<commit_message>
saving working draft - in progress
</commit_message>
<xml_diff>
--- a/Resources/PublishingSourceCode.pptx
+++ b/Resources/PublishingSourceCode.pptx
@@ -5,12 +5,20 @@
     <p:sldMasterId id="2147483648" r:id="rId1"/>
   </p:sldMasterIdLst>
   <p:notesMasterIdLst>
-    <p:notesMasterId r:id="rId5"/>
+    <p:notesMasterId r:id="rId13"/>
   </p:notesMasterIdLst>
   <p:sldIdLst>
     <p:sldId id="256" r:id="rId2"/>
-    <p:sldId id="258" r:id="rId3"/>
-    <p:sldId id="257" r:id="rId4"/>
+    <p:sldId id="260" r:id="rId3"/>
+    <p:sldId id="265" r:id="rId4"/>
+    <p:sldId id="266" r:id="rId5"/>
+    <p:sldId id="261" r:id="rId6"/>
+    <p:sldId id="262" r:id="rId7"/>
+    <p:sldId id="263" r:id="rId8"/>
+    <p:sldId id="264" r:id="rId9"/>
+    <p:sldId id="258" r:id="rId10"/>
+    <p:sldId id="257" r:id="rId11"/>
+    <p:sldId id="259" r:id="rId12"/>
   </p:sldIdLst>
   <p:sldSz cx="12192000" cy="6858000"/>
   <p:notesSz cx="6858000" cy="9144000"/>
@@ -109,6 +117,11 @@
       </a:defRPr>
     </a:lvl9pPr>
   </p:defaultTextStyle>
+  <p:extLst>
+    <p:ext uri="{EFAFB233-063F-42B5-8137-9DF3F51BA10A}">
+      <p15:sldGuideLst xmlns:p15="http://schemas.microsoft.com/office/powerpoint/2012/main"/>
+    </p:ext>
+  </p:extLst>
 </p:presentation>
 </file>
 
@@ -563,7 +576,7 @@
           <a:p>
             <a:fld id="{4F090570-C106-4FBC-AEF5-5C270F494E9C}" type="slidenum">
               <a:rPr lang="en-US" smtClean="0"/>
-              <a:t>3</a:t>
+              <a:t>10</a:t>
             </a:fld>
             <a:endParaRPr lang="en-US"/>
           </a:p>
@@ -3831,6 +3844,21 @@
               <a:rPr lang="en-US" dirty="0"/>
               <a:t>Publishing Source Code</a:t>
             </a:r>
+            <a:br>
+              <a:rPr lang="en-US" dirty="0"/>
+            </a:br>
+            <a:r>
+              <a:rPr lang="en-US" sz="3600" dirty="0"/>
+              <a:t>for</a:t>
+            </a:r>
+            <a:br>
+              <a:rPr lang="en-US" sz="3600" dirty="0"/>
+            </a:br>
+            <a:r>
+              <a:rPr lang="en-US" sz="3600" dirty="0"/>
+              <a:t>Reuse and Maintenance</a:t>
+            </a:r>
+            <a:endParaRPr lang="en-US" dirty="0"/>
           </a:p>
         </p:txBody>
       </p:sp>
@@ -3852,8 +3880,8 @@
         </p:nvSpPr>
         <p:spPr>
           <a:xfrm>
-            <a:off x="1524000" y="4024648"/>
-            <a:ext cx="9144000" cy="1233152"/>
+            <a:off x="1524000" y="4296992"/>
+            <a:ext cx="9144000" cy="960808"/>
           </a:xfrm>
         </p:spPr>
         <p:txBody>
@@ -3877,6 +3905,269 @@
     <p:extLst>
       <p:ext uri="{BB962C8B-B14F-4D97-AF65-F5344CB8AC3E}">
         <p14:creationId xmlns:p14="http://schemas.microsoft.com/office/powerpoint/2010/main" val="1859140117"/>
+      </p:ext>
+    </p:extLst>
+  </p:cSld>
+  <p:clrMapOvr>
+    <a:masterClrMapping/>
+  </p:clrMapOvr>
+</p:sld>
+</file>
+
+<file path=ppt/slides/slide10.xml><?xml version="1.0" encoding="utf-8"?>
+<p:sld xmlns:a="http://schemas.openxmlformats.org/drawingml/2006/main" xmlns:r="http://schemas.openxmlformats.org/officeDocument/2006/relationships" xmlns:p="http://schemas.openxmlformats.org/presentationml/2006/main">
+  <p:cSld>
+    <p:spTree>
+      <p:nvGrpSpPr>
+        <p:cNvPr id="1" name=""/>
+        <p:cNvGrpSpPr/>
+        <p:nvPr/>
+      </p:nvGrpSpPr>
+      <p:grpSpPr>
+        <a:xfrm>
+          <a:off x="0" y="0"/>
+          <a:ext cx="0" cy="0"/>
+          <a:chOff x="0" y="0"/>
+          <a:chExt cx="0" cy="0"/>
+        </a:xfrm>
+      </p:grpSpPr>
+      <p:sp>
+        <p:nvSpPr>
+          <p:cNvPr id="2" name="Title 1">
+            <a:extLst>
+              <a:ext uri="{FF2B5EF4-FFF2-40B4-BE49-F238E27FC236}">
+                <a16:creationId xmlns:a16="http://schemas.microsoft.com/office/drawing/2014/main" id="{B4725340-475B-4911-AC68-3E9A7FF99896}"/>
+              </a:ext>
+            </a:extLst>
+          </p:cNvPr>
+          <p:cNvSpPr>
+            <a:spLocks noGrp="1"/>
+          </p:cNvSpPr>
+          <p:nvPr>
+            <p:ph type="title"/>
+          </p:nvPr>
+        </p:nvSpPr>
+        <p:spPr/>
+        <p:txBody>
+          <a:bodyPr/>
+          <a:lstStyle/>
+          <a:p>
+            <a:r>
+              <a:rPr lang="en-US" dirty="0"/>
+              <a:t>The Issues</a:t>
+            </a:r>
+          </a:p>
+        </p:txBody>
+      </p:sp>
+      <p:sp>
+        <p:nvSpPr>
+          <p:cNvPr id="3" name="Content Placeholder 2">
+            <a:extLst>
+              <a:ext uri="{FF2B5EF4-FFF2-40B4-BE49-F238E27FC236}">
+                <a16:creationId xmlns:a16="http://schemas.microsoft.com/office/drawing/2014/main" id="{D28EEC85-0147-4609-8EA7-C7AE355F5329}"/>
+              </a:ext>
+            </a:extLst>
+          </p:cNvPr>
+          <p:cNvSpPr>
+            <a:spLocks noGrp="1"/>
+          </p:cNvSpPr>
+          <p:nvPr>
+            <p:ph idx="1"/>
+          </p:nvPr>
+        </p:nvSpPr>
+        <p:spPr>
+          <a:xfrm>
+            <a:off x="838200" y="1390918"/>
+            <a:ext cx="10515600" cy="4786045"/>
+          </a:xfrm>
+        </p:spPr>
+        <p:txBody>
+          <a:bodyPr/>
+          <a:lstStyle/>
+          <a:p>
+            <a:pPr>
+              <a:lnSpc>
+                <a:spcPct val="150000"/>
+              </a:lnSpc>
+            </a:pPr>
+            <a:r>
+              <a:rPr lang="en-US" dirty="0"/>
+              <a:t>Source code containment and delivery are solved problems</a:t>
+            </a:r>
+          </a:p>
+          <a:p>
+            <a:pPr lvl="1">
+              <a:lnSpc>
+                <a:spcPct val="100000"/>
+              </a:lnSpc>
+            </a:pPr>
+            <a:r>
+              <a:rPr lang="en-US" dirty="0"/>
+              <a:t>Cloud-based facilities like </a:t>
+            </a:r>
+            <a:r>
+              <a:rPr lang="en-US" dirty="0" err="1"/>
+              <a:t>github</a:t>
+            </a:r>
+            <a:r>
+              <a:rPr lang="en-US" dirty="0"/>
+              <a:t> do that very well</a:t>
+            </a:r>
+          </a:p>
+          <a:p>
+            <a:pPr>
+              <a:lnSpc>
+                <a:spcPct val="150000"/>
+              </a:lnSpc>
+            </a:pPr>
+            <a:r>
+              <a:rPr lang="en-US" dirty="0"/>
+              <a:t>The issues are finding and understanding code relevant to a need</a:t>
+            </a:r>
+          </a:p>
+          <a:p>
+            <a:pPr lvl="1">
+              <a:lnSpc>
+                <a:spcPct val="100000"/>
+              </a:lnSpc>
+            </a:pPr>
+            <a:r>
+              <a:rPr lang="en-US" dirty="0"/>
+              <a:t>We want most code repositories to be large – to support broad reuse</a:t>
+            </a:r>
+          </a:p>
+          <a:p>
+            <a:pPr lvl="1">
+              <a:lnSpc>
+                <a:spcPct val="100000"/>
+              </a:lnSpc>
+            </a:pPr>
+            <a:r>
+              <a:rPr lang="en-US" dirty="0"/>
+              <a:t>How do we find, in a large repository, code that fills some need?</a:t>
+            </a:r>
+          </a:p>
+          <a:p>
+            <a:pPr>
+              <a:lnSpc>
+                <a:spcPct val="100000"/>
+              </a:lnSpc>
+            </a:pPr>
+            <a:r>
+              <a:rPr lang="en-US" dirty="0"/>
+              <a:t>Website documentation, collocated with source code, is a good option</a:t>
+            </a:r>
+          </a:p>
+          <a:p>
+            <a:pPr lvl="1">
+              <a:lnSpc>
+                <a:spcPct val="100000"/>
+              </a:lnSpc>
+            </a:pPr>
+            <a:r>
+              <a:rPr lang="en-US" dirty="0"/>
+              <a:t>To support both salvage and reuse documentation needs to provide information about the component’s concept, design, and typical use</a:t>
+            </a:r>
+          </a:p>
+        </p:txBody>
+      </p:sp>
+    </p:spTree>
+    <p:extLst>
+      <p:ext uri="{BB962C8B-B14F-4D97-AF65-F5344CB8AC3E}">
+        <p14:creationId xmlns:p14="http://schemas.microsoft.com/office/powerpoint/2010/main" val="1974146755"/>
+      </p:ext>
+    </p:extLst>
+  </p:cSld>
+  <p:clrMapOvr>
+    <a:masterClrMapping/>
+  </p:clrMapOvr>
+</p:sld>
+</file>
+
+<file path=ppt/slides/slide11.xml><?xml version="1.0" encoding="utf-8"?>
+<p:sld xmlns:a="http://schemas.openxmlformats.org/drawingml/2006/main" xmlns:r="http://schemas.openxmlformats.org/officeDocument/2006/relationships" xmlns:p="http://schemas.openxmlformats.org/presentationml/2006/main">
+  <p:cSld>
+    <p:spTree>
+      <p:nvGrpSpPr>
+        <p:cNvPr id="1" name=""/>
+        <p:cNvGrpSpPr/>
+        <p:nvPr/>
+      </p:nvGrpSpPr>
+      <p:grpSpPr>
+        <a:xfrm>
+          <a:off x="0" y="0"/>
+          <a:ext cx="0" cy="0"/>
+          <a:chOff x="0" y="0"/>
+          <a:chExt cx="0" cy="0"/>
+        </a:xfrm>
+      </p:grpSpPr>
+      <p:sp>
+        <p:nvSpPr>
+          <p:cNvPr id="2" name="Title 1">
+            <a:extLst>
+              <a:ext uri="{FF2B5EF4-FFF2-40B4-BE49-F238E27FC236}">
+                <a16:creationId xmlns:a16="http://schemas.microsoft.com/office/drawing/2014/main" id="{2881EC79-B8EB-4B86-9096-033DD253DA73}"/>
+              </a:ext>
+            </a:extLst>
+          </p:cNvPr>
+          <p:cNvSpPr>
+            <a:spLocks noGrp="1"/>
+          </p:cNvSpPr>
+          <p:nvPr>
+            <p:ph type="title"/>
+          </p:nvPr>
+        </p:nvSpPr>
+        <p:spPr/>
+        <p:txBody>
+          <a:bodyPr/>
+          <a:lstStyle/>
+          <a:p>
+            <a:r>
+              <a:rPr lang="en-US" dirty="0"/>
+              <a:t>Site Structure</a:t>
+            </a:r>
+          </a:p>
+        </p:txBody>
+      </p:sp>
+      <p:pic>
+        <p:nvPicPr>
+          <p:cNvPr id="9" name="Content Placeholder 8" descr="A screenshot of a cell phone&#10;&#10;Description automatically generated">
+            <a:extLst>
+              <a:ext uri="{FF2B5EF4-FFF2-40B4-BE49-F238E27FC236}">
+                <a16:creationId xmlns:a16="http://schemas.microsoft.com/office/drawing/2014/main" id="{82156CF1-0166-439C-8BE3-5189825ED8A0}"/>
+              </a:ext>
+            </a:extLst>
+          </p:cNvPr>
+          <p:cNvPicPr>
+            <a:picLocks noGrp="1" noChangeAspect="1"/>
+          </p:cNvPicPr>
+          <p:nvPr>
+            <p:ph idx="1"/>
+          </p:nvPr>
+        </p:nvPicPr>
+        <p:blipFill>
+          <a:blip r:embed="rId2">
+            <a:extLst>
+              <a:ext uri="{28A0092B-C50C-407E-A947-70E740481C1C}">
+                <a14:useLocalDpi xmlns:a14="http://schemas.microsoft.com/office/drawing/2010/main" val="0"/>
+              </a:ext>
+            </a:extLst>
+          </a:blip>
+          <a:stretch>
+            <a:fillRect/>
+          </a:stretch>
+        </p:blipFill>
+        <p:spPr>
+          <a:xfrm>
+            <a:off x="1456870" y="1609725"/>
+            <a:ext cx="9278259" cy="4605338"/>
+          </a:xfrm>
+        </p:spPr>
+      </p:pic>
+    </p:spTree>
+    <p:extLst>
+      <p:ext uri="{BB962C8B-B14F-4D97-AF65-F5344CB8AC3E}">
+        <p14:creationId xmlns:p14="http://schemas.microsoft.com/office/powerpoint/2010/main" val="431493297"/>
       </p:ext>
     </p:extLst>
   </p:cSld>
@@ -3908,7 +4199,7 @@
           <p:cNvPr id="2" name="Title 1">
             <a:extLst>
               <a:ext uri="{FF2B5EF4-FFF2-40B4-BE49-F238E27FC236}">
-                <a16:creationId xmlns:a16="http://schemas.microsoft.com/office/drawing/2014/main" id="{7B9AA4E2-8439-499E-8E09-B7B92D39946D}"/>
+                <a16:creationId xmlns:a16="http://schemas.microsoft.com/office/drawing/2014/main" id="{C818CF9C-B350-4936-99E1-D89031958E0C}"/>
               </a:ext>
             </a:extLst>
           </p:cNvPr>
@@ -3919,14 +4210,19 @@
             <p:ph type="title"/>
           </p:nvPr>
         </p:nvSpPr>
-        <p:spPr/>
+        <p:spPr>
+          <a:xfrm>
+            <a:off x="838200" y="339367"/>
+            <a:ext cx="10515600" cy="678161"/>
+          </a:xfrm>
+        </p:spPr>
         <p:txBody>
           <a:bodyPr/>
           <a:lstStyle/>
           <a:p>
             <a:r>
               <a:rPr lang="en-US" dirty="0"/>
-              <a:t>Publishing Code to Support Reuse</a:t>
+              <a:t>Domains</a:t>
             </a:r>
           </a:p>
         </p:txBody>
@@ -3936,7 +4232,7 @@
           <p:cNvPr id="3" name="Content Placeholder 2">
             <a:extLst>
               <a:ext uri="{FF2B5EF4-FFF2-40B4-BE49-F238E27FC236}">
-                <a16:creationId xmlns:a16="http://schemas.microsoft.com/office/drawing/2014/main" id="{52CCEAD5-80CD-43AC-9D2F-18A29BD5B9E1}"/>
+                <a16:creationId xmlns:a16="http://schemas.microsoft.com/office/drawing/2014/main" id="{C65F66DE-FE31-4539-83AE-36CA6E637596}"/>
               </a:ext>
             </a:extLst>
           </p:cNvPr>
@@ -3947,42 +4243,115 @@
             <p:ph idx="1"/>
           </p:nvPr>
         </p:nvSpPr>
-        <p:spPr/>
-        <p:txBody>
-          <a:bodyPr/>
-          <a:lstStyle/>
-          <a:p>
-            <a:r>
-              <a:rPr lang="en-US" dirty="0"/>
-              <a:t>Four main facets:</a:t>
+        <p:spPr>
+          <a:xfrm>
+            <a:off x="838200" y="1017529"/>
+            <a:ext cx="10515600" cy="5355770"/>
+          </a:xfrm>
+        </p:spPr>
+        <p:txBody>
+          <a:bodyPr>
+            <a:noAutofit/>
+          </a:bodyPr>
+          <a:lstStyle/>
+          <a:p>
+            <a:r>
+              <a:rPr lang="en-US" sz="2000" dirty="0"/>
+              <a:t>Academic Research: 5 – 10 code developers</a:t>
             </a:r>
           </a:p>
           <a:p>
             <a:pPr lvl="1"/>
             <a:r>
-              <a:rPr lang="en-US" dirty="0"/>
-              <a:t>Containment</a:t>
+              <a:rPr lang="en-US" sz="1800" dirty="0"/>
+              <a:t>Code life-time: 3 – 5 years</a:t>
             </a:r>
           </a:p>
           <a:p>
             <a:pPr lvl="1"/>
             <a:r>
-              <a:rPr lang="en-US" dirty="0"/>
-              <a:t>Delivery</a:t>
+              <a:rPr lang="en-US" sz="1800" dirty="0"/>
+              <a:t>Example: Natural Language Processing (NLP)</a:t>
+            </a:r>
+          </a:p>
+          <a:p>
+            <a:r>
+              <a:rPr lang="en-US" sz="2000" dirty="0"/>
+              <a:t>Open Source Development: 5 – 1000 active developers, many casual contributors</a:t>
             </a:r>
           </a:p>
           <a:p>
             <a:pPr lvl="1"/>
             <a:r>
-              <a:rPr lang="en-US" dirty="0"/>
-              <a:t>Location</a:t>
+              <a:rPr lang="en-US" sz="1800" dirty="0"/>
+              <a:t>Code life-time: 10 - 20 years</a:t>
             </a:r>
           </a:p>
           <a:p>
             <a:pPr lvl="1"/>
             <a:r>
-              <a:rPr lang="en-US" dirty="0"/>
-              <a:t>Interpretation</a:t>
+              <a:rPr lang="en-US" sz="1800" dirty="0"/>
+              <a:t>Example: Linux</a:t>
+            </a:r>
+          </a:p>
+          <a:p>
+            <a:r>
+              <a:rPr lang="en-US" sz="2000" dirty="0"/>
+              <a:t>Industrial Development: 5 – 10 developers</a:t>
+            </a:r>
+          </a:p>
+          <a:p>
+            <a:pPr lvl="1"/>
+            <a:r>
+              <a:rPr lang="en-US" sz="1800" dirty="0"/>
+              <a:t>Code life-time: 5 – 20 years</a:t>
+            </a:r>
+          </a:p>
+          <a:p>
+            <a:pPr lvl="1"/>
+            <a:r>
+              <a:rPr lang="en-US" sz="1800" dirty="0"/>
+              <a:t>Example: Machine Tool Control</a:t>
+            </a:r>
+          </a:p>
+          <a:p>
+            <a:r>
+              <a:rPr lang="en-US" sz="2000" dirty="0"/>
+              <a:t>Commercial Products: 10 – 30 developers</a:t>
+            </a:r>
+          </a:p>
+          <a:p>
+            <a:pPr lvl="1"/>
+            <a:r>
+              <a:rPr lang="en-US" sz="1800" dirty="0"/>
+              <a:t>Code life-time: 20 – 30 years</a:t>
+            </a:r>
+          </a:p>
+          <a:p>
+            <a:pPr lvl="1"/>
+            <a:r>
+              <a:rPr lang="en-US" sz="1800" dirty="0"/>
+              <a:t>Example: Microsoft Word</a:t>
+            </a:r>
+          </a:p>
+          <a:p>
+            <a:r>
+              <a:rPr lang="en-US" sz="2000" dirty="0"/>
+              <a:t>Aerospace Programs: 5 – 200 developers</a:t>
+            </a:r>
+          </a:p>
+          <a:p>
+            <a:pPr lvl="1"/>
+            <a:r>
+              <a:rPr lang="en-US" sz="1600" dirty="0"/>
+              <a:t>Code life-time: 20 – 30 years</a:t>
+            </a:r>
+          </a:p>
+          <a:p>
+            <a:pPr lvl="1"/>
+            <a:r>
+              <a:rPr lang="en-US" sz="1600" dirty="0"/>
+              <a:t>Example: Submarine control, Area surveillance, ..</a:t>
             </a:r>
           </a:p>
         </p:txBody>
@@ -3990,7 +4359,7 @@
     </p:spTree>
     <p:extLst>
       <p:ext uri="{BB962C8B-B14F-4D97-AF65-F5344CB8AC3E}">
-        <p14:creationId xmlns:p14="http://schemas.microsoft.com/office/powerpoint/2010/main" val="4268696743"/>
+        <p14:creationId xmlns:p14="http://schemas.microsoft.com/office/powerpoint/2010/main" val="3351627177"/>
       </p:ext>
     </p:extLst>
   </p:cSld>
@@ -4022,7 +4391,7 @@
           <p:cNvPr id="2" name="Title 1">
             <a:extLst>
               <a:ext uri="{FF2B5EF4-FFF2-40B4-BE49-F238E27FC236}">
-                <a16:creationId xmlns:a16="http://schemas.microsoft.com/office/drawing/2014/main" id="{B4725340-475B-4911-AC68-3E9A7FF99896}"/>
+                <a16:creationId xmlns:a16="http://schemas.microsoft.com/office/drawing/2014/main" id="{FC761616-BC4C-4E83-8885-917C3743ADBF}"/>
               </a:ext>
             </a:extLst>
           </p:cNvPr>
@@ -4031,45 +4400,1046 @@
           </p:cNvSpPr>
           <p:nvPr>
             <p:ph type="title"/>
-          </p:nvPr>
-        </p:nvSpPr>
-        <p:spPr/>
-        <p:txBody>
-          <a:bodyPr/>
-          <a:lstStyle/>
-          <a:p>
-            <a:r>
-              <a:rPr lang="en-US" dirty="0"/>
-              <a:t>Publishing?</a:t>
-            </a:r>
-          </a:p>
-        </p:txBody>
-      </p:sp>
-      <p:sp>
-        <p:nvSpPr>
-          <p:cNvPr id="3" name="Content Placeholder 2">
-            <a:extLst>
-              <a:ext uri="{FF2B5EF4-FFF2-40B4-BE49-F238E27FC236}">
-                <a16:creationId xmlns:a16="http://schemas.microsoft.com/office/drawing/2014/main" id="{D28EEC85-0147-4609-8EA7-C7AE355F5329}"/>
-              </a:ext>
-            </a:extLst>
-          </p:cNvPr>
-          <p:cNvSpPr>
-            <a:spLocks noGrp="1"/>
-          </p:cNvSpPr>
-          <p:nvPr>
-            <p:ph idx="1"/>
           </p:nvPr>
         </p:nvSpPr>
         <p:spPr>
           <a:xfrm>
-            <a:off x="838200" y="1601919"/>
-            <a:ext cx="10515600" cy="4575044"/>
+            <a:off x="838200" y="339367"/>
+            <a:ext cx="10515600" cy="1248428"/>
           </a:xfrm>
         </p:spPr>
         <p:txBody>
           <a:bodyPr/>
           <a:lstStyle/>
+          <a:p>
+            <a:pPr>
+              <a:lnSpc>
+                <a:spcPct val="50000"/>
+              </a:lnSpc>
+            </a:pPr>
+            <a:r>
+              <a:rPr lang="en-US" dirty="0"/>
+              <a:t>Open-Source Domain</a:t>
+            </a:r>
+            <a:br>
+              <a:rPr lang="en-US" dirty="0"/>
+            </a:br>
+            <a:r>
+              <a:rPr lang="en-US" dirty="0"/>
+              <a:t>	</a:t>
+            </a:r>
+            <a:r>
+              <a:rPr lang="en-US" sz="2800" dirty="0"/>
+              <a:t>Parts flow in, a product flows out</a:t>
+            </a:r>
+            <a:endParaRPr lang="en-US" dirty="0"/>
+          </a:p>
+        </p:txBody>
+      </p:sp>
+      <p:sp>
+        <p:nvSpPr>
+          <p:cNvPr id="3" name="Content Placeholder 2">
+            <a:extLst>
+              <a:ext uri="{FF2B5EF4-FFF2-40B4-BE49-F238E27FC236}">
+                <a16:creationId xmlns:a16="http://schemas.microsoft.com/office/drawing/2014/main" id="{F48E1EFF-811D-455D-A807-038454B9CF7F}"/>
+              </a:ext>
+            </a:extLst>
+          </p:cNvPr>
+          <p:cNvSpPr>
+            <a:spLocks noGrp="1"/>
+          </p:cNvSpPr>
+          <p:nvPr>
+            <p:ph idx="1"/>
+          </p:nvPr>
+        </p:nvSpPr>
+        <p:spPr>
+          <a:xfrm>
+            <a:off x="774405" y="1587795"/>
+            <a:ext cx="10515600" cy="4848447"/>
+          </a:xfrm>
+        </p:spPr>
+        <p:txBody>
+          <a:bodyPr>
+            <a:normAutofit/>
+          </a:bodyPr>
+          <a:lstStyle/>
+          <a:p>
+            <a:r>
+              <a:rPr lang="en-US" sz="2400" dirty="0"/>
+              <a:t>Open-source projects like Linux</a:t>
+            </a:r>
+          </a:p>
+          <a:p>
+            <a:pPr lvl="1"/>
+            <a:r>
+              <a:rPr lang="en-US" sz="2000" dirty="0"/>
+              <a:t>Locally developed code flows to the cloud</a:t>
+            </a:r>
+          </a:p>
+          <a:p>
+            <a:pPr lvl="2"/>
+            <a:r>
+              <a:rPr lang="en-US" sz="1800" dirty="0"/>
+              <a:t>Local contributors push to remote development branch</a:t>
+            </a:r>
+          </a:p>
+          <a:p>
+            <a:pPr lvl="1"/>
+            <a:r>
+              <a:rPr lang="en-US" sz="2000" dirty="0"/>
+              <a:t>A single large system flows from the cloud to local users</a:t>
+            </a:r>
+          </a:p>
+          <a:p>
+            <a:pPr lvl="2"/>
+            <a:r>
+              <a:rPr lang="en-US" sz="1800" dirty="0"/>
+              <a:t>Download a distro</a:t>
+            </a:r>
+          </a:p>
+          <a:p>
+            <a:r>
+              <a:rPr lang="en-US" sz="2400" dirty="0"/>
+              <a:t>Open-source applications like node.js</a:t>
+            </a:r>
+          </a:p>
+          <a:p>
+            <a:pPr lvl="1"/>
+            <a:r>
+              <a:rPr lang="en-US" sz="2000" dirty="0"/>
+              <a:t>Developed by small group of contributors</a:t>
+            </a:r>
+          </a:p>
+          <a:p>
+            <a:pPr lvl="1"/>
+            <a:r>
+              <a:rPr lang="en-US" sz="2000" dirty="0"/>
+              <a:t>Users download and install system with additional imports</a:t>
+            </a:r>
+          </a:p>
+          <a:p>
+            <a:r>
+              <a:rPr lang="en-US" sz="2400" dirty="0"/>
+              <a:t>Open-source libraries like jQuery.js</a:t>
+            </a:r>
+          </a:p>
+          <a:p>
+            <a:pPr lvl="1"/>
+            <a:r>
+              <a:rPr lang="en-US" sz="2000" dirty="0"/>
+              <a:t>Developed by small group of contributors</a:t>
+            </a:r>
+          </a:p>
+          <a:p>
+            <a:pPr lvl="1"/>
+            <a:r>
+              <a:rPr lang="en-US" sz="2000" dirty="0"/>
+              <a:t>Users bind remote library to webpages with CDN links</a:t>
+            </a:r>
+          </a:p>
+        </p:txBody>
+      </p:sp>
+    </p:spTree>
+    <p:extLst>
+      <p:ext uri="{BB962C8B-B14F-4D97-AF65-F5344CB8AC3E}">
+        <p14:creationId xmlns:p14="http://schemas.microsoft.com/office/powerpoint/2010/main" val="553079437"/>
+      </p:ext>
+    </p:extLst>
+  </p:cSld>
+  <p:clrMapOvr>
+    <a:masterClrMapping/>
+  </p:clrMapOvr>
+</p:sld>
+</file>
+
+<file path=ppt/slides/slide4.xml><?xml version="1.0" encoding="utf-8"?>
+<p:sld xmlns:a="http://schemas.openxmlformats.org/drawingml/2006/main" xmlns:r="http://schemas.openxmlformats.org/officeDocument/2006/relationships" xmlns:p="http://schemas.openxmlformats.org/presentationml/2006/main">
+  <p:cSld>
+    <p:spTree>
+      <p:nvGrpSpPr>
+        <p:cNvPr id="1" name=""/>
+        <p:cNvGrpSpPr/>
+        <p:nvPr/>
+      </p:nvGrpSpPr>
+      <p:grpSpPr>
+        <a:xfrm>
+          <a:off x="0" y="0"/>
+          <a:ext cx="0" cy="0"/>
+          <a:chOff x="0" y="0"/>
+          <a:chExt cx="0" cy="0"/>
+        </a:xfrm>
+      </p:grpSpPr>
+      <p:sp>
+        <p:nvSpPr>
+          <p:cNvPr id="2" name="Title 1">
+            <a:extLst>
+              <a:ext uri="{FF2B5EF4-FFF2-40B4-BE49-F238E27FC236}">
+                <a16:creationId xmlns:a16="http://schemas.microsoft.com/office/drawing/2014/main" id="{B8048834-3763-4979-BA81-DCC31DC3F05D}"/>
+              </a:ext>
+            </a:extLst>
+          </p:cNvPr>
+          <p:cNvSpPr>
+            <a:spLocks noGrp="1"/>
+          </p:cNvSpPr>
+          <p:nvPr>
+            <p:ph type="title"/>
+          </p:nvPr>
+        </p:nvSpPr>
+        <p:spPr>
+          <a:xfrm>
+            <a:off x="838200" y="495311"/>
+            <a:ext cx="10515600" cy="1051551"/>
+          </a:xfrm>
+        </p:spPr>
+        <p:txBody>
+          <a:bodyPr/>
+          <a:lstStyle/>
+          <a:p>
+            <a:pPr>
+              <a:lnSpc>
+                <a:spcPct val="50000"/>
+              </a:lnSpc>
+            </a:pPr>
+            <a:r>
+              <a:rPr lang="en-US" dirty="0"/>
+              <a:t>Other Domains</a:t>
+            </a:r>
+            <a:br>
+              <a:rPr lang="en-US" dirty="0"/>
+            </a:br>
+            <a:r>
+              <a:rPr lang="en-US" dirty="0"/>
+              <a:t>	</a:t>
+            </a:r>
+            <a:r>
+              <a:rPr lang="en-US" sz="3200" dirty="0"/>
+              <a:t>Components installed, flow out to users</a:t>
+            </a:r>
+            <a:endParaRPr lang="en-US" dirty="0"/>
+          </a:p>
+        </p:txBody>
+      </p:sp>
+      <p:sp>
+        <p:nvSpPr>
+          <p:cNvPr id="3" name="Content Placeholder 2">
+            <a:extLst>
+              <a:ext uri="{FF2B5EF4-FFF2-40B4-BE49-F238E27FC236}">
+                <a16:creationId xmlns:a16="http://schemas.microsoft.com/office/drawing/2014/main" id="{5B0EB159-6705-41C1-885A-26BC3E0FBFFE}"/>
+              </a:ext>
+            </a:extLst>
+          </p:cNvPr>
+          <p:cNvSpPr>
+            <a:spLocks noGrp="1"/>
+          </p:cNvSpPr>
+          <p:nvPr>
+            <p:ph idx="1"/>
+          </p:nvPr>
+        </p:nvSpPr>
+        <p:spPr>
+          <a:xfrm>
+            <a:off x="838200" y="1701209"/>
+            <a:ext cx="10515600" cy="4719953"/>
+          </a:xfrm>
+        </p:spPr>
+        <p:txBody>
+          <a:bodyPr/>
+          <a:lstStyle/>
+          <a:p>
+            <a:r>
+              <a:rPr lang="en-US" dirty="0"/>
+              <a:t>Users search for a component to fill a current implementation need</a:t>
+            </a:r>
+          </a:p>
+          <a:p>
+            <a:pPr lvl="1"/>
+            <a:r>
+              <a:rPr lang="en-US" dirty="0"/>
+              <a:t>Repository needs to be large, i.e., hold many components so there is a fairly good change to find something useful</a:t>
+            </a:r>
+          </a:p>
+          <a:p>
+            <a:pPr lvl="1"/>
+            <a:r>
+              <a:rPr lang="en-US" dirty="0"/>
+              <a:t>So search and interpretation need to be effective</a:t>
+            </a:r>
+          </a:p>
+          <a:p>
+            <a:pPr lvl="1"/>
+            <a:r>
+              <a:rPr lang="en-US" dirty="0"/>
+              <a:t>For repositories with hundreds of components that is not trivial</a:t>
+            </a:r>
+          </a:p>
+          <a:p>
+            <a:r>
+              <a:rPr lang="en-US" dirty="0"/>
+              <a:t>The main issues are:</a:t>
+            </a:r>
+          </a:p>
+          <a:p>
+            <a:pPr lvl="1"/>
+            <a:r>
+              <a:rPr lang="en-US" dirty="0"/>
+              <a:t>Developing a useful search process that is intuitive and quick</a:t>
+            </a:r>
+          </a:p>
+          <a:p>
+            <a:pPr lvl="1"/>
+            <a:r>
+              <a:rPr lang="en-US" dirty="0"/>
+              <a:t>Helping users interpret a found component</a:t>
+            </a:r>
+          </a:p>
+          <a:p>
+            <a:pPr lvl="2"/>
+            <a:r>
+              <a:rPr lang="en-US" dirty="0"/>
+              <a:t>What does it do?</a:t>
+            </a:r>
+          </a:p>
+          <a:p>
+            <a:pPr lvl="2"/>
+            <a:r>
+              <a:rPr lang="en-US" dirty="0"/>
+              <a:t>How is it designed?</a:t>
+            </a:r>
+          </a:p>
+          <a:p>
+            <a:pPr lvl="2"/>
+            <a:r>
+              <a:rPr lang="en-US" dirty="0"/>
+              <a:t>How to integrate with existing code?</a:t>
+            </a:r>
+          </a:p>
+          <a:p>
+            <a:pPr lvl="2"/>
+            <a:endParaRPr lang="en-US" dirty="0"/>
+          </a:p>
+        </p:txBody>
+      </p:sp>
+    </p:spTree>
+    <p:extLst>
+      <p:ext uri="{BB962C8B-B14F-4D97-AF65-F5344CB8AC3E}">
+        <p14:creationId xmlns:p14="http://schemas.microsoft.com/office/powerpoint/2010/main" val="4110067833"/>
+      </p:ext>
+    </p:extLst>
+  </p:cSld>
+  <p:clrMapOvr>
+    <a:masterClrMapping/>
+  </p:clrMapOvr>
+</p:sld>
+</file>
+
+<file path=ppt/slides/slide5.xml><?xml version="1.0" encoding="utf-8"?>
+<p:sld xmlns:a="http://schemas.openxmlformats.org/drawingml/2006/main" xmlns:r="http://schemas.openxmlformats.org/officeDocument/2006/relationships" xmlns:p="http://schemas.openxmlformats.org/presentationml/2006/main" show="0">
+  <p:cSld>
+    <p:spTree>
+      <p:nvGrpSpPr>
+        <p:cNvPr id="1" name=""/>
+        <p:cNvGrpSpPr/>
+        <p:nvPr/>
+      </p:nvGrpSpPr>
+      <p:grpSpPr>
+        <a:xfrm>
+          <a:off x="0" y="0"/>
+          <a:ext cx="0" cy="0"/>
+          <a:chOff x="0" y="0"/>
+          <a:chExt cx="0" cy="0"/>
+        </a:xfrm>
+      </p:grpSpPr>
+      <p:sp>
+        <p:nvSpPr>
+          <p:cNvPr id="2" name="Title 1">
+            <a:extLst>
+              <a:ext uri="{FF2B5EF4-FFF2-40B4-BE49-F238E27FC236}">
+                <a16:creationId xmlns:a16="http://schemas.microsoft.com/office/drawing/2014/main" id="{C818CF9C-B350-4936-99E1-D89031958E0C}"/>
+              </a:ext>
+            </a:extLst>
+          </p:cNvPr>
+          <p:cNvSpPr>
+            <a:spLocks noGrp="1"/>
+          </p:cNvSpPr>
+          <p:nvPr>
+            <p:ph type="title"/>
+          </p:nvPr>
+        </p:nvSpPr>
+        <p:spPr>
+          <a:xfrm>
+            <a:off x="838200" y="339367"/>
+            <a:ext cx="10515600" cy="678161"/>
+          </a:xfrm>
+        </p:spPr>
+        <p:txBody>
+          <a:bodyPr/>
+          <a:lstStyle/>
+          <a:p>
+            <a:r>
+              <a:rPr lang="en-US" dirty="0"/>
+              <a:t>Academic Research Domain</a:t>
+            </a:r>
+          </a:p>
+        </p:txBody>
+      </p:sp>
+      <p:sp>
+        <p:nvSpPr>
+          <p:cNvPr id="3" name="Content Placeholder 2">
+            <a:extLst>
+              <a:ext uri="{FF2B5EF4-FFF2-40B4-BE49-F238E27FC236}">
+                <a16:creationId xmlns:a16="http://schemas.microsoft.com/office/drawing/2014/main" id="{C65F66DE-FE31-4539-83AE-36CA6E637596}"/>
+              </a:ext>
+            </a:extLst>
+          </p:cNvPr>
+          <p:cNvSpPr>
+            <a:spLocks noGrp="1"/>
+          </p:cNvSpPr>
+          <p:nvPr>
+            <p:ph idx="1"/>
+          </p:nvPr>
+        </p:nvSpPr>
+        <p:spPr>
+          <a:xfrm>
+            <a:off x="838200" y="1017529"/>
+            <a:ext cx="10515600" cy="5355770"/>
+          </a:xfrm>
+        </p:spPr>
+        <p:txBody>
+          <a:bodyPr>
+            <a:noAutofit/>
+          </a:bodyPr>
+          <a:lstStyle/>
+          <a:p>
+            <a:r>
+              <a:rPr lang="en-US" sz="2000" dirty="0"/>
+              <a:t>Academic Research: 5 – 10 code developers</a:t>
+            </a:r>
+          </a:p>
+          <a:p>
+            <a:pPr lvl="1"/>
+            <a:r>
+              <a:rPr lang="en-US" sz="1800" dirty="0"/>
+              <a:t>Code life-time: 3 – 5 years</a:t>
+            </a:r>
+          </a:p>
+          <a:p>
+            <a:pPr lvl="1"/>
+            <a:r>
+              <a:rPr lang="en-US" sz="1800" dirty="0"/>
+              <a:t>Example: Natural Language Processing (NLP)</a:t>
+            </a:r>
+          </a:p>
+          <a:p>
+            <a:r>
+              <a:rPr lang="en-US" sz="2000" dirty="0"/>
+              <a:t>An academic researcher may have 2 or 3 doctoral candidates working on related parts of a research project.</a:t>
+            </a:r>
+          </a:p>
+          <a:p>
+            <a:r>
+              <a:rPr lang="en-US" sz="2000" dirty="0"/>
+              <a:t>She may collaborate with two or three colleagues, perhaps at different universities.</a:t>
+            </a:r>
+          </a:p>
+          <a:p>
+            <a:pPr lvl="1"/>
+            <a:r>
+              <a:rPr lang="en-US" sz="1800" dirty="0"/>
+              <a:t>Each of those colleagues may have a similar team working on related projects.</a:t>
+            </a:r>
+          </a:p>
+          <a:p>
+            <a:r>
+              <a:rPr lang="en-US" sz="2200" dirty="0"/>
+              <a:t>There usually is continuing work on the same or related research projects for many years.</a:t>
+            </a:r>
+          </a:p>
+          <a:p>
+            <a:r>
+              <a:rPr lang="en-US" sz="2200" dirty="0"/>
+              <a:t>It is quite common that this work develops software tools for gathering and analyzing data.  Sometimes software is part of the end product, e.g., compilers for a new language, an architecture for streaming or classifying content, …</a:t>
+            </a:r>
+          </a:p>
+          <a:p>
+            <a:r>
+              <a:rPr lang="en-US" sz="2200" dirty="0"/>
+              <a:t>These software developments are rarely maintained well.  Often documentation is nothing but poorly written code.</a:t>
+            </a:r>
+          </a:p>
+          <a:p>
+            <a:r>
+              <a:rPr lang="en-US" sz="2200" dirty="0"/>
+              <a:t>Software exchange is often ad-hoc.</a:t>
+            </a:r>
+          </a:p>
+        </p:txBody>
+      </p:sp>
+    </p:spTree>
+    <p:extLst>
+      <p:ext uri="{BB962C8B-B14F-4D97-AF65-F5344CB8AC3E}">
+        <p14:creationId xmlns:p14="http://schemas.microsoft.com/office/powerpoint/2010/main" val="3236624771"/>
+      </p:ext>
+    </p:extLst>
+  </p:cSld>
+  <p:clrMapOvr>
+    <a:masterClrMapping/>
+  </p:clrMapOvr>
+</p:sld>
+</file>
+
+<file path=ppt/slides/slide6.xml><?xml version="1.0" encoding="utf-8"?>
+<p:sld xmlns:a="http://schemas.openxmlformats.org/drawingml/2006/main" xmlns:r="http://schemas.openxmlformats.org/officeDocument/2006/relationships" xmlns:p="http://schemas.openxmlformats.org/presentationml/2006/main" show="0">
+  <p:cSld>
+    <p:spTree>
+      <p:nvGrpSpPr>
+        <p:cNvPr id="1" name=""/>
+        <p:cNvGrpSpPr/>
+        <p:nvPr/>
+      </p:nvGrpSpPr>
+      <p:grpSpPr>
+        <a:xfrm>
+          <a:off x="0" y="0"/>
+          <a:ext cx="0" cy="0"/>
+          <a:chOff x="0" y="0"/>
+          <a:chExt cx="0" cy="0"/>
+        </a:xfrm>
+      </p:grpSpPr>
+      <p:sp>
+        <p:nvSpPr>
+          <p:cNvPr id="2" name="Title 1">
+            <a:extLst>
+              <a:ext uri="{FF2B5EF4-FFF2-40B4-BE49-F238E27FC236}">
+                <a16:creationId xmlns:a16="http://schemas.microsoft.com/office/drawing/2014/main" id="{C818CF9C-B350-4936-99E1-D89031958E0C}"/>
+              </a:ext>
+            </a:extLst>
+          </p:cNvPr>
+          <p:cNvSpPr>
+            <a:spLocks noGrp="1"/>
+          </p:cNvSpPr>
+          <p:nvPr>
+            <p:ph type="title"/>
+          </p:nvPr>
+        </p:nvSpPr>
+        <p:spPr>
+          <a:xfrm>
+            <a:off x="838200" y="339367"/>
+            <a:ext cx="10515600" cy="678161"/>
+          </a:xfrm>
+        </p:spPr>
+        <p:txBody>
+          <a:bodyPr/>
+          <a:lstStyle/>
+          <a:p>
+            <a:r>
+              <a:rPr lang="en-US" dirty="0"/>
+              <a:t>Open Source Domain</a:t>
+            </a:r>
+          </a:p>
+        </p:txBody>
+      </p:sp>
+      <p:sp>
+        <p:nvSpPr>
+          <p:cNvPr id="3" name="Content Placeholder 2">
+            <a:extLst>
+              <a:ext uri="{FF2B5EF4-FFF2-40B4-BE49-F238E27FC236}">
+                <a16:creationId xmlns:a16="http://schemas.microsoft.com/office/drawing/2014/main" id="{C65F66DE-FE31-4539-83AE-36CA6E637596}"/>
+              </a:ext>
+            </a:extLst>
+          </p:cNvPr>
+          <p:cNvSpPr>
+            <a:spLocks noGrp="1"/>
+          </p:cNvSpPr>
+          <p:nvPr>
+            <p:ph idx="1"/>
+          </p:nvPr>
+        </p:nvSpPr>
+        <p:spPr>
+          <a:xfrm>
+            <a:off x="838200" y="1216909"/>
+            <a:ext cx="10515600" cy="5355770"/>
+          </a:xfrm>
+        </p:spPr>
+        <p:txBody>
+          <a:bodyPr>
+            <a:noAutofit/>
+          </a:bodyPr>
+          <a:lstStyle/>
+          <a:p>
+            <a:r>
+              <a:rPr lang="en-US" sz="2000" dirty="0"/>
+              <a:t>Open Source Development: 5 – 1000 active developers, many casual contributors</a:t>
+            </a:r>
+          </a:p>
+          <a:p>
+            <a:pPr lvl="1"/>
+            <a:r>
+              <a:rPr lang="en-US" sz="1800" dirty="0"/>
+              <a:t>Code life-time: 10 - 20 years</a:t>
+            </a:r>
+          </a:p>
+          <a:p>
+            <a:pPr lvl="1"/>
+            <a:r>
+              <a:rPr lang="en-US" sz="1800" dirty="0"/>
+              <a:t>Examples: Linux, Node.js, MongoDB</a:t>
+            </a:r>
+          </a:p>
+          <a:p>
+            <a:r>
+              <a:rPr lang="en-US" sz="2200" dirty="0"/>
+              <a:t>Following an initial period of development, a project often settles into a maintenance mode:</a:t>
+            </a:r>
+          </a:p>
+          <a:p>
+            <a:pPr lvl="1"/>
+            <a:r>
+              <a:rPr lang="en-US" sz="1800" dirty="0"/>
+              <a:t>Maintain the same mission and design.</a:t>
+            </a:r>
+          </a:p>
+          <a:p>
+            <a:pPr lvl="1"/>
+            <a:r>
+              <a:rPr lang="en-US" sz="1800" dirty="0"/>
+              <a:t>Add new features and port to new platforms.</a:t>
+            </a:r>
+          </a:p>
+          <a:p>
+            <a:r>
+              <a:rPr lang="en-US" sz="2200" dirty="0"/>
+              <a:t>Occasionally revise most of the code and support new missions.</a:t>
+            </a:r>
+          </a:p>
+          <a:p>
+            <a:r>
+              <a:rPr lang="en-US" sz="2200" dirty="0"/>
+              <a:t>Documentation varies from poor to outstanding.</a:t>
+            </a:r>
+          </a:p>
+          <a:p>
+            <a:pPr lvl="1"/>
+            <a:r>
+              <a:rPr lang="en-US" sz="1800" dirty="0"/>
+              <a:t>Some projects focus on </a:t>
+            </a:r>
+            <a:r>
+              <a:rPr lang="en-US" sz="1800" dirty="0" err="1"/>
+              <a:t>api</a:t>
+            </a:r>
+            <a:r>
+              <a:rPr lang="en-US" sz="1800" dirty="0"/>
+              <a:t> level documentation – how to use the code.</a:t>
+            </a:r>
+          </a:p>
+          <a:p>
+            <a:pPr lvl="1"/>
+            <a:r>
+              <a:rPr lang="en-US" sz="1800" dirty="0"/>
+              <a:t>Some focus on maintenance – what are the parts, how are they related, code standards, …</a:t>
+            </a:r>
+          </a:p>
+          <a:p>
+            <a:endParaRPr lang="en-US" sz="2200" dirty="0"/>
+          </a:p>
+        </p:txBody>
+      </p:sp>
+    </p:spTree>
+    <p:extLst>
+      <p:ext uri="{BB962C8B-B14F-4D97-AF65-F5344CB8AC3E}">
+        <p14:creationId xmlns:p14="http://schemas.microsoft.com/office/powerpoint/2010/main" val="891542893"/>
+      </p:ext>
+    </p:extLst>
+  </p:cSld>
+  <p:clrMapOvr>
+    <a:masterClrMapping/>
+  </p:clrMapOvr>
+</p:sld>
+</file>
+
+<file path=ppt/slides/slide7.xml><?xml version="1.0" encoding="utf-8"?>
+<p:sld xmlns:a="http://schemas.openxmlformats.org/drawingml/2006/main" xmlns:r="http://schemas.openxmlformats.org/officeDocument/2006/relationships" xmlns:p="http://schemas.openxmlformats.org/presentationml/2006/main" show="0">
+  <p:cSld>
+    <p:spTree>
+      <p:nvGrpSpPr>
+        <p:cNvPr id="1" name=""/>
+        <p:cNvGrpSpPr/>
+        <p:nvPr/>
+      </p:nvGrpSpPr>
+      <p:grpSpPr>
+        <a:xfrm>
+          <a:off x="0" y="0"/>
+          <a:ext cx="0" cy="0"/>
+          <a:chOff x="0" y="0"/>
+          <a:chExt cx="0" cy="0"/>
+        </a:xfrm>
+      </p:grpSpPr>
+      <p:sp>
+        <p:nvSpPr>
+          <p:cNvPr id="2" name="Title 1">
+            <a:extLst>
+              <a:ext uri="{FF2B5EF4-FFF2-40B4-BE49-F238E27FC236}">
+                <a16:creationId xmlns:a16="http://schemas.microsoft.com/office/drawing/2014/main" id="{C818CF9C-B350-4936-99E1-D89031958E0C}"/>
+              </a:ext>
+            </a:extLst>
+          </p:cNvPr>
+          <p:cNvSpPr>
+            <a:spLocks noGrp="1"/>
+          </p:cNvSpPr>
+          <p:nvPr>
+            <p:ph type="title"/>
+          </p:nvPr>
+        </p:nvSpPr>
+        <p:spPr>
+          <a:xfrm>
+            <a:off x="838200" y="339367"/>
+            <a:ext cx="10515600" cy="678161"/>
+          </a:xfrm>
+        </p:spPr>
+        <p:txBody>
+          <a:bodyPr/>
+          <a:lstStyle/>
+          <a:p>
+            <a:r>
+              <a:rPr lang="en-US" dirty="0"/>
+              <a:t>Domain</a:t>
+            </a:r>
+          </a:p>
+        </p:txBody>
+      </p:sp>
+      <p:sp>
+        <p:nvSpPr>
+          <p:cNvPr id="3" name="Content Placeholder 2">
+            <a:extLst>
+              <a:ext uri="{FF2B5EF4-FFF2-40B4-BE49-F238E27FC236}">
+                <a16:creationId xmlns:a16="http://schemas.microsoft.com/office/drawing/2014/main" id="{C65F66DE-FE31-4539-83AE-36CA6E637596}"/>
+              </a:ext>
+            </a:extLst>
+          </p:cNvPr>
+          <p:cNvSpPr>
+            <a:spLocks noGrp="1"/>
+          </p:cNvSpPr>
+          <p:nvPr>
+            <p:ph idx="1"/>
+          </p:nvPr>
+        </p:nvSpPr>
+        <p:spPr>
+          <a:xfrm>
+            <a:off x="838200" y="1017529"/>
+            <a:ext cx="10515600" cy="5355770"/>
+          </a:xfrm>
+        </p:spPr>
+        <p:txBody>
+          <a:bodyPr>
+            <a:noAutofit/>
+          </a:bodyPr>
+          <a:lstStyle/>
+          <a:p>
+            <a:r>
+              <a:rPr lang="en-US" sz="2000" dirty="0"/>
+              <a:t>Open Source Development: 5 – 10 active developers, many casual contributors</a:t>
+            </a:r>
+          </a:p>
+          <a:p>
+            <a:pPr lvl="1"/>
+            <a:r>
+              <a:rPr lang="en-US" sz="1800" dirty="0"/>
+              <a:t>Code life-time: 10 - 20 years</a:t>
+            </a:r>
+          </a:p>
+          <a:p>
+            <a:pPr lvl="1"/>
+            <a:r>
+              <a:rPr lang="en-US" sz="1800" dirty="0"/>
+              <a:t>Example: Linux</a:t>
+            </a:r>
+          </a:p>
+          <a:p>
+            <a:r>
+              <a:rPr lang="en-US" sz="2000" dirty="0"/>
+              <a:t>Industrial Development: 5 – 10 developers</a:t>
+            </a:r>
+          </a:p>
+          <a:p>
+            <a:pPr lvl="1"/>
+            <a:r>
+              <a:rPr lang="en-US" sz="1800" dirty="0"/>
+              <a:t>Code life-time: 5 – 20 years</a:t>
+            </a:r>
+          </a:p>
+          <a:p>
+            <a:pPr lvl="1"/>
+            <a:r>
+              <a:rPr lang="en-US" sz="1800" dirty="0"/>
+              <a:t>Example: Machine Tool Control</a:t>
+            </a:r>
+          </a:p>
+          <a:p>
+            <a:r>
+              <a:rPr lang="en-US" sz="2000" dirty="0"/>
+              <a:t>Commercial Products: </a:t>
+            </a:r>
+          </a:p>
+          <a:p>
+            <a:pPr lvl="1"/>
+            <a:r>
+              <a:rPr lang="en-US" sz="1800" dirty="0"/>
+              <a:t>Code life-time: 20 – 30 years</a:t>
+            </a:r>
+          </a:p>
+          <a:p>
+            <a:pPr lvl="1"/>
+            <a:r>
+              <a:rPr lang="en-US" sz="1800" dirty="0"/>
+              <a:t>Example: Microsoft Word</a:t>
+            </a:r>
+          </a:p>
+          <a:p>
+            <a:r>
+              <a:rPr lang="en-US" sz="2000" dirty="0"/>
+              <a:t>Aerospace Programs: 5 – 200 developers</a:t>
+            </a:r>
+          </a:p>
+          <a:p>
+            <a:pPr lvl="1"/>
+            <a:r>
+              <a:rPr lang="en-US" sz="1600" dirty="0"/>
+              <a:t>Code life-time: 20 – 30 years</a:t>
+            </a:r>
+          </a:p>
+          <a:p>
+            <a:pPr lvl="1"/>
+            <a:r>
+              <a:rPr lang="en-US" sz="1600" dirty="0"/>
+              <a:t>Example: Submarine control, Area surveillance, ..</a:t>
+            </a:r>
+          </a:p>
+        </p:txBody>
+      </p:sp>
+    </p:spTree>
+    <p:extLst>
+      <p:ext uri="{BB962C8B-B14F-4D97-AF65-F5344CB8AC3E}">
+        <p14:creationId xmlns:p14="http://schemas.microsoft.com/office/powerpoint/2010/main" val="1744719603"/>
+      </p:ext>
+    </p:extLst>
+  </p:cSld>
+  <p:clrMapOvr>
+    <a:masterClrMapping/>
+  </p:clrMapOvr>
+</p:sld>
+</file>
+
+<file path=ppt/slides/slide8.xml><?xml version="1.0" encoding="utf-8"?>
+<p:sld xmlns:a="http://schemas.openxmlformats.org/drawingml/2006/main" xmlns:r="http://schemas.openxmlformats.org/officeDocument/2006/relationships" xmlns:p="http://schemas.openxmlformats.org/presentationml/2006/main">
+  <p:cSld>
+    <p:spTree>
+      <p:nvGrpSpPr>
+        <p:cNvPr id="1" name=""/>
+        <p:cNvGrpSpPr/>
+        <p:nvPr/>
+      </p:nvGrpSpPr>
+      <p:grpSpPr>
+        <a:xfrm>
+          <a:off x="0" y="0"/>
+          <a:ext cx="0" cy="0"/>
+          <a:chOff x="0" y="0"/>
+          <a:chExt cx="0" cy="0"/>
+        </a:xfrm>
+      </p:grpSpPr>
+      <p:sp>
+        <p:nvSpPr>
+          <p:cNvPr id="2" name="Title 1">
+            <a:extLst>
+              <a:ext uri="{FF2B5EF4-FFF2-40B4-BE49-F238E27FC236}">
+                <a16:creationId xmlns:a16="http://schemas.microsoft.com/office/drawing/2014/main" id="{D5791037-F5B9-4520-96E0-22E8D64C46FF}"/>
+              </a:ext>
+            </a:extLst>
+          </p:cNvPr>
+          <p:cNvSpPr>
+            <a:spLocks noGrp="1"/>
+          </p:cNvSpPr>
+          <p:nvPr>
+            <p:ph type="title"/>
+          </p:nvPr>
+        </p:nvSpPr>
+        <p:spPr/>
+        <p:txBody>
+          <a:bodyPr/>
+          <a:lstStyle/>
+          <a:p>
+            <a:r>
+              <a:rPr lang="en-US" dirty="0"/>
+              <a:t>Goal – Support Salvage and Reuse</a:t>
+            </a:r>
+          </a:p>
+        </p:txBody>
+      </p:sp>
+      <p:sp>
+        <p:nvSpPr>
+          <p:cNvPr id="3" name="Content Placeholder 2">
+            <a:extLst>
+              <a:ext uri="{FF2B5EF4-FFF2-40B4-BE49-F238E27FC236}">
+                <a16:creationId xmlns:a16="http://schemas.microsoft.com/office/drawing/2014/main" id="{491474DF-CCCA-4B65-87ED-1CE7E2998525}"/>
+              </a:ext>
+            </a:extLst>
+          </p:cNvPr>
+          <p:cNvSpPr>
+            <a:spLocks noGrp="1"/>
+          </p:cNvSpPr>
+          <p:nvPr>
+            <p:ph idx="1"/>
+          </p:nvPr>
+        </p:nvSpPr>
+        <p:spPr/>
+        <p:txBody>
+          <a:bodyPr/>
+          <a:lstStyle/>
+          <a:p>
+            <a:r>
+              <a:rPr lang="en-US" dirty="0"/>
+              <a:t>Software Components</a:t>
+            </a:r>
+          </a:p>
+          <a:p>
+            <a:pPr lvl="1"/>
+            <a:r>
+              <a:rPr lang="en-US" dirty="0"/>
+              <a:t>Software package that has a single purpose, few dependencies, and is useful for building software systems</a:t>
+            </a:r>
+          </a:p>
+          <a:p>
+            <a:r>
+              <a:rPr lang="en-US" dirty="0"/>
+              <a:t>Salvage</a:t>
+            </a:r>
+          </a:p>
+          <a:p>
+            <a:pPr lvl="1"/>
+            <a:r>
+              <a:rPr lang="en-US" dirty="0"/>
+              <a:t>Using an existing component with minor modifications</a:t>
+            </a:r>
+          </a:p>
+          <a:p>
+            <a:pPr lvl="1"/>
+            <a:r>
+              <a:rPr lang="en-US" dirty="0"/>
+              <a:t>Adds another component that must be configured and managed</a:t>
+            </a:r>
+          </a:p>
+          <a:p>
+            <a:r>
+              <a:rPr lang="en-US" dirty="0"/>
+              <a:t>Reuse</a:t>
+            </a:r>
+          </a:p>
+          <a:p>
+            <a:pPr lvl="1"/>
+            <a:r>
+              <a:rPr lang="en-US" dirty="0"/>
+              <a:t>Reuse an existing component with </a:t>
+            </a:r>
+            <a:r>
+              <a:rPr lang="en-US" b="1" dirty="0"/>
+              <a:t>no modification</a:t>
+            </a:r>
+          </a:p>
+          <a:p>
+            <a:pPr lvl="1"/>
+            <a:r>
+              <a:rPr lang="en-US" dirty="0"/>
+              <a:t>Used by composing, using as template argument, or using as base for derived classes</a:t>
+            </a:r>
+          </a:p>
+        </p:txBody>
+      </p:sp>
+    </p:spTree>
+    <p:extLst>
+      <p:ext uri="{BB962C8B-B14F-4D97-AF65-F5344CB8AC3E}">
+        <p14:creationId xmlns:p14="http://schemas.microsoft.com/office/powerpoint/2010/main" val="1570206584"/>
+      </p:ext>
+    </p:extLst>
+  </p:cSld>
+  <p:clrMapOvr>
+    <a:masterClrMapping/>
+  </p:clrMapOvr>
+</p:sld>
+</file>
+
+<file path=ppt/slides/slide9.xml><?xml version="1.0" encoding="utf-8"?>
+<p:sld xmlns:a="http://schemas.openxmlformats.org/drawingml/2006/main" xmlns:r="http://schemas.openxmlformats.org/officeDocument/2006/relationships" xmlns:p="http://schemas.openxmlformats.org/presentationml/2006/main">
+  <p:cSld>
+    <p:spTree>
+      <p:nvGrpSpPr>
+        <p:cNvPr id="1" name=""/>
+        <p:cNvGrpSpPr/>
+        <p:nvPr/>
+      </p:nvGrpSpPr>
+      <p:grpSpPr>
+        <a:xfrm>
+          <a:off x="0" y="0"/>
+          <a:ext cx="0" cy="0"/>
+          <a:chOff x="0" y="0"/>
+          <a:chExt cx="0" cy="0"/>
+        </a:xfrm>
+      </p:grpSpPr>
+      <p:sp>
+        <p:nvSpPr>
+          <p:cNvPr id="2" name="Title 1">
+            <a:extLst>
+              <a:ext uri="{FF2B5EF4-FFF2-40B4-BE49-F238E27FC236}">
+                <a16:creationId xmlns:a16="http://schemas.microsoft.com/office/drawing/2014/main" id="{7B9AA4E2-8439-499E-8E09-B7B92D39946D}"/>
+              </a:ext>
+            </a:extLst>
+          </p:cNvPr>
+          <p:cNvSpPr>
+            <a:spLocks noGrp="1"/>
+          </p:cNvSpPr>
+          <p:nvPr>
+            <p:ph type="title"/>
+          </p:nvPr>
+        </p:nvSpPr>
+        <p:spPr/>
+        <p:txBody>
+          <a:bodyPr/>
+          <a:lstStyle/>
+          <a:p>
+            <a:r>
+              <a:rPr lang="en-US" dirty="0"/>
+              <a:t>Publishing Code for (Re)use</a:t>
+            </a:r>
+          </a:p>
+        </p:txBody>
+      </p:sp>
+      <p:sp>
+        <p:nvSpPr>
+          <p:cNvPr id="3" name="Content Placeholder 2">
+            <a:extLst>
+              <a:ext uri="{FF2B5EF4-FFF2-40B4-BE49-F238E27FC236}">
+                <a16:creationId xmlns:a16="http://schemas.microsoft.com/office/drawing/2014/main" id="{52CCEAD5-80CD-43AC-9D2F-18A29BD5B9E1}"/>
+              </a:ext>
+            </a:extLst>
+          </p:cNvPr>
+          <p:cNvSpPr>
+            <a:spLocks noGrp="1"/>
+          </p:cNvSpPr>
+          <p:nvPr>
+            <p:ph idx="1"/>
+          </p:nvPr>
+        </p:nvSpPr>
+        <p:spPr/>
+        <p:txBody>
+          <a:bodyPr/>
+          <a:lstStyle/>
+          <a:p>
+            <a:pPr>
+              <a:lnSpc>
+                <a:spcPct val="100000"/>
+              </a:lnSpc>
+            </a:pPr>
+            <a:r>
+              <a:rPr lang="en-US" dirty="0"/>
+              <a:t>Publishing some code artifact is the act of making it available, in useable form.</a:t>
+            </a:r>
+          </a:p>
           <a:p>
             <a:pPr>
               <a:lnSpc>
@@ -4078,7 +5448,7 @@
             </a:pPr>
             <a:r>
               <a:rPr lang="en-US" dirty="0"/>
-              <a:t>Source code containment and delivery are solved problems</a:t>
+              <a:t>Five main facets:</a:t>
             </a:r>
           </a:p>
           <a:p>
@@ -4089,26 +5459,7 @@
             </a:pPr>
             <a:r>
               <a:rPr lang="en-US" dirty="0"/>
-              <a:t>Cloud-based facilities like </a:t>
-            </a:r>
-            <a:r>
-              <a:rPr lang="en-US" dirty="0" err="1"/>
-              <a:t>github</a:t>
-            </a:r>
-            <a:r>
-              <a:rPr lang="en-US" dirty="0"/>
-              <a:t> do that very well</a:t>
-            </a:r>
-          </a:p>
-          <a:p>
-            <a:pPr>
-              <a:lnSpc>
-                <a:spcPct val="150000"/>
-              </a:lnSpc>
-            </a:pPr>
-            <a:r>
-              <a:rPr lang="en-US" dirty="0"/>
-              <a:t>The issues are finding and understanding code relevant to a need</a:t>
+              <a:t>Containment</a:t>
             </a:r>
           </a:p>
           <a:p>
@@ -4119,7 +5470,7 @@
             </a:pPr>
             <a:r>
               <a:rPr lang="en-US" dirty="0"/>
-              <a:t>We want most code repositories to be large – to support reuse</a:t>
+              <a:t>Delivery</a:t>
             </a:r>
           </a:p>
           <a:p>
@@ -4130,7 +5481,29 @@
             </a:pPr>
             <a:r>
               <a:rPr lang="en-US" dirty="0"/>
-              <a:t>How do we find, in a large repository, code that fills some need?</a:t>
+              <a:t>Location</a:t>
+            </a:r>
+          </a:p>
+          <a:p>
+            <a:pPr lvl="1">
+              <a:lnSpc>
+                <a:spcPct val="100000"/>
+              </a:lnSpc>
+            </a:pPr>
+            <a:r>
+              <a:rPr lang="en-US" dirty="0"/>
+              <a:t>Interpretation</a:t>
+            </a:r>
+          </a:p>
+          <a:p>
+            <a:pPr lvl="1">
+              <a:lnSpc>
+                <a:spcPct val="100000"/>
+              </a:lnSpc>
+            </a:pPr>
+            <a:r>
+              <a:rPr lang="en-US" dirty="0"/>
+              <a:t>Quality Control</a:t>
             </a:r>
           </a:p>
         </p:txBody>
@@ -4138,7 +5511,7 @@
     </p:spTree>
     <p:extLst>
       <p:ext uri="{BB962C8B-B14F-4D97-AF65-F5344CB8AC3E}">
-        <p14:creationId xmlns:p14="http://schemas.microsoft.com/office/powerpoint/2010/main" val="1974146755"/>
+        <p14:creationId xmlns:p14="http://schemas.microsoft.com/office/powerpoint/2010/main" val="4268696743"/>
       </p:ext>
     </p:extLst>
   </p:cSld>

</xml_diff>

<commit_message>
fixed text error in ClassRelationships
</commit_message>
<xml_diff>
--- a/Resources/PublishingSourceCode.pptx
+++ b/Resources/PublishingSourceCode.pptx
@@ -1,6 +1,6 @@
 
 <file path=ppt/presentation.xml><?xml version="1.0" encoding="utf-8"?>
-<p:presentation xmlns:a="http://schemas.openxmlformats.org/drawingml/2006/main" xmlns:r="http://schemas.openxmlformats.org/officeDocument/2006/relationships" xmlns:p="http://schemas.openxmlformats.org/presentationml/2006/main" saveSubsetFonts="1">
+<p:presentation xmlns:a="http://schemas.openxmlformats.org/drawingml/2006/main" xmlns:r="http://schemas.openxmlformats.org/officeDocument/2006/relationships" xmlns:p="http://schemas.openxmlformats.org/presentationml/2006/main" showSpecialPlsOnTitleSld="0" saveSubsetFonts="1">
   <p:sldMasterIdLst>
     <p:sldMasterId id="2147483648" r:id="rId1"/>
   </p:sldMasterIdLst>
@@ -12,16 +12,16 @@
     <p:sldId id="260" r:id="rId3"/>
     <p:sldId id="265" r:id="rId4"/>
     <p:sldId id="266" r:id="rId5"/>
-    <p:sldId id="261" r:id="rId6"/>
-    <p:sldId id="262" r:id="rId7"/>
-    <p:sldId id="263" r:id="rId8"/>
-    <p:sldId id="264" r:id="rId9"/>
-    <p:sldId id="258" r:id="rId10"/>
-    <p:sldId id="257" r:id="rId11"/>
-    <p:sldId id="259" r:id="rId12"/>
+    <p:sldId id="264" r:id="rId6"/>
+    <p:sldId id="258" r:id="rId7"/>
+    <p:sldId id="257" r:id="rId8"/>
+    <p:sldId id="259" r:id="rId9"/>
+    <p:sldId id="261" r:id="rId10"/>
+    <p:sldId id="262" r:id="rId11"/>
+    <p:sldId id="263" r:id="rId12"/>
   </p:sldIdLst>
   <p:sldSz cx="12192000" cy="6858000"/>
-  <p:notesSz cx="6858000" cy="9144000"/>
+  <p:notesSz cx="7010400" cy="9296400"/>
   <p:defaultTextStyle>
     <a:defPPr>
       <a:defRPr lang="en-US"/>
@@ -160,14 +160,14 @@
         <p:spPr>
           <a:xfrm>
             <a:off x="0" y="0"/>
-            <a:ext cx="2971800" cy="458788"/>
+            <a:ext cx="3037840" cy="466434"/>
           </a:xfrm>
           <a:prstGeom prst="rect">
             <a:avLst/>
           </a:prstGeom>
         </p:spPr>
         <p:txBody>
-          <a:bodyPr vert="horz" lIns="91440" tIns="45720" rIns="91440" bIns="45720" rtlCol="0"/>
+          <a:bodyPr vert="horz" lIns="93177" tIns="46589" rIns="93177" bIns="46589" rtlCol="0"/>
           <a:lstStyle>
             <a:lvl1pPr algn="l">
               <a:defRPr sz="1200"/>
@@ -190,15 +190,15 @@
         </p:nvSpPr>
         <p:spPr>
           <a:xfrm>
-            <a:off x="3884613" y="0"/>
-            <a:ext cx="2971800" cy="458788"/>
+            <a:off x="3970938" y="0"/>
+            <a:ext cx="3037840" cy="466434"/>
           </a:xfrm>
           <a:prstGeom prst="rect">
             <a:avLst/>
           </a:prstGeom>
         </p:spPr>
         <p:txBody>
-          <a:bodyPr vert="horz" lIns="91440" tIns="45720" rIns="91440" bIns="45720" rtlCol="0"/>
+          <a:bodyPr vert="horz" lIns="93177" tIns="46589" rIns="93177" bIns="46589" rtlCol="0"/>
           <a:lstStyle>
             <a:lvl1pPr algn="r">
               <a:defRPr sz="1200"/>
@@ -207,7 +207,7 @@
           <a:p>
             <a:fld id="{707A244B-480E-4DF8-B8AD-6F4623E3B964}" type="datetimeFigureOut">
               <a:rPr lang="en-US" smtClean="0"/>
-              <a:t>10/12/2019</a:t>
+              <a:t>10/13/2019</a:t>
             </a:fld>
             <a:endParaRPr lang="en-US"/>
           </a:p>
@@ -225,8 +225,8 @@
         </p:nvSpPr>
         <p:spPr>
           <a:xfrm>
-            <a:off x="685800" y="1143000"/>
-            <a:ext cx="5486400" cy="3086100"/>
+            <a:off x="717550" y="1162050"/>
+            <a:ext cx="5575300" cy="3136900"/>
           </a:xfrm>
           <a:prstGeom prst="rect">
             <a:avLst/>
@@ -239,7 +239,7 @@
           </a:ln>
         </p:spPr>
         <p:txBody>
-          <a:bodyPr vert="horz" lIns="91440" tIns="45720" rIns="91440" bIns="45720" rtlCol="0" anchor="ctr"/>
+          <a:bodyPr vert="horz" lIns="93177" tIns="46589" rIns="93177" bIns="46589" rtlCol="0" anchor="ctr"/>
           <a:lstStyle/>
           <a:p>
             <a:endParaRPr lang="en-US"/>
@@ -258,15 +258,15 @@
         </p:nvSpPr>
         <p:spPr>
           <a:xfrm>
-            <a:off x="685800" y="4400550"/>
-            <a:ext cx="5486400" cy="3600450"/>
+            <a:off x="701040" y="4473892"/>
+            <a:ext cx="5608320" cy="3660458"/>
           </a:xfrm>
           <a:prstGeom prst="rect">
             <a:avLst/>
           </a:prstGeom>
         </p:spPr>
         <p:txBody>
-          <a:bodyPr vert="horz" lIns="91440" tIns="45720" rIns="91440" bIns="45720" rtlCol="0"/>
+          <a:bodyPr vert="horz" lIns="93177" tIns="46589" rIns="93177" bIns="46589" rtlCol="0"/>
           <a:lstStyle/>
           <a:p>
             <a:pPr lvl="0"/>
@@ -317,15 +317,15 @@
         </p:nvSpPr>
         <p:spPr>
           <a:xfrm>
-            <a:off x="0" y="8685213"/>
-            <a:ext cx="2971800" cy="458787"/>
+            <a:off x="0" y="8829967"/>
+            <a:ext cx="3037840" cy="466433"/>
           </a:xfrm>
           <a:prstGeom prst="rect">
             <a:avLst/>
           </a:prstGeom>
         </p:spPr>
         <p:txBody>
-          <a:bodyPr vert="horz" lIns="91440" tIns="45720" rIns="91440" bIns="45720" rtlCol="0" anchor="b"/>
+          <a:bodyPr vert="horz" lIns="93177" tIns="46589" rIns="93177" bIns="46589" rtlCol="0" anchor="b"/>
           <a:lstStyle>
             <a:lvl1pPr algn="l">
               <a:defRPr sz="1200"/>
@@ -348,15 +348,15 @@
         </p:nvSpPr>
         <p:spPr>
           <a:xfrm>
-            <a:off x="3884613" y="8685213"/>
-            <a:ext cx="2971800" cy="458787"/>
+            <a:off x="3970938" y="8829967"/>
+            <a:ext cx="3037840" cy="466433"/>
           </a:xfrm>
           <a:prstGeom prst="rect">
             <a:avLst/>
           </a:prstGeom>
         </p:spPr>
         <p:txBody>
-          <a:bodyPr vert="horz" lIns="91440" tIns="45720" rIns="91440" bIns="45720" rtlCol="0" anchor="b"/>
+          <a:bodyPr vert="horz" lIns="93177" tIns="46589" rIns="93177" bIns="46589" rtlCol="0" anchor="b"/>
           <a:lstStyle>
             <a:lvl1pPr algn="r">
               <a:defRPr sz="1200"/>
@@ -518,7 +518,7 @@
           <a:bodyPr/>
           <a:lstStyle/>
           <a:p>
-            <a:pPr marL="171450" indent="-171450">
+            <a:pPr marL="174708" indent="-174708">
               <a:buFont typeface="Arial" panose="020B0604020202020204" pitchFamily="34" charset="0"/>
               <a:buChar char="•"/>
             </a:pPr>
@@ -528,7 +528,7 @@
             </a:r>
           </a:p>
           <a:p>
-            <a:pPr marL="171450" indent="-171450">
+            <a:pPr marL="174708" indent="-174708">
               <a:buFont typeface="Arial" panose="020B0604020202020204" pitchFamily="34" charset="0"/>
               <a:buChar char="•"/>
             </a:pPr>
@@ -538,7 +538,7 @@
             </a:r>
           </a:p>
           <a:p>
-            <a:pPr marL="171450" indent="-171450">
+            <a:pPr marL="174708" indent="-174708">
               <a:buFont typeface="Arial" panose="020B0604020202020204" pitchFamily="34" charset="0"/>
               <a:buChar char="•"/>
             </a:pPr>
@@ -548,7 +548,7 @@
             </a:r>
           </a:p>
           <a:p>
-            <a:pPr marL="171450" indent="-171450">
+            <a:pPr marL="174708" indent="-174708">
               <a:buFont typeface="Arial" panose="020B0604020202020204" pitchFamily="34" charset="0"/>
               <a:buChar char="•"/>
             </a:pPr>
@@ -576,7 +576,7 @@
           <a:p>
             <a:fld id="{4F090570-C106-4FBC-AEF5-5C270F494E9C}" type="slidenum">
               <a:rPr lang="en-US" smtClean="0"/>
-              <a:t>10</a:t>
+              <a:t>7</a:t>
             </a:fld>
             <a:endParaRPr lang="en-US"/>
           </a:p>
@@ -740,9 +740,9 @@
           <a:bodyPr/>
           <a:lstStyle/>
           <a:p>
-            <a:fld id="{8B5166B1-0C91-48F6-B3DB-B6E43F9BD2AB}" type="datetimeFigureOut">
+            <a:fld id="{7E5A6A94-3764-4657-B78A-EA3F42F28C9C}" type="datetime1">
               <a:rPr lang="en-US" smtClean="0"/>
-              <a:t>10/12/2019</a:t>
+              <a:t>10/13/2019</a:t>
             </a:fld>
             <a:endParaRPr lang="en-US"/>
           </a:p>
@@ -938,9 +938,9 @@
           <a:bodyPr/>
           <a:lstStyle/>
           <a:p>
-            <a:fld id="{8B5166B1-0C91-48F6-B3DB-B6E43F9BD2AB}" type="datetimeFigureOut">
+            <a:fld id="{93B9EABD-462C-4F85-9539-646406A6B6CC}" type="datetime1">
               <a:rPr lang="en-US" smtClean="0"/>
-              <a:t>10/12/2019</a:t>
+              <a:t>10/13/2019</a:t>
             </a:fld>
             <a:endParaRPr lang="en-US"/>
           </a:p>
@@ -1146,9 +1146,9 @@
           <a:bodyPr/>
           <a:lstStyle/>
           <a:p>
-            <a:fld id="{8B5166B1-0C91-48F6-B3DB-B6E43F9BD2AB}" type="datetimeFigureOut">
+            <a:fld id="{E179B0F1-CFD2-466E-85DC-3349E60E54D2}" type="datetime1">
               <a:rPr lang="en-US" smtClean="0"/>
-              <a:t>10/12/2019</a:t>
+              <a:t>10/13/2019</a:t>
             </a:fld>
             <a:endParaRPr lang="en-US"/>
           </a:p>
@@ -1354,9 +1354,9 @@
           <a:bodyPr/>
           <a:lstStyle/>
           <a:p>
-            <a:fld id="{8B5166B1-0C91-48F6-B3DB-B6E43F9BD2AB}" type="datetimeFigureOut">
+            <a:fld id="{6DC36762-1270-475E-8EE1-6BB0D9927869}" type="datetime1">
               <a:rPr lang="en-US" smtClean="0"/>
-              <a:t>10/12/2019</a:t>
+              <a:t>10/13/2019</a:t>
             </a:fld>
             <a:endParaRPr lang="en-US"/>
           </a:p>
@@ -1629,9 +1629,9 @@
           <a:bodyPr/>
           <a:lstStyle/>
           <a:p>
-            <a:fld id="{8B5166B1-0C91-48F6-B3DB-B6E43F9BD2AB}" type="datetimeFigureOut">
+            <a:fld id="{E28B701A-BF74-4B76-B760-E2C6561B48E0}" type="datetime1">
               <a:rPr lang="en-US" smtClean="0"/>
-              <a:t>10/12/2019</a:t>
+              <a:t>10/13/2019</a:t>
             </a:fld>
             <a:endParaRPr lang="en-US"/>
           </a:p>
@@ -1894,9 +1894,9 @@
           <a:bodyPr/>
           <a:lstStyle/>
           <a:p>
-            <a:fld id="{8B5166B1-0C91-48F6-B3DB-B6E43F9BD2AB}" type="datetimeFigureOut">
+            <a:fld id="{848E7606-0344-46F9-B489-348F205DDD81}" type="datetime1">
               <a:rPr lang="en-US" smtClean="0"/>
-              <a:t>10/12/2019</a:t>
+              <a:t>10/13/2019</a:t>
             </a:fld>
             <a:endParaRPr lang="en-US"/>
           </a:p>
@@ -2306,9 +2306,9 @@
           <a:bodyPr/>
           <a:lstStyle/>
           <a:p>
-            <a:fld id="{8B5166B1-0C91-48F6-B3DB-B6E43F9BD2AB}" type="datetimeFigureOut">
+            <a:fld id="{12562A6D-B456-4A3E-ABF9-DB3F97FE8526}" type="datetime1">
               <a:rPr lang="en-US" smtClean="0"/>
-              <a:t>10/12/2019</a:t>
+              <a:t>10/13/2019</a:t>
             </a:fld>
             <a:endParaRPr lang="en-US"/>
           </a:p>
@@ -2447,9 +2447,9 @@
           <a:bodyPr/>
           <a:lstStyle/>
           <a:p>
-            <a:fld id="{8B5166B1-0C91-48F6-B3DB-B6E43F9BD2AB}" type="datetimeFigureOut">
+            <a:fld id="{14644366-7E7B-43AD-8FBC-DB94443C6600}" type="datetime1">
               <a:rPr lang="en-US" smtClean="0"/>
-              <a:t>10/12/2019</a:t>
+              <a:t>10/13/2019</a:t>
             </a:fld>
             <a:endParaRPr lang="en-US"/>
           </a:p>
@@ -2560,9 +2560,9 @@
           <a:bodyPr/>
           <a:lstStyle/>
           <a:p>
-            <a:fld id="{8B5166B1-0C91-48F6-B3DB-B6E43F9BD2AB}" type="datetimeFigureOut">
+            <a:fld id="{8ABD86A2-66D8-40CD-9756-5715ECB136F6}" type="datetime1">
               <a:rPr lang="en-US" smtClean="0"/>
-              <a:t>10/12/2019</a:t>
+              <a:t>10/13/2019</a:t>
             </a:fld>
             <a:endParaRPr lang="en-US"/>
           </a:p>
@@ -2871,9 +2871,9 @@
           <a:bodyPr/>
           <a:lstStyle/>
           <a:p>
-            <a:fld id="{8B5166B1-0C91-48F6-B3DB-B6E43F9BD2AB}" type="datetimeFigureOut">
+            <a:fld id="{84947D4A-30B2-48C8-A960-21FC1AE3E1D6}" type="datetime1">
               <a:rPr lang="en-US" smtClean="0"/>
-              <a:t>10/12/2019</a:t>
+              <a:t>10/13/2019</a:t>
             </a:fld>
             <a:endParaRPr lang="en-US"/>
           </a:p>
@@ -3159,9 +3159,9 @@
           <a:bodyPr/>
           <a:lstStyle/>
           <a:p>
-            <a:fld id="{8B5166B1-0C91-48F6-B3DB-B6E43F9BD2AB}" type="datetimeFigureOut">
+            <a:fld id="{1A4A88B8-2510-4B6F-8DFE-EE55B4B2CE7F}" type="datetime1">
               <a:rPr lang="en-US" smtClean="0"/>
-              <a:t>10/12/2019</a:t>
+              <a:t>10/13/2019</a:t>
             </a:fld>
             <a:endParaRPr lang="en-US"/>
           </a:p>
@@ -3400,9 +3400,9 @@
             </a:lvl1pPr>
           </a:lstStyle>
           <a:p>
-            <a:fld id="{8B5166B1-0C91-48F6-B3DB-B6E43F9BD2AB}" type="datetimeFigureOut">
+            <a:fld id="{17ED4B07-0083-46EC-AB42-36920CDC7586}" type="datetime1">
               <a:rPr lang="en-US" smtClean="0"/>
-              <a:t>10/12/2019</a:t>
+              <a:t>10/13/2019</a:t>
             </a:fld>
             <a:endParaRPr lang="en-US"/>
           </a:p>
@@ -3519,6 +3519,7 @@
     <p:sldLayoutId id="2147483658" r:id="rId10"/>
     <p:sldLayoutId id="2147483659" r:id="rId11"/>
   </p:sldLayoutIdLst>
+  <p:hf hdr="0" ftr="0" dt="0"/>
   <p:txStyles>
     <p:titleStyle>
       <a:lvl1pPr algn="l" defTabSz="914400" rtl="0" eaLnBrk="1" latinLnBrk="0" hangingPunct="1">
@@ -3915,7 +3916,7 @@
 </file>
 
 <file path=ppt/slides/slide10.xml><?xml version="1.0" encoding="utf-8"?>
-<p:sld xmlns:a="http://schemas.openxmlformats.org/drawingml/2006/main" xmlns:r="http://schemas.openxmlformats.org/officeDocument/2006/relationships" xmlns:p="http://schemas.openxmlformats.org/presentationml/2006/main">
+<p:sld xmlns:a="http://schemas.openxmlformats.org/drawingml/2006/main" xmlns:r="http://schemas.openxmlformats.org/officeDocument/2006/relationships" xmlns:p="http://schemas.openxmlformats.org/presentationml/2006/main" show="0">
   <p:cSld>
     <p:spTree>
       <p:nvGrpSpPr>
@@ -3936,7 +3937,7 @@
           <p:cNvPr id="2" name="Title 1">
             <a:extLst>
               <a:ext uri="{FF2B5EF4-FFF2-40B4-BE49-F238E27FC236}">
-                <a16:creationId xmlns:a16="http://schemas.microsoft.com/office/drawing/2014/main" id="{B4725340-475B-4911-AC68-3E9A7FF99896}"/>
+                <a16:creationId xmlns:a16="http://schemas.microsoft.com/office/drawing/2014/main" id="{C818CF9C-B350-4936-99E1-D89031958E0C}"/>
               </a:ext>
             </a:extLst>
           </p:cNvPr>
@@ -3945,136 +3946,164 @@
           </p:cNvSpPr>
           <p:nvPr>
             <p:ph type="title"/>
-          </p:nvPr>
-        </p:nvSpPr>
-        <p:spPr/>
-        <p:txBody>
-          <a:bodyPr/>
-          <a:lstStyle/>
-          <a:p>
-            <a:r>
-              <a:rPr lang="en-US" dirty="0"/>
-              <a:t>The Issues</a:t>
-            </a:r>
-          </a:p>
-        </p:txBody>
-      </p:sp>
-      <p:sp>
-        <p:nvSpPr>
-          <p:cNvPr id="3" name="Content Placeholder 2">
-            <a:extLst>
-              <a:ext uri="{FF2B5EF4-FFF2-40B4-BE49-F238E27FC236}">
-                <a16:creationId xmlns:a16="http://schemas.microsoft.com/office/drawing/2014/main" id="{D28EEC85-0147-4609-8EA7-C7AE355F5329}"/>
-              </a:ext>
-            </a:extLst>
-          </p:cNvPr>
-          <p:cNvSpPr>
-            <a:spLocks noGrp="1"/>
-          </p:cNvSpPr>
-          <p:nvPr>
-            <p:ph idx="1"/>
           </p:nvPr>
         </p:nvSpPr>
         <p:spPr>
           <a:xfrm>
-            <a:off x="838200" y="1390918"/>
-            <a:ext cx="10515600" cy="4786045"/>
+            <a:off x="838200" y="339367"/>
+            <a:ext cx="10515600" cy="678161"/>
           </a:xfrm>
         </p:spPr>
         <p:txBody>
           <a:bodyPr/>
           <a:lstStyle/>
           <a:p>
-            <a:pPr>
-              <a:lnSpc>
-                <a:spcPct val="150000"/>
-              </a:lnSpc>
-            </a:pPr>
             <a:r>
               <a:rPr lang="en-US" dirty="0"/>
-              <a:t>Source code containment and delivery are solved problems</a:t>
-            </a:r>
-          </a:p>
-          <a:p>
-            <a:pPr lvl="1">
-              <a:lnSpc>
-                <a:spcPct val="100000"/>
-              </a:lnSpc>
-            </a:pPr>
-            <a:r>
-              <a:rPr lang="en-US" dirty="0"/>
-              <a:t>Cloud-based facilities like </a:t>
-            </a:r>
-            <a:r>
-              <a:rPr lang="en-US" dirty="0" err="1"/>
-              <a:t>github</a:t>
-            </a:r>
-            <a:r>
-              <a:rPr lang="en-US" dirty="0"/>
-              <a:t> do that very well</a:t>
-            </a:r>
-          </a:p>
-          <a:p>
-            <a:pPr>
-              <a:lnSpc>
-                <a:spcPct val="150000"/>
-              </a:lnSpc>
-            </a:pPr>
-            <a:r>
-              <a:rPr lang="en-US" dirty="0"/>
-              <a:t>The issues are finding and understanding code relevant to a need</a:t>
-            </a:r>
-          </a:p>
-          <a:p>
-            <a:pPr lvl="1">
-              <a:lnSpc>
-                <a:spcPct val="100000"/>
-              </a:lnSpc>
-            </a:pPr>
-            <a:r>
-              <a:rPr lang="en-US" dirty="0"/>
-              <a:t>We want most code repositories to be large – to support broad reuse</a:t>
-            </a:r>
-          </a:p>
-          <a:p>
-            <a:pPr lvl="1">
-              <a:lnSpc>
-                <a:spcPct val="100000"/>
-              </a:lnSpc>
-            </a:pPr>
-            <a:r>
-              <a:rPr lang="en-US" dirty="0"/>
-              <a:t>How do we find, in a large repository, code that fills some need?</a:t>
-            </a:r>
-          </a:p>
-          <a:p>
-            <a:pPr>
-              <a:lnSpc>
-                <a:spcPct val="100000"/>
-              </a:lnSpc>
-            </a:pPr>
-            <a:r>
-              <a:rPr lang="en-US" dirty="0"/>
-              <a:t>Website documentation, collocated with source code, is a good option</a:t>
-            </a:r>
-          </a:p>
-          <a:p>
-            <a:pPr lvl="1">
-              <a:lnSpc>
-                <a:spcPct val="100000"/>
-              </a:lnSpc>
-            </a:pPr>
-            <a:r>
-              <a:rPr lang="en-US" dirty="0"/>
-              <a:t>To support both salvage and reuse documentation needs to provide information about the component’s concept, design, and typical use</a:t>
-            </a:r>
+              <a:t>Open Source Domain</a:t>
+            </a:r>
+          </a:p>
+        </p:txBody>
+      </p:sp>
+      <p:sp>
+        <p:nvSpPr>
+          <p:cNvPr id="3" name="Content Placeholder 2">
+            <a:extLst>
+              <a:ext uri="{FF2B5EF4-FFF2-40B4-BE49-F238E27FC236}">
+                <a16:creationId xmlns:a16="http://schemas.microsoft.com/office/drawing/2014/main" id="{C65F66DE-FE31-4539-83AE-36CA6E637596}"/>
+              </a:ext>
+            </a:extLst>
+          </p:cNvPr>
+          <p:cNvSpPr>
+            <a:spLocks noGrp="1"/>
+          </p:cNvSpPr>
+          <p:nvPr>
+            <p:ph idx="1"/>
+          </p:nvPr>
+        </p:nvSpPr>
+        <p:spPr>
+          <a:xfrm>
+            <a:off x="838200" y="1216909"/>
+            <a:ext cx="10515600" cy="5355770"/>
+          </a:xfrm>
+        </p:spPr>
+        <p:txBody>
+          <a:bodyPr>
+            <a:noAutofit/>
+          </a:bodyPr>
+          <a:lstStyle/>
+          <a:p>
+            <a:r>
+              <a:rPr lang="en-US" sz="2000" dirty="0"/>
+              <a:t>Open Source Development: 5 – 1000 active developers, many casual contributors</a:t>
+            </a:r>
+          </a:p>
+          <a:p>
+            <a:pPr lvl="1"/>
+            <a:r>
+              <a:rPr lang="en-US" sz="1800" dirty="0"/>
+              <a:t>Code life-time: 10 - 20 years</a:t>
+            </a:r>
+          </a:p>
+          <a:p>
+            <a:pPr lvl="1"/>
+            <a:r>
+              <a:rPr lang="en-US" sz="1800" dirty="0"/>
+              <a:t>Examples: Linux, Node.js, MongoDB</a:t>
+            </a:r>
+          </a:p>
+          <a:p>
+            <a:r>
+              <a:rPr lang="en-US" sz="2200" dirty="0"/>
+              <a:t>Following an initial period of development, a project often settles into a maintenance mode:</a:t>
+            </a:r>
+          </a:p>
+          <a:p>
+            <a:pPr lvl="1"/>
+            <a:r>
+              <a:rPr lang="en-US" sz="1800" dirty="0"/>
+              <a:t>Maintain the same mission and design.</a:t>
+            </a:r>
+          </a:p>
+          <a:p>
+            <a:pPr lvl="1"/>
+            <a:r>
+              <a:rPr lang="en-US" sz="1800" dirty="0"/>
+              <a:t>Add new features and port to new platforms.</a:t>
+            </a:r>
+          </a:p>
+          <a:p>
+            <a:r>
+              <a:rPr lang="en-US" sz="2200" dirty="0"/>
+              <a:t>Occasionally revise most of the code and support new missions.</a:t>
+            </a:r>
+          </a:p>
+          <a:p>
+            <a:r>
+              <a:rPr lang="en-US" sz="2200" dirty="0"/>
+              <a:t>Documentation varies from poor to outstanding.</a:t>
+            </a:r>
+          </a:p>
+          <a:p>
+            <a:pPr lvl="1"/>
+            <a:r>
+              <a:rPr lang="en-US" sz="1800" dirty="0"/>
+              <a:t>Some projects focus on </a:t>
+            </a:r>
+            <a:r>
+              <a:rPr lang="en-US" sz="1800" dirty="0" err="1"/>
+              <a:t>api</a:t>
+            </a:r>
+            <a:r>
+              <a:rPr lang="en-US" sz="1800" dirty="0"/>
+              <a:t> level documentation – how to use the code.</a:t>
+            </a:r>
+          </a:p>
+          <a:p>
+            <a:pPr lvl="1"/>
+            <a:r>
+              <a:rPr lang="en-US" sz="1800" dirty="0"/>
+              <a:t>Some focus on maintenance – what are the parts, how are they related, code standards, …</a:t>
+            </a:r>
+          </a:p>
+          <a:p>
+            <a:endParaRPr lang="en-US" sz="2200" dirty="0"/>
+          </a:p>
+        </p:txBody>
+      </p:sp>
+      <p:sp>
+        <p:nvSpPr>
+          <p:cNvPr id="4" name="Slide Number Placeholder 3">
+            <a:extLst>
+              <a:ext uri="{FF2B5EF4-FFF2-40B4-BE49-F238E27FC236}">
+                <a16:creationId xmlns:a16="http://schemas.microsoft.com/office/drawing/2014/main" id="{322EE9A1-C48D-4BEF-9075-0B0169EC94DF}"/>
+              </a:ext>
+            </a:extLst>
+          </p:cNvPr>
+          <p:cNvSpPr>
+            <a:spLocks noGrp="1"/>
+          </p:cNvSpPr>
+          <p:nvPr>
+            <p:ph type="sldNum" sz="quarter" idx="12"/>
+          </p:nvPr>
+        </p:nvSpPr>
+        <p:spPr/>
+        <p:txBody>
+          <a:bodyPr/>
+          <a:lstStyle/>
+          <a:p>
+            <a:fld id="{EDEBF0BA-A897-4C1E-AB3C-F330808C0E1D}" type="slidenum">
+              <a:rPr lang="en-US" smtClean="0"/>
+              <a:t>10</a:t>
+            </a:fld>
+            <a:endParaRPr lang="en-US"/>
           </a:p>
         </p:txBody>
       </p:sp>
     </p:spTree>
     <p:extLst>
       <p:ext uri="{BB962C8B-B14F-4D97-AF65-F5344CB8AC3E}">
-        <p14:creationId xmlns:p14="http://schemas.microsoft.com/office/powerpoint/2010/main" val="1974146755"/>
+        <p14:creationId xmlns:p14="http://schemas.microsoft.com/office/powerpoint/2010/main" val="891542893"/>
       </p:ext>
     </p:extLst>
   </p:cSld>
@@ -4085,7 +4114,7 @@
 </file>
 
 <file path=ppt/slides/slide11.xml><?xml version="1.0" encoding="utf-8"?>
-<p:sld xmlns:a="http://schemas.openxmlformats.org/drawingml/2006/main" xmlns:r="http://schemas.openxmlformats.org/officeDocument/2006/relationships" xmlns:p="http://schemas.openxmlformats.org/presentationml/2006/main">
+<p:sld xmlns:a="http://schemas.openxmlformats.org/drawingml/2006/main" xmlns:r="http://schemas.openxmlformats.org/officeDocument/2006/relationships" xmlns:p="http://schemas.openxmlformats.org/presentationml/2006/main" show="0">
   <p:cSld>
     <p:spTree>
       <p:nvGrpSpPr>
@@ -4106,7 +4135,7 @@
           <p:cNvPr id="2" name="Title 1">
             <a:extLst>
               <a:ext uri="{FF2B5EF4-FFF2-40B4-BE49-F238E27FC236}">
-                <a16:creationId xmlns:a16="http://schemas.microsoft.com/office/drawing/2014/main" id="{2881EC79-B8EB-4B86-9096-033DD253DA73}"/>
+                <a16:creationId xmlns:a16="http://schemas.microsoft.com/office/drawing/2014/main" id="{C818CF9C-B350-4936-99E1-D89031958E0C}"/>
               </a:ext>
             </a:extLst>
           </p:cNvPr>
@@ -4117,57 +4146,165 @@
             <p:ph type="title"/>
           </p:nvPr>
         </p:nvSpPr>
-        <p:spPr/>
-        <p:txBody>
-          <a:bodyPr/>
-          <a:lstStyle/>
-          <a:p>
-            <a:r>
-              <a:rPr lang="en-US" dirty="0"/>
-              <a:t>Site Structure</a:t>
-            </a:r>
-          </a:p>
-        </p:txBody>
-      </p:sp>
-      <p:pic>
-        <p:nvPicPr>
-          <p:cNvPr id="9" name="Content Placeholder 8" descr="A screenshot of a cell phone&#10;&#10;Description automatically generated">
-            <a:extLst>
-              <a:ext uri="{FF2B5EF4-FFF2-40B4-BE49-F238E27FC236}">
-                <a16:creationId xmlns:a16="http://schemas.microsoft.com/office/drawing/2014/main" id="{82156CF1-0166-439C-8BE3-5189825ED8A0}"/>
-              </a:ext>
-            </a:extLst>
-          </p:cNvPr>
-          <p:cNvPicPr>
-            <a:picLocks noGrp="1" noChangeAspect="1"/>
-          </p:cNvPicPr>
-          <p:nvPr>
-            <p:ph idx="1"/>
-          </p:nvPr>
-        </p:nvPicPr>
-        <p:blipFill>
-          <a:blip r:embed="rId2">
-            <a:extLst>
-              <a:ext uri="{28A0092B-C50C-407E-A947-70E740481C1C}">
-                <a14:useLocalDpi xmlns:a14="http://schemas.microsoft.com/office/drawing/2010/main" val="0"/>
-              </a:ext>
-            </a:extLst>
-          </a:blip>
-          <a:stretch>
-            <a:fillRect/>
-          </a:stretch>
-        </p:blipFill>
         <p:spPr>
           <a:xfrm>
-            <a:off x="1456870" y="1609725"/>
-            <a:ext cx="9278259" cy="4605338"/>
+            <a:off x="838200" y="339367"/>
+            <a:ext cx="10515600" cy="678161"/>
           </a:xfrm>
         </p:spPr>
-      </p:pic>
+        <p:txBody>
+          <a:bodyPr/>
+          <a:lstStyle/>
+          <a:p>
+            <a:r>
+              <a:rPr lang="en-US" dirty="0"/>
+              <a:t>Domain</a:t>
+            </a:r>
+          </a:p>
+        </p:txBody>
+      </p:sp>
+      <p:sp>
+        <p:nvSpPr>
+          <p:cNvPr id="3" name="Content Placeholder 2">
+            <a:extLst>
+              <a:ext uri="{FF2B5EF4-FFF2-40B4-BE49-F238E27FC236}">
+                <a16:creationId xmlns:a16="http://schemas.microsoft.com/office/drawing/2014/main" id="{C65F66DE-FE31-4539-83AE-36CA6E637596}"/>
+              </a:ext>
+            </a:extLst>
+          </p:cNvPr>
+          <p:cNvSpPr>
+            <a:spLocks noGrp="1"/>
+          </p:cNvSpPr>
+          <p:nvPr>
+            <p:ph idx="1"/>
+          </p:nvPr>
+        </p:nvSpPr>
+        <p:spPr>
+          <a:xfrm>
+            <a:off x="838200" y="1017529"/>
+            <a:ext cx="10515600" cy="5355770"/>
+          </a:xfrm>
+        </p:spPr>
+        <p:txBody>
+          <a:bodyPr>
+            <a:noAutofit/>
+          </a:bodyPr>
+          <a:lstStyle/>
+          <a:p>
+            <a:r>
+              <a:rPr lang="en-US" sz="2000" dirty="0"/>
+              <a:t>Open Source Development: 5 – 10 active developers, many casual contributors</a:t>
+            </a:r>
+          </a:p>
+          <a:p>
+            <a:pPr lvl="1"/>
+            <a:r>
+              <a:rPr lang="en-US" sz="1800" dirty="0"/>
+              <a:t>Code life-time: 10 - 20 years</a:t>
+            </a:r>
+          </a:p>
+          <a:p>
+            <a:pPr lvl="1"/>
+            <a:r>
+              <a:rPr lang="en-US" sz="1800" dirty="0"/>
+              <a:t>Example: Linux</a:t>
+            </a:r>
+          </a:p>
+          <a:p>
+            <a:r>
+              <a:rPr lang="en-US" sz="2000" dirty="0"/>
+              <a:t>Industrial Development: 5 – 10 developers</a:t>
+            </a:r>
+          </a:p>
+          <a:p>
+            <a:pPr lvl="1"/>
+            <a:r>
+              <a:rPr lang="en-US" sz="1800" dirty="0"/>
+              <a:t>Code life-time: 5 – 20 years</a:t>
+            </a:r>
+          </a:p>
+          <a:p>
+            <a:pPr lvl="1"/>
+            <a:r>
+              <a:rPr lang="en-US" sz="1800" dirty="0"/>
+              <a:t>Example: Machine Tool Control</a:t>
+            </a:r>
+          </a:p>
+          <a:p>
+            <a:r>
+              <a:rPr lang="en-US" sz="2000" dirty="0"/>
+              <a:t>Commercial Products: </a:t>
+            </a:r>
+          </a:p>
+          <a:p>
+            <a:pPr lvl="1"/>
+            <a:r>
+              <a:rPr lang="en-US" sz="1800" dirty="0"/>
+              <a:t>Code life-time: 20 – 30 years</a:t>
+            </a:r>
+          </a:p>
+          <a:p>
+            <a:pPr lvl="1"/>
+            <a:r>
+              <a:rPr lang="en-US" sz="1800" dirty="0"/>
+              <a:t>Example: Microsoft Word</a:t>
+            </a:r>
+          </a:p>
+          <a:p>
+            <a:r>
+              <a:rPr lang="en-US" sz="2000" dirty="0"/>
+              <a:t>Aerospace Programs: 5 – 200 developers</a:t>
+            </a:r>
+          </a:p>
+          <a:p>
+            <a:pPr lvl="1"/>
+            <a:r>
+              <a:rPr lang="en-US" sz="1600" dirty="0"/>
+              <a:t>Code life-time: 20 – 30 years</a:t>
+            </a:r>
+          </a:p>
+          <a:p>
+            <a:pPr lvl="1"/>
+            <a:r>
+              <a:rPr lang="en-US" sz="1600" dirty="0"/>
+              <a:t>Example: Submarine control, Area surveillance, ..</a:t>
+            </a:r>
+          </a:p>
+        </p:txBody>
+      </p:sp>
+      <p:sp>
+        <p:nvSpPr>
+          <p:cNvPr id="4" name="Slide Number Placeholder 3">
+            <a:extLst>
+              <a:ext uri="{FF2B5EF4-FFF2-40B4-BE49-F238E27FC236}">
+                <a16:creationId xmlns:a16="http://schemas.microsoft.com/office/drawing/2014/main" id="{A916C694-BD83-42C9-A8AC-D048E61AD071}"/>
+              </a:ext>
+            </a:extLst>
+          </p:cNvPr>
+          <p:cNvSpPr>
+            <a:spLocks noGrp="1"/>
+          </p:cNvSpPr>
+          <p:nvPr>
+            <p:ph type="sldNum" sz="quarter" idx="12"/>
+          </p:nvPr>
+        </p:nvSpPr>
+        <p:spPr/>
+        <p:txBody>
+          <a:bodyPr/>
+          <a:lstStyle/>
+          <a:p>
+            <a:fld id="{EDEBF0BA-A897-4C1E-AB3C-F330808C0E1D}" type="slidenum">
+              <a:rPr lang="en-US" smtClean="0"/>
+              <a:t>11</a:t>
+            </a:fld>
+            <a:endParaRPr lang="en-US"/>
+          </a:p>
+        </p:txBody>
+      </p:sp>
     </p:spTree>
     <p:extLst>
       <p:ext uri="{BB962C8B-B14F-4D97-AF65-F5344CB8AC3E}">
-        <p14:creationId xmlns:p14="http://schemas.microsoft.com/office/powerpoint/2010/main" val="431493297"/>
+        <p14:creationId xmlns:p14="http://schemas.microsoft.com/office/powerpoint/2010/main" val="1744719603"/>
       </p:ext>
     </p:extLst>
   </p:cSld>
@@ -4353,6 +4490,35 @@
               <a:rPr lang="en-US" sz="1600" dirty="0"/>
               <a:t>Example: Submarine control, Area surveillance, ..</a:t>
             </a:r>
+          </a:p>
+        </p:txBody>
+      </p:sp>
+      <p:sp>
+        <p:nvSpPr>
+          <p:cNvPr id="4" name="Slide Number Placeholder 3">
+            <a:extLst>
+              <a:ext uri="{FF2B5EF4-FFF2-40B4-BE49-F238E27FC236}">
+                <a16:creationId xmlns:a16="http://schemas.microsoft.com/office/drawing/2014/main" id="{F980341C-B802-4DB5-8B01-9BF021EDC77D}"/>
+              </a:ext>
+            </a:extLst>
+          </p:cNvPr>
+          <p:cNvSpPr>
+            <a:spLocks noGrp="1"/>
+          </p:cNvSpPr>
+          <p:nvPr>
+            <p:ph type="sldNum" sz="quarter" idx="12"/>
+          </p:nvPr>
+        </p:nvSpPr>
+        <p:spPr/>
+        <p:txBody>
+          <a:bodyPr/>
+          <a:lstStyle/>
+          <a:p>
+            <a:fld id="{EDEBF0BA-A897-4C1E-AB3C-F330808C0E1D}" type="slidenum">
+              <a:rPr lang="en-US" smtClean="0"/>
+              <a:t>2</a:t>
+            </a:fld>
+            <a:endParaRPr lang="en-US"/>
           </a:p>
         </p:txBody>
       </p:sp>
@@ -4583,7 +4749,7 @@
             <a:pPr lvl="1"/>
             <a:r>
               <a:rPr lang="en-US" sz="2000" dirty="0"/>
-              <a:t>Users bind remote library to webpages with CDN links</a:t>
+              <a:t>Users bind remote library to webpages with Content Delivery Network (CDN) links</a:t>
             </a:r>
             <a:br>
               <a:rPr lang="en-US" sz="2000" dirty="0"/>
@@ -4595,6 +4761,35 @@
               <a:rPr lang="en-US" sz="2400" dirty="0"/>
               <a:t>This domain already has a publishing model that has different goals than ours</a:t>
             </a:r>
+          </a:p>
+        </p:txBody>
+      </p:sp>
+      <p:sp>
+        <p:nvSpPr>
+          <p:cNvPr id="5" name="Slide Number Placeholder 4">
+            <a:extLst>
+              <a:ext uri="{FF2B5EF4-FFF2-40B4-BE49-F238E27FC236}">
+                <a16:creationId xmlns:a16="http://schemas.microsoft.com/office/drawing/2014/main" id="{202009C0-2CD5-4B98-999E-742073B61CD3}"/>
+              </a:ext>
+            </a:extLst>
+          </p:cNvPr>
+          <p:cNvSpPr>
+            <a:spLocks noGrp="1"/>
+          </p:cNvSpPr>
+          <p:nvPr>
+            <p:ph type="sldNum" sz="quarter" idx="12"/>
+          </p:nvPr>
+        </p:nvSpPr>
+        <p:spPr/>
+        <p:txBody>
+          <a:bodyPr/>
+          <a:lstStyle/>
+          <a:p>
+            <a:fld id="{EDEBF0BA-A897-4C1E-AB3C-F330808C0E1D}" type="slidenum">
+              <a:rPr lang="en-US" smtClean="0"/>
+              <a:t>3</a:t>
+            </a:fld>
+            <a:endParaRPr lang="en-US"/>
           </a:p>
         </p:txBody>
       </p:sp>
@@ -4826,6 +5021,35 @@
           </a:p>
         </p:txBody>
       </p:sp>
+      <p:sp>
+        <p:nvSpPr>
+          <p:cNvPr id="5" name="Slide Number Placeholder 4">
+            <a:extLst>
+              <a:ext uri="{FF2B5EF4-FFF2-40B4-BE49-F238E27FC236}">
+                <a16:creationId xmlns:a16="http://schemas.microsoft.com/office/drawing/2014/main" id="{CF0FA9AE-ADB3-46B4-80D0-6607029129CD}"/>
+              </a:ext>
+            </a:extLst>
+          </p:cNvPr>
+          <p:cNvSpPr>
+            <a:spLocks noGrp="1"/>
+          </p:cNvSpPr>
+          <p:nvPr>
+            <p:ph type="sldNum" sz="quarter" idx="12"/>
+          </p:nvPr>
+        </p:nvSpPr>
+        <p:spPr/>
+        <p:txBody>
+          <a:bodyPr/>
+          <a:lstStyle/>
+          <a:p>
+            <a:fld id="{EDEBF0BA-A897-4C1E-AB3C-F330808C0E1D}" type="slidenum">
+              <a:rPr lang="en-US" smtClean="0"/>
+              <a:t>4</a:t>
+            </a:fld>
+            <a:endParaRPr lang="en-US"/>
+          </a:p>
+        </p:txBody>
+      </p:sp>
     </p:spTree>
     <p:extLst>
       <p:ext uri="{BB962C8B-B14F-4D97-AF65-F5344CB8AC3E}">
@@ -4840,7 +5064,7 @@
 </file>
 
 <file path=ppt/slides/slide5.xml><?xml version="1.0" encoding="utf-8"?>
-<p:sld xmlns:a="http://schemas.openxmlformats.org/drawingml/2006/main" xmlns:r="http://schemas.openxmlformats.org/officeDocument/2006/relationships" xmlns:p="http://schemas.openxmlformats.org/presentationml/2006/main" show="0">
+<p:sld xmlns:a="http://schemas.openxmlformats.org/drawingml/2006/main" xmlns:r="http://schemas.openxmlformats.org/officeDocument/2006/relationships" xmlns:p="http://schemas.openxmlformats.org/presentationml/2006/main">
   <p:cSld>
     <p:spTree>
       <p:nvGrpSpPr>
@@ -4861,7 +5085,7 @@
           <p:cNvPr id="2" name="Title 1">
             <a:extLst>
               <a:ext uri="{FF2B5EF4-FFF2-40B4-BE49-F238E27FC236}">
-                <a16:creationId xmlns:a16="http://schemas.microsoft.com/office/drawing/2014/main" id="{C818CF9C-B350-4936-99E1-D89031958E0C}"/>
+                <a16:creationId xmlns:a16="http://schemas.microsoft.com/office/drawing/2014/main" id="{D5791037-F5B9-4520-96E0-22E8D64C46FF}"/>
               </a:ext>
             </a:extLst>
           </p:cNvPr>
@@ -4872,19 +5096,14 @@
             <p:ph type="title"/>
           </p:nvPr>
         </p:nvSpPr>
-        <p:spPr>
-          <a:xfrm>
-            <a:off x="838200" y="339367"/>
-            <a:ext cx="10515600" cy="678161"/>
-          </a:xfrm>
-        </p:spPr>
+        <p:spPr/>
         <p:txBody>
           <a:bodyPr/>
           <a:lstStyle/>
           <a:p>
             <a:r>
               <a:rPr lang="en-US" dirty="0"/>
-              <a:t>Academic Research Domain</a:t>
+              <a:t>Goal – Support Salvage and Reuse</a:t>
             </a:r>
           </a:p>
         </p:txBody>
@@ -4894,7 +5113,7 @@
           <p:cNvPr id="3" name="Content Placeholder 2">
             <a:extLst>
               <a:ext uri="{FF2B5EF4-FFF2-40B4-BE49-F238E27FC236}">
-                <a16:creationId xmlns:a16="http://schemas.microsoft.com/office/drawing/2014/main" id="{C65F66DE-FE31-4539-83AE-36CA6E637596}"/>
+                <a16:creationId xmlns:a16="http://schemas.microsoft.com/office/drawing/2014/main" id="{491474DF-CCCA-4B65-87ED-1CE7E2998525}"/>
               </a:ext>
             </a:extLst>
           </p:cNvPr>
@@ -4905,86 +5124,102 @@
             <p:ph idx="1"/>
           </p:nvPr>
         </p:nvSpPr>
-        <p:spPr>
-          <a:xfrm>
-            <a:off x="838200" y="1017529"/>
-            <a:ext cx="10515600" cy="5355770"/>
-          </a:xfrm>
-        </p:spPr>
-        <p:txBody>
-          <a:bodyPr>
-            <a:noAutofit/>
-          </a:bodyPr>
-          <a:lstStyle/>
-          <a:p>
-            <a:r>
-              <a:rPr lang="en-US" sz="2000" dirty="0"/>
-              <a:t>Academic Research: 5 – 10 code developers</a:t>
+        <p:spPr/>
+        <p:txBody>
+          <a:bodyPr/>
+          <a:lstStyle/>
+          <a:p>
+            <a:r>
+              <a:rPr lang="en-US" dirty="0"/>
+              <a:t>Software Components</a:t>
             </a:r>
           </a:p>
           <a:p>
             <a:pPr lvl="1"/>
             <a:r>
-              <a:rPr lang="en-US" sz="1800" dirty="0"/>
-              <a:t>Code life-time: 3 – 5 years</a:t>
+              <a:rPr lang="en-US" dirty="0"/>
+              <a:t>Software package that has a single purpose, few dependencies, and is useful for building software systems – example: blocking queue</a:t>
+            </a:r>
+          </a:p>
+          <a:p>
+            <a:r>
+              <a:rPr lang="en-US" dirty="0"/>
+              <a:t>Salvage</a:t>
             </a:r>
           </a:p>
           <a:p>
             <a:pPr lvl="1"/>
             <a:r>
-              <a:rPr lang="en-US" sz="1800" dirty="0"/>
-              <a:t>Example: Natural Language Processing (NLP)</a:t>
-            </a:r>
-          </a:p>
-          <a:p>
-            <a:r>
-              <a:rPr lang="en-US" sz="2000" dirty="0"/>
-              <a:t>An academic researcher may have 2 or 3 doctoral candidates working on related parts of a research project.</a:t>
-            </a:r>
-          </a:p>
-          <a:p>
-            <a:r>
-              <a:rPr lang="en-US" sz="2000" dirty="0"/>
-              <a:t>She may collaborate with two or three colleagues, perhaps at different universities.</a:t>
+              <a:rPr lang="en-US" dirty="0"/>
+              <a:t>Using an existing component with minor modifications</a:t>
             </a:r>
           </a:p>
           <a:p>
             <a:pPr lvl="1"/>
             <a:r>
-              <a:rPr lang="en-US" sz="1800" dirty="0"/>
-              <a:t>Each of those colleagues may have a similar team working on related projects.</a:t>
-            </a:r>
-          </a:p>
-          <a:p>
-            <a:r>
-              <a:rPr lang="en-US" sz="2200" dirty="0"/>
-              <a:t>There usually is continuing work on the same or related research projects for many years.</a:t>
-            </a:r>
-          </a:p>
-          <a:p>
-            <a:r>
-              <a:rPr lang="en-US" sz="2200" dirty="0"/>
-              <a:t>It is quite common that this work develops software tools for gathering and analyzing data.  Sometimes software is part of the end product, e.g., compilers for a new language, an architecture for streaming or classifying content, …</a:t>
-            </a:r>
-          </a:p>
-          <a:p>
-            <a:r>
-              <a:rPr lang="en-US" sz="2200" dirty="0"/>
-              <a:t>These software developments are rarely maintained well.  Often documentation is nothing but poorly written code.</a:t>
-            </a:r>
-          </a:p>
-          <a:p>
-            <a:r>
-              <a:rPr lang="en-US" sz="2200" dirty="0"/>
-              <a:t>Software exchange is often ad-hoc.</a:t>
-            </a:r>
+              <a:rPr lang="en-US" dirty="0"/>
+              <a:t>That creates another component that must be configured and managed</a:t>
+            </a:r>
+          </a:p>
+          <a:p>
+            <a:r>
+              <a:rPr lang="en-US" dirty="0"/>
+              <a:t>Reuse</a:t>
+            </a:r>
+          </a:p>
+          <a:p>
+            <a:pPr lvl="1"/>
+            <a:r>
+              <a:rPr lang="en-US" dirty="0"/>
+              <a:t>Reuse an existing component with </a:t>
+            </a:r>
+            <a:r>
+              <a:rPr lang="en-US" b="1" dirty="0"/>
+              <a:t>no modification</a:t>
+            </a:r>
+          </a:p>
+          <a:p>
+            <a:pPr lvl="1"/>
+            <a:r>
+              <a:rPr lang="en-US" dirty="0"/>
+              <a:t>Used by composing, using as template argument, or using as base for derived classes</a:t>
+            </a:r>
+          </a:p>
+        </p:txBody>
+      </p:sp>
+      <p:sp>
+        <p:nvSpPr>
+          <p:cNvPr id="4" name="Slide Number Placeholder 3">
+            <a:extLst>
+              <a:ext uri="{FF2B5EF4-FFF2-40B4-BE49-F238E27FC236}">
+                <a16:creationId xmlns:a16="http://schemas.microsoft.com/office/drawing/2014/main" id="{B61567BC-F924-41F2-BFB4-D8538334616A}"/>
+              </a:ext>
+            </a:extLst>
+          </p:cNvPr>
+          <p:cNvSpPr>
+            <a:spLocks noGrp="1"/>
+          </p:cNvSpPr>
+          <p:nvPr>
+            <p:ph type="sldNum" sz="quarter" idx="12"/>
+          </p:nvPr>
+        </p:nvSpPr>
+        <p:spPr/>
+        <p:txBody>
+          <a:bodyPr/>
+          <a:lstStyle/>
+          <a:p>
+            <a:fld id="{EDEBF0BA-A897-4C1E-AB3C-F330808C0E1D}" type="slidenum">
+              <a:rPr lang="en-US" smtClean="0"/>
+              <a:t>5</a:t>
+            </a:fld>
+            <a:endParaRPr lang="en-US"/>
           </a:p>
         </p:txBody>
       </p:sp>
     </p:spTree>
     <p:extLst>
       <p:ext uri="{BB962C8B-B14F-4D97-AF65-F5344CB8AC3E}">
-        <p14:creationId xmlns:p14="http://schemas.microsoft.com/office/powerpoint/2010/main" val="3236624771"/>
+        <p14:creationId xmlns:p14="http://schemas.microsoft.com/office/powerpoint/2010/main" val="1570206584"/>
       </p:ext>
     </p:extLst>
   </p:cSld>
@@ -4995,7 +5230,7 @@
 </file>
 
 <file path=ppt/slides/slide6.xml><?xml version="1.0" encoding="utf-8"?>
-<p:sld xmlns:a="http://schemas.openxmlformats.org/drawingml/2006/main" xmlns:r="http://schemas.openxmlformats.org/officeDocument/2006/relationships" xmlns:p="http://schemas.openxmlformats.org/presentationml/2006/main" show="0">
+<p:sld xmlns:a="http://schemas.openxmlformats.org/drawingml/2006/main" xmlns:r="http://schemas.openxmlformats.org/officeDocument/2006/relationships" xmlns:p="http://schemas.openxmlformats.org/presentationml/2006/main">
   <p:cSld>
     <p:spTree>
       <p:nvGrpSpPr>
@@ -5016,7 +5251,7 @@
           <p:cNvPr id="2" name="Title 1">
             <a:extLst>
               <a:ext uri="{FF2B5EF4-FFF2-40B4-BE49-F238E27FC236}">
-                <a16:creationId xmlns:a16="http://schemas.microsoft.com/office/drawing/2014/main" id="{C818CF9C-B350-4936-99E1-D89031958E0C}"/>
+                <a16:creationId xmlns:a16="http://schemas.microsoft.com/office/drawing/2014/main" id="{7B9AA4E2-8439-499E-8E09-B7B92D39946D}"/>
               </a:ext>
             </a:extLst>
           </p:cNvPr>
@@ -5027,19 +5262,14 @@
             <p:ph type="title"/>
           </p:nvPr>
         </p:nvSpPr>
-        <p:spPr>
-          <a:xfrm>
-            <a:off x="838200" y="339367"/>
-            <a:ext cx="10515600" cy="678161"/>
-          </a:xfrm>
-        </p:spPr>
+        <p:spPr/>
         <p:txBody>
           <a:bodyPr/>
           <a:lstStyle/>
           <a:p>
             <a:r>
               <a:rPr lang="en-US" dirty="0"/>
-              <a:t>Open Source Domain</a:t>
+              <a:t>Publishing Code for (Re)use</a:t>
             </a:r>
           </a:p>
         </p:txBody>
@@ -5049,7 +5279,7 @@
           <p:cNvPr id="3" name="Content Placeholder 2">
             <a:extLst>
               <a:ext uri="{FF2B5EF4-FFF2-40B4-BE49-F238E27FC236}">
-                <a16:creationId xmlns:a16="http://schemas.microsoft.com/office/drawing/2014/main" id="{C65F66DE-FE31-4539-83AE-36CA6E637596}"/>
+                <a16:creationId xmlns:a16="http://schemas.microsoft.com/office/drawing/2014/main" id="{52CCEAD5-80CD-43AC-9D2F-18A29BD5B9E1}"/>
               </a:ext>
             </a:extLst>
           </p:cNvPr>
@@ -5060,100 +5290,122 @@
             <p:ph idx="1"/>
           </p:nvPr>
         </p:nvSpPr>
-        <p:spPr>
-          <a:xfrm>
-            <a:off x="838200" y="1216909"/>
-            <a:ext cx="10515600" cy="5355770"/>
-          </a:xfrm>
-        </p:spPr>
-        <p:txBody>
-          <a:bodyPr>
-            <a:noAutofit/>
-          </a:bodyPr>
-          <a:lstStyle/>
-          <a:p>
-            <a:r>
-              <a:rPr lang="en-US" sz="2000" dirty="0"/>
-              <a:t>Open Source Development: 5 – 1000 active developers, many casual contributors</a:t>
-            </a:r>
-          </a:p>
-          <a:p>
-            <a:pPr lvl="1"/>
-            <a:r>
-              <a:rPr lang="en-US" sz="1800" dirty="0"/>
-              <a:t>Code life-time: 10 - 20 years</a:t>
-            </a:r>
-          </a:p>
-          <a:p>
-            <a:pPr lvl="1"/>
-            <a:r>
-              <a:rPr lang="en-US" sz="1800" dirty="0"/>
-              <a:t>Examples: Linux, Node.js, MongoDB</a:t>
-            </a:r>
-          </a:p>
-          <a:p>
-            <a:r>
-              <a:rPr lang="en-US" sz="2200" dirty="0"/>
-              <a:t>Following an initial period of development, a project often settles into a maintenance mode:</a:t>
-            </a:r>
-          </a:p>
-          <a:p>
-            <a:pPr lvl="1"/>
-            <a:r>
-              <a:rPr lang="en-US" sz="1800" dirty="0"/>
-              <a:t>Maintain the same mission and design.</a:t>
-            </a:r>
-          </a:p>
-          <a:p>
-            <a:pPr lvl="1"/>
-            <a:r>
-              <a:rPr lang="en-US" sz="1800" dirty="0"/>
-              <a:t>Add new features and port to new platforms.</a:t>
-            </a:r>
-          </a:p>
-          <a:p>
-            <a:r>
-              <a:rPr lang="en-US" sz="2200" dirty="0"/>
-              <a:t>Occasionally revise most of the code and support new missions.</a:t>
-            </a:r>
-          </a:p>
-          <a:p>
-            <a:r>
-              <a:rPr lang="en-US" sz="2200" dirty="0"/>
-              <a:t>Documentation varies from poor to outstanding.</a:t>
-            </a:r>
-          </a:p>
-          <a:p>
-            <a:pPr lvl="1"/>
-            <a:r>
-              <a:rPr lang="en-US" sz="1800" dirty="0"/>
-              <a:t>Some projects focus on </a:t>
-            </a:r>
-            <a:r>
-              <a:rPr lang="en-US" sz="1800" dirty="0" err="1"/>
-              <a:t>api</a:t>
-            </a:r>
-            <a:r>
-              <a:rPr lang="en-US" sz="1800" dirty="0"/>
-              <a:t> level documentation – how to use the code.</a:t>
-            </a:r>
-          </a:p>
-          <a:p>
-            <a:pPr lvl="1"/>
-            <a:r>
-              <a:rPr lang="en-US" sz="1800" dirty="0"/>
-              <a:t>Some focus on maintenance – what are the parts, how are they related, code standards, …</a:t>
-            </a:r>
-          </a:p>
-          <a:p>
-            <a:endParaRPr lang="en-US" sz="2200" dirty="0"/>
+        <p:spPr/>
+        <p:txBody>
+          <a:bodyPr/>
+          <a:lstStyle/>
+          <a:p>
+            <a:pPr>
+              <a:lnSpc>
+                <a:spcPct val="100000"/>
+              </a:lnSpc>
+            </a:pPr>
+            <a:r>
+              <a:rPr lang="en-US" dirty="0"/>
+              <a:t>Publishing some code artifact is the act of making it available, in useable form.</a:t>
+            </a:r>
+          </a:p>
+          <a:p>
+            <a:pPr>
+              <a:lnSpc>
+                <a:spcPct val="150000"/>
+              </a:lnSpc>
+            </a:pPr>
+            <a:r>
+              <a:rPr lang="en-US" dirty="0"/>
+              <a:t>Five main facets:</a:t>
+            </a:r>
+          </a:p>
+          <a:p>
+            <a:pPr lvl="1">
+              <a:lnSpc>
+                <a:spcPct val="100000"/>
+              </a:lnSpc>
+            </a:pPr>
+            <a:r>
+              <a:rPr lang="en-US" dirty="0"/>
+              <a:t>Containment</a:t>
+            </a:r>
+          </a:p>
+          <a:p>
+            <a:pPr lvl="1">
+              <a:lnSpc>
+                <a:spcPct val="100000"/>
+              </a:lnSpc>
+            </a:pPr>
+            <a:r>
+              <a:rPr lang="en-US" dirty="0"/>
+              <a:t>Delivery</a:t>
+            </a:r>
+          </a:p>
+          <a:p>
+            <a:pPr lvl="1">
+              <a:lnSpc>
+                <a:spcPct val="100000"/>
+              </a:lnSpc>
+            </a:pPr>
+            <a:r>
+              <a:rPr lang="en-US" dirty="0"/>
+              <a:t>Location</a:t>
+            </a:r>
+          </a:p>
+          <a:p>
+            <a:pPr lvl="1">
+              <a:lnSpc>
+                <a:spcPct val="100000"/>
+              </a:lnSpc>
+            </a:pPr>
+            <a:r>
+              <a:rPr lang="en-US" dirty="0"/>
+              <a:t>Interpretation</a:t>
+            </a:r>
+          </a:p>
+          <a:p>
+            <a:pPr lvl="1">
+              <a:lnSpc>
+                <a:spcPct val="100000"/>
+              </a:lnSpc>
+            </a:pPr>
+            <a:r>
+              <a:rPr lang="en-US" dirty="0"/>
+              <a:t>Quality Control</a:t>
+            </a:r>
+          </a:p>
+        </p:txBody>
+      </p:sp>
+      <p:sp>
+        <p:nvSpPr>
+          <p:cNvPr id="4" name="Slide Number Placeholder 3">
+            <a:extLst>
+              <a:ext uri="{FF2B5EF4-FFF2-40B4-BE49-F238E27FC236}">
+                <a16:creationId xmlns:a16="http://schemas.microsoft.com/office/drawing/2014/main" id="{0E7EA502-B1E7-4DB5-B94A-0DBA481132A4}"/>
+              </a:ext>
+            </a:extLst>
+          </p:cNvPr>
+          <p:cNvSpPr>
+            <a:spLocks noGrp="1"/>
+          </p:cNvSpPr>
+          <p:nvPr>
+            <p:ph type="sldNum" sz="quarter" idx="12"/>
+          </p:nvPr>
+        </p:nvSpPr>
+        <p:spPr/>
+        <p:txBody>
+          <a:bodyPr/>
+          <a:lstStyle/>
+          <a:p>
+            <a:fld id="{EDEBF0BA-A897-4C1E-AB3C-F330808C0E1D}" type="slidenum">
+              <a:rPr lang="en-US" smtClean="0"/>
+              <a:t>6</a:t>
+            </a:fld>
+            <a:endParaRPr lang="en-US"/>
           </a:p>
         </p:txBody>
       </p:sp>
     </p:spTree>
     <p:extLst>
       <p:ext uri="{BB962C8B-B14F-4D97-AF65-F5344CB8AC3E}">
-        <p14:creationId xmlns:p14="http://schemas.microsoft.com/office/powerpoint/2010/main" val="891542893"/>
+        <p14:creationId xmlns:p14="http://schemas.microsoft.com/office/powerpoint/2010/main" val="4268696743"/>
       </p:ext>
     </p:extLst>
   </p:cSld>
@@ -5164,7 +5416,7 @@
 </file>
 
 <file path=ppt/slides/slide7.xml><?xml version="1.0" encoding="utf-8"?>
-<p:sld xmlns:a="http://schemas.openxmlformats.org/drawingml/2006/main" xmlns:r="http://schemas.openxmlformats.org/officeDocument/2006/relationships" xmlns:p="http://schemas.openxmlformats.org/presentationml/2006/main" show="0">
+<p:sld xmlns:a="http://schemas.openxmlformats.org/drawingml/2006/main" xmlns:r="http://schemas.openxmlformats.org/officeDocument/2006/relationships" xmlns:p="http://schemas.openxmlformats.org/presentationml/2006/main">
   <p:cSld>
     <p:spTree>
       <p:nvGrpSpPr>
@@ -5185,7 +5437,7 @@
           <p:cNvPr id="2" name="Title 1">
             <a:extLst>
               <a:ext uri="{FF2B5EF4-FFF2-40B4-BE49-F238E27FC236}">
-                <a16:creationId xmlns:a16="http://schemas.microsoft.com/office/drawing/2014/main" id="{C818CF9C-B350-4936-99E1-D89031958E0C}"/>
+                <a16:creationId xmlns:a16="http://schemas.microsoft.com/office/drawing/2014/main" id="{B4725340-475B-4911-AC68-3E9A7FF99896}"/>
               </a:ext>
             </a:extLst>
           </p:cNvPr>
@@ -5194,138 +5446,165 @@
           </p:cNvSpPr>
           <p:nvPr>
             <p:ph type="title"/>
+          </p:nvPr>
+        </p:nvSpPr>
+        <p:spPr/>
+        <p:txBody>
+          <a:bodyPr/>
+          <a:lstStyle/>
+          <a:p>
+            <a:r>
+              <a:rPr lang="en-US" dirty="0"/>
+              <a:t>The Issues</a:t>
+            </a:r>
+          </a:p>
+        </p:txBody>
+      </p:sp>
+      <p:sp>
+        <p:nvSpPr>
+          <p:cNvPr id="3" name="Content Placeholder 2">
+            <a:extLst>
+              <a:ext uri="{FF2B5EF4-FFF2-40B4-BE49-F238E27FC236}">
+                <a16:creationId xmlns:a16="http://schemas.microsoft.com/office/drawing/2014/main" id="{D28EEC85-0147-4609-8EA7-C7AE355F5329}"/>
+              </a:ext>
+            </a:extLst>
+          </p:cNvPr>
+          <p:cNvSpPr>
+            <a:spLocks noGrp="1"/>
+          </p:cNvSpPr>
+          <p:nvPr>
+            <p:ph idx="1"/>
           </p:nvPr>
         </p:nvSpPr>
         <p:spPr>
           <a:xfrm>
-            <a:off x="838200" y="339367"/>
-            <a:ext cx="10515600" cy="678161"/>
+            <a:off x="838200" y="1390918"/>
+            <a:ext cx="10515600" cy="4786045"/>
           </a:xfrm>
         </p:spPr>
         <p:txBody>
           <a:bodyPr/>
           <a:lstStyle/>
           <a:p>
+            <a:pPr>
+              <a:lnSpc>
+                <a:spcPct val="150000"/>
+              </a:lnSpc>
+            </a:pPr>
             <a:r>
               <a:rPr lang="en-US" dirty="0"/>
-              <a:t>Domain</a:t>
-            </a:r>
-          </a:p>
-        </p:txBody>
-      </p:sp>
-      <p:sp>
-        <p:nvSpPr>
-          <p:cNvPr id="3" name="Content Placeholder 2">
-            <a:extLst>
-              <a:ext uri="{FF2B5EF4-FFF2-40B4-BE49-F238E27FC236}">
-                <a16:creationId xmlns:a16="http://schemas.microsoft.com/office/drawing/2014/main" id="{C65F66DE-FE31-4539-83AE-36CA6E637596}"/>
-              </a:ext>
-            </a:extLst>
-          </p:cNvPr>
-          <p:cNvSpPr>
-            <a:spLocks noGrp="1"/>
-          </p:cNvSpPr>
-          <p:nvPr>
-            <p:ph idx="1"/>
-          </p:nvPr>
-        </p:nvSpPr>
-        <p:spPr>
-          <a:xfrm>
-            <a:off x="838200" y="1017529"/>
-            <a:ext cx="10515600" cy="5355770"/>
-          </a:xfrm>
-        </p:spPr>
-        <p:txBody>
-          <a:bodyPr>
-            <a:noAutofit/>
-          </a:bodyPr>
-          <a:lstStyle/>
-          <a:p>
-            <a:r>
-              <a:rPr lang="en-US" sz="2000" dirty="0"/>
-              <a:t>Open Source Development: 5 – 10 active developers, many casual contributors</a:t>
-            </a:r>
-          </a:p>
-          <a:p>
-            <a:pPr lvl="1"/>
-            <a:r>
-              <a:rPr lang="en-US" sz="1800" dirty="0"/>
-              <a:t>Code life-time: 10 - 20 years</a:t>
-            </a:r>
-          </a:p>
-          <a:p>
-            <a:pPr lvl="1"/>
-            <a:r>
-              <a:rPr lang="en-US" sz="1800" dirty="0"/>
-              <a:t>Example: Linux</a:t>
-            </a:r>
-          </a:p>
-          <a:p>
-            <a:r>
-              <a:rPr lang="en-US" sz="2000" dirty="0"/>
-              <a:t>Industrial Development: 5 – 10 developers</a:t>
-            </a:r>
-          </a:p>
-          <a:p>
-            <a:pPr lvl="1"/>
-            <a:r>
-              <a:rPr lang="en-US" sz="1800" dirty="0"/>
-              <a:t>Code life-time: 5 – 20 years</a:t>
-            </a:r>
-          </a:p>
-          <a:p>
-            <a:pPr lvl="1"/>
-            <a:r>
-              <a:rPr lang="en-US" sz="1800" dirty="0"/>
-              <a:t>Example: Machine Tool Control</a:t>
-            </a:r>
-          </a:p>
-          <a:p>
-            <a:r>
-              <a:rPr lang="en-US" sz="2000" dirty="0"/>
-              <a:t>Commercial Products: </a:t>
-            </a:r>
-          </a:p>
-          <a:p>
-            <a:pPr lvl="1"/>
-            <a:r>
-              <a:rPr lang="en-US" sz="1800" dirty="0"/>
-              <a:t>Code life-time: 20 – 30 years</a:t>
-            </a:r>
-          </a:p>
-          <a:p>
-            <a:pPr lvl="1"/>
-            <a:r>
-              <a:rPr lang="en-US" sz="1800" dirty="0"/>
-              <a:t>Example: Microsoft Word</a:t>
-            </a:r>
-          </a:p>
-          <a:p>
-            <a:r>
-              <a:rPr lang="en-US" sz="2000" dirty="0"/>
-              <a:t>Aerospace Programs: 5 – 200 developers</a:t>
-            </a:r>
-          </a:p>
-          <a:p>
-            <a:pPr lvl="1"/>
-            <a:r>
-              <a:rPr lang="en-US" sz="1600" dirty="0"/>
-              <a:t>Code life-time: 20 – 30 years</a:t>
-            </a:r>
-          </a:p>
-          <a:p>
-            <a:pPr lvl="1"/>
-            <a:r>
-              <a:rPr lang="en-US" sz="1600" dirty="0"/>
-              <a:t>Example: Submarine control, Area surveillance, ..</a:t>
-            </a:r>
+              <a:t>Source code containment and delivery are solved problems</a:t>
+            </a:r>
+          </a:p>
+          <a:p>
+            <a:pPr lvl="1">
+              <a:lnSpc>
+                <a:spcPct val="100000"/>
+              </a:lnSpc>
+            </a:pPr>
+            <a:r>
+              <a:rPr lang="en-US" dirty="0"/>
+              <a:t>Cloud-based facilities like </a:t>
+            </a:r>
+            <a:r>
+              <a:rPr lang="en-US" dirty="0" err="1"/>
+              <a:t>github</a:t>
+            </a:r>
+            <a:r>
+              <a:rPr lang="en-US" dirty="0"/>
+              <a:t> do that very well</a:t>
+            </a:r>
+          </a:p>
+          <a:p>
+            <a:pPr>
+              <a:lnSpc>
+                <a:spcPct val="150000"/>
+              </a:lnSpc>
+            </a:pPr>
+            <a:r>
+              <a:rPr lang="en-US" dirty="0"/>
+              <a:t>The issues are finding and understanding code relevant to a need</a:t>
+            </a:r>
+          </a:p>
+          <a:p>
+            <a:pPr lvl="1">
+              <a:lnSpc>
+                <a:spcPct val="100000"/>
+              </a:lnSpc>
+            </a:pPr>
+            <a:r>
+              <a:rPr lang="en-US" dirty="0"/>
+              <a:t>We want most code repositories to be large – to support broad reuse</a:t>
+            </a:r>
+          </a:p>
+          <a:p>
+            <a:pPr lvl="1">
+              <a:lnSpc>
+                <a:spcPct val="100000"/>
+              </a:lnSpc>
+            </a:pPr>
+            <a:r>
+              <a:rPr lang="en-US" dirty="0"/>
+              <a:t>How do we find, in a large repository, code that fills some need?</a:t>
+            </a:r>
+          </a:p>
+          <a:p>
+            <a:pPr>
+              <a:lnSpc>
+                <a:spcPct val="100000"/>
+              </a:lnSpc>
+            </a:pPr>
+            <a:r>
+              <a:rPr lang="en-US" dirty="0"/>
+              <a:t>Website documentation, collocated with source code, is a good option</a:t>
+            </a:r>
+          </a:p>
+          <a:p>
+            <a:pPr lvl="1">
+              <a:lnSpc>
+                <a:spcPct val="100000"/>
+              </a:lnSpc>
+            </a:pPr>
+            <a:r>
+              <a:rPr lang="en-US" dirty="0"/>
+              <a:t>To support both salvage and reuse documentation needs to provide information about the component’s concept, design, and typical use</a:t>
+            </a:r>
+          </a:p>
+        </p:txBody>
+      </p:sp>
+      <p:sp>
+        <p:nvSpPr>
+          <p:cNvPr id="4" name="Slide Number Placeholder 3">
+            <a:extLst>
+              <a:ext uri="{FF2B5EF4-FFF2-40B4-BE49-F238E27FC236}">
+                <a16:creationId xmlns:a16="http://schemas.microsoft.com/office/drawing/2014/main" id="{B69DD603-6CCB-4044-86D9-1197C687F477}"/>
+              </a:ext>
+            </a:extLst>
+          </p:cNvPr>
+          <p:cNvSpPr>
+            <a:spLocks noGrp="1"/>
+          </p:cNvSpPr>
+          <p:nvPr>
+            <p:ph type="sldNum" sz="quarter" idx="12"/>
+          </p:nvPr>
+        </p:nvSpPr>
+        <p:spPr/>
+        <p:txBody>
+          <a:bodyPr/>
+          <a:lstStyle/>
+          <a:p>
+            <a:fld id="{EDEBF0BA-A897-4C1E-AB3C-F330808C0E1D}" type="slidenum">
+              <a:rPr lang="en-US" smtClean="0"/>
+              <a:t>7</a:t>
+            </a:fld>
+            <a:endParaRPr lang="en-US"/>
           </a:p>
         </p:txBody>
       </p:sp>
     </p:spTree>
     <p:extLst>
       <p:ext uri="{BB962C8B-B14F-4D97-AF65-F5344CB8AC3E}">
-        <p14:creationId xmlns:p14="http://schemas.microsoft.com/office/powerpoint/2010/main" val="1744719603"/>
+        <p14:creationId xmlns:p14="http://schemas.microsoft.com/office/powerpoint/2010/main" val="1974146755"/>
       </p:ext>
     </p:extLst>
   </p:cSld>
@@ -5357,7 +5636,7 @@
           <p:cNvPr id="2" name="Title 1">
             <a:extLst>
               <a:ext uri="{FF2B5EF4-FFF2-40B4-BE49-F238E27FC236}">
-                <a16:creationId xmlns:a16="http://schemas.microsoft.com/office/drawing/2014/main" id="{D5791037-F5B9-4520-96E0-22E8D64C46FF}"/>
+                <a16:creationId xmlns:a16="http://schemas.microsoft.com/office/drawing/2014/main" id="{2881EC79-B8EB-4B86-9096-033DD253DA73}"/>
               </a:ext>
             </a:extLst>
           </p:cNvPr>
@@ -5375,94 +5654,79 @@
           <a:p>
             <a:r>
               <a:rPr lang="en-US" dirty="0"/>
-              <a:t>Goal – Support Salvage and Reuse</a:t>
-            </a:r>
-          </a:p>
-        </p:txBody>
-      </p:sp>
-      <p:sp>
-        <p:nvSpPr>
-          <p:cNvPr id="3" name="Content Placeholder 2">
-            <a:extLst>
-              <a:ext uri="{FF2B5EF4-FFF2-40B4-BE49-F238E27FC236}">
-                <a16:creationId xmlns:a16="http://schemas.microsoft.com/office/drawing/2014/main" id="{491474DF-CCCA-4B65-87ED-1CE7E2998525}"/>
-              </a:ext>
-            </a:extLst>
-          </p:cNvPr>
-          <p:cNvSpPr>
-            <a:spLocks noGrp="1"/>
-          </p:cNvSpPr>
+              <a:t>Site Structure</a:t>
+            </a:r>
+          </a:p>
+        </p:txBody>
+      </p:sp>
+      <p:pic>
+        <p:nvPicPr>
+          <p:cNvPr id="9" name="Content Placeholder 8" descr="A screenshot of a cell phone&#10;&#10;Description automatically generated">
+            <a:extLst>
+              <a:ext uri="{FF2B5EF4-FFF2-40B4-BE49-F238E27FC236}">
+                <a16:creationId xmlns:a16="http://schemas.microsoft.com/office/drawing/2014/main" id="{82156CF1-0166-439C-8BE3-5189825ED8A0}"/>
+              </a:ext>
+            </a:extLst>
+          </p:cNvPr>
+          <p:cNvPicPr>
+            <a:picLocks noGrp="1" noChangeAspect="1"/>
+          </p:cNvPicPr>
           <p:nvPr>
             <p:ph idx="1"/>
           </p:nvPr>
+        </p:nvPicPr>
+        <p:blipFill>
+          <a:blip r:embed="rId2">
+            <a:extLst>
+              <a:ext uri="{28A0092B-C50C-407E-A947-70E740481C1C}">
+                <a14:useLocalDpi xmlns:a14="http://schemas.microsoft.com/office/drawing/2010/main" val="0"/>
+              </a:ext>
+            </a:extLst>
+          </a:blip>
+          <a:stretch>
+            <a:fillRect/>
+          </a:stretch>
+        </p:blipFill>
+        <p:spPr>
+          <a:xfrm>
+            <a:off x="1456870" y="1609725"/>
+            <a:ext cx="9278259" cy="4605338"/>
+          </a:xfrm>
+        </p:spPr>
+      </p:pic>
+      <p:sp>
+        <p:nvSpPr>
+          <p:cNvPr id="3" name="Slide Number Placeholder 2">
+            <a:extLst>
+              <a:ext uri="{FF2B5EF4-FFF2-40B4-BE49-F238E27FC236}">
+                <a16:creationId xmlns:a16="http://schemas.microsoft.com/office/drawing/2014/main" id="{0DBFBEAD-15D2-406B-B29D-E04E546B4CC4}"/>
+              </a:ext>
+            </a:extLst>
+          </p:cNvPr>
+          <p:cNvSpPr>
+            <a:spLocks noGrp="1"/>
+          </p:cNvSpPr>
+          <p:nvPr>
+            <p:ph type="sldNum" sz="quarter" idx="12"/>
+          </p:nvPr>
         </p:nvSpPr>
         <p:spPr/>
         <p:txBody>
           <a:bodyPr/>
           <a:lstStyle/>
           <a:p>
-            <a:r>
-              <a:rPr lang="en-US" dirty="0"/>
-              <a:t>Software Components</a:t>
-            </a:r>
-          </a:p>
-          <a:p>
-            <a:pPr lvl="1"/>
-            <a:r>
-              <a:rPr lang="en-US" dirty="0"/>
-              <a:t>Software package that has a single purpose, few dependencies, and is useful for building software systems – example: blocking queue</a:t>
-            </a:r>
-          </a:p>
-          <a:p>
-            <a:r>
-              <a:rPr lang="en-US" dirty="0"/>
-              <a:t>Salvage</a:t>
-            </a:r>
-          </a:p>
-          <a:p>
-            <a:pPr lvl="1"/>
-            <a:r>
-              <a:rPr lang="en-US" dirty="0"/>
-              <a:t>Using an existing component with minor modifications</a:t>
-            </a:r>
-          </a:p>
-          <a:p>
-            <a:pPr lvl="1"/>
-            <a:r>
-              <a:rPr lang="en-US" dirty="0"/>
-              <a:t>That creates another component that must be configured and managed</a:t>
-            </a:r>
-          </a:p>
-          <a:p>
-            <a:r>
-              <a:rPr lang="en-US" dirty="0"/>
-              <a:t>Reuse</a:t>
-            </a:r>
-          </a:p>
-          <a:p>
-            <a:pPr lvl="1"/>
-            <a:r>
-              <a:rPr lang="en-US" dirty="0"/>
-              <a:t>Reuse an existing component with </a:t>
-            </a:r>
-            <a:r>
-              <a:rPr lang="en-US" b="1" dirty="0"/>
-              <a:t>no modification</a:t>
-            </a:r>
-          </a:p>
-          <a:p>
-            <a:pPr lvl="1"/>
-            <a:r>
-              <a:rPr lang="en-US" dirty="0"/>
-              <a:t>Used by composing, using as template argument, or using as base for derived classes</a:t>
-            </a:r>
+            <a:fld id="{EDEBF0BA-A897-4C1E-AB3C-F330808C0E1D}" type="slidenum">
+              <a:rPr lang="en-US" smtClean="0"/>
+              <a:t>8</a:t>
+            </a:fld>
+            <a:endParaRPr lang="en-US"/>
           </a:p>
         </p:txBody>
       </p:sp>
     </p:spTree>
     <p:extLst>
       <p:ext uri="{BB962C8B-B14F-4D97-AF65-F5344CB8AC3E}">
-        <p14:creationId xmlns:p14="http://schemas.microsoft.com/office/powerpoint/2010/main" val="1570206584"/>
+        <p14:creationId xmlns:p14="http://schemas.microsoft.com/office/powerpoint/2010/main" val="431493297"/>
       </p:ext>
     </p:extLst>
   </p:cSld>
@@ -5473,7 +5737,7 @@
 </file>
 
 <file path=ppt/slides/slide9.xml><?xml version="1.0" encoding="utf-8"?>
-<p:sld xmlns:a="http://schemas.openxmlformats.org/drawingml/2006/main" xmlns:r="http://schemas.openxmlformats.org/officeDocument/2006/relationships" xmlns:p="http://schemas.openxmlformats.org/presentationml/2006/main">
+<p:sld xmlns:a="http://schemas.openxmlformats.org/drawingml/2006/main" xmlns:r="http://schemas.openxmlformats.org/officeDocument/2006/relationships" xmlns:p="http://schemas.openxmlformats.org/presentationml/2006/main" show="0">
   <p:cSld>
     <p:spTree>
       <p:nvGrpSpPr>
@@ -5494,7 +5758,7 @@
           <p:cNvPr id="2" name="Title 1">
             <a:extLst>
               <a:ext uri="{FF2B5EF4-FFF2-40B4-BE49-F238E27FC236}">
-                <a16:creationId xmlns:a16="http://schemas.microsoft.com/office/drawing/2014/main" id="{7B9AA4E2-8439-499E-8E09-B7B92D39946D}"/>
+                <a16:creationId xmlns:a16="http://schemas.microsoft.com/office/drawing/2014/main" id="{C818CF9C-B350-4936-99E1-D89031958E0C}"/>
               </a:ext>
             </a:extLst>
           </p:cNvPr>
@@ -5505,121 +5769,148 @@
             <p:ph type="title"/>
           </p:nvPr>
         </p:nvSpPr>
+        <p:spPr>
+          <a:xfrm>
+            <a:off x="838200" y="339367"/>
+            <a:ext cx="10515600" cy="678161"/>
+          </a:xfrm>
+        </p:spPr>
+        <p:txBody>
+          <a:bodyPr/>
+          <a:lstStyle/>
+          <a:p>
+            <a:r>
+              <a:rPr lang="en-US" dirty="0"/>
+              <a:t>Academic Research Domain</a:t>
+            </a:r>
+          </a:p>
+        </p:txBody>
+      </p:sp>
+      <p:sp>
+        <p:nvSpPr>
+          <p:cNvPr id="3" name="Content Placeholder 2">
+            <a:extLst>
+              <a:ext uri="{FF2B5EF4-FFF2-40B4-BE49-F238E27FC236}">
+                <a16:creationId xmlns:a16="http://schemas.microsoft.com/office/drawing/2014/main" id="{C65F66DE-FE31-4539-83AE-36CA6E637596}"/>
+              </a:ext>
+            </a:extLst>
+          </p:cNvPr>
+          <p:cNvSpPr>
+            <a:spLocks noGrp="1"/>
+          </p:cNvSpPr>
+          <p:nvPr>
+            <p:ph idx="1"/>
+          </p:nvPr>
+        </p:nvSpPr>
+        <p:spPr>
+          <a:xfrm>
+            <a:off x="838200" y="1017529"/>
+            <a:ext cx="10515600" cy="5355770"/>
+          </a:xfrm>
+        </p:spPr>
+        <p:txBody>
+          <a:bodyPr>
+            <a:noAutofit/>
+          </a:bodyPr>
+          <a:lstStyle/>
+          <a:p>
+            <a:r>
+              <a:rPr lang="en-US" sz="2000" dirty="0"/>
+              <a:t>Academic Research: 5 – 10 code developers</a:t>
+            </a:r>
+          </a:p>
+          <a:p>
+            <a:pPr lvl="1"/>
+            <a:r>
+              <a:rPr lang="en-US" sz="1800" dirty="0"/>
+              <a:t>Code life-time: 3 – 5 years</a:t>
+            </a:r>
+          </a:p>
+          <a:p>
+            <a:pPr lvl="1"/>
+            <a:r>
+              <a:rPr lang="en-US" sz="1800" dirty="0"/>
+              <a:t>Example: Natural Language Processing (NLP)</a:t>
+            </a:r>
+          </a:p>
+          <a:p>
+            <a:r>
+              <a:rPr lang="en-US" sz="2000" dirty="0"/>
+              <a:t>An academic researcher may have 2 or 3 doctoral candidates working on related parts of a research project.</a:t>
+            </a:r>
+          </a:p>
+          <a:p>
+            <a:r>
+              <a:rPr lang="en-US" sz="2000" dirty="0"/>
+              <a:t>She may collaborate with two or three colleagues, perhaps at different universities.</a:t>
+            </a:r>
+          </a:p>
+          <a:p>
+            <a:pPr lvl="1"/>
+            <a:r>
+              <a:rPr lang="en-US" sz="1800" dirty="0"/>
+              <a:t>Each of those colleagues may have a similar team working on related projects.</a:t>
+            </a:r>
+          </a:p>
+          <a:p>
+            <a:r>
+              <a:rPr lang="en-US" sz="2200" dirty="0"/>
+              <a:t>There usually is continuing work on the same or related research projects for many years.</a:t>
+            </a:r>
+          </a:p>
+          <a:p>
+            <a:r>
+              <a:rPr lang="en-US" sz="2200" dirty="0"/>
+              <a:t>It is quite common that this work develops software tools for gathering and analyzing data.  Sometimes software is part of the end product, e.g., compilers for a new language, an architecture for streaming or classifying content, …</a:t>
+            </a:r>
+          </a:p>
+          <a:p>
+            <a:r>
+              <a:rPr lang="en-US" sz="2200" dirty="0"/>
+              <a:t>These software developments are rarely maintained well.  Often documentation is nothing but poorly written code.</a:t>
+            </a:r>
+          </a:p>
+          <a:p>
+            <a:r>
+              <a:rPr lang="en-US" sz="2200" dirty="0"/>
+              <a:t>Software exchange is often ad-hoc.</a:t>
+            </a:r>
+          </a:p>
+        </p:txBody>
+      </p:sp>
+      <p:sp>
+        <p:nvSpPr>
+          <p:cNvPr id="4" name="Slide Number Placeholder 3">
+            <a:extLst>
+              <a:ext uri="{FF2B5EF4-FFF2-40B4-BE49-F238E27FC236}">
+                <a16:creationId xmlns:a16="http://schemas.microsoft.com/office/drawing/2014/main" id="{B11F232F-AB6D-4130-9246-6A1AF1E6451D}"/>
+              </a:ext>
+            </a:extLst>
+          </p:cNvPr>
+          <p:cNvSpPr>
+            <a:spLocks noGrp="1"/>
+          </p:cNvSpPr>
+          <p:nvPr>
+            <p:ph type="sldNum" sz="quarter" idx="12"/>
+          </p:nvPr>
+        </p:nvSpPr>
         <p:spPr/>
         <p:txBody>
           <a:bodyPr/>
           <a:lstStyle/>
           <a:p>
-            <a:r>
-              <a:rPr lang="en-US" dirty="0"/>
-              <a:t>Publishing Code for (Re)use</a:t>
-            </a:r>
-          </a:p>
-        </p:txBody>
-      </p:sp>
-      <p:sp>
-        <p:nvSpPr>
-          <p:cNvPr id="3" name="Content Placeholder 2">
-            <a:extLst>
-              <a:ext uri="{FF2B5EF4-FFF2-40B4-BE49-F238E27FC236}">
-                <a16:creationId xmlns:a16="http://schemas.microsoft.com/office/drawing/2014/main" id="{52CCEAD5-80CD-43AC-9D2F-18A29BD5B9E1}"/>
-              </a:ext>
-            </a:extLst>
-          </p:cNvPr>
-          <p:cNvSpPr>
-            <a:spLocks noGrp="1"/>
-          </p:cNvSpPr>
-          <p:nvPr>
-            <p:ph idx="1"/>
-          </p:nvPr>
-        </p:nvSpPr>
-        <p:spPr/>
-        <p:txBody>
-          <a:bodyPr/>
-          <a:lstStyle/>
-          <a:p>
-            <a:pPr>
-              <a:lnSpc>
-                <a:spcPct val="100000"/>
-              </a:lnSpc>
-            </a:pPr>
-            <a:r>
-              <a:rPr lang="en-US" dirty="0"/>
-              <a:t>Publishing some code artifact is the act of making it available, in useable form.</a:t>
-            </a:r>
-          </a:p>
-          <a:p>
-            <a:pPr>
-              <a:lnSpc>
-                <a:spcPct val="150000"/>
-              </a:lnSpc>
-            </a:pPr>
-            <a:r>
-              <a:rPr lang="en-US" dirty="0"/>
-              <a:t>Five main facets:</a:t>
-            </a:r>
-          </a:p>
-          <a:p>
-            <a:pPr lvl="1">
-              <a:lnSpc>
-                <a:spcPct val="100000"/>
-              </a:lnSpc>
-            </a:pPr>
-            <a:r>
-              <a:rPr lang="en-US" dirty="0"/>
-              <a:t>Containment</a:t>
-            </a:r>
-          </a:p>
-          <a:p>
-            <a:pPr lvl="1">
-              <a:lnSpc>
-                <a:spcPct val="100000"/>
-              </a:lnSpc>
-            </a:pPr>
-            <a:r>
-              <a:rPr lang="en-US" dirty="0"/>
-              <a:t>Delivery</a:t>
-            </a:r>
-          </a:p>
-          <a:p>
-            <a:pPr lvl="1">
-              <a:lnSpc>
-                <a:spcPct val="100000"/>
-              </a:lnSpc>
-            </a:pPr>
-            <a:r>
-              <a:rPr lang="en-US" dirty="0"/>
-              <a:t>Location</a:t>
-            </a:r>
-          </a:p>
-          <a:p>
-            <a:pPr lvl="1">
-              <a:lnSpc>
-                <a:spcPct val="100000"/>
-              </a:lnSpc>
-            </a:pPr>
-            <a:r>
-              <a:rPr lang="en-US" dirty="0"/>
-              <a:t>Interpretation</a:t>
-            </a:r>
-          </a:p>
-          <a:p>
-            <a:pPr lvl="1">
-              <a:lnSpc>
-                <a:spcPct val="100000"/>
-              </a:lnSpc>
-            </a:pPr>
-            <a:r>
-              <a:rPr lang="en-US" dirty="0"/>
-              <a:t>Quality Control</a:t>
-            </a:r>
+            <a:fld id="{EDEBF0BA-A897-4C1E-AB3C-F330808C0E1D}" type="slidenum">
+              <a:rPr lang="en-US" smtClean="0"/>
+              <a:t>9</a:t>
+            </a:fld>
+            <a:endParaRPr lang="en-US"/>
           </a:p>
         </p:txBody>
       </p:sp>
     </p:spTree>
     <p:extLst>
       <p:ext uri="{BB962C8B-B14F-4D97-AF65-F5344CB8AC3E}">
-        <p14:creationId xmlns:p14="http://schemas.microsoft.com/office/powerpoint/2010/main" val="4268696743"/>
+        <p14:creationId xmlns:p14="http://schemas.microsoft.com/office/powerpoint/2010/main" val="3236624771"/>
       </p:ext>
     </p:extLst>
   </p:cSld>

</xml_diff>

<commit_message>
finished powerpoint presentation publishing code
</commit_message>
<xml_diff>
--- a/Resources/PublishingSourceCode.pptx
+++ b/Resources/PublishingSourceCode.pptx
@@ -5,7 +5,7 @@
     <p:sldMasterId id="2147483648" r:id="rId1"/>
   </p:sldMasterIdLst>
   <p:notesMasterIdLst>
-    <p:notesMasterId r:id="rId14"/>
+    <p:notesMasterId r:id="rId25"/>
   </p:notesMasterIdLst>
   <p:sldIdLst>
     <p:sldId id="256" r:id="rId2"/>
@@ -13,13 +13,24 @@
     <p:sldId id="265" r:id="rId4"/>
     <p:sldId id="266" r:id="rId5"/>
     <p:sldId id="264" r:id="rId6"/>
-    <p:sldId id="258" r:id="rId7"/>
-    <p:sldId id="257" r:id="rId8"/>
-    <p:sldId id="267" r:id="rId9"/>
-    <p:sldId id="259" r:id="rId10"/>
-    <p:sldId id="261" r:id="rId11"/>
-    <p:sldId id="262" r:id="rId12"/>
-    <p:sldId id="263" r:id="rId13"/>
+    <p:sldId id="272" r:id="rId7"/>
+    <p:sldId id="258" r:id="rId8"/>
+    <p:sldId id="257" r:id="rId9"/>
+    <p:sldId id="267" r:id="rId10"/>
+    <p:sldId id="259" r:id="rId11"/>
+    <p:sldId id="268" r:id="rId12"/>
+    <p:sldId id="270" r:id="rId13"/>
+    <p:sldId id="271" r:id="rId14"/>
+    <p:sldId id="278" r:id="rId15"/>
+    <p:sldId id="274" r:id="rId16"/>
+    <p:sldId id="273" r:id="rId17"/>
+    <p:sldId id="275" r:id="rId18"/>
+    <p:sldId id="261" r:id="rId19"/>
+    <p:sldId id="262" r:id="rId20"/>
+    <p:sldId id="263" r:id="rId21"/>
+    <p:sldId id="276" r:id="rId22"/>
+    <p:sldId id="277" r:id="rId23"/>
+    <p:sldId id="279" r:id="rId24"/>
   </p:sldIdLst>
   <p:sldSz cx="12192000" cy="6858000"/>
   <p:notesSz cx="7010400" cy="9296400"/>
@@ -577,7 +588,7 @@
           <a:p>
             <a:fld id="{4F090570-C106-4FBC-AEF5-5C270F494E9C}" type="slidenum">
               <a:rPr lang="en-US" smtClean="0"/>
-              <a:t>7</a:t>
+              <a:t>8</a:t>
             </a:fld>
             <a:endParaRPr lang="en-US"/>
           </a:p>
@@ -3917,7 +3928,7 @@
 </file>
 
 <file path=ppt/slides/slide10.xml><?xml version="1.0" encoding="utf-8"?>
-<p:sld xmlns:a="http://schemas.openxmlformats.org/drawingml/2006/main" xmlns:r="http://schemas.openxmlformats.org/officeDocument/2006/relationships" xmlns:p="http://schemas.openxmlformats.org/presentationml/2006/main" show="0">
+<p:sld xmlns:a="http://schemas.openxmlformats.org/drawingml/2006/main" xmlns:r="http://schemas.openxmlformats.org/officeDocument/2006/relationships" xmlns:p="http://schemas.openxmlformats.org/presentationml/2006/main">
   <p:cSld>
     <p:spTree>
       <p:nvGrpSpPr>
@@ -3938,7 +3949,7 @@
           <p:cNvPr id="2" name="Title 1">
             <a:extLst>
               <a:ext uri="{FF2B5EF4-FFF2-40B4-BE49-F238E27FC236}">
-                <a16:creationId xmlns:a16="http://schemas.microsoft.com/office/drawing/2014/main" id="{C818CF9C-B350-4936-99E1-D89031958E0C}"/>
+                <a16:creationId xmlns:a16="http://schemas.microsoft.com/office/drawing/2014/main" id="{2881EC79-B8EB-4B86-9096-033DD253DA73}"/>
               </a:ext>
             </a:extLst>
           </p:cNvPr>
@@ -3949,121 +3960,24 @@
             <p:ph type="title"/>
           </p:nvPr>
         </p:nvSpPr>
-        <p:spPr>
-          <a:xfrm>
-            <a:off x="838200" y="339367"/>
-            <a:ext cx="10515600" cy="678161"/>
-          </a:xfrm>
-        </p:spPr>
-        <p:txBody>
-          <a:bodyPr/>
-          <a:lstStyle/>
-          <a:p>
-            <a:r>
-              <a:rPr lang="en-US" dirty="0"/>
-              <a:t>Academic Research Domain</a:t>
-            </a:r>
-          </a:p>
-        </p:txBody>
-      </p:sp>
-      <p:sp>
-        <p:nvSpPr>
-          <p:cNvPr id="3" name="Content Placeholder 2">
-            <a:extLst>
-              <a:ext uri="{FF2B5EF4-FFF2-40B4-BE49-F238E27FC236}">
-                <a16:creationId xmlns:a16="http://schemas.microsoft.com/office/drawing/2014/main" id="{C65F66DE-FE31-4539-83AE-36CA6E637596}"/>
-              </a:ext>
-            </a:extLst>
-          </p:cNvPr>
-          <p:cNvSpPr>
-            <a:spLocks noGrp="1"/>
-          </p:cNvSpPr>
-          <p:nvPr>
-            <p:ph idx="1"/>
-          </p:nvPr>
-        </p:nvSpPr>
-        <p:spPr>
-          <a:xfrm>
-            <a:off x="838200" y="1017529"/>
-            <a:ext cx="10515600" cy="5355770"/>
-          </a:xfrm>
-        </p:spPr>
-        <p:txBody>
-          <a:bodyPr>
-            <a:noAutofit/>
-          </a:bodyPr>
-          <a:lstStyle/>
-          <a:p>
-            <a:r>
-              <a:rPr lang="en-US" sz="2000" dirty="0"/>
-              <a:t>Academic Research: 5 – 10 code developers</a:t>
-            </a:r>
-          </a:p>
-          <a:p>
-            <a:pPr lvl="1"/>
-            <a:r>
-              <a:rPr lang="en-US" sz="1800" dirty="0"/>
-              <a:t>Code life-time: 3 – 5 years</a:t>
-            </a:r>
-          </a:p>
-          <a:p>
-            <a:pPr lvl="1"/>
-            <a:r>
-              <a:rPr lang="en-US" sz="1800" dirty="0"/>
-              <a:t>Example: Natural Language Processing (NLP)</a:t>
-            </a:r>
-          </a:p>
-          <a:p>
-            <a:r>
-              <a:rPr lang="en-US" sz="2000" dirty="0"/>
-              <a:t>An academic researcher may have 2 or 3 doctoral candidates working on related parts of a research project.</a:t>
-            </a:r>
-          </a:p>
-          <a:p>
-            <a:r>
-              <a:rPr lang="en-US" sz="2000" dirty="0"/>
-              <a:t>She may collaborate with two or three colleagues, perhaps at different universities.</a:t>
-            </a:r>
-          </a:p>
-          <a:p>
-            <a:pPr lvl="1"/>
-            <a:r>
-              <a:rPr lang="en-US" sz="1800" dirty="0"/>
-              <a:t>Each of those colleagues may have a similar team working on related projects.</a:t>
-            </a:r>
-          </a:p>
-          <a:p>
-            <a:r>
-              <a:rPr lang="en-US" sz="2200" dirty="0"/>
-              <a:t>There usually is continuing work on the same or related research projects for many years.</a:t>
-            </a:r>
-          </a:p>
-          <a:p>
-            <a:r>
-              <a:rPr lang="en-US" sz="2200" dirty="0"/>
-              <a:t>It is quite common that this work develops software tools for gathering and analyzing data.  Sometimes software is part of the end product, e.g., compilers for a new language, an architecture for streaming or classifying content, …</a:t>
-            </a:r>
-          </a:p>
-          <a:p>
-            <a:r>
-              <a:rPr lang="en-US" sz="2200" dirty="0"/>
-              <a:t>These software developments are rarely maintained well.  Often documentation is nothing but poorly written code.</a:t>
-            </a:r>
-          </a:p>
-          <a:p>
-            <a:r>
-              <a:rPr lang="en-US" sz="2200" dirty="0"/>
-              <a:t>Software exchange is often ad-hoc.</a:t>
-            </a:r>
-          </a:p>
-        </p:txBody>
-      </p:sp>
-      <p:sp>
-        <p:nvSpPr>
-          <p:cNvPr id="4" name="Slide Number Placeholder 3">
-            <a:extLst>
-              <a:ext uri="{FF2B5EF4-FFF2-40B4-BE49-F238E27FC236}">
-                <a16:creationId xmlns:a16="http://schemas.microsoft.com/office/drawing/2014/main" id="{B11F232F-AB6D-4130-9246-6A1AF1E6451D}"/>
+        <p:spPr/>
+        <p:txBody>
+          <a:bodyPr/>
+          <a:lstStyle/>
+          <a:p>
+            <a:r>
+              <a:rPr lang="en-US" dirty="0"/>
+              <a:t>Site Structure</a:t>
+            </a:r>
+          </a:p>
+        </p:txBody>
+      </p:sp>
+      <p:sp>
+        <p:nvSpPr>
+          <p:cNvPr id="3" name="Slide Number Placeholder 2">
+            <a:extLst>
+              <a:ext uri="{FF2B5EF4-FFF2-40B4-BE49-F238E27FC236}">
+                <a16:creationId xmlns:a16="http://schemas.microsoft.com/office/drawing/2014/main" id="{0DBFBEAD-15D2-406B-B29D-E04E546B4CC4}"/>
               </a:ext>
             </a:extLst>
           </p:cNvPr>
@@ -4087,10 +4001,45 @@
           </a:p>
         </p:txBody>
       </p:sp>
+      <p:pic>
+        <p:nvPicPr>
+          <p:cNvPr id="7" name="Content Placeholder 6" descr="A screenshot of a cell phone&#10;&#10;Description automatically generated">
+            <a:extLst>
+              <a:ext uri="{FF2B5EF4-FFF2-40B4-BE49-F238E27FC236}">
+                <a16:creationId xmlns:a16="http://schemas.microsoft.com/office/drawing/2014/main" id="{025D520F-A131-4997-AB91-05ACCF4CD798}"/>
+              </a:ext>
+            </a:extLst>
+          </p:cNvPr>
+          <p:cNvPicPr>
+            <a:picLocks noGrp="1" noChangeAspect="1"/>
+          </p:cNvPicPr>
+          <p:nvPr>
+            <p:ph idx="1"/>
+          </p:nvPr>
+        </p:nvPicPr>
+        <p:blipFill>
+          <a:blip r:embed="rId2">
+            <a:extLst>
+              <a:ext uri="{28A0092B-C50C-407E-A947-70E740481C1C}">
+                <a14:useLocalDpi xmlns:a14="http://schemas.microsoft.com/office/drawing/2010/main" val="0"/>
+              </a:ext>
+            </a:extLst>
+          </a:blip>
+          <a:stretch>
+            <a:fillRect/>
+          </a:stretch>
+        </p:blipFill>
+        <p:spPr>
+          <a:xfrm>
+            <a:off x="1863495" y="1609725"/>
+            <a:ext cx="8465009" cy="4605338"/>
+          </a:xfrm>
+        </p:spPr>
+      </p:pic>
     </p:spTree>
     <p:extLst>
       <p:ext uri="{BB962C8B-B14F-4D97-AF65-F5344CB8AC3E}">
-        <p14:creationId xmlns:p14="http://schemas.microsoft.com/office/powerpoint/2010/main" val="3236624771"/>
+        <p14:creationId xmlns:p14="http://schemas.microsoft.com/office/powerpoint/2010/main" val="431493297"/>
       </p:ext>
     </p:extLst>
   </p:cSld>
@@ -4101,7 +4050,7 @@
 </file>
 
 <file path=ppt/slides/slide11.xml><?xml version="1.0" encoding="utf-8"?>
-<p:sld xmlns:a="http://schemas.openxmlformats.org/drawingml/2006/main" xmlns:r="http://schemas.openxmlformats.org/officeDocument/2006/relationships" xmlns:p="http://schemas.openxmlformats.org/presentationml/2006/main" show="0">
+<p:sld xmlns:a="http://schemas.openxmlformats.org/drawingml/2006/main" xmlns:r="http://schemas.openxmlformats.org/officeDocument/2006/relationships" xmlns:p="http://schemas.openxmlformats.org/presentationml/2006/main">
   <p:cSld>
     <p:spTree>
       <p:nvGrpSpPr>
@@ -4122,7 +4071,7 @@
           <p:cNvPr id="2" name="Title 1">
             <a:extLst>
               <a:ext uri="{FF2B5EF4-FFF2-40B4-BE49-F238E27FC236}">
-                <a16:creationId xmlns:a16="http://schemas.microsoft.com/office/drawing/2014/main" id="{C818CF9C-B350-4936-99E1-D89031958E0C}"/>
+                <a16:creationId xmlns:a16="http://schemas.microsoft.com/office/drawing/2014/main" id="{6DFB2D42-9518-4248-AE5E-AC4DE0E3E6DF}"/>
               </a:ext>
             </a:extLst>
           </p:cNvPr>
@@ -4135,41 +4084,8 @@
         </p:nvSpPr>
         <p:spPr>
           <a:xfrm>
-            <a:off x="838200" y="339367"/>
-            <a:ext cx="10515600" cy="678161"/>
-          </a:xfrm>
-        </p:spPr>
-        <p:txBody>
-          <a:bodyPr/>
-          <a:lstStyle/>
-          <a:p>
-            <a:r>
-              <a:rPr lang="en-US" dirty="0"/>
-              <a:t>Open Source Domain</a:t>
-            </a:r>
-          </a:p>
-        </p:txBody>
-      </p:sp>
-      <p:sp>
-        <p:nvSpPr>
-          <p:cNvPr id="3" name="Content Placeholder 2">
-            <a:extLst>
-              <a:ext uri="{FF2B5EF4-FFF2-40B4-BE49-F238E27FC236}">
-                <a16:creationId xmlns:a16="http://schemas.microsoft.com/office/drawing/2014/main" id="{C65F66DE-FE31-4539-83AE-36CA6E637596}"/>
-              </a:ext>
-            </a:extLst>
-          </p:cNvPr>
-          <p:cNvSpPr>
-            <a:spLocks noGrp="1"/>
-          </p:cNvSpPr>
-          <p:nvPr>
-            <p:ph idx="1"/>
-          </p:nvPr>
-        </p:nvSpPr>
-        <p:spPr>
-          <a:xfrm>
-            <a:off x="838200" y="1216909"/>
-            <a:ext cx="10515600" cy="5355770"/>
+            <a:off x="5241700" y="365126"/>
+            <a:ext cx="6112099" cy="600789"/>
           </a:xfrm>
         </p:spPr>
         <p:txBody>
@@ -4179,80 +4095,117 @@
           <a:lstStyle/>
           <a:p>
             <a:r>
-              <a:rPr lang="en-US" sz="2000" dirty="0"/>
-              <a:t>Open Source Development: 5 – 1000 active developers, many casual contributors</a:t>
-            </a:r>
-          </a:p>
-          <a:p>
-            <a:pPr lvl="1"/>
-            <a:r>
-              <a:rPr lang="en-US" sz="1800" dirty="0"/>
-              <a:t>Code life-time: 10 - 20 years</a:t>
-            </a:r>
-          </a:p>
-          <a:p>
-            <a:pPr lvl="1"/>
-            <a:r>
-              <a:rPr lang="en-US" sz="1800" dirty="0"/>
-              <a:t>Examples: Linux, Node.js, MongoDB</a:t>
-            </a:r>
-          </a:p>
-          <a:p>
-            <a:r>
-              <a:rPr lang="en-US" sz="2200" dirty="0"/>
-              <a:t>Following an initial period of development, a project often settles into a maintenance mode:</a:t>
-            </a:r>
-          </a:p>
-          <a:p>
-            <a:pPr lvl="1"/>
-            <a:r>
-              <a:rPr lang="en-US" sz="1800" dirty="0"/>
-              <a:t>Maintain the same mission and design.</a:t>
-            </a:r>
-          </a:p>
-          <a:p>
-            <a:pPr lvl="1"/>
-            <a:r>
-              <a:rPr lang="en-US" sz="1800" dirty="0"/>
-              <a:t>Add new features and port to new platforms.</a:t>
-            </a:r>
-          </a:p>
-          <a:p>
-            <a:r>
-              <a:rPr lang="en-US" sz="2200" dirty="0"/>
-              <a:t>Occasionally revise most of the code and support new missions.</a:t>
-            </a:r>
-          </a:p>
-          <a:p>
-            <a:r>
-              <a:rPr lang="en-US" sz="2200" dirty="0"/>
-              <a:t>Documentation varies from poor to outstanding.</a:t>
-            </a:r>
-          </a:p>
-          <a:p>
-            <a:pPr lvl="1"/>
-            <a:r>
-              <a:rPr lang="en-US" sz="1800" dirty="0"/>
-              <a:t>Some projects focus on </a:t>
-            </a:r>
-            <a:r>
-              <a:rPr lang="en-US" sz="1800" dirty="0" err="1"/>
-              <a:t>api</a:t>
-            </a:r>
-            <a:r>
-              <a:rPr lang="en-US" sz="1800" dirty="0"/>
-              <a:t> level documentation – how to use the code.</a:t>
-            </a:r>
-          </a:p>
-          <a:p>
-            <a:pPr lvl="1"/>
-            <a:r>
-              <a:rPr lang="en-US" sz="1800" dirty="0"/>
-              <a:t>Some focus on maintenance – what are the parts, how are they related, code standards, …</a:t>
-            </a:r>
-          </a:p>
-          <a:p>
-            <a:endParaRPr lang="en-US" sz="2200" dirty="0"/>
+              <a:rPr lang="en-US" sz="4000" dirty="0"/>
+              <a:t>Site Structure - Code Repos</a:t>
+            </a:r>
+          </a:p>
+        </p:txBody>
+      </p:sp>
+      <p:pic>
+        <p:nvPicPr>
+          <p:cNvPr id="10" name="Content Placeholder 9" descr="A screenshot of a social media post&#10;&#10;Description automatically generated">
+            <a:extLst>
+              <a:ext uri="{FF2B5EF4-FFF2-40B4-BE49-F238E27FC236}">
+                <a16:creationId xmlns:a16="http://schemas.microsoft.com/office/drawing/2014/main" id="{F46FED3C-40A2-49D8-917D-37756ECC4DDE}"/>
+              </a:ext>
+            </a:extLst>
+          </p:cNvPr>
+          <p:cNvPicPr>
+            <a:picLocks noGrp="1" noChangeAspect="1"/>
+          </p:cNvPicPr>
+          <p:nvPr>
+            <p:ph sz="half" idx="1"/>
+          </p:nvPr>
+        </p:nvPicPr>
+        <p:blipFill>
+          <a:blip r:embed="rId2">
+            <a:extLst>
+              <a:ext uri="{28A0092B-C50C-407E-A947-70E740481C1C}">
+                <a14:useLocalDpi xmlns:a14="http://schemas.microsoft.com/office/drawing/2010/main" val="0"/>
+              </a:ext>
+            </a:extLst>
+          </a:blip>
+          <a:stretch>
+            <a:fillRect/>
+          </a:stretch>
+        </p:blipFill>
+        <p:spPr>
+          <a:xfrm>
+            <a:off x="519432" y="412124"/>
+            <a:ext cx="4786665" cy="2434107"/>
+          </a:xfrm>
+        </p:spPr>
+      </p:pic>
+      <p:sp>
+        <p:nvSpPr>
+          <p:cNvPr id="6" name="Content Placeholder 5">
+            <a:extLst>
+              <a:ext uri="{FF2B5EF4-FFF2-40B4-BE49-F238E27FC236}">
+                <a16:creationId xmlns:a16="http://schemas.microsoft.com/office/drawing/2014/main" id="{5319D24E-89D3-4DAA-9A3A-83E317A6E019}"/>
+              </a:ext>
+            </a:extLst>
+          </p:cNvPr>
+          <p:cNvSpPr>
+            <a:spLocks noGrp="1"/>
+          </p:cNvSpPr>
+          <p:nvPr>
+            <p:ph sz="half" idx="2"/>
+          </p:nvPr>
+        </p:nvSpPr>
+        <p:spPr>
+          <a:xfrm>
+            <a:off x="5422011" y="1233198"/>
+            <a:ext cx="5956479" cy="4929973"/>
+          </a:xfrm>
+        </p:spPr>
+        <p:txBody>
+          <a:bodyPr/>
+          <a:lstStyle/>
+          <a:p>
+            <a:r>
+              <a:rPr lang="en-US" dirty="0"/>
+              <a:t>Code Repositories are the most important part</a:t>
+            </a:r>
+          </a:p>
+          <a:p>
+            <a:r>
+              <a:rPr lang="en-US" dirty="0"/>
+              <a:t>Goal is to have large collections to promote broad reuse</a:t>
+            </a:r>
+          </a:p>
+          <a:p>
+            <a:r>
+              <a:rPr lang="en-US" dirty="0"/>
+              <a:t>Navigation is an issue:</a:t>
+            </a:r>
+          </a:p>
+          <a:p>
+            <a:pPr lvl="1"/>
+            <a:r>
+              <a:rPr lang="en-US" dirty="0"/>
+              <a:t>Link from Home menu</a:t>
+            </a:r>
+          </a:p>
+          <a:p>
+            <a:pPr lvl="1"/>
+            <a:r>
+              <a:rPr lang="en-US" dirty="0"/>
+              <a:t>Factor into (language or product specific) collections</a:t>
+            </a:r>
+          </a:p>
+          <a:p>
+            <a:pPr lvl="1"/>
+            <a:r>
+              <a:rPr lang="en-US" dirty="0"/>
+              <a:t>Factor each collection into individual repositories (utilities, tools, … )</a:t>
+            </a:r>
+          </a:p>
+          <a:p>
+            <a:pPr lvl="1"/>
+            <a:r>
+              <a:rPr lang="en-US" dirty="0"/>
+              <a:t>Link first to documentation which then links to code folder</a:t>
+            </a:r>
           </a:p>
         </p:txBody>
       </p:sp>
@@ -4261,7 +4214,7 @@
           <p:cNvPr id="4" name="Slide Number Placeholder 3">
             <a:extLst>
               <a:ext uri="{FF2B5EF4-FFF2-40B4-BE49-F238E27FC236}">
-                <a16:creationId xmlns:a16="http://schemas.microsoft.com/office/drawing/2014/main" id="{322EE9A1-C48D-4BEF-9075-0B0169EC94DF}"/>
+                <a16:creationId xmlns:a16="http://schemas.microsoft.com/office/drawing/2014/main" id="{94262509-2E1C-42AF-ACF8-7A6AC64578E3}"/>
               </a:ext>
             </a:extLst>
           </p:cNvPr>
@@ -4281,14 +4234,44 @@
               <a:rPr lang="en-US" smtClean="0"/>
               <a:t>11</a:t>
             </a:fld>
-            <a:endParaRPr lang="en-US"/>
-          </a:p>
-        </p:txBody>
-      </p:sp>
+            <a:endParaRPr lang="en-US" dirty="0"/>
+          </a:p>
+        </p:txBody>
+      </p:sp>
+      <p:pic>
+        <p:nvPicPr>
+          <p:cNvPr id="11" name="Picture 10">
+            <a:extLst>
+              <a:ext uri="{FF2B5EF4-FFF2-40B4-BE49-F238E27FC236}">
+                <a16:creationId xmlns:a16="http://schemas.microsoft.com/office/drawing/2014/main" id="{8C9B448C-B299-4D40-A3BF-FE692B75DEE5}"/>
+              </a:ext>
+            </a:extLst>
+          </p:cNvPr>
+          <p:cNvPicPr>
+            <a:picLocks noChangeAspect="1"/>
+          </p:cNvPicPr>
+          <p:nvPr/>
+        </p:nvPicPr>
+        <p:blipFill>
+          <a:blip r:embed="rId3"/>
+          <a:stretch>
+            <a:fillRect/>
+          </a:stretch>
+        </p:blipFill>
+        <p:spPr>
+          <a:xfrm>
+            <a:off x="759854" y="3012191"/>
+            <a:ext cx="3683358" cy="3611895"/>
+          </a:xfrm>
+          <a:prstGeom prst="rect">
+            <a:avLst/>
+          </a:prstGeom>
+        </p:spPr>
+      </p:pic>
     </p:spTree>
     <p:extLst>
       <p:ext uri="{BB962C8B-B14F-4D97-AF65-F5344CB8AC3E}">
-        <p14:creationId xmlns:p14="http://schemas.microsoft.com/office/powerpoint/2010/main" val="891542893"/>
+        <p14:creationId xmlns:p14="http://schemas.microsoft.com/office/powerpoint/2010/main" val="1092888415"/>
       </p:ext>
     </p:extLst>
   </p:cSld>
@@ -4299,7 +4282,7 @@
 </file>
 
 <file path=ppt/slides/slide12.xml><?xml version="1.0" encoding="utf-8"?>
-<p:sld xmlns:a="http://schemas.openxmlformats.org/drawingml/2006/main" xmlns:r="http://schemas.openxmlformats.org/officeDocument/2006/relationships" xmlns:p="http://schemas.openxmlformats.org/presentationml/2006/main" show="0">
+<p:sld xmlns:a="http://schemas.openxmlformats.org/drawingml/2006/main" xmlns:r="http://schemas.openxmlformats.org/officeDocument/2006/relationships" xmlns:p="http://schemas.openxmlformats.org/presentationml/2006/main">
   <p:cSld>
     <p:spTree>
       <p:nvGrpSpPr>
@@ -4320,6 +4303,1686 @@
           <p:cNvPr id="2" name="Title 1">
             <a:extLst>
               <a:ext uri="{FF2B5EF4-FFF2-40B4-BE49-F238E27FC236}">
+                <a16:creationId xmlns:a16="http://schemas.microsoft.com/office/drawing/2014/main" id="{6DFB2D42-9518-4248-AE5E-AC4DE0E3E6DF}"/>
+              </a:ext>
+            </a:extLst>
+          </p:cNvPr>
+          <p:cNvSpPr>
+            <a:spLocks noGrp="1"/>
+          </p:cNvSpPr>
+          <p:nvPr>
+            <p:ph type="title"/>
+          </p:nvPr>
+        </p:nvSpPr>
+        <p:spPr>
+          <a:xfrm>
+            <a:off x="838200" y="345808"/>
+            <a:ext cx="10515600" cy="954960"/>
+          </a:xfrm>
+        </p:spPr>
+        <p:txBody>
+          <a:bodyPr/>
+          <a:lstStyle/>
+          <a:p>
+            <a:r>
+              <a:rPr lang="en-US" dirty="0"/>
+              <a:t>Site Structure - Stories</a:t>
+            </a:r>
+          </a:p>
+        </p:txBody>
+      </p:sp>
+      <p:sp>
+        <p:nvSpPr>
+          <p:cNvPr id="6" name="Content Placeholder 5">
+            <a:extLst>
+              <a:ext uri="{FF2B5EF4-FFF2-40B4-BE49-F238E27FC236}">
+                <a16:creationId xmlns:a16="http://schemas.microsoft.com/office/drawing/2014/main" id="{5319D24E-89D3-4DAA-9A3A-83E317A6E019}"/>
+              </a:ext>
+            </a:extLst>
+          </p:cNvPr>
+          <p:cNvSpPr>
+            <a:spLocks noGrp="1"/>
+          </p:cNvSpPr>
+          <p:nvPr>
+            <p:ph sz="half" idx="2"/>
+          </p:nvPr>
+        </p:nvSpPr>
+        <p:spPr>
+          <a:xfrm>
+            <a:off x="6172200" y="1426376"/>
+            <a:ext cx="5181600" cy="4929973"/>
+          </a:xfrm>
+        </p:spPr>
+        <p:txBody>
+          <a:bodyPr/>
+          <a:lstStyle/>
+          <a:p>
+            <a:r>
+              <a:rPr lang="en-US" dirty="0"/>
+              <a:t>Stories are organized collections of pages from the site that all focus on a single theme</a:t>
+            </a:r>
+          </a:p>
+          <a:p>
+            <a:r>
+              <a:rPr lang="en-US" dirty="0"/>
+              <a:t>Intent is to help users grapple with site content</a:t>
+            </a:r>
+          </a:p>
+          <a:p>
+            <a:r>
+              <a:rPr lang="en-US" dirty="0"/>
+              <a:t>Examples are:</a:t>
+            </a:r>
+          </a:p>
+          <a:p>
+            <a:pPr lvl="1"/>
+            <a:r>
+              <a:rPr lang="en-US" dirty="0"/>
+              <a:t>C++ story – tutorial material</a:t>
+            </a:r>
+          </a:p>
+          <a:p>
+            <a:pPr lvl="1"/>
+            <a:r>
+              <a:rPr lang="en-US" dirty="0" err="1"/>
+              <a:t>SiteStory</a:t>
+            </a:r>
+            <a:r>
+              <a:rPr lang="en-US" dirty="0"/>
+              <a:t> – description of this site</a:t>
+            </a:r>
+          </a:p>
+          <a:p>
+            <a:pPr lvl="1"/>
+            <a:r>
+              <a:rPr lang="en-US" dirty="0" err="1"/>
+              <a:t>MLiPS</a:t>
+            </a:r>
+            <a:r>
+              <a:rPr lang="en-US" dirty="0"/>
+              <a:t> – guest story about ML</a:t>
+            </a:r>
+          </a:p>
+          <a:p>
+            <a:r>
+              <a:rPr lang="en-US" dirty="0"/>
+              <a:t>Image to the left is </a:t>
+            </a:r>
+            <a:r>
+              <a:rPr lang="en-US" dirty="0" err="1"/>
+              <a:t>StoryTeller</a:t>
+            </a:r>
+            <a:r>
+              <a:rPr lang="en-US" dirty="0"/>
+              <a:t> interface </a:t>
+            </a:r>
+          </a:p>
+        </p:txBody>
+      </p:sp>
+      <p:sp>
+        <p:nvSpPr>
+          <p:cNvPr id="4" name="Slide Number Placeholder 3">
+            <a:extLst>
+              <a:ext uri="{FF2B5EF4-FFF2-40B4-BE49-F238E27FC236}">
+                <a16:creationId xmlns:a16="http://schemas.microsoft.com/office/drawing/2014/main" id="{94262509-2E1C-42AF-ACF8-7A6AC64578E3}"/>
+              </a:ext>
+            </a:extLst>
+          </p:cNvPr>
+          <p:cNvSpPr>
+            <a:spLocks noGrp="1"/>
+          </p:cNvSpPr>
+          <p:nvPr>
+            <p:ph type="sldNum" sz="quarter" idx="12"/>
+          </p:nvPr>
+        </p:nvSpPr>
+        <p:spPr/>
+        <p:txBody>
+          <a:bodyPr/>
+          <a:lstStyle/>
+          <a:p>
+            <a:fld id="{EDEBF0BA-A897-4C1E-AB3C-F330808C0E1D}" type="slidenum">
+              <a:rPr lang="en-US" smtClean="0"/>
+              <a:t>12</a:t>
+            </a:fld>
+            <a:endParaRPr lang="en-US"/>
+          </a:p>
+        </p:txBody>
+      </p:sp>
+      <p:pic>
+        <p:nvPicPr>
+          <p:cNvPr id="11" name="Content Placeholder 10" descr="A screenshot of a social media post&#10;&#10;Description automatically generated">
+            <a:extLst>
+              <a:ext uri="{FF2B5EF4-FFF2-40B4-BE49-F238E27FC236}">
+                <a16:creationId xmlns:a16="http://schemas.microsoft.com/office/drawing/2014/main" id="{D259D0FE-3F55-4D0F-9621-B5ABC7B95453}"/>
+              </a:ext>
+            </a:extLst>
+          </p:cNvPr>
+          <p:cNvPicPr>
+            <a:picLocks noGrp="1" noChangeAspect="1"/>
+          </p:cNvPicPr>
+          <p:nvPr>
+            <p:ph sz="half" idx="1"/>
+          </p:nvPr>
+        </p:nvPicPr>
+        <p:blipFill>
+          <a:blip r:embed="rId2">
+            <a:extLst>
+              <a:ext uri="{28A0092B-C50C-407E-A947-70E740481C1C}">
+                <a14:useLocalDpi xmlns:a14="http://schemas.microsoft.com/office/drawing/2010/main" val="0"/>
+              </a:ext>
+            </a:extLst>
+          </a:blip>
+          <a:stretch>
+            <a:fillRect/>
+          </a:stretch>
+        </p:blipFill>
+        <p:spPr>
+          <a:xfrm>
+            <a:off x="1144270" y="1378039"/>
+            <a:ext cx="4034709" cy="2228543"/>
+          </a:xfrm>
+        </p:spPr>
+      </p:pic>
+      <p:sp>
+        <p:nvSpPr>
+          <p:cNvPr id="9" name="Content Placeholder 4">
+            <a:extLst>
+              <a:ext uri="{FF2B5EF4-FFF2-40B4-BE49-F238E27FC236}">
+                <a16:creationId xmlns:a16="http://schemas.microsoft.com/office/drawing/2014/main" id="{B526C8E8-872A-4AFD-AF49-BA7A188953FB}"/>
+              </a:ext>
+            </a:extLst>
+          </p:cNvPr>
+          <p:cNvSpPr txBox="1">
+            <a:spLocks/>
+          </p:cNvSpPr>
+          <p:nvPr/>
+        </p:nvSpPr>
+        <p:spPr>
+          <a:xfrm>
+            <a:off x="838200" y="4006448"/>
+            <a:ext cx="5181600" cy="2025158"/>
+          </a:xfrm>
+          <a:prstGeom prst="rect">
+            <a:avLst/>
+          </a:prstGeom>
+        </p:spPr>
+        <p:txBody>
+          <a:bodyPr vert="horz" lIns="91440" tIns="45720" rIns="91440" bIns="45720" rtlCol="0">
+            <a:normAutofit/>
+          </a:bodyPr>
+          <a:lstStyle>
+            <a:lvl1pPr marL="228600" indent="-228600" algn="l" defTabSz="914400" rtl="0" eaLnBrk="1" latinLnBrk="0" hangingPunct="1">
+              <a:lnSpc>
+                <a:spcPct val="90000"/>
+              </a:lnSpc>
+              <a:spcBef>
+                <a:spcPts val="1000"/>
+              </a:spcBef>
+              <a:buFont typeface="Arial" panose="020B0604020202020204" pitchFamily="34" charset="0"/>
+              <a:buChar char="•"/>
+              <a:defRPr sz="2800" kern="1200">
+                <a:solidFill>
+                  <a:schemeClr val="tx1"/>
+                </a:solidFill>
+                <a:latin typeface="+mn-lt"/>
+                <a:ea typeface="+mn-ea"/>
+                <a:cs typeface="+mn-cs"/>
+              </a:defRPr>
+            </a:lvl1pPr>
+            <a:lvl2pPr marL="685800" indent="-228600" algn="l" defTabSz="914400" rtl="0" eaLnBrk="1" latinLnBrk="0" hangingPunct="1">
+              <a:lnSpc>
+                <a:spcPct val="90000"/>
+              </a:lnSpc>
+              <a:spcBef>
+                <a:spcPts val="500"/>
+              </a:spcBef>
+              <a:buFont typeface="Arial" panose="020B0604020202020204" pitchFamily="34" charset="0"/>
+              <a:buChar char="•"/>
+              <a:defRPr sz="2400" kern="1200">
+                <a:solidFill>
+                  <a:schemeClr val="tx1"/>
+                </a:solidFill>
+                <a:latin typeface="+mn-lt"/>
+                <a:ea typeface="+mn-ea"/>
+                <a:cs typeface="+mn-cs"/>
+              </a:defRPr>
+            </a:lvl2pPr>
+            <a:lvl3pPr marL="1143000" indent="-228600" algn="l" defTabSz="914400" rtl="0" eaLnBrk="1" latinLnBrk="0" hangingPunct="1">
+              <a:lnSpc>
+                <a:spcPct val="90000"/>
+              </a:lnSpc>
+              <a:spcBef>
+                <a:spcPts val="500"/>
+              </a:spcBef>
+              <a:buFont typeface="Arial" panose="020B0604020202020204" pitchFamily="34" charset="0"/>
+              <a:buChar char="•"/>
+              <a:defRPr sz="2000" kern="1200">
+                <a:solidFill>
+                  <a:schemeClr val="tx1"/>
+                </a:solidFill>
+                <a:latin typeface="+mn-lt"/>
+                <a:ea typeface="+mn-ea"/>
+                <a:cs typeface="+mn-cs"/>
+              </a:defRPr>
+            </a:lvl3pPr>
+            <a:lvl4pPr marL="1600200" indent="-228600" algn="l" defTabSz="914400" rtl="0" eaLnBrk="1" latinLnBrk="0" hangingPunct="1">
+              <a:lnSpc>
+                <a:spcPct val="90000"/>
+              </a:lnSpc>
+              <a:spcBef>
+                <a:spcPts val="500"/>
+              </a:spcBef>
+              <a:buFont typeface="Arial" panose="020B0604020202020204" pitchFamily="34" charset="0"/>
+              <a:buChar char="•"/>
+              <a:defRPr sz="1800" kern="1200">
+                <a:solidFill>
+                  <a:schemeClr val="tx1"/>
+                </a:solidFill>
+                <a:latin typeface="+mn-lt"/>
+                <a:ea typeface="+mn-ea"/>
+                <a:cs typeface="+mn-cs"/>
+              </a:defRPr>
+            </a:lvl4pPr>
+            <a:lvl5pPr marL="2057400" indent="-228600" algn="l" defTabSz="914400" rtl="0" eaLnBrk="1" latinLnBrk="0" hangingPunct="1">
+              <a:lnSpc>
+                <a:spcPct val="90000"/>
+              </a:lnSpc>
+              <a:spcBef>
+                <a:spcPts val="500"/>
+              </a:spcBef>
+              <a:buFont typeface="Arial" panose="020B0604020202020204" pitchFamily="34" charset="0"/>
+              <a:buChar char="•"/>
+              <a:defRPr sz="1800" kern="1200">
+                <a:solidFill>
+                  <a:schemeClr val="tx1"/>
+                </a:solidFill>
+                <a:latin typeface="+mn-lt"/>
+                <a:ea typeface="+mn-ea"/>
+                <a:cs typeface="+mn-cs"/>
+              </a:defRPr>
+            </a:lvl5pPr>
+            <a:lvl6pPr marL="2514600" indent="-228600" algn="l" defTabSz="914400" rtl="0" eaLnBrk="1" latinLnBrk="0" hangingPunct="1">
+              <a:lnSpc>
+                <a:spcPct val="90000"/>
+              </a:lnSpc>
+              <a:spcBef>
+                <a:spcPts val="500"/>
+              </a:spcBef>
+              <a:buFont typeface="Arial" panose="020B0604020202020204" pitchFamily="34" charset="0"/>
+              <a:buChar char="•"/>
+              <a:defRPr sz="1800" kern="1200">
+                <a:solidFill>
+                  <a:schemeClr val="tx1"/>
+                </a:solidFill>
+                <a:latin typeface="+mn-lt"/>
+                <a:ea typeface="+mn-ea"/>
+                <a:cs typeface="+mn-cs"/>
+              </a:defRPr>
+            </a:lvl6pPr>
+            <a:lvl7pPr marL="2971800" indent="-228600" algn="l" defTabSz="914400" rtl="0" eaLnBrk="1" latinLnBrk="0" hangingPunct="1">
+              <a:lnSpc>
+                <a:spcPct val="90000"/>
+              </a:lnSpc>
+              <a:spcBef>
+                <a:spcPts val="500"/>
+              </a:spcBef>
+              <a:buFont typeface="Arial" panose="020B0604020202020204" pitchFamily="34" charset="0"/>
+              <a:buChar char="•"/>
+              <a:defRPr sz="1800" kern="1200">
+                <a:solidFill>
+                  <a:schemeClr val="tx1"/>
+                </a:solidFill>
+                <a:latin typeface="+mn-lt"/>
+                <a:ea typeface="+mn-ea"/>
+                <a:cs typeface="+mn-cs"/>
+              </a:defRPr>
+            </a:lvl7pPr>
+            <a:lvl8pPr marL="3429000" indent="-228600" algn="l" defTabSz="914400" rtl="0" eaLnBrk="1" latinLnBrk="0" hangingPunct="1">
+              <a:lnSpc>
+                <a:spcPct val="90000"/>
+              </a:lnSpc>
+              <a:spcBef>
+                <a:spcPts val="500"/>
+              </a:spcBef>
+              <a:buFont typeface="Arial" panose="020B0604020202020204" pitchFamily="34" charset="0"/>
+              <a:buChar char="•"/>
+              <a:defRPr sz="1800" kern="1200">
+                <a:solidFill>
+                  <a:schemeClr val="tx1"/>
+                </a:solidFill>
+                <a:latin typeface="+mn-lt"/>
+                <a:ea typeface="+mn-ea"/>
+                <a:cs typeface="+mn-cs"/>
+              </a:defRPr>
+            </a:lvl8pPr>
+            <a:lvl9pPr marL="3886200" indent="-228600" algn="l" defTabSz="914400" rtl="0" eaLnBrk="1" latinLnBrk="0" hangingPunct="1">
+              <a:lnSpc>
+                <a:spcPct val="90000"/>
+              </a:lnSpc>
+              <a:spcBef>
+                <a:spcPts val="500"/>
+              </a:spcBef>
+              <a:buFont typeface="Arial" panose="020B0604020202020204" pitchFamily="34" charset="0"/>
+              <a:buChar char="•"/>
+              <a:defRPr sz="1800" kern="1200">
+                <a:solidFill>
+                  <a:schemeClr val="tx1"/>
+                </a:solidFill>
+                <a:latin typeface="+mn-lt"/>
+                <a:ea typeface="+mn-ea"/>
+                <a:cs typeface="+mn-cs"/>
+              </a:defRPr>
+            </a:lvl9pPr>
+          </a:lstStyle>
+          <a:p>
+            <a:endParaRPr lang="en-US" dirty="0"/>
+          </a:p>
+        </p:txBody>
+      </p:sp>
+      <p:pic>
+        <p:nvPicPr>
+          <p:cNvPr id="13" name="Picture 12" descr="A screenshot of a cell phone&#10;&#10;Description automatically generated">
+            <a:extLst>
+              <a:ext uri="{FF2B5EF4-FFF2-40B4-BE49-F238E27FC236}">
+                <a16:creationId xmlns:a16="http://schemas.microsoft.com/office/drawing/2014/main" id="{7751078E-0403-4EC6-8BE1-9F430F4A0EC1}"/>
+              </a:ext>
+            </a:extLst>
+          </p:cNvPr>
+          <p:cNvPicPr>
+            <a:picLocks noChangeAspect="1"/>
+          </p:cNvPicPr>
+          <p:nvPr/>
+        </p:nvPicPr>
+        <p:blipFill>
+          <a:blip r:embed="rId3">
+            <a:extLst>
+              <a:ext uri="{28A0092B-C50C-407E-A947-70E740481C1C}">
+                <a14:useLocalDpi xmlns:a14="http://schemas.microsoft.com/office/drawing/2010/main" val="0"/>
+              </a:ext>
+            </a:extLst>
+          </a:blip>
+          <a:stretch>
+            <a:fillRect/>
+          </a:stretch>
+        </p:blipFill>
+        <p:spPr>
+          <a:xfrm>
+            <a:off x="967462" y="3876541"/>
+            <a:ext cx="4282343" cy="2280187"/>
+          </a:xfrm>
+          <a:prstGeom prst="rect">
+            <a:avLst/>
+          </a:prstGeom>
+        </p:spPr>
+      </p:pic>
+    </p:spTree>
+    <p:extLst>
+      <p:ext uri="{BB962C8B-B14F-4D97-AF65-F5344CB8AC3E}">
+        <p14:creationId xmlns:p14="http://schemas.microsoft.com/office/powerpoint/2010/main" val="3045181864"/>
+      </p:ext>
+    </p:extLst>
+  </p:cSld>
+  <p:clrMapOvr>
+    <a:masterClrMapping/>
+  </p:clrMapOvr>
+</p:sld>
+</file>
+
+<file path=ppt/slides/slide13.xml><?xml version="1.0" encoding="utf-8"?>
+<p:sld xmlns:a="http://schemas.openxmlformats.org/drawingml/2006/main" xmlns:r="http://schemas.openxmlformats.org/officeDocument/2006/relationships" xmlns:p="http://schemas.openxmlformats.org/presentationml/2006/main">
+  <p:cSld>
+    <p:spTree>
+      <p:nvGrpSpPr>
+        <p:cNvPr id="1" name=""/>
+        <p:cNvGrpSpPr/>
+        <p:nvPr/>
+      </p:nvGrpSpPr>
+      <p:grpSpPr>
+        <a:xfrm>
+          <a:off x="0" y="0"/>
+          <a:ext cx="0" cy="0"/>
+          <a:chOff x="0" y="0"/>
+          <a:chExt cx="0" cy="0"/>
+        </a:xfrm>
+      </p:grpSpPr>
+      <p:sp>
+        <p:nvSpPr>
+          <p:cNvPr id="2" name="Title 1">
+            <a:extLst>
+              <a:ext uri="{FF2B5EF4-FFF2-40B4-BE49-F238E27FC236}">
+                <a16:creationId xmlns:a16="http://schemas.microsoft.com/office/drawing/2014/main" id="{6DFB2D42-9518-4248-AE5E-AC4DE0E3E6DF}"/>
+              </a:ext>
+            </a:extLst>
+          </p:cNvPr>
+          <p:cNvSpPr>
+            <a:spLocks noGrp="1"/>
+          </p:cNvSpPr>
+          <p:nvPr>
+            <p:ph type="title"/>
+          </p:nvPr>
+        </p:nvSpPr>
+        <p:spPr>
+          <a:xfrm>
+            <a:off x="5847006" y="345808"/>
+            <a:ext cx="5854520" cy="698565"/>
+          </a:xfrm>
+        </p:spPr>
+        <p:txBody>
+          <a:bodyPr>
+            <a:noAutofit/>
+          </a:bodyPr>
+          <a:lstStyle/>
+          <a:p>
+            <a:r>
+              <a:rPr lang="en-US" sz="4000" dirty="0"/>
+              <a:t>Site Structure – Code Snaps</a:t>
+            </a:r>
+          </a:p>
+        </p:txBody>
+      </p:sp>
+      <p:sp>
+        <p:nvSpPr>
+          <p:cNvPr id="6" name="Content Placeholder 5">
+            <a:extLst>
+              <a:ext uri="{FF2B5EF4-FFF2-40B4-BE49-F238E27FC236}">
+                <a16:creationId xmlns:a16="http://schemas.microsoft.com/office/drawing/2014/main" id="{5319D24E-89D3-4DAA-9A3A-83E317A6E019}"/>
+              </a:ext>
+            </a:extLst>
+          </p:cNvPr>
+          <p:cNvSpPr>
+            <a:spLocks noGrp="1"/>
+          </p:cNvSpPr>
+          <p:nvPr>
+            <p:ph sz="half" idx="2"/>
+          </p:nvPr>
+        </p:nvSpPr>
+        <p:spPr>
+          <a:xfrm>
+            <a:off x="6172200" y="1155926"/>
+            <a:ext cx="5181600" cy="2191703"/>
+          </a:xfrm>
+        </p:spPr>
+        <p:txBody>
+          <a:bodyPr>
+            <a:normAutofit/>
+          </a:bodyPr>
+          <a:lstStyle/>
+          <a:p>
+            <a:r>
+              <a:rPr lang="en-US" sz="2400" dirty="0" err="1"/>
+              <a:t>CodeSnaps</a:t>
+            </a:r>
+            <a:endParaRPr lang="en-US" sz="2400" dirty="0"/>
+          </a:p>
+          <a:p>
+            <a:pPr lvl="1"/>
+            <a:r>
+              <a:rPr lang="en-US" sz="2000" dirty="0"/>
+              <a:t>Source code converted to HTML page</a:t>
+            </a:r>
+          </a:p>
+          <a:p>
+            <a:pPr lvl="1"/>
+            <a:r>
+              <a:rPr lang="en-US" sz="2000" dirty="0"/>
+              <a:t>Provides quick access to views of important code fragments</a:t>
+            </a:r>
+          </a:p>
+          <a:p>
+            <a:pPr lvl="1"/>
+            <a:r>
+              <a:rPr lang="en-US" sz="2000" dirty="0"/>
+              <a:t>No need to download from repository to explore</a:t>
+            </a:r>
+          </a:p>
+        </p:txBody>
+      </p:sp>
+      <p:sp>
+        <p:nvSpPr>
+          <p:cNvPr id="4" name="Slide Number Placeholder 3">
+            <a:extLst>
+              <a:ext uri="{FF2B5EF4-FFF2-40B4-BE49-F238E27FC236}">
+                <a16:creationId xmlns:a16="http://schemas.microsoft.com/office/drawing/2014/main" id="{94262509-2E1C-42AF-ACF8-7A6AC64578E3}"/>
+              </a:ext>
+            </a:extLst>
+          </p:cNvPr>
+          <p:cNvSpPr>
+            <a:spLocks noGrp="1"/>
+          </p:cNvSpPr>
+          <p:nvPr>
+            <p:ph type="sldNum" sz="quarter" idx="12"/>
+          </p:nvPr>
+        </p:nvSpPr>
+        <p:spPr/>
+        <p:txBody>
+          <a:bodyPr/>
+          <a:lstStyle/>
+          <a:p>
+            <a:fld id="{EDEBF0BA-A897-4C1E-AB3C-F330808C0E1D}" type="slidenum">
+              <a:rPr lang="en-US" smtClean="0"/>
+              <a:t>13</a:t>
+            </a:fld>
+            <a:endParaRPr lang="en-US"/>
+          </a:p>
+        </p:txBody>
+      </p:sp>
+      <p:sp>
+        <p:nvSpPr>
+          <p:cNvPr id="9" name="Content Placeholder 4">
+            <a:extLst>
+              <a:ext uri="{FF2B5EF4-FFF2-40B4-BE49-F238E27FC236}">
+                <a16:creationId xmlns:a16="http://schemas.microsoft.com/office/drawing/2014/main" id="{B526C8E8-872A-4AFD-AF49-BA7A188953FB}"/>
+              </a:ext>
+            </a:extLst>
+          </p:cNvPr>
+          <p:cNvSpPr txBox="1">
+            <a:spLocks/>
+          </p:cNvSpPr>
+          <p:nvPr/>
+        </p:nvSpPr>
+        <p:spPr>
+          <a:xfrm>
+            <a:off x="838200" y="4006448"/>
+            <a:ext cx="5181600" cy="2025158"/>
+          </a:xfrm>
+          <a:prstGeom prst="rect">
+            <a:avLst/>
+          </a:prstGeom>
+        </p:spPr>
+        <p:txBody>
+          <a:bodyPr vert="horz" lIns="91440" tIns="45720" rIns="91440" bIns="45720" rtlCol="0">
+            <a:normAutofit/>
+          </a:bodyPr>
+          <a:lstStyle>
+            <a:lvl1pPr marL="228600" indent="-228600" algn="l" defTabSz="914400" rtl="0" eaLnBrk="1" latinLnBrk="0" hangingPunct="1">
+              <a:lnSpc>
+                <a:spcPct val="90000"/>
+              </a:lnSpc>
+              <a:spcBef>
+                <a:spcPts val="1000"/>
+              </a:spcBef>
+              <a:buFont typeface="Arial" panose="020B0604020202020204" pitchFamily="34" charset="0"/>
+              <a:buChar char="•"/>
+              <a:defRPr sz="2800" kern="1200">
+                <a:solidFill>
+                  <a:schemeClr val="tx1"/>
+                </a:solidFill>
+                <a:latin typeface="+mn-lt"/>
+                <a:ea typeface="+mn-ea"/>
+                <a:cs typeface="+mn-cs"/>
+              </a:defRPr>
+            </a:lvl1pPr>
+            <a:lvl2pPr marL="685800" indent="-228600" algn="l" defTabSz="914400" rtl="0" eaLnBrk="1" latinLnBrk="0" hangingPunct="1">
+              <a:lnSpc>
+                <a:spcPct val="90000"/>
+              </a:lnSpc>
+              <a:spcBef>
+                <a:spcPts val="500"/>
+              </a:spcBef>
+              <a:buFont typeface="Arial" panose="020B0604020202020204" pitchFamily="34" charset="0"/>
+              <a:buChar char="•"/>
+              <a:defRPr sz="2400" kern="1200">
+                <a:solidFill>
+                  <a:schemeClr val="tx1"/>
+                </a:solidFill>
+                <a:latin typeface="+mn-lt"/>
+                <a:ea typeface="+mn-ea"/>
+                <a:cs typeface="+mn-cs"/>
+              </a:defRPr>
+            </a:lvl2pPr>
+            <a:lvl3pPr marL="1143000" indent="-228600" algn="l" defTabSz="914400" rtl="0" eaLnBrk="1" latinLnBrk="0" hangingPunct="1">
+              <a:lnSpc>
+                <a:spcPct val="90000"/>
+              </a:lnSpc>
+              <a:spcBef>
+                <a:spcPts val="500"/>
+              </a:spcBef>
+              <a:buFont typeface="Arial" panose="020B0604020202020204" pitchFamily="34" charset="0"/>
+              <a:buChar char="•"/>
+              <a:defRPr sz="2000" kern="1200">
+                <a:solidFill>
+                  <a:schemeClr val="tx1"/>
+                </a:solidFill>
+                <a:latin typeface="+mn-lt"/>
+                <a:ea typeface="+mn-ea"/>
+                <a:cs typeface="+mn-cs"/>
+              </a:defRPr>
+            </a:lvl3pPr>
+            <a:lvl4pPr marL="1600200" indent="-228600" algn="l" defTabSz="914400" rtl="0" eaLnBrk="1" latinLnBrk="0" hangingPunct="1">
+              <a:lnSpc>
+                <a:spcPct val="90000"/>
+              </a:lnSpc>
+              <a:spcBef>
+                <a:spcPts val="500"/>
+              </a:spcBef>
+              <a:buFont typeface="Arial" panose="020B0604020202020204" pitchFamily="34" charset="0"/>
+              <a:buChar char="•"/>
+              <a:defRPr sz="1800" kern="1200">
+                <a:solidFill>
+                  <a:schemeClr val="tx1"/>
+                </a:solidFill>
+                <a:latin typeface="+mn-lt"/>
+                <a:ea typeface="+mn-ea"/>
+                <a:cs typeface="+mn-cs"/>
+              </a:defRPr>
+            </a:lvl4pPr>
+            <a:lvl5pPr marL="2057400" indent="-228600" algn="l" defTabSz="914400" rtl="0" eaLnBrk="1" latinLnBrk="0" hangingPunct="1">
+              <a:lnSpc>
+                <a:spcPct val="90000"/>
+              </a:lnSpc>
+              <a:spcBef>
+                <a:spcPts val="500"/>
+              </a:spcBef>
+              <a:buFont typeface="Arial" panose="020B0604020202020204" pitchFamily="34" charset="0"/>
+              <a:buChar char="•"/>
+              <a:defRPr sz="1800" kern="1200">
+                <a:solidFill>
+                  <a:schemeClr val="tx1"/>
+                </a:solidFill>
+                <a:latin typeface="+mn-lt"/>
+                <a:ea typeface="+mn-ea"/>
+                <a:cs typeface="+mn-cs"/>
+              </a:defRPr>
+            </a:lvl5pPr>
+            <a:lvl6pPr marL="2514600" indent="-228600" algn="l" defTabSz="914400" rtl="0" eaLnBrk="1" latinLnBrk="0" hangingPunct="1">
+              <a:lnSpc>
+                <a:spcPct val="90000"/>
+              </a:lnSpc>
+              <a:spcBef>
+                <a:spcPts val="500"/>
+              </a:spcBef>
+              <a:buFont typeface="Arial" panose="020B0604020202020204" pitchFamily="34" charset="0"/>
+              <a:buChar char="•"/>
+              <a:defRPr sz="1800" kern="1200">
+                <a:solidFill>
+                  <a:schemeClr val="tx1"/>
+                </a:solidFill>
+                <a:latin typeface="+mn-lt"/>
+                <a:ea typeface="+mn-ea"/>
+                <a:cs typeface="+mn-cs"/>
+              </a:defRPr>
+            </a:lvl6pPr>
+            <a:lvl7pPr marL="2971800" indent="-228600" algn="l" defTabSz="914400" rtl="0" eaLnBrk="1" latinLnBrk="0" hangingPunct="1">
+              <a:lnSpc>
+                <a:spcPct val="90000"/>
+              </a:lnSpc>
+              <a:spcBef>
+                <a:spcPts val="500"/>
+              </a:spcBef>
+              <a:buFont typeface="Arial" panose="020B0604020202020204" pitchFamily="34" charset="0"/>
+              <a:buChar char="•"/>
+              <a:defRPr sz="1800" kern="1200">
+                <a:solidFill>
+                  <a:schemeClr val="tx1"/>
+                </a:solidFill>
+                <a:latin typeface="+mn-lt"/>
+                <a:ea typeface="+mn-ea"/>
+                <a:cs typeface="+mn-cs"/>
+              </a:defRPr>
+            </a:lvl7pPr>
+            <a:lvl8pPr marL="3429000" indent="-228600" algn="l" defTabSz="914400" rtl="0" eaLnBrk="1" latinLnBrk="0" hangingPunct="1">
+              <a:lnSpc>
+                <a:spcPct val="90000"/>
+              </a:lnSpc>
+              <a:spcBef>
+                <a:spcPts val="500"/>
+              </a:spcBef>
+              <a:buFont typeface="Arial" panose="020B0604020202020204" pitchFamily="34" charset="0"/>
+              <a:buChar char="•"/>
+              <a:defRPr sz="1800" kern="1200">
+                <a:solidFill>
+                  <a:schemeClr val="tx1"/>
+                </a:solidFill>
+                <a:latin typeface="+mn-lt"/>
+                <a:ea typeface="+mn-ea"/>
+                <a:cs typeface="+mn-cs"/>
+              </a:defRPr>
+            </a:lvl8pPr>
+            <a:lvl9pPr marL="3886200" indent="-228600" algn="l" defTabSz="914400" rtl="0" eaLnBrk="1" latinLnBrk="0" hangingPunct="1">
+              <a:lnSpc>
+                <a:spcPct val="90000"/>
+              </a:lnSpc>
+              <a:spcBef>
+                <a:spcPts val="500"/>
+              </a:spcBef>
+              <a:buFont typeface="Arial" panose="020B0604020202020204" pitchFamily="34" charset="0"/>
+              <a:buChar char="•"/>
+              <a:defRPr sz="1800" kern="1200">
+                <a:solidFill>
+                  <a:schemeClr val="tx1"/>
+                </a:solidFill>
+                <a:latin typeface="+mn-lt"/>
+                <a:ea typeface="+mn-ea"/>
+                <a:cs typeface="+mn-cs"/>
+              </a:defRPr>
+            </a:lvl9pPr>
+          </a:lstStyle>
+          <a:p>
+            <a:endParaRPr lang="en-US" dirty="0"/>
+          </a:p>
+        </p:txBody>
+      </p:sp>
+      <p:pic>
+        <p:nvPicPr>
+          <p:cNvPr id="8" name="Content Placeholder 7" descr="A screenshot of a cell phone&#10;&#10;Description automatically generated">
+            <a:extLst>
+              <a:ext uri="{FF2B5EF4-FFF2-40B4-BE49-F238E27FC236}">
+                <a16:creationId xmlns:a16="http://schemas.microsoft.com/office/drawing/2014/main" id="{E542E57B-E1C6-4DAC-993B-A75D13FF09EC}"/>
+              </a:ext>
+            </a:extLst>
+          </p:cNvPr>
+          <p:cNvPicPr>
+            <a:picLocks noGrp="1" noChangeAspect="1"/>
+          </p:cNvPicPr>
+          <p:nvPr>
+            <p:ph sz="half" idx="1"/>
+          </p:nvPr>
+        </p:nvPicPr>
+        <p:blipFill>
+          <a:blip r:embed="rId2">
+            <a:extLst>
+              <a:ext uri="{28A0092B-C50C-407E-A947-70E740481C1C}">
+                <a14:useLocalDpi xmlns:a14="http://schemas.microsoft.com/office/drawing/2010/main" val="0"/>
+              </a:ext>
+            </a:extLst>
+          </a:blip>
+          <a:stretch>
+            <a:fillRect/>
+          </a:stretch>
+        </p:blipFill>
+        <p:spPr>
+          <a:xfrm>
+            <a:off x="456067" y="3676918"/>
+            <a:ext cx="5639933" cy="2679432"/>
+          </a:xfrm>
+        </p:spPr>
+      </p:pic>
+      <p:pic>
+        <p:nvPicPr>
+          <p:cNvPr id="12" name="Picture 11" descr="A screenshot of a cell phone&#10;&#10;Description automatically generated">
+            <a:extLst>
+              <a:ext uri="{FF2B5EF4-FFF2-40B4-BE49-F238E27FC236}">
+                <a16:creationId xmlns:a16="http://schemas.microsoft.com/office/drawing/2014/main" id="{F62FB80D-8B58-42E9-B1FB-42CF0D4DA7BA}"/>
+              </a:ext>
+            </a:extLst>
+          </p:cNvPr>
+          <p:cNvPicPr>
+            <a:picLocks noChangeAspect="1"/>
+          </p:cNvPicPr>
+          <p:nvPr/>
+        </p:nvPicPr>
+        <p:blipFill>
+          <a:blip r:embed="rId3">
+            <a:extLst>
+              <a:ext uri="{28A0092B-C50C-407E-A947-70E740481C1C}">
+                <a14:useLocalDpi xmlns:a14="http://schemas.microsoft.com/office/drawing/2010/main" val="0"/>
+              </a:ext>
+            </a:extLst>
+          </a:blip>
+          <a:stretch>
+            <a:fillRect/>
+          </a:stretch>
+        </p:blipFill>
+        <p:spPr>
+          <a:xfrm>
+            <a:off x="6533347" y="3362572"/>
+            <a:ext cx="4716349" cy="3031991"/>
+          </a:xfrm>
+          <a:prstGeom prst="rect">
+            <a:avLst/>
+          </a:prstGeom>
+        </p:spPr>
+      </p:pic>
+      <p:pic>
+        <p:nvPicPr>
+          <p:cNvPr id="15" name="Picture 14" descr="A screenshot of a cell phone&#10;&#10;Description automatically generated">
+            <a:extLst>
+              <a:ext uri="{FF2B5EF4-FFF2-40B4-BE49-F238E27FC236}">
+                <a16:creationId xmlns:a16="http://schemas.microsoft.com/office/drawing/2014/main" id="{B53C186F-1247-441E-8187-BDA4766EC51A}"/>
+              </a:ext>
+            </a:extLst>
+          </p:cNvPr>
+          <p:cNvPicPr>
+            <a:picLocks noChangeAspect="1"/>
+          </p:cNvPicPr>
+          <p:nvPr/>
+        </p:nvPicPr>
+        <p:blipFill>
+          <a:blip r:embed="rId4">
+            <a:extLst>
+              <a:ext uri="{28A0092B-C50C-407E-A947-70E740481C1C}">
+                <a14:useLocalDpi xmlns:a14="http://schemas.microsoft.com/office/drawing/2010/main" val="0"/>
+              </a:ext>
+            </a:extLst>
+          </a:blip>
+          <a:stretch>
+            <a:fillRect/>
+          </a:stretch>
+        </p:blipFill>
+        <p:spPr>
+          <a:xfrm>
+            <a:off x="759854" y="308425"/>
+            <a:ext cx="4779790" cy="3054147"/>
+          </a:xfrm>
+          <a:prstGeom prst="rect">
+            <a:avLst/>
+          </a:prstGeom>
+        </p:spPr>
+      </p:pic>
+    </p:spTree>
+    <p:extLst>
+      <p:ext uri="{BB962C8B-B14F-4D97-AF65-F5344CB8AC3E}">
+        <p14:creationId xmlns:p14="http://schemas.microsoft.com/office/powerpoint/2010/main" val="324031820"/>
+      </p:ext>
+    </p:extLst>
+  </p:cSld>
+  <p:clrMapOvr>
+    <a:masterClrMapping/>
+  </p:clrMapOvr>
+</p:sld>
+</file>
+
+<file path=ppt/slides/slide14.xml><?xml version="1.0" encoding="utf-8"?>
+<p:sld xmlns:a="http://schemas.openxmlformats.org/drawingml/2006/main" xmlns:r="http://schemas.openxmlformats.org/officeDocument/2006/relationships" xmlns:p="http://schemas.openxmlformats.org/presentationml/2006/main">
+  <p:cSld>
+    <p:spTree>
+      <p:nvGrpSpPr>
+        <p:cNvPr id="1" name=""/>
+        <p:cNvGrpSpPr/>
+        <p:nvPr/>
+      </p:nvGrpSpPr>
+      <p:grpSpPr>
+        <a:xfrm>
+          <a:off x="0" y="0"/>
+          <a:ext cx="0" cy="0"/>
+          <a:chOff x="0" y="0"/>
+          <a:chExt cx="0" cy="0"/>
+        </a:xfrm>
+      </p:grpSpPr>
+      <p:sp>
+        <p:nvSpPr>
+          <p:cNvPr id="2" name="Title 1">
+            <a:extLst>
+              <a:ext uri="{FF2B5EF4-FFF2-40B4-BE49-F238E27FC236}">
+                <a16:creationId xmlns:a16="http://schemas.microsoft.com/office/drawing/2014/main" id="{68E76424-DE7B-413E-AA87-9DB3DC2C2FE5}"/>
+              </a:ext>
+            </a:extLst>
+          </p:cNvPr>
+          <p:cNvSpPr>
+            <a:spLocks noGrp="1"/>
+          </p:cNvSpPr>
+          <p:nvPr>
+            <p:ph type="title"/>
+          </p:nvPr>
+        </p:nvSpPr>
+        <p:spPr>
+          <a:xfrm>
+            <a:off x="838200" y="339369"/>
+            <a:ext cx="10515600" cy="478440"/>
+          </a:xfrm>
+        </p:spPr>
+        <p:txBody>
+          <a:bodyPr/>
+          <a:lstStyle/>
+          <a:p>
+            <a:r>
+              <a:rPr lang="en-US" dirty="0"/>
+              <a:t>Quality Control</a:t>
+            </a:r>
+          </a:p>
+        </p:txBody>
+      </p:sp>
+      <p:sp>
+        <p:nvSpPr>
+          <p:cNvPr id="3" name="Content Placeholder 2">
+            <a:extLst>
+              <a:ext uri="{FF2B5EF4-FFF2-40B4-BE49-F238E27FC236}">
+                <a16:creationId xmlns:a16="http://schemas.microsoft.com/office/drawing/2014/main" id="{99BCD03B-4005-463A-A34C-E90EA6F56E7A}"/>
+              </a:ext>
+            </a:extLst>
+          </p:cNvPr>
+          <p:cNvSpPr>
+            <a:spLocks noGrp="1"/>
+          </p:cNvSpPr>
+          <p:nvPr>
+            <p:ph idx="1"/>
+          </p:nvPr>
+        </p:nvSpPr>
+        <p:spPr>
+          <a:xfrm>
+            <a:off x="838200" y="972355"/>
+            <a:ext cx="10515600" cy="5546276"/>
+          </a:xfrm>
+        </p:spPr>
+        <p:txBody>
+          <a:bodyPr>
+            <a:noAutofit/>
+          </a:bodyPr>
+          <a:lstStyle/>
+          <a:p>
+            <a:r>
+              <a:rPr lang="en-US" sz="2400" dirty="0"/>
+              <a:t>Without quality control it’s easy for repositories to become a sea of flotsam[1] and jetsam[2]</a:t>
+            </a:r>
+          </a:p>
+          <a:p>
+            <a:pPr lvl="1"/>
+            <a:r>
+              <a:rPr lang="en-US" sz="2000" dirty="0"/>
+              <a:t>Some good content, but a lot of content that isn’t ready for reuse</a:t>
+            </a:r>
+          </a:p>
+          <a:p>
+            <a:r>
+              <a:rPr lang="en-US" sz="2400" dirty="0"/>
+              <a:t>To avoid that destination two things are necessary:</a:t>
+            </a:r>
+          </a:p>
+          <a:p>
+            <a:pPr lvl="1"/>
+            <a:r>
+              <a:rPr lang="en-US" sz="2000" dirty="0"/>
+              <a:t>An effective structure for disclosing the contents of a repository</a:t>
+            </a:r>
+          </a:p>
+          <a:p>
+            <a:pPr lvl="2"/>
+            <a:r>
+              <a:rPr lang="en-US" sz="1600" dirty="0"/>
+              <a:t>This site provides a candidate</a:t>
+            </a:r>
+          </a:p>
+          <a:p>
+            <a:pPr lvl="1"/>
+            <a:r>
+              <a:rPr lang="en-US" sz="2000" dirty="0"/>
+              <a:t>Willingness of the site sponsor to invest in review and improvement</a:t>
+            </a:r>
+          </a:p>
+          <a:p>
+            <a:pPr lvl="2"/>
+            <a:r>
+              <a:rPr lang="en-US" sz="1800" dirty="0"/>
+              <a:t>Standards components must meet to become candidates</a:t>
+            </a:r>
+          </a:p>
+          <a:p>
+            <a:pPr lvl="2"/>
+            <a:r>
+              <a:rPr lang="en-US" sz="1800" dirty="0"/>
+              <a:t>Knowledgeable and productive person(s) to evaluate a component against the standards and admit or reject</a:t>
+            </a:r>
+          </a:p>
+          <a:p>
+            <a:pPr lvl="2"/>
+            <a:r>
+              <a:rPr lang="en-US" sz="1800" dirty="0"/>
+              <a:t>Continuing background review activity – is this component still valuable?</a:t>
+            </a:r>
+          </a:p>
+          <a:p>
+            <a:r>
+              <a:rPr lang="en-US" sz="2400" dirty="0"/>
+              <a:t>Note that </a:t>
+            </a:r>
+            <a:r>
+              <a:rPr lang="en-US" sz="2400" dirty="0" err="1"/>
+              <a:t>github</a:t>
+            </a:r>
+            <a:r>
+              <a:rPr lang="en-US" sz="2400" dirty="0"/>
+              <a:t> provides tools to help, e.g., wikis, charts, …</a:t>
+            </a:r>
+            <a:br>
+              <a:rPr lang="en-US" sz="2400" dirty="0"/>
+            </a:br>
+            <a:endParaRPr lang="en-US" sz="2400" dirty="0"/>
+          </a:p>
+          <a:p>
+            <a:pPr marL="0" indent="0">
+              <a:buNone/>
+            </a:pPr>
+            <a:r>
+              <a:rPr lang="en-US" sz="2400" dirty="0"/>
+              <a:t>    [1] Flotsam - cargo that surfaces from a sunken ship</a:t>
+            </a:r>
+          </a:p>
+          <a:p>
+            <a:pPr marL="0" indent="0">
+              <a:buNone/>
+            </a:pPr>
+            <a:r>
+              <a:rPr lang="en-US" sz="2400" dirty="0"/>
+              <a:t>    [2] Jetsam – cargo that is intentionally cast from a ship in distress.</a:t>
+            </a:r>
+          </a:p>
+        </p:txBody>
+      </p:sp>
+      <p:sp>
+        <p:nvSpPr>
+          <p:cNvPr id="4" name="Slide Number Placeholder 3">
+            <a:extLst>
+              <a:ext uri="{FF2B5EF4-FFF2-40B4-BE49-F238E27FC236}">
+                <a16:creationId xmlns:a16="http://schemas.microsoft.com/office/drawing/2014/main" id="{E1AEABCC-100B-4338-8545-5BA420BE25A6}"/>
+              </a:ext>
+            </a:extLst>
+          </p:cNvPr>
+          <p:cNvSpPr>
+            <a:spLocks noGrp="1"/>
+          </p:cNvSpPr>
+          <p:nvPr>
+            <p:ph type="sldNum" sz="quarter" idx="12"/>
+          </p:nvPr>
+        </p:nvSpPr>
+        <p:spPr/>
+        <p:txBody>
+          <a:bodyPr/>
+          <a:lstStyle/>
+          <a:p>
+            <a:fld id="{EDEBF0BA-A897-4C1E-AB3C-F330808C0E1D}" type="slidenum">
+              <a:rPr lang="en-US" smtClean="0"/>
+              <a:t>14</a:t>
+            </a:fld>
+            <a:endParaRPr lang="en-US"/>
+          </a:p>
+        </p:txBody>
+      </p:sp>
+      <p:cxnSp>
+        <p:nvCxnSpPr>
+          <p:cNvPr id="10" name="Straight Connector 9">
+            <a:extLst>
+              <a:ext uri="{FF2B5EF4-FFF2-40B4-BE49-F238E27FC236}">
+                <a16:creationId xmlns:a16="http://schemas.microsoft.com/office/drawing/2014/main" id="{A19F60CD-70C4-4576-9064-9160B4C35568}"/>
+              </a:ext>
+            </a:extLst>
+          </p:cNvPr>
+          <p:cNvCxnSpPr/>
+          <p:nvPr/>
+        </p:nvCxnSpPr>
+        <p:spPr>
+          <a:xfrm>
+            <a:off x="1056068" y="5402676"/>
+            <a:ext cx="9800822" cy="0"/>
+          </a:xfrm>
+          <a:prstGeom prst="line">
+            <a:avLst/>
+          </a:prstGeom>
+        </p:spPr>
+        <p:style>
+          <a:lnRef idx="3">
+            <a:schemeClr val="dk1"/>
+          </a:lnRef>
+          <a:fillRef idx="0">
+            <a:schemeClr val="dk1"/>
+          </a:fillRef>
+          <a:effectRef idx="2">
+            <a:schemeClr val="dk1"/>
+          </a:effectRef>
+          <a:fontRef idx="minor">
+            <a:schemeClr val="tx1"/>
+          </a:fontRef>
+        </p:style>
+      </p:cxnSp>
+    </p:spTree>
+    <p:extLst>
+      <p:ext uri="{BB962C8B-B14F-4D97-AF65-F5344CB8AC3E}">
+        <p14:creationId xmlns:p14="http://schemas.microsoft.com/office/powerpoint/2010/main" val="6011053"/>
+      </p:ext>
+    </p:extLst>
+  </p:cSld>
+  <p:clrMapOvr>
+    <a:masterClrMapping/>
+  </p:clrMapOvr>
+</p:sld>
+</file>
+
+<file path=ppt/slides/slide15.xml><?xml version="1.0" encoding="utf-8"?>
+<p:sld xmlns:a="http://schemas.openxmlformats.org/drawingml/2006/main" xmlns:r="http://schemas.openxmlformats.org/officeDocument/2006/relationships" xmlns:p="http://schemas.openxmlformats.org/presentationml/2006/main">
+  <p:cSld>
+    <p:spTree>
+      <p:nvGrpSpPr>
+        <p:cNvPr id="1" name=""/>
+        <p:cNvGrpSpPr/>
+        <p:nvPr/>
+      </p:nvGrpSpPr>
+      <p:grpSpPr>
+        <a:xfrm>
+          <a:off x="0" y="0"/>
+          <a:ext cx="0" cy="0"/>
+          <a:chOff x="0" y="0"/>
+          <a:chExt cx="0" cy="0"/>
+        </a:xfrm>
+      </p:grpSpPr>
+      <p:sp>
+        <p:nvSpPr>
+          <p:cNvPr id="6" name="Title 5">
+            <a:extLst>
+              <a:ext uri="{FF2B5EF4-FFF2-40B4-BE49-F238E27FC236}">
+                <a16:creationId xmlns:a16="http://schemas.microsoft.com/office/drawing/2014/main" id="{6F84FA54-65FA-4160-855E-2B56132F9651}"/>
+              </a:ext>
+            </a:extLst>
+          </p:cNvPr>
+          <p:cNvSpPr>
+            <a:spLocks noGrp="1"/>
+          </p:cNvSpPr>
+          <p:nvPr>
+            <p:ph type="title"/>
+          </p:nvPr>
+        </p:nvSpPr>
+        <p:spPr/>
+        <p:txBody>
+          <a:bodyPr/>
+          <a:lstStyle/>
+          <a:p>
+            <a:r>
+              <a:rPr lang="en-US" dirty="0"/>
+              <a:t>Experiments</a:t>
+            </a:r>
+          </a:p>
+        </p:txBody>
+      </p:sp>
+      <p:sp>
+        <p:nvSpPr>
+          <p:cNvPr id="7" name="Content Placeholder 6">
+            <a:extLst>
+              <a:ext uri="{FF2B5EF4-FFF2-40B4-BE49-F238E27FC236}">
+                <a16:creationId xmlns:a16="http://schemas.microsoft.com/office/drawing/2014/main" id="{1BF0FC12-D67B-4A58-8EC4-1867ACA2F8BD}"/>
+              </a:ext>
+            </a:extLst>
+          </p:cNvPr>
+          <p:cNvSpPr>
+            <a:spLocks noGrp="1"/>
+          </p:cNvSpPr>
+          <p:nvPr>
+            <p:ph idx="1"/>
+          </p:nvPr>
+        </p:nvSpPr>
+        <p:spPr>
+          <a:xfrm>
+            <a:off x="838200" y="1435994"/>
+            <a:ext cx="10515600" cy="4605741"/>
+          </a:xfrm>
+        </p:spPr>
+        <p:txBody>
+          <a:bodyPr/>
+          <a:lstStyle/>
+          <a:p>
+            <a:r>
+              <a:rPr lang="en-US" dirty="0"/>
+              <a:t>Experiments to make the site’s publishing process more effective are continuing:</a:t>
+            </a:r>
+          </a:p>
+          <a:p>
+            <a:pPr lvl="1"/>
+            <a:r>
+              <a:rPr lang="en-US" dirty="0"/>
+              <a:t>Developing UI widgets to use webpage real estate effectively</a:t>
+            </a:r>
+          </a:p>
+          <a:p>
+            <a:pPr lvl="2"/>
+            <a:r>
+              <a:rPr lang="en-US" dirty="0"/>
+              <a:t>User driven diagram resizer</a:t>
+            </a:r>
+          </a:p>
+          <a:p>
+            <a:pPr lvl="2"/>
+            <a:r>
+              <a:rPr lang="en-US" dirty="0"/>
+              <a:t>Slide-in panels</a:t>
+            </a:r>
+          </a:p>
+          <a:p>
+            <a:pPr lvl="2"/>
+            <a:r>
+              <a:rPr lang="en-US" dirty="0"/>
+              <a:t>Slide show</a:t>
+            </a:r>
+          </a:p>
+          <a:p>
+            <a:pPr lvl="2"/>
+            <a:r>
+              <a:rPr lang="en-US" dirty="0"/>
+              <a:t>Code blocks for presentation</a:t>
+            </a:r>
+          </a:p>
+          <a:p>
+            <a:pPr lvl="2"/>
+            <a:r>
+              <a:rPr lang="en-US" dirty="0"/>
+              <a:t>Photo styling</a:t>
+            </a:r>
+          </a:p>
+          <a:p>
+            <a:pPr lvl="1"/>
+            <a:r>
+              <a:rPr lang="en-US" dirty="0"/>
+              <a:t>Navigation schemes</a:t>
+            </a:r>
+          </a:p>
+          <a:p>
+            <a:pPr lvl="2"/>
+            <a:r>
+              <a:rPr lang="en-US" dirty="0"/>
+              <a:t>Dropdown menus</a:t>
+            </a:r>
+          </a:p>
+          <a:p>
+            <a:pPr lvl="2"/>
+            <a:r>
+              <a:rPr lang="en-US" dirty="0"/>
+              <a:t>Navigation buttons and key presses</a:t>
+            </a:r>
+          </a:p>
+          <a:p>
+            <a:pPr lvl="1"/>
+            <a:r>
+              <a:rPr lang="en-US" dirty="0"/>
+              <a:t>Continuing to think about site organization schemes</a:t>
+            </a:r>
+          </a:p>
+        </p:txBody>
+      </p:sp>
+      <p:sp>
+        <p:nvSpPr>
+          <p:cNvPr id="5" name="Slide Number Placeholder 4">
+            <a:extLst>
+              <a:ext uri="{FF2B5EF4-FFF2-40B4-BE49-F238E27FC236}">
+                <a16:creationId xmlns:a16="http://schemas.microsoft.com/office/drawing/2014/main" id="{175BF427-C62C-4AB5-A038-A22DED838917}"/>
+              </a:ext>
+            </a:extLst>
+          </p:cNvPr>
+          <p:cNvSpPr>
+            <a:spLocks noGrp="1"/>
+          </p:cNvSpPr>
+          <p:nvPr>
+            <p:ph type="sldNum" sz="quarter" idx="12"/>
+          </p:nvPr>
+        </p:nvSpPr>
+        <p:spPr/>
+        <p:txBody>
+          <a:bodyPr/>
+          <a:lstStyle/>
+          <a:p>
+            <a:fld id="{EDEBF0BA-A897-4C1E-AB3C-F330808C0E1D}" type="slidenum">
+              <a:rPr lang="en-US" smtClean="0"/>
+              <a:t>15</a:t>
+            </a:fld>
+            <a:endParaRPr lang="en-US"/>
+          </a:p>
+        </p:txBody>
+      </p:sp>
+    </p:spTree>
+    <p:extLst>
+      <p:ext uri="{BB962C8B-B14F-4D97-AF65-F5344CB8AC3E}">
+        <p14:creationId xmlns:p14="http://schemas.microsoft.com/office/powerpoint/2010/main" val="3303993548"/>
+      </p:ext>
+    </p:extLst>
+  </p:cSld>
+  <p:clrMapOvr>
+    <a:masterClrMapping/>
+  </p:clrMapOvr>
+</p:sld>
+</file>
+
+<file path=ppt/slides/slide16.xml><?xml version="1.0" encoding="utf-8"?>
+<p:sld xmlns:a="http://schemas.openxmlformats.org/drawingml/2006/main" xmlns:r="http://schemas.openxmlformats.org/officeDocument/2006/relationships" xmlns:p="http://schemas.openxmlformats.org/presentationml/2006/main">
+  <p:cSld>
+    <p:spTree>
+      <p:nvGrpSpPr>
+        <p:cNvPr id="1" name=""/>
+        <p:cNvGrpSpPr/>
+        <p:nvPr/>
+      </p:nvGrpSpPr>
+      <p:grpSpPr>
+        <a:xfrm>
+          <a:off x="0" y="0"/>
+          <a:ext cx="0" cy="0"/>
+          <a:chOff x="0" y="0"/>
+          <a:chExt cx="0" cy="0"/>
+        </a:xfrm>
+      </p:grpSpPr>
+      <p:sp>
+        <p:nvSpPr>
+          <p:cNvPr id="2" name="Title 1">
+            <a:extLst>
+              <a:ext uri="{FF2B5EF4-FFF2-40B4-BE49-F238E27FC236}">
+                <a16:creationId xmlns:a16="http://schemas.microsoft.com/office/drawing/2014/main" id="{ACAA7557-4583-4CE5-9450-333B91340133}"/>
+              </a:ext>
+            </a:extLst>
+          </p:cNvPr>
+          <p:cNvSpPr>
+            <a:spLocks noGrp="1"/>
+          </p:cNvSpPr>
+          <p:nvPr>
+            <p:ph type="title"/>
+          </p:nvPr>
+        </p:nvSpPr>
+        <p:spPr>
+          <a:xfrm>
+            <a:off x="838200" y="365125"/>
+            <a:ext cx="5257800" cy="1325563"/>
+          </a:xfrm>
+        </p:spPr>
+        <p:txBody>
+          <a:bodyPr>
+            <a:normAutofit/>
+          </a:bodyPr>
+          <a:lstStyle/>
+          <a:p>
+            <a:r>
+              <a:rPr lang="en-US" sz="4000" dirty="0"/>
+              <a:t>Status and Conclusions</a:t>
+            </a:r>
+          </a:p>
+        </p:txBody>
+      </p:sp>
+      <p:sp>
+        <p:nvSpPr>
+          <p:cNvPr id="5" name="Content Placeholder 4">
+            <a:extLst>
+              <a:ext uri="{FF2B5EF4-FFF2-40B4-BE49-F238E27FC236}">
+                <a16:creationId xmlns:a16="http://schemas.microsoft.com/office/drawing/2014/main" id="{F59047EB-518C-4D47-AE0E-61C2D22A203D}"/>
+              </a:ext>
+            </a:extLst>
+          </p:cNvPr>
+          <p:cNvSpPr>
+            <a:spLocks noGrp="1"/>
+          </p:cNvSpPr>
+          <p:nvPr>
+            <p:ph sz="half" idx="1"/>
+          </p:nvPr>
+        </p:nvSpPr>
+        <p:spPr>
+          <a:xfrm>
+            <a:off x="767371" y="1603420"/>
+            <a:ext cx="5181600" cy="4573543"/>
+          </a:xfrm>
+        </p:spPr>
+        <p:txBody>
+          <a:bodyPr/>
+          <a:lstStyle/>
+          <a:p>
+            <a:r>
+              <a:rPr lang="en-US" dirty="0"/>
+              <a:t>Status - </a:t>
+            </a:r>
+            <a:r>
+              <a:rPr lang="en-US" sz="2400" dirty="0">
+                <a:hlinkClick r:id="rId2"/>
+              </a:rPr>
+              <a:t>https://JimFawcett.github.io</a:t>
+            </a:r>
+            <a:r>
+              <a:rPr lang="en-US" sz="2400" dirty="0"/>
+              <a:t>: </a:t>
+            </a:r>
+            <a:endParaRPr lang="en-US" dirty="0"/>
+          </a:p>
+          <a:p>
+            <a:pPr lvl="1"/>
+            <a:r>
+              <a:rPr lang="en-US" dirty="0"/>
+              <a:t>Most of the structure described is in place</a:t>
+            </a:r>
+          </a:p>
+          <a:p>
+            <a:pPr lvl="1"/>
+            <a:r>
+              <a:rPr lang="en-US" dirty="0"/>
+              <a:t>More than 40 repositories of mostly C++ code are published</a:t>
+            </a:r>
+          </a:p>
+          <a:p>
+            <a:pPr lvl="1"/>
+            <a:r>
+              <a:rPr lang="en-US" dirty="0"/>
+              <a:t>Several stories are published</a:t>
+            </a:r>
+          </a:p>
+          <a:p>
+            <a:pPr lvl="1"/>
+            <a:r>
+              <a:rPr lang="en-US" dirty="0"/>
+              <a:t>Other resources and </a:t>
+            </a:r>
+            <a:r>
+              <a:rPr lang="en-US" dirty="0" err="1"/>
+              <a:t>CodeSnaps</a:t>
+            </a:r>
+            <a:r>
+              <a:rPr lang="en-US" dirty="0"/>
+              <a:t> are available from the site</a:t>
+            </a:r>
+          </a:p>
+          <a:p>
+            <a:r>
+              <a:rPr lang="en-US" dirty="0"/>
+              <a:t>Plans</a:t>
+            </a:r>
+          </a:p>
+          <a:p>
+            <a:pPr lvl="1"/>
+            <a:r>
+              <a:rPr lang="en-US" dirty="0"/>
+              <a:t>Install more code repositories</a:t>
+            </a:r>
+          </a:p>
+          <a:p>
+            <a:pPr lvl="1"/>
+            <a:r>
+              <a:rPr lang="en-US" dirty="0"/>
+              <a:t>Start to add videos</a:t>
+            </a:r>
+          </a:p>
+        </p:txBody>
+      </p:sp>
+      <p:sp>
+        <p:nvSpPr>
+          <p:cNvPr id="6" name="Content Placeholder 5">
+            <a:extLst>
+              <a:ext uri="{FF2B5EF4-FFF2-40B4-BE49-F238E27FC236}">
+                <a16:creationId xmlns:a16="http://schemas.microsoft.com/office/drawing/2014/main" id="{FE80FAEC-8AE9-4AB5-9C84-5EEDD2807033}"/>
+              </a:ext>
+            </a:extLst>
+          </p:cNvPr>
+          <p:cNvSpPr>
+            <a:spLocks noGrp="1"/>
+          </p:cNvSpPr>
+          <p:nvPr>
+            <p:ph sz="half" idx="2"/>
+          </p:nvPr>
+        </p:nvSpPr>
+        <p:spPr>
+          <a:xfrm>
+            <a:off x="6210834" y="1629163"/>
+            <a:ext cx="5181600" cy="5455746"/>
+          </a:xfrm>
+        </p:spPr>
+        <p:txBody>
+          <a:bodyPr/>
+          <a:lstStyle/>
+          <a:p>
+            <a:r>
+              <a:rPr lang="en-US" dirty="0"/>
+              <a:t>Conclusions:</a:t>
+            </a:r>
+          </a:p>
+          <a:p>
+            <a:pPr lvl="1"/>
+            <a:r>
+              <a:rPr lang="en-US" dirty="0"/>
+              <a:t>Static sites seem like a good tool for publishing</a:t>
+            </a:r>
+          </a:p>
+          <a:p>
+            <a:pPr lvl="2"/>
+            <a:r>
+              <a:rPr lang="en-US" dirty="0"/>
+              <a:t>Main issue is text or keyword </a:t>
+            </a:r>
+            <a:r>
+              <a:rPr lang="en-US" dirty="0" err="1"/>
+              <a:t>searchs</a:t>
+            </a:r>
+            <a:r>
+              <a:rPr lang="en-US" dirty="0"/>
+              <a:t> not available with static sites</a:t>
+            </a:r>
+          </a:p>
+          <a:p>
+            <a:pPr lvl="2"/>
+            <a:r>
+              <a:rPr lang="en-US" dirty="0"/>
+              <a:t>Can be addressed with local mirror and tools for synchronizing and local searching</a:t>
+            </a:r>
+          </a:p>
+          <a:p>
+            <a:pPr lvl="1"/>
+            <a:r>
+              <a:rPr lang="en-US" dirty="0"/>
+              <a:t>Required effort is reasonable for the expected payoff</a:t>
+            </a:r>
+          </a:p>
+          <a:p>
+            <a:pPr lvl="2"/>
+            <a:r>
+              <a:rPr lang="en-US" dirty="0"/>
+              <a:t>This site went from zero to current status in four months of my time</a:t>
+            </a:r>
+          </a:p>
+          <a:p>
+            <a:pPr lvl="2"/>
+            <a:r>
+              <a:rPr lang="en-US" dirty="0"/>
+              <a:t>However, I’ve built a site like this before.</a:t>
+            </a:r>
+          </a:p>
+        </p:txBody>
+      </p:sp>
+      <p:sp>
+        <p:nvSpPr>
+          <p:cNvPr id="4" name="Slide Number Placeholder 3">
+            <a:extLst>
+              <a:ext uri="{FF2B5EF4-FFF2-40B4-BE49-F238E27FC236}">
+                <a16:creationId xmlns:a16="http://schemas.microsoft.com/office/drawing/2014/main" id="{A5C2B86A-AE47-44AF-9978-587D3DAADB7B}"/>
+              </a:ext>
+            </a:extLst>
+          </p:cNvPr>
+          <p:cNvSpPr>
+            <a:spLocks noGrp="1"/>
+          </p:cNvSpPr>
+          <p:nvPr>
+            <p:ph type="sldNum" sz="quarter" idx="12"/>
+          </p:nvPr>
+        </p:nvSpPr>
+        <p:spPr/>
+        <p:txBody>
+          <a:bodyPr/>
+          <a:lstStyle/>
+          <a:p>
+            <a:fld id="{EDEBF0BA-A897-4C1E-AB3C-F330808C0E1D}" type="slidenum">
+              <a:rPr lang="en-US" smtClean="0"/>
+              <a:t>16</a:t>
+            </a:fld>
+            <a:endParaRPr lang="en-US"/>
+          </a:p>
+        </p:txBody>
+      </p:sp>
+    </p:spTree>
+    <p:extLst>
+      <p:ext uri="{BB962C8B-B14F-4D97-AF65-F5344CB8AC3E}">
+        <p14:creationId xmlns:p14="http://schemas.microsoft.com/office/powerpoint/2010/main" val="2191199278"/>
+      </p:ext>
+    </p:extLst>
+  </p:cSld>
+  <p:clrMapOvr>
+    <a:masterClrMapping/>
+  </p:clrMapOvr>
+</p:sld>
+</file>
+
+<file path=ppt/slides/slide17.xml><?xml version="1.0" encoding="utf-8"?>
+<p:sld xmlns:a="http://schemas.openxmlformats.org/drawingml/2006/main" xmlns:r="http://schemas.openxmlformats.org/officeDocument/2006/relationships" xmlns:p="http://schemas.openxmlformats.org/presentationml/2006/main">
+  <p:cSld>
+    <p:spTree>
+      <p:nvGrpSpPr>
+        <p:cNvPr id="1" name=""/>
+        <p:cNvGrpSpPr/>
+        <p:nvPr/>
+      </p:nvGrpSpPr>
+      <p:grpSpPr>
+        <a:xfrm>
+          <a:off x="0" y="0"/>
+          <a:ext cx="0" cy="0"/>
+          <a:chOff x="0" y="0"/>
+          <a:chExt cx="0" cy="0"/>
+        </a:xfrm>
+      </p:grpSpPr>
+      <p:sp>
+        <p:nvSpPr>
+          <p:cNvPr id="2" name="Title 1">
+            <a:extLst>
+              <a:ext uri="{FF2B5EF4-FFF2-40B4-BE49-F238E27FC236}">
+                <a16:creationId xmlns:a16="http://schemas.microsoft.com/office/drawing/2014/main" id="{508F2C2D-8A1E-4157-B36F-A4E30EAA74CE}"/>
+              </a:ext>
+            </a:extLst>
+          </p:cNvPr>
+          <p:cNvSpPr>
+            <a:spLocks noGrp="1"/>
+          </p:cNvSpPr>
+          <p:nvPr>
+            <p:ph type="ctrTitle"/>
+          </p:nvPr>
+        </p:nvSpPr>
+        <p:spPr/>
+        <p:txBody>
+          <a:bodyPr/>
+          <a:lstStyle/>
+          <a:p>
+            <a:r>
+              <a:rPr lang="en-US" dirty="0"/>
+              <a:t>Appendix - Domains</a:t>
+            </a:r>
+          </a:p>
+        </p:txBody>
+      </p:sp>
+    </p:spTree>
+    <p:extLst>
+      <p:ext uri="{BB962C8B-B14F-4D97-AF65-F5344CB8AC3E}">
+        <p14:creationId xmlns:p14="http://schemas.microsoft.com/office/powerpoint/2010/main" val="1857873718"/>
+      </p:ext>
+    </p:extLst>
+  </p:cSld>
+  <p:clrMapOvr>
+    <a:masterClrMapping/>
+  </p:clrMapOvr>
+</p:sld>
+</file>
+
+<file path=ppt/slides/slide18.xml><?xml version="1.0" encoding="utf-8"?>
+<p:sld xmlns:a="http://schemas.openxmlformats.org/drawingml/2006/main" xmlns:r="http://schemas.openxmlformats.org/officeDocument/2006/relationships" xmlns:p="http://schemas.openxmlformats.org/presentationml/2006/main">
+  <p:cSld>
+    <p:spTree>
+      <p:nvGrpSpPr>
+        <p:cNvPr id="1" name=""/>
+        <p:cNvGrpSpPr/>
+        <p:nvPr/>
+      </p:nvGrpSpPr>
+      <p:grpSpPr>
+        <a:xfrm>
+          <a:off x="0" y="0"/>
+          <a:ext cx="0" cy="0"/>
+          <a:chOff x="0" y="0"/>
+          <a:chExt cx="0" cy="0"/>
+        </a:xfrm>
+      </p:grpSpPr>
+      <p:sp>
+        <p:nvSpPr>
+          <p:cNvPr id="2" name="Title 1">
+            <a:extLst>
+              <a:ext uri="{FF2B5EF4-FFF2-40B4-BE49-F238E27FC236}">
                 <a16:creationId xmlns:a16="http://schemas.microsoft.com/office/drawing/2014/main" id="{C818CF9C-B350-4936-99E1-D89031958E0C}"/>
               </a:ext>
             </a:extLst>
@@ -4343,7 +6006,7 @@
           <a:p>
             <a:r>
               <a:rPr lang="en-US" dirty="0"/>
-              <a:t>Domain</a:t>
+              <a:t>Academic Research Domain</a:t>
             </a:r>
           </a:p>
         </p:txBody>
@@ -4378,81 +6041,64 @@
           <a:p>
             <a:r>
               <a:rPr lang="en-US" sz="2000" dirty="0"/>
-              <a:t>Open Source Development: 5 – 10 active developers, many casual contributors</a:t>
+              <a:t>Academic Research: 5 – 10 code developers</a:t>
             </a:r>
           </a:p>
           <a:p>
             <a:pPr lvl="1"/>
             <a:r>
               <a:rPr lang="en-US" sz="1800" dirty="0"/>
-              <a:t>Code life-time: 10 - 20 years</a:t>
+              <a:t>Code life-time: 3 – 5 years</a:t>
             </a:r>
           </a:p>
           <a:p>
             <a:pPr lvl="1"/>
             <a:r>
               <a:rPr lang="en-US" sz="1800" dirty="0"/>
-              <a:t>Example: Linux</a:t>
+              <a:t>Example: Natural Language Processing (NLP)</a:t>
             </a:r>
           </a:p>
           <a:p>
             <a:r>
               <a:rPr lang="en-US" sz="2000" dirty="0"/>
-              <a:t>Industrial Development: 5 – 10 developers</a:t>
+              <a:t>An academic researcher may have 2 or 3 doctoral candidates working on related parts of a research project.</a:t>
+            </a:r>
+          </a:p>
+          <a:p>
+            <a:r>
+              <a:rPr lang="en-US" sz="2000" dirty="0"/>
+              <a:t>She may collaborate with two or three colleagues, perhaps at different universities.</a:t>
             </a:r>
           </a:p>
           <a:p>
             <a:pPr lvl="1"/>
             <a:r>
               <a:rPr lang="en-US" sz="1800" dirty="0"/>
-              <a:t>Code life-time: 5 – 20 years</a:t>
-            </a:r>
-          </a:p>
-          <a:p>
-            <a:pPr lvl="1"/>
-            <a:r>
-              <a:rPr lang="en-US" sz="1800" dirty="0"/>
-              <a:t>Example: Machine Tool Control</a:t>
-            </a:r>
-          </a:p>
-          <a:p>
-            <a:r>
-              <a:rPr lang="en-US" sz="2000" dirty="0"/>
-              <a:t>Commercial Products: </a:t>
-            </a:r>
-          </a:p>
-          <a:p>
-            <a:pPr lvl="1"/>
-            <a:r>
-              <a:rPr lang="en-US" sz="1800" dirty="0"/>
-              <a:t>Code life-time: 20 – 30 years</a:t>
-            </a:r>
-          </a:p>
-          <a:p>
-            <a:pPr lvl="1"/>
-            <a:r>
-              <a:rPr lang="en-US" sz="1800" dirty="0"/>
-              <a:t>Example: Microsoft Word</a:t>
-            </a:r>
-          </a:p>
-          <a:p>
-            <a:r>
-              <a:rPr lang="en-US" sz="2000" dirty="0"/>
-              <a:t>Aerospace Programs: 5 – 200 developers</a:t>
-            </a:r>
-          </a:p>
-          <a:p>
-            <a:pPr lvl="1"/>
-            <a:r>
-              <a:rPr lang="en-US" sz="1600" dirty="0"/>
-              <a:t>Code life-time: 20 – 30 years</a:t>
-            </a:r>
-          </a:p>
-          <a:p>
-            <a:pPr lvl="1"/>
-            <a:r>
-              <a:rPr lang="en-US" sz="1600" dirty="0"/>
-              <a:t>Example: Submarine control, Area surveillance, ..</a:t>
+              <a:t>Each of those colleagues may have a similar team working on related projects.</a:t>
+            </a:r>
+          </a:p>
+          <a:p>
+            <a:r>
+              <a:rPr lang="en-US" sz="2200" dirty="0"/>
+              <a:t>There usually is continuing work on the same or related research projects for many years.</a:t>
+            </a:r>
+          </a:p>
+          <a:p>
+            <a:r>
+              <a:rPr lang="en-US" sz="2200" dirty="0"/>
+              <a:t>It is quite common that this work develops software tools for gathering and analyzing data.  Sometimes software is part of the end product, e.g., compilers for a new language, an architecture for streaming or classifying content, …</a:t>
+            </a:r>
+          </a:p>
+          <a:p>
+            <a:r>
+              <a:rPr lang="en-US" sz="2200" dirty="0"/>
+              <a:t>These software developments are rarely maintained well.  Often documentation is nothing but code and the papers that describe research results and mention the software as an aside.</a:t>
+            </a:r>
+          </a:p>
+          <a:p>
+            <a:r>
+              <a:rPr lang="en-US" sz="2200" dirty="0"/>
+              <a:t>Software exchange is often ad-hoc.</a:t>
             </a:r>
           </a:p>
         </p:txBody>
@@ -4462,7 +6108,7 @@
           <p:cNvPr id="4" name="Slide Number Placeholder 3">
             <a:extLst>
               <a:ext uri="{FF2B5EF4-FFF2-40B4-BE49-F238E27FC236}">
-                <a16:creationId xmlns:a16="http://schemas.microsoft.com/office/drawing/2014/main" id="{A916C694-BD83-42C9-A8AC-D048E61AD071}"/>
+                <a16:creationId xmlns:a16="http://schemas.microsoft.com/office/drawing/2014/main" id="{B11F232F-AB6D-4130-9246-6A1AF1E6451D}"/>
               </a:ext>
             </a:extLst>
           </p:cNvPr>
@@ -4480,7 +6126,7 @@
           <a:p>
             <a:fld id="{EDEBF0BA-A897-4C1E-AB3C-F330808C0E1D}" type="slidenum">
               <a:rPr lang="en-US" smtClean="0"/>
-              <a:t>12</a:t>
+              <a:t>18</a:t>
             </a:fld>
             <a:endParaRPr lang="en-US"/>
           </a:p>
@@ -4489,7 +6135,225 @@
     </p:spTree>
     <p:extLst>
       <p:ext uri="{BB962C8B-B14F-4D97-AF65-F5344CB8AC3E}">
-        <p14:creationId xmlns:p14="http://schemas.microsoft.com/office/powerpoint/2010/main" val="1744719603"/>
+        <p14:creationId xmlns:p14="http://schemas.microsoft.com/office/powerpoint/2010/main" val="3236624771"/>
+      </p:ext>
+    </p:extLst>
+  </p:cSld>
+  <p:clrMapOvr>
+    <a:masterClrMapping/>
+  </p:clrMapOvr>
+</p:sld>
+</file>
+
+<file path=ppt/slides/slide19.xml><?xml version="1.0" encoding="utf-8"?>
+<p:sld xmlns:a="http://schemas.openxmlformats.org/drawingml/2006/main" xmlns:r="http://schemas.openxmlformats.org/officeDocument/2006/relationships" xmlns:p="http://schemas.openxmlformats.org/presentationml/2006/main">
+  <p:cSld>
+    <p:spTree>
+      <p:nvGrpSpPr>
+        <p:cNvPr id="1" name=""/>
+        <p:cNvGrpSpPr/>
+        <p:nvPr/>
+      </p:nvGrpSpPr>
+      <p:grpSpPr>
+        <a:xfrm>
+          <a:off x="0" y="0"/>
+          <a:ext cx="0" cy="0"/>
+          <a:chOff x="0" y="0"/>
+          <a:chExt cx="0" cy="0"/>
+        </a:xfrm>
+      </p:grpSpPr>
+      <p:sp>
+        <p:nvSpPr>
+          <p:cNvPr id="2" name="Title 1">
+            <a:extLst>
+              <a:ext uri="{FF2B5EF4-FFF2-40B4-BE49-F238E27FC236}">
+                <a16:creationId xmlns:a16="http://schemas.microsoft.com/office/drawing/2014/main" id="{C818CF9C-B350-4936-99E1-D89031958E0C}"/>
+              </a:ext>
+            </a:extLst>
+          </p:cNvPr>
+          <p:cNvSpPr>
+            <a:spLocks noGrp="1"/>
+          </p:cNvSpPr>
+          <p:nvPr>
+            <p:ph type="title"/>
+          </p:nvPr>
+        </p:nvSpPr>
+        <p:spPr>
+          <a:xfrm>
+            <a:off x="838200" y="339367"/>
+            <a:ext cx="10515600" cy="678161"/>
+          </a:xfrm>
+        </p:spPr>
+        <p:txBody>
+          <a:bodyPr/>
+          <a:lstStyle/>
+          <a:p>
+            <a:r>
+              <a:rPr lang="en-US" dirty="0"/>
+              <a:t>Open Source Domain</a:t>
+            </a:r>
+          </a:p>
+        </p:txBody>
+      </p:sp>
+      <p:sp>
+        <p:nvSpPr>
+          <p:cNvPr id="3" name="Content Placeholder 2">
+            <a:extLst>
+              <a:ext uri="{FF2B5EF4-FFF2-40B4-BE49-F238E27FC236}">
+                <a16:creationId xmlns:a16="http://schemas.microsoft.com/office/drawing/2014/main" id="{C65F66DE-FE31-4539-83AE-36CA6E637596}"/>
+              </a:ext>
+            </a:extLst>
+          </p:cNvPr>
+          <p:cNvSpPr>
+            <a:spLocks noGrp="1"/>
+          </p:cNvSpPr>
+          <p:nvPr>
+            <p:ph idx="1"/>
+          </p:nvPr>
+        </p:nvSpPr>
+        <p:spPr>
+          <a:xfrm>
+            <a:off x="838200" y="1216909"/>
+            <a:ext cx="10515600" cy="5355770"/>
+          </a:xfrm>
+        </p:spPr>
+        <p:txBody>
+          <a:bodyPr>
+            <a:noAutofit/>
+          </a:bodyPr>
+          <a:lstStyle/>
+          <a:p>
+            <a:r>
+              <a:rPr lang="en-US" sz="2000" dirty="0"/>
+              <a:t>Open Source Development: 5 – 1000 active developers, many casual contributors</a:t>
+            </a:r>
+          </a:p>
+          <a:p>
+            <a:pPr lvl="1"/>
+            <a:r>
+              <a:rPr lang="en-US" sz="1800" dirty="0"/>
+              <a:t>Code life-time: 10 - 20 years</a:t>
+            </a:r>
+          </a:p>
+          <a:p>
+            <a:pPr lvl="1"/>
+            <a:r>
+              <a:rPr lang="en-US" sz="1800" dirty="0"/>
+              <a:t>Examples: Linux, Node.js, MongoDB</a:t>
+            </a:r>
+          </a:p>
+          <a:p>
+            <a:r>
+              <a:rPr lang="en-US" sz="2200" dirty="0"/>
+              <a:t>Following an initial period of development, a project often settles into a maintenance mode:</a:t>
+            </a:r>
+          </a:p>
+          <a:p>
+            <a:pPr lvl="1"/>
+            <a:r>
+              <a:rPr lang="en-US" sz="1800" dirty="0"/>
+              <a:t>Maintain the same mission and design.</a:t>
+            </a:r>
+          </a:p>
+          <a:p>
+            <a:pPr lvl="1"/>
+            <a:r>
+              <a:rPr lang="en-US" sz="1800" dirty="0"/>
+              <a:t>Add new features and port to new platforms.</a:t>
+            </a:r>
+          </a:p>
+          <a:p>
+            <a:r>
+              <a:rPr lang="en-US" sz="2200" dirty="0"/>
+              <a:t>Occasionally revise most of the code and support new missions.</a:t>
+            </a:r>
+          </a:p>
+          <a:p>
+            <a:r>
+              <a:rPr lang="en-US" sz="2200" dirty="0"/>
+              <a:t>Documentation varies from poor to outstanding.</a:t>
+            </a:r>
+          </a:p>
+          <a:p>
+            <a:pPr lvl="1"/>
+            <a:r>
+              <a:rPr lang="en-US" sz="1800" dirty="0"/>
+              <a:t>Linux documentation is one of the outstanding ones: </a:t>
+            </a:r>
+          </a:p>
+          <a:p>
+            <a:pPr lvl="2"/>
+            <a:r>
+              <a:rPr lang="en-US" sz="1400" dirty="0">
+                <a:hlinkClick r:id="rId2"/>
+              </a:rPr>
+              <a:t>https://www.kernel.org/doc/html/v4.10/index.html</a:t>
+            </a:r>
+            <a:r>
+              <a:rPr lang="en-US" sz="1400" dirty="0"/>
+              <a:t> </a:t>
+            </a:r>
+          </a:p>
+          <a:p>
+            <a:pPr lvl="1"/>
+            <a:r>
+              <a:rPr lang="en-US" sz="1800" dirty="0"/>
+              <a:t>Some projects focus on </a:t>
+            </a:r>
+            <a:r>
+              <a:rPr lang="en-US" sz="1800" dirty="0" err="1"/>
+              <a:t>api</a:t>
+            </a:r>
+            <a:r>
+              <a:rPr lang="en-US" sz="1800" dirty="0"/>
+              <a:t> level documentation – how to use the code.</a:t>
+            </a:r>
+          </a:p>
+          <a:p>
+            <a:pPr lvl="1"/>
+            <a:r>
+              <a:rPr lang="en-US" sz="1800" dirty="0"/>
+              <a:t>Some focus on maintenance – what are the parts, how are they related, code standards, …</a:t>
+            </a:r>
+          </a:p>
+          <a:p>
+            <a:endParaRPr lang="en-US" sz="2200" dirty="0"/>
+          </a:p>
+        </p:txBody>
+      </p:sp>
+      <p:sp>
+        <p:nvSpPr>
+          <p:cNvPr id="4" name="Slide Number Placeholder 3">
+            <a:extLst>
+              <a:ext uri="{FF2B5EF4-FFF2-40B4-BE49-F238E27FC236}">
+                <a16:creationId xmlns:a16="http://schemas.microsoft.com/office/drawing/2014/main" id="{322EE9A1-C48D-4BEF-9075-0B0169EC94DF}"/>
+              </a:ext>
+            </a:extLst>
+          </p:cNvPr>
+          <p:cNvSpPr>
+            <a:spLocks noGrp="1"/>
+          </p:cNvSpPr>
+          <p:nvPr>
+            <p:ph type="sldNum" sz="quarter" idx="12"/>
+          </p:nvPr>
+        </p:nvSpPr>
+        <p:spPr/>
+        <p:txBody>
+          <a:bodyPr/>
+          <a:lstStyle/>
+          <a:p>
+            <a:fld id="{EDEBF0BA-A897-4C1E-AB3C-F330808C0E1D}" type="slidenum">
+              <a:rPr lang="en-US" smtClean="0"/>
+              <a:t>19</a:t>
+            </a:fld>
+            <a:endParaRPr lang="en-US"/>
+          </a:p>
+        </p:txBody>
+      </p:sp>
+    </p:spTree>
+    <p:extLst>
+      <p:ext uri="{BB962C8B-B14F-4D97-AF65-F5344CB8AC3E}">
+        <p14:creationId xmlns:p14="http://schemas.microsoft.com/office/powerpoint/2010/main" val="891542893"/>
       </p:ext>
     </p:extLst>
   </p:cSld>
@@ -4711,6 +6575,746 @@
     <p:extLst>
       <p:ext uri="{BB962C8B-B14F-4D97-AF65-F5344CB8AC3E}">
         <p14:creationId xmlns:p14="http://schemas.microsoft.com/office/powerpoint/2010/main" val="3351627177"/>
+      </p:ext>
+    </p:extLst>
+  </p:cSld>
+  <p:clrMapOvr>
+    <a:masterClrMapping/>
+  </p:clrMapOvr>
+</p:sld>
+</file>
+
+<file path=ppt/slides/slide20.xml><?xml version="1.0" encoding="utf-8"?>
+<p:sld xmlns:a="http://schemas.openxmlformats.org/drawingml/2006/main" xmlns:r="http://schemas.openxmlformats.org/officeDocument/2006/relationships" xmlns:p="http://schemas.openxmlformats.org/presentationml/2006/main">
+  <p:cSld>
+    <p:spTree>
+      <p:nvGrpSpPr>
+        <p:cNvPr id="1" name=""/>
+        <p:cNvGrpSpPr/>
+        <p:nvPr/>
+      </p:nvGrpSpPr>
+      <p:grpSpPr>
+        <a:xfrm>
+          <a:off x="0" y="0"/>
+          <a:ext cx="0" cy="0"/>
+          <a:chOff x="0" y="0"/>
+          <a:chExt cx="0" cy="0"/>
+        </a:xfrm>
+      </p:grpSpPr>
+      <p:sp>
+        <p:nvSpPr>
+          <p:cNvPr id="2" name="Title 1">
+            <a:extLst>
+              <a:ext uri="{FF2B5EF4-FFF2-40B4-BE49-F238E27FC236}">
+                <a16:creationId xmlns:a16="http://schemas.microsoft.com/office/drawing/2014/main" id="{C818CF9C-B350-4936-99E1-D89031958E0C}"/>
+              </a:ext>
+            </a:extLst>
+          </p:cNvPr>
+          <p:cNvSpPr>
+            <a:spLocks noGrp="1"/>
+          </p:cNvSpPr>
+          <p:nvPr>
+            <p:ph type="title"/>
+          </p:nvPr>
+        </p:nvSpPr>
+        <p:spPr>
+          <a:xfrm>
+            <a:off x="838200" y="339367"/>
+            <a:ext cx="10515600" cy="678161"/>
+          </a:xfrm>
+        </p:spPr>
+        <p:txBody>
+          <a:bodyPr/>
+          <a:lstStyle/>
+          <a:p>
+            <a:r>
+              <a:rPr lang="en-US" dirty="0"/>
+              <a:t>Industrial Development Domain</a:t>
+            </a:r>
+          </a:p>
+        </p:txBody>
+      </p:sp>
+      <p:sp>
+        <p:nvSpPr>
+          <p:cNvPr id="3" name="Content Placeholder 2">
+            <a:extLst>
+              <a:ext uri="{FF2B5EF4-FFF2-40B4-BE49-F238E27FC236}">
+                <a16:creationId xmlns:a16="http://schemas.microsoft.com/office/drawing/2014/main" id="{C65F66DE-FE31-4539-83AE-36CA6E637596}"/>
+              </a:ext>
+            </a:extLst>
+          </p:cNvPr>
+          <p:cNvSpPr>
+            <a:spLocks noGrp="1"/>
+          </p:cNvSpPr>
+          <p:nvPr>
+            <p:ph idx="1"/>
+          </p:nvPr>
+        </p:nvSpPr>
+        <p:spPr>
+          <a:xfrm>
+            <a:off x="838200" y="1268569"/>
+            <a:ext cx="10515600" cy="5104730"/>
+          </a:xfrm>
+        </p:spPr>
+        <p:txBody>
+          <a:bodyPr>
+            <a:noAutofit/>
+          </a:bodyPr>
+          <a:lstStyle/>
+          <a:p>
+            <a:r>
+              <a:rPr lang="en-US" sz="2000" dirty="0"/>
+              <a:t>Industrial Development: 5 – 10 developers</a:t>
+            </a:r>
+          </a:p>
+          <a:p>
+            <a:pPr lvl="1"/>
+            <a:r>
+              <a:rPr lang="en-US" sz="1800" dirty="0"/>
+              <a:t>Code life-time: 5 – 20 years</a:t>
+            </a:r>
+          </a:p>
+          <a:p>
+            <a:pPr lvl="1"/>
+            <a:r>
+              <a:rPr lang="en-US" sz="1800" dirty="0"/>
+              <a:t>Example: Machine Tool Control</a:t>
+            </a:r>
+          </a:p>
+          <a:p>
+            <a:r>
+              <a:rPr lang="en-US" sz="2200" dirty="0"/>
+              <a:t>Code base starts with an initial product</a:t>
+            </a:r>
+          </a:p>
+          <a:p>
+            <a:r>
+              <a:rPr lang="en-US" sz="2200" dirty="0"/>
+              <a:t>New products start from that initial code</a:t>
+            </a:r>
+          </a:p>
+          <a:p>
+            <a:pPr lvl="1"/>
+            <a:r>
+              <a:rPr lang="en-US" sz="1800" dirty="0"/>
+              <a:t>Has a common code baseline been defined?</a:t>
+            </a:r>
+          </a:p>
+          <a:p>
+            <a:pPr lvl="1"/>
+            <a:r>
+              <a:rPr lang="en-US" sz="1800" dirty="0"/>
+              <a:t>Code reviews are held during development</a:t>
+            </a:r>
+          </a:p>
+          <a:p>
+            <a:pPr lvl="1"/>
+            <a:r>
+              <a:rPr lang="en-US" sz="1800" dirty="0"/>
+              <a:t>At product completion is code reviewed and refactored into reusable parts and product specific code?</a:t>
+            </a:r>
+          </a:p>
+          <a:p>
+            <a:pPr lvl="1"/>
+            <a:r>
+              <a:rPr lang="en-US" sz="1800" dirty="0"/>
+              <a:t>Is the organization willing to provide overhead effort to evolve the common code base?</a:t>
+            </a:r>
+          </a:p>
+        </p:txBody>
+      </p:sp>
+      <p:sp>
+        <p:nvSpPr>
+          <p:cNvPr id="4" name="Slide Number Placeholder 3">
+            <a:extLst>
+              <a:ext uri="{FF2B5EF4-FFF2-40B4-BE49-F238E27FC236}">
+                <a16:creationId xmlns:a16="http://schemas.microsoft.com/office/drawing/2014/main" id="{A916C694-BD83-42C9-A8AC-D048E61AD071}"/>
+              </a:ext>
+            </a:extLst>
+          </p:cNvPr>
+          <p:cNvSpPr>
+            <a:spLocks noGrp="1"/>
+          </p:cNvSpPr>
+          <p:nvPr>
+            <p:ph type="sldNum" sz="quarter" idx="12"/>
+          </p:nvPr>
+        </p:nvSpPr>
+        <p:spPr/>
+        <p:txBody>
+          <a:bodyPr/>
+          <a:lstStyle/>
+          <a:p>
+            <a:fld id="{EDEBF0BA-A897-4C1E-AB3C-F330808C0E1D}" type="slidenum">
+              <a:rPr lang="en-US" smtClean="0"/>
+              <a:t>20</a:t>
+            </a:fld>
+            <a:endParaRPr lang="en-US"/>
+          </a:p>
+        </p:txBody>
+      </p:sp>
+    </p:spTree>
+    <p:extLst>
+      <p:ext uri="{BB962C8B-B14F-4D97-AF65-F5344CB8AC3E}">
+        <p14:creationId xmlns:p14="http://schemas.microsoft.com/office/powerpoint/2010/main" val="1744719603"/>
+      </p:ext>
+    </p:extLst>
+  </p:cSld>
+  <p:clrMapOvr>
+    <a:masterClrMapping/>
+  </p:clrMapOvr>
+</p:sld>
+</file>
+
+<file path=ppt/slides/slide21.xml><?xml version="1.0" encoding="utf-8"?>
+<p:sld xmlns:a="http://schemas.openxmlformats.org/drawingml/2006/main" xmlns:r="http://schemas.openxmlformats.org/officeDocument/2006/relationships" xmlns:p="http://schemas.openxmlformats.org/presentationml/2006/main">
+  <p:cSld>
+    <p:spTree>
+      <p:nvGrpSpPr>
+        <p:cNvPr id="1" name=""/>
+        <p:cNvGrpSpPr/>
+        <p:nvPr/>
+      </p:nvGrpSpPr>
+      <p:grpSpPr>
+        <a:xfrm>
+          <a:off x="0" y="0"/>
+          <a:ext cx="0" cy="0"/>
+          <a:chOff x="0" y="0"/>
+          <a:chExt cx="0" cy="0"/>
+        </a:xfrm>
+      </p:grpSpPr>
+      <p:sp>
+        <p:nvSpPr>
+          <p:cNvPr id="2" name="Title 1">
+            <a:extLst>
+              <a:ext uri="{FF2B5EF4-FFF2-40B4-BE49-F238E27FC236}">
+                <a16:creationId xmlns:a16="http://schemas.microsoft.com/office/drawing/2014/main" id="{C818CF9C-B350-4936-99E1-D89031958E0C}"/>
+              </a:ext>
+            </a:extLst>
+          </p:cNvPr>
+          <p:cNvSpPr>
+            <a:spLocks noGrp="1"/>
+          </p:cNvSpPr>
+          <p:nvPr>
+            <p:ph type="title"/>
+          </p:nvPr>
+        </p:nvSpPr>
+        <p:spPr>
+          <a:xfrm>
+            <a:off x="838200" y="339367"/>
+            <a:ext cx="10515600" cy="678161"/>
+          </a:xfrm>
+        </p:spPr>
+        <p:txBody>
+          <a:bodyPr/>
+          <a:lstStyle/>
+          <a:p>
+            <a:r>
+              <a:rPr lang="en-US" dirty="0"/>
+              <a:t>Commercial Domain</a:t>
+            </a:r>
+          </a:p>
+        </p:txBody>
+      </p:sp>
+      <p:sp>
+        <p:nvSpPr>
+          <p:cNvPr id="3" name="Content Placeholder 2">
+            <a:extLst>
+              <a:ext uri="{FF2B5EF4-FFF2-40B4-BE49-F238E27FC236}">
+                <a16:creationId xmlns:a16="http://schemas.microsoft.com/office/drawing/2014/main" id="{C65F66DE-FE31-4539-83AE-36CA6E637596}"/>
+              </a:ext>
+            </a:extLst>
+          </p:cNvPr>
+          <p:cNvSpPr>
+            <a:spLocks noGrp="1"/>
+          </p:cNvSpPr>
+          <p:nvPr>
+            <p:ph idx="1"/>
+          </p:nvPr>
+        </p:nvSpPr>
+        <p:spPr>
+          <a:xfrm>
+            <a:off x="838200" y="1017529"/>
+            <a:ext cx="10515600" cy="5355770"/>
+          </a:xfrm>
+        </p:spPr>
+        <p:txBody>
+          <a:bodyPr>
+            <a:noAutofit/>
+          </a:bodyPr>
+          <a:lstStyle/>
+          <a:p>
+            <a:r>
+              <a:rPr lang="en-US" sz="2000" dirty="0"/>
+              <a:t>Commercial Products: </a:t>
+            </a:r>
+          </a:p>
+          <a:p>
+            <a:pPr lvl="1"/>
+            <a:r>
+              <a:rPr lang="en-US" sz="1800" dirty="0"/>
+              <a:t>Code life-time: 20 – 30 years</a:t>
+            </a:r>
+          </a:p>
+          <a:p>
+            <a:pPr lvl="1"/>
+            <a:r>
+              <a:rPr lang="en-US" sz="1800" dirty="0"/>
+              <a:t>Example: Microsoft Word</a:t>
+            </a:r>
+          </a:p>
+          <a:p>
+            <a:r>
+              <a:rPr lang="en-US" sz="2200" dirty="0"/>
+              <a:t>Product may start with code framework, standards, and a specification</a:t>
+            </a:r>
+          </a:p>
+          <a:p>
+            <a:pPr lvl="1"/>
+            <a:r>
+              <a:rPr lang="en-US" sz="1800" dirty="0"/>
+              <a:t>For Microsoft Office and many other products, the framework has been the Microsoft Component Object Model (COM)</a:t>
+            </a:r>
+          </a:p>
+          <a:p>
+            <a:pPr lvl="2"/>
+            <a:r>
+              <a:rPr lang="en-US" sz="1400" dirty="0"/>
+              <a:t>It appears that, moving forward, COM will be hidden with a wrapper technology - Windows </a:t>
+            </a:r>
+            <a:r>
+              <a:rPr lang="en-US" sz="1400" dirty="0" err="1"/>
+              <a:t>RunTime</a:t>
+            </a:r>
+            <a:r>
+              <a:rPr lang="en-US" sz="1400" dirty="0"/>
+              <a:t> (WinRT): </a:t>
+            </a:r>
+            <a:r>
+              <a:rPr lang="en-US" sz="1400" dirty="0">
+                <a:hlinkClick r:id="rId2"/>
+              </a:rPr>
+              <a:t>https://en.wikipedia.org/wiki/Windows_Runtime</a:t>
+            </a:r>
+            <a:r>
+              <a:rPr lang="en-US" sz="1400" dirty="0"/>
+              <a:t> </a:t>
+            </a:r>
+          </a:p>
+          <a:p>
+            <a:pPr lvl="1"/>
+            <a:r>
+              <a:rPr lang="en-US" sz="1800" dirty="0"/>
+              <a:t>Specification is developed by a Program Manager and reviewed by the development team</a:t>
+            </a:r>
+          </a:p>
+          <a:p>
+            <a:r>
+              <a:rPr lang="en-US" sz="2200" dirty="0"/>
+              <a:t>Microsoft has spent a lot of resources on documentation, with mixed results</a:t>
+            </a:r>
+          </a:p>
+          <a:p>
+            <a:pPr lvl="1"/>
+            <a:r>
+              <a:rPr lang="en-US" sz="1800" dirty="0"/>
+              <a:t>Executing a search in MSDN for WinRT results in 6,180,000 results.  </a:t>
+            </a:r>
+          </a:p>
+          <a:p>
+            <a:pPr lvl="1"/>
+            <a:r>
+              <a:rPr lang="en-US" sz="1800" dirty="0"/>
+              <a:t>That isn’t a useful query, it’s a data dump – in fairness, the results are prioritized</a:t>
+            </a:r>
+          </a:p>
+          <a:p>
+            <a:pPr lvl="1"/>
+            <a:r>
+              <a:rPr lang="en-US" sz="1800" dirty="0"/>
+              <a:t>It’s quite common that when you arrive at a useful documentation page you get partial results with the remainder often linked to many pages scattered over the vast reaches of MSDN</a:t>
+            </a:r>
+          </a:p>
+          <a:p>
+            <a:r>
+              <a:rPr lang="en-US" sz="2200" dirty="0"/>
+              <a:t>Indeed, there are many Microsoft technologies each with its own products, APIs, code examples.</a:t>
+            </a:r>
+          </a:p>
+          <a:p>
+            <a:pPr lvl="1"/>
+            <a:r>
+              <a:rPr lang="en-US" sz="1800" dirty="0"/>
+              <a:t>Some, like the </a:t>
+            </a:r>
+            <a:r>
+              <a:rPr lang="en-US" sz="1800" dirty="0" err="1"/>
+              <a:t>.Net</a:t>
+            </a:r>
+            <a:r>
+              <a:rPr lang="en-US" sz="1800" dirty="0"/>
+              <a:t> framework have outstanding organization and documentation.</a:t>
+            </a:r>
+          </a:p>
+          <a:p>
+            <a:pPr lvl="1"/>
+            <a:endParaRPr lang="en-US" sz="1800" dirty="0"/>
+          </a:p>
+        </p:txBody>
+      </p:sp>
+      <p:sp>
+        <p:nvSpPr>
+          <p:cNvPr id="4" name="Slide Number Placeholder 3">
+            <a:extLst>
+              <a:ext uri="{FF2B5EF4-FFF2-40B4-BE49-F238E27FC236}">
+                <a16:creationId xmlns:a16="http://schemas.microsoft.com/office/drawing/2014/main" id="{A916C694-BD83-42C9-A8AC-D048E61AD071}"/>
+              </a:ext>
+            </a:extLst>
+          </p:cNvPr>
+          <p:cNvSpPr>
+            <a:spLocks noGrp="1"/>
+          </p:cNvSpPr>
+          <p:nvPr>
+            <p:ph type="sldNum" sz="quarter" idx="12"/>
+          </p:nvPr>
+        </p:nvSpPr>
+        <p:spPr/>
+        <p:txBody>
+          <a:bodyPr/>
+          <a:lstStyle/>
+          <a:p>
+            <a:fld id="{EDEBF0BA-A897-4C1E-AB3C-F330808C0E1D}" type="slidenum">
+              <a:rPr lang="en-US" smtClean="0"/>
+              <a:t>21</a:t>
+            </a:fld>
+            <a:endParaRPr lang="en-US"/>
+          </a:p>
+        </p:txBody>
+      </p:sp>
+    </p:spTree>
+    <p:extLst>
+      <p:ext uri="{BB962C8B-B14F-4D97-AF65-F5344CB8AC3E}">
+        <p14:creationId xmlns:p14="http://schemas.microsoft.com/office/powerpoint/2010/main" val="1820564551"/>
+      </p:ext>
+    </p:extLst>
+  </p:cSld>
+  <p:clrMapOvr>
+    <a:masterClrMapping/>
+  </p:clrMapOvr>
+</p:sld>
+</file>
+
+<file path=ppt/slides/slide22.xml><?xml version="1.0" encoding="utf-8"?>
+<p:sld xmlns:a="http://schemas.openxmlformats.org/drawingml/2006/main" xmlns:r="http://schemas.openxmlformats.org/officeDocument/2006/relationships" xmlns:p="http://schemas.openxmlformats.org/presentationml/2006/main">
+  <p:cSld>
+    <p:spTree>
+      <p:nvGrpSpPr>
+        <p:cNvPr id="1" name=""/>
+        <p:cNvGrpSpPr/>
+        <p:nvPr/>
+      </p:nvGrpSpPr>
+      <p:grpSpPr>
+        <a:xfrm>
+          <a:off x="0" y="0"/>
+          <a:ext cx="0" cy="0"/>
+          <a:chOff x="0" y="0"/>
+          <a:chExt cx="0" cy="0"/>
+        </a:xfrm>
+      </p:grpSpPr>
+      <p:sp>
+        <p:nvSpPr>
+          <p:cNvPr id="2" name="Title 1">
+            <a:extLst>
+              <a:ext uri="{FF2B5EF4-FFF2-40B4-BE49-F238E27FC236}">
+                <a16:creationId xmlns:a16="http://schemas.microsoft.com/office/drawing/2014/main" id="{C818CF9C-B350-4936-99E1-D89031958E0C}"/>
+              </a:ext>
+            </a:extLst>
+          </p:cNvPr>
+          <p:cNvSpPr>
+            <a:spLocks noGrp="1"/>
+          </p:cNvSpPr>
+          <p:nvPr>
+            <p:ph type="title"/>
+          </p:nvPr>
+        </p:nvSpPr>
+        <p:spPr>
+          <a:xfrm>
+            <a:off x="838200" y="339367"/>
+            <a:ext cx="10515600" cy="529957"/>
+          </a:xfrm>
+        </p:spPr>
+        <p:txBody>
+          <a:bodyPr/>
+          <a:lstStyle/>
+          <a:p>
+            <a:r>
+              <a:rPr lang="en-US" dirty="0"/>
+              <a:t>Aerospace Domain</a:t>
+            </a:r>
+          </a:p>
+        </p:txBody>
+      </p:sp>
+      <p:sp>
+        <p:nvSpPr>
+          <p:cNvPr id="3" name="Content Placeholder 2">
+            <a:extLst>
+              <a:ext uri="{FF2B5EF4-FFF2-40B4-BE49-F238E27FC236}">
+                <a16:creationId xmlns:a16="http://schemas.microsoft.com/office/drawing/2014/main" id="{C65F66DE-FE31-4539-83AE-36CA6E637596}"/>
+              </a:ext>
+            </a:extLst>
+          </p:cNvPr>
+          <p:cNvSpPr>
+            <a:spLocks noGrp="1"/>
+          </p:cNvSpPr>
+          <p:nvPr>
+            <p:ph idx="1"/>
+          </p:nvPr>
+        </p:nvSpPr>
+        <p:spPr>
+          <a:xfrm>
+            <a:off x="838200" y="1017529"/>
+            <a:ext cx="10515600" cy="5355770"/>
+          </a:xfrm>
+        </p:spPr>
+        <p:txBody>
+          <a:bodyPr>
+            <a:noAutofit/>
+          </a:bodyPr>
+          <a:lstStyle/>
+          <a:p>
+            <a:r>
+              <a:rPr lang="en-US" sz="1800" dirty="0"/>
+              <a:t>Aerospace Programs: 5 – 200 developers</a:t>
+            </a:r>
+          </a:p>
+          <a:p>
+            <a:pPr lvl="1"/>
+            <a:r>
+              <a:rPr lang="en-US" sz="1400" dirty="0"/>
+              <a:t>Code life-time: 20 – 30 years</a:t>
+            </a:r>
+          </a:p>
+          <a:p>
+            <a:pPr lvl="1"/>
+            <a:r>
+              <a:rPr lang="en-US" sz="1400" dirty="0"/>
+              <a:t>Example: Submarine control, Area surveillance, ..</a:t>
+            </a:r>
+          </a:p>
+          <a:p>
+            <a:r>
+              <a:rPr lang="en-US" sz="1800" dirty="0"/>
+              <a:t>Development is product oriented, starting with an initial contract, and continuing for possibly many years of enhancements and new contracts that build on the existing product technology</a:t>
+            </a:r>
+          </a:p>
+          <a:p>
+            <a:r>
+              <a:rPr lang="en-US" sz="1800" dirty="0"/>
+              <a:t>An example is the development of area surveillance radar systems</a:t>
+            </a:r>
+          </a:p>
+          <a:p>
+            <a:pPr lvl="1"/>
+            <a:r>
+              <a:rPr lang="en-US" sz="1400" dirty="0"/>
+              <a:t>Typical lifetime of a radar system is 20 years</a:t>
+            </a:r>
+          </a:p>
+          <a:p>
+            <a:pPr lvl="2"/>
+            <a:r>
+              <a:rPr lang="en-US" sz="1100" dirty="0"/>
+              <a:t>The code has to be maintained over that lifetime, sometimes by the manufacturer, sometimes by the customer.</a:t>
+            </a:r>
+          </a:p>
+          <a:p>
+            <a:pPr lvl="1"/>
+            <a:r>
+              <a:rPr lang="en-US" sz="1400" dirty="0"/>
+              <a:t>Once an initial contract has been completed it is common for scores of contracts to be awarded for new versions of a successful product.</a:t>
+            </a:r>
+          </a:p>
+          <a:p>
+            <a:pPr lvl="2"/>
+            <a:r>
+              <a:rPr lang="en-US" sz="1100" dirty="0"/>
+              <a:t>Usually a large part of a new product based on an existing one will share a large fraction of its code</a:t>
+            </a:r>
+          </a:p>
+          <a:p>
+            <a:pPr lvl="2"/>
+            <a:r>
+              <a:rPr lang="en-US" sz="1100" dirty="0"/>
+              <a:t>In most cases the new contract requires new features and enhancements – the customer looks at the original and decides how to embellish</a:t>
+            </a:r>
+          </a:p>
+          <a:p>
+            <a:r>
+              <a:rPr lang="en-US" sz="1800" dirty="0"/>
+              <a:t>The Capability Maturity Model was developed beginning when the Air Force funded a study with the Software Engineering Institute.  Its intent is to encourage DoD contractors to develop and maintain a consistent process for creation of software. </a:t>
+            </a:r>
+          </a:p>
+          <a:p>
+            <a:pPr lvl="1"/>
+            <a:r>
+              <a:rPr lang="en-US" sz="1400" dirty="0">
+                <a:hlinkClick r:id="rId2"/>
+              </a:rPr>
+              <a:t>https://en.wikipedia.org/wiki/Capability_Maturity_Model</a:t>
+            </a:r>
+            <a:r>
+              <a:rPr lang="en-US" sz="1400" dirty="0"/>
+              <a:t> </a:t>
+            </a:r>
+          </a:p>
+          <a:p>
+            <a:pPr lvl="1"/>
+            <a:r>
+              <a:rPr lang="en-US" sz="1400" dirty="0"/>
+              <a:t>CMM provides guidelines, but it is a model and a yardstick for assessing capability of contractors</a:t>
+            </a:r>
+          </a:p>
+          <a:p>
+            <a:pPr lvl="1"/>
+            <a:r>
+              <a:rPr lang="en-US" sz="1400" dirty="0"/>
+              <a:t>It does not provide specifics for tools and techniques that support reuse</a:t>
+            </a:r>
+          </a:p>
+          <a:p>
+            <a:pPr lvl="1"/>
+            <a:endParaRPr lang="en-US" sz="1400" dirty="0"/>
+          </a:p>
+          <a:p>
+            <a:pPr lvl="1"/>
+            <a:endParaRPr lang="en-US" sz="1400" dirty="0"/>
+          </a:p>
+        </p:txBody>
+      </p:sp>
+      <p:sp>
+        <p:nvSpPr>
+          <p:cNvPr id="4" name="Slide Number Placeholder 3">
+            <a:extLst>
+              <a:ext uri="{FF2B5EF4-FFF2-40B4-BE49-F238E27FC236}">
+                <a16:creationId xmlns:a16="http://schemas.microsoft.com/office/drawing/2014/main" id="{A916C694-BD83-42C9-A8AC-D048E61AD071}"/>
+              </a:ext>
+            </a:extLst>
+          </p:cNvPr>
+          <p:cNvSpPr>
+            <a:spLocks noGrp="1"/>
+          </p:cNvSpPr>
+          <p:nvPr>
+            <p:ph type="sldNum" sz="quarter" idx="12"/>
+          </p:nvPr>
+        </p:nvSpPr>
+        <p:spPr/>
+        <p:txBody>
+          <a:bodyPr/>
+          <a:lstStyle/>
+          <a:p>
+            <a:fld id="{EDEBF0BA-A897-4C1E-AB3C-F330808C0E1D}" type="slidenum">
+              <a:rPr lang="en-US" smtClean="0"/>
+              <a:t>22</a:t>
+            </a:fld>
+            <a:endParaRPr lang="en-US"/>
+          </a:p>
+        </p:txBody>
+      </p:sp>
+    </p:spTree>
+    <p:extLst>
+      <p:ext uri="{BB962C8B-B14F-4D97-AF65-F5344CB8AC3E}">
+        <p14:creationId xmlns:p14="http://schemas.microsoft.com/office/powerpoint/2010/main" val="3738534843"/>
+      </p:ext>
+    </p:extLst>
+  </p:cSld>
+  <p:clrMapOvr>
+    <a:masterClrMapping/>
+  </p:clrMapOvr>
+</p:sld>
+</file>
+
+<file path=ppt/slides/slide23.xml><?xml version="1.0" encoding="utf-8"?>
+<p:sld xmlns:a="http://schemas.openxmlformats.org/drawingml/2006/main" xmlns:r="http://schemas.openxmlformats.org/officeDocument/2006/relationships" xmlns:p="http://schemas.openxmlformats.org/presentationml/2006/main">
+  <p:cSld>
+    <p:spTree>
+      <p:nvGrpSpPr>
+        <p:cNvPr id="1" name=""/>
+        <p:cNvGrpSpPr/>
+        <p:nvPr/>
+      </p:nvGrpSpPr>
+      <p:grpSpPr>
+        <a:xfrm>
+          <a:off x="0" y="0"/>
+          <a:ext cx="0" cy="0"/>
+          <a:chOff x="0" y="0"/>
+          <a:chExt cx="0" cy="0"/>
+        </a:xfrm>
+      </p:grpSpPr>
+      <p:sp>
+        <p:nvSpPr>
+          <p:cNvPr id="2" name="Title 1">
+            <a:extLst>
+              <a:ext uri="{FF2B5EF4-FFF2-40B4-BE49-F238E27FC236}">
+                <a16:creationId xmlns:a16="http://schemas.microsoft.com/office/drawing/2014/main" id="{4E9D22A6-D52F-42FB-B419-4D8F5EA420AF}"/>
+              </a:ext>
+            </a:extLst>
+          </p:cNvPr>
+          <p:cNvSpPr>
+            <a:spLocks noGrp="1"/>
+          </p:cNvSpPr>
+          <p:nvPr>
+            <p:ph type="title"/>
+          </p:nvPr>
+        </p:nvSpPr>
+        <p:spPr>
+          <a:xfrm>
+            <a:off x="1706450" y="1709739"/>
+            <a:ext cx="9640999" cy="2218318"/>
+          </a:xfrm>
+        </p:spPr>
+        <p:txBody>
+          <a:bodyPr/>
+          <a:lstStyle/>
+          <a:p>
+            <a:r>
+              <a:rPr lang="en-US" dirty="0"/>
+              <a:t>That’s all Folks!</a:t>
+            </a:r>
+          </a:p>
+        </p:txBody>
+      </p:sp>
+      <p:sp>
+        <p:nvSpPr>
+          <p:cNvPr id="4" name="Slide Number Placeholder 3">
+            <a:extLst>
+              <a:ext uri="{FF2B5EF4-FFF2-40B4-BE49-F238E27FC236}">
+                <a16:creationId xmlns:a16="http://schemas.microsoft.com/office/drawing/2014/main" id="{588E7465-2093-4484-BD7C-017C8887C436}"/>
+              </a:ext>
+            </a:extLst>
+          </p:cNvPr>
+          <p:cNvSpPr>
+            <a:spLocks noGrp="1"/>
+          </p:cNvSpPr>
+          <p:nvPr>
+            <p:ph type="sldNum" sz="quarter" idx="12"/>
+          </p:nvPr>
+        </p:nvSpPr>
+        <p:spPr/>
+        <p:txBody>
+          <a:bodyPr/>
+          <a:lstStyle/>
+          <a:p>
+            <a:fld id="{EDEBF0BA-A897-4C1E-AB3C-F330808C0E1D}" type="slidenum">
+              <a:rPr lang="en-US" smtClean="0"/>
+              <a:t>23</a:t>
+            </a:fld>
+            <a:endParaRPr lang="en-US"/>
+          </a:p>
+        </p:txBody>
+      </p:sp>
+    </p:spTree>
+    <p:extLst>
+      <p:ext uri="{BB962C8B-B14F-4D97-AF65-F5344CB8AC3E}">
+        <p14:creationId xmlns:p14="http://schemas.microsoft.com/office/powerpoint/2010/main" val="1866960133"/>
       </p:ext>
     </p:extLst>
   </p:cSld>
@@ -5022,7 +7626,7 @@
         </p:nvSpPr>
         <p:spPr>
           <a:xfrm>
-            <a:off x="1236372" y="4198513"/>
+            <a:off x="1236372" y="4114806"/>
             <a:ext cx="8178084" cy="1867436"/>
           </a:xfrm>
           <a:prstGeom prst="rect">
@@ -5125,7 +7729,7 @@
         </p:nvSpPr>
         <p:spPr>
           <a:xfrm>
-            <a:off x="838200" y="1701209"/>
+            <a:off x="838200" y="1546862"/>
             <a:ext cx="10515600" cy="4719953"/>
           </a:xfrm>
         </p:spPr>
@@ -5156,7 +7760,7 @@
             <a:pPr lvl="1"/>
             <a:r>
               <a:rPr lang="en-US" dirty="0"/>
-              <a:t>For repositories with hundreds of components that is not trivial</a:t>
+              <a:t>For repositories with hundreds of components, that is not trivial</a:t>
             </a:r>
           </a:p>
           <a:p>
@@ -5164,6 +7768,14 @@
               <a:rPr lang="en-US" dirty="0"/>
               <a:t>The main issues are:</a:t>
             </a:r>
+            <a:br>
+              <a:rPr lang="en-US" sz="2400" dirty="0"/>
+            </a:br>
+            <a:r>
+              <a:rPr lang="en-US" sz="600" dirty="0"/>
+              <a:t> </a:t>
+            </a:r>
+            <a:endParaRPr lang="en-US" dirty="0"/>
           </a:p>
           <a:p>
             <a:pPr lvl="1"/>
@@ -5436,7 +8048,7 @@
           <p:cNvPr id="2" name="Title 1">
             <a:extLst>
               <a:ext uri="{FF2B5EF4-FFF2-40B4-BE49-F238E27FC236}">
-                <a16:creationId xmlns:a16="http://schemas.microsoft.com/office/drawing/2014/main" id="{7B9AA4E2-8439-499E-8E09-B7B92D39946D}"/>
+                <a16:creationId xmlns:a16="http://schemas.microsoft.com/office/drawing/2014/main" id="{F1B24BBB-0213-4D00-88F7-E56C4B74D226}"/>
               </a:ext>
             </a:extLst>
           </p:cNvPr>
@@ -5454,7 +8066,7 @@
           <a:p>
             <a:r>
               <a:rPr lang="en-US" dirty="0"/>
-              <a:t>Publishing Code for (Re)use</a:t>
+              <a:t>Software Reuse</a:t>
             </a:r>
           </a:p>
         </p:txBody>
@@ -5464,7 +8076,7 @@
           <p:cNvPr id="3" name="Content Placeholder 2">
             <a:extLst>
               <a:ext uri="{FF2B5EF4-FFF2-40B4-BE49-F238E27FC236}">
-                <a16:creationId xmlns:a16="http://schemas.microsoft.com/office/drawing/2014/main" id="{52CCEAD5-80CD-43AC-9D2F-18A29BD5B9E1}"/>
+                <a16:creationId xmlns:a16="http://schemas.microsoft.com/office/drawing/2014/main" id="{FEA0B531-7F0B-4322-A722-D55B7801E94D}"/>
               </a:ext>
             </a:extLst>
           </p:cNvPr>
@@ -5475,85 +8087,98 @@
             <p:ph idx="1"/>
           </p:nvPr>
         </p:nvSpPr>
-        <p:spPr/>
-        <p:txBody>
-          <a:bodyPr/>
-          <a:lstStyle/>
-          <a:p>
-            <a:pPr>
-              <a:lnSpc>
-                <a:spcPct val="100000"/>
-              </a:lnSpc>
+        <p:spPr>
+          <a:xfrm>
+            <a:off x="838200" y="1390918"/>
+            <a:ext cx="10515600" cy="4605741"/>
+          </a:xfrm>
+        </p:spPr>
+        <p:txBody>
+          <a:bodyPr/>
+          <a:lstStyle/>
+          <a:p>
+            <a:r>
+              <a:rPr lang="en-US" dirty="0"/>
+              <a:t>Reuse of compiler libraries has been spectacularly successful</a:t>
+            </a:r>
+          </a:p>
+          <a:p>
+            <a:pPr lvl="1"/>
+            <a:r>
+              <a:rPr lang="en-US" dirty="0"/>
+              <a:t>Each language defines a set of libraries that support building projects</a:t>
+            </a:r>
+          </a:p>
+          <a:p>
+            <a:pPr lvl="1"/>
+            <a:r>
+              <a:rPr lang="en-US" dirty="0"/>
+              <a:t>Updated with each new standardization of the language.</a:t>
+            </a:r>
+          </a:p>
+          <a:p>
+            <a:pPr marL="457200" lvl="1" indent="0">
+              <a:buNone/>
             </a:pPr>
             <a:r>
-              <a:rPr lang="en-US" dirty="0"/>
-              <a:t>Publishing some code artifact is the act of making it available, in useable form.</a:t>
-            </a:r>
-          </a:p>
-          <a:p>
-            <a:pPr>
-              <a:lnSpc>
-                <a:spcPct val="150000"/>
-              </a:lnSpc>
-            </a:pPr>
-            <a:r>
-              <a:rPr lang="en-US" dirty="0"/>
-              <a:t>Five main facets:</a:t>
-            </a:r>
-          </a:p>
-          <a:p>
-            <a:pPr lvl="1">
-              <a:lnSpc>
-                <a:spcPct val="100000"/>
-              </a:lnSpc>
-            </a:pPr>
-            <a:r>
-              <a:rPr lang="en-US" dirty="0"/>
-              <a:t>Containment</a:t>
-            </a:r>
-          </a:p>
-          <a:p>
-            <a:pPr lvl="1">
-              <a:lnSpc>
-                <a:spcPct val="100000"/>
-              </a:lnSpc>
-            </a:pPr>
-            <a:r>
-              <a:rPr lang="en-US" dirty="0"/>
-              <a:t>Delivery</a:t>
-            </a:r>
-          </a:p>
-          <a:p>
-            <a:pPr lvl="1">
-              <a:lnSpc>
-                <a:spcPct val="100000"/>
-              </a:lnSpc>
-            </a:pPr>
-            <a:r>
-              <a:rPr lang="en-US" dirty="0"/>
-              <a:t>Location</a:t>
-            </a:r>
-          </a:p>
-          <a:p>
-            <a:pPr lvl="1">
-              <a:lnSpc>
-                <a:spcPct val="100000"/>
-              </a:lnSpc>
-            </a:pPr>
-            <a:r>
-              <a:rPr lang="en-US" dirty="0"/>
-              <a:t>Interpretation</a:t>
-            </a:r>
-          </a:p>
-          <a:p>
-            <a:pPr lvl="1">
-              <a:lnSpc>
-                <a:spcPct val="100000"/>
-              </a:lnSpc>
-            </a:pPr>
-            <a:r>
-              <a:rPr lang="en-US" dirty="0"/>
-              <a:t>Quality Control</a:t>
+              <a:rPr lang="en-US" sz="300" dirty="0"/>
+              <a:t> </a:t>
+            </a:r>
+            <a:endParaRPr lang="en-US" dirty="0"/>
+          </a:p>
+          <a:p>
+            <a:r>
+              <a:rPr lang="en-US" dirty="0"/>
+              <a:t>Software reuse in the academic, industrial, and commercial domains has been disappointing</a:t>
+            </a:r>
+          </a:p>
+          <a:p>
+            <a:pPr lvl="1"/>
+            <a:r>
+              <a:rPr lang="en-US" dirty="0"/>
+              <a:t>Typical use is:</a:t>
+            </a:r>
+          </a:p>
+          <a:p>
+            <a:pPr lvl="2"/>
+            <a:r>
+              <a:rPr lang="en-US" dirty="0"/>
+              <a:t>Grab the last relevant project(s)</a:t>
+            </a:r>
+          </a:p>
+          <a:p>
+            <a:pPr lvl="2"/>
+            <a:r>
+              <a:rPr lang="en-US" dirty="0"/>
+              <a:t>Attempt to throw away the unneeded parts</a:t>
+            </a:r>
+          </a:p>
+          <a:p>
+            <a:pPr lvl="3"/>
+            <a:r>
+              <a:rPr lang="en-US" dirty="0"/>
+              <a:t>Sometimes we keep unneeded parts because too much breaks if we remove</a:t>
+            </a:r>
+          </a:p>
+          <a:p>
+            <a:pPr lvl="3"/>
+            <a:r>
+              <a:rPr lang="en-US" dirty="0"/>
+              <a:t>That causes maintenance problems</a:t>
+            </a:r>
+          </a:p>
+          <a:p>
+            <a:pPr lvl="2"/>
+            <a:r>
+              <a:rPr lang="en-US" dirty="0"/>
+              <a:t>Add needed new parts</a:t>
+            </a:r>
+          </a:p>
+          <a:p>
+            <a:pPr lvl="2"/>
+            <a:r>
+              <a:rPr lang="en-US" dirty="0"/>
+              <a:t>Spend a lot of time fixing breakage</a:t>
             </a:r>
           </a:p>
         </p:txBody>
@@ -5563,7 +8188,7 @@
           <p:cNvPr id="4" name="Slide Number Placeholder 3">
             <a:extLst>
               <a:ext uri="{FF2B5EF4-FFF2-40B4-BE49-F238E27FC236}">
-                <a16:creationId xmlns:a16="http://schemas.microsoft.com/office/drawing/2014/main" id="{0E7EA502-B1E7-4DB5-B94A-0DBA481132A4}"/>
+                <a16:creationId xmlns:a16="http://schemas.microsoft.com/office/drawing/2014/main" id="{0D37066F-B2B3-4651-BDC8-5D880CC57D1C}"/>
               </a:ext>
             </a:extLst>
           </p:cNvPr>
@@ -5590,7 +8215,7 @@
     </p:spTree>
     <p:extLst>
       <p:ext uri="{BB962C8B-B14F-4D97-AF65-F5344CB8AC3E}">
-        <p14:creationId xmlns:p14="http://schemas.microsoft.com/office/powerpoint/2010/main" val="4268696743"/>
+        <p14:creationId xmlns:p14="http://schemas.microsoft.com/office/powerpoint/2010/main" val="2182629184"/>
       </p:ext>
     </p:extLst>
   </p:cSld>
@@ -5622,7 +8247,7 @@
           <p:cNvPr id="2" name="Title 1">
             <a:extLst>
               <a:ext uri="{FF2B5EF4-FFF2-40B4-BE49-F238E27FC236}">
-                <a16:creationId xmlns:a16="http://schemas.microsoft.com/office/drawing/2014/main" id="{B4725340-475B-4911-AC68-3E9A7FF99896}"/>
+                <a16:creationId xmlns:a16="http://schemas.microsoft.com/office/drawing/2014/main" id="{7B9AA4E2-8439-499E-8E09-B7B92D39946D}"/>
               </a:ext>
             </a:extLst>
           </p:cNvPr>
@@ -5640,7 +8265,7 @@
           <a:p>
             <a:r>
               <a:rPr lang="en-US" dirty="0"/>
-              <a:t>The Issues</a:t>
+              <a:t>Publishing Code for (Re)use</a:t>
             </a:r>
           </a:p>
         </p:txBody>
@@ -5650,7 +8275,7 @@
           <p:cNvPr id="3" name="Content Placeholder 2">
             <a:extLst>
               <a:ext uri="{FF2B5EF4-FFF2-40B4-BE49-F238E27FC236}">
-                <a16:creationId xmlns:a16="http://schemas.microsoft.com/office/drawing/2014/main" id="{D28EEC85-0147-4609-8EA7-C7AE355F5329}"/>
+                <a16:creationId xmlns:a16="http://schemas.microsoft.com/office/drawing/2014/main" id="{52CCEAD5-80CD-43AC-9D2F-18A29BD5B9E1}"/>
               </a:ext>
             </a:extLst>
           </p:cNvPr>
@@ -5663,13 +8288,35 @@
         </p:nvSpPr>
         <p:spPr>
           <a:xfrm>
-            <a:off x="838200" y="1390918"/>
-            <a:ext cx="10515600" cy="4786045"/>
+            <a:off x="838200" y="1339403"/>
+            <a:ext cx="10515600" cy="4734530"/>
           </a:xfrm>
         </p:spPr>
         <p:txBody>
           <a:bodyPr/>
           <a:lstStyle/>
+          <a:p>
+            <a:pPr>
+              <a:lnSpc>
+                <a:spcPct val="100000"/>
+              </a:lnSpc>
+            </a:pPr>
+            <a:r>
+              <a:rPr lang="en-US" dirty="0"/>
+              <a:t>The goal of this site is to improve that process by publishing code in an effective way</a:t>
+            </a:r>
+          </a:p>
+          <a:p>
+            <a:pPr>
+              <a:lnSpc>
+                <a:spcPct val="100000"/>
+              </a:lnSpc>
+            </a:pPr>
+            <a:r>
+              <a:rPr lang="en-US" dirty="0"/>
+              <a:t>Publishing some code artifact is the act of making it available, in usable form.</a:t>
+            </a:r>
+          </a:p>
           <a:p>
             <a:pPr>
               <a:lnSpc>
@@ -5678,7 +8325,7 @@
             </a:pPr>
             <a:r>
               <a:rPr lang="en-US" dirty="0"/>
-              <a:t>Source code containment and delivery are solved problems</a:t>
+              <a:t>Five main facets:</a:t>
             </a:r>
           </a:p>
           <a:p>
@@ -5689,26 +8336,7 @@
             </a:pPr>
             <a:r>
               <a:rPr lang="en-US" dirty="0"/>
-              <a:t>Cloud-based facilities like </a:t>
-            </a:r>
-            <a:r>
-              <a:rPr lang="en-US" dirty="0" err="1"/>
-              <a:t>github</a:t>
-            </a:r>
-            <a:r>
-              <a:rPr lang="en-US" dirty="0"/>
-              <a:t> do that very well</a:t>
-            </a:r>
-          </a:p>
-          <a:p>
-            <a:pPr>
-              <a:lnSpc>
-                <a:spcPct val="150000"/>
-              </a:lnSpc>
-            </a:pPr>
-            <a:r>
-              <a:rPr lang="en-US" dirty="0"/>
-              <a:t>The issues are finding and understanding code relevant to a need</a:t>
+              <a:t>Containment</a:t>
             </a:r>
           </a:p>
           <a:p>
@@ -5719,7 +8347,7 @@
             </a:pPr>
             <a:r>
               <a:rPr lang="en-US" dirty="0"/>
-              <a:t>We want most code repositories to be large – to support broad reuse</a:t>
+              <a:t>Delivery</a:t>
             </a:r>
           </a:p>
           <a:p>
@@ -5730,18 +8358,7 @@
             </a:pPr>
             <a:r>
               <a:rPr lang="en-US" dirty="0"/>
-              <a:t>How do we find, in a large repository, code that fills some need?</a:t>
-            </a:r>
-          </a:p>
-          <a:p>
-            <a:pPr>
-              <a:lnSpc>
-                <a:spcPct val="100000"/>
-              </a:lnSpc>
-            </a:pPr>
-            <a:r>
-              <a:rPr lang="en-US" dirty="0"/>
-              <a:t>Website documentation, collocated with source code, is a good option</a:t>
+              <a:t>Location</a:t>
             </a:r>
           </a:p>
           <a:p>
@@ -5752,7 +8369,18 @@
             </a:pPr>
             <a:r>
               <a:rPr lang="en-US" dirty="0"/>
-              <a:t>To support both salvage and reuse documentation needs to provide information about the component’s concept, design, and typical use</a:t>
+              <a:t>Interpretation</a:t>
+            </a:r>
+          </a:p>
+          <a:p>
+            <a:pPr lvl="1">
+              <a:lnSpc>
+                <a:spcPct val="100000"/>
+              </a:lnSpc>
+            </a:pPr>
+            <a:r>
+              <a:rPr lang="en-US" dirty="0"/>
+              <a:t>Quality Control</a:t>
             </a:r>
           </a:p>
         </p:txBody>
@@ -5762,7 +8390,7 @@
           <p:cNvPr id="4" name="Slide Number Placeholder 3">
             <a:extLst>
               <a:ext uri="{FF2B5EF4-FFF2-40B4-BE49-F238E27FC236}">
-                <a16:creationId xmlns:a16="http://schemas.microsoft.com/office/drawing/2014/main" id="{B69DD603-6CCB-4044-86D9-1197C687F477}"/>
+                <a16:creationId xmlns:a16="http://schemas.microsoft.com/office/drawing/2014/main" id="{0E7EA502-B1E7-4DB5-B94A-0DBA481132A4}"/>
               </a:ext>
             </a:extLst>
           </p:cNvPr>
@@ -5789,7 +8417,7 @@
     </p:spTree>
     <p:extLst>
       <p:ext uri="{BB962C8B-B14F-4D97-AF65-F5344CB8AC3E}">
-        <p14:creationId xmlns:p14="http://schemas.microsoft.com/office/powerpoint/2010/main" val="1974146755"/>
+        <p14:creationId xmlns:p14="http://schemas.microsoft.com/office/powerpoint/2010/main" val="4268696743"/>
       </p:ext>
     </p:extLst>
   </p:cSld>
@@ -5821,7 +8449,7 @@
           <p:cNvPr id="2" name="Title 1">
             <a:extLst>
               <a:ext uri="{FF2B5EF4-FFF2-40B4-BE49-F238E27FC236}">
-                <a16:creationId xmlns:a16="http://schemas.microsoft.com/office/drawing/2014/main" id="{B5D3CA25-160B-4B16-981E-1259FF9C54AA}"/>
+                <a16:creationId xmlns:a16="http://schemas.microsoft.com/office/drawing/2014/main" id="{B4725340-475B-4911-AC68-3E9A7FF99896}"/>
               </a:ext>
             </a:extLst>
           </p:cNvPr>
@@ -5839,7 +8467,7 @@
           <a:p>
             <a:r>
               <a:rPr lang="en-US" dirty="0"/>
-              <a:t>Website for Publishing Reusable Components</a:t>
+              <a:t>The Issues</a:t>
             </a:r>
           </a:p>
         </p:txBody>
@@ -5849,7 +8477,7 @@
           <p:cNvPr id="3" name="Content Placeholder 2">
             <a:extLst>
               <a:ext uri="{FF2B5EF4-FFF2-40B4-BE49-F238E27FC236}">
-                <a16:creationId xmlns:a16="http://schemas.microsoft.com/office/drawing/2014/main" id="{51D4E0A7-5491-48A3-8C75-90DDBA9ED838}"/>
+                <a16:creationId xmlns:a16="http://schemas.microsoft.com/office/drawing/2014/main" id="{D28EEC85-0147-4609-8EA7-C7AE355F5329}"/>
               </a:ext>
             </a:extLst>
           </p:cNvPr>
@@ -5860,78 +8488,98 @@
             <p:ph idx="1"/>
           </p:nvPr>
         </p:nvSpPr>
-        <p:spPr/>
-        <p:txBody>
-          <a:bodyPr/>
-          <a:lstStyle/>
-          <a:p>
-            <a:r>
-              <a:rPr lang="en-US" dirty="0"/>
-              <a:t>A site for publishing source code will need:</a:t>
-            </a:r>
-          </a:p>
-          <a:p>
-            <a:pPr lvl="1"/>
-            <a:r>
-              <a:rPr lang="en-US" dirty="0"/>
-              <a:t>A structure for holding organized collections of code</a:t>
-            </a:r>
-          </a:p>
-          <a:p>
-            <a:pPr lvl="1"/>
-            <a:r>
-              <a:rPr lang="en-US" dirty="0"/>
-              <a:t>Documentation for each component</a:t>
-            </a:r>
-          </a:p>
-          <a:p>
-            <a:pPr lvl="2"/>
-            <a:r>
-              <a:rPr lang="en-US" dirty="0"/>
-              <a:t>Concept, Design, </a:t>
+        <p:spPr>
+          <a:xfrm>
+            <a:off x="838200" y="1390918"/>
+            <a:ext cx="10515600" cy="4786045"/>
+          </a:xfrm>
+        </p:spPr>
+        <p:txBody>
+          <a:bodyPr/>
+          <a:lstStyle/>
+          <a:p>
+            <a:pPr>
+              <a:lnSpc>
+                <a:spcPct val="150000"/>
+              </a:lnSpc>
+            </a:pPr>
+            <a:r>
+              <a:rPr lang="en-US" dirty="0"/>
+              <a:t>Source code containment and delivery are solved problems</a:t>
+            </a:r>
+          </a:p>
+          <a:p>
+            <a:pPr lvl="1">
+              <a:lnSpc>
+                <a:spcPct val="100000"/>
+              </a:lnSpc>
+            </a:pPr>
+            <a:r>
+              <a:rPr lang="en-US" dirty="0"/>
+              <a:t>Cloud-based facilities like </a:t>
             </a:r>
             <a:r>
               <a:rPr lang="en-US" dirty="0" err="1"/>
-              <a:t>Useage</a:t>
-            </a:r>
-            <a:r>
-              <a:rPr lang="en-US" dirty="0"/>
-              <a:t>, Status</a:t>
-            </a:r>
-          </a:p>
-          <a:p>
-            <a:pPr lvl="1"/>
-            <a:r>
-              <a:rPr lang="en-US" dirty="0"/>
-              <a:t>Additional resources to help users understand relevant technologies</a:t>
-            </a:r>
-          </a:p>
-          <a:p>
-            <a:pPr lvl="2"/>
-            <a:r>
-              <a:rPr lang="en-US" dirty="0"/>
-              <a:t>Language and platform references</a:t>
-            </a:r>
-          </a:p>
-          <a:p>
-            <a:pPr lvl="2"/>
-            <a:r>
-              <a:rPr lang="en-US" dirty="0"/>
-              <a:t>Brief code snapshots with commentary, provided as webpages</a:t>
-            </a:r>
-          </a:p>
-          <a:p>
-            <a:pPr lvl="2"/>
-            <a:r>
-              <a:rPr lang="en-US" dirty="0"/>
-              <a:t>Related blogs and opinion pieces</a:t>
-            </a:r>
-          </a:p>
-          <a:p>
-            <a:pPr lvl="2"/>
-            <a:r>
-              <a:rPr lang="en-US" dirty="0"/>
-              <a:t>Code standards</a:t>
+              <a:t>github</a:t>
+            </a:r>
+            <a:r>
+              <a:rPr lang="en-US" dirty="0"/>
+              <a:t> do that very well</a:t>
+            </a:r>
+          </a:p>
+          <a:p>
+            <a:pPr>
+              <a:lnSpc>
+                <a:spcPct val="150000"/>
+              </a:lnSpc>
+            </a:pPr>
+            <a:r>
+              <a:rPr lang="en-US" dirty="0"/>
+              <a:t>The issues are finding and understanding code relevant to a need</a:t>
+            </a:r>
+          </a:p>
+          <a:p>
+            <a:pPr lvl="1">
+              <a:lnSpc>
+                <a:spcPct val="100000"/>
+              </a:lnSpc>
+            </a:pPr>
+            <a:r>
+              <a:rPr lang="en-US" dirty="0"/>
+              <a:t>We want most code repositories to be large – to support broad reuse</a:t>
+            </a:r>
+          </a:p>
+          <a:p>
+            <a:pPr lvl="1">
+              <a:lnSpc>
+                <a:spcPct val="100000"/>
+              </a:lnSpc>
+            </a:pPr>
+            <a:r>
+              <a:rPr lang="en-US" dirty="0"/>
+              <a:t>How do we find, in a large repository, code that fills some need?</a:t>
+            </a:r>
+          </a:p>
+          <a:p>
+            <a:pPr>
+              <a:lnSpc>
+                <a:spcPct val="100000"/>
+              </a:lnSpc>
+            </a:pPr>
+            <a:r>
+              <a:rPr lang="en-US" dirty="0"/>
+              <a:t>Website documentation, collocated with source code - a good option</a:t>
+            </a:r>
+          </a:p>
+          <a:p>
+            <a:pPr lvl="1">
+              <a:lnSpc>
+                <a:spcPct val="100000"/>
+              </a:lnSpc>
+            </a:pPr>
+            <a:r>
+              <a:rPr lang="en-US" dirty="0"/>
+              <a:t>To support both salvage and reuse, documentation needs to provide information about the component’s concept, design, and typical use</a:t>
             </a:r>
           </a:p>
         </p:txBody>
@@ -5941,7 +8589,7 @@
           <p:cNvPr id="4" name="Slide Number Placeholder 3">
             <a:extLst>
               <a:ext uri="{FF2B5EF4-FFF2-40B4-BE49-F238E27FC236}">
-                <a16:creationId xmlns:a16="http://schemas.microsoft.com/office/drawing/2014/main" id="{B5E8AE43-7C82-414E-9C86-9D3337400307}"/>
+                <a16:creationId xmlns:a16="http://schemas.microsoft.com/office/drawing/2014/main" id="{B69DD603-6CCB-4044-86D9-1197C687F477}"/>
               </a:ext>
             </a:extLst>
           </p:cNvPr>
@@ -5968,7 +8616,7 @@
     </p:spTree>
     <p:extLst>
       <p:ext uri="{BB962C8B-B14F-4D97-AF65-F5344CB8AC3E}">
-        <p14:creationId xmlns:p14="http://schemas.microsoft.com/office/powerpoint/2010/main" val="3990487094"/>
+        <p14:creationId xmlns:p14="http://schemas.microsoft.com/office/powerpoint/2010/main" val="1974146755"/>
       </p:ext>
     </p:extLst>
   </p:cSld>
@@ -6000,7 +8648,7 @@
           <p:cNvPr id="2" name="Title 1">
             <a:extLst>
               <a:ext uri="{FF2B5EF4-FFF2-40B4-BE49-F238E27FC236}">
-                <a16:creationId xmlns:a16="http://schemas.microsoft.com/office/drawing/2014/main" id="{2881EC79-B8EB-4B86-9096-033DD253DA73}"/>
+                <a16:creationId xmlns:a16="http://schemas.microsoft.com/office/drawing/2014/main" id="{B5D3CA25-160B-4B16-981E-1259FF9C54AA}"/>
               </a:ext>
             </a:extLst>
           </p:cNvPr>
@@ -6018,52 +8666,115 @@
           <a:p>
             <a:r>
               <a:rPr lang="en-US" dirty="0"/>
-              <a:t>Site Structure</a:t>
-            </a:r>
-          </a:p>
-        </p:txBody>
-      </p:sp>
-      <p:pic>
-        <p:nvPicPr>
-          <p:cNvPr id="9" name="Content Placeholder 8" descr="A screenshot of a cell phone&#10;&#10;Description automatically generated">
-            <a:extLst>
-              <a:ext uri="{FF2B5EF4-FFF2-40B4-BE49-F238E27FC236}">
-                <a16:creationId xmlns:a16="http://schemas.microsoft.com/office/drawing/2014/main" id="{82156CF1-0166-439C-8BE3-5189825ED8A0}"/>
-              </a:ext>
-            </a:extLst>
-          </p:cNvPr>
-          <p:cNvPicPr>
-            <a:picLocks noGrp="1" noChangeAspect="1"/>
-          </p:cNvPicPr>
+              <a:t>Website for Publishing Reusable Components</a:t>
+            </a:r>
+          </a:p>
+        </p:txBody>
+      </p:sp>
+      <p:sp>
+        <p:nvSpPr>
+          <p:cNvPr id="3" name="Content Placeholder 2">
+            <a:extLst>
+              <a:ext uri="{FF2B5EF4-FFF2-40B4-BE49-F238E27FC236}">
+                <a16:creationId xmlns:a16="http://schemas.microsoft.com/office/drawing/2014/main" id="{51D4E0A7-5491-48A3-8C75-90DDBA9ED838}"/>
+              </a:ext>
+            </a:extLst>
+          </p:cNvPr>
+          <p:cNvSpPr>
+            <a:spLocks noGrp="1"/>
+          </p:cNvSpPr>
           <p:nvPr>
             <p:ph idx="1"/>
           </p:nvPr>
-        </p:nvPicPr>
-        <p:blipFill>
-          <a:blip r:embed="rId2">
-            <a:extLst>
-              <a:ext uri="{28A0092B-C50C-407E-A947-70E740481C1C}">
-                <a14:useLocalDpi xmlns:a14="http://schemas.microsoft.com/office/drawing/2010/main" val="0"/>
-              </a:ext>
-            </a:extLst>
-          </a:blip>
-          <a:stretch>
-            <a:fillRect/>
-          </a:stretch>
-        </p:blipFill>
-        <p:spPr>
-          <a:xfrm>
-            <a:off x="1456870" y="1609725"/>
-            <a:ext cx="9278259" cy="4605338"/>
-          </a:xfrm>
-        </p:spPr>
-      </p:pic>
-      <p:sp>
-        <p:nvSpPr>
-          <p:cNvPr id="3" name="Slide Number Placeholder 2">
-            <a:extLst>
-              <a:ext uri="{FF2B5EF4-FFF2-40B4-BE49-F238E27FC236}">
-                <a16:creationId xmlns:a16="http://schemas.microsoft.com/office/drawing/2014/main" id="{0DBFBEAD-15D2-406B-B29D-E04E546B4CC4}"/>
+        </p:nvSpPr>
+        <p:spPr/>
+        <p:txBody>
+          <a:bodyPr/>
+          <a:lstStyle/>
+          <a:p>
+            <a:r>
+              <a:rPr lang="en-US" dirty="0"/>
+              <a:t>A site for publishing source code will need:</a:t>
+            </a:r>
+          </a:p>
+          <a:p>
+            <a:pPr lvl="1"/>
+            <a:r>
+              <a:rPr lang="en-US" dirty="0"/>
+              <a:t>A structure for holding organized collections of code</a:t>
+            </a:r>
+          </a:p>
+          <a:p>
+            <a:pPr lvl="1"/>
+            <a:r>
+              <a:rPr lang="en-US" dirty="0"/>
+              <a:t>Documentation for each component</a:t>
+            </a:r>
+          </a:p>
+          <a:p>
+            <a:pPr lvl="2"/>
+            <a:r>
+              <a:rPr lang="en-US" dirty="0"/>
+              <a:t>Concept, Design, Usage, Status</a:t>
+            </a:r>
+          </a:p>
+          <a:p>
+            <a:pPr lvl="1"/>
+            <a:r>
+              <a:rPr lang="en-US" dirty="0"/>
+              <a:t>Additional resources to help users understand relevant technologies</a:t>
+            </a:r>
+          </a:p>
+          <a:p>
+            <a:pPr lvl="2"/>
+            <a:r>
+              <a:rPr lang="en-US" dirty="0"/>
+              <a:t>Language and platform references</a:t>
+            </a:r>
+          </a:p>
+          <a:p>
+            <a:pPr lvl="2"/>
+            <a:r>
+              <a:rPr lang="en-US" dirty="0"/>
+              <a:t>Brief code snapshots with commentary, provided as webpages</a:t>
+            </a:r>
+          </a:p>
+          <a:p>
+            <a:pPr lvl="2"/>
+            <a:r>
+              <a:rPr lang="en-US" dirty="0"/>
+              <a:t>Related blogs and opinion pieces</a:t>
+            </a:r>
+          </a:p>
+          <a:p>
+            <a:pPr lvl="2"/>
+            <a:r>
+              <a:rPr lang="en-US" dirty="0"/>
+              <a:t>Code standards</a:t>
+            </a:r>
+          </a:p>
+          <a:p>
+            <a:pPr lvl="1"/>
+            <a:r>
+              <a:rPr lang="en-US" dirty="0"/>
+              <a:t>Stories and Videos</a:t>
+            </a:r>
+          </a:p>
+          <a:p>
+            <a:pPr lvl="2"/>
+            <a:r>
+              <a:rPr lang="en-US" dirty="0"/>
+              <a:t>Discussions, each focused on a single theme</a:t>
+            </a:r>
+          </a:p>
+        </p:txBody>
+      </p:sp>
+      <p:sp>
+        <p:nvSpPr>
+          <p:cNvPr id="4" name="Slide Number Placeholder 3">
+            <a:extLst>
+              <a:ext uri="{FF2B5EF4-FFF2-40B4-BE49-F238E27FC236}">
+                <a16:creationId xmlns:a16="http://schemas.microsoft.com/office/drawing/2014/main" id="{B5E8AE43-7C82-414E-9C86-9D3337400307}"/>
               </a:ext>
             </a:extLst>
           </p:cNvPr>
@@ -6090,7 +8801,7 @@
     </p:spTree>
     <p:extLst>
       <p:ext uri="{BB962C8B-B14F-4D97-AF65-F5344CB8AC3E}">
-        <p14:creationId xmlns:p14="http://schemas.microsoft.com/office/powerpoint/2010/main" val="431493297"/>
+        <p14:creationId xmlns:p14="http://schemas.microsoft.com/office/powerpoint/2010/main" val="3990487094"/>
       </p:ext>
     </p:extLst>
   </p:cSld>

</xml_diff>

<commit_message>
minor text modifications, added prologue
</commit_message>
<xml_diff>
--- a/Resources/PublishingSourceCode.pptx
+++ b/Resources/PublishingSourceCode.pptx
@@ -5,32 +5,33 @@
     <p:sldMasterId id="2147483648" r:id="rId1"/>
   </p:sldMasterIdLst>
   <p:notesMasterIdLst>
-    <p:notesMasterId r:id="rId25"/>
+    <p:notesMasterId r:id="rId26"/>
   </p:notesMasterIdLst>
   <p:sldIdLst>
     <p:sldId id="256" r:id="rId2"/>
-    <p:sldId id="260" r:id="rId3"/>
-    <p:sldId id="265" r:id="rId4"/>
-    <p:sldId id="266" r:id="rId5"/>
-    <p:sldId id="264" r:id="rId6"/>
-    <p:sldId id="272" r:id="rId7"/>
-    <p:sldId id="258" r:id="rId8"/>
-    <p:sldId id="257" r:id="rId9"/>
-    <p:sldId id="267" r:id="rId10"/>
-    <p:sldId id="259" r:id="rId11"/>
-    <p:sldId id="268" r:id="rId12"/>
-    <p:sldId id="270" r:id="rId13"/>
-    <p:sldId id="271" r:id="rId14"/>
-    <p:sldId id="278" r:id="rId15"/>
-    <p:sldId id="274" r:id="rId16"/>
-    <p:sldId id="273" r:id="rId17"/>
-    <p:sldId id="275" r:id="rId18"/>
-    <p:sldId id="261" r:id="rId19"/>
-    <p:sldId id="262" r:id="rId20"/>
-    <p:sldId id="263" r:id="rId21"/>
-    <p:sldId id="276" r:id="rId22"/>
-    <p:sldId id="277" r:id="rId23"/>
-    <p:sldId id="279" r:id="rId24"/>
+    <p:sldId id="280" r:id="rId3"/>
+    <p:sldId id="260" r:id="rId4"/>
+    <p:sldId id="265" r:id="rId5"/>
+    <p:sldId id="266" r:id="rId6"/>
+    <p:sldId id="264" r:id="rId7"/>
+    <p:sldId id="272" r:id="rId8"/>
+    <p:sldId id="258" r:id="rId9"/>
+    <p:sldId id="257" r:id="rId10"/>
+    <p:sldId id="267" r:id="rId11"/>
+    <p:sldId id="259" r:id="rId12"/>
+    <p:sldId id="268" r:id="rId13"/>
+    <p:sldId id="270" r:id="rId14"/>
+    <p:sldId id="271" r:id="rId15"/>
+    <p:sldId id="278" r:id="rId16"/>
+    <p:sldId id="274" r:id="rId17"/>
+    <p:sldId id="273" r:id="rId18"/>
+    <p:sldId id="275" r:id="rId19"/>
+    <p:sldId id="261" r:id="rId20"/>
+    <p:sldId id="262" r:id="rId21"/>
+    <p:sldId id="263" r:id="rId22"/>
+    <p:sldId id="276" r:id="rId23"/>
+    <p:sldId id="277" r:id="rId24"/>
+    <p:sldId id="279" r:id="rId25"/>
   </p:sldIdLst>
   <p:sldSz cx="12192000" cy="6858000"/>
   <p:notesSz cx="7010400" cy="9296400"/>
@@ -588,7 +589,7 @@
           <a:p>
             <a:fld id="{4F090570-C106-4FBC-AEF5-5C270F494E9C}" type="slidenum">
               <a:rPr lang="en-US" smtClean="0"/>
-              <a:t>8</a:t>
+              <a:t>9</a:t>
             </a:fld>
             <a:endParaRPr lang="en-US"/>
           </a:p>
@@ -3949,7 +3950,7 @@
           <p:cNvPr id="2" name="Title 1">
             <a:extLst>
               <a:ext uri="{FF2B5EF4-FFF2-40B4-BE49-F238E27FC236}">
-                <a16:creationId xmlns:a16="http://schemas.microsoft.com/office/drawing/2014/main" id="{2881EC79-B8EB-4B86-9096-033DD253DA73}"/>
+                <a16:creationId xmlns:a16="http://schemas.microsoft.com/office/drawing/2014/main" id="{B5D3CA25-160B-4B16-981E-1259FF9C54AA}"/>
               </a:ext>
             </a:extLst>
           </p:cNvPr>
@@ -3967,17 +3968,115 @@
           <a:p>
             <a:r>
               <a:rPr lang="en-US" dirty="0"/>
-              <a:t>Site Structure</a:t>
-            </a:r>
-          </a:p>
-        </p:txBody>
-      </p:sp>
-      <p:sp>
-        <p:nvSpPr>
-          <p:cNvPr id="3" name="Slide Number Placeholder 2">
-            <a:extLst>
-              <a:ext uri="{FF2B5EF4-FFF2-40B4-BE49-F238E27FC236}">
-                <a16:creationId xmlns:a16="http://schemas.microsoft.com/office/drawing/2014/main" id="{0DBFBEAD-15D2-406B-B29D-E04E546B4CC4}"/>
+              <a:t>Website for Publishing Reusable Components</a:t>
+            </a:r>
+          </a:p>
+        </p:txBody>
+      </p:sp>
+      <p:sp>
+        <p:nvSpPr>
+          <p:cNvPr id="3" name="Content Placeholder 2">
+            <a:extLst>
+              <a:ext uri="{FF2B5EF4-FFF2-40B4-BE49-F238E27FC236}">
+                <a16:creationId xmlns:a16="http://schemas.microsoft.com/office/drawing/2014/main" id="{51D4E0A7-5491-48A3-8C75-90DDBA9ED838}"/>
+              </a:ext>
+            </a:extLst>
+          </p:cNvPr>
+          <p:cNvSpPr>
+            <a:spLocks noGrp="1"/>
+          </p:cNvSpPr>
+          <p:nvPr>
+            <p:ph idx="1"/>
+          </p:nvPr>
+        </p:nvSpPr>
+        <p:spPr/>
+        <p:txBody>
+          <a:bodyPr/>
+          <a:lstStyle/>
+          <a:p>
+            <a:r>
+              <a:rPr lang="en-US" dirty="0"/>
+              <a:t>A site for publishing source code will need:</a:t>
+            </a:r>
+          </a:p>
+          <a:p>
+            <a:pPr lvl="1"/>
+            <a:r>
+              <a:rPr lang="en-US" dirty="0"/>
+              <a:t>A structure for holding organized collections of code</a:t>
+            </a:r>
+          </a:p>
+          <a:p>
+            <a:pPr lvl="1"/>
+            <a:r>
+              <a:rPr lang="en-US" dirty="0"/>
+              <a:t>Documentation for each component</a:t>
+            </a:r>
+          </a:p>
+          <a:p>
+            <a:pPr lvl="2"/>
+            <a:r>
+              <a:rPr lang="en-US" dirty="0"/>
+              <a:t>Concept, Design, Usage, Status</a:t>
+            </a:r>
+          </a:p>
+          <a:p>
+            <a:pPr lvl="1"/>
+            <a:r>
+              <a:rPr lang="en-US" dirty="0"/>
+              <a:t>Additional resources to help users understand relevant technologies</a:t>
+            </a:r>
+          </a:p>
+          <a:p>
+            <a:pPr lvl="2"/>
+            <a:r>
+              <a:rPr lang="en-US" dirty="0"/>
+              <a:t>Language and platform references</a:t>
+            </a:r>
+          </a:p>
+          <a:p>
+            <a:pPr lvl="2"/>
+            <a:r>
+              <a:rPr lang="en-US" dirty="0"/>
+              <a:t>Brief code snapshots with commentary, provided as webpages</a:t>
+            </a:r>
+          </a:p>
+          <a:p>
+            <a:pPr lvl="2"/>
+            <a:r>
+              <a:rPr lang="en-US" dirty="0"/>
+              <a:t>Related blogs and opinion pieces</a:t>
+            </a:r>
+          </a:p>
+          <a:p>
+            <a:pPr lvl="2"/>
+            <a:r>
+              <a:rPr lang="en-US" dirty="0"/>
+              <a:t>Code standards</a:t>
+            </a:r>
+          </a:p>
+          <a:p>
+            <a:pPr lvl="1"/>
+            <a:r>
+              <a:rPr lang="en-US" dirty="0"/>
+              <a:t>Stories and Videos</a:t>
+            </a:r>
+          </a:p>
+          <a:p>
+            <a:pPr lvl="2"/>
+            <a:r>
+              <a:rPr lang="en-US" dirty="0"/>
+              <a:t>Discussions, each focused on a single theme</a:t>
+            </a:r>
+          </a:p>
+        </p:txBody>
+      </p:sp>
+      <p:sp>
+        <p:nvSpPr>
+          <p:cNvPr id="4" name="Slide Number Placeholder 3">
+            <a:extLst>
+              <a:ext uri="{FF2B5EF4-FFF2-40B4-BE49-F238E27FC236}">
+                <a16:creationId xmlns:a16="http://schemas.microsoft.com/office/drawing/2014/main" id="{B5E8AE43-7C82-414E-9C86-9D3337400307}"/>
               </a:ext>
             </a:extLst>
           </p:cNvPr>
@@ -4001,45 +4100,10 @@
           </a:p>
         </p:txBody>
       </p:sp>
-      <p:pic>
-        <p:nvPicPr>
-          <p:cNvPr id="7" name="Content Placeholder 6" descr="A screenshot of a cell phone&#10;&#10;Description automatically generated">
-            <a:extLst>
-              <a:ext uri="{FF2B5EF4-FFF2-40B4-BE49-F238E27FC236}">
-                <a16:creationId xmlns:a16="http://schemas.microsoft.com/office/drawing/2014/main" id="{025D520F-A131-4997-AB91-05ACCF4CD798}"/>
-              </a:ext>
-            </a:extLst>
-          </p:cNvPr>
-          <p:cNvPicPr>
-            <a:picLocks noGrp="1" noChangeAspect="1"/>
-          </p:cNvPicPr>
-          <p:nvPr>
-            <p:ph idx="1"/>
-          </p:nvPr>
-        </p:nvPicPr>
-        <p:blipFill>
-          <a:blip r:embed="rId2">
-            <a:extLst>
-              <a:ext uri="{28A0092B-C50C-407E-A947-70E740481C1C}">
-                <a14:useLocalDpi xmlns:a14="http://schemas.microsoft.com/office/drawing/2010/main" val="0"/>
-              </a:ext>
-            </a:extLst>
-          </a:blip>
-          <a:stretch>
-            <a:fillRect/>
-          </a:stretch>
-        </p:blipFill>
-        <p:spPr>
-          <a:xfrm>
-            <a:off x="1863495" y="1609725"/>
-            <a:ext cx="8465009" cy="4605338"/>
-          </a:xfrm>
-        </p:spPr>
-      </p:pic>
     </p:spTree>
     <p:extLst>
       <p:ext uri="{BB962C8B-B14F-4D97-AF65-F5344CB8AC3E}">
-        <p14:creationId xmlns:p14="http://schemas.microsoft.com/office/powerpoint/2010/main" val="431493297"/>
+        <p14:creationId xmlns:p14="http://schemas.microsoft.com/office/powerpoint/2010/main" val="3990487094"/>
       </p:ext>
     </p:extLst>
   </p:cSld>
@@ -4071,6 +4135,139 @@
           <p:cNvPr id="2" name="Title 1">
             <a:extLst>
               <a:ext uri="{FF2B5EF4-FFF2-40B4-BE49-F238E27FC236}">
+                <a16:creationId xmlns:a16="http://schemas.microsoft.com/office/drawing/2014/main" id="{2881EC79-B8EB-4B86-9096-033DD253DA73}"/>
+              </a:ext>
+            </a:extLst>
+          </p:cNvPr>
+          <p:cNvSpPr>
+            <a:spLocks noGrp="1"/>
+          </p:cNvSpPr>
+          <p:nvPr>
+            <p:ph type="title"/>
+          </p:nvPr>
+        </p:nvSpPr>
+        <p:spPr/>
+        <p:txBody>
+          <a:bodyPr/>
+          <a:lstStyle/>
+          <a:p>
+            <a:r>
+              <a:rPr lang="en-US" dirty="0"/>
+              <a:t>Site Structure – </a:t>
+            </a:r>
+            <a:r>
+              <a:rPr lang="en-US" sz="2800" dirty="0">
+                <a:hlinkClick r:id="rId2"/>
+              </a:rPr>
+              <a:t>https://JimFawcett.github.io</a:t>
+            </a:r>
+            <a:r>
+              <a:rPr lang="en-US" sz="2800" dirty="0"/>
+              <a:t> </a:t>
+            </a:r>
+            <a:endParaRPr lang="en-US" dirty="0"/>
+          </a:p>
+        </p:txBody>
+      </p:sp>
+      <p:sp>
+        <p:nvSpPr>
+          <p:cNvPr id="3" name="Slide Number Placeholder 2">
+            <a:extLst>
+              <a:ext uri="{FF2B5EF4-FFF2-40B4-BE49-F238E27FC236}">
+                <a16:creationId xmlns:a16="http://schemas.microsoft.com/office/drawing/2014/main" id="{0DBFBEAD-15D2-406B-B29D-E04E546B4CC4}"/>
+              </a:ext>
+            </a:extLst>
+          </p:cNvPr>
+          <p:cNvSpPr>
+            <a:spLocks noGrp="1"/>
+          </p:cNvSpPr>
+          <p:nvPr>
+            <p:ph type="sldNum" sz="quarter" idx="12"/>
+          </p:nvPr>
+        </p:nvSpPr>
+        <p:spPr/>
+        <p:txBody>
+          <a:bodyPr/>
+          <a:lstStyle/>
+          <a:p>
+            <a:fld id="{EDEBF0BA-A897-4C1E-AB3C-F330808C0E1D}" type="slidenum">
+              <a:rPr lang="en-US" smtClean="0"/>
+              <a:t>11</a:t>
+            </a:fld>
+            <a:endParaRPr lang="en-US"/>
+          </a:p>
+        </p:txBody>
+      </p:sp>
+      <p:pic>
+        <p:nvPicPr>
+          <p:cNvPr id="7" name="Content Placeholder 6" descr="A screenshot of a cell phone&#10;&#10;Description automatically generated">
+            <a:extLst>
+              <a:ext uri="{FF2B5EF4-FFF2-40B4-BE49-F238E27FC236}">
+                <a16:creationId xmlns:a16="http://schemas.microsoft.com/office/drawing/2014/main" id="{025D520F-A131-4997-AB91-05ACCF4CD798}"/>
+              </a:ext>
+            </a:extLst>
+          </p:cNvPr>
+          <p:cNvPicPr>
+            <a:picLocks noGrp="1" noChangeAspect="1"/>
+          </p:cNvPicPr>
+          <p:nvPr>
+            <p:ph idx="1"/>
+          </p:nvPr>
+        </p:nvPicPr>
+        <p:blipFill>
+          <a:blip r:embed="rId3">
+            <a:extLst>
+              <a:ext uri="{28A0092B-C50C-407E-A947-70E740481C1C}">
+                <a14:useLocalDpi xmlns:a14="http://schemas.microsoft.com/office/drawing/2010/main" val="0"/>
+              </a:ext>
+            </a:extLst>
+          </a:blip>
+          <a:stretch>
+            <a:fillRect/>
+          </a:stretch>
+        </p:blipFill>
+        <p:spPr>
+          <a:xfrm>
+            <a:off x="1863495" y="1609725"/>
+            <a:ext cx="8465009" cy="4605338"/>
+          </a:xfrm>
+        </p:spPr>
+      </p:pic>
+    </p:spTree>
+    <p:extLst>
+      <p:ext uri="{BB962C8B-B14F-4D97-AF65-F5344CB8AC3E}">
+        <p14:creationId xmlns:p14="http://schemas.microsoft.com/office/powerpoint/2010/main" val="431493297"/>
+      </p:ext>
+    </p:extLst>
+  </p:cSld>
+  <p:clrMapOvr>
+    <a:masterClrMapping/>
+  </p:clrMapOvr>
+</p:sld>
+</file>
+
+<file path=ppt/slides/slide12.xml><?xml version="1.0" encoding="utf-8"?>
+<p:sld xmlns:a="http://schemas.openxmlformats.org/drawingml/2006/main" xmlns:r="http://schemas.openxmlformats.org/officeDocument/2006/relationships" xmlns:p="http://schemas.openxmlformats.org/presentationml/2006/main">
+  <p:cSld>
+    <p:spTree>
+      <p:nvGrpSpPr>
+        <p:cNvPr id="1" name=""/>
+        <p:cNvGrpSpPr/>
+        <p:nvPr/>
+      </p:nvGrpSpPr>
+      <p:grpSpPr>
+        <a:xfrm>
+          <a:off x="0" y="0"/>
+          <a:ext cx="0" cy="0"/>
+          <a:chOff x="0" y="0"/>
+          <a:chExt cx="0" cy="0"/>
+        </a:xfrm>
+      </p:grpSpPr>
+      <p:sp>
+        <p:nvSpPr>
+          <p:cNvPr id="2" name="Title 1">
+            <a:extLst>
+              <a:ext uri="{FF2B5EF4-FFF2-40B4-BE49-F238E27FC236}">
                 <a16:creationId xmlns:a16="http://schemas.microsoft.com/office/drawing/2014/main" id="{6DFB2D42-9518-4248-AE5E-AC4DE0E3E6DF}"/>
               </a:ext>
             </a:extLst>
@@ -4232,7 +4429,7 @@
           <a:p>
             <a:fld id="{EDEBF0BA-A897-4C1E-AB3C-F330808C0E1D}" type="slidenum">
               <a:rPr lang="en-US" smtClean="0"/>
-              <a:t>11</a:t>
+              <a:t>12</a:t>
             </a:fld>
             <a:endParaRPr lang="en-US" dirty="0"/>
           </a:p>
@@ -4281,7 +4478,7 @@
 </p:sld>
 </file>
 
-<file path=ppt/slides/slide12.xml><?xml version="1.0" encoding="utf-8"?>
+<file path=ppt/slides/slide13.xml><?xml version="1.0" encoding="utf-8"?>
 <p:sld xmlns:a="http://schemas.openxmlformats.org/drawingml/2006/main" xmlns:r="http://schemas.openxmlformats.org/officeDocument/2006/relationships" xmlns:p="http://schemas.openxmlformats.org/presentationml/2006/main">
   <p:cSld>
     <p:spTree>
@@ -4442,7 +4639,7 @@
           <a:p>
             <a:fld id="{EDEBF0BA-A897-4C1E-AB3C-F330808C0E1D}" type="slidenum">
               <a:rPr lang="en-US" smtClean="0"/>
-              <a:t>12</a:t>
+              <a:t>13</a:t>
             </a:fld>
             <a:endParaRPr lang="en-US"/>
           </a:p>
@@ -4728,7 +4925,7 @@
 </p:sld>
 </file>
 
-<file path=ppt/slides/slide13.xml><?xml version="1.0" encoding="utf-8"?>
+<file path=ppt/slides/slide14.xml><?xml version="1.0" encoding="utf-8"?>
 <p:sld xmlns:a="http://schemas.openxmlformats.org/drawingml/2006/main" xmlns:r="http://schemas.openxmlformats.org/officeDocument/2006/relationships" xmlns:p="http://schemas.openxmlformats.org/presentationml/2006/main">
   <p:cSld>
     <p:spTree>
@@ -4860,7 +5057,7 @@
           <a:p>
             <a:fld id="{EDEBF0BA-A897-4C1E-AB3C-F330808C0E1D}" type="slidenum">
               <a:rPr lang="en-US" smtClean="0"/>
-              <a:t>13</a:t>
+              <a:t>14</a:t>
             </a:fld>
             <a:endParaRPr lang="en-US"/>
           </a:p>
@@ -5182,7 +5379,7 @@
 </p:sld>
 </file>
 
-<file path=ppt/slides/slide14.xml><?xml version="1.0" encoding="utf-8"?>
+<file path=ppt/slides/slide15.xml><?xml version="1.0" encoding="utf-8"?>
 <p:sld xmlns:a="http://schemas.openxmlformats.org/drawingml/2006/main" xmlns:r="http://schemas.openxmlformats.org/officeDocument/2006/relationships" xmlns:p="http://schemas.openxmlformats.org/presentationml/2006/main">
   <p:cSld>
     <p:spTree>
@@ -5288,7 +5485,7 @@
           <a:p>
             <a:pPr lvl="2"/>
             <a:r>
-              <a:rPr lang="en-US" sz="1600" dirty="0"/>
+              <a:rPr lang="en-US" sz="1800" dirty="0"/>
               <a:t>This site provides a candidate</a:t>
             </a:r>
           </a:p>
@@ -5343,7 +5540,7 @@
               <a:buNone/>
             </a:pPr>
             <a:r>
-              <a:rPr lang="en-US" sz="2400" dirty="0"/>
+              <a:rPr lang="en-US" sz="2000" dirty="0"/>
               <a:t>    [1] Flotsam - cargo that surfaces from a sunken ship</a:t>
             </a:r>
           </a:p>
@@ -5352,7 +5549,7 @@
               <a:buNone/>
             </a:pPr>
             <a:r>
-              <a:rPr lang="en-US" sz="2400" dirty="0"/>
+              <a:rPr lang="en-US" sz="2000" dirty="0"/>
               <a:t>    [2] Jetsam – cargo that is intentionally cast from a ship in distress.</a:t>
             </a:r>
           </a:p>
@@ -5381,7 +5578,7 @@
           <a:p>
             <a:fld id="{EDEBF0BA-A897-4C1E-AB3C-F330808C0E1D}" type="slidenum">
               <a:rPr lang="en-US" smtClean="0"/>
-              <a:t>14</a:t>
+              <a:t>15</a:t>
             </a:fld>
             <a:endParaRPr lang="en-US"/>
           </a:p>
@@ -5436,196 +5633,6 @@
 </p:sld>
 </file>
 
-<file path=ppt/slides/slide15.xml><?xml version="1.0" encoding="utf-8"?>
-<p:sld xmlns:a="http://schemas.openxmlformats.org/drawingml/2006/main" xmlns:r="http://schemas.openxmlformats.org/officeDocument/2006/relationships" xmlns:p="http://schemas.openxmlformats.org/presentationml/2006/main">
-  <p:cSld>
-    <p:spTree>
-      <p:nvGrpSpPr>
-        <p:cNvPr id="1" name=""/>
-        <p:cNvGrpSpPr/>
-        <p:nvPr/>
-      </p:nvGrpSpPr>
-      <p:grpSpPr>
-        <a:xfrm>
-          <a:off x="0" y="0"/>
-          <a:ext cx="0" cy="0"/>
-          <a:chOff x="0" y="0"/>
-          <a:chExt cx="0" cy="0"/>
-        </a:xfrm>
-      </p:grpSpPr>
-      <p:sp>
-        <p:nvSpPr>
-          <p:cNvPr id="6" name="Title 5">
-            <a:extLst>
-              <a:ext uri="{FF2B5EF4-FFF2-40B4-BE49-F238E27FC236}">
-                <a16:creationId xmlns:a16="http://schemas.microsoft.com/office/drawing/2014/main" id="{6F84FA54-65FA-4160-855E-2B56132F9651}"/>
-              </a:ext>
-            </a:extLst>
-          </p:cNvPr>
-          <p:cNvSpPr>
-            <a:spLocks noGrp="1"/>
-          </p:cNvSpPr>
-          <p:nvPr>
-            <p:ph type="title"/>
-          </p:nvPr>
-        </p:nvSpPr>
-        <p:spPr/>
-        <p:txBody>
-          <a:bodyPr/>
-          <a:lstStyle/>
-          <a:p>
-            <a:r>
-              <a:rPr lang="en-US" dirty="0"/>
-              <a:t>Experiments</a:t>
-            </a:r>
-          </a:p>
-        </p:txBody>
-      </p:sp>
-      <p:sp>
-        <p:nvSpPr>
-          <p:cNvPr id="7" name="Content Placeholder 6">
-            <a:extLst>
-              <a:ext uri="{FF2B5EF4-FFF2-40B4-BE49-F238E27FC236}">
-                <a16:creationId xmlns:a16="http://schemas.microsoft.com/office/drawing/2014/main" id="{1BF0FC12-D67B-4A58-8EC4-1867ACA2F8BD}"/>
-              </a:ext>
-            </a:extLst>
-          </p:cNvPr>
-          <p:cNvSpPr>
-            <a:spLocks noGrp="1"/>
-          </p:cNvSpPr>
-          <p:nvPr>
-            <p:ph idx="1"/>
-          </p:nvPr>
-        </p:nvSpPr>
-        <p:spPr>
-          <a:xfrm>
-            <a:off x="838200" y="1435994"/>
-            <a:ext cx="10515600" cy="4605741"/>
-          </a:xfrm>
-        </p:spPr>
-        <p:txBody>
-          <a:bodyPr/>
-          <a:lstStyle/>
-          <a:p>
-            <a:r>
-              <a:rPr lang="en-US" dirty="0"/>
-              <a:t>Experiments to make the site’s publishing process more effective are continuing:</a:t>
-            </a:r>
-          </a:p>
-          <a:p>
-            <a:pPr lvl="1"/>
-            <a:r>
-              <a:rPr lang="en-US" dirty="0"/>
-              <a:t>Developing UI widgets to use webpage real estate effectively</a:t>
-            </a:r>
-          </a:p>
-          <a:p>
-            <a:pPr lvl="2"/>
-            <a:r>
-              <a:rPr lang="en-US" dirty="0"/>
-              <a:t>User driven diagram resizer</a:t>
-            </a:r>
-          </a:p>
-          <a:p>
-            <a:pPr lvl="2"/>
-            <a:r>
-              <a:rPr lang="en-US" dirty="0"/>
-              <a:t>Slide-in panels</a:t>
-            </a:r>
-          </a:p>
-          <a:p>
-            <a:pPr lvl="2"/>
-            <a:r>
-              <a:rPr lang="en-US" dirty="0"/>
-              <a:t>Slide show</a:t>
-            </a:r>
-          </a:p>
-          <a:p>
-            <a:pPr lvl="2"/>
-            <a:r>
-              <a:rPr lang="en-US" dirty="0"/>
-              <a:t>Code blocks for presentation</a:t>
-            </a:r>
-          </a:p>
-          <a:p>
-            <a:pPr lvl="2"/>
-            <a:r>
-              <a:rPr lang="en-US" dirty="0"/>
-              <a:t>Photo styling</a:t>
-            </a:r>
-          </a:p>
-          <a:p>
-            <a:pPr lvl="1"/>
-            <a:r>
-              <a:rPr lang="en-US" dirty="0"/>
-              <a:t>Navigation schemes</a:t>
-            </a:r>
-          </a:p>
-          <a:p>
-            <a:pPr lvl="2"/>
-            <a:r>
-              <a:rPr lang="en-US" dirty="0"/>
-              <a:t>Dropdown menus</a:t>
-            </a:r>
-          </a:p>
-          <a:p>
-            <a:pPr lvl="2"/>
-            <a:r>
-              <a:rPr lang="en-US" dirty="0"/>
-              <a:t>Navigation buttons and key presses</a:t>
-            </a:r>
-          </a:p>
-          <a:p>
-            <a:pPr lvl="1"/>
-            <a:r>
-              <a:rPr lang="en-US" dirty="0"/>
-              <a:t>Continuing to think about site organization schemes</a:t>
-            </a:r>
-          </a:p>
-        </p:txBody>
-      </p:sp>
-      <p:sp>
-        <p:nvSpPr>
-          <p:cNvPr id="5" name="Slide Number Placeholder 4">
-            <a:extLst>
-              <a:ext uri="{FF2B5EF4-FFF2-40B4-BE49-F238E27FC236}">
-                <a16:creationId xmlns:a16="http://schemas.microsoft.com/office/drawing/2014/main" id="{175BF427-C62C-4AB5-A038-A22DED838917}"/>
-              </a:ext>
-            </a:extLst>
-          </p:cNvPr>
-          <p:cNvSpPr>
-            <a:spLocks noGrp="1"/>
-          </p:cNvSpPr>
-          <p:nvPr>
-            <p:ph type="sldNum" sz="quarter" idx="12"/>
-          </p:nvPr>
-        </p:nvSpPr>
-        <p:spPr/>
-        <p:txBody>
-          <a:bodyPr/>
-          <a:lstStyle/>
-          <a:p>
-            <a:fld id="{EDEBF0BA-A897-4C1E-AB3C-F330808C0E1D}" type="slidenum">
-              <a:rPr lang="en-US" smtClean="0"/>
-              <a:t>15</a:t>
-            </a:fld>
-            <a:endParaRPr lang="en-US"/>
-          </a:p>
-        </p:txBody>
-      </p:sp>
-    </p:spTree>
-    <p:extLst>
-      <p:ext uri="{BB962C8B-B14F-4D97-AF65-F5344CB8AC3E}">
-        <p14:creationId xmlns:p14="http://schemas.microsoft.com/office/powerpoint/2010/main" val="3303993548"/>
-      </p:ext>
-    </p:extLst>
-  </p:cSld>
-  <p:clrMapOvr>
-    <a:masterClrMapping/>
-  </p:clrMapOvr>
-</p:sld>
-</file>
-
 <file path=ppt/slides/slide16.xml><?xml version="1.0" encoding="utf-8"?>
 <p:sld xmlns:a="http://schemas.openxmlformats.org/drawingml/2006/main" xmlns:r="http://schemas.openxmlformats.org/officeDocument/2006/relationships" xmlns:p="http://schemas.openxmlformats.org/presentationml/2006/main">
   <p:cSld>
@@ -5645,10 +5652,10 @@
       </p:grpSpPr>
       <p:sp>
         <p:nvSpPr>
-          <p:cNvPr id="2" name="Title 1">
-            <a:extLst>
-              <a:ext uri="{FF2B5EF4-FFF2-40B4-BE49-F238E27FC236}">
-                <a16:creationId xmlns:a16="http://schemas.microsoft.com/office/drawing/2014/main" id="{ACAA7557-4583-4CE5-9450-333B91340133}"/>
+          <p:cNvPr id="6" name="Title 5">
+            <a:extLst>
+              <a:ext uri="{FF2B5EF4-FFF2-40B4-BE49-F238E27FC236}">
+                <a16:creationId xmlns:a16="http://schemas.microsoft.com/office/drawing/2014/main" id="{6F84FA54-65FA-4160-855E-2B56132F9651}"/>
               </a:ext>
             </a:extLst>
           </p:cNvPr>
@@ -5657,216 +5664,129 @@
           </p:cNvSpPr>
           <p:nvPr>
             <p:ph type="title"/>
+          </p:nvPr>
+        </p:nvSpPr>
+        <p:spPr/>
+        <p:txBody>
+          <a:bodyPr/>
+          <a:lstStyle/>
+          <a:p>
+            <a:r>
+              <a:rPr lang="en-US" dirty="0"/>
+              <a:t>Experiments</a:t>
+            </a:r>
+          </a:p>
+        </p:txBody>
+      </p:sp>
+      <p:sp>
+        <p:nvSpPr>
+          <p:cNvPr id="7" name="Content Placeholder 6">
+            <a:extLst>
+              <a:ext uri="{FF2B5EF4-FFF2-40B4-BE49-F238E27FC236}">
+                <a16:creationId xmlns:a16="http://schemas.microsoft.com/office/drawing/2014/main" id="{1BF0FC12-D67B-4A58-8EC4-1867ACA2F8BD}"/>
+              </a:ext>
+            </a:extLst>
+          </p:cNvPr>
+          <p:cNvSpPr>
+            <a:spLocks noGrp="1"/>
+          </p:cNvSpPr>
+          <p:nvPr>
+            <p:ph idx="1"/>
           </p:nvPr>
         </p:nvSpPr>
         <p:spPr>
           <a:xfrm>
-            <a:off x="838200" y="365125"/>
-            <a:ext cx="5257800" cy="1325563"/>
+            <a:off x="838200" y="1435994"/>
+            <a:ext cx="10515600" cy="4605741"/>
           </a:xfrm>
         </p:spPr>
         <p:txBody>
-          <a:bodyPr>
-            <a:normAutofit/>
-          </a:bodyPr>
-          <a:lstStyle/>
-          <a:p>
-            <a:r>
-              <a:rPr lang="en-US" sz="4000" dirty="0"/>
-              <a:t>Status and Conclusions</a:t>
-            </a:r>
-          </a:p>
-        </p:txBody>
-      </p:sp>
-      <p:sp>
-        <p:nvSpPr>
-          <p:cNvPr id="5" name="Content Placeholder 4">
-            <a:extLst>
-              <a:ext uri="{FF2B5EF4-FFF2-40B4-BE49-F238E27FC236}">
-                <a16:creationId xmlns:a16="http://schemas.microsoft.com/office/drawing/2014/main" id="{F59047EB-518C-4D47-AE0E-61C2D22A203D}"/>
-              </a:ext>
-            </a:extLst>
-          </p:cNvPr>
-          <p:cNvSpPr>
-            <a:spLocks noGrp="1"/>
-          </p:cNvSpPr>
-          <p:nvPr>
-            <p:ph sz="half" idx="1"/>
-          </p:nvPr>
-        </p:nvSpPr>
-        <p:spPr>
-          <a:xfrm>
-            <a:off x="767371" y="1603420"/>
-            <a:ext cx="5181600" cy="4573543"/>
-          </a:xfrm>
-        </p:spPr>
-        <p:txBody>
-          <a:bodyPr/>
-          <a:lstStyle/>
-          <a:p>
-            <a:r>
-              <a:rPr lang="en-US" dirty="0"/>
-              <a:t>Status - </a:t>
-            </a:r>
-            <a:r>
-              <a:rPr lang="en-US" sz="2400" dirty="0">
-                <a:hlinkClick r:id="rId2"/>
-              </a:rPr>
-              <a:t>https://JimFawcett.github.io</a:t>
-            </a:r>
-            <a:r>
-              <a:rPr lang="en-US" sz="2400" dirty="0"/>
-              <a:t>: </a:t>
-            </a:r>
-            <a:endParaRPr lang="en-US" dirty="0"/>
-          </a:p>
-          <a:p>
-            <a:pPr lvl="1"/>
-            <a:r>
-              <a:rPr lang="en-US" dirty="0"/>
-              <a:t>Most of the structure described is in place</a:t>
-            </a:r>
-          </a:p>
-          <a:p>
-            <a:pPr lvl="1"/>
-            <a:r>
-              <a:rPr lang="en-US" dirty="0"/>
-              <a:t>More than 40 repositories of mostly C++ code are published</a:t>
-            </a:r>
-          </a:p>
-          <a:p>
-            <a:pPr lvl="1"/>
-            <a:r>
-              <a:rPr lang="en-US" dirty="0"/>
-              <a:t>Several stories are published</a:t>
-            </a:r>
-          </a:p>
-          <a:p>
-            <a:pPr lvl="1"/>
-            <a:r>
-              <a:rPr lang="en-US" dirty="0"/>
-              <a:t>Other resources and </a:t>
-            </a:r>
-            <a:r>
-              <a:rPr lang="en-US" dirty="0" err="1"/>
-              <a:t>CodeSnaps</a:t>
-            </a:r>
-            <a:r>
-              <a:rPr lang="en-US" dirty="0"/>
-              <a:t> are available from the site</a:t>
-            </a:r>
-          </a:p>
-          <a:p>
-            <a:r>
-              <a:rPr lang="en-US" dirty="0"/>
-              <a:t>Plans</a:t>
-            </a:r>
-          </a:p>
-          <a:p>
-            <a:pPr lvl="1"/>
-            <a:r>
-              <a:rPr lang="en-US" dirty="0"/>
-              <a:t>Install more code repositories</a:t>
-            </a:r>
-          </a:p>
-          <a:p>
-            <a:pPr lvl="1"/>
-            <a:r>
-              <a:rPr lang="en-US" dirty="0"/>
-              <a:t>Start to add videos</a:t>
-            </a:r>
-          </a:p>
-        </p:txBody>
-      </p:sp>
-      <p:sp>
-        <p:nvSpPr>
-          <p:cNvPr id="6" name="Content Placeholder 5">
-            <a:extLst>
-              <a:ext uri="{FF2B5EF4-FFF2-40B4-BE49-F238E27FC236}">
-                <a16:creationId xmlns:a16="http://schemas.microsoft.com/office/drawing/2014/main" id="{FE80FAEC-8AE9-4AB5-9C84-5EEDD2807033}"/>
-              </a:ext>
-            </a:extLst>
-          </p:cNvPr>
-          <p:cNvSpPr>
-            <a:spLocks noGrp="1"/>
-          </p:cNvSpPr>
-          <p:nvPr>
-            <p:ph sz="half" idx="2"/>
-          </p:nvPr>
-        </p:nvSpPr>
-        <p:spPr>
-          <a:xfrm>
-            <a:off x="6210834" y="1629163"/>
-            <a:ext cx="5181600" cy="5455746"/>
-          </a:xfrm>
-        </p:spPr>
-        <p:txBody>
-          <a:bodyPr/>
-          <a:lstStyle/>
-          <a:p>
-            <a:r>
-              <a:rPr lang="en-US" dirty="0"/>
-              <a:t>Conclusions:</a:t>
-            </a:r>
-          </a:p>
-          <a:p>
-            <a:pPr lvl="1"/>
-            <a:r>
-              <a:rPr lang="en-US" dirty="0"/>
-              <a:t>Static sites seem like a good tool for publishing</a:t>
+          <a:bodyPr/>
+          <a:lstStyle/>
+          <a:p>
+            <a:r>
+              <a:rPr lang="en-US" dirty="0"/>
+              <a:t>Experiments to make the site’s publishing process more effective are continuing:</a:t>
+            </a:r>
+          </a:p>
+          <a:p>
+            <a:pPr lvl="1"/>
+            <a:r>
+              <a:rPr lang="en-US" dirty="0"/>
+              <a:t>Developing UI widgets to use webpage real estate effectively</a:t>
             </a:r>
           </a:p>
           <a:p>
             <a:pPr lvl="2"/>
             <a:r>
               <a:rPr lang="en-US" dirty="0"/>
-              <a:t>Main issue is text or keyword </a:t>
-            </a:r>
-            <a:r>
-              <a:rPr lang="en-US" dirty="0" err="1"/>
-              <a:t>searchs</a:t>
-            </a:r>
-            <a:r>
-              <a:rPr lang="en-US" dirty="0"/>
-              <a:t> not available with static sites</a:t>
+              <a:t>User driven diagram resizer</a:t>
             </a:r>
           </a:p>
           <a:p>
             <a:pPr lvl="2"/>
             <a:r>
               <a:rPr lang="en-US" dirty="0"/>
-              <a:t>Can be addressed with local mirror and tools for synchronizing and local searching</a:t>
-            </a:r>
-          </a:p>
-          <a:p>
-            <a:pPr lvl="1"/>
-            <a:r>
-              <a:rPr lang="en-US" dirty="0"/>
-              <a:t>Required effort is reasonable for the expected payoff</a:t>
+              <a:t>Slide-in panels</a:t>
             </a:r>
           </a:p>
           <a:p>
             <a:pPr lvl="2"/>
             <a:r>
               <a:rPr lang="en-US" dirty="0"/>
-              <a:t>This site went from zero to current status in four months of my time</a:t>
+              <a:t>Slide show</a:t>
             </a:r>
           </a:p>
           <a:p>
             <a:pPr lvl="2"/>
             <a:r>
               <a:rPr lang="en-US" dirty="0"/>
-              <a:t>However, I’ve built a site like this before.</a:t>
-            </a:r>
-          </a:p>
-        </p:txBody>
-      </p:sp>
-      <p:sp>
-        <p:nvSpPr>
-          <p:cNvPr id="4" name="Slide Number Placeholder 3">
-            <a:extLst>
-              <a:ext uri="{FF2B5EF4-FFF2-40B4-BE49-F238E27FC236}">
-                <a16:creationId xmlns:a16="http://schemas.microsoft.com/office/drawing/2014/main" id="{A5C2B86A-AE47-44AF-9978-587D3DAADB7B}"/>
+              <a:t>Code blocks for presentation</a:t>
+            </a:r>
+          </a:p>
+          <a:p>
+            <a:pPr lvl="2"/>
+            <a:r>
+              <a:rPr lang="en-US" dirty="0"/>
+              <a:t>Photo styling</a:t>
+            </a:r>
+          </a:p>
+          <a:p>
+            <a:pPr lvl="1"/>
+            <a:r>
+              <a:rPr lang="en-US" dirty="0"/>
+              <a:t>Navigation schemes</a:t>
+            </a:r>
+          </a:p>
+          <a:p>
+            <a:pPr lvl="2"/>
+            <a:r>
+              <a:rPr lang="en-US" dirty="0"/>
+              <a:t>Dropdown menus</a:t>
+            </a:r>
+          </a:p>
+          <a:p>
+            <a:pPr lvl="2"/>
+            <a:r>
+              <a:rPr lang="en-US" dirty="0"/>
+              <a:t>Navigation buttons and key presses</a:t>
+            </a:r>
+          </a:p>
+          <a:p>
+            <a:pPr lvl="1"/>
+            <a:r>
+              <a:rPr lang="en-US" dirty="0"/>
+              <a:t>Continuing to think about site organization schemes</a:t>
+            </a:r>
+          </a:p>
+        </p:txBody>
+      </p:sp>
+      <p:sp>
+        <p:nvSpPr>
+          <p:cNvPr id="5" name="Slide Number Placeholder 4">
+            <a:extLst>
+              <a:ext uri="{FF2B5EF4-FFF2-40B4-BE49-F238E27FC236}">
+                <a16:creationId xmlns:a16="http://schemas.microsoft.com/office/drawing/2014/main" id="{175BF427-C62C-4AB5-A038-A22DED838917}"/>
               </a:ext>
             </a:extLst>
           </p:cNvPr>
@@ -5893,7 +5813,7 @@
     </p:spTree>
     <p:extLst>
       <p:ext uri="{BB962C8B-B14F-4D97-AF65-F5344CB8AC3E}">
-        <p14:creationId xmlns:p14="http://schemas.microsoft.com/office/powerpoint/2010/main" val="2191199278"/>
+        <p14:creationId xmlns:p14="http://schemas.microsoft.com/office/powerpoint/2010/main" val="3303993548"/>
       </p:ext>
     </p:extLst>
   </p:cSld>
@@ -5925,15 +5845,225 @@
           <p:cNvPr id="2" name="Title 1">
             <a:extLst>
               <a:ext uri="{FF2B5EF4-FFF2-40B4-BE49-F238E27FC236}">
-                <a16:creationId xmlns:a16="http://schemas.microsoft.com/office/drawing/2014/main" id="{508F2C2D-8A1E-4157-B36F-A4E30EAA74CE}"/>
-              </a:ext>
-            </a:extLst>
-          </p:cNvPr>
-          <p:cNvSpPr>
-            <a:spLocks noGrp="1"/>
-          </p:cNvSpPr>
-          <p:nvPr>
-            <p:ph type="ctrTitle"/>
+                <a16:creationId xmlns:a16="http://schemas.microsoft.com/office/drawing/2014/main" id="{ACAA7557-4583-4CE5-9450-333B91340133}"/>
+              </a:ext>
+            </a:extLst>
+          </p:cNvPr>
+          <p:cNvSpPr>
+            <a:spLocks noGrp="1"/>
+          </p:cNvSpPr>
+          <p:nvPr>
+            <p:ph type="title"/>
+          </p:nvPr>
+        </p:nvSpPr>
+        <p:spPr>
+          <a:xfrm>
+            <a:off x="838200" y="365125"/>
+            <a:ext cx="5257800" cy="1325563"/>
+          </a:xfrm>
+        </p:spPr>
+        <p:txBody>
+          <a:bodyPr>
+            <a:normAutofit/>
+          </a:bodyPr>
+          <a:lstStyle/>
+          <a:p>
+            <a:r>
+              <a:rPr lang="en-US" sz="4000" dirty="0"/>
+              <a:t>Status and Conclusions</a:t>
+            </a:r>
+          </a:p>
+        </p:txBody>
+      </p:sp>
+      <p:sp>
+        <p:nvSpPr>
+          <p:cNvPr id="5" name="Content Placeholder 4">
+            <a:extLst>
+              <a:ext uri="{FF2B5EF4-FFF2-40B4-BE49-F238E27FC236}">
+                <a16:creationId xmlns:a16="http://schemas.microsoft.com/office/drawing/2014/main" id="{F59047EB-518C-4D47-AE0E-61C2D22A203D}"/>
+              </a:ext>
+            </a:extLst>
+          </p:cNvPr>
+          <p:cNvSpPr>
+            <a:spLocks noGrp="1"/>
+          </p:cNvSpPr>
+          <p:nvPr>
+            <p:ph sz="half" idx="1"/>
+          </p:nvPr>
+        </p:nvSpPr>
+        <p:spPr>
+          <a:xfrm>
+            <a:off x="767371" y="1603420"/>
+            <a:ext cx="5181600" cy="4573543"/>
+          </a:xfrm>
+        </p:spPr>
+        <p:txBody>
+          <a:bodyPr/>
+          <a:lstStyle/>
+          <a:p>
+            <a:r>
+              <a:rPr lang="en-US" dirty="0"/>
+              <a:t>Status - </a:t>
+            </a:r>
+            <a:r>
+              <a:rPr lang="en-US" sz="2400" dirty="0">
+                <a:hlinkClick r:id="rId2"/>
+              </a:rPr>
+              <a:t>https://JimFawcett.github.io</a:t>
+            </a:r>
+            <a:r>
+              <a:rPr lang="en-US" sz="2400" dirty="0"/>
+              <a:t>: </a:t>
+            </a:r>
+            <a:endParaRPr lang="en-US" dirty="0"/>
+          </a:p>
+          <a:p>
+            <a:pPr lvl="1"/>
+            <a:r>
+              <a:rPr lang="en-US" dirty="0"/>
+              <a:t>Most of the structure described is in place</a:t>
+            </a:r>
+          </a:p>
+          <a:p>
+            <a:pPr lvl="1"/>
+            <a:r>
+              <a:rPr lang="en-US" dirty="0"/>
+              <a:t>More than 40 repositories of mostly C++ code are published</a:t>
+            </a:r>
+          </a:p>
+          <a:p>
+            <a:pPr lvl="1"/>
+            <a:r>
+              <a:rPr lang="en-US" dirty="0"/>
+              <a:t>Several stories are published</a:t>
+            </a:r>
+          </a:p>
+          <a:p>
+            <a:pPr lvl="1"/>
+            <a:r>
+              <a:rPr lang="en-US" dirty="0"/>
+              <a:t>Other resources and </a:t>
+            </a:r>
+            <a:r>
+              <a:rPr lang="en-US" dirty="0" err="1"/>
+              <a:t>CodeSnaps</a:t>
+            </a:r>
+            <a:r>
+              <a:rPr lang="en-US" dirty="0"/>
+              <a:t> are available from the site</a:t>
+            </a:r>
+          </a:p>
+          <a:p>
+            <a:r>
+              <a:rPr lang="en-US" dirty="0"/>
+              <a:t>Plans</a:t>
+            </a:r>
+          </a:p>
+          <a:p>
+            <a:pPr lvl="1"/>
+            <a:r>
+              <a:rPr lang="en-US" dirty="0"/>
+              <a:t>Install more code repositories</a:t>
+            </a:r>
+          </a:p>
+          <a:p>
+            <a:pPr lvl="1"/>
+            <a:r>
+              <a:rPr lang="en-US" dirty="0"/>
+              <a:t>Start to add videos</a:t>
+            </a:r>
+          </a:p>
+        </p:txBody>
+      </p:sp>
+      <p:sp>
+        <p:nvSpPr>
+          <p:cNvPr id="6" name="Content Placeholder 5">
+            <a:extLst>
+              <a:ext uri="{FF2B5EF4-FFF2-40B4-BE49-F238E27FC236}">
+                <a16:creationId xmlns:a16="http://schemas.microsoft.com/office/drawing/2014/main" id="{FE80FAEC-8AE9-4AB5-9C84-5EEDD2807033}"/>
+              </a:ext>
+            </a:extLst>
+          </p:cNvPr>
+          <p:cNvSpPr>
+            <a:spLocks noGrp="1"/>
+          </p:cNvSpPr>
+          <p:nvPr>
+            <p:ph sz="half" idx="2"/>
+          </p:nvPr>
+        </p:nvSpPr>
+        <p:spPr>
+          <a:xfrm>
+            <a:off x="6096000" y="1629163"/>
+            <a:ext cx="5296434" cy="5455746"/>
+          </a:xfrm>
+        </p:spPr>
+        <p:txBody>
+          <a:bodyPr/>
+          <a:lstStyle/>
+          <a:p>
+            <a:r>
+              <a:rPr lang="en-US" dirty="0"/>
+              <a:t>Conclusions:</a:t>
+            </a:r>
+          </a:p>
+          <a:p>
+            <a:pPr lvl="1"/>
+            <a:r>
+              <a:rPr lang="en-US" dirty="0"/>
+              <a:t>Static sites seem like a good tool for publishing</a:t>
+            </a:r>
+          </a:p>
+          <a:p>
+            <a:pPr lvl="2"/>
+            <a:r>
+              <a:rPr lang="en-US" dirty="0"/>
+              <a:t>Main issue is text or keyword searches not available with static sites</a:t>
+            </a:r>
+          </a:p>
+          <a:p>
+            <a:pPr lvl="2"/>
+            <a:r>
+              <a:rPr lang="en-US" dirty="0"/>
+              <a:t>Can be addressed with local mirror and tools for synchronizing and local searching</a:t>
+            </a:r>
+          </a:p>
+          <a:p>
+            <a:pPr lvl="1"/>
+            <a:r>
+              <a:rPr lang="en-US" dirty="0"/>
+              <a:t>Required effort is reasonable for the expected payoff</a:t>
+            </a:r>
+          </a:p>
+          <a:p>
+            <a:pPr lvl="2"/>
+            <a:r>
+              <a:rPr lang="en-US" dirty="0"/>
+              <a:t>This site went from zero to current status in four months of my time</a:t>
+            </a:r>
+          </a:p>
+          <a:p>
+            <a:pPr lvl="2"/>
+            <a:r>
+              <a:rPr lang="en-US" dirty="0"/>
+              <a:t>However, I’ve built a site like this before.</a:t>
+            </a:r>
+          </a:p>
+        </p:txBody>
+      </p:sp>
+      <p:sp>
+        <p:nvSpPr>
+          <p:cNvPr id="4" name="Slide Number Placeholder 3">
+            <a:extLst>
+              <a:ext uri="{FF2B5EF4-FFF2-40B4-BE49-F238E27FC236}">
+                <a16:creationId xmlns:a16="http://schemas.microsoft.com/office/drawing/2014/main" id="{A5C2B86A-AE47-44AF-9978-587D3DAADB7B}"/>
+              </a:ext>
+            </a:extLst>
+          </p:cNvPr>
+          <p:cNvSpPr>
+            <a:spLocks noGrp="1"/>
+          </p:cNvSpPr>
+          <p:nvPr>
+            <p:ph type="sldNum" sz="quarter" idx="12"/>
           </p:nvPr>
         </p:nvSpPr>
         <p:spPr/>
@@ -5941,17 +6071,18 @@
           <a:bodyPr/>
           <a:lstStyle/>
           <a:p>
-            <a:r>
-              <a:rPr lang="en-US" dirty="0"/>
-              <a:t>Appendix - Domains</a:t>
-            </a:r>
+            <a:fld id="{EDEBF0BA-A897-4C1E-AB3C-F330808C0E1D}" type="slidenum">
+              <a:rPr lang="en-US" smtClean="0"/>
+              <a:t>17</a:t>
+            </a:fld>
+            <a:endParaRPr lang="en-US"/>
           </a:p>
         </p:txBody>
       </p:sp>
     </p:spTree>
     <p:extLst>
       <p:ext uri="{BB962C8B-B14F-4D97-AF65-F5344CB8AC3E}">
-        <p14:creationId xmlns:p14="http://schemas.microsoft.com/office/powerpoint/2010/main" val="1857873718"/>
+        <p14:creationId xmlns:p14="http://schemas.microsoft.com/office/powerpoint/2010/main" val="2191199278"/>
       </p:ext>
     </p:extLst>
   </p:cSld>
@@ -5983,140 +6114,15 @@
           <p:cNvPr id="2" name="Title 1">
             <a:extLst>
               <a:ext uri="{FF2B5EF4-FFF2-40B4-BE49-F238E27FC236}">
-                <a16:creationId xmlns:a16="http://schemas.microsoft.com/office/drawing/2014/main" id="{C818CF9C-B350-4936-99E1-D89031958E0C}"/>
-              </a:ext>
-            </a:extLst>
-          </p:cNvPr>
-          <p:cNvSpPr>
-            <a:spLocks noGrp="1"/>
-          </p:cNvSpPr>
-          <p:nvPr>
-            <p:ph type="title"/>
-          </p:nvPr>
-        </p:nvSpPr>
-        <p:spPr>
-          <a:xfrm>
-            <a:off x="838200" y="339367"/>
-            <a:ext cx="10515600" cy="678161"/>
-          </a:xfrm>
-        </p:spPr>
-        <p:txBody>
-          <a:bodyPr/>
-          <a:lstStyle/>
-          <a:p>
-            <a:r>
-              <a:rPr lang="en-US" dirty="0"/>
-              <a:t>Academic Research Domain</a:t>
-            </a:r>
-          </a:p>
-        </p:txBody>
-      </p:sp>
-      <p:sp>
-        <p:nvSpPr>
-          <p:cNvPr id="3" name="Content Placeholder 2">
-            <a:extLst>
-              <a:ext uri="{FF2B5EF4-FFF2-40B4-BE49-F238E27FC236}">
-                <a16:creationId xmlns:a16="http://schemas.microsoft.com/office/drawing/2014/main" id="{C65F66DE-FE31-4539-83AE-36CA6E637596}"/>
-              </a:ext>
-            </a:extLst>
-          </p:cNvPr>
-          <p:cNvSpPr>
-            <a:spLocks noGrp="1"/>
-          </p:cNvSpPr>
-          <p:nvPr>
-            <p:ph idx="1"/>
-          </p:nvPr>
-        </p:nvSpPr>
-        <p:spPr>
-          <a:xfrm>
-            <a:off x="838200" y="1017529"/>
-            <a:ext cx="10515600" cy="5355770"/>
-          </a:xfrm>
-        </p:spPr>
-        <p:txBody>
-          <a:bodyPr>
-            <a:noAutofit/>
-          </a:bodyPr>
-          <a:lstStyle/>
-          <a:p>
-            <a:r>
-              <a:rPr lang="en-US" sz="2000" dirty="0"/>
-              <a:t>Academic Research: 5 – 10 code developers</a:t>
-            </a:r>
-          </a:p>
-          <a:p>
-            <a:pPr lvl="1"/>
-            <a:r>
-              <a:rPr lang="en-US" sz="1800" dirty="0"/>
-              <a:t>Code life-time: 3 – 5 years</a:t>
-            </a:r>
-          </a:p>
-          <a:p>
-            <a:pPr lvl="1"/>
-            <a:r>
-              <a:rPr lang="en-US" sz="1800" dirty="0"/>
-              <a:t>Example: Natural Language Processing (NLP)</a:t>
-            </a:r>
-          </a:p>
-          <a:p>
-            <a:r>
-              <a:rPr lang="en-US" sz="2000" dirty="0"/>
-              <a:t>An academic researcher may have 2 or 3 doctoral candidates working on related parts of a research project.</a:t>
-            </a:r>
-          </a:p>
-          <a:p>
-            <a:r>
-              <a:rPr lang="en-US" sz="2000" dirty="0"/>
-              <a:t>She may collaborate with two or three colleagues, perhaps at different universities.</a:t>
-            </a:r>
-          </a:p>
-          <a:p>
-            <a:pPr lvl="1"/>
-            <a:r>
-              <a:rPr lang="en-US" sz="1800" dirty="0"/>
-              <a:t>Each of those colleagues may have a similar team working on related projects.</a:t>
-            </a:r>
-          </a:p>
-          <a:p>
-            <a:r>
-              <a:rPr lang="en-US" sz="2200" dirty="0"/>
-              <a:t>There usually is continuing work on the same or related research projects for many years.</a:t>
-            </a:r>
-          </a:p>
-          <a:p>
-            <a:r>
-              <a:rPr lang="en-US" sz="2200" dirty="0"/>
-              <a:t>It is quite common that this work develops software tools for gathering and analyzing data.  Sometimes software is part of the end product, e.g., compilers for a new language, an architecture for streaming or classifying content, …</a:t>
-            </a:r>
-          </a:p>
-          <a:p>
-            <a:r>
-              <a:rPr lang="en-US" sz="2200" dirty="0"/>
-              <a:t>These software developments are rarely maintained well.  Often documentation is nothing but code and the papers that describe research results and mention the software as an aside.</a:t>
-            </a:r>
-          </a:p>
-          <a:p>
-            <a:r>
-              <a:rPr lang="en-US" sz="2200" dirty="0"/>
-              <a:t>Software exchange is often ad-hoc.</a:t>
-            </a:r>
-          </a:p>
-        </p:txBody>
-      </p:sp>
-      <p:sp>
-        <p:nvSpPr>
-          <p:cNvPr id="4" name="Slide Number Placeholder 3">
-            <a:extLst>
-              <a:ext uri="{FF2B5EF4-FFF2-40B4-BE49-F238E27FC236}">
-                <a16:creationId xmlns:a16="http://schemas.microsoft.com/office/drawing/2014/main" id="{B11F232F-AB6D-4130-9246-6A1AF1E6451D}"/>
-              </a:ext>
-            </a:extLst>
-          </p:cNvPr>
-          <p:cNvSpPr>
-            <a:spLocks noGrp="1"/>
-          </p:cNvSpPr>
-          <p:nvPr>
-            <p:ph type="sldNum" sz="quarter" idx="12"/>
+                <a16:creationId xmlns:a16="http://schemas.microsoft.com/office/drawing/2014/main" id="{508F2C2D-8A1E-4157-B36F-A4E30EAA74CE}"/>
+              </a:ext>
+            </a:extLst>
+          </p:cNvPr>
+          <p:cNvSpPr>
+            <a:spLocks noGrp="1"/>
+          </p:cNvSpPr>
+          <p:nvPr>
+            <p:ph type="ctrTitle"/>
           </p:nvPr>
         </p:nvSpPr>
         <p:spPr/>
@@ -6124,18 +6130,17 @@
           <a:bodyPr/>
           <a:lstStyle/>
           <a:p>
-            <a:fld id="{EDEBF0BA-A897-4C1E-AB3C-F330808C0E1D}" type="slidenum">
-              <a:rPr lang="en-US" smtClean="0"/>
-              <a:t>18</a:t>
-            </a:fld>
-            <a:endParaRPr lang="en-US"/>
+            <a:r>
+              <a:rPr lang="en-US" dirty="0"/>
+              <a:t>Appendix - Domains</a:t>
+            </a:r>
           </a:p>
         </p:txBody>
       </p:sp>
     </p:spTree>
     <p:extLst>
       <p:ext uri="{BB962C8B-B14F-4D97-AF65-F5344CB8AC3E}">
-        <p14:creationId xmlns:p14="http://schemas.microsoft.com/office/powerpoint/2010/main" val="3236624771"/>
+        <p14:creationId xmlns:p14="http://schemas.microsoft.com/office/powerpoint/2010/main" val="1857873718"/>
       </p:ext>
     </p:extLst>
   </p:cSld>
@@ -6190,7 +6195,7 @@
           <a:p>
             <a:r>
               <a:rPr lang="en-US" dirty="0"/>
-              <a:t>Open Source Domain</a:t>
+              <a:t>Academic Research Domain</a:t>
             </a:r>
           </a:p>
         </p:txBody>
@@ -6213,7 +6218,7 @@
         </p:nvSpPr>
         <p:spPr>
           <a:xfrm>
-            <a:off x="838200" y="1216909"/>
+            <a:off x="838200" y="1017529"/>
             <a:ext cx="10515600" cy="5355770"/>
           </a:xfrm>
         </p:spPr>
@@ -6225,99 +6230,65 @@
           <a:p>
             <a:r>
               <a:rPr lang="en-US" sz="2000" dirty="0"/>
-              <a:t>Open Source Development: 5 – 1000 active developers, many casual contributors</a:t>
+              <a:t>Academic Research: 5 – 10 code developers</a:t>
             </a:r>
           </a:p>
           <a:p>
             <a:pPr lvl="1"/>
             <a:r>
               <a:rPr lang="en-US" sz="1800" dirty="0"/>
-              <a:t>Code life-time: 10 - 20 years</a:t>
+              <a:t>Code life-time: 3 – 5 years</a:t>
             </a:r>
           </a:p>
           <a:p>
             <a:pPr lvl="1"/>
             <a:r>
               <a:rPr lang="en-US" sz="1800" dirty="0"/>
-              <a:t>Examples: Linux, Node.js, MongoDB</a:t>
+              <a:t>Example: Natural Language Processing (NLP)</a:t>
+            </a:r>
+          </a:p>
+          <a:p>
+            <a:r>
+              <a:rPr lang="en-US" sz="2000" dirty="0"/>
+              <a:t>An academic researcher may have 2 or 3 doctoral candidates working on related parts of a research project.</a:t>
+            </a:r>
+          </a:p>
+          <a:p>
+            <a:r>
+              <a:rPr lang="en-US" sz="2000" dirty="0"/>
+              <a:t>She may collaborate with two or three colleagues, perhaps at different universities.</a:t>
+            </a:r>
+          </a:p>
+          <a:p>
+            <a:pPr lvl="1"/>
+            <a:r>
+              <a:rPr lang="en-US" sz="1800" dirty="0"/>
+              <a:t>Each of those colleagues may have a similar team working on related projects.</a:t>
             </a:r>
           </a:p>
           <a:p>
             <a:r>
               <a:rPr lang="en-US" sz="2200" dirty="0"/>
-              <a:t>Following an initial period of development, a project often settles into a maintenance mode:</a:t>
-            </a:r>
-          </a:p>
-          <a:p>
-            <a:pPr lvl="1"/>
-            <a:r>
-              <a:rPr lang="en-US" sz="1800" dirty="0"/>
-              <a:t>Maintain the same mission and design.</a:t>
-            </a:r>
-          </a:p>
-          <a:p>
-            <a:pPr lvl="1"/>
-            <a:r>
-              <a:rPr lang="en-US" sz="1800" dirty="0"/>
-              <a:t>Add new features and port to new platforms.</a:t>
+              <a:t>There usually is continuing work on the same or related research projects for many years.</a:t>
             </a:r>
           </a:p>
           <a:p>
             <a:r>
               <a:rPr lang="en-US" sz="2200" dirty="0"/>
-              <a:t>Occasionally revise most of the code and support new missions.</a:t>
+              <a:t>It is quite common that this work develops software tools for gathering and analyzing data.  Sometimes software is part of the end product, e.g., compilers for a new language, an architecture for streaming or classifying content, …</a:t>
             </a:r>
           </a:p>
           <a:p>
             <a:r>
               <a:rPr lang="en-US" sz="2200" dirty="0"/>
-              <a:t>Documentation varies from poor to outstanding.</a:t>
-            </a:r>
-          </a:p>
-          <a:p>
-            <a:pPr lvl="1"/>
-            <a:r>
-              <a:rPr lang="en-US" sz="1800" dirty="0"/>
-              <a:t>Linux documentation is one of the outstanding ones: </a:t>
-            </a:r>
-          </a:p>
-          <a:p>
-            <a:pPr lvl="2"/>
-            <a:r>
-              <a:rPr lang="en-US" sz="1400" dirty="0">
-                <a:hlinkClick r:id="rId2"/>
-              </a:rPr>
-              <a:t>https://www.kernel.org/doc/html/v4.10/index.html</a:t>
-            </a:r>
-            <a:r>
-              <a:rPr lang="en-US" sz="1400" dirty="0"/>
-              <a:t> </a:t>
-            </a:r>
-          </a:p>
-          <a:p>
-            <a:pPr lvl="1"/>
-            <a:r>
-              <a:rPr lang="en-US" sz="1800" dirty="0"/>
-              <a:t>Some projects focus on </a:t>
-            </a:r>
-            <a:r>
-              <a:rPr lang="en-US" sz="1800" dirty="0" err="1"/>
-              <a:t>api</a:t>
-            </a:r>
-            <a:r>
-              <a:rPr lang="en-US" sz="1800" dirty="0"/>
-              <a:t> level documentation – how to use the code.</a:t>
-            </a:r>
-          </a:p>
-          <a:p>
-            <a:pPr lvl="1"/>
-            <a:r>
-              <a:rPr lang="en-US" sz="1800" dirty="0"/>
-              <a:t>Some focus on maintenance – what are the parts, how are they related, code standards, …</a:t>
-            </a:r>
-          </a:p>
-          <a:p>
-            <a:endParaRPr lang="en-US" sz="2200" dirty="0"/>
+              <a:t>These software developments are rarely maintained well.  Often documentation is nothing but code and the papers that describe research results and mention the software as an aside.</a:t>
+            </a:r>
+          </a:p>
+          <a:p>
+            <a:r>
+              <a:rPr lang="en-US" sz="2200" dirty="0"/>
+              <a:t>Software exchange is often ad-hoc.</a:t>
+            </a:r>
           </a:p>
         </p:txBody>
       </p:sp>
@@ -6326,7 +6297,7 @@
           <p:cNvPr id="4" name="Slide Number Placeholder 3">
             <a:extLst>
               <a:ext uri="{FF2B5EF4-FFF2-40B4-BE49-F238E27FC236}">
-                <a16:creationId xmlns:a16="http://schemas.microsoft.com/office/drawing/2014/main" id="{322EE9A1-C48D-4BEF-9075-0B0169EC94DF}"/>
+                <a16:creationId xmlns:a16="http://schemas.microsoft.com/office/drawing/2014/main" id="{B11F232F-AB6D-4130-9246-6A1AF1E6451D}"/>
               </a:ext>
             </a:extLst>
           </p:cNvPr>
@@ -6353,7 +6324,7 @@
     </p:spTree>
     <p:extLst>
       <p:ext uri="{BB962C8B-B14F-4D97-AF65-F5344CB8AC3E}">
-        <p14:creationId xmlns:p14="http://schemas.microsoft.com/office/powerpoint/2010/main" val="891542893"/>
+        <p14:creationId xmlns:p14="http://schemas.microsoft.com/office/powerpoint/2010/main" val="3236624771"/>
       </p:ext>
     </p:extLst>
   </p:cSld>
@@ -6385,7 +6356,7 @@
           <p:cNvPr id="2" name="Title 1">
             <a:extLst>
               <a:ext uri="{FF2B5EF4-FFF2-40B4-BE49-F238E27FC236}">
-                <a16:creationId xmlns:a16="http://schemas.microsoft.com/office/drawing/2014/main" id="{C818CF9C-B350-4936-99E1-D89031958E0C}"/>
+                <a16:creationId xmlns:a16="http://schemas.microsoft.com/office/drawing/2014/main" id="{79DD350B-D16A-4094-A81A-3C2D95DE90DB}"/>
               </a:ext>
             </a:extLst>
           </p:cNvPr>
@@ -6399,7 +6370,7 @@
         <p:spPr>
           <a:xfrm>
             <a:off x="838200" y="339367"/>
-            <a:ext cx="10515600" cy="678161"/>
+            <a:ext cx="10515600" cy="736019"/>
           </a:xfrm>
         </p:spPr>
         <p:txBody>
@@ -6408,7 +6379,7 @@
           <a:p>
             <a:r>
               <a:rPr lang="en-US" dirty="0"/>
-              <a:t>Application Domains</a:t>
+              <a:t>Prologue</a:t>
             </a:r>
           </a:p>
         </p:txBody>
@@ -6418,7 +6389,7 @@
           <p:cNvPr id="3" name="Content Placeholder 2">
             <a:extLst>
               <a:ext uri="{FF2B5EF4-FFF2-40B4-BE49-F238E27FC236}">
-                <a16:creationId xmlns:a16="http://schemas.microsoft.com/office/drawing/2014/main" id="{C65F66DE-FE31-4539-83AE-36CA6E637596}"/>
+                <a16:creationId xmlns:a16="http://schemas.microsoft.com/office/drawing/2014/main" id="{91B37E16-8559-4302-8066-83892DD70A2C}"/>
               </a:ext>
             </a:extLst>
           </p:cNvPr>
@@ -6431,113 +6402,80 @@
         </p:nvSpPr>
         <p:spPr>
           <a:xfrm>
-            <a:off x="838200" y="1017529"/>
-            <a:ext cx="10515600" cy="5355770"/>
+            <a:off x="838200" y="1326523"/>
+            <a:ext cx="10515600" cy="4605741"/>
           </a:xfrm>
         </p:spPr>
         <p:txBody>
-          <a:bodyPr>
-            <a:noAutofit/>
-          </a:bodyPr>
-          <a:lstStyle/>
-          <a:p>
-            <a:r>
-              <a:rPr lang="en-US" sz="2000" dirty="0"/>
-              <a:t>Academic Research: 5 – 10 code developers</a:t>
-            </a:r>
-          </a:p>
-          <a:p>
-            <a:pPr lvl="1"/>
-            <a:r>
-              <a:rPr lang="en-US" sz="1800" dirty="0"/>
-              <a:t>Code life-time: 3 – 5 years</a:t>
-            </a:r>
-          </a:p>
-          <a:p>
-            <a:pPr lvl="1"/>
-            <a:r>
-              <a:rPr lang="en-US" sz="1800" dirty="0"/>
-              <a:t>Example: Natural Language Processing (NLP)</a:t>
-            </a:r>
-          </a:p>
-          <a:p>
-            <a:r>
-              <a:rPr lang="en-US" sz="2000" dirty="0"/>
-              <a:t>Open Source Development: 5 – 1000 active developers, many casual contributors</a:t>
-            </a:r>
-          </a:p>
-          <a:p>
-            <a:pPr lvl="1"/>
-            <a:r>
-              <a:rPr lang="en-US" sz="1800" dirty="0"/>
-              <a:t>Code life-time: 10 - 20 years</a:t>
-            </a:r>
-          </a:p>
-          <a:p>
-            <a:pPr lvl="1"/>
-            <a:r>
-              <a:rPr lang="en-US" sz="1800" dirty="0"/>
-              <a:t>Example: Linux</a:t>
-            </a:r>
-          </a:p>
-          <a:p>
-            <a:r>
-              <a:rPr lang="en-US" sz="2000" dirty="0"/>
-              <a:t>Industrial Development: 5 – 10 developers</a:t>
-            </a:r>
-          </a:p>
-          <a:p>
-            <a:pPr lvl="1"/>
-            <a:r>
-              <a:rPr lang="en-US" sz="1800" dirty="0"/>
-              <a:t>Code life-time: 5 – 20 years</a:t>
-            </a:r>
-          </a:p>
-          <a:p>
-            <a:pPr lvl="1"/>
-            <a:r>
-              <a:rPr lang="en-US" sz="1800" dirty="0"/>
-              <a:t>Example: Machine Tool Control</a:t>
-            </a:r>
-          </a:p>
-          <a:p>
-            <a:r>
-              <a:rPr lang="en-US" sz="2000" dirty="0"/>
-              <a:t>Commercial Products: 10 – 30 developers</a:t>
-            </a:r>
-          </a:p>
-          <a:p>
-            <a:pPr lvl="1"/>
-            <a:r>
-              <a:rPr lang="en-US" sz="1800" dirty="0"/>
-              <a:t>Code life-time: 20 – 30 years</a:t>
-            </a:r>
-          </a:p>
-          <a:p>
-            <a:pPr lvl="1"/>
-            <a:r>
-              <a:rPr lang="en-US" sz="1800" dirty="0"/>
-              <a:t>Example: Microsoft Word</a:t>
-            </a:r>
-          </a:p>
-          <a:p>
-            <a:r>
-              <a:rPr lang="en-US" sz="2000" dirty="0"/>
-              <a:t>Aerospace Programs: 5 – 200 developers</a:t>
-            </a:r>
-          </a:p>
-          <a:p>
-            <a:pPr lvl="1"/>
-            <a:r>
-              <a:rPr lang="en-US" sz="1600" dirty="0"/>
-              <a:t>Code life-time: 20 – 30 years</a:t>
-            </a:r>
-          </a:p>
-          <a:p>
-            <a:pPr lvl="1"/>
-            <a:r>
-              <a:rPr lang="en-US" sz="1600" dirty="0"/>
-              <a:t>Example: Submarine control, Area surveillance, ..</a:t>
+          <a:bodyPr/>
+          <a:lstStyle/>
+          <a:p>
+            <a:r>
+              <a:rPr lang="en-US" dirty="0"/>
+              <a:t>This is a presentation of goals and accomplishments of a website designed to publish source code to support software reuse.</a:t>
+            </a:r>
+          </a:p>
+          <a:p>
+            <a:pPr lvl="1"/>
+            <a:r>
+              <a:rPr lang="en-US" dirty="0">
+                <a:hlinkClick r:id="rId2"/>
+              </a:rPr>
+              <a:t>https://JimFawcett.github.io</a:t>
+            </a:r>
+            <a:r>
+              <a:rPr lang="en-US" dirty="0"/>
+              <a:t> </a:t>
+            </a:r>
+            <a:br>
+              <a:rPr lang="en-US" dirty="0"/>
+            </a:br>
+            <a:r>
+              <a:rPr lang="en-US" sz="400" dirty="0"/>
+              <a:t> </a:t>
+            </a:r>
+            <a:endParaRPr lang="en-US" dirty="0"/>
+          </a:p>
+          <a:p>
+            <a:endParaRPr lang="en-US" sz="100" dirty="0"/>
+          </a:p>
+          <a:p>
+            <a:r>
+              <a:rPr lang="en-US" dirty="0"/>
+              <a:t>The site is a second-generation facility based on experience with an academic website:</a:t>
+            </a:r>
+          </a:p>
+          <a:p>
+            <a:pPr lvl="1"/>
+            <a:r>
+              <a:rPr lang="en-US" dirty="0">
+                <a:hlinkClick r:id="rId3"/>
+              </a:rPr>
+              <a:t>https://ecs.syr.edu/faculty/fawcett/handouts/Webpages/fawcettHome.htm</a:t>
+            </a:r>
+            <a:endParaRPr lang="en-US" dirty="0"/>
+          </a:p>
+          <a:p>
+            <a:endParaRPr lang="en-US" sz="800" dirty="0"/>
+          </a:p>
+          <a:p>
+            <a:r>
+              <a:rPr lang="en-US" dirty="0"/>
+              <a:t>I used that site for graduate software design courses taught at Syracuse University for many years.</a:t>
+            </a:r>
+          </a:p>
+          <a:p>
+            <a:pPr lvl="1"/>
+            <a:r>
+              <a:rPr lang="en-US" dirty="0"/>
+              <a:t>Published lecture content</a:t>
+            </a:r>
+          </a:p>
+          <a:p>
+            <a:pPr lvl="1"/>
+            <a:r>
+              <a:rPr lang="en-US" dirty="0"/>
+              <a:t>Provided access to code components students used for class projects</a:t>
             </a:r>
           </a:p>
         </p:txBody>
@@ -6547,7 +6485,7 @@
           <p:cNvPr id="4" name="Slide Number Placeholder 3">
             <a:extLst>
               <a:ext uri="{FF2B5EF4-FFF2-40B4-BE49-F238E27FC236}">
-                <a16:creationId xmlns:a16="http://schemas.microsoft.com/office/drawing/2014/main" id="{F980341C-B802-4DB5-8B01-9BF021EDC77D}"/>
+                <a16:creationId xmlns:a16="http://schemas.microsoft.com/office/drawing/2014/main" id="{FFFF6527-161D-42F8-9DD6-F507EB23272D}"/>
               </a:ext>
             </a:extLst>
           </p:cNvPr>
@@ -6574,7 +6512,7 @@
     </p:spTree>
     <p:extLst>
       <p:ext uri="{BB962C8B-B14F-4D97-AF65-F5344CB8AC3E}">
-        <p14:creationId xmlns:p14="http://schemas.microsoft.com/office/powerpoint/2010/main" val="3351627177"/>
+        <p14:creationId xmlns:p14="http://schemas.microsoft.com/office/powerpoint/2010/main" val="3203741197"/>
       </p:ext>
     </p:extLst>
   </p:cSld>
@@ -6629,7 +6567,7 @@
           <a:p>
             <a:r>
               <a:rPr lang="en-US" dirty="0"/>
-              <a:t>Industrial Development Domain</a:t>
+              <a:t>Open Source Domain</a:t>
             </a:r>
           </a:p>
         </p:txBody>
@@ -6652,8 +6590,8 @@
         </p:nvSpPr>
         <p:spPr>
           <a:xfrm>
-            <a:off x="838200" y="1268569"/>
-            <a:ext cx="10515600" cy="5104730"/>
+            <a:off x="838200" y="1216909"/>
+            <a:ext cx="10515600" cy="5355770"/>
           </a:xfrm>
         </p:spPr>
         <p:txBody>
@@ -6664,62 +6602,99 @@
           <a:p>
             <a:r>
               <a:rPr lang="en-US" sz="2000" dirty="0"/>
-              <a:t>Industrial Development: 5 – 10 developers</a:t>
+              <a:t>Open Source Development: 5 – 1000 active developers, many casual contributors</a:t>
             </a:r>
           </a:p>
           <a:p>
             <a:pPr lvl="1"/>
             <a:r>
               <a:rPr lang="en-US" sz="1800" dirty="0"/>
-              <a:t>Code life-time: 5 – 20 years</a:t>
+              <a:t>Code life-time: 10 - 20 years</a:t>
             </a:r>
           </a:p>
           <a:p>
             <a:pPr lvl="1"/>
             <a:r>
               <a:rPr lang="en-US" sz="1800" dirty="0"/>
-              <a:t>Example: Machine Tool Control</a:t>
+              <a:t>Examples: Linux, Node.js, MongoDB</a:t>
             </a:r>
           </a:p>
           <a:p>
             <a:r>
               <a:rPr lang="en-US" sz="2200" dirty="0"/>
-              <a:t>Code base starts with an initial product</a:t>
+              <a:t>Following an initial period of development, a project often settles into a maintenance mode:</a:t>
+            </a:r>
+          </a:p>
+          <a:p>
+            <a:pPr lvl="1"/>
+            <a:r>
+              <a:rPr lang="en-US" sz="1800" dirty="0"/>
+              <a:t>Maintain the same mission and design.</a:t>
+            </a:r>
+          </a:p>
+          <a:p>
+            <a:pPr lvl="1"/>
+            <a:r>
+              <a:rPr lang="en-US" sz="1800" dirty="0"/>
+              <a:t>Add new features and port to new platforms.</a:t>
             </a:r>
           </a:p>
           <a:p>
             <a:r>
               <a:rPr lang="en-US" sz="2200" dirty="0"/>
-              <a:t>New products start from that initial code</a:t>
+              <a:t>Occasionally revise most of the code and support new missions.</a:t>
+            </a:r>
+          </a:p>
+          <a:p>
+            <a:r>
+              <a:rPr lang="en-US" sz="2200" dirty="0"/>
+              <a:t>Documentation varies from poor to outstanding.</a:t>
             </a:r>
           </a:p>
           <a:p>
             <a:pPr lvl="1"/>
             <a:r>
               <a:rPr lang="en-US" sz="1800" dirty="0"/>
-              <a:t>Has a common code baseline been defined?</a:t>
+              <a:t>Linux documentation is one of the outstanding ones: </a:t>
+            </a:r>
+          </a:p>
+          <a:p>
+            <a:pPr lvl="2"/>
+            <a:r>
+              <a:rPr lang="en-US" sz="1400" dirty="0">
+                <a:hlinkClick r:id="rId2"/>
+              </a:rPr>
+              <a:t>https://www.kernel.org/doc/html/v4.10/index.html</a:t>
+            </a:r>
+            <a:r>
+              <a:rPr lang="en-US" sz="1400" dirty="0"/>
+              <a:t> </a:t>
             </a:r>
           </a:p>
           <a:p>
             <a:pPr lvl="1"/>
             <a:r>
               <a:rPr lang="en-US" sz="1800" dirty="0"/>
-              <a:t>Code reviews are held during development</a:t>
-            </a:r>
-          </a:p>
-          <a:p>
-            <a:pPr lvl="1"/>
+              <a:t>Some projects focus on </a:t>
+            </a:r>
+            <a:r>
+              <a:rPr lang="en-US" sz="1800" dirty="0" err="1"/>
+              <a:t>api</a:t>
+            </a:r>
             <a:r>
               <a:rPr lang="en-US" sz="1800" dirty="0"/>
-              <a:t>At product completion is code reviewed and refactored into reusable parts and product specific code?</a:t>
+              <a:t> level documentation – how to use the code.</a:t>
             </a:r>
           </a:p>
           <a:p>
             <a:pPr lvl="1"/>
             <a:r>
               <a:rPr lang="en-US" sz="1800" dirty="0"/>
-              <a:t>Is the organization willing to provide overhead effort to evolve the common code base?</a:t>
-            </a:r>
+              <a:t>Some focus on maintenance – what are the parts, how are they related, code standards, …</a:t>
+            </a:r>
+          </a:p>
+          <a:p>
+            <a:endParaRPr lang="en-US" sz="2200" dirty="0"/>
           </a:p>
         </p:txBody>
       </p:sp>
@@ -6728,7 +6703,7 @@
           <p:cNvPr id="4" name="Slide Number Placeholder 3">
             <a:extLst>
               <a:ext uri="{FF2B5EF4-FFF2-40B4-BE49-F238E27FC236}">
-                <a16:creationId xmlns:a16="http://schemas.microsoft.com/office/drawing/2014/main" id="{A916C694-BD83-42C9-A8AC-D048E61AD071}"/>
+                <a16:creationId xmlns:a16="http://schemas.microsoft.com/office/drawing/2014/main" id="{322EE9A1-C48D-4BEF-9075-0B0169EC94DF}"/>
               </a:ext>
             </a:extLst>
           </p:cNvPr>
@@ -6755,7 +6730,7 @@
     </p:spTree>
     <p:extLst>
       <p:ext uri="{BB962C8B-B14F-4D97-AF65-F5344CB8AC3E}">
-        <p14:creationId xmlns:p14="http://schemas.microsoft.com/office/powerpoint/2010/main" val="1744719603"/>
+        <p14:creationId xmlns:p14="http://schemas.microsoft.com/office/powerpoint/2010/main" val="891542893"/>
       </p:ext>
     </p:extLst>
   </p:cSld>
@@ -6810,7 +6785,7 @@
           <a:p>
             <a:r>
               <a:rPr lang="en-US" dirty="0"/>
-              <a:t>Commercial Domain</a:t>
+              <a:t>Industrial Development Domain</a:t>
             </a:r>
           </a:p>
         </p:txBody>
@@ -6833,8 +6808,8 @@
         </p:nvSpPr>
         <p:spPr>
           <a:xfrm>
-            <a:off x="838200" y="1017529"/>
-            <a:ext cx="10515600" cy="5355770"/>
+            <a:off x="838200" y="1268569"/>
+            <a:ext cx="10515600" cy="5104730"/>
           </a:xfrm>
         </p:spPr>
         <p:txBody>
@@ -6845,119 +6820,62 @@
           <a:p>
             <a:r>
               <a:rPr lang="en-US" sz="2000" dirty="0"/>
-              <a:t>Commercial Products: </a:t>
+              <a:t>Industrial Development: 5 – 10 developers</a:t>
             </a:r>
           </a:p>
           <a:p>
             <a:pPr lvl="1"/>
             <a:r>
               <a:rPr lang="en-US" sz="1800" dirty="0"/>
-              <a:t>Code life-time: 20 – 30 years</a:t>
+              <a:t>Code life-time: 5 – 20 years</a:t>
             </a:r>
           </a:p>
           <a:p>
             <a:pPr lvl="1"/>
             <a:r>
               <a:rPr lang="en-US" sz="1800" dirty="0"/>
-              <a:t>Example: Microsoft Word</a:t>
+              <a:t>Example: Machine Tool Control</a:t>
             </a:r>
           </a:p>
           <a:p>
             <a:r>
               <a:rPr lang="en-US" sz="2200" dirty="0"/>
-              <a:t>Product may start with code framework, standards, and a specification</a:t>
+              <a:t>Code base starts with an initial product</a:t>
+            </a:r>
+          </a:p>
+          <a:p>
+            <a:r>
+              <a:rPr lang="en-US" sz="2200" dirty="0"/>
+              <a:t>New products start from that initial code</a:t>
             </a:r>
           </a:p>
           <a:p>
             <a:pPr lvl="1"/>
             <a:r>
               <a:rPr lang="en-US" sz="1800" dirty="0"/>
-              <a:t>For Microsoft Office and many other products, the framework has been the Microsoft Component Object Model (COM)</a:t>
-            </a:r>
-          </a:p>
-          <a:p>
-            <a:pPr lvl="2"/>
-            <a:r>
-              <a:rPr lang="en-US" sz="1400" dirty="0"/>
-              <a:t>It appears that, moving forward, COM will be hidden with a wrapper technology - Windows </a:t>
-            </a:r>
-            <a:r>
-              <a:rPr lang="en-US" sz="1400" dirty="0" err="1"/>
-              <a:t>RunTime</a:t>
-            </a:r>
-            <a:r>
-              <a:rPr lang="en-US" sz="1400" dirty="0"/>
-              <a:t> (WinRT): </a:t>
-            </a:r>
-            <a:r>
-              <a:rPr lang="en-US" sz="1400" dirty="0">
-                <a:hlinkClick r:id="rId2"/>
-              </a:rPr>
-              <a:t>https://en.wikipedia.org/wiki/Windows_Runtime</a:t>
-            </a:r>
-            <a:r>
-              <a:rPr lang="en-US" sz="1400" dirty="0"/>
-              <a:t> </a:t>
+              <a:t>Has a common code baseline been defined?</a:t>
             </a:r>
           </a:p>
           <a:p>
             <a:pPr lvl="1"/>
             <a:r>
               <a:rPr lang="en-US" sz="1800" dirty="0"/>
-              <a:t>Specification is developed by a Program Manager and reviewed by the development team</a:t>
-            </a:r>
-          </a:p>
-          <a:p>
-            <a:r>
-              <a:rPr lang="en-US" sz="2200" dirty="0"/>
-              <a:t>Microsoft has spent a lot of resources on documentation, with mixed results</a:t>
+              <a:t>Code reviews are held during development</a:t>
             </a:r>
           </a:p>
           <a:p>
             <a:pPr lvl="1"/>
             <a:r>
               <a:rPr lang="en-US" sz="1800" dirty="0"/>
-              <a:t>Executing a search in MSDN for WinRT results in 6,180,000 results.  </a:t>
+              <a:t>At product completion is code reviewed and refactored into reusable parts and product specific code?</a:t>
             </a:r>
           </a:p>
           <a:p>
             <a:pPr lvl="1"/>
             <a:r>
               <a:rPr lang="en-US" sz="1800" dirty="0"/>
-              <a:t>That isn’t a useful query, it’s a data dump – in fairness, the results are prioritized</a:t>
-            </a:r>
-          </a:p>
-          <a:p>
-            <a:pPr lvl="1"/>
-            <a:r>
-              <a:rPr lang="en-US" sz="1800" dirty="0"/>
-              <a:t>It’s quite common that when you arrive at a useful documentation page you get partial results with the remainder often linked to many pages scattered over the vast reaches of MSDN</a:t>
-            </a:r>
-          </a:p>
-          <a:p>
-            <a:r>
-              <a:rPr lang="en-US" sz="2200" dirty="0"/>
-              <a:t>Indeed, there are many Microsoft technologies each with its own products, APIs, code examples.</a:t>
-            </a:r>
-          </a:p>
-          <a:p>
-            <a:pPr lvl="1"/>
-            <a:r>
-              <a:rPr lang="en-US" sz="1800" dirty="0"/>
-              <a:t>Some, like the </a:t>
-            </a:r>
-            <a:r>
-              <a:rPr lang="en-US" sz="1800" dirty="0" err="1"/>
-              <a:t>.Net</a:t>
-            </a:r>
-            <a:r>
-              <a:rPr lang="en-US" sz="1800" dirty="0"/>
-              <a:t> framework have outstanding organization and documentation.</a:t>
-            </a:r>
-          </a:p>
-          <a:p>
-            <a:pPr lvl="1"/>
-            <a:endParaRPr lang="en-US" sz="1800" dirty="0"/>
+              <a:t>Is the organization willing to provide overhead effort to evolve the common code base?</a:t>
+            </a:r>
           </a:p>
         </p:txBody>
       </p:sp>
@@ -6993,7 +6911,7 @@
     </p:spTree>
     <p:extLst>
       <p:ext uri="{BB962C8B-B14F-4D97-AF65-F5344CB8AC3E}">
-        <p14:creationId xmlns:p14="http://schemas.microsoft.com/office/powerpoint/2010/main" val="1820564551"/>
+        <p14:creationId xmlns:p14="http://schemas.microsoft.com/office/powerpoint/2010/main" val="1744719603"/>
       </p:ext>
     </p:extLst>
   </p:cSld>
@@ -7039,7 +6957,7 @@
         <p:spPr>
           <a:xfrm>
             <a:off x="838200" y="339367"/>
-            <a:ext cx="10515600" cy="529957"/>
+            <a:ext cx="10515600" cy="678161"/>
           </a:xfrm>
         </p:spPr>
         <p:txBody>
@@ -7048,7 +6966,7 @@
           <a:p>
             <a:r>
               <a:rPr lang="en-US" dirty="0"/>
-              <a:t>Aerospace Domain</a:t>
+              <a:t>Commercial Domain</a:t>
             </a:r>
           </a:p>
         </p:txBody>
@@ -7082,84 +7000,56 @@
           <a:lstStyle/>
           <a:p>
             <a:r>
+              <a:rPr lang="en-US" sz="2000" dirty="0"/>
+              <a:t>Commercial Products: </a:t>
+            </a:r>
+          </a:p>
+          <a:p>
+            <a:pPr lvl="1"/>
+            <a:r>
               <a:rPr lang="en-US" sz="1800" dirty="0"/>
-              <a:t>Aerospace Programs: 5 – 200 developers</a:t>
-            </a:r>
-          </a:p>
-          <a:p>
-            <a:pPr lvl="1"/>
+              <a:t>Code life-time: 20 – 30 years</a:t>
+            </a:r>
+          </a:p>
+          <a:p>
+            <a:pPr lvl="1"/>
+            <a:r>
+              <a:rPr lang="en-US" sz="1800" dirty="0"/>
+              <a:t>Example: Microsoft Word</a:t>
+            </a:r>
+          </a:p>
+          <a:p>
+            <a:r>
+              <a:rPr lang="en-US" sz="2200" dirty="0"/>
+              <a:t>Product may start with code framework, standards, and a specification</a:t>
+            </a:r>
+          </a:p>
+          <a:p>
+            <a:pPr lvl="1"/>
+            <a:r>
+              <a:rPr lang="en-US" sz="1800" dirty="0"/>
+              <a:t>For Microsoft Office and many other products, the framework has been the Microsoft Component Object Model (COM)</a:t>
+            </a:r>
+          </a:p>
+          <a:p>
+            <a:pPr lvl="2"/>
             <a:r>
               <a:rPr lang="en-US" sz="1400" dirty="0"/>
-              <a:t>Code life-time: 20 – 30 years</a:t>
-            </a:r>
-          </a:p>
-          <a:p>
-            <a:pPr lvl="1"/>
+              <a:t>It appears that, moving forward, COM will be hidden with a wrapper technology - Windows </a:t>
+            </a:r>
+            <a:r>
+              <a:rPr lang="en-US" sz="1400" dirty="0" err="1"/>
+              <a:t>RunTime</a:t>
+            </a:r>
             <a:r>
               <a:rPr lang="en-US" sz="1400" dirty="0"/>
-              <a:t>Example: Submarine control, Area surveillance, ..</a:t>
-            </a:r>
-          </a:p>
-          <a:p>
-            <a:r>
-              <a:rPr lang="en-US" sz="1800" dirty="0"/>
-              <a:t>Development is product oriented, starting with an initial contract, and continuing for possibly many years of enhancements and new contracts that build on the existing product technology</a:t>
-            </a:r>
-          </a:p>
-          <a:p>
-            <a:r>
-              <a:rPr lang="en-US" sz="1800" dirty="0"/>
-              <a:t>An example is the development of area surveillance radar systems</a:t>
-            </a:r>
-          </a:p>
-          <a:p>
-            <a:pPr lvl="1"/>
-            <a:r>
-              <a:rPr lang="en-US" sz="1400" dirty="0"/>
-              <a:t>Typical lifetime of a radar system is 20 years</a:t>
-            </a:r>
-          </a:p>
-          <a:p>
-            <a:pPr lvl="2"/>
-            <a:r>
-              <a:rPr lang="en-US" sz="1100" dirty="0"/>
-              <a:t>The code has to be maintained over that lifetime, sometimes by the manufacturer, sometimes by the customer.</a:t>
-            </a:r>
-          </a:p>
-          <a:p>
-            <a:pPr lvl="1"/>
-            <a:r>
-              <a:rPr lang="en-US" sz="1400" dirty="0"/>
-              <a:t>Once an initial contract has been completed it is common for scores of contracts to be awarded for new versions of a successful product.</a:t>
-            </a:r>
-          </a:p>
-          <a:p>
-            <a:pPr lvl="2"/>
-            <a:r>
-              <a:rPr lang="en-US" sz="1100" dirty="0"/>
-              <a:t>Usually a large part of a new product based on an existing one will share a large fraction of its code</a:t>
-            </a:r>
-          </a:p>
-          <a:p>
-            <a:pPr lvl="2"/>
-            <a:r>
-              <a:rPr lang="en-US" sz="1100" dirty="0"/>
-              <a:t>In most cases the new contract requires new features and enhancements – the customer looks at the original and decides how to embellish</a:t>
-            </a:r>
-          </a:p>
-          <a:p>
-            <a:r>
-              <a:rPr lang="en-US" sz="1800" dirty="0"/>
-              <a:t>The Capability Maturity Model was developed beginning when the Air Force funded a study with the Software Engineering Institute.  Its intent is to encourage DoD contractors to develop and maintain a consistent process for creation of software. </a:t>
-            </a:r>
-          </a:p>
-          <a:p>
-            <a:pPr lvl="1"/>
+              <a:t> (WinRT): </a:t>
+            </a:r>
             <a:r>
               <a:rPr lang="en-US" sz="1400" dirty="0">
                 <a:hlinkClick r:id="rId2"/>
               </a:rPr>
-              <a:t>https://en.wikipedia.org/wiki/Capability_Maturity_Model</a:t>
+              <a:t>https://en.wikipedia.org/wiki/Windows_Runtime</a:t>
             </a:r>
             <a:r>
               <a:rPr lang="en-US" sz="1400" dirty="0"/>
@@ -7169,24 +7059,61 @@
           <a:p>
             <a:pPr lvl="1"/>
             <a:r>
-              <a:rPr lang="en-US" sz="1400" dirty="0"/>
-              <a:t>CMM provides guidelines, but it is a model and a yardstick for assessing capability of contractors</a:t>
-            </a:r>
-          </a:p>
-          <a:p>
-            <a:pPr lvl="1"/>
-            <a:r>
-              <a:rPr lang="en-US" sz="1400" dirty="0"/>
-              <a:t>It does not provide specifics for tools and techniques that support reuse</a:t>
-            </a:r>
-          </a:p>
-          <a:p>
-            <a:pPr lvl="1"/>
-            <a:endParaRPr lang="en-US" sz="1400" dirty="0"/>
-          </a:p>
-          <a:p>
-            <a:pPr lvl="1"/>
-            <a:endParaRPr lang="en-US" sz="1400" dirty="0"/>
+              <a:rPr lang="en-US" sz="1800" dirty="0"/>
+              <a:t>Specification is developed by a Program Manager and reviewed by the development team</a:t>
+            </a:r>
+          </a:p>
+          <a:p>
+            <a:r>
+              <a:rPr lang="en-US" sz="2200" dirty="0"/>
+              <a:t>Microsoft has spent a lot of resources on documentation, with mixed results</a:t>
+            </a:r>
+          </a:p>
+          <a:p>
+            <a:pPr lvl="1"/>
+            <a:r>
+              <a:rPr lang="en-US" sz="1800" dirty="0"/>
+              <a:t>Executing a search in MSDN for WinRT results in 6,180,000 results.  </a:t>
+            </a:r>
+          </a:p>
+          <a:p>
+            <a:pPr lvl="1"/>
+            <a:r>
+              <a:rPr lang="en-US" sz="1800" dirty="0"/>
+              <a:t>That isn’t a useful query, it’s a data dump – in fairness, the results are prioritized</a:t>
+            </a:r>
+          </a:p>
+          <a:p>
+            <a:pPr lvl="1"/>
+            <a:r>
+              <a:rPr lang="en-US" sz="1800" dirty="0"/>
+              <a:t>It’s quite common that when you arrive at a useful documentation page you get partial results with the remainder often linked to many pages scattered over the vast reaches of MSDN</a:t>
+            </a:r>
+          </a:p>
+          <a:p>
+            <a:r>
+              <a:rPr lang="en-US" sz="2200" dirty="0"/>
+              <a:t>Indeed, there are many Microsoft technologies each with its own products, APIs, code examples.</a:t>
+            </a:r>
+          </a:p>
+          <a:p>
+            <a:pPr lvl="1"/>
+            <a:r>
+              <a:rPr lang="en-US" sz="1800" dirty="0"/>
+              <a:t>Some, like the </a:t>
+            </a:r>
+            <a:r>
+              <a:rPr lang="en-US" sz="1800" dirty="0" err="1"/>
+              <a:t>.Net</a:t>
+            </a:r>
+            <a:r>
+              <a:rPr lang="en-US" sz="1800" dirty="0"/>
+              <a:t> framework have outstanding organization and documentation.</a:t>
+            </a:r>
+          </a:p>
+          <a:p>
+            <a:pPr lvl="1"/>
+            <a:endParaRPr lang="en-US" sz="1800" dirty="0"/>
           </a:p>
         </p:txBody>
       </p:sp>
@@ -7222,7 +7149,7 @@
     </p:spTree>
     <p:extLst>
       <p:ext uri="{BB962C8B-B14F-4D97-AF65-F5344CB8AC3E}">
-        <p14:creationId xmlns:p14="http://schemas.microsoft.com/office/powerpoint/2010/main" val="3738534843"/>
+        <p14:creationId xmlns:p14="http://schemas.microsoft.com/office/powerpoint/2010/main" val="1820564551"/>
       </p:ext>
     </p:extLst>
   </p:cSld>
@@ -7254,6 +7181,235 @@
           <p:cNvPr id="2" name="Title 1">
             <a:extLst>
               <a:ext uri="{FF2B5EF4-FFF2-40B4-BE49-F238E27FC236}">
+                <a16:creationId xmlns:a16="http://schemas.microsoft.com/office/drawing/2014/main" id="{C818CF9C-B350-4936-99E1-D89031958E0C}"/>
+              </a:ext>
+            </a:extLst>
+          </p:cNvPr>
+          <p:cNvSpPr>
+            <a:spLocks noGrp="1"/>
+          </p:cNvSpPr>
+          <p:nvPr>
+            <p:ph type="title"/>
+          </p:nvPr>
+        </p:nvSpPr>
+        <p:spPr>
+          <a:xfrm>
+            <a:off x="838200" y="339367"/>
+            <a:ext cx="10515600" cy="529957"/>
+          </a:xfrm>
+        </p:spPr>
+        <p:txBody>
+          <a:bodyPr/>
+          <a:lstStyle/>
+          <a:p>
+            <a:r>
+              <a:rPr lang="en-US" dirty="0"/>
+              <a:t>Aerospace Domain</a:t>
+            </a:r>
+          </a:p>
+        </p:txBody>
+      </p:sp>
+      <p:sp>
+        <p:nvSpPr>
+          <p:cNvPr id="3" name="Content Placeholder 2">
+            <a:extLst>
+              <a:ext uri="{FF2B5EF4-FFF2-40B4-BE49-F238E27FC236}">
+                <a16:creationId xmlns:a16="http://schemas.microsoft.com/office/drawing/2014/main" id="{C65F66DE-FE31-4539-83AE-36CA6E637596}"/>
+              </a:ext>
+            </a:extLst>
+          </p:cNvPr>
+          <p:cNvSpPr>
+            <a:spLocks noGrp="1"/>
+          </p:cNvSpPr>
+          <p:nvPr>
+            <p:ph idx="1"/>
+          </p:nvPr>
+        </p:nvSpPr>
+        <p:spPr>
+          <a:xfrm>
+            <a:off x="838200" y="1017529"/>
+            <a:ext cx="10515600" cy="5355770"/>
+          </a:xfrm>
+        </p:spPr>
+        <p:txBody>
+          <a:bodyPr>
+            <a:noAutofit/>
+          </a:bodyPr>
+          <a:lstStyle/>
+          <a:p>
+            <a:r>
+              <a:rPr lang="en-US" sz="1800" dirty="0"/>
+              <a:t>Aerospace Programs: 5 – 200 developers</a:t>
+            </a:r>
+          </a:p>
+          <a:p>
+            <a:pPr lvl="1"/>
+            <a:r>
+              <a:rPr lang="en-US" sz="1400" dirty="0"/>
+              <a:t>Code life-time: 20 – 30 years</a:t>
+            </a:r>
+          </a:p>
+          <a:p>
+            <a:pPr lvl="1"/>
+            <a:r>
+              <a:rPr lang="en-US" sz="1400" dirty="0"/>
+              <a:t>Example: Submarine control, Area surveillance, ..</a:t>
+            </a:r>
+          </a:p>
+          <a:p>
+            <a:r>
+              <a:rPr lang="en-US" sz="1800" dirty="0"/>
+              <a:t>Development is product oriented, starting with an initial contract, and continuing for possibly many years of enhancements and new contracts that build on the existing product technology</a:t>
+            </a:r>
+          </a:p>
+          <a:p>
+            <a:r>
+              <a:rPr lang="en-US" sz="1800" dirty="0"/>
+              <a:t>An example is the development of area surveillance radar systems</a:t>
+            </a:r>
+          </a:p>
+          <a:p>
+            <a:pPr lvl="1"/>
+            <a:r>
+              <a:rPr lang="en-US" sz="1400" dirty="0"/>
+              <a:t>Typical lifetime of a radar system is 20 years</a:t>
+            </a:r>
+          </a:p>
+          <a:p>
+            <a:pPr lvl="2"/>
+            <a:r>
+              <a:rPr lang="en-US" sz="1100" dirty="0"/>
+              <a:t>The code has to be maintained over that lifetime, sometimes by the manufacturer, sometimes by the customer.</a:t>
+            </a:r>
+          </a:p>
+          <a:p>
+            <a:pPr lvl="1"/>
+            <a:r>
+              <a:rPr lang="en-US" sz="1400" dirty="0"/>
+              <a:t>Once an initial contract has been completed it is common for scores of contracts to be awarded for new versions of a successful product.</a:t>
+            </a:r>
+          </a:p>
+          <a:p>
+            <a:pPr lvl="2"/>
+            <a:r>
+              <a:rPr lang="en-US" sz="1100" dirty="0"/>
+              <a:t>Usually a large part of a new product based on an existing one will share a large fraction of its code</a:t>
+            </a:r>
+          </a:p>
+          <a:p>
+            <a:pPr lvl="2"/>
+            <a:r>
+              <a:rPr lang="en-US" sz="1100" dirty="0"/>
+              <a:t>In most cases the new contract requires new features and enhancements – the customer looks at the original and decides how to embellish</a:t>
+            </a:r>
+          </a:p>
+          <a:p>
+            <a:r>
+              <a:rPr lang="en-US" sz="1800" dirty="0"/>
+              <a:t>The Capability Maturity Model was developed beginning when the Air Force funded a study with the Software Engineering Institute.  Its intent is to encourage DoD contractors to develop and maintain a consistent process for creation of software. </a:t>
+            </a:r>
+          </a:p>
+          <a:p>
+            <a:pPr lvl="1"/>
+            <a:r>
+              <a:rPr lang="en-US" sz="1400" dirty="0">
+                <a:hlinkClick r:id="rId2"/>
+              </a:rPr>
+              <a:t>https://en.wikipedia.org/wiki/Capability_Maturity_Model</a:t>
+            </a:r>
+            <a:r>
+              <a:rPr lang="en-US" sz="1400" dirty="0"/>
+              <a:t> </a:t>
+            </a:r>
+          </a:p>
+          <a:p>
+            <a:pPr lvl="1"/>
+            <a:r>
+              <a:rPr lang="en-US" sz="1400" dirty="0"/>
+              <a:t>CMM provides guidelines, but it is a model and a yardstick for assessing capability of contractors</a:t>
+            </a:r>
+          </a:p>
+          <a:p>
+            <a:pPr lvl="1"/>
+            <a:r>
+              <a:rPr lang="en-US" sz="1400" dirty="0"/>
+              <a:t>It does not provide specifics for tools and techniques that support reuse</a:t>
+            </a:r>
+          </a:p>
+          <a:p>
+            <a:pPr lvl="1"/>
+            <a:endParaRPr lang="en-US" sz="1400" dirty="0"/>
+          </a:p>
+          <a:p>
+            <a:pPr lvl="1"/>
+            <a:endParaRPr lang="en-US" sz="1400" dirty="0"/>
+          </a:p>
+        </p:txBody>
+      </p:sp>
+      <p:sp>
+        <p:nvSpPr>
+          <p:cNvPr id="4" name="Slide Number Placeholder 3">
+            <a:extLst>
+              <a:ext uri="{FF2B5EF4-FFF2-40B4-BE49-F238E27FC236}">
+                <a16:creationId xmlns:a16="http://schemas.microsoft.com/office/drawing/2014/main" id="{A916C694-BD83-42C9-A8AC-D048E61AD071}"/>
+              </a:ext>
+            </a:extLst>
+          </p:cNvPr>
+          <p:cNvSpPr>
+            <a:spLocks noGrp="1"/>
+          </p:cNvSpPr>
+          <p:nvPr>
+            <p:ph type="sldNum" sz="quarter" idx="12"/>
+          </p:nvPr>
+        </p:nvSpPr>
+        <p:spPr/>
+        <p:txBody>
+          <a:bodyPr/>
+          <a:lstStyle/>
+          <a:p>
+            <a:fld id="{EDEBF0BA-A897-4C1E-AB3C-F330808C0E1D}" type="slidenum">
+              <a:rPr lang="en-US" smtClean="0"/>
+              <a:t>23</a:t>
+            </a:fld>
+            <a:endParaRPr lang="en-US"/>
+          </a:p>
+        </p:txBody>
+      </p:sp>
+    </p:spTree>
+    <p:extLst>
+      <p:ext uri="{BB962C8B-B14F-4D97-AF65-F5344CB8AC3E}">
+        <p14:creationId xmlns:p14="http://schemas.microsoft.com/office/powerpoint/2010/main" val="3738534843"/>
+      </p:ext>
+    </p:extLst>
+  </p:cSld>
+  <p:clrMapOvr>
+    <a:masterClrMapping/>
+  </p:clrMapOvr>
+</p:sld>
+</file>
+
+<file path=ppt/slides/slide24.xml><?xml version="1.0" encoding="utf-8"?>
+<p:sld xmlns:a="http://schemas.openxmlformats.org/drawingml/2006/main" xmlns:r="http://schemas.openxmlformats.org/officeDocument/2006/relationships" xmlns:p="http://schemas.openxmlformats.org/presentationml/2006/main">
+  <p:cSld>
+    <p:spTree>
+      <p:nvGrpSpPr>
+        <p:cNvPr id="1" name=""/>
+        <p:cNvGrpSpPr/>
+        <p:nvPr/>
+      </p:nvGrpSpPr>
+      <p:grpSpPr>
+        <a:xfrm>
+          <a:off x="0" y="0"/>
+          <a:ext cx="0" cy="0"/>
+          <a:chOff x="0" y="0"/>
+          <a:chExt cx="0" cy="0"/>
+        </a:xfrm>
+      </p:grpSpPr>
+      <p:sp>
+        <p:nvSpPr>
+          <p:cNvPr id="2" name="Title 1">
+            <a:extLst>
+              <a:ext uri="{FF2B5EF4-FFF2-40B4-BE49-F238E27FC236}">
                 <a16:creationId xmlns:a16="http://schemas.microsoft.com/office/drawing/2014/main" id="{4E9D22A6-D52F-42FB-B419-4D8F5EA420AF}"/>
               </a:ext>
             </a:extLst>
@@ -7305,7 +7461,7 @@
           <a:p>
             <a:fld id="{EDEBF0BA-A897-4C1E-AB3C-F330808C0E1D}" type="slidenum">
               <a:rPr lang="en-US" smtClean="0"/>
-              <a:t>23</a:t>
+              <a:t>24</a:t>
             </a:fld>
             <a:endParaRPr lang="en-US"/>
           </a:p>
@@ -7343,6 +7499,229 @@
       </p:grpSpPr>
       <p:sp>
         <p:nvSpPr>
+          <p:cNvPr id="2" name="Title 1">
+            <a:extLst>
+              <a:ext uri="{FF2B5EF4-FFF2-40B4-BE49-F238E27FC236}">
+                <a16:creationId xmlns:a16="http://schemas.microsoft.com/office/drawing/2014/main" id="{C818CF9C-B350-4936-99E1-D89031958E0C}"/>
+              </a:ext>
+            </a:extLst>
+          </p:cNvPr>
+          <p:cNvSpPr>
+            <a:spLocks noGrp="1"/>
+          </p:cNvSpPr>
+          <p:nvPr>
+            <p:ph type="title"/>
+          </p:nvPr>
+        </p:nvSpPr>
+        <p:spPr>
+          <a:xfrm>
+            <a:off x="838200" y="339367"/>
+            <a:ext cx="10515600" cy="678161"/>
+          </a:xfrm>
+        </p:spPr>
+        <p:txBody>
+          <a:bodyPr>
+            <a:noAutofit/>
+          </a:bodyPr>
+          <a:lstStyle/>
+          <a:p>
+            <a:r>
+              <a:rPr lang="en-US" sz="3600" dirty="0"/>
+              <a:t>Application Domain Targets – Candidates for Support?</a:t>
+            </a:r>
+          </a:p>
+        </p:txBody>
+      </p:sp>
+      <p:sp>
+        <p:nvSpPr>
+          <p:cNvPr id="3" name="Content Placeholder 2">
+            <a:extLst>
+              <a:ext uri="{FF2B5EF4-FFF2-40B4-BE49-F238E27FC236}">
+                <a16:creationId xmlns:a16="http://schemas.microsoft.com/office/drawing/2014/main" id="{C65F66DE-FE31-4539-83AE-36CA6E637596}"/>
+              </a:ext>
+            </a:extLst>
+          </p:cNvPr>
+          <p:cNvSpPr>
+            <a:spLocks noGrp="1"/>
+          </p:cNvSpPr>
+          <p:nvPr>
+            <p:ph idx="1"/>
+          </p:nvPr>
+        </p:nvSpPr>
+        <p:spPr>
+          <a:xfrm>
+            <a:off x="838200" y="1183142"/>
+            <a:ext cx="10515600" cy="5355770"/>
+          </a:xfrm>
+        </p:spPr>
+        <p:txBody>
+          <a:bodyPr>
+            <a:noAutofit/>
+          </a:bodyPr>
+          <a:lstStyle/>
+          <a:p>
+            <a:r>
+              <a:rPr lang="en-US" sz="2000" dirty="0"/>
+              <a:t>Academic Research: 5 – 10 code developers</a:t>
+            </a:r>
+          </a:p>
+          <a:p>
+            <a:pPr lvl="1"/>
+            <a:r>
+              <a:rPr lang="en-US" sz="1800" dirty="0"/>
+              <a:t>Code life-time: 3 – 5 years</a:t>
+            </a:r>
+          </a:p>
+          <a:p>
+            <a:pPr lvl="1"/>
+            <a:r>
+              <a:rPr lang="en-US" sz="1800" dirty="0"/>
+              <a:t>Example: Natural Language Processing (NLP)</a:t>
+            </a:r>
+          </a:p>
+          <a:p>
+            <a:r>
+              <a:rPr lang="en-US" sz="2000" dirty="0"/>
+              <a:t>Open Source Development: 5 – 1000 active developers, many casual contributors</a:t>
+            </a:r>
+          </a:p>
+          <a:p>
+            <a:pPr lvl="1"/>
+            <a:r>
+              <a:rPr lang="en-US" sz="1800" dirty="0"/>
+              <a:t>Code life-time: 10 - 20 years</a:t>
+            </a:r>
+          </a:p>
+          <a:p>
+            <a:pPr lvl="1"/>
+            <a:r>
+              <a:rPr lang="en-US" sz="1800" dirty="0"/>
+              <a:t>Example: Linux</a:t>
+            </a:r>
+          </a:p>
+          <a:p>
+            <a:r>
+              <a:rPr lang="en-US" sz="2000" dirty="0"/>
+              <a:t>Industrial Development: 5 – 10 developers</a:t>
+            </a:r>
+          </a:p>
+          <a:p>
+            <a:pPr lvl="1"/>
+            <a:r>
+              <a:rPr lang="en-US" sz="1800" dirty="0"/>
+              <a:t>Code life-time: 5 – 20 years</a:t>
+            </a:r>
+          </a:p>
+          <a:p>
+            <a:pPr lvl="1"/>
+            <a:r>
+              <a:rPr lang="en-US" sz="1800" dirty="0"/>
+              <a:t>Example: Machine Tool Control</a:t>
+            </a:r>
+          </a:p>
+          <a:p>
+            <a:r>
+              <a:rPr lang="en-US" sz="2000" dirty="0"/>
+              <a:t>Commercial Products: 10 – 30 developers</a:t>
+            </a:r>
+          </a:p>
+          <a:p>
+            <a:pPr lvl="1"/>
+            <a:r>
+              <a:rPr lang="en-US" sz="1800" dirty="0"/>
+              <a:t>Code life-time: 20 – 30 years</a:t>
+            </a:r>
+          </a:p>
+          <a:p>
+            <a:pPr lvl="1"/>
+            <a:r>
+              <a:rPr lang="en-US" sz="1800" dirty="0"/>
+              <a:t>Example: Microsoft Word</a:t>
+            </a:r>
+          </a:p>
+          <a:p>
+            <a:r>
+              <a:rPr lang="en-US" sz="2000" dirty="0"/>
+              <a:t>Aerospace Programs: 5 – 200 developers</a:t>
+            </a:r>
+          </a:p>
+          <a:p>
+            <a:pPr lvl="1"/>
+            <a:r>
+              <a:rPr lang="en-US" sz="1600" dirty="0"/>
+              <a:t>Code life-time: 20 – 30 years</a:t>
+            </a:r>
+          </a:p>
+          <a:p>
+            <a:pPr lvl="1"/>
+            <a:r>
+              <a:rPr lang="en-US" sz="1600" dirty="0"/>
+              <a:t>Example: Submarine control, Area surveillance, ..</a:t>
+            </a:r>
+          </a:p>
+        </p:txBody>
+      </p:sp>
+      <p:sp>
+        <p:nvSpPr>
+          <p:cNvPr id="4" name="Slide Number Placeholder 3">
+            <a:extLst>
+              <a:ext uri="{FF2B5EF4-FFF2-40B4-BE49-F238E27FC236}">
+                <a16:creationId xmlns:a16="http://schemas.microsoft.com/office/drawing/2014/main" id="{F980341C-B802-4DB5-8B01-9BF021EDC77D}"/>
+              </a:ext>
+            </a:extLst>
+          </p:cNvPr>
+          <p:cNvSpPr>
+            <a:spLocks noGrp="1"/>
+          </p:cNvSpPr>
+          <p:nvPr>
+            <p:ph type="sldNum" sz="quarter" idx="12"/>
+          </p:nvPr>
+        </p:nvSpPr>
+        <p:spPr/>
+        <p:txBody>
+          <a:bodyPr/>
+          <a:lstStyle/>
+          <a:p>
+            <a:fld id="{EDEBF0BA-A897-4C1E-AB3C-F330808C0E1D}" type="slidenum">
+              <a:rPr lang="en-US" smtClean="0"/>
+              <a:t>3</a:t>
+            </a:fld>
+            <a:endParaRPr lang="en-US"/>
+          </a:p>
+        </p:txBody>
+      </p:sp>
+    </p:spTree>
+    <p:extLst>
+      <p:ext uri="{BB962C8B-B14F-4D97-AF65-F5344CB8AC3E}">
+        <p14:creationId xmlns:p14="http://schemas.microsoft.com/office/powerpoint/2010/main" val="3351627177"/>
+      </p:ext>
+    </p:extLst>
+  </p:cSld>
+  <p:clrMapOvr>
+    <a:masterClrMapping/>
+  </p:clrMapOvr>
+</p:sld>
+</file>
+
+<file path=ppt/slides/slide4.xml><?xml version="1.0" encoding="utf-8"?>
+<p:sld xmlns:a="http://schemas.openxmlformats.org/drawingml/2006/main" xmlns:r="http://schemas.openxmlformats.org/officeDocument/2006/relationships" xmlns:p="http://schemas.openxmlformats.org/presentationml/2006/main">
+  <p:cSld>
+    <p:spTree>
+      <p:nvGrpSpPr>
+        <p:cNvPr id="1" name=""/>
+        <p:cNvGrpSpPr/>
+        <p:nvPr/>
+      </p:nvGrpSpPr>
+      <p:grpSpPr>
+        <a:xfrm>
+          <a:off x="0" y="0"/>
+          <a:ext cx="0" cy="0"/>
+          <a:chOff x="0" y="0"/>
+          <a:chExt cx="0" cy="0"/>
+        </a:xfrm>
+      </p:grpSpPr>
+      <p:sp>
+        <p:nvSpPr>
           <p:cNvPr id="4" name="Rectangle 3">
             <a:extLst>
               <a:ext uri="{FF2B5EF4-FFF2-40B4-BE49-F238E27FC236}">
@@ -7576,7 +7955,7 @@
           <a:p>
             <a:fld id="{EDEBF0BA-A897-4C1E-AB3C-F330808C0E1D}" type="slidenum">
               <a:rPr lang="en-US" smtClean="0"/>
-              <a:t>3</a:t>
+              <a:t>4</a:t>
             </a:fld>
             <a:endParaRPr lang="en-US"/>
           </a:p>
@@ -7595,7 +7974,7 @@
 </p:sld>
 </file>
 
-<file path=ppt/slides/slide4.xml><?xml version="1.0" encoding="utf-8"?>
+<file path=ppt/slides/slide5.xml><?xml version="1.0" encoding="utf-8"?>
 <p:sld xmlns:a="http://schemas.openxmlformats.org/drawingml/2006/main" xmlns:r="http://schemas.openxmlformats.org/officeDocument/2006/relationships" xmlns:p="http://schemas.openxmlformats.org/presentationml/2006/main">
   <p:cSld>
     <p:spTree>
@@ -7841,7 +8220,7 @@
           <a:p>
             <a:fld id="{EDEBF0BA-A897-4C1E-AB3C-F330808C0E1D}" type="slidenum">
               <a:rPr lang="en-US" smtClean="0"/>
-              <a:t>4</a:t>
+              <a:t>5</a:t>
             </a:fld>
             <a:endParaRPr lang="en-US"/>
           </a:p>
@@ -7851,172 +8230,6 @@
     <p:extLst>
       <p:ext uri="{BB962C8B-B14F-4D97-AF65-F5344CB8AC3E}">
         <p14:creationId xmlns:p14="http://schemas.microsoft.com/office/powerpoint/2010/main" val="4110067833"/>
-      </p:ext>
-    </p:extLst>
-  </p:cSld>
-  <p:clrMapOvr>
-    <a:masterClrMapping/>
-  </p:clrMapOvr>
-</p:sld>
-</file>
-
-<file path=ppt/slides/slide5.xml><?xml version="1.0" encoding="utf-8"?>
-<p:sld xmlns:a="http://schemas.openxmlformats.org/drawingml/2006/main" xmlns:r="http://schemas.openxmlformats.org/officeDocument/2006/relationships" xmlns:p="http://schemas.openxmlformats.org/presentationml/2006/main">
-  <p:cSld>
-    <p:spTree>
-      <p:nvGrpSpPr>
-        <p:cNvPr id="1" name=""/>
-        <p:cNvGrpSpPr/>
-        <p:nvPr/>
-      </p:nvGrpSpPr>
-      <p:grpSpPr>
-        <a:xfrm>
-          <a:off x="0" y="0"/>
-          <a:ext cx="0" cy="0"/>
-          <a:chOff x="0" y="0"/>
-          <a:chExt cx="0" cy="0"/>
-        </a:xfrm>
-      </p:grpSpPr>
-      <p:sp>
-        <p:nvSpPr>
-          <p:cNvPr id="2" name="Title 1">
-            <a:extLst>
-              <a:ext uri="{FF2B5EF4-FFF2-40B4-BE49-F238E27FC236}">
-                <a16:creationId xmlns:a16="http://schemas.microsoft.com/office/drawing/2014/main" id="{D5791037-F5B9-4520-96E0-22E8D64C46FF}"/>
-              </a:ext>
-            </a:extLst>
-          </p:cNvPr>
-          <p:cNvSpPr>
-            <a:spLocks noGrp="1"/>
-          </p:cNvSpPr>
-          <p:nvPr>
-            <p:ph type="title"/>
-          </p:nvPr>
-        </p:nvSpPr>
-        <p:spPr/>
-        <p:txBody>
-          <a:bodyPr/>
-          <a:lstStyle/>
-          <a:p>
-            <a:r>
-              <a:rPr lang="en-US" dirty="0"/>
-              <a:t>Goal – Support Salvage and Reuse</a:t>
-            </a:r>
-          </a:p>
-        </p:txBody>
-      </p:sp>
-      <p:sp>
-        <p:nvSpPr>
-          <p:cNvPr id="3" name="Content Placeholder 2">
-            <a:extLst>
-              <a:ext uri="{FF2B5EF4-FFF2-40B4-BE49-F238E27FC236}">
-                <a16:creationId xmlns:a16="http://schemas.microsoft.com/office/drawing/2014/main" id="{491474DF-CCCA-4B65-87ED-1CE7E2998525}"/>
-              </a:ext>
-            </a:extLst>
-          </p:cNvPr>
-          <p:cNvSpPr>
-            <a:spLocks noGrp="1"/>
-          </p:cNvSpPr>
-          <p:nvPr>
-            <p:ph idx="1"/>
-          </p:nvPr>
-        </p:nvSpPr>
-        <p:spPr/>
-        <p:txBody>
-          <a:bodyPr/>
-          <a:lstStyle/>
-          <a:p>
-            <a:r>
-              <a:rPr lang="en-US" dirty="0"/>
-              <a:t>Software Components</a:t>
-            </a:r>
-          </a:p>
-          <a:p>
-            <a:pPr lvl="1"/>
-            <a:r>
-              <a:rPr lang="en-US" dirty="0"/>
-              <a:t>Software package that has a single purpose, few dependencies, and is useful for building software systems – example: blocking queue</a:t>
-            </a:r>
-          </a:p>
-          <a:p>
-            <a:r>
-              <a:rPr lang="en-US" dirty="0"/>
-              <a:t>Salvage</a:t>
-            </a:r>
-          </a:p>
-          <a:p>
-            <a:pPr lvl="1"/>
-            <a:r>
-              <a:rPr lang="en-US" dirty="0"/>
-              <a:t>Using an existing component with minor modifications</a:t>
-            </a:r>
-          </a:p>
-          <a:p>
-            <a:pPr lvl="1"/>
-            <a:r>
-              <a:rPr lang="en-US" dirty="0"/>
-              <a:t>That creates another component that must be configured and managed</a:t>
-            </a:r>
-          </a:p>
-          <a:p>
-            <a:r>
-              <a:rPr lang="en-US" dirty="0"/>
-              <a:t>Reuse</a:t>
-            </a:r>
-          </a:p>
-          <a:p>
-            <a:pPr lvl="1"/>
-            <a:r>
-              <a:rPr lang="en-US" dirty="0"/>
-              <a:t>Reuse an existing component with </a:t>
-            </a:r>
-            <a:r>
-              <a:rPr lang="en-US" b="1" dirty="0"/>
-              <a:t>no modification</a:t>
-            </a:r>
-          </a:p>
-          <a:p>
-            <a:pPr lvl="1"/>
-            <a:r>
-              <a:rPr lang="en-US" dirty="0"/>
-              <a:t>Used by composing, using as template argument, or using as base for derived classes</a:t>
-            </a:r>
-          </a:p>
-        </p:txBody>
-      </p:sp>
-      <p:sp>
-        <p:nvSpPr>
-          <p:cNvPr id="4" name="Slide Number Placeholder 3">
-            <a:extLst>
-              <a:ext uri="{FF2B5EF4-FFF2-40B4-BE49-F238E27FC236}">
-                <a16:creationId xmlns:a16="http://schemas.microsoft.com/office/drawing/2014/main" id="{B61567BC-F924-41F2-BFB4-D8538334616A}"/>
-              </a:ext>
-            </a:extLst>
-          </p:cNvPr>
-          <p:cNvSpPr>
-            <a:spLocks noGrp="1"/>
-          </p:cNvSpPr>
-          <p:nvPr>
-            <p:ph type="sldNum" sz="quarter" idx="12"/>
-          </p:nvPr>
-        </p:nvSpPr>
-        <p:spPr/>
-        <p:txBody>
-          <a:bodyPr/>
-          <a:lstStyle/>
-          <a:p>
-            <a:fld id="{EDEBF0BA-A897-4C1E-AB3C-F330808C0E1D}" type="slidenum">
-              <a:rPr lang="en-US" smtClean="0"/>
-              <a:t>5</a:t>
-            </a:fld>
-            <a:endParaRPr lang="en-US"/>
-          </a:p>
-        </p:txBody>
-      </p:sp>
-    </p:spTree>
-    <p:extLst>
-      <p:ext uri="{BB962C8B-B14F-4D97-AF65-F5344CB8AC3E}">
-        <p14:creationId xmlns:p14="http://schemas.microsoft.com/office/powerpoint/2010/main" val="1570206584"/>
       </p:ext>
     </p:extLst>
   </p:cSld>
@@ -8048,7 +8261,7 @@
           <p:cNvPr id="2" name="Title 1">
             <a:extLst>
               <a:ext uri="{FF2B5EF4-FFF2-40B4-BE49-F238E27FC236}">
-                <a16:creationId xmlns:a16="http://schemas.microsoft.com/office/drawing/2014/main" id="{F1B24BBB-0213-4D00-88F7-E56C4B74D226}"/>
+                <a16:creationId xmlns:a16="http://schemas.microsoft.com/office/drawing/2014/main" id="{D5791037-F5B9-4520-96E0-22E8D64C46FF}"/>
               </a:ext>
             </a:extLst>
           </p:cNvPr>
@@ -8066,7 +8279,7 @@
           <a:p>
             <a:r>
               <a:rPr lang="en-US" dirty="0"/>
-              <a:t>Software Reuse</a:t>
+              <a:t>Goal – Support Salvage and Reuse</a:t>
             </a:r>
           </a:p>
         </p:txBody>
@@ -8076,7 +8289,7 @@
           <p:cNvPr id="3" name="Content Placeholder 2">
             <a:extLst>
               <a:ext uri="{FF2B5EF4-FFF2-40B4-BE49-F238E27FC236}">
-                <a16:creationId xmlns:a16="http://schemas.microsoft.com/office/drawing/2014/main" id="{FEA0B531-7F0B-4322-A722-D55B7801E94D}"/>
+                <a16:creationId xmlns:a16="http://schemas.microsoft.com/office/drawing/2014/main" id="{491474DF-CCCA-4B65-87ED-1CE7E2998525}"/>
               </a:ext>
             </a:extLst>
           </p:cNvPr>
@@ -8087,98 +8300,65 @@
             <p:ph idx="1"/>
           </p:nvPr>
         </p:nvSpPr>
-        <p:spPr>
-          <a:xfrm>
-            <a:off x="838200" y="1390918"/>
-            <a:ext cx="10515600" cy="4605741"/>
-          </a:xfrm>
-        </p:spPr>
-        <p:txBody>
-          <a:bodyPr/>
-          <a:lstStyle/>
-          <a:p>
-            <a:r>
-              <a:rPr lang="en-US" dirty="0"/>
-              <a:t>Reuse of compiler libraries has been spectacularly successful</a:t>
-            </a:r>
-          </a:p>
-          <a:p>
-            <a:pPr lvl="1"/>
-            <a:r>
-              <a:rPr lang="en-US" dirty="0"/>
-              <a:t>Each language defines a set of libraries that support building projects</a:t>
-            </a:r>
-          </a:p>
-          <a:p>
-            <a:pPr lvl="1"/>
-            <a:r>
-              <a:rPr lang="en-US" dirty="0"/>
-              <a:t>Updated with each new standardization of the language.</a:t>
-            </a:r>
-          </a:p>
-          <a:p>
-            <a:pPr marL="457200" lvl="1" indent="0">
-              <a:buNone/>
-            </a:pPr>
-            <a:r>
-              <a:rPr lang="en-US" sz="300" dirty="0"/>
-              <a:t> </a:t>
-            </a:r>
-            <a:endParaRPr lang="en-US" dirty="0"/>
-          </a:p>
-          <a:p>
-            <a:r>
-              <a:rPr lang="en-US" dirty="0"/>
-              <a:t>Software reuse in the academic, industrial, and commercial domains has been disappointing</a:t>
-            </a:r>
-          </a:p>
-          <a:p>
-            <a:pPr lvl="1"/>
-            <a:r>
-              <a:rPr lang="en-US" dirty="0"/>
-              <a:t>Typical use is:</a:t>
-            </a:r>
-          </a:p>
-          <a:p>
-            <a:pPr lvl="2"/>
-            <a:r>
-              <a:rPr lang="en-US" dirty="0"/>
-              <a:t>Grab the last relevant project(s)</a:t>
-            </a:r>
-          </a:p>
-          <a:p>
-            <a:pPr lvl="2"/>
-            <a:r>
-              <a:rPr lang="en-US" dirty="0"/>
-              <a:t>Attempt to throw away the unneeded parts</a:t>
-            </a:r>
-          </a:p>
-          <a:p>
-            <a:pPr lvl="3"/>
-            <a:r>
-              <a:rPr lang="en-US" dirty="0"/>
-              <a:t>Sometimes we keep unneeded parts because too much breaks if we remove</a:t>
-            </a:r>
-          </a:p>
-          <a:p>
-            <a:pPr lvl="3"/>
-            <a:r>
-              <a:rPr lang="en-US" dirty="0"/>
-              <a:t>That causes maintenance problems</a:t>
-            </a:r>
-          </a:p>
-          <a:p>
-            <a:pPr lvl="2"/>
-            <a:r>
-              <a:rPr lang="en-US" dirty="0"/>
-              <a:t>Add needed new parts</a:t>
-            </a:r>
-          </a:p>
-          <a:p>
-            <a:pPr lvl="2"/>
-            <a:r>
-              <a:rPr lang="en-US" dirty="0"/>
-              <a:t>Spend a lot of time fixing breakage</a:t>
+        <p:spPr/>
+        <p:txBody>
+          <a:bodyPr/>
+          <a:lstStyle/>
+          <a:p>
+            <a:r>
+              <a:rPr lang="en-US" dirty="0"/>
+              <a:t>Software Components</a:t>
+            </a:r>
+          </a:p>
+          <a:p>
+            <a:pPr lvl="1"/>
+            <a:r>
+              <a:rPr lang="en-US" dirty="0"/>
+              <a:t>Software package that has a single purpose, few dependencies, and is useful for building software systems – example: blocking queue</a:t>
+            </a:r>
+          </a:p>
+          <a:p>
+            <a:r>
+              <a:rPr lang="en-US" dirty="0"/>
+              <a:t>Salvage</a:t>
+            </a:r>
+          </a:p>
+          <a:p>
+            <a:pPr lvl="1"/>
+            <a:r>
+              <a:rPr lang="en-US" dirty="0"/>
+              <a:t>Using an existing component with minor modifications</a:t>
+            </a:r>
+          </a:p>
+          <a:p>
+            <a:pPr lvl="1"/>
+            <a:r>
+              <a:rPr lang="en-US" dirty="0"/>
+              <a:t>That creates another component that must be configured and managed</a:t>
+            </a:r>
+          </a:p>
+          <a:p>
+            <a:r>
+              <a:rPr lang="en-US" dirty="0"/>
+              <a:t>Reuse</a:t>
+            </a:r>
+          </a:p>
+          <a:p>
+            <a:pPr lvl="1"/>
+            <a:r>
+              <a:rPr lang="en-US" dirty="0"/>
+              <a:t>Reuse an existing component with </a:t>
+            </a:r>
+            <a:r>
+              <a:rPr lang="en-US" b="1" dirty="0"/>
+              <a:t>no modification</a:t>
+            </a:r>
+          </a:p>
+          <a:p>
+            <a:pPr lvl="1"/>
+            <a:r>
+              <a:rPr lang="en-US" dirty="0"/>
+              <a:t>Used by composing, using as template argument, or using as base for derived classes</a:t>
             </a:r>
           </a:p>
         </p:txBody>
@@ -8188,7 +8368,7 @@
           <p:cNvPr id="4" name="Slide Number Placeholder 3">
             <a:extLst>
               <a:ext uri="{FF2B5EF4-FFF2-40B4-BE49-F238E27FC236}">
-                <a16:creationId xmlns:a16="http://schemas.microsoft.com/office/drawing/2014/main" id="{0D37066F-B2B3-4651-BDC8-5D880CC57D1C}"/>
+                <a16:creationId xmlns:a16="http://schemas.microsoft.com/office/drawing/2014/main" id="{B61567BC-F924-41F2-BFB4-D8538334616A}"/>
               </a:ext>
             </a:extLst>
           </p:cNvPr>
@@ -8215,7 +8395,7 @@
     </p:spTree>
     <p:extLst>
       <p:ext uri="{BB962C8B-B14F-4D97-AF65-F5344CB8AC3E}">
-        <p14:creationId xmlns:p14="http://schemas.microsoft.com/office/powerpoint/2010/main" val="2182629184"/>
+        <p14:creationId xmlns:p14="http://schemas.microsoft.com/office/powerpoint/2010/main" val="1570206584"/>
       </p:ext>
     </p:extLst>
   </p:cSld>
@@ -8247,7 +8427,7 @@
           <p:cNvPr id="2" name="Title 1">
             <a:extLst>
               <a:ext uri="{FF2B5EF4-FFF2-40B4-BE49-F238E27FC236}">
-                <a16:creationId xmlns:a16="http://schemas.microsoft.com/office/drawing/2014/main" id="{7B9AA4E2-8439-499E-8E09-B7B92D39946D}"/>
+                <a16:creationId xmlns:a16="http://schemas.microsoft.com/office/drawing/2014/main" id="{F1B24BBB-0213-4D00-88F7-E56C4B74D226}"/>
               </a:ext>
             </a:extLst>
           </p:cNvPr>
@@ -8265,7 +8445,7 @@
           <a:p>
             <a:r>
               <a:rPr lang="en-US" dirty="0"/>
-              <a:t>Publishing Code for (Re)use</a:t>
+              <a:t>Software Reuse</a:t>
             </a:r>
           </a:p>
         </p:txBody>
@@ -8275,7 +8455,7 @@
           <p:cNvPr id="3" name="Content Placeholder 2">
             <a:extLst>
               <a:ext uri="{FF2B5EF4-FFF2-40B4-BE49-F238E27FC236}">
-                <a16:creationId xmlns:a16="http://schemas.microsoft.com/office/drawing/2014/main" id="{52CCEAD5-80CD-43AC-9D2F-18A29BD5B9E1}"/>
+                <a16:creationId xmlns:a16="http://schemas.microsoft.com/office/drawing/2014/main" id="{FEA0B531-7F0B-4322-A722-D55B7801E94D}"/>
               </a:ext>
             </a:extLst>
           </p:cNvPr>
@@ -8288,99 +8468,96 @@
         </p:nvSpPr>
         <p:spPr>
           <a:xfrm>
-            <a:off x="838200" y="1339403"/>
-            <a:ext cx="10515600" cy="4734530"/>
+            <a:off x="838200" y="1390918"/>
+            <a:ext cx="10515600" cy="4605741"/>
           </a:xfrm>
         </p:spPr>
         <p:txBody>
           <a:bodyPr/>
           <a:lstStyle/>
           <a:p>
-            <a:pPr>
-              <a:lnSpc>
-                <a:spcPct val="100000"/>
-              </a:lnSpc>
+            <a:r>
+              <a:rPr lang="en-US" dirty="0"/>
+              <a:t>Reuse of compiler libraries has been spectacularly successful</a:t>
+            </a:r>
+          </a:p>
+          <a:p>
+            <a:pPr lvl="1"/>
+            <a:r>
+              <a:rPr lang="en-US" dirty="0"/>
+              <a:t>Each language defines a set of libraries that support building projects</a:t>
+            </a:r>
+          </a:p>
+          <a:p>
+            <a:pPr lvl="1"/>
+            <a:r>
+              <a:rPr lang="en-US" dirty="0"/>
+              <a:t>Updated with each new standardization of the language.</a:t>
+            </a:r>
+          </a:p>
+          <a:p>
+            <a:pPr marL="457200" lvl="1" indent="0">
+              <a:buNone/>
             </a:pPr>
             <a:r>
-              <a:rPr lang="en-US" dirty="0"/>
-              <a:t>The goal of this site is to improve that process by publishing code in an effective way</a:t>
-            </a:r>
-          </a:p>
-          <a:p>
-            <a:pPr>
-              <a:lnSpc>
-                <a:spcPct val="100000"/>
-              </a:lnSpc>
-            </a:pPr>
-            <a:r>
-              <a:rPr lang="en-US" dirty="0"/>
-              <a:t>Publishing some code artifact is the act of making it available, in usable form.</a:t>
-            </a:r>
-          </a:p>
-          <a:p>
-            <a:pPr>
-              <a:lnSpc>
-                <a:spcPct val="150000"/>
-              </a:lnSpc>
-            </a:pPr>
-            <a:r>
-              <a:rPr lang="en-US" dirty="0"/>
-              <a:t>Five main facets:</a:t>
-            </a:r>
-          </a:p>
-          <a:p>
-            <a:pPr lvl="1">
-              <a:lnSpc>
-                <a:spcPct val="100000"/>
-              </a:lnSpc>
-            </a:pPr>
-            <a:r>
-              <a:rPr lang="en-US" dirty="0"/>
-              <a:t>Containment</a:t>
-            </a:r>
-          </a:p>
-          <a:p>
-            <a:pPr lvl="1">
-              <a:lnSpc>
-                <a:spcPct val="100000"/>
-              </a:lnSpc>
-            </a:pPr>
-            <a:r>
-              <a:rPr lang="en-US" dirty="0"/>
-              <a:t>Delivery</a:t>
-            </a:r>
-          </a:p>
-          <a:p>
-            <a:pPr lvl="1">
-              <a:lnSpc>
-                <a:spcPct val="100000"/>
-              </a:lnSpc>
-            </a:pPr>
-            <a:r>
-              <a:rPr lang="en-US" dirty="0"/>
-              <a:t>Location</a:t>
-            </a:r>
-          </a:p>
-          <a:p>
-            <a:pPr lvl="1">
-              <a:lnSpc>
-                <a:spcPct val="100000"/>
-              </a:lnSpc>
-            </a:pPr>
-            <a:r>
-              <a:rPr lang="en-US" dirty="0"/>
-              <a:t>Interpretation</a:t>
-            </a:r>
-          </a:p>
-          <a:p>
-            <a:pPr lvl="1">
-              <a:lnSpc>
-                <a:spcPct val="100000"/>
-              </a:lnSpc>
-            </a:pPr>
-            <a:r>
-              <a:rPr lang="en-US" dirty="0"/>
-              <a:t>Quality Control</a:t>
+              <a:rPr lang="en-US" sz="300" dirty="0"/>
+              <a:t> </a:t>
+            </a:r>
+            <a:endParaRPr lang="en-US" dirty="0"/>
+          </a:p>
+          <a:p>
+            <a:r>
+              <a:rPr lang="en-US" dirty="0"/>
+              <a:t>Software reuse in the academic, industrial, and commercial domains has been disappointing</a:t>
+            </a:r>
+          </a:p>
+          <a:p>
+            <a:pPr lvl="1"/>
+            <a:r>
+              <a:rPr lang="en-US" dirty="0"/>
+              <a:t>Typical use is:</a:t>
+            </a:r>
+          </a:p>
+          <a:p>
+            <a:pPr lvl="2"/>
+            <a:r>
+              <a:rPr lang="en-US" dirty="0"/>
+              <a:t>Grab the last relevant project(s)</a:t>
+            </a:r>
+          </a:p>
+          <a:p>
+            <a:pPr lvl="2"/>
+            <a:r>
+              <a:rPr lang="en-US" dirty="0"/>
+              <a:t>Attempt to throw away the unneeded parts</a:t>
+            </a:r>
+          </a:p>
+          <a:p>
+            <a:pPr lvl="3"/>
+            <a:r>
+              <a:rPr lang="en-US" dirty="0"/>
+              <a:t>Sometimes we keep unneeded parts because too much breaks if we remove</a:t>
+            </a:r>
+          </a:p>
+          <a:p>
+            <a:pPr lvl="3"/>
+            <a:r>
+              <a:rPr lang="en-US" dirty="0"/>
+              <a:t>That causes maintenance problems</a:t>
+            </a:r>
+          </a:p>
+          <a:p>
+            <a:pPr lvl="2"/>
+            <a:r>
+              <a:rPr lang="en-US" dirty="0"/>
+              <a:t>Add needed new parts</a:t>
+            </a:r>
+          </a:p>
+          <a:p>
+            <a:pPr lvl="2"/>
+            <a:r>
+              <a:rPr lang="en-US" dirty="0"/>
+              <a:t>Spend a lot of time fixing breakage</a:t>
             </a:r>
           </a:p>
         </p:txBody>
@@ -8390,7 +8567,7 @@
           <p:cNvPr id="4" name="Slide Number Placeholder 3">
             <a:extLst>
               <a:ext uri="{FF2B5EF4-FFF2-40B4-BE49-F238E27FC236}">
-                <a16:creationId xmlns:a16="http://schemas.microsoft.com/office/drawing/2014/main" id="{0E7EA502-B1E7-4DB5-B94A-0DBA481132A4}"/>
+                <a16:creationId xmlns:a16="http://schemas.microsoft.com/office/drawing/2014/main" id="{0D37066F-B2B3-4651-BDC8-5D880CC57D1C}"/>
               </a:ext>
             </a:extLst>
           </p:cNvPr>
@@ -8417,7 +8594,7 @@
     </p:spTree>
     <p:extLst>
       <p:ext uri="{BB962C8B-B14F-4D97-AF65-F5344CB8AC3E}">
-        <p14:creationId xmlns:p14="http://schemas.microsoft.com/office/powerpoint/2010/main" val="4268696743"/>
+        <p14:creationId xmlns:p14="http://schemas.microsoft.com/office/powerpoint/2010/main" val="2182629184"/>
       </p:ext>
     </p:extLst>
   </p:cSld>
@@ -8449,7 +8626,7 @@
           <p:cNvPr id="2" name="Title 1">
             <a:extLst>
               <a:ext uri="{FF2B5EF4-FFF2-40B4-BE49-F238E27FC236}">
-                <a16:creationId xmlns:a16="http://schemas.microsoft.com/office/drawing/2014/main" id="{B4725340-475B-4911-AC68-3E9A7FF99896}"/>
+                <a16:creationId xmlns:a16="http://schemas.microsoft.com/office/drawing/2014/main" id="{7B9AA4E2-8439-499E-8E09-B7B92D39946D}"/>
               </a:ext>
             </a:extLst>
           </p:cNvPr>
@@ -8467,7 +8644,7 @@
           <a:p>
             <a:r>
               <a:rPr lang="en-US" dirty="0"/>
-              <a:t>The Issues</a:t>
+              <a:t>Publishing Code for (Re)use</a:t>
             </a:r>
           </a:p>
         </p:txBody>
@@ -8477,7 +8654,7 @@
           <p:cNvPr id="3" name="Content Placeholder 2">
             <a:extLst>
               <a:ext uri="{FF2B5EF4-FFF2-40B4-BE49-F238E27FC236}">
-                <a16:creationId xmlns:a16="http://schemas.microsoft.com/office/drawing/2014/main" id="{D28EEC85-0147-4609-8EA7-C7AE355F5329}"/>
+                <a16:creationId xmlns:a16="http://schemas.microsoft.com/office/drawing/2014/main" id="{52CCEAD5-80CD-43AC-9D2F-18A29BD5B9E1}"/>
               </a:ext>
             </a:extLst>
           </p:cNvPr>
@@ -8490,13 +8667,35 @@
         </p:nvSpPr>
         <p:spPr>
           <a:xfrm>
-            <a:off x="838200" y="1390918"/>
-            <a:ext cx="10515600" cy="4786045"/>
+            <a:off x="838200" y="1339403"/>
+            <a:ext cx="10515600" cy="4734530"/>
           </a:xfrm>
         </p:spPr>
         <p:txBody>
           <a:bodyPr/>
           <a:lstStyle/>
+          <a:p>
+            <a:pPr>
+              <a:lnSpc>
+                <a:spcPct val="100000"/>
+              </a:lnSpc>
+            </a:pPr>
+            <a:r>
+              <a:rPr lang="en-US" dirty="0"/>
+              <a:t>The goal of this site is to improve that process by publishing code in an effective way</a:t>
+            </a:r>
+          </a:p>
+          <a:p>
+            <a:pPr>
+              <a:lnSpc>
+                <a:spcPct val="100000"/>
+              </a:lnSpc>
+            </a:pPr>
+            <a:r>
+              <a:rPr lang="en-US" dirty="0"/>
+              <a:t>Publishing some code artifact is the act of making it available, in usable form.</a:t>
+            </a:r>
+          </a:p>
           <a:p>
             <a:pPr>
               <a:lnSpc>
@@ -8505,7 +8704,7 @@
             </a:pPr>
             <a:r>
               <a:rPr lang="en-US" dirty="0"/>
-              <a:t>Source code containment and delivery are solved problems</a:t>
+              <a:t>Five main facets:</a:t>
             </a:r>
           </a:p>
           <a:p>
@@ -8516,26 +8715,7 @@
             </a:pPr>
             <a:r>
               <a:rPr lang="en-US" dirty="0"/>
-              <a:t>Cloud-based facilities like </a:t>
-            </a:r>
-            <a:r>
-              <a:rPr lang="en-US" dirty="0" err="1"/>
-              <a:t>github</a:t>
-            </a:r>
-            <a:r>
-              <a:rPr lang="en-US" dirty="0"/>
-              <a:t> do that very well</a:t>
-            </a:r>
-          </a:p>
-          <a:p>
-            <a:pPr>
-              <a:lnSpc>
-                <a:spcPct val="150000"/>
-              </a:lnSpc>
-            </a:pPr>
-            <a:r>
-              <a:rPr lang="en-US" dirty="0"/>
-              <a:t>The issues are finding and understanding code relevant to a need</a:t>
+              <a:t>Containment</a:t>
             </a:r>
           </a:p>
           <a:p>
@@ -8546,7 +8726,7 @@
             </a:pPr>
             <a:r>
               <a:rPr lang="en-US" dirty="0"/>
-              <a:t>We want most code repositories to be large – to support broad reuse</a:t>
+              <a:t>Delivery</a:t>
             </a:r>
           </a:p>
           <a:p>
@@ -8557,18 +8737,7 @@
             </a:pPr>
             <a:r>
               <a:rPr lang="en-US" dirty="0"/>
-              <a:t>How do we find, in a large repository, code that fills some need?</a:t>
-            </a:r>
-          </a:p>
-          <a:p>
-            <a:pPr>
-              <a:lnSpc>
-                <a:spcPct val="100000"/>
-              </a:lnSpc>
-            </a:pPr>
-            <a:r>
-              <a:rPr lang="en-US" dirty="0"/>
-              <a:t>Website documentation, collocated with source code - a good option</a:t>
+              <a:t>Location</a:t>
             </a:r>
           </a:p>
           <a:p>
@@ -8579,7 +8748,18 @@
             </a:pPr>
             <a:r>
               <a:rPr lang="en-US" dirty="0"/>
-              <a:t>To support both salvage and reuse, documentation needs to provide information about the component’s concept, design, and typical use</a:t>
+              <a:t>Interpretation</a:t>
+            </a:r>
+          </a:p>
+          <a:p>
+            <a:pPr lvl="1">
+              <a:lnSpc>
+                <a:spcPct val="100000"/>
+              </a:lnSpc>
+            </a:pPr>
+            <a:r>
+              <a:rPr lang="en-US" dirty="0"/>
+              <a:t>Quality Control</a:t>
             </a:r>
           </a:p>
         </p:txBody>
@@ -8589,7 +8769,7 @@
           <p:cNvPr id="4" name="Slide Number Placeholder 3">
             <a:extLst>
               <a:ext uri="{FF2B5EF4-FFF2-40B4-BE49-F238E27FC236}">
-                <a16:creationId xmlns:a16="http://schemas.microsoft.com/office/drawing/2014/main" id="{B69DD603-6CCB-4044-86D9-1197C687F477}"/>
+                <a16:creationId xmlns:a16="http://schemas.microsoft.com/office/drawing/2014/main" id="{0E7EA502-B1E7-4DB5-B94A-0DBA481132A4}"/>
               </a:ext>
             </a:extLst>
           </p:cNvPr>
@@ -8616,7 +8796,7 @@
     </p:spTree>
     <p:extLst>
       <p:ext uri="{BB962C8B-B14F-4D97-AF65-F5344CB8AC3E}">
-        <p14:creationId xmlns:p14="http://schemas.microsoft.com/office/powerpoint/2010/main" val="1974146755"/>
+        <p14:creationId xmlns:p14="http://schemas.microsoft.com/office/powerpoint/2010/main" val="4268696743"/>
       </p:ext>
     </p:extLst>
   </p:cSld>
@@ -8648,7 +8828,7 @@
           <p:cNvPr id="2" name="Title 1">
             <a:extLst>
               <a:ext uri="{FF2B5EF4-FFF2-40B4-BE49-F238E27FC236}">
-                <a16:creationId xmlns:a16="http://schemas.microsoft.com/office/drawing/2014/main" id="{B5D3CA25-160B-4B16-981E-1259FF9C54AA}"/>
+                <a16:creationId xmlns:a16="http://schemas.microsoft.com/office/drawing/2014/main" id="{B4725340-475B-4911-AC68-3E9A7FF99896}"/>
               </a:ext>
             </a:extLst>
           </p:cNvPr>
@@ -8666,7 +8846,7 @@
           <a:p>
             <a:r>
               <a:rPr lang="en-US" dirty="0"/>
-              <a:t>Website for Publishing Reusable Components</a:t>
+              <a:t>The Issues</a:t>
             </a:r>
           </a:p>
         </p:txBody>
@@ -8676,7 +8856,7 @@
           <p:cNvPr id="3" name="Content Placeholder 2">
             <a:extLst>
               <a:ext uri="{FF2B5EF4-FFF2-40B4-BE49-F238E27FC236}">
-                <a16:creationId xmlns:a16="http://schemas.microsoft.com/office/drawing/2014/main" id="{51D4E0A7-5491-48A3-8C75-90DDBA9ED838}"/>
+                <a16:creationId xmlns:a16="http://schemas.microsoft.com/office/drawing/2014/main" id="{D28EEC85-0147-4609-8EA7-C7AE355F5329}"/>
               </a:ext>
             </a:extLst>
           </p:cNvPr>
@@ -8687,84 +8867,98 @@
             <p:ph idx="1"/>
           </p:nvPr>
         </p:nvSpPr>
-        <p:spPr/>
-        <p:txBody>
-          <a:bodyPr/>
-          <a:lstStyle/>
-          <a:p>
-            <a:r>
-              <a:rPr lang="en-US" dirty="0"/>
-              <a:t>A site for publishing source code will need:</a:t>
-            </a:r>
-          </a:p>
-          <a:p>
-            <a:pPr lvl="1"/>
-            <a:r>
-              <a:rPr lang="en-US" dirty="0"/>
-              <a:t>A structure for holding organized collections of code</a:t>
-            </a:r>
-          </a:p>
-          <a:p>
-            <a:pPr lvl="1"/>
-            <a:r>
-              <a:rPr lang="en-US" dirty="0"/>
-              <a:t>Documentation for each component</a:t>
-            </a:r>
-          </a:p>
-          <a:p>
-            <a:pPr lvl="2"/>
-            <a:r>
-              <a:rPr lang="en-US" dirty="0"/>
-              <a:t>Concept, Design, Usage, Status</a:t>
-            </a:r>
-          </a:p>
-          <a:p>
-            <a:pPr lvl="1"/>
-            <a:r>
-              <a:rPr lang="en-US" dirty="0"/>
-              <a:t>Additional resources to help users understand relevant technologies</a:t>
-            </a:r>
-          </a:p>
-          <a:p>
-            <a:pPr lvl="2"/>
-            <a:r>
-              <a:rPr lang="en-US" dirty="0"/>
-              <a:t>Language and platform references</a:t>
-            </a:r>
-          </a:p>
-          <a:p>
-            <a:pPr lvl="2"/>
-            <a:r>
-              <a:rPr lang="en-US" dirty="0"/>
-              <a:t>Brief code snapshots with commentary, provided as webpages</a:t>
-            </a:r>
-          </a:p>
-          <a:p>
-            <a:pPr lvl="2"/>
-            <a:r>
-              <a:rPr lang="en-US" dirty="0"/>
-              <a:t>Related blogs and opinion pieces</a:t>
-            </a:r>
-          </a:p>
-          <a:p>
-            <a:pPr lvl="2"/>
-            <a:r>
-              <a:rPr lang="en-US" dirty="0"/>
-              <a:t>Code standards</a:t>
-            </a:r>
-          </a:p>
-          <a:p>
-            <a:pPr lvl="1"/>
-            <a:r>
-              <a:rPr lang="en-US" dirty="0"/>
-              <a:t>Stories and Videos</a:t>
-            </a:r>
-          </a:p>
-          <a:p>
-            <a:pPr lvl="2"/>
-            <a:r>
-              <a:rPr lang="en-US" dirty="0"/>
-              <a:t>Discussions, each focused on a single theme</a:t>
+        <p:spPr>
+          <a:xfrm>
+            <a:off x="838200" y="1390918"/>
+            <a:ext cx="10515600" cy="4786045"/>
+          </a:xfrm>
+        </p:spPr>
+        <p:txBody>
+          <a:bodyPr/>
+          <a:lstStyle/>
+          <a:p>
+            <a:pPr>
+              <a:lnSpc>
+                <a:spcPct val="150000"/>
+              </a:lnSpc>
+            </a:pPr>
+            <a:r>
+              <a:rPr lang="en-US" dirty="0"/>
+              <a:t>Source code containment and delivery are solved problems</a:t>
+            </a:r>
+          </a:p>
+          <a:p>
+            <a:pPr lvl="1">
+              <a:lnSpc>
+                <a:spcPct val="100000"/>
+              </a:lnSpc>
+            </a:pPr>
+            <a:r>
+              <a:rPr lang="en-US" dirty="0"/>
+              <a:t>Cloud-based facilities like </a:t>
+            </a:r>
+            <a:r>
+              <a:rPr lang="en-US" dirty="0" err="1"/>
+              <a:t>github</a:t>
+            </a:r>
+            <a:r>
+              <a:rPr lang="en-US" dirty="0"/>
+              <a:t> do that very well</a:t>
+            </a:r>
+          </a:p>
+          <a:p>
+            <a:pPr>
+              <a:lnSpc>
+                <a:spcPct val="150000"/>
+              </a:lnSpc>
+            </a:pPr>
+            <a:r>
+              <a:rPr lang="en-US" dirty="0"/>
+              <a:t>The issues are finding and understanding code relevant to a need</a:t>
+            </a:r>
+          </a:p>
+          <a:p>
+            <a:pPr lvl="1">
+              <a:lnSpc>
+                <a:spcPct val="100000"/>
+              </a:lnSpc>
+            </a:pPr>
+            <a:r>
+              <a:rPr lang="en-US" dirty="0"/>
+              <a:t>We want most code repositories to be large – to support broad reuse</a:t>
+            </a:r>
+          </a:p>
+          <a:p>
+            <a:pPr lvl="1">
+              <a:lnSpc>
+                <a:spcPct val="100000"/>
+              </a:lnSpc>
+            </a:pPr>
+            <a:r>
+              <a:rPr lang="en-US" dirty="0"/>
+              <a:t>How do we find, in a large repository, code that fills some need?</a:t>
+            </a:r>
+          </a:p>
+          <a:p>
+            <a:pPr>
+              <a:lnSpc>
+                <a:spcPct val="100000"/>
+              </a:lnSpc>
+            </a:pPr>
+            <a:r>
+              <a:rPr lang="en-US" dirty="0"/>
+              <a:t>Website documentation, collocated with source code - a good option</a:t>
+            </a:r>
+          </a:p>
+          <a:p>
+            <a:pPr lvl="1">
+              <a:lnSpc>
+                <a:spcPct val="100000"/>
+              </a:lnSpc>
+            </a:pPr>
+            <a:r>
+              <a:rPr lang="en-US" dirty="0"/>
+              <a:t>To support both salvage and reuse, documentation needs to provide information about the component’s concept, design, and typical use</a:t>
             </a:r>
           </a:p>
         </p:txBody>
@@ -8774,7 +8968,7 @@
           <p:cNvPr id="4" name="Slide Number Placeholder 3">
             <a:extLst>
               <a:ext uri="{FF2B5EF4-FFF2-40B4-BE49-F238E27FC236}">
-                <a16:creationId xmlns:a16="http://schemas.microsoft.com/office/drawing/2014/main" id="{B5E8AE43-7C82-414E-9C86-9D3337400307}"/>
+                <a16:creationId xmlns:a16="http://schemas.microsoft.com/office/drawing/2014/main" id="{B69DD603-6CCB-4044-86D9-1197C687F477}"/>
               </a:ext>
             </a:extLst>
           </p:cNvPr>
@@ -8801,7 +8995,7 @@
     </p:spTree>
     <p:extLst>
       <p:ext uri="{BB962C8B-B14F-4D97-AF65-F5344CB8AC3E}">
-        <p14:creationId xmlns:p14="http://schemas.microsoft.com/office/powerpoint/2010/main" val="3990487094"/>
+        <p14:creationId xmlns:p14="http://schemas.microsoft.com/office/powerpoint/2010/main" val="1974146755"/>
       </p:ext>
     </p:extLst>
   </p:cSld>

</xml_diff>

<commit_message>
added one text item
</commit_message>
<xml_diff>
--- a/Resources/PublishingSourceCode.pptx
+++ b/Resources/PublishingSourceCode.pptx
@@ -8642,6 +8642,21 @@
             <a:r>
               <a:rPr lang="en-US" dirty="0"/>
               <a:t>A structure for holding organized collections of code</a:t>
+            </a:r>
+          </a:p>
+          <a:p>
+            <a:pPr lvl="1"/>
+            <a:r>
+              <a:rPr lang="en-US" dirty="0"/>
+              <a:t>An intuitive navigation process to </a:t>
+            </a:r>
+            <a:r>
+              <a:rPr lang="en-US"/>
+              <a:t>find specific code </a:t>
+            </a:r>
+            <a:r>
+              <a:rPr lang="en-US" dirty="0"/>
+              <a:t>and resources</a:t>
             </a:r>
           </a:p>
           <a:p>

</xml_diff>

<commit_message>
added another text item
</commit_message>
<xml_diff>
--- a/Resources/PublishingSourceCode.pptx
+++ b/Resources/PublishingSourceCode.pptx
@@ -5252,6 +5252,13 @@
             <a:r>
               <a:rPr lang="en-US" dirty="0"/>
               <a:t>Dropdown menus</a:t>
+            </a:r>
+          </a:p>
+          <a:p>
+            <a:pPr lvl="2"/>
+            <a:r>
+              <a:rPr lang="en-US" dirty="0"/>
+              <a:t>Page sequences (defined by hidden links)</a:t>
             </a:r>
           </a:p>
           <a:p>

</xml_diff>

<commit_message>
reordered pages, minor changes in content
</commit_message>
<xml_diff>
--- a/Resources/PublishingSourceCode.pptx
+++ b/Resources/PublishingSourceCode.pptx
@@ -5,35 +5,36 @@
     <p:sldMasterId id="2147483648" r:id="rId1"/>
   </p:sldMasterIdLst>
   <p:notesMasterIdLst>
-    <p:notesMasterId r:id="rId28"/>
+    <p:notesMasterId r:id="rId29"/>
   </p:notesMasterIdLst>
   <p:sldIdLst>
     <p:sldId id="256" r:id="rId2"/>
-    <p:sldId id="264" r:id="rId3"/>
-    <p:sldId id="272" r:id="rId4"/>
-    <p:sldId id="281" r:id="rId5"/>
+    <p:sldId id="283" r:id="rId3"/>
+    <p:sldId id="264" r:id="rId4"/>
+    <p:sldId id="272" r:id="rId5"/>
     <p:sldId id="260" r:id="rId6"/>
-    <p:sldId id="280" r:id="rId7"/>
+    <p:sldId id="281" r:id="rId7"/>
     <p:sldId id="258" r:id="rId8"/>
     <p:sldId id="257" r:id="rId9"/>
-    <p:sldId id="267" r:id="rId10"/>
-    <p:sldId id="259" r:id="rId11"/>
-    <p:sldId id="268" r:id="rId12"/>
-    <p:sldId id="270" r:id="rId13"/>
-    <p:sldId id="271" r:id="rId14"/>
-    <p:sldId id="278" r:id="rId15"/>
-    <p:sldId id="274" r:id="rId16"/>
-    <p:sldId id="273" r:id="rId17"/>
-    <p:sldId id="275" r:id="rId18"/>
-    <p:sldId id="282" r:id="rId19"/>
-    <p:sldId id="265" r:id="rId20"/>
-    <p:sldId id="266" r:id="rId21"/>
-    <p:sldId id="261" r:id="rId22"/>
-    <p:sldId id="262" r:id="rId23"/>
-    <p:sldId id="263" r:id="rId24"/>
-    <p:sldId id="276" r:id="rId25"/>
-    <p:sldId id="277" r:id="rId26"/>
-    <p:sldId id="279" r:id="rId27"/>
+    <p:sldId id="280" r:id="rId10"/>
+    <p:sldId id="267" r:id="rId11"/>
+    <p:sldId id="259" r:id="rId12"/>
+    <p:sldId id="268" r:id="rId13"/>
+    <p:sldId id="270" r:id="rId14"/>
+    <p:sldId id="271" r:id="rId15"/>
+    <p:sldId id="278" r:id="rId16"/>
+    <p:sldId id="274" r:id="rId17"/>
+    <p:sldId id="273" r:id="rId18"/>
+    <p:sldId id="275" r:id="rId19"/>
+    <p:sldId id="282" r:id="rId20"/>
+    <p:sldId id="265" r:id="rId21"/>
+    <p:sldId id="266" r:id="rId22"/>
+    <p:sldId id="261" r:id="rId23"/>
+    <p:sldId id="262" r:id="rId24"/>
+    <p:sldId id="263" r:id="rId25"/>
+    <p:sldId id="276" r:id="rId26"/>
+    <p:sldId id="277" r:id="rId27"/>
+    <p:sldId id="279" r:id="rId28"/>
   </p:sldIdLst>
   <p:sldSz cx="12192000" cy="6858000"/>
   <p:notesSz cx="7010400" cy="9296400"/>
@@ -3952,7 +3953,7 @@
           <p:cNvPr id="2" name="Title 1">
             <a:extLst>
               <a:ext uri="{FF2B5EF4-FFF2-40B4-BE49-F238E27FC236}">
-                <a16:creationId xmlns:a16="http://schemas.microsoft.com/office/drawing/2014/main" id="{2881EC79-B8EB-4B86-9096-033DD253DA73}"/>
+                <a16:creationId xmlns:a16="http://schemas.microsoft.com/office/drawing/2014/main" id="{B5D3CA25-160B-4B16-981E-1259FF9C54AA}"/>
               </a:ext>
             </a:extLst>
           </p:cNvPr>
@@ -3963,40 +3964,137 @@
             <p:ph type="title"/>
           </p:nvPr>
         </p:nvSpPr>
-        <p:spPr>
-          <a:xfrm>
-            <a:off x="838200" y="339367"/>
-            <a:ext cx="10515600" cy="755337"/>
-          </a:xfrm>
-        </p:spPr>
-        <p:txBody>
-          <a:bodyPr/>
-          <a:lstStyle/>
-          <a:p>
-            <a:r>
-              <a:rPr lang="en-US" dirty="0"/>
-              <a:t>Site Structure – </a:t>
-            </a:r>
-            <a:r>
-              <a:rPr lang="en-US" sz="2800" dirty="0">
-                <a:hlinkClick r:id="rId2"/>
-              </a:rPr>
-              <a:t>https://JimFawcett.github.io</a:t>
-            </a:r>
-            <a:r>
-              <a:rPr lang="en-US" sz="2800" dirty="0"/>
-              <a:t> </a:t>
-            </a:r>
-            <a:endParaRPr lang="en-US" dirty="0"/>
-          </a:p>
-        </p:txBody>
-      </p:sp>
-      <p:sp>
-        <p:nvSpPr>
-          <p:cNvPr id="3" name="Slide Number Placeholder 2">
-            <a:extLst>
-              <a:ext uri="{FF2B5EF4-FFF2-40B4-BE49-F238E27FC236}">
-                <a16:creationId xmlns:a16="http://schemas.microsoft.com/office/drawing/2014/main" id="{0DBFBEAD-15D2-406B-B29D-E04E546B4CC4}"/>
+        <p:spPr/>
+        <p:txBody>
+          <a:bodyPr/>
+          <a:lstStyle/>
+          <a:p>
+            <a:r>
+              <a:rPr lang="en-US" dirty="0"/>
+              <a:t>Website for Publishing Reusable Components</a:t>
+            </a:r>
+          </a:p>
+        </p:txBody>
+      </p:sp>
+      <p:sp>
+        <p:nvSpPr>
+          <p:cNvPr id="3" name="Content Placeholder 2">
+            <a:extLst>
+              <a:ext uri="{FF2B5EF4-FFF2-40B4-BE49-F238E27FC236}">
+                <a16:creationId xmlns:a16="http://schemas.microsoft.com/office/drawing/2014/main" id="{51D4E0A7-5491-48A3-8C75-90DDBA9ED838}"/>
+              </a:ext>
+            </a:extLst>
+          </p:cNvPr>
+          <p:cNvSpPr>
+            <a:spLocks noGrp="1"/>
+          </p:cNvSpPr>
+          <p:nvPr>
+            <p:ph idx="1"/>
+          </p:nvPr>
+        </p:nvSpPr>
+        <p:spPr/>
+        <p:txBody>
+          <a:bodyPr/>
+          <a:lstStyle/>
+          <a:p>
+            <a:r>
+              <a:rPr lang="en-US" dirty="0"/>
+              <a:t>A site for publishing source code will need:</a:t>
+            </a:r>
+          </a:p>
+          <a:p>
+            <a:pPr lvl="1"/>
+            <a:r>
+              <a:rPr lang="en-US" dirty="0"/>
+              <a:t>A structure for holding organized collections of code</a:t>
+            </a:r>
+          </a:p>
+          <a:p>
+            <a:pPr lvl="1"/>
+            <a:r>
+              <a:rPr lang="en-US" dirty="0"/>
+              <a:t>An intuitive navigation process to </a:t>
+            </a:r>
+            <a:r>
+              <a:rPr lang="en-US"/>
+              <a:t>find specific code </a:t>
+            </a:r>
+            <a:r>
+              <a:rPr lang="en-US" dirty="0"/>
+              <a:t>and resources</a:t>
+            </a:r>
+          </a:p>
+          <a:p>
+            <a:pPr lvl="1"/>
+            <a:r>
+              <a:rPr lang="en-US" dirty="0"/>
+              <a:t>Documentation for each component</a:t>
+            </a:r>
+          </a:p>
+          <a:p>
+            <a:pPr lvl="2"/>
+            <a:r>
+              <a:rPr lang="en-US" dirty="0"/>
+              <a:t>Concept, Design, Usage, Status</a:t>
+            </a:r>
+          </a:p>
+          <a:p>
+            <a:pPr lvl="1"/>
+            <a:r>
+              <a:rPr lang="en-US" dirty="0"/>
+              <a:t>Additional resources to help users understand relevant technologies</a:t>
+            </a:r>
+          </a:p>
+          <a:p>
+            <a:pPr lvl="2"/>
+            <a:r>
+              <a:rPr lang="en-US" dirty="0"/>
+              <a:t>Language and platform references</a:t>
+            </a:r>
+          </a:p>
+          <a:p>
+            <a:pPr lvl="2"/>
+            <a:r>
+              <a:rPr lang="en-US" dirty="0"/>
+              <a:t>Brief code snapshots with commentary, provided as webpages</a:t>
+            </a:r>
+          </a:p>
+          <a:p>
+            <a:pPr lvl="2"/>
+            <a:r>
+              <a:rPr lang="en-US" dirty="0"/>
+              <a:t>Related blogs and opinion pieces</a:t>
+            </a:r>
+          </a:p>
+          <a:p>
+            <a:pPr lvl="2"/>
+            <a:r>
+              <a:rPr lang="en-US" dirty="0"/>
+              <a:t>Code standards</a:t>
+            </a:r>
+          </a:p>
+          <a:p>
+            <a:pPr lvl="1"/>
+            <a:r>
+              <a:rPr lang="en-US" dirty="0"/>
+              <a:t>Stories and Videos</a:t>
+            </a:r>
+          </a:p>
+          <a:p>
+            <a:pPr lvl="2"/>
+            <a:r>
+              <a:rPr lang="en-US" dirty="0"/>
+              <a:t>Discussions, each focused on a single theme</a:t>
+            </a:r>
+          </a:p>
+        </p:txBody>
+      </p:sp>
+      <p:sp>
+        <p:nvSpPr>
+          <p:cNvPr id="4" name="Slide Number Placeholder 3">
+            <a:extLst>
+              <a:ext uri="{FF2B5EF4-FFF2-40B4-BE49-F238E27FC236}">
+                <a16:creationId xmlns:a16="http://schemas.microsoft.com/office/drawing/2014/main" id="{B5E8AE43-7C82-414E-9C86-9D3337400307}"/>
               </a:ext>
             </a:extLst>
           </p:cNvPr>
@@ -4020,45 +4118,10 @@
           </a:p>
         </p:txBody>
       </p:sp>
-      <p:pic>
-        <p:nvPicPr>
-          <p:cNvPr id="7" name="Content Placeholder 6" descr="A screenshot of a cell phone&#10;&#10;Description automatically generated">
-            <a:extLst>
-              <a:ext uri="{FF2B5EF4-FFF2-40B4-BE49-F238E27FC236}">
-                <a16:creationId xmlns:a16="http://schemas.microsoft.com/office/drawing/2014/main" id="{025D520F-A131-4997-AB91-05ACCF4CD798}"/>
-              </a:ext>
-            </a:extLst>
-          </p:cNvPr>
-          <p:cNvPicPr>
-            <a:picLocks noGrp="1" noChangeAspect="1"/>
-          </p:cNvPicPr>
-          <p:nvPr>
-            <p:ph idx="1"/>
-          </p:nvPr>
-        </p:nvPicPr>
-        <p:blipFill>
-          <a:blip r:embed="rId3">
-            <a:extLst>
-              <a:ext uri="{28A0092B-C50C-407E-A947-70E740481C1C}">
-                <a14:useLocalDpi xmlns:a14="http://schemas.microsoft.com/office/drawing/2010/main" val="0"/>
-              </a:ext>
-            </a:extLst>
-          </a:blip>
-          <a:stretch>
-            <a:fillRect/>
-          </a:stretch>
-        </p:blipFill>
-        <p:spPr>
-          <a:xfrm>
-            <a:off x="1320084" y="1234662"/>
-            <a:ext cx="9414105" cy="5121688"/>
-          </a:xfrm>
-        </p:spPr>
-      </p:pic>
     </p:spTree>
     <p:extLst>
       <p:ext uri="{BB962C8B-B14F-4D97-AF65-F5344CB8AC3E}">
-        <p14:creationId xmlns:p14="http://schemas.microsoft.com/office/powerpoint/2010/main" val="431493297"/>
+        <p14:creationId xmlns:p14="http://schemas.microsoft.com/office/powerpoint/2010/main" val="3990487094"/>
       </p:ext>
     </p:extLst>
   </p:cSld>
@@ -4090,6 +4153,144 @@
           <p:cNvPr id="2" name="Title 1">
             <a:extLst>
               <a:ext uri="{FF2B5EF4-FFF2-40B4-BE49-F238E27FC236}">
+                <a16:creationId xmlns:a16="http://schemas.microsoft.com/office/drawing/2014/main" id="{2881EC79-B8EB-4B86-9096-033DD253DA73}"/>
+              </a:ext>
+            </a:extLst>
+          </p:cNvPr>
+          <p:cNvSpPr>
+            <a:spLocks noGrp="1"/>
+          </p:cNvSpPr>
+          <p:nvPr>
+            <p:ph type="title"/>
+          </p:nvPr>
+        </p:nvSpPr>
+        <p:spPr>
+          <a:xfrm>
+            <a:off x="838200" y="339367"/>
+            <a:ext cx="10515600" cy="755337"/>
+          </a:xfrm>
+        </p:spPr>
+        <p:txBody>
+          <a:bodyPr/>
+          <a:lstStyle/>
+          <a:p>
+            <a:r>
+              <a:rPr lang="en-US" dirty="0"/>
+              <a:t>Site Structure – </a:t>
+            </a:r>
+            <a:r>
+              <a:rPr lang="en-US" sz="2800" dirty="0">
+                <a:hlinkClick r:id="rId2"/>
+              </a:rPr>
+              <a:t>https://JimFawcett.github.io</a:t>
+            </a:r>
+            <a:r>
+              <a:rPr lang="en-US" sz="2800" dirty="0"/>
+              <a:t> </a:t>
+            </a:r>
+            <a:endParaRPr lang="en-US" dirty="0"/>
+          </a:p>
+        </p:txBody>
+      </p:sp>
+      <p:sp>
+        <p:nvSpPr>
+          <p:cNvPr id="3" name="Slide Number Placeholder 2">
+            <a:extLst>
+              <a:ext uri="{FF2B5EF4-FFF2-40B4-BE49-F238E27FC236}">
+                <a16:creationId xmlns:a16="http://schemas.microsoft.com/office/drawing/2014/main" id="{0DBFBEAD-15D2-406B-B29D-E04E546B4CC4}"/>
+              </a:ext>
+            </a:extLst>
+          </p:cNvPr>
+          <p:cNvSpPr>
+            <a:spLocks noGrp="1"/>
+          </p:cNvSpPr>
+          <p:nvPr>
+            <p:ph type="sldNum" sz="quarter" idx="12"/>
+          </p:nvPr>
+        </p:nvSpPr>
+        <p:spPr/>
+        <p:txBody>
+          <a:bodyPr/>
+          <a:lstStyle/>
+          <a:p>
+            <a:fld id="{EDEBF0BA-A897-4C1E-AB3C-F330808C0E1D}" type="slidenum">
+              <a:rPr lang="en-US" smtClean="0"/>
+              <a:t>11</a:t>
+            </a:fld>
+            <a:endParaRPr lang="en-US"/>
+          </a:p>
+        </p:txBody>
+      </p:sp>
+      <p:pic>
+        <p:nvPicPr>
+          <p:cNvPr id="7" name="Content Placeholder 6" descr="A screenshot of a cell phone&#10;&#10;Description automatically generated">
+            <a:extLst>
+              <a:ext uri="{FF2B5EF4-FFF2-40B4-BE49-F238E27FC236}">
+                <a16:creationId xmlns:a16="http://schemas.microsoft.com/office/drawing/2014/main" id="{025D520F-A131-4997-AB91-05ACCF4CD798}"/>
+              </a:ext>
+            </a:extLst>
+          </p:cNvPr>
+          <p:cNvPicPr>
+            <a:picLocks noGrp="1" noChangeAspect="1"/>
+          </p:cNvPicPr>
+          <p:nvPr>
+            <p:ph idx="1"/>
+          </p:nvPr>
+        </p:nvPicPr>
+        <p:blipFill>
+          <a:blip r:embed="rId3">
+            <a:extLst>
+              <a:ext uri="{28A0092B-C50C-407E-A947-70E740481C1C}">
+                <a14:useLocalDpi xmlns:a14="http://schemas.microsoft.com/office/drawing/2010/main" val="0"/>
+              </a:ext>
+            </a:extLst>
+          </a:blip>
+          <a:stretch>
+            <a:fillRect/>
+          </a:stretch>
+        </p:blipFill>
+        <p:spPr>
+          <a:xfrm>
+            <a:off x="1320084" y="1234662"/>
+            <a:ext cx="9414105" cy="5121688"/>
+          </a:xfrm>
+        </p:spPr>
+      </p:pic>
+    </p:spTree>
+    <p:extLst>
+      <p:ext uri="{BB962C8B-B14F-4D97-AF65-F5344CB8AC3E}">
+        <p14:creationId xmlns:p14="http://schemas.microsoft.com/office/powerpoint/2010/main" val="431493297"/>
+      </p:ext>
+    </p:extLst>
+  </p:cSld>
+  <p:clrMapOvr>
+    <a:masterClrMapping/>
+  </p:clrMapOvr>
+</p:sld>
+</file>
+
+<file path=ppt/slides/slide12.xml><?xml version="1.0" encoding="utf-8"?>
+<p:sld xmlns:a="http://schemas.openxmlformats.org/drawingml/2006/main" xmlns:r="http://schemas.openxmlformats.org/officeDocument/2006/relationships" xmlns:p="http://schemas.openxmlformats.org/presentationml/2006/main">
+  <p:cSld>
+    <p:spTree>
+      <p:nvGrpSpPr>
+        <p:cNvPr id="1" name=""/>
+        <p:cNvGrpSpPr/>
+        <p:nvPr/>
+      </p:nvGrpSpPr>
+      <p:grpSpPr>
+        <a:xfrm>
+          <a:off x="0" y="0"/>
+          <a:ext cx="0" cy="0"/>
+          <a:chOff x="0" y="0"/>
+          <a:chExt cx="0" cy="0"/>
+        </a:xfrm>
+      </p:grpSpPr>
+      <p:sp>
+        <p:nvSpPr>
+          <p:cNvPr id="2" name="Title 1">
+            <a:extLst>
+              <a:ext uri="{FF2B5EF4-FFF2-40B4-BE49-F238E27FC236}">
                 <a16:creationId xmlns:a16="http://schemas.microsoft.com/office/drawing/2014/main" id="{6DFB2D42-9518-4248-AE5E-AC4DE0E3E6DF}"/>
               </a:ext>
             </a:extLst>
@@ -4265,7 +4466,7 @@
           <a:p>
             <a:fld id="{EDEBF0BA-A897-4C1E-AB3C-F330808C0E1D}" type="slidenum">
               <a:rPr lang="en-US" smtClean="0"/>
-              <a:t>11</a:t>
+              <a:t>12</a:t>
             </a:fld>
             <a:endParaRPr lang="en-US" dirty="0"/>
           </a:p>
@@ -4314,7 +4515,7 @@
 </p:sld>
 </file>
 
-<file path=ppt/slides/slide12.xml><?xml version="1.0" encoding="utf-8"?>
+<file path=ppt/slides/slide13.xml><?xml version="1.0" encoding="utf-8"?>
 <p:sld xmlns:a="http://schemas.openxmlformats.org/drawingml/2006/main" xmlns:r="http://schemas.openxmlformats.org/officeDocument/2006/relationships" xmlns:p="http://schemas.openxmlformats.org/presentationml/2006/main">
   <p:cSld>
     <p:spTree>
@@ -4489,7 +4690,7 @@
           <a:p>
             <a:fld id="{EDEBF0BA-A897-4C1E-AB3C-F330808C0E1D}" type="slidenum">
               <a:rPr lang="en-US" smtClean="0"/>
-              <a:t>12</a:t>
+              <a:t>13</a:t>
             </a:fld>
             <a:endParaRPr lang="en-US"/>
           </a:p>
@@ -4775,7 +4976,7 @@
 </p:sld>
 </file>
 
-<file path=ppt/slides/slide13.xml><?xml version="1.0" encoding="utf-8"?>
+<file path=ppt/slides/slide14.xml><?xml version="1.0" encoding="utf-8"?>
 <p:sld xmlns:a="http://schemas.openxmlformats.org/drawingml/2006/main" xmlns:r="http://schemas.openxmlformats.org/officeDocument/2006/relationships" xmlns:p="http://schemas.openxmlformats.org/presentationml/2006/main">
   <p:cSld>
     <p:spTree>
@@ -4921,7 +5122,7 @@
           <a:p>
             <a:fld id="{EDEBF0BA-A897-4C1E-AB3C-F330808C0E1D}" type="slidenum">
               <a:rPr lang="en-US" smtClean="0"/>
-              <a:t>13</a:t>
+              <a:t>14</a:t>
             </a:fld>
             <a:endParaRPr lang="en-US"/>
           </a:p>
@@ -5243,7 +5444,7 @@
 </p:sld>
 </file>
 
-<file path=ppt/slides/slide14.xml><?xml version="1.0" encoding="utf-8"?>
+<file path=ppt/slides/slide15.xml><?xml version="1.0" encoding="utf-8"?>
 <p:sld xmlns:a="http://schemas.openxmlformats.org/drawingml/2006/main" xmlns:r="http://schemas.openxmlformats.org/officeDocument/2006/relationships" xmlns:p="http://schemas.openxmlformats.org/presentationml/2006/main">
   <p:cSld>
     <p:spTree>
@@ -5442,7 +5643,7 @@
           <a:p>
             <a:fld id="{EDEBF0BA-A897-4C1E-AB3C-F330808C0E1D}" type="slidenum">
               <a:rPr lang="en-US" smtClean="0"/>
-              <a:t>14</a:t>
+              <a:t>15</a:t>
             </a:fld>
             <a:endParaRPr lang="en-US"/>
           </a:p>
@@ -5497,214 +5698,6 @@
 </p:sld>
 </file>
 
-<file path=ppt/slides/slide15.xml><?xml version="1.0" encoding="utf-8"?>
-<p:sld xmlns:a="http://schemas.openxmlformats.org/drawingml/2006/main" xmlns:r="http://schemas.openxmlformats.org/officeDocument/2006/relationships" xmlns:p="http://schemas.openxmlformats.org/presentationml/2006/main">
-  <p:cSld>
-    <p:spTree>
-      <p:nvGrpSpPr>
-        <p:cNvPr id="1" name=""/>
-        <p:cNvGrpSpPr/>
-        <p:nvPr/>
-      </p:nvGrpSpPr>
-      <p:grpSpPr>
-        <a:xfrm>
-          <a:off x="0" y="0"/>
-          <a:ext cx="0" cy="0"/>
-          <a:chOff x="0" y="0"/>
-          <a:chExt cx="0" cy="0"/>
-        </a:xfrm>
-      </p:grpSpPr>
-      <p:sp>
-        <p:nvSpPr>
-          <p:cNvPr id="6" name="Title 5">
-            <a:extLst>
-              <a:ext uri="{FF2B5EF4-FFF2-40B4-BE49-F238E27FC236}">
-                <a16:creationId xmlns:a16="http://schemas.microsoft.com/office/drawing/2014/main" id="{6F84FA54-65FA-4160-855E-2B56132F9651}"/>
-              </a:ext>
-            </a:extLst>
-          </p:cNvPr>
-          <p:cNvSpPr>
-            <a:spLocks noGrp="1"/>
-          </p:cNvSpPr>
-          <p:nvPr>
-            <p:ph type="title"/>
-          </p:nvPr>
-        </p:nvSpPr>
-        <p:spPr/>
-        <p:txBody>
-          <a:bodyPr/>
-          <a:lstStyle/>
-          <a:p>
-            <a:r>
-              <a:rPr lang="en-US" dirty="0"/>
-              <a:t>Experiments  </a:t>
-            </a:r>
-            <a:r>
-              <a:rPr lang="en-US" sz="2800" dirty="0">
-                <a:hlinkClick r:id="rId2"/>
-              </a:rPr>
-              <a:t>https://JimFawcett.github.io/SiteStory_4.html</a:t>
-            </a:r>
-            <a:r>
-              <a:rPr lang="en-US" sz="2800" dirty="0"/>
-              <a:t> </a:t>
-            </a:r>
-            <a:endParaRPr lang="en-US" dirty="0"/>
-          </a:p>
-        </p:txBody>
-      </p:sp>
-      <p:sp>
-        <p:nvSpPr>
-          <p:cNvPr id="7" name="Content Placeholder 6">
-            <a:extLst>
-              <a:ext uri="{FF2B5EF4-FFF2-40B4-BE49-F238E27FC236}">
-                <a16:creationId xmlns:a16="http://schemas.microsoft.com/office/drawing/2014/main" id="{1BF0FC12-D67B-4A58-8EC4-1867ACA2F8BD}"/>
-              </a:ext>
-            </a:extLst>
-          </p:cNvPr>
-          <p:cNvSpPr>
-            <a:spLocks noGrp="1"/>
-          </p:cNvSpPr>
-          <p:nvPr>
-            <p:ph idx="1"/>
-          </p:nvPr>
-        </p:nvSpPr>
-        <p:spPr>
-          <a:xfrm>
-            <a:off x="838200" y="1435994"/>
-            <a:ext cx="10515600" cy="4605741"/>
-          </a:xfrm>
-        </p:spPr>
-        <p:txBody>
-          <a:bodyPr/>
-          <a:lstStyle/>
-          <a:p>
-            <a:r>
-              <a:rPr lang="en-US" dirty="0"/>
-              <a:t>Experiments to make the site’s publishing process more effective are continuing:</a:t>
-            </a:r>
-          </a:p>
-          <a:p>
-            <a:pPr lvl="1"/>
-            <a:r>
-              <a:rPr lang="en-US" dirty="0"/>
-              <a:t>Developing UI widgets to use webpage real estate effectively</a:t>
-            </a:r>
-          </a:p>
-          <a:p>
-            <a:pPr lvl="2"/>
-            <a:r>
-              <a:rPr lang="en-US" dirty="0"/>
-              <a:t>User driven diagram resizer</a:t>
-            </a:r>
-          </a:p>
-          <a:p>
-            <a:pPr lvl="2"/>
-            <a:r>
-              <a:rPr lang="en-US" dirty="0"/>
-              <a:t>Slide-in panels</a:t>
-            </a:r>
-          </a:p>
-          <a:p>
-            <a:pPr lvl="2"/>
-            <a:r>
-              <a:rPr lang="en-US" dirty="0"/>
-              <a:t>Slide show</a:t>
-            </a:r>
-          </a:p>
-          <a:p>
-            <a:pPr lvl="2"/>
-            <a:r>
-              <a:rPr lang="en-US" dirty="0"/>
-              <a:t>Code blocks for presentation</a:t>
-            </a:r>
-          </a:p>
-          <a:p>
-            <a:pPr lvl="2"/>
-            <a:r>
-              <a:rPr lang="en-US" dirty="0"/>
-              <a:t>Photo styling</a:t>
-            </a:r>
-          </a:p>
-          <a:p>
-            <a:pPr lvl="1"/>
-            <a:r>
-              <a:rPr lang="en-US" dirty="0"/>
-              <a:t>Navigation schemes</a:t>
-            </a:r>
-          </a:p>
-          <a:p>
-            <a:pPr lvl="2"/>
-            <a:r>
-              <a:rPr lang="en-US" dirty="0"/>
-              <a:t>Dropdown menus</a:t>
-            </a:r>
-          </a:p>
-          <a:p>
-            <a:pPr lvl="2"/>
-            <a:r>
-              <a:rPr lang="en-US" dirty="0"/>
-              <a:t>Page sequences (defined by hidden links)</a:t>
-            </a:r>
-          </a:p>
-          <a:p>
-            <a:pPr lvl="2"/>
-            <a:r>
-              <a:rPr lang="en-US" dirty="0"/>
-              <a:t>Navigation buttons and key presses</a:t>
-            </a:r>
-          </a:p>
-          <a:p>
-            <a:pPr lvl="1"/>
-            <a:r>
-              <a:rPr lang="en-US" dirty="0"/>
-              <a:t>Continuing to think about site organization schemes</a:t>
-            </a:r>
-          </a:p>
-        </p:txBody>
-      </p:sp>
-      <p:sp>
-        <p:nvSpPr>
-          <p:cNvPr id="5" name="Slide Number Placeholder 4">
-            <a:extLst>
-              <a:ext uri="{FF2B5EF4-FFF2-40B4-BE49-F238E27FC236}">
-                <a16:creationId xmlns:a16="http://schemas.microsoft.com/office/drawing/2014/main" id="{175BF427-C62C-4AB5-A038-A22DED838917}"/>
-              </a:ext>
-            </a:extLst>
-          </p:cNvPr>
-          <p:cNvSpPr>
-            <a:spLocks noGrp="1"/>
-          </p:cNvSpPr>
-          <p:nvPr>
-            <p:ph type="sldNum" sz="quarter" idx="12"/>
-          </p:nvPr>
-        </p:nvSpPr>
-        <p:spPr/>
-        <p:txBody>
-          <a:bodyPr/>
-          <a:lstStyle/>
-          <a:p>
-            <a:fld id="{EDEBF0BA-A897-4C1E-AB3C-F330808C0E1D}" type="slidenum">
-              <a:rPr lang="en-US" smtClean="0"/>
-              <a:t>15</a:t>
-            </a:fld>
-            <a:endParaRPr lang="en-US"/>
-          </a:p>
-        </p:txBody>
-      </p:sp>
-    </p:spTree>
-    <p:extLst>
-      <p:ext uri="{BB962C8B-B14F-4D97-AF65-F5344CB8AC3E}">
-        <p14:creationId xmlns:p14="http://schemas.microsoft.com/office/powerpoint/2010/main" val="3303993548"/>
-      </p:ext>
-    </p:extLst>
-  </p:cSld>
-  <p:clrMapOvr>
-    <a:masterClrMapping/>
-  </p:clrMapOvr>
-</p:sld>
-</file>
-
 <file path=ppt/slides/slide16.xml><?xml version="1.0" encoding="utf-8"?>
 <p:sld xmlns:a="http://schemas.openxmlformats.org/drawingml/2006/main" xmlns:r="http://schemas.openxmlformats.org/officeDocument/2006/relationships" xmlns:p="http://schemas.openxmlformats.org/presentationml/2006/main">
   <p:cSld>
@@ -5724,10 +5717,10 @@
       </p:grpSpPr>
       <p:sp>
         <p:nvSpPr>
-          <p:cNvPr id="2" name="Title 1">
-            <a:extLst>
-              <a:ext uri="{FF2B5EF4-FFF2-40B4-BE49-F238E27FC236}">
-                <a16:creationId xmlns:a16="http://schemas.microsoft.com/office/drawing/2014/main" id="{ACAA7557-4583-4CE5-9450-333B91340133}"/>
+          <p:cNvPr id="6" name="Title 5">
+            <a:extLst>
+              <a:ext uri="{FF2B5EF4-FFF2-40B4-BE49-F238E27FC236}">
+                <a16:creationId xmlns:a16="http://schemas.microsoft.com/office/drawing/2014/main" id="{6F84FA54-65FA-4160-855E-2B56132F9651}"/>
               </a:ext>
             </a:extLst>
           </p:cNvPr>
@@ -5736,215 +5729,147 @@
           </p:cNvSpPr>
           <p:nvPr>
             <p:ph type="title"/>
+          </p:nvPr>
+        </p:nvSpPr>
+        <p:spPr/>
+        <p:txBody>
+          <a:bodyPr/>
+          <a:lstStyle/>
+          <a:p>
+            <a:r>
+              <a:rPr lang="en-US" dirty="0"/>
+              <a:t>Experiments  </a:t>
+            </a:r>
+            <a:r>
+              <a:rPr lang="en-US" sz="2800" dirty="0">
+                <a:hlinkClick r:id="rId2"/>
+              </a:rPr>
+              <a:t>https://JimFawcett.github.io/SiteStory_4.html</a:t>
+            </a:r>
+            <a:r>
+              <a:rPr lang="en-US" sz="2800" dirty="0"/>
+              <a:t> </a:t>
+            </a:r>
+            <a:endParaRPr lang="en-US" dirty="0"/>
+          </a:p>
+        </p:txBody>
+      </p:sp>
+      <p:sp>
+        <p:nvSpPr>
+          <p:cNvPr id="7" name="Content Placeholder 6">
+            <a:extLst>
+              <a:ext uri="{FF2B5EF4-FFF2-40B4-BE49-F238E27FC236}">
+                <a16:creationId xmlns:a16="http://schemas.microsoft.com/office/drawing/2014/main" id="{1BF0FC12-D67B-4A58-8EC4-1867ACA2F8BD}"/>
+              </a:ext>
+            </a:extLst>
+          </p:cNvPr>
+          <p:cNvSpPr>
+            <a:spLocks noGrp="1"/>
+          </p:cNvSpPr>
+          <p:nvPr>
+            <p:ph idx="1"/>
           </p:nvPr>
         </p:nvSpPr>
         <p:spPr>
           <a:xfrm>
-            <a:off x="838200" y="365125"/>
-            <a:ext cx="5257800" cy="1325563"/>
+            <a:off x="838200" y="1435994"/>
+            <a:ext cx="10515600" cy="4605741"/>
           </a:xfrm>
         </p:spPr>
         <p:txBody>
-          <a:bodyPr>
-            <a:normAutofit/>
-          </a:bodyPr>
-          <a:lstStyle/>
-          <a:p>
-            <a:r>
-              <a:rPr lang="en-US" sz="4000" dirty="0"/>
-              <a:t>Status and Conclusions</a:t>
-            </a:r>
-          </a:p>
-        </p:txBody>
-      </p:sp>
-      <p:sp>
-        <p:nvSpPr>
-          <p:cNvPr id="5" name="Content Placeholder 4">
-            <a:extLst>
-              <a:ext uri="{FF2B5EF4-FFF2-40B4-BE49-F238E27FC236}">
-                <a16:creationId xmlns:a16="http://schemas.microsoft.com/office/drawing/2014/main" id="{F59047EB-518C-4D47-AE0E-61C2D22A203D}"/>
-              </a:ext>
-            </a:extLst>
-          </p:cNvPr>
-          <p:cNvSpPr>
-            <a:spLocks noGrp="1"/>
-          </p:cNvSpPr>
-          <p:nvPr>
-            <p:ph sz="half" idx="1"/>
-          </p:nvPr>
-        </p:nvSpPr>
-        <p:spPr>
-          <a:xfrm>
-            <a:off x="767371" y="1603420"/>
-            <a:ext cx="5181600" cy="4573543"/>
-          </a:xfrm>
-        </p:spPr>
-        <p:txBody>
-          <a:bodyPr/>
-          <a:lstStyle/>
-          <a:p>
-            <a:r>
-              <a:rPr lang="en-US" dirty="0"/>
-              <a:t>Status - </a:t>
-            </a:r>
-            <a:r>
-              <a:rPr lang="en-US" sz="2400" dirty="0">
-                <a:hlinkClick r:id="rId2"/>
-              </a:rPr>
-              <a:t>https://JimFawcett.github.io</a:t>
-            </a:r>
-            <a:r>
-              <a:rPr lang="en-US" sz="2400" dirty="0"/>
-              <a:t>: </a:t>
-            </a:r>
-            <a:endParaRPr lang="en-US" dirty="0"/>
-          </a:p>
-          <a:p>
-            <a:pPr lvl="1"/>
-            <a:r>
-              <a:rPr lang="en-US" dirty="0"/>
-              <a:t>Most of the structure described is in place</a:t>
-            </a:r>
-          </a:p>
-          <a:p>
-            <a:pPr lvl="1"/>
-            <a:r>
-              <a:rPr lang="en-US" dirty="0"/>
-              <a:t>More than 40 repositories of mostly C++ code are published</a:t>
-            </a:r>
-          </a:p>
-          <a:p>
-            <a:pPr lvl="1"/>
-            <a:r>
-              <a:rPr lang="en-US" dirty="0"/>
-              <a:t>Several stories are published</a:t>
-            </a:r>
-          </a:p>
-          <a:p>
-            <a:pPr lvl="1"/>
-            <a:r>
-              <a:rPr lang="en-US" dirty="0"/>
-              <a:t>Other resources and </a:t>
-            </a:r>
-            <a:r>
-              <a:rPr lang="en-US" dirty="0" err="1"/>
-              <a:t>CodeSnaps</a:t>
-            </a:r>
-            <a:r>
-              <a:rPr lang="en-US" dirty="0"/>
-              <a:t> are available from the site</a:t>
-            </a:r>
-          </a:p>
-          <a:p>
-            <a:r>
-              <a:rPr lang="en-US" dirty="0"/>
-              <a:t>Plans</a:t>
-            </a:r>
-          </a:p>
-          <a:p>
-            <a:pPr lvl="1"/>
-            <a:r>
-              <a:rPr lang="en-US" dirty="0"/>
-              <a:t>Install more code repositories</a:t>
-            </a:r>
-          </a:p>
-          <a:p>
-            <a:pPr lvl="1"/>
-            <a:r>
-              <a:rPr lang="en-US" dirty="0"/>
-              <a:t>Install starter site</a:t>
-            </a:r>
-          </a:p>
-          <a:p>
-            <a:pPr lvl="1"/>
-            <a:r>
-              <a:rPr lang="en-US" dirty="0"/>
-              <a:t>Start to add videos</a:t>
-            </a:r>
-          </a:p>
-        </p:txBody>
-      </p:sp>
-      <p:sp>
-        <p:nvSpPr>
-          <p:cNvPr id="6" name="Content Placeholder 5">
-            <a:extLst>
-              <a:ext uri="{FF2B5EF4-FFF2-40B4-BE49-F238E27FC236}">
-                <a16:creationId xmlns:a16="http://schemas.microsoft.com/office/drawing/2014/main" id="{FE80FAEC-8AE9-4AB5-9C84-5EEDD2807033}"/>
-              </a:ext>
-            </a:extLst>
-          </p:cNvPr>
-          <p:cNvSpPr>
-            <a:spLocks noGrp="1"/>
-          </p:cNvSpPr>
-          <p:nvPr>
-            <p:ph sz="half" idx="2"/>
-          </p:nvPr>
-        </p:nvSpPr>
-        <p:spPr>
-          <a:xfrm>
-            <a:off x="6096000" y="1629163"/>
-            <a:ext cx="5296434" cy="5455746"/>
-          </a:xfrm>
-        </p:spPr>
-        <p:txBody>
-          <a:bodyPr/>
-          <a:lstStyle/>
-          <a:p>
-            <a:r>
-              <a:rPr lang="en-US" dirty="0"/>
-              <a:t>Conclusions:</a:t>
-            </a:r>
-          </a:p>
-          <a:p>
-            <a:pPr lvl="1"/>
-            <a:r>
-              <a:rPr lang="en-US" dirty="0"/>
-              <a:t>Static sites seem like a good tool for publishing</a:t>
+          <a:bodyPr/>
+          <a:lstStyle/>
+          <a:p>
+            <a:r>
+              <a:rPr lang="en-US" dirty="0"/>
+              <a:t>Experiments to make the site’s publishing process more effective are continuing:</a:t>
+            </a:r>
+          </a:p>
+          <a:p>
+            <a:pPr lvl="1"/>
+            <a:r>
+              <a:rPr lang="en-US" dirty="0"/>
+              <a:t>Developing UI widgets to use webpage real estate effectively</a:t>
             </a:r>
           </a:p>
           <a:p>
             <a:pPr lvl="2"/>
             <a:r>
               <a:rPr lang="en-US" dirty="0"/>
-              <a:t>Main issue is text or keyword searches not available with static sites</a:t>
+              <a:t>User driven diagram resizer</a:t>
             </a:r>
           </a:p>
           <a:p>
             <a:pPr lvl="2"/>
             <a:r>
               <a:rPr lang="en-US" dirty="0"/>
-              <a:t>Can be addressed with local mirror and tools for synchronizing and local searching</a:t>
-            </a:r>
-          </a:p>
-          <a:p>
-            <a:pPr lvl="1"/>
-            <a:r>
-              <a:rPr lang="en-US" dirty="0"/>
-              <a:t>Required effort is reasonable for the expected payoff</a:t>
+              <a:t>Slide-in panels</a:t>
             </a:r>
           </a:p>
           <a:p>
             <a:pPr lvl="2"/>
             <a:r>
               <a:rPr lang="en-US" dirty="0"/>
-              <a:t>This site went from zero to current status in four months of my time</a:t>
+              <a:t>Slide show</a:t>
             </a:r>
           </a:p>
           <a:p>
             <a:pPr lvl="2"/>
             <a:r>
               <a:rPr lang="en-US" dirty="0"/>
-              <a:t>However, I’ve built a site like this before.</a:t>
-            </a:r>
-          </a:p>
-        </p:txBody>
-      </p:sp>
-      <p:sp>
-        <p:nvSpPr>
-          <p:cNvPr id="4" name="Slide Number Placeholder 3">
-            <a:extLst>
-              <a:ext uri="{FF2B5EF4-FFF2-40B4-BE49-F238E27FC236}">
-                <a16:creationId xmlns:a16="http://schemas.microsoft.com/office/drawing/2014/main" id="{A5C2B86A-AE47-44AF-9978-587D3DAADB7B}"/>
+              <a:t>Code blocks for presentation</a:t>
+            </a:r>
+          </a:p>
+          <a:p>
+            <a:pPr lvl="2"/>
+            <a:r>
+              <a:rPr lang="en-US" dirty="0"/>
+              <a:t>Photo styling</a:t>
+            </a:r>
+          </a:p>
+          <a:p>
+            <a:pPr lvl="1"/>
+            <a:r>
+              <a:rPr lang="en-US" dirty="0"/>
+              <a:t>Navigation schemes</a:t>
+            </a:r>
+          </a:p>
+          <a:p>
+            <a:pPr lvl="2"/>
+            <a:r>
+              <a:rPr lang="en-US" dirty="0"/>
+              <a:t>Dropdown menus</a:t>
+            </a:r>
+          </a:p>
+          <a:p>
+            <a:pPr lvl="2"/>
+            <a:r>
+              <a:rPr lang="en-US" dirty="0"/>
+              <a:t>Page sequences (defined by hidden links)</a:t>
+            </a:r>
+          </a:p>
+          <a:p>
+            <a:pPr lvl="2"/>
+            <a:r>
+              <a:rPr lang="en-US" dirty="0"/>
+              <a:t>Navigation buttons and key presses</a:t>
+            </a:r>
+          </a:p>
+          <a:p>
+            <a:pPr lvl="1"/>
+            <a:r>
+              <a:rPr lang="en-US" dirty="0"/>
+              <a:t>Continuing to think about site organization schemes</a:t>
+            </a:r>
+          </a:p>
+        </p:txBody>
+      </p:sp>
+      <p:sp>
+        <p:nvSpPr>
+          <p:cNvPr id="5" name="Slide Number Placeholder 4">
+            <a:extLst>
+              <a:ext uri="{FF2B5EF4-FFF2-40B4-BE49-F238E27FC236}">
+                <a16:creationId xmlns:a16="http://schemas.microsoft.com/office/drawing/2014/main" id="{175BF427-C62C-4AB5-A038-A22DED838917}"/>
               </a:ext>
             </a:extLst>
           </p:cNvPr>
@@ -5971,7 +5896,7 @@
     </p:spTree>
     <p:extLst>
       <p:ext uri="{BB962C8B-B14F-4D97-AF65-F5344CB8AC3E}">
-        <p14:creationId xmlns:p14="http://schemas.microsoft.com/office/powerpoint/2010/main" val="2191199278"/>
+        <p14:creationId xmlns:p14="http://schemas.microsoft.com/office/powerpoint/2010/main" val="3303993548"/>
       </p:ext>
     </p:extLst>
   </p:cSld>
@@ -6003,15 +5928,232 @@
           <p:cNvPr id="2" name="Title 1">
             <a:extLst>
               <a:ext uri="{FF2B5EF4-FFF2-40B4-BE49-F238E27FC236}">
-                <a16:creationId xmlns:a16="http://schemas.microsoft.com/office/drawing/2014/main" id="{508F2C2D-8A1E-4157-B36F-A4E30EAA74CE}"/>
-              </a:ext>
-            </a:extLst>
-          </p:cNvPr>
-          <p:cNvSpPr>
-            <a:spLocks noGrp="1"/>
-          </p:cNvSpPr>
-          <p:nvPr>
-            <p:ph type="ctrTitle"/>
+                <a16:creationId xmlns:a16="http://schemas.microsoft.com/office/drawing/2014/main" id="{ACAA7557-4583-4CE5-9450-333B91340133}"/>
+              </a:ext>
+            </a:extLst>
+          </p:cNvPr>
+          <p:cNvSpPr>
+            <a:spLocks noGrp="1"/>
+          </p:cNvSpPr>
+          <p:nvPr>
+            <p:ph type="title"/>
+          </p:nvPr>
+        </p:nvSpPr>
+        <p:spPr>
+          <a:xfrm>
+            <a:off x="838200" y="365125"/>
+            <a:ext cx="5257800" cy="1325563"/>
+          </a:xfrm>
+        </p:spPr>
+        <p:txBody>
+          <a:bodyPr>
+            <a:normAutofit/>
+          </a:bodyPr>
+          <a:lstStyle/>
+          <a:p>
+            <a:r>
+              <a:rPr lang="en-US" sz="4000" dirty="0"/>
+              <a:t>Status and Conclusions</a:t>
+            </a:r>
+          </a:p>
+        </p:txBody>
+      </p:sp>
+      <p:sp>
+        <p:nvSpPr>
+          <p:cNvPr id="5" name="Content Placeholder 4">
+            <a:extLst>
+              <a:ext uri="{FF2B5EF4-FFF2-40B4-BE49-F238E27FC236}">
+                <a16:creationId xmlns:a16="http://schemas.microsoft.com/office/drawing/2014/main" id="{F59047EB-518C-4D47-AE0E-61C2D22A203D}"/>
+              </a:ext>
+            </a:extLst>
+          </p:cNvPr>
+          <p:cNvSpPr>
+            <a:spLocks noGrp="1"/>
+          </p:cNvSpPr>
+          <p:nvPr>
+            <p:ph sz="half" idx="1"/>
+          </p:nvPr>
+        </p:nvSpPr>
+        <p:spPr>
+          <a:xfrm>
+            <a:off x="767371" y="1603420"/>
+            <a:ext cx="5181600" cy="4573543"/>
+          </a:xfrm>
+        </p:spPr>
+        <p:txBody>
+          <a:bodyPr/>
+          <a:lstStyle/>
+          <a:p>
+            <a:r>
+              <a:rPr lang="en-US" dirty="0"/>
+              <a:t>Status - </a:t>
+            </a:r>
+            <a:r>
+              <a:rPr lang="en-US" sz="2400" dirty="0">
+                <a:hlinkClick r:id="rId2"/>
+              </a:rPr>
+              <a:t>https://JimFawcett.github.io</a:t>
+            </a:r>
+            <a:r>
+              <a:rPr lang="en-US" sz="2400" dirty="0"/>
+              <a:t>: </a:t>
+            </a:r>
+            <a:endParaRPr lang="en-US" dirty="0"/>
+          </a:p>
+          <a:p>
+            <a:pPr lvl="1"/>
+            <a:r>
+              <a:rPr lang="en-US" dirty="0"/>
+              <a:t>Most of the structure described is in place</a:t>
+            </a:r>
+          </a:p>
+          <a:p>
+            <a:pPr lvl="1"/>
+            <a:r>
+              <a:rPr lang="en-US" dirty="0"/>
+              <a:t>More than 40 repositories of mostly C++ code are published</a:t>
+            </a:r>
+          </a:p>
+          <a:p>
+            <a:pPr lvl="1"/>
+            <a:r>
+              <a:rPr lang="en-US" dirty="0"/>
+              <a:t>Several stories are published</a:t>
+            </a:r>
+          </a:p>
+          <a:p>
+            <a:pPr lvl="1"/>
+            <a:r>
+              <a:rPr lang="en-US" dirty="0"/>
+              <a:t>Other resources and </a:t>
+            </a:r>
+            <a:r>
+              <a:rPr lang="en-US" dirty="0" err="1"/>
+              <a:t>CodeSnaps</a:t>
+            </a:r>
+            <a:r>
+              <a:rPr lang="en-US" dirty="0"/>
+              <a:t> are available from the site</a:t>
+            </a:r>
+          </a:p>
+          <a:p>
+            <a:r>
+              <a:rPr lang="en-US" dirty="0"/>
+              <a:t>Plans</a:t>
+            </a:r>
+          </a:p>
+          <a:p>
+            <a:pPr lvl="1"/>
+            <a:r>
+              <a:rPr lang="en-US" dirty="0"/>
+              <a:t>Install more code repositories</a:t>
+            </a:r>
+          </a:p>
+          <a:p>
+            <a:pPr lvl="1"/>
+            <a:r>
+              <a:rPr lang="en-US" dirty="0"/>
+              <a:t>Install starter site</a:t>
+            </a:r>
+          </a:p>
+          <a:p>
+            <a:pPr lvl="1"/>
+            <a:r>
+              <a:rPr lang="en-US" dirty="0"/>
+              <a:t>Start to add videos</a:t>
+            </a:r>
+          </a:p>
+        </p:txBody>
+      </p:sp>
+      <p:sp>
+        <p:nvSpPr>
+          <p:cNvPr id="6" name="Content Placeholder 5">
+            <a:extLst>
+              <a:ext uri="{FF2B5EF4-FFF2-40B4-BE49-F238E27FC236}">
+                <a16:creationId xmlns:a16="http://schemas.microsoft.com/office/drawing/2014/main" id="{FE80FAEC-8AE9-4AB5-9C84-5EEDD2807033}"/>
+              </a:ext>
+            </a:extLst>
+          </p:cNvPr>
+          <p:cNvSpPr>
+            <a:spLocks noGrp="1"/>
+          </p:cNvSpPr>
+          <p:nvPr>
+            <p:ph sz="half" idx="2"/>
+          </p:nvPr>
+        </p:nvSpPr>
+        <p:spPr>
+          <a:xfrm>
+            <a:off x="6096000" y="1629163"/>
+            <a:ext cx="5296434" cy="5455746"/>
+          </a:xfrm>
+        </p:spPr>
+        <p:txBody>
+          <a:bodyPr/>
+          <a:lstStyle/>
+          <a:p>
+            <a:r>
+              <a:rPr lang="en-US" dirty="0"/>
+              <a:t>Conclusions:</a:t>
+            </a:r>
+          </a:p>
+          <a:p>
+            <a:pPr lvl="1"/>
+            <a:r>
+              <a:rPr lang="en-US" dirty="0"/>
+              <a:t>Static sites seem like a good tool for publishing</a:t>
+            </a:r>
+          </a:p>
+          <a:p>
+            <a:pPr lvl="2"/>
+            <a:r>
+              <a:rPr lang="en-US" dirty="0"/>
+              <a:t>Main issue is text or keyword searches not available with static sites</a:t>
+            </a:r>
+          </a:p>
+          <a:p>
+            <a:pPr lvl="2"/>
+            <a:r>
+              <a:rPr lang="en-US" dirty="0"/>
+              <a:t>Can be addressed with local mirror and tools for synchronizing and local searching</a:t>
+            </a:r>
+          </a:p>
+          <a:p>
+            <a:pPr lvl="1"/>
+            <a:r>
+              <a:rPr lang="en-US" dirty="0"/>
+              <a:t>Required effort is reasonable for the expected payoff</a:t>
+            </a:r>
+          </a:p>
+          <a:p>
+            <a:pPr lvl="2"/>
+            <a:r>
+              <a:rPr lang="en-US" dirty="0"/>
+              <a:t>This site went from zero to current status in four months of my time</a:t>
+            </a:r>
+          </a:p>
+          <a:p>
+            <a:pPr lvl="2"/>
+            <a:r>
+              <a:rPr lang="en-US" dirty="0"/>
+              <a:t>However, I’ve built a site like this before.</a:t>
+            </a:r>
+          </a:p>
+        </p:txBody>
+      </p:sp>
+      <p:sp>
+        <p:nvSpPr>
+          <p:cNvPr id="4" name="Slide Number Placeholder 3">
+            <a:extLst>
+              <a:ext uri="{FF2B5EF4-FFF2-40B4-BE49-F238E27FC236}">
+                <a16:creationId xmlns:a16="http://schemas.microsoft.com/office/drawing/2014/main" id="{A5C2B86A-AE47-44AF-9978-587D3DAADB7B}"/>
+              </a:ext>
+            </a:extLst>
+          </p:cNvPr>
+          <p:cNvSpPr>
+            <a:spLocks noGrp="1"/>
+          </p:cNvSpPr>
+          <p:nvPr>
+            <p:ph type="sldNum" sz="quarter" idx="12"/>
           </p:nvPr>
         </p:nvSpPr>
         <p:spPr/>
@@ -6019,17 +6161,18 @@
           <a:bodyPr/>
           <a:lstStyle/>
           <a:p>
-            <a:r>
-              <a:rPr lang="en-US" dirty="0"/>
-              <a:t>Appendix - Domains</a:t>
-            </a:r>
+            <a:fld id="{EDEBF0BA-A897-4C1E-AB3C-F330808C0E1D}" type="slidenum">
+              <a:rPr lang="en-US" smtClean="0"/>
+              <a:t>17</a:t>
+            </a:fld>
+            <a:endParaRPr lang="en-US"/>
           </a:p>
         </p:txBody>
       </p:sp>
     </p:spTree>
     <p:extLst>
       <p:ext uri="{BB962C8B-B14F-4D97-AF65-F5344CB8AC3E}">
-        <p14:creationId xmlns:p14="http://schemas.microsoft.com/office/powerpoint/2010/main" val="1857873718"/>
+        <p14:creationId xmlns:p14="http://schemas.microsoft.com/office/powerpoint/2010/main" val="2191199278"/>
       </p:ext>
     </p:extLst>
   </p:cSld>
@@ -6061,6 +6204,64 @@
           <p:cNvPr id="2" name="Title 1">
             <a:extLst>
               <a:ext uri="{FF2B5EF4-FFF2-40B4-BE49-F238E27FC236}">
+                <a16:creationId xmlns:a16="http://schemas.microsoft.com/office/drawing/2014/main" id="{508F2C2D-8A1E-4157-B36F-A4E30EAA74CE}"/>
+              </a:ext>
+            </a:extLst>
+          </p:cNvPr>
+          <p:cNvSpPr>
+            <a:spLocks noGrp="1"/>
+          </p:cNvSpPr>
+          <p:nvPr>
+            <p:ph type="ctrTitle"/>
+          </p:nvPr>
+        </p:nvSpPr>
+        <p:spPr/>
+        <p:txBody>
+          <a:bodyPr/>
+          <a:lstStyle/>
+          <a:p>
+            <a:r>
+              <a:rPr lang="en-US" dirty="0"/>
+              <a:t>Appendix - Domains</a:t>
+            </a:r>
+          </a:p>
+        </p:txBody>
+      </p:sp>
+    </p:spTree>
+    <p:extLst>
+      <p:ext uri="{BB962C8B-B14F-4D97-AF65-F5344CB8AC3E}">
+        <p14:creationId xmlns:p14="http://schemas.microsoft.com/office/powerpoint/2010/main" val="1857873718"/>
+      </p:ext>
+    </p:extLst>
+  </p:cSld>
+  <p:clrMapOvr>
+    <a:masterClrMapping/>
+  </p:clrMapOvr>
+</p:sld>
+</file>
+
+<file path=ppt/slides/slide19.xml><?xml version="1.0" encoding="utf-8"?>
+<p:sld xmlns:a="http://schemas.openxmlformats.org/drawingml/2006/main" xmlns:r="http://schemas.openxmlformats.org/officeDocument/2006/relationships" xmlns:p="http://schemas.openxmlformats.org/presentationml/2006/main">
+  <p:cSld>
+    <p:spTree>
+      <p:nvGrpSpPr>
+        <p:cNvPr id="1" name=""/>
+        <p:cNvGrpSpPr/>
+        <p:nvPr/>
+      </p:nvGrpSpPr>
+      <p:grpSpPr>
+        <a:xfrm>
+          <a:off x="0" y="0"/>
+          <a:ext cx="0" cy="0"/>
+          <a:chOff x="0" y="0"/>
+          <a:chExt cx="0" cy="0"/>
+        </a:xfrm>
+      </p:grpSpPr>
+      <p:sp>
+        <p:nvSpPr>
+          <p:cNvPr id="2" name="Title 1">
+            <a:extLst>
+              <a:ext uri="{FF2B5EF4-FFF2-40B4-BE49-F238E27FC236}">
                 <a16:creationId xmlns:a16="http://schemas.microsoft.com/office/drawing/2014/main" id="{C818CF9C-B350-4936-99E1-D89031958E0C}"/>
               </a:ext>
             </a:extLst>
@@ -6243,7 +6444,7 @@
           <a:p>
             <a:fld id="{EDEBF0BA-A897-4C1E-AB3C-F330808C0E1D}" type="slidenum">
               <a:rPr lang="en-US" smtClean="0"/>
-              <a:t>18</a:t>
+              <a:t>19</a:t>
             </a:fld>
             <a:endParaRPr lang="en-US"/>
           </a:p>
@@ -6262,7 +6463,161 @@
 </p:sld>
 </file>
 
-<file path=ppt/slides/slide19.xml><?xml version="1.0" encoding="utf-8"?>
+<file path=ppt/slides/slide2.xml><?xml version="1.0" encoding="utf-8"?>
+<p:sld xmlns:a="http://schemas.openxmlformats.org/drawingml/2006/main" xmlns:r="http://schemas.openxmlformats.org/officeDocument/2006/relationships" xmlns:p="http://schemas.openxmlformats.org/presentationml/2006/main">
+  <p:cSld>
+    <p:spTree>
+      <p:nvGrpSpPr>
+        <p:cNvPr id="1" name=""/>
+        <p:cNvGrpSpPr/>
+        <p:nvPr/>
+      </p:nvGrpSpPr>
+      <p:grpSpPr>
+        <a:xfrm>
+          <a:off x="0" y="0"/>
+          <a:ext cx="0" cy="0"/>
+          <a:chOff x="0" y="0"/>
+          <a:chExt cx="0" cy="0"/>
+        </a:xfrm>
+      </p:grpSpPr>
+      <p:sp>
+        <p:nvSpPr>
+          <p:cNvPr id="2" name="Title 1">
+            <a:extLst>
+              <a:ext uri="{FF2B5EF4-FFF2-40B4-BE49-F238E27FC236}">
+                <a16:creationId xmlns:a16="http://schemas.microsoft.com/office/drawing/2014/main" id="{56A5A42E-B0BA-45B3-ABC6-8B7AADA16747}"/>
+              </a:ext>
+            </a:extLst>
+          </p:cNvPr>
+          <p:cNvSpPr>
+            <a:spLocks noGrp="1"/>
+          </p:cNvSpPr>
+          <p:nvPr>
+            <p:ph type="title"/>
+          </p:nvPr>
+        </p:nvSpPr>
+        <p:spPr/>
+        <p:txBody>
+          <a:bodyPr/>
+          <a:lstStyle/>
+          <a:p>
+            <a:r>
+              <a:rPr lang="en-US" dirty="0"/>
+              <a:t>Publishing Code Topics</a:t>
+            </a:r>
+          </a:p>
+        </p:txBody>
+      </p:sp>
+      <p:sp>
+        <p:nvSpPr>
+          <p:cNvPr id="3" name="Content Placeholder 2">
+            <a:extLst>
+              <a:ext uri="{FF2B5EF4-FFF2-40B4-BE49-F238E27FC236}">
+                <a16:creationId xmlns:a16="http://schemas.microsoft.com/office/drawing/2014/main" id="{7764305B-6773-4247-B021-BA380E4D0B7C}"/>
+              </a:ext>
+            </a:extLst>
+          </p:cNvPr>
+          <p:cNvSpPr>
+            <a:spLocks noGrp="1"/>
+          </p:cNvSpPr>
+          <p:nvPr>
+            <p:ph idx="1"/>
+          </p:nvPr>
+        </p:nvSpPr>
+        <p:spPr/>
+        <p:txBody>
+          <a:bodyPr/>
+          <a:lstStyle/>
+          <a:p>
+            <a:r>
+              <a:rPr lang="en-US" dirty="0"/>
+              <a:t>Software Salvage and Reuse</a:t>
+            </a:r>
+          </a:p>
+          <a:p>
+            <a:r>
+              <a:rPr lang="en-US" dirty="0"/>
+              <a:t>Publishing Code Components</a:t>
+            </a:r>
+          </a:p>
+          <a:p>
+            <a:r>
+              <a:rPr lang="en-US" dirty="0"/>
+              <a:t>Reuse Prologue</a:t>
+            </a:r>
+          </a:p>
+          <a:p>
+            <a:r>
+              <a:rPr lang="en-US" dirty="0"/>
+              <a:t>Website Structure</a:t>
+            </a:r>
+          </a:p>
+          <a:p>
+            <a:r>
+              <a:rPr lang="en-US" dirty="0"/>
+              <a:t>Quality Control</a:t>
+            </a:r>
+          </a:p>
+          <a:p>
+            <a:r>
+              <a:rPr lang="en-US" dirty="0"/>
+              <a:t>Experiments</a:t>
+            </a:r>
+          </a:p>
+          <a:p>
+            <a:r>
+              <a:rPr lang="en-US" dirty="0"/>
+              <a:t>Conclusions</a:t>
+            </a:r>
+          </a:p>
+          <a:p>
+            <a:endParaRPr lang="en-US" dirty="0"/>
+          </a:p>
+        </p:txBody>
+      </p:sp>
+      <p:sp>
+        <p:nvSpPr>
+          <p:cNvPr id="4" name="Slide Number Placeholder 3">
+            <a:extLst>
+              <a:ext uri="{FF2B5EF4-FFF2-40B4-BE49-F238E27FC236}">
+                <a16:creationId xmlns:a16="http://schemas.microsoft.com/office/drawing/2014/main" id="{52D988B3-62E0-415C-9E74-289E15EAF1FB}"/>
+              </a:ext>
+            </a:extLst>
+          </p:cNvPr>
+          <p:cNvSpPr>
+            <a:spLocks noGrp="1"/>
+          </p:cNvSpPr>
+          <p:nvPr>
+            <p:ph type="sldNum" sz="quarter" idx="12"/>
+          </p:nvPr>
+        </p:nvSpPr>
+        <p:spPr/>
+        <p:txBody>
+          <a:bodyPr/>
+          <a:lstStyle/>
+          <a:p>
+            <a:fld id="{EDEBF0BA-A897-4C1E-AB3C-F330808C0E1D}" type="slidenum">
+              <a:rPr lang="en-US" smtClean="0"/>
+              <a:t>2</a:t>
+            </a:fld>
+            <a:endParaRPr lang="en-US"/>
+          </a:p>
+        </p:txBody>
+      </p:sp>
+    </p:spTree>
+    <p:extLst>
+      <p:ext uri="{BB962C8B-B14F-4D97-AF65-F5344CB8AC3E}">
+        <p14:creationId xmlns:p14="http://schemas.microsoft.com/office/powerpoint/2010/main" val="4030365046"/>
+      </p:ext>
+    </p:extLst>
+  </p:cSld>
+  <p:clrMapOvr>
+    <a:masterClrMapping/>
+  </p:clrMapOvr>
+</p:sld>
+</file>
+
+<file path=ppt/slides/slide20.xml><?xml version="1.0" encoding="utf-8"?>
 <p:sld xmlns:a="http://schemas.openxmlformats.org/drawingml/2006/main" xmlns:r="http://schemas.openxmlformats.org/officeDocument/2006/relationships" xmlns:p="http://schemas.openxmlformats.org/presentationml/2006/main">
   <p:cSld>
     <p:spTree>
@@ -6514,7 +6869,7 @@
           <a:p>
             <a:fld id="{EDEBF0BA-A897-4C1E-AB3C-F330808C0E1D}" type="slidenum">
               <a:rPr lang="en-US" smtClean="0"/>
-              <a:t>19</a:t>
+              <a:t>20</a:t>
             </a:fld>
             <a:endParaRPr lang="en-US"/>
           </a:p>
@@ -6533,173 +6888,7 @@
 </p:sld>
 </file>
 
-<file path=ppt/slides/slide2.xml><?xml version="1.0" encoding="utf-8"?>
-<p:sld xmlns:a="http://schemas.openxmlformats.org/drawingml/2006/main" xmlns:r="http://schemas.openxmlformats.org/officeDocument/2006/relationships" xmlns:p="http://schemas.openxmlformats.org/presentationml/2006/main">
-  <p:cSld>
-    <p:spTree>
-      <p:nvGrpSpPr>
-        <p:cNvPr id="1" name=""/>
-        <p:cNvGrpSpPr/>
-        <p:nvPr/>
-      </p:nvGrpSpPr>
-      <p:grpSpPr>
-        <a:xfrm>
-          <a:off x="0" y="0"/>
-          <a:ext cx="0" cy="0"/>
-          <a:chOff x="0" y="0"/>
-          <a:chExt cx="0" cy="0"/>
-        </a:xfrm>
-      </p:grpSpPr>
-      <p:sp>
-        <p:nvSpPr>
-          <p:cNvPr id="2" name="Title 1">
-            <a:extLst>
-              <a:ext uri="{FF2B5EF4-FFF2-40B4-BE49-F238E27FC236}">
-                <a16:creationId xmlns:a16="http://schemas.microsoft.com/office/drawing/2014/main" id="{D5791037-F5B9-4520-96E0-22E8D64C46FF}"/>
-              </a:ext>
-            </a:extLst>
-          </p:cNvPr>
-          <p:cNvSpPr>
-            <a:spLocks noGrp="1"/>
-          </p:cNvSpPr>
-          <p:nvPr>
-            <p:ph type="title"/>
-          </p:nvPr>
-        </p:nvSpPr>
-        <p:spPr/>
-        <p:txBody>
-          <a:bodyPr/>
-          <a:lstStyle/>
-          <a:p>
-            <a:r>
-              <a:rPr lang="en-US" dirty="0"/>
-              <a:t>Software Salvage and Reuse</a:t>
-            </a:r>
-          </a:p>
-        </p:txBody>
-      </p:sp>
-      <p:sp>
-        <p:nvSpPr>
-          <p:cNvPr id="3" name="Content Placeholder 2">
-            <a:extLst>
-              <a:ext uri="{FF2B5EF4-FFF2-40B4-BE49-F238E27FC236}">
-                <a16:creationId xmlns:a16="http://schemas.microsoft.com/office/drawing/2014/main" id="{491474DF-CCCA-4B65-87ED-1CE7E2998525}"/>
-              </a:ext>
-            </a:extLst>
-          </p:cNvPr>
-          <p:cNvSpPr>
-            <a:spLocks noGrp="1"/>
-          </p:cNvSpPr>
-          <p:nvPr>
-            <p:ph idx="1"/>
-          </p:nvPr>
-        </p:nvSpPr>
-        <p:spPr/>
-        <p:txBody>
-          <a:bodyPr/>
-          <a:lstStyle/>
-          <a:p>
-            <a:r>
-              <a:rPr lang="en-US" dirty="0"/>
-              <a:t>Software Components</a:t>
-            </a:r>
-          </a:p>
-          <a:p>
-            <a:pPr lvl="1"/>
-            <a:r>
-              <a:rPr lang="en-US" dirty="0"/>
-              <a:t>Software package that has a single purpose, few dependencies, and is useful for building software systems – example: blocking queue</a:t>
-            </a:r>
-          </a:p>
-          <a:p>
-            <a:r>
-              <a:rPr lang="en-US" dirty="0"/>
-              <a:t>Salvage  (good)</a:t>
-            </a:r>
-          </a:p>
-          <a:p>
-            <a:pPr lvl="1"/>
-            <a:r>
-              <a:rPr lang="en-US" dirty="0"/>
-              <a:t>Using an existing component with minor modifications</a:t>
-            </a:r>
-          </a:p>
-          <a:p>
-            <a:pPr lvl="1"/>
-            <a:r>
-              <a:rPr lang="en-US" dirty="0"/>
-              <a:t>That creates another component that must be configured and managed</a:t>
-            </a:r>
-          </a:p>
-          <a:p>
-            <a:r>
-              <a:rPr lang="en-US" dirty="0"/>
-              <a:t>Reuse   (better)</a:t>
-            </a:r>
-          </a:p>
-          <a:p>
-            <a:pPr lvl="1"/>
-            <a:r>
-              <a:rPr lang="en-US" dirty="0"/>
-              <a:t>Reuse an existing component with </a:t>
-            </a:r>
-            <a:r>
-              <a:rPr lang="en-US" b="1" dirty="0"/>
-              <a:t>no modification</a:t>
-            </a:r>
-          </a:p>
-          <a:p>
-            <a:pPr lvl="1"/>
-            <a:r>
-              <a:rPr lang="en-US" dirty="0"/>
-              <a:t>Used by composing, using as template argument, or using as base for derived classes</a:t>
-            </a:r>
-          </a:p>
-        </p:txBody>
-      </p:sp>
-      <p:sp>
-        <p:nvSpPr>
-          <p:cNvPr id="4" name="Slide Number Placeholder 3">
-            <a:extLst>
-              <a:ext uri="{FF2B5EF4-FFF2-40B4-BE49-F238E27FC236}">
-                <a16:creationId xmlns:a16="http://schemas.microsoft.com/office/drawing/2014/main" id="{B61567BC-F924-41F2-BFB4-D8538334616A}"/>
-              </a:ext>
-            </a:extLst>
-          </p:cNvPr>
-          <p:cNvSpPr>
-            <a:spLocks noGrp="1"/>
-          </p:cNvSpPr>
-          <p:nvPr>
-            <p:ph type="sldNum" sz="quarter" idx="12"/>
-          </p:nvPr>
-        </p:nvSpPr>
-        <p:spPr/>
-        <p:txBody>
-          <a:bodyPr/>
-          <a:lstStyle/>
-          <a:p>
-            <a:fld id="{EDEBF0BA-A897-4C1E-AB3C-F330808C0E1D}" type="slidenum">
-              <a:rPr lang="en-US" smtClean="0"/>
-              <a:t>2</a:t>
-            </a:fld>
-            <a:endParaRPr lang="en-US"/>
-          </a:p>
-        </p:txBody>
-      </p:sp>
-    </p:spTree>
-    <p:extLst>
-      <p:ext uri="{BB962C8B-B14F-4D97-AF65-F5344CB8AC3E}">
-        <p14:creationId xmlns:p14="http://schemas.microsoft.com/office/powerpoint/2010/main" val="1570206584"/>
-      </p:ext>
-    </p:extLst>
-  </p:cSld>
-  <p:clrMapOvr>
-    <a:masterClrMapping/>
-  </p:clrMapOvr>
-</p:sld>
-</file>
-
-<file path=ppt/slides/slide20.xml><?xml version="1.0" encoding="utf-8"?>
+<file path=ppt/slides/slide21.xml><?xml version="1.0" encoding="utf-8"?>
 <p:sld xmlns:a="http://schemas.openxmlformats.org/drawingml/2006/main" xmlns:r="http://schemas.openxmlformats.org/officeDocument/2006/relationships" xmlns:p="http://schemas.openxmlformats.org/presentationml/2006/main">
   <p:cSld>
     <p:spTree>
@@ -6960,7 +7149,7 @@
           <a:p>
             <a:fld id="{EDEBF0BA-A897-4C1E-AB3C-F330808C0E1D}" type="slidenum">
               <a:rPr lang="en-US" smtClean="0"/>
-              <a:t>20</a:t>
+              <a:t>21</a:t>
             </a:fld>
             <a:endParaRPr lang="en-US"/>
           </a:p>
@@ -6970,190 +7159,6 @@
     <p:extLst>
       <p:ext uri="{BB962C8B-B14F-4D97-AF65-F5344CB8AC3E}">
         <p14:creationId xmlns:p14="http://schemas.microsoft.com/office/powerpoint/2010/main" val="99145666"/>
-      </p:ext>
-    </p:extLst>
-  </p:cSld>
-  <p:clrMapOvr>
-    <a:masterClrMapping/>
-  </p:clrMapOvr>
-</p:sld>
-</file>
-
-<file path=ppt/slides/slide21.xml><?xml version="1.0" encoding="utf-8"?>
-<p:sld xmlns:a="http://schemas.openxmlformats.org/drawingml/2006/main" xmlns:r="http://schemas.openxmlformats.org/officeDocument/2006/relationships" xmlns:p="http://schemas.openxmlformats.org/presentationml/2006/main">
-  <p:cSld>
-    <p:spTree>
-      <p:nvGrpSpPr>
-        <p:cNvPr id="1" name=""/>
-        <p:cNvGrpSpPr/>
-        <p:nvPr/>
-      </p:nvGrpSpPr>
-      <p:grpSpPr>
-        <a:xfrm>
-          <a:off x="0" y="0"/>
-          <a:ext cx="0" cy="0"/>
-          <a:chOff x="0" y="0"/>
-          <a:chExt cx="0" cy="0"/>
-        </a:xfrm>
-      </p:grpSpPr>
-      <p:sp>
-        <p:nvSpPr>
-          <p:cNvPr id="2" name="Title 1">
-            <a:extLst>
-              <a:ext uri="{FF2B5EF4-FFF2-40B4-BE49-F238E27FC236}">
-                <a16:creationId xmlns:a16="http://schemas.microsoft.com/office/drawing/2014/main" id="{C818CF9C-B350-4936-99E1-D89031958E0C}"/>
-              </a:ext>
-            </a:extLst>
-          </p:cNvPr>
-          <p:cNvSpPr>
-            <a:spLocks noGrp="1"/>
-          </p:cNvSpPr>
-          <p:nvPr>
-            <p:ph type="title"/>
-          </p:nvPr>
-        </p:nvSpPr>
-        <p:spPr>
-          <a:xfrm>
-            <a:off x="838200" y="339367"/>
-            <a:ext cx="10515600" cy="678161"/>
-          </a:xfrm>
-        </p:spPr>
-        <p:txBody>
-          <a:bodyPr/>
-          <a:lstStyle/>
-          <a:p>
-            <a:r>
-              <a:rPr lang="en-US" dirty="0"/>
-              <a:t>Academic Research Domain</a:t>
-            </a:r>
-          </a:p>
-        </p:txBody>
-      </p:sp>
-      <p:sp>
-        <p:nvSpPr>
-          <p:cNvPr id="3" name="Content Placeholder 2">
-            <a:extLst>
-              <a:ext uri="{FF2B5EF4-FFF2-40B4-BE49-F238E27FC236}">
-                <a16:creationId xmlns:a16="http://schemas.microsoft.com/office/drawing/2014/main" id="{C65F66DE-FE31-4539-83AE-36CA6E637596}"/>
-              </a:ext>
-            </a:extLst>
-          </p:cNvPr>
-          <p:cNvSpPr>
-            <a:spLocks noGrp="1"/>
-          </p:cNvSpPr>
-          <p:nvPr>
-            <p:ph idx="1"/>
-          </p:nvPr>
-        </p:nvSpPr>
-        <p:spPr>
-          <a:xfrm>
-            <a:off x="838200" y="1017529"/>
-            <a:ext cx="10515600" cy="5355770"/>
-          </a:xfrm>
-        </p:spPr>
-        <p:txBody>
-          <a:bodyPr>
-            <a:noAutofit/>
-          </a:bodyPr>
-          <a:lstStyle/>
-          <a:p>
-            <a:r>
-              <a:rPr lang="en-US" sz="2000" dirty="0"/>
-              <a:t>Academic Research: 5 – 10 code developers</a:t>
-            </a:r>
-          </a:p>
-          <a:p>
-            <a:pPr lvl="1"/>
-            <a:r>
-              <a:rPr lang="en-US" sz="1800" dirty="0"/>
-              <a:t>Code life-time: 3 – 5 years</a:t>
-            </a:r>
-          </a:p>
-          <a:p>
-            <a:pPr lvl="1"/>
-            <a:r>
-              <a:rPr lang="en-US" sz="1800" dirty="0"/>
-              <a:t>Example: Natural Language Processing (NLP)</a:t>
-            </a:r>
-          </a:p>
-          <a:p>
-            <a:r>
-              <a:rPr lang="en-US" sz="2000" dirty="0"/>
-              <a:t>An academic researcher may have 2 or 3 doctoral candidates working on related parts of a research project.</a:t>
-            </a:r>
-          </a:p>
-          <a:p>
-            <a:r>
-              <a:rPr lang="en-US" sz="2000" dirty="0"/>
-              <a:t>She may collaborate with two or three colleagues, perhaps at different universities.</a:t>
-            </a:r>
-          </a:p>
-          <a:p>
-            <a:pPr lvl="1"/>
-            <a:r>
-              <a:rPr lang="en-US" sz="1800" dirty="0"/>
-              <a:t>Each of those colleagues may have a similar team working on related projects.</a:t>
-            </a:r>
-          </a:p>
-          <a:p>
-            <a:r>
-              <a:rPr lang="en-US" sz="2200" dirty="0"/>
-              <a:t>There usually is continuing work on the same or related research projects for many years.</a:t>
-            </a:r>
-          </a:p>
-          <a:p>
-            <a:r>
-              <a:rPr lang="en-US" sz="2200" dirty="0"/>
-              <a:t>It is quite common that this work develops software tools for gathering and analyzing data.  Sometimes software is part of the end product, e.g., compilers for a new language, an architecture for streaming or classifying content, …</a:t>
-            </a:r>
-          </a:p>
-          <a:p>
-            <a:r>
-              <a:rPr lang="en-US" sz="2200" dirty="0"/>
-              <a:t>These software developments are rarely maintained well.  Often documentation is nothing but code and the papers that describe research results and mention the software as an aside.</a:t>
-            </a:r>
-          </a:p>
-          <a:p>
-            <a:r>
-              <a:rPr lang="en-US" sz="2200" dirty="0"/>
-              <a:t>Our methods are applicable.</a:t>
-            </a:r>
-          </a:p>
-        </p:txBody>
-      </p:sp>
-      <p:sp>
-        <p:nvSpPr>
-          <p:cNvPr id="4" name="Slide Number Placeholder 3">
-            <a:extLst>
-              <a:ext uri="{FF2B5EF4-FFF2-40B4-BE49-F238E27FC236}">
-                <a16:creationId xmlns:a16="http://schemas.microsoft.com/office/drawing/2014/main" id="{B11F232F-AB6D-4130-9246-6A1AF1E6451D}"/>
-              </a:ext>
-            </a:extLst>
-          </p:cNvPr>
-          <p:cNvSpPr>
-            <a:spLocks noGrp="1"/>
-          </p:cNvSpPr>
-          <p:nvPr>
-            <p:ph type="sldNum" sz="quarter" idx="12"/>
-          </p:nvPr>
-        </p:nvSpPr>
-        <p:spPr/>
-        <p:txBody>
-          <a:bodyPr/>
-          <a:lstStyle/>
-          <a:p>
-            <a:fld id="{EDEBF0BA-A897-4C1E-AB3C-F330808C0E1D}" type="slidenum">
-              <a:rPr lang="en-US" smtClean="0"/>
-              <a:t>21</a:t>
-            </a:fld>
-            <a:endParaRPr lang="en-US"/>
-          </a:p>
-        </p:txBody>
-      </p:sp>
-    </p:spTree>
-    <p:extLst>
-      <p:ext uri="{BB962C8B-B14F-4D97-AF65-F5344CB8AC3E}">
-        <p14:creationId xmlns:p14="http://schemas.microsoft.com/office/powerpoint/2010/main" val="3236624771"/>
       </p:ext>
     </p:extLst>
   </p:cSld>
@@ -7208,7 +7213,7 @@
           <a:p>
             <a:r>
               <a:rPr lang="en-US" dirty="0"/>
-              <a:t>Open Source Domain</a:t>
+              <a:t>Academic Research Domain</a:t>
             </a:r>
           </a:p>
         </p:txBody>
@@ -7231,7 +7236,7 @@
         </p:nvSpPr>
         <p:spPr>
           <a:xfrm>
-            <a:off x="838200" y="1216909"/>
+            <a:off x="838200" y="1017529"/>
             <a:ext cx="10515600" cy="5355770"/>
           </a:xfrm>
         </p:spPr>
@@ -7243,101 +7248,64 @@
           <a:p>
             <a:r>
               <a:rPr lang="en-US" sz="2000" dirty="0"/>
-              <a:t>Open Source Development: 5 – 1000 active developers, many casual contributors</a:t>
+              <a:t>Academic Research: 5 – 10 code developers</a:t>
             </a:r>
           </a:p>
           <a:p>
             <a:pPr lvl="1"/>
             <a:r>
               <a:rPr lang="en-US" sz="1800" dirty="0"/>
-              <a:t>Code life-time: 10 - 20 years</a:t>
+              <a:t>Code life-time: 3 – 5 years</a:t>
             </a:r>
           </a:p>
           <a:p>
             <a:pPr lvl="1"/>
             <a:r>
               <a:rPr lang="en-US" sz="1800" dirty="0"/>
-              <a:t>Examples: Linux, Node.js, MongoDB</a:t>
+              <a:t>Example: Natural Language Processing (NLP)</a:t>
+            </a:r>
+          </a:p>
+          <a:p>
+            <a:r>
+              <a:rPr lang="en-US" sz="2000" dirty="0"/>
+              <a:t>An academic researcher may have 2 or 3 doctoral candidates working on related parts of a research project.</a:t>
+            </a:r>
+          </a:p>
+          <a:p>
+            <a:r>
+              <a:rPr lang="en-US" sz="2000" dirty="0"/>
+              <a:t>She may collaborate with two or three colleagues, perhaps at different universities.</a:t>
+            </a:r>
+          </a:p>
+          <a:p>
+            <a:pPr lvl="1"/>
+            <a:r>
+              <a:rPr lang="en-US" sz="1800" dirty="0"/>
+              <a:t>Each of those colleagues may have a similar team working on related projects.</a:t>
             </a:r>
           </a:p>
           <a:p>
             <a:r>
               <a:rPr lang="en-US" sz="2200" dirty="0"/>
-              <a:t>Following an initial period of development, a project often settles into a maintenance mode:</a:t>
-            </a:r>
-          </a:p>
-          <a:p>
-            <a:pPr lvl="1"/>
-            <a:r>
-              <a:rPr lang="en-US" sz="1800" dirty="0"/>
-              <a:t>Maintain the same mission and design.</a:t>
-            </a:r>
-          </a:p>
-          <a:p>
-            <a:pPr lvl="1"/>
-            <a:r>
-              <a:rPr lang="en-US" sz="1800" dirty="0"/>
-              <a:t>Add new features and port to new platforms.</a:t>
+              <a:t>There usually is continuing work on the same or related research projects for many years.</a:t>
             </a:r>
           </a:p>
           <a:p>
             <a:r>
               <a:rPr lang="en-US" sz="2200" dirty="0"/>
-              <a:t>Occasionally revise most of the code and support new missions.</a:t>
+              <a:t>It is quite common that this work develops software tools for gathering and analyzing data.  Sometimes software is part of the end product, e.g., compilers for a new language, an architecture for streaming or classifying content, …</a:t>
             </a:r>
           </a:p>
           <a:p>
             <a:r>
               <a:rPr lang="en-US" sz="2200" dirty="0"/>
-              <a:t>Documentation varies from poor to outstanding.</a:t>
-            </a:r>
-          </a:p>
-          <a:p>
-            <a:pPr lvl="1"/>
-            <a:r>
-              <a:rPr lang="en-US" sz="1800" dirty="0"/>
-              <a:t>Linux documentation is one of the outstanding ones: </a:t>
-            </a:r>
-          </a:p>
-          <a:p>
-            <a:pPr lvl="2"/>
-            <a:r>
-              <a:rPr lang="en-US" sz="1400" dirty="0">
-                <a:hlinkClick r:id="rId2"/>
-              </a:rPr>
-              <a:t>https://www.kernel.org/doc/html/v4.10/index.html</a:t>
-            </a:r>
-            <a:r>
-              <a:rPr lang="en-US" sz="1400" dirty="0"/>
-              <a:t> </a:t>
-            </a:r>
-          </a:p>
-          <a:p>
-            <a:pPr lvl="1"/>
-            <a:r>
-              <a:rPr lang="en-US" sz="1800" dirty="0"/>
-              <a:t>Some projects focus on </a:t>
-            </a:r>
-            <a:r>
-              <a:rPr lang="en-US" sz="1800" dirty="0" err="1"/>
-              <a:t>api</a:t>
-            </a:r>
-            <a:r>
-              <a:rPr lang="en-US" sz="1800" dirty="0"/>
-              <a:t> level documentation – how to use the code.</a:t>
-            </a:r>
-          </a:p>
-          <a:p>
-            <a:pPr lvl="1"/>
-            <a:r>
-              <a:rPr lang="en-US" sz="1800" dirty="0"/>
-              <a:t>Some focus on maintenance – what are the parts, how are they related, code standards, …</a:t>
+              <a:t>These software developments are rarely maintained well.  Often documentation is nothing but code and the papers that describe research results and mention the software as an aside.</a:t>
             </a:r>
           </a:p>
           <a:p>
             <a:r>
               <a:rPr lang="en-US" sz="2200" dirty="0"/>
-              <a:t>Their goal is different than ours – our methods may not apply.</a:t>
+              <a:t>Our methods are applicable.</a:t>
             </a:r>
           </a:p>
         </p:txBody>
@@ -7347,7 +7315,7 @@
           <p:cNvPr id="4" name="Slide Number Placeholder 3">
             <a:extLst>
               <a:ext uri="{FF2B5EF4-FFF2-40B4-BE49-F238E27FC236}">
-                <a16:creationId xmlns:a16="http://schemas.microsoft.com/office/drawing/2014/main" id="{322EE9A1-C48D-4BEF-9075-0B0169EC94DF}"/>
+                <a16:creationId xmlns:a16="http://schemas.microsoft.com/office/drawing/2014/main" id="{B11F232F-AB6D-4130-9246-6A1AF1E6451D}"/>
               </a:ext>
             </a:extLst>
           </p:cNvPr>
@@ -7374,7 +7342,7 @@
     </p:spTree>
     <p:extLst>
       <p:ext uri="{BB962C8B-B14F-4D97-AF65-F5344CB8AC3E}">
-        <p14:creationId xmlns:p14="http://schemas.microsoft.com/office/powerpoint/2010/main" val="891542893"/>
+        <p14:creationId xmlns:p14="http://schemas.microsoft.com/office/powerpoint/2010/main" val="3236624771"/>
       </p:ext>
     </p:extLst>
   </p:cSld>
@@ -7429,7 +7397,7 @@
           <a:p>
             <a:r>
               <a:rPr lang="en-US" dirty="0"/>
-              <a:t>Industrial Development Domain</a:t>
+              <a:t>Open Source Domain</a:t>
             </a:r>
           </a:p>
         </p:txBody>
@@ -7452,8 +7420,8 @@
         </p:nvSpPr>
         <p:spPr>
           <a:xfrm>
-            <a:off x="838200" y="1268569"/>
-            <a:ext cx="10515600" cy="5104730"/>
+            <a:off x="838200" y="1216909"/>
+            <a:ext cx="10515600" cy="5355770"/>
           </a:xfrm>
         </p:spPr>
         <p:txBody>
@@ -7464,67 +7432,101 @@
           <a:p>
             <a:r>
               <a:rPr lang="en-US" sz="2000" dirty="0"/>
-              <a:t>Industrial Development: 5 – 10 developers</a:t>
+              <a:t>Open Source Development: 5 – 1000 active developers, many casual contributors</a:t>
             </a:r>
           </a:p>
           <a:p>
             <a:pPr lvl="1"/>
             <a:r>
               <a:rPr lang="en-US" sz="1800" dirty="0"/>
-              <a:t>Code life-time: 5 – 20 years</a:t>
+              <a:t>Code life-time: 10 - 20 years</a:t>
             </a:r>
           </a:p>
           <a:p>
             <a:pPr lvl="1"/>
             <a:r>
               <a:rPr lang="en-US" sz="1800" dirty="0"/>
-              <a:t>Example: Machine Tool Control</a:t>
+              <a:t>Examples: Linux, Node.js, MongoDB</a:t>
             </a:r>
           </a:p>
           <a:p>
             <a:r>
               <a:rPr lang="en-US" sz="2200" dirty="0"/>
-              <a:t>Code base starts with an initial product</a:t>
+              <a:t>Following an initial period of development, a project often settles into a maintenance mode:</a:t>
+            </a:r>
+          </a:p>
+          <a:p>
+            <a:pPr lvl="1"/>
+            <a:r>
+              <a:rPr lang="en-US" sz="1800" dirty="0"/>
+              <a:t>Maintain the same mission and design.</a:t>
+            </a:r>
+          </a:p>
+          <a:p>
+            <a:pPr lvl="1"/>
+            <a:r>
+              <a:rPr lang="en-US" sz="1800" dirty="0"/>
+              <a:t>Add new features and port to new platforms.</a:t>
             </a:r>
           </a:p>
           <a:p>
             <a:r>
               <a:rPr lang="en-US" sz="2200" dirty="0"/>
-              <a:t>New products start from that initial code</a:t>
+              <a:t>Occasionally revise most of the code and support new missions.</a:t>
+            </a:r>
+          </a:p>
+          <a:p>
+            <a:r>
+              <a:rPr lang="en-US" sz="2200" dirty="0"/>
+              <a:t>Documentation varies from poor to outstanding.</a:t>
             </a:r>
           </a:p>
           <a:p>
             <a:pPr lvl="1"/>
             <a:r>
               <a:rPr lang="en-US" sz="1800" dirty="0"/>
-              <a:t>Has a common code baseline been defined?</a:t>
+              <a:t>Linux documentation is one of the outstanding ones: </a:t>
+            </a:r>
+          </a:p>
+          <a:p>
+            <a:pPr lvl="2"/>
+            <a:r>
+              <a:rPr lang="en-US" sz="1400" dirty="0">
+                <a:hlinkClick r:id="rId2"/>
+              </a:rPr>
+              <a:t>https://www.kernel.org/doc/html/v4.10/index.html</a:t>
+            </a:r>
+            <a:r>
+              <a:rPr lang="en-US" sz="1400" dirty="0"/>
+              <a:t> </a:t>
             </a:r>
           </a:p>
           <a:p>
             <a:pPr lvl="1"/>
             <a:r>
               <a:rPr lang="en-US" sz="1800" dirty="0"/>
-              <a:t>Code reviews are held during development</a:t>
-            </a:r>
-          </a:p>
-          <a:p>
-            <a:pPr lvl="1"/>
+              <a:t>Some projects focus on </a:t>
+            </a:r>
+            <a:r>
+              <a:rPr lang="en-US" sz="1800" dirty="0" err="1"/>
+              <a:t>api</a:t>
+            </a:r>
             <a:r>
               <a:rPr lang="en-US" sz="1800" dirty="0"/>
-              <a:t>At product completion is code reviewed and refactored into reusable parts and product specific code?</a:t>
+              <a:t> level documentation – how to use the code.</a:t>
             </a:r>
           </a:p>
           <a:p>
             <a:pPr lvl="1"/>
             <a:r>
               <a:rPr lang="en-US" sz="1800" dirty="0"/>
-              <a:t>Is the organization willing to provide overhead effort to evolve the common code base?</a:t>
+              <a:t>Some focus on maintenance – what are the parts, how are they related, code standards, …</a:t>
             </a:r>
           </a:p>
           <a:p>
             <a:r>
               <a:rPr lang="en-US" sz="2200" dirty="0"/>
-              <a:t>Our methods are applicable.  A scaled down version is probably appropriate.</a:t>
+              <a:t>Their goal is different than ours – our methods may not apply.</a:t>
             </a:r>
           </a:p>
         </p:txBody>
@@ -7534,7 +7536,7 @@
           <p:cNvPr id="4" name="Slide Number Placeholder 3">
             <a:extLst>
               <a:ext uri="{FF2B5EF4-FFF2-40B4-BE49-F238E27FC236}">
-                <a16:creationId xmlns:a16="http://schemas.microsoft.com/office/drawing/2014/main" id="{A916C694-BD83-42C9-A8AC-D048E61AD071}"/>
+                <a16:creationId xmlns:a16="http://schemas.microsoft.com/office/drawing/2014/main" id="{322EE9A1-C48D-4BEF-9075-0B0169EC94DF}"/>
               </a:ext>
             </a:extLst>
           </p:cNvPr>
@@ -7561,7 +7563,7 @@
     </p:spTree>
     <p:extLst>
       <p:ext uri="{BB962C8B-B14F-4D97-AF65-F5344CB8AC3E}">
-        <p14:creationId xmlns:p14="http://schemas.microsoft.com/office/powerpoint/2010/main" val="1744719603"/>
+        <p14:creationId xmlns:p14="http://schemas.microsoft.com/office/powerpoint/2010/main" val="891542893"/>
       </p:ext>
     </p:extLst>
   </p:cSld>
@@ -7616,7 +7618,7 @@
           <a:p>
             <a:r>
               <a:rPr lang="en-US" dirty="0"/>
-              <a:t>Commercial Domain</a:t>
+              <a:t>Industrial Development Domain</a:t>
             </a:r>
           </a:p>
         </p:txBody>
@@ -7639,8 +7641,8 @@
         </p:nvSpPr>
         <p:spPr>
           <a:xfrm>
-            <a:off x="838200" y="1017529"/>
-            <a:ext cx="10515600" cy="5355770"/>
+            <a:off x="838200" y="1268569"/>
+            <a:ext cx="10515600" cy="5104730"/>
           </a:xfrm>
         </p:spPr>
         <p:txBody>
@@ -7651,119 +7653,68 @@
           <a:p>
             <a:r>
               <a:rPr lang="en-US" sz="2000" dirty="0"/>
-              <a:t>Commercial Products: </a:t>
+              <a:t>Industrial Development: 5 – 10 developers</a:t>
             </a:r>
           </a:p>
           <a:p>
             <a:pPr lvl="1"/>
             <a:r>
               <a:rPr lang="en-US" sz="1800" dirty="0"/>
-              <a:t>Code life-time: 20 – 30 years</a:t>
+              <a:t>Code life-time: 5 – 20 years</a:t>
             </a:r>
           </a:p>
           <a:p>
             <a:pPr lvl="1"/>
             <a:r>
               <a:rPr lang="en-US" sz="1800" dirty="0"/>
-              <a:t>Example: Microsoft Word</a:t>
+              <a:t>Example: Machine Tool Control</a:t>
             </a:r>
           </a:p>
           <a:p>
             <a:r>
               <a:rPr lang="en-US" sz="2200" dirty="0"/>
-              <a:t>Product may start with code framework, standards, and a specification</a:t>
+              <a:t>Code base starts with an initial product</a:t>
+            </a:r>
+          </a:p>
+          <a:p>
+            <a:r>
+              <a:rPr lang="en-US" sz="2200" dirty="0"/>
+              <a:t>New products start from that initial code</a:t>
             </a:r>
           </a:p>
           <a:p>
             <a:pPr lvl="1"/>
             <a:r>
               <a:rPr lang="en-US" sz="1800" dirty="0"/>
-              <a:t>For Microsoft Office and many other products, the framework has been the Microsoft Component Object Model (COM)</a:t>
-            </a:r>
-          </a:p>
-          <a:p>
-            <a:pPr lvl="2"/>
-            <a:r>
-              <a:rPr lang="en-US" sz="1400" dirty="0"/>
-              <a:t>It appears that, moving forward, COM will be hidden with a wrapper technology - Windows </a:t>
-            </a:r>
-            <a:r>
-              <a:rPr lang="en-US" sz="1400" dirty="0" err="1"/>
-              <a:t>RunTime</a:t>
-            </a:r>
-            <a:r>
-              <a:rPr lang="en-US" sz="1400" dirty="0"/>
-              <a:t> (WinRT): </a:t>
-            </a:r>
-            <a:r>
-              <a:rPr lang="en-US" sz="1400" dirty="0">
-                <a:hlinkClick r:id="rId2"/>
-              </a:rPr>
-              <a:t>https://en.wikipedia.org/wiki/Windows_Runtime</a:t>
-            </a:r>
-            <a:r>
-              <a:rPr lang="en-US" sz="1400" dirty="0"/>
-              <a:t> </a:t>
+              <a:t>Has a common code baseline been defined?</a:t>
             </a:r>
           </a:p>
           <a:p>
             <a:pPr lvl="1"/>
             <a:r>
               <a:rPr lang="en-US" sz="1800" dirty="0"/>
-              <a:t>Specification is developed by a Program Manager and reviewed by the development team</a:t>
+              <a:t>Code reviews are held during development</a:t>
+            </a:r>
+          </a:p>
+          <a:p>
+            <a:pPr lvl="1"/>
+            <a:r>
+              <a:rPr lang="en-US" sz="1800" dirty="0"/>
+              <a:t>At product completion is code reviewed and refactored into reusable parts and product specific code?</a:t>
+            </a:r>
+          </a:p>
+          <a:p>
+            <a:pPr lvl="1"/>
+            <a:r>
+              <a:rPr lang="en-US" sz="1800" dirty="0"/>
+              <a:t>Is the organization willing to provide overhead effort to evolve the common code base?</a:t>
             </a:r>
           </a:p>
           <a:p>
             <a:r>
               <a:rPr lang="en-US" sz="2200" dirty="0"/>
-              <a:t>Microsoft has spent a lot of resources on documentation, with mixed results</a:t>
-            </a:r>
-          </a:p>
-          <a:p>
-            <a:pPr lvl="1"/>
-            <a:r>
-              <a:rPr lang="en-US" sz="1800" dirty="0"/>
-              <a:t>Executing a search in MSDN for WinRT results in 6,180,000 results.  </a:t>
-            </a:r>
-          </a:p>
-          <a:p>
-            <a:pPr lvl="1"/>
-            <a:r>
-              <a:rPr lang="en-US" sz="1800" dirty="0"/>
-              <a:t>That isn’t a useful query – in fairness, the results are prioritized</a:t>
-            </a:r>
-          </a:p>
-          <a:p>
-            <a:pPr lvl="1"/>
-            <a:r>
-              <a:rPr lang="en-US" sz="1800" dirty="0"/>
-              <a:t>It’s quite common that when you arrive at a useful documentation page you get partial results with the remainder often linked to many pages scattered over the vast reaches of MSDN</a:t>
-            </a:r>
-          </a:p>
-          <a:p>
-            <a:r>
-              <a:rPr lang="en-US" sz="2200" dirty="0"/>
-              <a:t>Indeed, there are many Microsoft technologies each with its own products, APIs, code examples.</a:t>
-            </a:r>
-          </a:p>
-          <a:p>
-            <a:pPr lvl="1"/>
-            <a:r>
-              <a:rPr lang="en-US" sz="1800" dirty="0"/>
-              <a:t>Some, like the </a:t>
-            </a:r>
-            <a:r>
-              <a:rPr lang="en-US" sz="1800" dirty="0" err="1"/>
-              <a:t>.Net</a:t>
-            </a:r>
-            <a:r>
-              <a:rPr lang="en-US" sz="1800" dirty="0"/>
-              <a:t> framework have outstanding organization and documentation.</a:t>
-            </a:r>
-          </a:p>
-          <a:p>
-            <a:pPr lvl="1"/>
-            <a:endParaRPr lang="en-US" sz="1800" dirty="0"/>
+              <a:t>Our methods are applicable.  A scaled down version is probably appropriate.</a:t>
+            </a:r>
           </a:p>
         </p:txBody>
       </p:sp>
@@ -7799,7 +7750,7 @@
     </p:spTree>
     <p:extLst>
       <p:ext uri="{BB962C8B-B14F-4D97-AF65-F5344CB8AC3E}">
-        <p14:creationId xmlns:p14="http://schemas.microsoft.com/office/powerpoint/2010/main" val="1820564551"/>
+        <p14:creationId xmlns:p14="http://schemas.microsoft.com/office/powerpoint/2010/main" val="1744719603"/>
       </p:ext>
     </p:extLst>
   </p:cSld>
@@ -7845,7 +7796,7 @@
         <p:spPr>
           <a:xfrm>
             <a:off x="838200" y="339367"/>
-            <a:ext cx="10515600" cy="529957"/>
+            <a:ext cx="10515600" cy="678161"/>
           </a:xfrm>
         </p:spPr>
         <p:txBody>
@@ -7854,7 +7805,7 @@
           <a:p>
             <a:r>
               <a:rPr lang="en-US" dirty="0"/>
-              <a:t>Aerospace Domain</a:t>
+              <a:t>Commercial Domain</a:t>
             </a:r>
           </a:p>
         </p:txBody>
@@ -7888,84 +7839,56 @@
           <a:lstStyle/>
           <a:p>
             <a:r>
+              <a:rPr lang="en-US" sz="2000" dirty="0"/>
+              <a:t>Commercial Products: </a:t>
+            </a:r>
+          </a:p>
+          <a:p>
+            <a:pPr lvl="1"/>
+            <a:r>
               <a:rPr lang="en-US" sz="1800" dirty="0"/>
-              <a:t>Aerospace Programs: 5 – 200 developers</a:t>
-            </a:r>
-          </a:p>
-          <a:p>
-            <a:pPr lvl="1"/>
+              <a:t>Code life-time: 20 – 30 years</a:t>
+            </a:r>
+          </a:p>
+          <a:p>
+            <a:pPr lvl="1"/>
+            <a:r>
+              <a:rPr lang="en-US" sz="1800" dirty="0"/>
+              <a:t>Example: Microsoft Word</a:t>
+            </a:r>
+          </a:p>
+          <a:p>
+            <a:r>
+              <a:rPr lang="en-US" sz="2200" dirty="0"/>
+              <a:t>Product may start with code framework, standards, and a specification</a:t>
+            </a:r>
+          </a:p>
+          <a:p>
+            <a:pPr lvl="1"/>
+            <a:r>
+              <a:rPr lang="en-US" sz="1800" dirty="0"/>
+              <a:t>For Microsoft Office and many other products, the framework has been the Microsoft Component Object Model (COM) – technology was specifically designed for reuse</a:t>
+            </a:r>
+          </a:p>
+          <a:p>
+            <a:pPr lvl="2"/>
             <a:r>
               <a:rPr lang="en-US" sz="1400" dirty="0"/>
-              <a:t>Code life-time: 20 – 30 years</a:t>
-            </a:r>
-          </a:p>
-          <a:p>
-            <a:pPr lvl="1"/>
+              <a:t>It appears that, moving forward, COM will be hidden with a wrapper technology - Windows </a:t>
+            </a:r>
+            <a:r>
+              <a:rPr lang="en-US" sz="1400" dirty="0" err="1"/>
+              <a:t>RunTime</a:t>
+            </a:r>
             <a:r>
               <a:rPr lang="en-US" sz="1400" dirty="0"/>
-              <a:t>Example: Submarine control, Area surveillance, ..</a:t>
-            </a:r>
-          </a:p>
-          <a:p>
-            <a:r>
-              <a:rPr lang="en-US" sz="1800" dirty="0"/>
-              <a:t>Development is product oriented, starting with an initial contract, and continuing for possibly many years of enhancements and new contracts that build on the existing product technology</a:t>
-            </a:r>
-          </a:p>
-          <a:p>
-            <a:r>
-              <a:rPr lang="en-US" sz="1800" dirty="0"/>
-              <a:t>An example is the development of area surveillance radar systems</a:t>
-            </a:r>
-          </a:p>
-          <a:p>
-            <a:pPr lvl="1"/>
-            <a:r>
-              <a:rPr lang="en-US" sz="1400" dirty="0"/>
-              <a:t>Typical lifetime of a radar system is 20 years</a:t>
-            </a:r>
-          </a:p>
-          <a:p>
-            <a:pPr lvl="2"/>
-            <a:r>
-              <a:rPr lang="en-US" sz="1100" dirty="0"/>
-              <a:t>The code has to be maintained over that lifetime, sometimes by the manufacturer, sometimes by the customer.</a:t>
-            </a:r>
-          </a:p>
-          <a:p>
-            <a:pPr lvl="1"/>
-            <a:r>
-              <a:rPr lang="en-US" sz="1400" dirty="0"/>
-              <a:t>Once an initial contract has been successfully completed it is common for many contracts to be awarded for new versions.</a:t>
-            </a:r>
-          </a:p>
-          <a:p>
-            <a:pPr lvl="2"/>
-            <a:r>
-              <a:rPr lang="en-US" sz="1100" dirty="0"/>
-              <a:t>Usually a large part of a new product is based on an existing one and will share a large fraction of its code</a:t>
-            </a:r>
-          </a:p>
-          <a:p>
-            <a:pPr lvl="2"/>
-            <a:r>
-              <a:rPr lang="en-US" sz="1100" dirty="0"/>
-              <a:t>In most cases the new contract requires new features and enhancements – the customer looks at the original and decides how to embellish</a:t>
-            </a:r>
-          </a:p>
-          <a:p>
-            <a:r>
-              <a:rPr lang="en-US" sz="1800" dirty="0"/>
-              <a:t>The Capability Maturity Model was developed beginning when the Air Force funded a study with the Software Engineering Institute.  Its intent is to encourage DoD contractors to develop and maintain a consistent process for creation of software. </a:t>
-            </a:r>
-          </a:p>
-          <a:p>
-            <a:pPr lvl="1"/>
+              <a:t> (WinRT): </a:t>
+            </a:r>
             <a:r>
               <a:rPr lang="en-US" sz="1400" dirty="0">
                 <a:hlinkClick r:id="rId2"/>
               </a:rPr>
-              <a:t>https://en.wikipedia.org/wiki/Capability_Maturity_Model</a:t>
+              <a:t>https://en.wikipedia.org/wiki/Windows_Runtime</a:t>
             </a:r>
             <a:r>
               <a:rPr lang="en-US" sz="1400" dirty="0"/>
@@ -7975,30 +7898,61 @@
           <a:p>
             <a:pPr lvl="1"/>
             <a:r>
-              <a:rPr lang="en-US" sz="1400" dirty="0"/>
-              <a:t>CMM provides guidelines, but it is a model and a yardstick for assessing capability of contractors</a:t>
-            </a:r>
-          </a:p>
-          <a:p>
-            <a:pPr lvl="1"/>
-            <a:r>
-              <a:rPr lang="en-US" sz="1400" dirty="0"/>
-              <a:t>It does not provide specifics for tools and techniques that support reuse</a:t>
-            </a:r>
-          </a:p>
-          <a:p>
-            <a:r>
               <a:rPr lang="en-US" sz="1800" dirty="0"/>
-              <a:t>Our methods apply for individual product teams.  Unknown how that would scale to corporation level. </a:t>
-            </a:r>
-          </a:p>
-          <a:p>
-            <a:pPr lvl="1"/>
-            <a:endParaRPr lang="en-US" sz="1400" dirty="0"/>
-          </a:p>
-          <a:p>
-            <a:pPr lvl="1"/>
-            <a:endParaRPr lang="en-US" sz="1400" dirty="0"/>
+              <a:t>Specification is developed by a Program Manager and reviewed by the development team</a:t>
+            </a:r>
+          </a:p>
+          <a:p>
+            <a:r>
+              <a:rPr lang="en-US" sz="2200" dirty="0"/>
+              <a:t>Microsoft has spent a lot of resources on documentation, with mixed results</a:t>
+            </a:r>
+          </a:p>
+          <a:p>
+            <a:pPr lvl="1"/>
+            <a:r>
+              <a:rPr lang="en-US" sz="1800" dirty="0"/>
+              <a:t>Executing a search in MSDN for WinRT results in 6,180,000 results.  </a:t>
+            </a:r>
+          </a:p>
+          <a:p>
+            <a:pPr lvl="1"/>
+            <a:r>
+              <a:rPr lang="en-US" sz="1800" dirty="0"/>
+              <a:t>That isn’t a useful query – in fairness, the results are prioritized</a:t>
+            </a:r>
+          </a:p>
+          <a:p>
+            <a:pPr lvl="1"/>
+            <a:r>
+              <a:rPr lang="en-US" sz="1800" dirty="0"/>
+              <a:t>It’s quite common that when you arrive at a useful documentation page you get partial results with the remainder often linked to many pages scattered over the vast reaches of MSDN</a:t>
+            </a:r>
+          </a:p>
+          <a:p>
+            <a:r>
+              <a:rPr lang="en-US" sz="2200" dirty="0"/>
+              <a:t>There are many Microsoft technologies each with its own products, APIs, code examples.</a:t>
+            </a:r>
+          </a:p>
+          <a:p>
+            <a:pPr lvl="1"/>
+            <a:r>
+              <a:rPr lang="en-US" sz="1800" dirty="0"/>
+              <a:t>Some, like the </a:t>
+            </a:r>
+            <a:r>
+              <a:rPr lang="en-US" sz="1800" dirty="0" err="1"/>
+              <a:t>.Net</a:t>
+            </a:r>
+            <a:r>
+              <a:rPr lang="en-US" sz="1800" dirty="0"/>
+              <a:t> framework have outstanding organization and documentation.</a:t>
+            </a:r>
+          </a:p>
+          <a:p>
+            <a:pPr lvl="1"/>
+            <a:endParaRPr lang="en-US" sz="1800" dirty="0"/>
           </a:p>
         </p:txBody>
       </p:sp>
@@ -8034,7 +7988,7 @@
     </p:spTree>
     <p:extLst>
       <p:ext uri="{BB962C8B-B14F-4D97-AF65-F5344CB8AC3E}">
-        <p14:creationId xmlns:p14="http://schemas.microsoft.com/office/powerpoint/2010/main" val="3738534843"/>
+        <p14:creationId xmlns:p14="http://schemas.microsoft.com/office/powerpoint/2010/main" val="1820564551"/>
       </p:ext>
     </p:extLst>
   </p:cSld>
@@ -8066,6 +8020,241 @@
           <p:cNvPr id="2" name="Title 1">
             <a:extLst>
               <a:ext uri="{FF2B5EF4-FFF2-40B4-BE49-F238E27FC236}">
+                <a16:creationId xmlns:a16="http://schemas.microsoft.com/office/drawing/2014/main" id="{C818CF9C-B350-4936-99E1-D89031958E0C}"/>
+              </a:ext>
+            </a:extLst>
+          </p:cNvPr>
+          <p:cNvSpPr>
+            <a:spLocks noGrp="1"/>
+          </p:cNvSpPr>
+          <p:nvPr>
+            <p:ph type="title"/>
+          </p:nvPr>
+        </p:nvSpPr>
+        <p:spPr>
+          <a:xfrm>
+            <a:off x="838200" y="339367"/>
+            <a:ext cx="10515600" cy="529957"/>
+          </a:xfrm>
+        </p:spPr>
+        <p:txBody>
+          <a:bodyPr/>
+          <a:lstStyle/>
+          <a:p>
+            <a:r>
+              <a:rPr lang="en-US" dirty="0"/>
+              <a:t>Aerospace Domain</a:t>
+            </a:r>
+          </a:p>
+        </p:txBody>
+      </p:sp>
+      <p:sp>
+        <p:nvSpPr>
+          <p:cNvPr id="3" name="Content Placeholder 2">
+            <a:extLst>
+              <a:ext uri="{FF2B5EF4-FFF2-40B4-BE49-F238E27FC236}">
+                <a16:creationId xmlns:a16="http://schemas.microsoft.com/office/drawing/2014/main" id="{C65F66DE-FE31-4539-83AE-36CA6E637596}"/>
+              </a:ext>
+            </a:extLst>
+          </p:cNvPr>
+          <p:cNvSpPr>
+            <a:spLocks noGrp="1"/>
+          </p:cNvSpPr>
+          <p:nvPr>
+            <p:ph idx="1"/>
+          </p:nvPr>
+        </p:nvSpPr>
+        <p:spPr>
+          <a:xfrm>
+            <a:off x="838200" y="1017529"/>
+            <a:ext cx="10515600" cy="5355770"/>
+          </a:xfrm>
+        </p:spPr>
+        <p:txBody>
+          <a:bodyPr>
+            <a:noAutofit/>
+          </a:bodyPr>
+          <a:lstStyle/>
+          <a:p>
+            <a:r>
+              <a:rPr lang="en-US" sz="1800" dirty="0"/>
+              <a:t>Aerospace Programs: 5 – 200 developers</a:t>
+            </a:r>
+          </a:p>
+          <a:p>
+            <a:pPr lvl="1"/>
+            <a:r>
+              <a:rPr lang="en-US" sz="1400" dirty="0"/>
+              <a:t>Code life-time: 20 – 30 years</a:t>
+            </a:r>
+          </a:p>
+          <a:p>
+            <a:pPr lvl="1"/>
+            <a:r>
+              <a:rPr lang="en-US" sz="1400" dirty="0"/>
+              <a:t>Example: Submarine control, Area surveillance, ..</a:t>
+            </a:r>
+          </a:p>
+          <a:p>
+            <a:r>
+              <a:rPr lang="en-US" sz="1800" dirty="0"/>
+              <a:t>Development is product oriented, starting with an initial contract, and continuing for possibly many years of enhancements and new contracts that build on the existing product technology</a:t>
+            </a:r>
+          </a:p>
+          <a:p>
+            <a:r>
+              <a:rPr lang="en-US" sz="1800" dirty="0"/>
+              <a:t>An example is the development of area surveillance radar systems</a:t>
+            </a:r>
+          </a:p>
+          <a:p>
+            <a:pPr lvl="1"/>
+            <a:r>
+              <a:rPr lang="en-US" sz="1400" dirty="0"/>
+              <a:t>Typical lifetime of a radar system is 20 years</a:t>
+            </a:r>
+          </a:p>
+          <a:p>
+            <a:pPr lvl="2"/>
+            <a:r>
+              <a:rPr lang="en-US" sz="1100" dirty="0"/>
+              <a:t>The code has to be maintained over that lifetime, sometimes by the manufacturer, sometimes by the customer.</a:t>
+            </a:r>
+          </a:p>
+          <a:p>
+            <a:pPr lvl="1"/>
+            <a:r>
+              <a:rPr lang="en-US" sz="1400" dirty="0"/>
+              <a:t>Once an initial contract has been successfully completed it is common for many contracts to be awarded for new versions.</a:t>
+            </a:r>
+          </a:p>
+          <a:p>
+            <a:pPr lvl="2"/>
+            <a:r>
+              <a:rPr lang="en-US" sz="1100" dirty="0"/>
+              <a:t>Usually a large part of a new product is based on an existing one and will share a large fraction of its code</a:t>
+            </a:r>
+          </a:p>
+          <a:p>
+            <a:pPr lvl="2"/>
+            <a:r>
+              <a:rPr lang="en-US" sz="1100" dirty="0"/>
+              <a:t>In most cases the new contract requires new features and enhancements – the customer looks at the original and decides how to embellish</a:t>
+            </a:r>
+          </a:p>
+          <a:p>
+            <a:r>
+              <a:rPr lang="en-US" sz="1800" dirty="0"/>
+              <a:t>The Capability Maturity Model was developed beginning when the Air Force funded a study with the Software Engineering Institute.  Its intent is to encourage DoD contractors to develop and maintain a consistent process for creation of software. </a:t>
+            </a:r>
+          </a:p>
+          <a:p>
+            <a:pPr lvl="1"/>
+            <a:r>
+              <a:rPr lang="en-US" sz="1400" dirty="0">
+                <a:hlinkClick r:id="rId2"/>
+              </a:rPr>
+              <a:t>https://en.wikipedia.org/wiki/Capability_Maturity_Model</a:t>
+            </a:r>
+            <a:r>
+              <a:rPr lang="en-US" sz="1400" dirty="0"/>
+              <a:t> </a:t>
+            </a:r>
+          </a:p>
+          <a:p>
+            <a:pPr lvl="1"/>
+            <a:r>
+              <a:rPr lang="en-US" sz="1400" dirty="0"/>
+              <a:t>CMM provides guidelines, but it is a model and a yardstick for assessing capability of contractors</a:t>
+            </a:r>
+          </a:p>
+          <a:p>
+            <a:pPr lvl="1"/>
+            <a:r>
+              <a:rPr lang="en-US" sz="1400" dirty="0"/>
+              <a:t>It does not provide specifics for tools and techniques that support reuse</a:t>
+            </a:r>
+          </a:p>
+          <a:p>
+            <a:r>
+              <a:rPr lang="en-US" sz="1800" dirty="0"/>
+              <a:t>Our methods apply for individual product teams.  Unknown how that would scale to corporation level. </a:t>
+            </a:r>
+          </a:p>
+          <a:p>
+            <a:pPr lvl="1"/>
+            <a:endParaRPr lang="en-US" sz="1400" dirty="0"/>
+          </a:p>
+          <a:p>
+            <a:pPr lvl="1"/>
+            <a:endParaRPr lang="en-US" sz="1400" dirty="0"/>
+          </a:p>
+        </p:txBody>
+      </p:sp>
+      <p:sp>
+        <p:nvSpPr>
+          <p:cNvPr id="4" name="Slide Number Placeholder 3">
+            <a:extLst>
+              <a:ext uri="{FF2B5EF4-FFF2-40B4-BE49-F238E27FC236}">
+                <a16:creationId xmlns:a16="http://schemas.microsoft.com/office/drawing/2014/main" id="{A916C694-BD83-42C9-A8AC-D048E61AD071}"/>
+              </a:ext>
+            </a:extLst>
+          </p:cNvPr>
+          <p:cNvSpPr>
+            <a:spLocks noGrp="1"/>
+          </p:cNvSpPr>
+          <p:nvPr>
+            <p:ph type="sldNum" sz="quarter" idx="12"/>
+          </p:nvPr>
+        </p:nvSpPr>
+        <p:spPr/>
+        <p:txBody>
+          <a:bodyPr/>
+          <a:lstStyle/>
+          <a:p>
+            <a:fld id="{EDEBF0BA-A897-4C1E-AB3C-F330808C0E1D}" type="slidenum">
+              <a:rPr lang="en-US" smtClean="0"/>
+              <a:t>26</a:t>
+            </a:fld>
+            <a:endParaRPr lang="en-US"/>
+          </a:p>
+        </p:txBody>
+      </p:sp>
+    </p:spTree>
+    <p:extLst>
+      <p:ext uri="{BB962C8B-B14F-4D97-AF65-F5344CB8AC3E}">
+        <p14:creationId xmlns:p14="http://schemas.microsoft.com/office/powerpoint/2010/main" val="3738534843"/>
+      </p:ext>
+    </p:extLst>
+  </p:cSld>
+  <p:clrMapOvr>
+    <a:masterClrMapping/>
+  </p:clrMapOvr>
+</p:sld>
+</file>
+
+<file path=ppt/slides/slide27.xml><?xml version="1.0" encoding="utf-8"?>
+<p:sld xmlns:a="http://schemas.openxmlformats.org/drawingml/2006/main" xmlns:r="http://schemas.openxmlformats.org/officeDocument/2006/relationships" xmlns:p="http://schemas.openxmlformats.org/presentationml/2006/main">
+  <p:cSld>
+    <p:spTree>
+      <p:nvGrpSpPr>
+        <p:cNvPr id="1" name=""/>
+        <p:cNvGrpSpPr/>
+        <p:nvPr/>
+      </p:nvGrpSpPr>
+      <p:grpSpPr>
+        <a:xfrm>
+          <a:off x="0" y="0"/>
+          <a:ext cx="0" cy="0"/>
+          <a:chOff x="0" y="0"/>
+          <a:chExt cx="0" cy="0"/>
+        </a:xfrm>
+      </p:grpSpPr>
+      <p:sp>
+        <p:nvSpPr>
+          <p:cNvPr id="2" name="Title 1">
+            <a:extLst>
+              <a:ext uri="{FF2B5EF4-FFF2-40B4-BE49-F238E27FC236}">
                 <a16:creationId xmlns:a16="http://schemas.microsoft.com/office/drawing/2014/main" id="{4E9D22A6-D52F-42FB-B419-4D8F5EA420AF}"/>
               </a:ext>
             </a:extLst>
@@ -8117,7 +8306,7 @@
           <a:p>
             <a:fld id="{EDEBF0BA-A897-4C1E-AB3C-F330808C0E1D}" type="slidenum">
               <a:rPr lang="en-US" smtClean="0"/>
-              <a:t>26</a:t>
+              <a:t>27</a:t>
             </a:fld>
             <a:endParaRPr lang="en-US"/>
           </a:p>
@@ -8158,7 +8347,7 @@
           <p:cNvPr id="2" name="Title 1">
             <a:extLst>
               <a:ext uri="{FF2B5EF4-FFF2-40B4-BE49-F238E27FC236}">
-                <a16:creationId xmlns:a16="http://schemas.microsoft.com/office/drawing/2014/main" id="{F1B24BBB-0213-4D00-88F7-E56C4B74D226}"/>
+                <a16:creationId xmlns:a16="http://schemas.microsoft.com/office/drawing/2014/main" id="{D5791037-F5B9-4520-96E0-22E8D64C46FF}"/>
               </a:ext>
             </a:extLst>
           </p:cNvPr>
@@ -8176,7 +8365,7 @@
           <a:p>
             <a:r>
               <a:rPr lang="en-US" dirty="0"/>
-              <a:t>Software Reuse – Good news and bad news</a:t>
+              <a:t>Software Salvage and Reuse</a:t>
             </a:r>
           </a:p>
         </p:txBody>
@@ -8186,7 +8375,7 @@
           <p:cNvPr id="3" name="Content Placeholder 2">
             <a:extLst>
               <a:ext uri="{FF2B5EF4-FFF2-40B4-BE49-F238E27FC236}">
-                <a16:creationId xmlns:a16="http://schemas.microsoft.com/office/drawing/2014/main" id="{FEA0B531-7F0B-4322-A722-D55B7801E94D}"/>
+                <a16:creationId xmlns:a16="http://schemas.microsoft.com/office/drawing/2014/main" id="{491474DF-CCCA-4B65-87ED-1CE7E2998525}"/>
               </a:ext>
             </a:extLst>
           </p:cNvPr>
@@ -8197,98 +8386,65 @@
             <p:ph idx="1"/>
           </p:nvPr>
         </p:nvSpPr>
-        <p:spPr>
-          <a:xfrm>
-            <a:off x="838200" y="1390918"/>
-            <a:ext cx="10515600" cy="4605741"/>
-          </a:xfrm>
-        </p:spPr>
-        <p:txBody>
-          <a:bodyPr/>
-          <a:lstStyle/>
-          <a:p>
-            <a:r>
-              <a:rPr lang="en-US" dirty="0"/>
-              <a:t>Reuse of compiler libraries has been spectacularly successful</a:t>
-            </a:r>
-          </a:p>
-          <a:p>
-            <a:pPr lvl="1"/>
-            <a:r>
-              <a:rPr lang="en-US" dirty="0"/>
-              <a:t>Each language defines a set of libraries that support building projects</a:t>
-            </a:r>
-          </a:p>
-          <a:p>
-            <a:pPr lvl="1"/>
-            <a:r>
-              <a:rPr lang="en-US" dirty="0"/>
-              <a:t>Updated with each new standardization of the language.</a:t>
-            </a:r>
-          </a:p>
-          <a:p>
-            <a:pPr marL="457200" lvl="1" indent="0">
-              <a:buNone/>
-            </a:pPr>
-            <a:r>
-              <a:rPr lang="en-US" sz="300" dirty="0"/>
-              <a:t> </a:t>
-            </a:r>
-            <a:endParaRPr lang="en-US" dirty="0"/>
-          </a:p>
-          <a:p>
-            <a:r>
-              <a:rPr lang="en-US" dirty="0"/>
-              <a:t>Software reuse in the academic, industrial, and commercial domains has been disappointing</a:t>
-            </a:r>
-          </a:p>
-          <a:p>
-            <a:pPr lvl="1"/>
-            <a:r>
-              <a:rPr lang="en-US" dirty="0"/>
-              <a:t>Typical use is:</a:t>
-            </a:r>
-          </a:p>
-          <a:p>
-            <a:pPr lvl="2"/>
-            <a:r>
-              <a:rPr lang="en-US" dirty="0"/>
-              <a:t>Grab the last relevant project(s)</a:t>
-            </a:r>
-          </a:p>
-          <a:p>
-            <a:pPr lvl="2"/>
-            <a:r>
-              <a:rPr lang="en-US" dirty="0"/>
-              <a:t>Attempt to throw away the unneeded parts</a:t>
-            </a:r>
-          </a:p>
-          <a:p>
-            <a:pPr lvl="3"/>
-            <a:r>
-              <a:rPr lang="en-US" dirty="0"/>
-              <a:t>Sometimes we keep unneeded parts because too much breaks if we remove</a:t>
-            </a:r>
-          </a:p>
-          <a:p>
-            <a:pPr lvl="3"/>
-            <a:r>
-              <a:rPr lang="en-US" dirty="0"/>
-              <a:t>That causes maintenance problems</a:t>
-            </a:r>
-          </a:p>
-          <a:p>
-            <a:pPr lvl="2"/>
-            <a:r>
-              <a:rPr lang="en-US" dirty="0"/>
-              <a:t>Add needed new parts</a:t>
-            </a:r>
-          </a:p>
-          <a:p>
-            <a:pPr lvl="2"/>
-            <a:r>
-              <a:rPr lang="en-US" dirty="0"/>
-              <a:t>Spend a lot of time fixing breakage</a:t>
+        <p:spPr/>
+        <p:txBody>
+          <a:bodyPr/>
+          <a:lstStyle/>
+          <a:p>
+            <a:r>
+              <a:rPr lang="en-US" dirty="0"/>
+              <a:t>Software Components</a:t>
+            </a:r>
+          </a:p>
+          <a:p>
+            <a:pPr lvl="1"/>
+            <a:r>
+              <a:rPr lang="en-US" dirty="0"/>
+              <a:t>Software package that has a single purpose, few dependencies, and is useful for building software systems – example: blocking queue</a:t>
+            </a:r>
+          </a:p>
+          <a:p>
+            <a:r>
+              <a:rPr lang="en-US" dirty="0"/>
+              <a:t>Salvage  (good)</a:t>
+            </a:r>
+          </a:p>
+          <a:p>
+            <a:pPr lvl="1"/>
+            <a:r>
+              <a:rPr lang="en-US" dirty="0"/>
+              <a:t>Using an existing component with minor modifications</a:t>
+            </a:r>
+          </a:p>
+          <a:p>
+            <a:pPr lvl="1"/>
+            <a:r>
+              <a:rPr lang="en-US" dirty="0"/>
+              <a:t>That creates another component that must be configured and managed</a:t>
+            </a:r>
+          </a:p>
+          <a:p>
+            <a:r>
+              <a:rPr lang="en-US" dirty="0"/>
+              <a:t>Reuse   (better)</a:t>
+            </a:r>
+          </a:p>
+          <a:p>
+            <a:pPr lvl="1"/>
+            <a:r>
+              <a:rPr lang="en-US" dirty="0"/>
+              <a:t>Reuse an existing component with </a:t>
+            </a:r>
+            <a:r>
+              <a:rPr lang="en-US" b="1" dirty="0"/>
+              <a:t>no modification</a:t>
+            </a:r>
+          </a:p>
+          <a:p>
+            <a:pPr lvl="1"/>
+            <a:r>
+              <a:rPr lang="en-US" dirty="0"/>
+              <a:t>Used by composing, using as template argument, or using as base for derived classes</a:t>
             </a:r>
           </a:p>
         </p:txBody>
@@ -8298,7 +8454,7 @@
           <p:cNvPr id="4" name="Slide Number Placeholder 3">
             <a:extLst>
               <a:ext uri="{FF2B5EF4-FFF2-40B4-BE49-F238E27FC236}">
-                <a16:creationId xmlns:a16="http://schemas.microsoft.com/office/drawing/2014/main" id="{0D37066F-B2B3-4651-BDC8-5D880CC57D1C}"/>
+                <a16:creationId xmlns:a16="http://schemas.microsoft.com/office/drawing/2014/main" id="{B61567BC-F924-41F2-BFB4-D8538334616A}"/>
               </a:ext>
             </a:extLst>
           </p:cNvPr>
@@ -8325,7 +8481,7 @@
     </p:spTree>
     <p:extLst>
       <p:ext uri="{BB962C8B-B14F-4D97-AF65-F5344CB8AC3E}">
-        <p14:creationId xmlns:p14="http://schemas.microsoft.com/office/powerpoint/2010/main" val="2182629184"/>
+        <p14:creationId xmlns:p14="http://schemas.microsoft.com/office/powerpoint/2010/main" val="1570206584"/>
       </p:ext>
     </p:extLst>
   </p:cSld>
@@ -8357,7 +8513,7 @@
           <p:cNvPr id="2" name="Title 1">
             <a:extLst>
               <a:ext uri="{FF2B5EF4-FFF2-40B4-BE49-F238E27FC236}">
-                <a16:creationId xmlns:a16="http://schemas.microsoft.com/office/drawing/2014/main" id="{C58305A8-0765-4D4D-947E-07A379B102BA}"/>
+                <a16:creationId xmlns:a16="http://schemas.microsoft.com/office/drawing/2014/main" id="{F1B24BBB-0213-4D00-88F7-E56C4B74D226}"/>
               </a:ext>
             </a:extLst>
           </p:cNvPr>
@@ -8375,7 +8531,7 @@
           <a:p>
             <a:r>
               <a:rPr lang="en-US" dirty="0"/>
-              <a:t>Supporting Software Reuse</a:t>
+              <a:t>Software Reuse – Good news and bad news</a:t>
             </a:r>
           </a:p>
         </p:txBody>
@@ -8385,7 +8541,7 @@
           <p:cNvPr id="3" name="Content Placeholder 2">
             <a:extLst>
               <a:ext uri="{FF2B5EF4-FFF2-40B4-BE49-F238E27FC236}">
-                <a16:creationId xmlns:a16="http://schemas.microsoft.com/office/drawing/2014/main" id="{78F434FE-1033-4F03-82D7-3C2E4A993410}"/>
+                <a16:creationId xmlns:a16="http://schemas.microsoft.com/office/drawing/2014/main" id="{FEA0B531-7F0B-4322-A722-D55B7801E94D}"/>
               </a:ext>
             </a:extLst>
           </p:cNvPr>
@@ -8396,67 +8552,100 @@
             <p:ph idx="1"/>
           </p:nvPr>
         </p:nvSpPr>
-        <p:spPr/>
-        <p:txBody>
-          <a:bodyPr/>
-          <a:lstStyle/>
-          <a:p>
-            <a:r>
-              <a:rPr lang="en-US" dirty="0"/>
-              <a:t>For reuse a software component should be designed so that reusing in a new project is quicker and easier than creating from scratch</a:t>
-            </a:r>
-          </a:p>
-          <a:p>
-            <a:pPr lvl="1"/>
-            <a:r>
-              <a:rPr lang="en-US" dirty="0"/>
-              <a:t>How to do that is a topic for another story.</a:t>
-            </a:r>
-          </a:p>
-          <a:p>
-            <a:pPr lvl="1"/>
-            <a:r>
-              <a:rPr lang="en-US" dirty="0"/>
-              <a:t>There are many good examples, e.g., the C++ Standard Template Library and Apache </a:t>
-            </a:r>
-            <a:r>
-              <a:rPr lang="en-US" dirty="0" err="1"/>
-              <a:t>HttpComponents</a:t>
-            </a:r>
-            <a:r>
-              <a:rPr lang="en-US" dirty="0"/>
-              <a:t>.</a:t>
-            </a:r>
-          </a:p>
-          <a:p>
-            <a:r>
-              <a:rPr lang="en-US" dirty="0"/>
-              <a:t>Components must be available</a:t>
-            </a:r>
-          </a:p>
-          <a:p>
-            <a:pPr lvl="1"/>
-            <a:r>
-              <a:rPr lang="en-US" dirty="0"/>
-              <a:t>That implies some cloud-based repository</a:t>
-            </a:r>
-          </a:p>
-          <a:p>
-            <a:r>
-              <a:rPr lang="en-US" dirty="0"/>
-              <a:t>Components need to be documented</a:t>
-            </a:r>
-          </a:p>
-          <a:p>
-            <a:pPr lvl="1"/>
-            <a:r>
-              <a:rPr lang="en-US" dirty="0"/>
-              <a:t>Concept, use statement, use examples, design, status</a:t>
-            </a:r>
-          </a:p>
-          <a:p>
+        <p:spPr>
+          <a:xfrm>
+            <a:off x="838200" y="1390918"/>
+            <a:ext cx="10515600" cy="4605741"/>
+          </a:xfrm>
+        </p:spPr>
+        <p:txBody>
+          <a:bodyPr/>
+          <a:lstStyle/>
+          <a:p>
+            <a:r>
+              <a:rPr lang="en-US" dirty="0"/>
+              <a:t>Reuse of compiler libraries has been spectacularly successful</a:t>
+            </a:r>
+          </a:p>
+          <a:p>
+            <a:pPr lvl="1"/>
+            <a:r>
+              <a:rPr lang="en-US" dirty="0"/>
+              <a:t>Each language defines a set of libraries that support building projects</a:t>
+            </a:r>
+          </a:p>
+          <a:p>
+            <a:pPr lvl="1"/>
+            <a:r>
+              <a:rPr lang="en-US" dirty="0"/>
+              <a:t>Updated with each new standardization of the language.</a:t>
+            </a:r>
+          </a:p>
+          <a:p>
+            <a:pPr marL="457200" lvl="1" indent="0">
+              <a:buNone/>
+            </a:pPr>
+            <a:r>
+              <a:rPr lang="en-US" sz="300" dirty="0"/>
+              <a:t> </a:t>
+            </a:r>
             <a:endParaRPr lang="en-US" dirty="0"/>
           </a:p>
+          <a:p>
+            <a:r>
+              <a:rPr lang="en-US" dirty="0"/>
+              <a:t>Software reuse in the academic, industrial, and commercial domains has been disappointing</a:t>
+            </a:r>
+          </a:p>
+          <a:p>
+            <a:pPr lvl="1"/>
+            <a:r>
+              <a:rPr lang="en-US" dirty="0"/>
+              <a:t>Typical use is:</a:t>
+            </a:r>
+          </a:p>
+          <a:p>
+            <a:pPr lvl="2"/>
+            <a:r>
+              <a:rPr lang="en-US" dirty="0"/>
+              <a:t>Grab the last relevant project(s)</a:t>
+            </a:r>
+          </a:p>
+          <a:p>
+            <a:pPr lvl="2"/>
+            <a:r>
+              <a:rPr lang="en-US" dirty="0"/>
+              <a:t>Attempt to throw away the unneeded parts</a:t>
+            </a:r>
+          </a:p>
+          <a:p>
+            <a:pPr lvl="3"/>
+            <a:r>
+              <a:rPr lang="en-US" dirty="0"/>
+              <a:t>Sometimes we keep unneeded parts because too much breaks if we remove</a:t>
+            </a:r>
+          </a:p>
+          <a:p>
+            <a:pPr lvl="3"/>
+            <a:r>
+              <a:rPr lang="en-US" dirty="0"/>
+              <a:t>That causes maintenance problems</a:t>
+            </a:r>
+          </a:p>
+          <a:p>
+            <a:pPr lvl="2"/>
+            <a:r>
+              <a:rPr lang="en-US" dirty="0"/>
+              <a:t>Add needed new parts</a:t>
+            </a:r>
+          </a:p>
+          <a:p>
+            <a:pPr lvl="2"/>
+            <a:r>
+              <a:rPr lang="en-US" dirty="0"/>
+              <a:t>Spend a lot of time fixing breakage</a:t>
+            </a:r>
+          </a:p>
         </p:txBody>
       </p:sp>
       <p:sp>
@@ -8464,7 +8653,7 @@
           <p:cNvPr id="4" name="Slide Number Placeholder 3">
             <a:extLst>
               <a:ext uri="{FF2B5EF4-FFF2-40B4-BE49-F238E27FC236}">
-                <a16:creationId xmlns:a16="http://schemas.microsoft.com/office/drawing/2014/main" id="{CEF10F0C-76D1-407A-A933-1C1B4B685E21}"/>
+                <a16:creationId xmlns:a16="http://schemas.microsoft.com/office/drawing/2014/main" id="{0D37066F-B2B3-4651-BDC8-5D880CC57D1C}"/>
               </a:ext>
             </a:extLst>
           </p:cNvPr>
@@ -8491,7 +8680,7 @@
     </p:spTree>
     <p:extLst>
       <p:ext uri="{BB962C8B-B14F-4D97-AF65-F5344CB8AC3E}">
-        <p14:creationId xmlns:p14="http://schemas.microsoft.com/office/powerpoint/2010/main" val="3382765793"/>
+        <p14:creationId xmlns:p14="http://schemas.microsoft.com/office/powerpoint/2010/main" val="2182629184"/>
       </p:ext>
     </p:extLst>
   </p:cSld>
@@ -8746,7 +8935,7 @@
           <p:cNvPr id="2" name="Title 1">
             <a:extLst>
               <a:ext uri="{FF2B5EF4-FFF2-40B4-BE49-F238E27FC236}">
-                <a16:creationId xmlns:a16="http://schemas.microsoft.com/office/drawing/2014/main" id="{79DD350B-D16A-4094-A81A-3C2D95DE90DB}"/>
+                <a16:creationId xmlns:a16="http://schemas.microsoft.com/office/drawing/2014/main" id="{C58305A8-0765-4D4D-947E-07A379B102BA}"/>
               </a:ext>
             </a:extLst>
           </p:cNvPr>
@@ -8757,19 +8946,14 @@
             <p:ph type="title"/>
           </p:nvPr>
         </p:nvSpPr>
-        <p:spPr>
-          <a:xfrm>
-            <a:off x="838200" y="339367"/>
-            <a:ext cx="10515600" cy="736019"/>
-          </a:xfrm>
-        </p:spPr>
-        <p:txBody>
-          <a:bodyPr/>
-          <a:lstStyle/>
-          <a:p>
-            <a:r>
-              <a:rPr lang="en-US" dirty="0"/>
-              <a:t>Prologue</a:t>
+        <p:spPr/>
+        <p:txBody>
+          <a:bodyPr/>
+          <a:lstStyle/>
+          <a:p>
+            <a:r>
+              <a:rPr lang="en-US" dirty="0"/>
+              <a:t>Supporting Software Reuse</a:t>
             </a:r>
           </a:p>
         </p:txBody>
@@ -8779,7 +8963,7 @@
           <p:cNvPr id="3" name="Content Placeholder 2">
             <a:extLst>
               <a:ext uri="{FF2B5EF4-FFF2-40B4-BE49-F238E27FC236}">
-                <a16:creationId xmlns:a16="http://schemas.microsoft.com/office/drawing/2014/main" id="{91B37E16-8559-4302-8066-83892DD70A2C}"/>
+                <a16:creationId xmlns:a16="http://schemas.microsoft.com/office/drawing/2014/main" id="{78F434FE-1033-4F03-82D7-3C2E4A993410}"/>
               </a:ext>
             </a:extLst>
           </p:cNvPr>
@@ -8790,92 +8974,67 @@
             <p:ph idx="1"/>
           </p:nvPr>
         </p:nvSpPr>
-        <p:spPr>
-          <a:xfrm>
-            <a:off x="838200" y="1326523"/>
-            <a:ext cx="10515600" cy="4605741"/>
-          </a:xfrm>
-        </p:spPr>
-        <p:txBody>
-          <a:bodyPr/>
-          <a:lstStyle/>
-          <a:p>
-            <a:r>
-              <a:rPr lang="en-US" dirty="0"/>
-              <a:t>This is a presentation of goals and features of a website designed to publish source code in support of software reuse.</a:t>
-            </a:r>
-          </a:p>
-          <a:p>
-            <a:pPr lvl="1"/>
-            <a:r>
-              <a:rPr lang="en-US" dirty="0">
-                <a:hlinkClick r:id="rId2"/>
-              </a:rPr>
-              <a:t>https://JimFawcett.github.io</a:t>
-            </a:r>
-            <a:r>
-              <a:rPr lang="en-US" dirty="0"/>
-              <a:t>                     </a:t>
-            </a:r>
-            <a:r>
-              <a:rPr lang="en-US" dirty="0">
-                <a:solidFill>
-                  <a:srgbClr val="C00000"/>
-                </a:solidFill>
-              </a:rPr>
-              <a:t>Take a quick tour</a:t>
-            </a:r>
-            <a:br>
-              <a:rPr lang="en-US" dirty="0"/>
-            </a:br>
-            <a:r>
-              <a:rPr lang="en-US" sz="400" dirty="0"/>
-              <a:t> </a:t>
-            </a:r>
+        <p:spPr/>
+        <p:txBody>
+          <a:bodyPr/>
+          <a:lstStyle/>
+          <a:p>
+            <a:r>
+              <a:rPr lang="en-US" dirty="0"/>
+              <a:t>For reuse a software component should be designed so that reusing in a new project is quicker and easier than creating from scratch</a:t>
+            </a:r>
+          </a:p>
+          <a:p>
+            <a:pPr lvl="1"/>
+            <a:r>
+              <a:rPr lang="en-US" dirty="0"/>
+              <a:t>How to do that is a topic for another story.</a:t>
+            </a:r>
+          </a:p>
+          <a:p>
+            <a:pPr lvl="1"/>
+            <a:r>
+              <a:rPr lang="en-US" dirty="0"/>
+              <a:t>There are many good examples, e.g., the C++ Standard Template Library and Apache </a:t>
+            </a:r>
+            <a:r>
+              <a:rPr lang="en-US" dirty="0" err="1"/>
+              <a:t>HttpComponents</a:t>
+            </a:r>
+            <a:r>
+              <a:rPr lang="en-US" dirty="0"/>
+              <a:t>.</a:t>
+            </a:r>
+          </a:p>
+          <a:p>
+            <a:r>
+              <a:rPr lang="en-US" dirty="0"/>
+              <a:t>Components must be available</a:t>
+            </a:r>
+          </a:p>
+          <a:p>
+            <a:pPr lvl="1"/>
+            <a:r>
+              <a:rPr lang="en-US" dirty="0"/>
+              <a:t>That implies some cloud-based repository</a:t>
+            </a:r>
+          </a:p>
+          <a:p>
+            <a:r>
+              <a:rPr lang="en-US" dirty="0"/>
+              <a:t>Components need to be documented</a:t>
+            </a:r>
+          </a:p>
+          <a:p>
+            <a:pPr lvl="1"/>
+            <a:r>
+              <a:rPr lang="en-US" dirty="0"/>
+              <a:t>Concept, use statement, use examples, design, status</a:t>
+            </a:r>
+          </a:p>
+          <a:p>
             <a:endParaRPr lang="en-US" dirty="0"/>
           </a:p>
-          <a:p>
-            <a:endParaRPr lang="en-US" sz="100" dirty="0"/>
-          </a:p>
-          <a:p>
-            <a:r>
-              <a:rPr lang="en-US" dirty="0"/>
-              <a:t>The site is a second-generation facility based on experience with an academic website:</a:t>
-            </a:r>
-          </a:p>
-          <a:p>
-            <a:pPr lvl="1"/>
-            <a:r>
-              <a:rPr lang="en-US" dirty="0">
-                <a:hlinkClick r:id="rId3"/>
-              </a:rPr>
-              <a:t>https://ecs.syr.edu/faculty/fawcett/handouts/Webpages/fawcettHome.htm</a:t>
-            </a:r>
-            <a:endParaRPr lang="en-US" dirty="0"/>
-          </a:p>
-          <a:p>
-            <a:endParaRPr lang="en-US" sz="800" dirty="0"/>
-          </a:p>
-          <a:p>
-            <a:r>
-              <a:rPr lang="en-US" dirty="0"/>
-              <a:t>I used that site for graduate software design courses taught at Syracuse University for many years.</a:t>
-            </a:r>
-          </a:p>
-          <a:p>
-            <a:pPr lvl="1"/>
-            <a:r>
-              <a:rPr lang="en-US" dirty="0"/>
-              <a:t>Published lecture content</a:t>
-            </a:r>
-          </a:p>
-          <a:p>
-            <a:pPr lvl="1"/>
-            <a:r>
-              <a:rPr lang="en-US" dirty="0"/>
-              <a:t>Provided access to code components students used for class projects</a:t>
-            </a:r>
-          </a:p>
         </p:txBody>
       </p:sp>
       <p:sp>
@@ -8883,7 +9042,7 @@
           <p:cNvPr id="4" name="Slide Number Placeholder 3">
             <a:extLst>
               <a:ext uri="{FF2B5EF4-FFF2-40B4-BE49-F238E27FC236}">
-                <a16:creationId xmlns:a16="http://schemas.microsoft.com/office/drawing/2014/main" id="{FFFF6527-161D-42F8-9DD6-F507EB23272D}"/>
+                <a16:creationId xmlns:a16="http://schemas.microsoft.com/office/drawing/2014/main" id="{CEF10F0C-76D1-407A-A933-1C1B4B685E21}"/>
               </a:ext>
             </a:extLst>
           </p:cNvPr>
@@ -8907,59 +9066,10 @@
           </a:p>
         </p:txBody>
       </p:sp>
-      <p:sp>
-        <p:nvSpPr>
-          <p:cNvPr id="5" name="Arrow: Right 4">
-            <a:extLst>
-              <a:ext uri="{FF2B5EF4-FFF2-40B4-BE49-F238E27FC236}">
-                <a16:creationId xmlns:a16="http://schemas.microsoft.com/office/drawing/2014/main" id="{53500758-6ED7-4CC5-A406-4AF82428612F}"/>
-              </a:ext>
-            </a:extLst>
-          </p:cNvPr>
-          <p:cNvSpPr/>
-          <p:nvPr/>
-        </p:nvSpPr>
-        <p:spPr>
-          <a:xfrm rot="10800000">
-            <a:off x="5531476" y="2253803"/>
-            <a:ext cx="759854" cy="244698"/>
-          </a:xfrm>
-          <a:prstGeom prst="rightArrow">
-            <a:avLst/>
-          </a:prstGeom>
-          <a:solidFill>
-            <a:srgbClr val="C00000"/>
-          </a:solidFill>
-        </p:spPr>
-        <p:style>
-          <a:lnRef idx="2">
-            <a:schemeClr val="accent1">
-              <a:shade val="50000"/>
-            </a:schemeClr>
-          </a:lnRef>
-          <a:fillRef idx="1">
-            <a:schemeClr val="accent1"/>
-          </a:fillRef>
-          <a:effectRef idx="0">
-            <a:schemeClr val="accent1"/>
-          </a:effectRef>
-          <a:fontRef idx="minor">
-            <a:schemeClr val="lt1"/>
-          </a:fontRef>
-        </p:style>
-        <p:txBody>
-          <a:bodyPr rtlCol="0" anchor="ctr"/>
-          <a:lstStyle/>
-          <a:p>
-            <a:pPr algn="ctr"/>
-            <a:endParaRPr lang="en-US"/>
-          </a:p>
-        </p:txBody>
-      </p:sp>
     </p:spTree>
     <p:extLst>
       <p:ext uri="{BB962C8B-B14F-4D97-AF65-F5344CB8AC3E}">
-        <p14:creationId xmlns:p14="http://schemas.microsoft.com/office/powerpoint/2010/main" val="3203741197"/>
+        <p14:creationId xmlns:p14="http://schemas.microsoft.com/office/powerpoint/2010/main" val="3382765793"/>
       </p:ext>
     </p:extLst>
   </p:cSld>
@@ -9009,7 +9119,7 @@
           <a:p>
             <a:r>
               <a:rPr lang="en-US" dirty="0"/>
-              <a:t>Publishing Code for (Re)use</a:t>
+              <a:t>Publishing Code Components for (Re)use</a:t>
             </a:r>
           </a:p>
         </p:txBody>
@@ -9392,7 +9502,7 @@
           <p:cNvPr id="2" name="Title 1">
             <a:extLst>
               <a:ext uri="{FF2B5EF4-FFF2-40B4-BE49-F238E27FC236}">
-                <a16:creationId xmlns:a16="http://schemas.microsoft.com/office/drawing/2014/main" id="{B5D3CA25-160B-4B16-981E-1259FF9C54AA}"/>
+                <a16:creationId xmlns:a16="http://schemas.microsoft.com/office/drawing/2014/main" id="{79DD350B-D16A-4094-A81A-3C2D95DE90DB}"/>
               </a:ext>
             </a:extLst>
           </p:cNvPr>
@@ -9403,14 +9513,19 @@
             <p:ph type="title"/>
           </p:nvPr>
         </p:nvSpPr>
-        <p:spPr/>
-        <p:txBody>
-          <a:bodyPr/>
-          <a:lstStyle/>
-          <a:p>
-            <a:r>
-              <a:rPr lang="en-US" dirty="0"/>
-              <a:t>Website for Publishing Reusable Components</a:t>
+        <p:spPr>
+          <a:xfrm>
+            <a:off x="838200" y="339367"/>
+            <a:ext cx="10515600" cy="736019"/>
+          </a:xfrm>
+        </p:spPr>
+        <p:txBody>
+          <a:bodyPr/>
+          <a:lstStyle/>
+          <a:p>
+            <a:r>
+              <a:rPr lang="en-US" dirty="0"/>
+              <a:t>Story Prologue</a:t>
             </a:r>
           </a:p>
         </p:txBody>
@@ -9420,7 +9535,7 @@
           <p:cNvPr id="3" name="Content Placeholder 2">
             <a:extLst>
               <a:ext uri="{FF2B5EF4-FFF2-40B4-BE49-F238E27FC236}">
-                <a16:creationId xmlns:a16="http://schemas.microsoft.com/office/drawing/2014/main" id="{51D4E0A7-5491-48A3-8C75-90DDBA9ED838}"/>
+                <a16:creationId xmlns:a16="http://schemas.microsoft.com/office/drawing/2014/main" id="{91B37E16-8559-4302-8066-83892DD70A2C}"/>
               </a:ext>
             </a:extLst>
           </p:cNvPr>
@@ -9431,99 +9546,90 @@
             <p:ph idx="1"/>
           </p:nvPr>
         </p:nvSpPr>
-        <p:spPr/>
-        <p:txBody>
-          <a:bodyPr/>
-          <a:lstStyle/>
-          <a:p>
-            <a:r>
-              <a:rPr lang="en-US" dirty="0"/>
-              <a:t>A site for publishing source code will need:</a:t>
-            </a:r>
-          </a:p>
-          <a:p>
-            <a:pPr lvl="1"/>
-            <a:r>
-              <a:rPr lang="en-US" dirty="0"/>
-              <a:t>A structure for holding organized collections of code</a:t>
-            </a:r>
-          </a:p>
-          <a:p>
-            <a:pPr lvl="1"/>
-            <a:r>
-              <a:rPr lang="en-US" dirty="0"/>
-              <a:t>An intuitive navigation process to </a:t>
-            </a:r>
-            <a:r>
-              <a:rPr lang="en-US"/>
-              <a:t>find specific code </a:t>
-            </a:r>
-            <a:r>
-              <a:rPr lang="en-US" dirty="0"/>
-              <a:t>and resources</a:t>
-            </a:r>
-          </a:p>
-          <a:p>
-            <a:pPr lvl="1"/>
-            <a:r>
-              <a:rPr lang="en-US" dirty="0"/>
-              <a:t>Documentation for each component</a:t>
-            </a:r>
-          </a:p>
-          <a:p>
-            <a:pPr lvl="2"/>
-            <a:r>
-              <a:rPr lang="en-US" dirty="0"/>
-              <a:t>Concept, Design, Usage, Status</a:t>
-            </a:r>
-          </a:p>
-          <a:p>
-            <a:pPr lvl="1"/>
-            <a:r>
-              <a:rPr lang="en-US" dirty="0"/>
-              <a:t>Additional resources to help users understand relevant technologies</a:t>
-            </a:r>
-          </a:p>
-          <a:p>
-            <a:pPr lvl="2"/>
-            <a:r>
-              <a:rPr lang="en-US" dirty="0"/>
-              <a:t>Language and platform references</a:t>
-            </a:r>
-          </a:p>
-          <a:p>
-            <a:pPr lvl="2"/>
-            <a:r>
-              <a:rPr lang="en-US" dirty="0"/>
-              <a:t>Brief code snapshots with commentary, provided as webpages</a:t>
-            </a:r>
-          </a:p>
-          <a:p>
-            <a:pPr lvl="2"/>
-            <a:r>
-              <a:rPr lang="en-US" dirty="0"/>
-              <a:t>Related blogs and opinion pieces</a:t>
-            </a:r>
-          </a:p>
-          <a:p>
-            <a:pPr lvl="2"/>
-            <a:r>
-              <a:rPr lang="en-US" dirty="0"/>
-              <a:t>Code standards</a:t>
-            </a:r>
-          </a:p>
-          <a:p>
-            <a:pPr lvl="1"/>
-            <a:r>
-              <a:rPr lang="en-US" dirty="0"/>
-              <a:t>Stories and Videos</a:t>
-            </a:r>
-          </a:p>
-          <a:p>
-            <a:pPr lvl="2"/>
-            <a:r>
-              <a:rPr lang="en-US" dirty="0"/>
-              <a:t>Discussions, each focused on a single theme</a:t>
+        <p:spPr>
+          <a:xfrm>
+            <a:off x="838200" y="1326523"/>
+            <a:ext cx="10515600" cy="4605741"/>
+          </a:xfrm>
+        </p:spPr>
+        <p:txBody>
+          <a:bodyPr/>
+          <a:lstStyle/>
+          <a:p>
+            <a:r>
+              <a:rPr lang="en-US" dirty="0"/>
+              <a:t>This is a presentation of goals and features of a website designed to publish source code in support of software reuse.</a:t>
+            </a:r>
+          </a:p>
+          <a:p>
+            <a:pPr lvl="1"/>
+            <a:r>
+              <a:rPr lang="en-US" dirty="0">
+                <a:hlinkClick r:id="rId2"/>
+              </a:rPr>
+              <a:t>https://JimFawcett.github.io</a:t>
+            </a:r>
+            <a:r>
+              <a:rPr lang="en-US" dirty="0"/>
+              <a:t>                     </a:t>
+            </a:r>
+            <a:r>
+              <a:rPr lang="en-US" dirty="0">
+                <a:solidFill>
+                  <a:srgbClr val="C00000"/>
+                </a:solidFill>
+              </a:rPr>
+              <a:t>Take a quick tour</a:t>
+            </a:r>
+            <a:br>
+              <a:rPr lang="en-US" dirty="0"/>
+            </a:br>
+            <a:r>
+              <a:rPr lang="en-US" sz="400" dirty="0"/>
+              <a:t> </a:t>
+            </a:r>
+            <a:endParaRPr lang="en-US" dirty="0"/>
+          </a:p>
+          <a:p>
+            <a:endParaRPr lang="en-US" sz="100" dirty="0"/>
+          </a:p>
+          <a:p>
+            <a:r>
+              <a:rPr lang="en-US" dirty="0"/>
+              <a:t>The site is a second-generation facility based on experience with an academic website:</a:t>
+            </a:r>
+          </a:p>
+          <a:p>
+            <a:pPr lvl="1"/>
+            <a:r>
+              <a:rPr lang="en-US" dirty="0">
+                <a:hlinkClick r:id="rId3"/>
+              </a:rPr>
+              <a:t>https://ecs.syr.edu/faculty/fawcett/handouts/Webpages/fawcettHome.htm</a:t>
+            </a:r>
+            <a:endParaRPr lang="en-US" dirty="0"/>
+          </a:p>
+          <a:p>
+            <a:endParaRPr lang="en-US" sz="800" dirty="0"/>
+          </a:p>
+          <a:p>
+            <a:r>
+              <a:rPr lang="en-US" dirty="0"/>
+              <a:t>I used that site for graduate software design courses taught at Syracuse University for many years.</a:t>
+            </a:r>
+          </a:p>
+          <a:p>
+            <a:pPr lvl="1"/>
+            <a:r>
+              <a:rPr lang="en-US" dirty="0"/>
+              <a:t>Published lecture content</a:t>
+            </a:r>
+          </a:p>
+          <a:p>
+            <a:pPr lvl="1"/>
+            <a:r>
+              <a:rPr lang="en-US" dirty="0"/>
+              <a:t>Provided access to code components students used for class projects</a:t>
             </a:r>
           </a:p>
         </p:txBody>
@@ -9533,7 +9639,7 @@
           <p:cNvPr id="4" name="Slide Number Placeholder 3">
             <a:extLst>
               <a:ext uri="{FF2B5EF4-FFF2-40B4-BE49-F238E27FC236}">
-                <a16:creationId xmlns:a16="http://schemas.microsoft.com/office/drawing/2014/main" id="{B5E8AE43-7C82-414E-9C86-9D3337400307}"/>
+                <a16:creationId xmlns:a16="http://schemas.microsoft.com/office/drawing/2014/main" id="{FFFF6527-161D-42F8-9DD6-F507EB23272D}"/>
               </a:ext>
             </a:extLst>
           </p:cNvPr>
@@ -9557,10 +9663,59 @@
           </a:p>
         </p:txBody>
       </p:sp>
+      <p:sp>
+        <p:nvSpPr>
+          <p:cNvPr id="5" name="Arrow: Right 4">
+            <a:extLst>
+              <a:ext uri="{FF2B5EF4-FFF2-40B4-BE49-F238E27FC236}">
+                <a16:creationId xmlns:a16="http://schemas.microsoft.com/office/drawing/2014/main" id="{53500758-6ED7-4CC5-A406-4AF82428612F}"/>
+              </a:ext>
+            </a:extLst>
+          </p:cNvPr>
+          <p:cNvSpPr/>
+          <p:nvPr/>
+        </p:nvSpPr>
+        <p:spPr>
+          <a:xfrm rot="10800000">
+            <a:off x="5531476" y="2253803"/>
+            <a:ext cx="759854" cy="244698"/>
+          </a:xfrm>
+          <a:prstGeom prst="rightArrow">
+            <a:avLst/>
+          </a:prstGeom>
+          <a:solidFill>
+            <a:srgbClr val="C00000"/>
+          </a:solidFill>
+        </p:spPr>
+        <p:style>
+          <a:lnRef idx="2">
+            <a:schemeClr val="accent1">
+              <a:shade val="50000"/>
+            </a:schemeClr>
+          </a:lnRef>
+          <a:fillRef idx="1">
+            <a:schemeClr val="accent1"/>
+          </a:fillRef>
+          <a:effectRef idx="0">
+            <a:schemeClr val="accent1"/>
+          </a:effectRef>
+          <a:fontRef idx="minor">
+            <a:schemeClr val="lt1"/>
+          </a:fontRef>
+        </p:style>
+        <p:txBody>
+          <a:bodyPr rtlCol="0" anchor="ctr"/>
+          <a:lstStyle/>
+          <a:p>
+            <a:pPr algn="ctr"/>
+            <a:endParaRPr lang="en-US"/>
+          </a:p>
+        </p:txBody>
+      </p:sp>
     </p:spTree>
     <p:extLst>
       <p:ext uri="{BB962C8B-B14F-4D97-AF65-F5344CB8AC3E}">
-        <p14:creationId xmlns:p14="http://schemas.microsoft.com/office/powerpoint/2010/main" val="3990487094"/>
+        <p14:creationId xmlns:p14="http://schemas.microsoft.com/office/powerpoint/2010/main" val="3203741197"/>
       </p:ext>
     </p:extLst>
   </p:cSld>

</xml_diff>

<commit_message>
added link to Experiments page
</commit_message>
<xml_diff>
--- a/Resources/PublishingSourceCode.pptx
+++ b/Resources/PublishingSourceCode.pptx
@@ -5731,23 +5731,41 @@
             <p:ph type="title"/>
           </p:nvPr>
         </p:nvSpPr>
-        <p:spPr/>
-        <p:txBody>
-          <a:bodyPr/>
-          <a:lstStyle/>
-          <a:p>
-            <a:r>
-              <a:rPr lang="en-US" dirty="0"/>
-              <a:t>Experiments  </a:t>
-            </a:r>
-            <a:r>
-              <a:rPr lang="en-US" sz="2800" dirty="0">
+        <p:spPr>
+          <a:xfrm>
+            <a:off x="838200" y="300731"/>
+            <a:ext cx="10515600" cy="1276932"/>
+          </a:xfrm>
+        </p:spPr>
+        <p:txBody>
+          <a:bodyPr/>
+          <a:lstStyle/>
+          <a:p>
+            <a:r>
+              <a:rPr lang="en-US" dirty="0"/>
+              <a:t>Experiments</a:t>
+            </a:r>
+            <a:br>
+              <a:rPr lang="en-US" dirty="0"/>
+            </a:br>
+            <a:r>
+              <a:rPr lang="en-US" sz="2400" dirty="0">
                 <a:hlinkClick r:id="rId2"/>
               </a:rPr>
+              <a:t>https://JimFawcett.github.io/Tests.html</a:t>
+            </a:r>
+            <a:r>
+              <a:rPr lang="en-US" sz="2400" dirty="0"/>
+              <a:t>,   </a:t>
+            </a:r>
+            <a:r>
+              <a:rPr lang="en-US" sz="2400" dirty="0">
+                <a:hlinkClick r:id="rId3"/>
+              </a:rPr>
               <a:t>https://JimFawcett.github.io/SiteStory_4.html</a:t>
             </a:r>
             <a:r>
-              <a:rPr lang="en-US" sz="2800" dirty="0"/>
+              <a:rPr lang="en-US" sz="2400" dirty="0"/>
               <a:t> </a:t>
             </a:r>
             <a:endParaRPr lang="en-US" dirty="0"/>
@@ -5772,93 +5790,95 @@
         </p:nvSpPr>
         <p:spPr>
           <a:xfrm>
-            <a:off x="838200" y="1435994"/>
+            <a:off x="838200" y="1909213"/>
             <a:ext cx="10515600" cy="4605741"/>
           </a:xfrm>
         </p:spPr>
         <p:txBody>
-          <a:bodyPr/>
-          <a:lstStyle/>
-          <a:p>
-            <a:r>
-              <a:rPr lang="en-US" dirty="0"/>
+          <a:bodyPr>
+            <a:noAutofit/>
+          </a:bodyPr>
+          <a:lstStyle/>
+          <a:p>
+            <a:r>
+              <a:rPr lang="en-US" sz="2400" dirty="0"/>
               <a:t>Experiments to make the site’s publishing process more effective are continuing:</a:t>
             </a:r>
           </a:p>
           <a:p>
             <a:pPr lvl="1"/>
             <a:r>
-              <a:rPr lang="en-US" dirty="0"/>
+              <a:rPr lang="en-US" sz="2000" dirty="0"/>
               <a:t>Developing UI widgets to use webpage real estate effectively</a:t>
             </a:r>
           </a:p>
           <a:p>
             <a:pPr lvl="2"/>
             <a:r>
-              <a:rPr lang="en-US" dirty="0"/>
+              <a:rPr lang="en-US" sz="1800" dirty="0"/>
               <a:t>User driven diagram resizer</a:t>
             </a:r>
           </a:p>
           <a:p>
             <a:pPr lvl="2"/>
             <a:r>
-              <a:rPr lang="en-US" dirty="0"/>
+              <a:rPr lang="en-US" sz="1800" dirty="0"/>
               <a:t>Slide-in panels</a:t>
             </a:r>
           </a:p>
           <a:p>
             <a:pPr lvl="2"/>
             <a:r>
-              <a:rPr lang="en-US" dirty="0"/>
+              <a:rPr lang="en-US" sz="1800" dirty="0"/>
               <a:t>Slide show</a:t>
             </a:r>
           </a:p>
           <a:p>
             <a:pPr lvl="2"/>
             <a:r>
-              <a:rPr lang="en-US" dirty="0"/>
+              <a:rPr lang="en-US" sz="1800" dirty="0"/>
               <a:t>Code blocks for presentation</a:t>
             </a:r>
           </a:p>
           <a:p>
             <a:pPr lvl="2"/>
             <a:r>
-              <a:rPr lang="en-US" dirty="0"/>
+              <a:rPr lang="en-US" sz="1800" dirty="0"/>
               <a:t>Photo styling</a:t>
             </a:r>
           </a:p>
           <a:p>
             <a:pPr lvl="1"/>
             <a:r>
-              <a:rPr lang="en-US" dirty="0"/>
+              <a:rPr lang="en-US" sz="2000" dirty="0"/>
               <a:t>Navigation schemes</a:t>
             </a:r>
           </a:p>
           <a:p>
             <a:pPr lvl="2"/>
             <a:r>
-              <a:rPr lang="en-US" dirty="0"/>
+              <a:rPr lang="en-US" sz="1800" dirty="0"/>
               <a:t>Dropdown menus</a:t>
             </a:r>
           </a:p>
           <a:p>
             <a:pPr lvl="2"/>
             <a:r>
-              <a:rPr lang="en-US" dirty="0"/>
+              <a:rPr lang="en-US" sz="1800" dirty="0"/>
               <a:t>Page sequences (defined by hidden links)</a:t>
             </a:r>
           </a:p>
           <a:p>
             <a:pPr lvl="2"/>
             <a:r>
-              <a:rPr lang="en-US" dirty="0"/>
+              <a:rPr lang="en-US" sz="1800" dirty="0"/>
               <a:t>Navigation buttons and key presses</a:t>
             </a:r>
           </a:p>
           <a:p>
             <a:pPr lvl="1"/>
             <a:r>
-              <a:rPr lang="en-US" dirty="0"/>
+              <a:rPr lang="en-US" sz="2000" dirty="0"/>
               <a:t>Continuing to think about site organization schemes</a:t>
             </a:r>
           </a:p>

</xml_diff>

<commit_message>
reordered slides, tweaked text
</commit_message>
<xml_diff>
--- a/Resources/PublishingSourceCode.pptx
+++ b/Resources/PublishingSourceCode.pptx
@@ -14,9 +14,9 @@
     <p:sldId id="272" r:id="rId5"/>
     <p:sldId id="260" r:id="rId6"/>
     <p:sldId id="281" r:id="rId7"/>
-    <p:sldId id="258" r:id="rId8"/>
-    <p:sldId id="257" r:id="rId9"/>
-    <p:sldId id="280" r:id="rId10"/>
+    <p:sldId id="280" r:id="rId8"/>
+    <p:sldId id="258" r:id="rId9"/>
+    <p:sldId id="257" r:id="rId10"/>
     <p:sldId id="267" r:id="rId11"/>
     <p:sldId id="259" r:id="rId12"/>
     <p:sldId id="268" r:id="rId13"/>
@@ -592,7 +592,7 @@
           <a:p>
             <a:fld id="{4F090570-C106-4FBC-AEF5-5C270F494E9C}" type="slidenum">
               <a:rPr lang="en-US" smtClean="0"/>
-              <a:t>8</a:t>
+              <a:t>9</a:t>
             </a:fld>
             <a:endParaRPr lang="en-US"/>
           </a:p>
@@ -3992,7 +3992,12 @@
             <p:ph idx="1"/>
           </p:nvPr>
         </p:nvSpPr>
-        <p:spPr/>
+        <p:spPr>
+          <a:xfrm>
+            <a:off x="838200" y="1474631"/>
+            <a:ext cx="10515600" cy="4605741"/>
+          </a:xfrm>
+        </p:spPr>
         <p:txBody>
           <a:bodyPr/>
           <a:lstStyle/>
@@ -4013,15 +4018,7 @@
             <a:pPr lvl="1"/>
             <a:r>
               <a:rPr lang="en-US" dirty="0"/>
-              <a:t>An intuitive navigation process to </a:t>
-            </a:r>
-            <a:r>
-              <a:rPr lang="en-US"/>
-              <a:t>find specific code </a:t>
-            </a:r>
-            <a:r>
-              <a:rPr lang="en-US" dirty="0"/>
-              <a:t>and resources</a:t>
+              <a:t>An intuitive navigation process to find specific code and resources</a:t>
             </a:r>
           </a:p>
           <a:p>
@@ -5565,7 +5562,7 @@
             <a:pPr lvl="2"/>
             <a:r>
               <a:rPr lang="en-US" sz="1800" dirty="0"/>
-              <a:t>Standards components must meet to become candidates</a:t>
+              <a:t>Standards – brief statements - components must meet to become candidates</a:t>
             </a:r>
           </a:p>
           <a:p>
@@ -5961,8 +5958,8 @@
         </p:nvSpPr>
         <p:spPr>
           <a:xfrm>
-            <a:off x="838200" y="365125"/>
-            <a:ext cx="5257800" cy="1325563"/>
+            <a:off x="838200" y="365126"/>
+            <a:ext cx="5257800" cy="806852"/>
           </a:xfrm>
         </p:spPr>
         <p:txBody>
@@ -5996,8 +5993,8 @@
         </p:nvSpPr>
         <p:spPr>
           <a:xfrm>
-            <a:off x="767371" y="1603420"/>
-            <a:ext cx="5181600" cy="4573543"/>
+            <a:off x="709414" y="1345843"/>
+            <a:ext cx="5181600" cy="4856864"/>
           </a:xfrm>
         </p:spPr>
         <p:txBody>
@@ -6103,8 +6100,8 @@
         </p:nvSpPr>
         <p:spPr>
           <a:xfrm>
-            <a:off x="6096000" y="1629163"/>
-            <a:ext cx="5296434" cy="5455746"/>
+            <a:off x="6096000" y="1345843"/>
+            <a:ext cx="5296434" cy="5739066"/>
           </a:xfrm>
         </p:spPr>
         <p:txBody>
@@ -6563,13 +6560,7 @@
           <a:p>
             <a:r>
               <a:rPr lang="en-US" dirty="0"/>
-              <a:t>Reuse Prologue</a:t>
-            </a:r>
-          </a:p>
-          <a:p>
-            <a:r>
-              <a:rPr lang="en-US" dirty="0"/>
-              <a:t>Website Structure</a:t>
+              <a:t>Repository Structure</a:t>
             </a:r>
           </a:p>
           <a:p>
@@ -8406,65 +8397,92 @@
             <p:ph idx="1"/>
           </p:nvPr>
         </p:nvSpPr>
-        <p:spPr/>
-        <p:txBody>
-          <a:bodyPr/>
-          <a:lstStyle/>
-          <a:p>
-            <a:r>
-              <a:rPr lang="en-US" dirty="0"/>
+        <p:spPr>
+          <a:xfrm>
+            <a:off x="838200" y="1493949"/>
+            <a:ext cx="10515600" cy="4605741"/>
+          </a:xfrm>
+        </p:spPr>
+        <p:txBody>
+          <a:bodyPr>
+            <a:normAutofit/>
+          </a:bodyPr>
+          <a:lstStyle/>
+          <a:p>
+            <a:r>
+              <a:rPr lang="en-US" sz="2400" dirty="0"/>
               <a:t>Software Components</a:t>
             </a:r>
           </a:p>
           <a:p>
             <a:pPr lvl="1"/>
             <a:r>
-              <a:rPr lang="en-US" dirty="0"/>
+              <a:rPr lang="en-US" sz="2000" dirty="0"/>
               <a:t>Software package that has a single purpose, few dependencies, and is useful for building software systems – example: blocking queue</a:t>
             </a:r>
           </a:p>
           <a:p>
             <a:r>
-              <a:rPr lang="en-US" dirty="0"/>
+              <a:rPr lang="en-US" sz="2400" dirty="0"/>
               <a:t>Salvage  (good)</a:t>
             </a:r>
           </a:p>
           <a:p>
             <a:pPr lvl="1"/>
             <a:r>
-              <a:rPr lang="en-US" dirty="0"/>
-              <a:t>Using an existing component with minor modifications</a:t>
-            </a:r>
-          </a:p>
-          <a:p>
-            <a:pPr lvl="1"/>
-            <a:r>
-              <a:rPr lang="en-US" dirty="0"/>
-              <a:t>That creates another component that must be configured and managed</a:t>
-            </a:r>
-          </a:p>
-          <a:p>
-            <a:r>
-              <a:rPr lang="en-US" dirty="0"/>
+              <a:rPr lang="en-US" sz="2000" dirty="0"/>
+              <a:t>Use existing components with minor modifications</a:t>
+            </a:r>
+          </a:p>
+          <a:p>
+            <a:pPr lvl="1"/>
+            <a:r>
+              <a:rPr lang="en-US" sz="2000" dirty="0"/>
+              <a:t>That creates new components that must be configured and managed</a:t>
+            </a:r>
+          </a:p>
+          <a:p>
+            <a:r>
+              <a:rPr lang="en-US" sz="2400" dirty="0"/>
               <a:t>Reuse   (better)</a:t>
             </a:r>
           </a:p>
           <a:p>
             <a:pPr lvl="1"/>
             <a:r>
-              <a:rPr lang="en-US" dirty="0"/>
-              <a:t>Reuse an existing component with </a:t>
-            </a:r>
-            <a:r>
-              <a:rPr lang="en-US" b="1" dirty="0"/>
+              <a:rPr lang="en-US" sz="2000" dirty="0"/>
+              <a:t>Reuse existing components with </a:t>
+            </a:r>
+            <a:r>
+              <a:rPr lang="en-US" sz="2000" b="1" dirty="0"/>
               <a:t>no modification</a:t>
             </a:r>
           </a:p>
           <a:p>
             <a:pPr lvl="1"/>
             <a:r>
-              <a:rPr lang="en-US" dirty="0"/>
-              <a:t>Used by composing, using as template argument, or using as base for derived classes</a:t>
+              <a:rPr lang="en-US" sz="2000" dirty="0"/>
+              <a:t>Use by composing, use as template argument, or use as base for derived classes</a:t>
+            </a:r>
+          </a:p>
+          <a:p>
+            <a:r>
+              <a:rPr lang="en-US" sz="2400" dirty="0"/>
+              <a:t>Purpose</a:t>
+            </a:r>
+          </a:p>
+          <a:p>
+            <a:pPr lvl="1"/>
+            <a:r>
+              <a:rPr lang="en-US" sz="2000" dirty="0"/>
+              <a:t>Improve productivity by building fewer lines of code</a:t>
+            </a:r>
+          </a:p>
+          <a:p>
+            <a:pPr lvl="1"/>
+            <a:r>
+              <a:rPr lang="en-US" sz="2000" dirty="0"/>
+              <a:t>Avoid introducing new defects and performance issues</a:t>
             </a:r>
           </a:p>
         </p:txBody>
@@ -8579,25 +8597,27 @@
           </a:xfrm>
         </p:spPr>
         <p:txBody>
-          <a:bodyPr/>
-          <a:lstStyle/>
-          <a:p>
-            <a:r>
-              <a:rPr lang="en-US" dirty="0"/>
-              <a:t>Reuse of compiler libraries has been spectacularly successful</a:t>
-            </a:r>
-          </a:p>
-          <a:p>
-            <a:pPr lvl="1"/>
-            <a:r>
-              <a:rPr lang="en-US" dirty="0"/>
+          <a:bodyPr>
+            <a:noAutofit/>
+          </a:bodyPr>
+          <a:lstStyle/>
+          <a:p>
+            <a:r>
+              <a:rPr lang="en-US" sz="2400" dirty="0"/>
+              <a:t>Reusing code from compiler libraries has been spectacularly successful</a:t>
+            </a:r>
+          </a:p>
+          <a:p>
+            <a:pPr lvl="1"/>
+            <a:r>
+              <a:rPr lang="en-US" sz="2000" dirty="0"/>
               <a:t>Each language defines a set of libraries that support building projects</a:t>
             </a:r>
           </a:p>
           <a:p>
             <a:pPr lvl="1"/>
             <a:r>
-              <a:rPr lang="en-US" dirty="0"/>
+              <a:rPr lang="en-US" sz="2000" dirty="0"/>
               <a:t>Updated with each new standardization of the language.</a:t>
             </a:r>
           </a:p>
@@ -8606,63 +8626,63 @@
               <a:buNone/>
             </a:pPr>
             <a:r>
-              <a:rPr lang="en-US" sz="300" dirty="0"/>
+              <a:rPr lang="en-US" sz="200" dirty="0"/>
               <a:t> </a:t>
             </a:r>
-            <a:endParaRPr lang="en-US" dirty="0"/>
-          </a:p>
-          <a:p>
-            <a:r>
-              <a:rPr lang="en-US" dirty="0"/>
-              <a:t>Software reuse in the academic, industrial, and commercial domains has been disappointing</a:t>
-            </a:r>
-          </a:p>
-          <a:p>
-            <a:pPr lvl="1"/>
-            <a:r>
-              <a:rPr lang="en-US" dirty="0"/>
+            <a:endParaRPr lang="en-US" sz="2000" dirty="0"/>
+          </a:p>
+          <a:p>
+            <a:r>
+              <a:rPr lang="en-US" sz="2400" dirty="0"/>
+              <a:t>Software reuse in the academic, industrial, and commercial domains has often been disappointing</a:t>
+            </a:r>
+          </a:p>
+          <a:p>
+            <a:pPr lvl="1"/>
+            <a:r>
+              <a:rPr lang="en-US" sz="2000" dirty="0"/>
               <a:t>Typical use is:</a:t>
             </a:r>
           </a:p>
           <a:p>
             <a:pPr lvl="2"/>
             <a:r>
-              <a:rPr lang="en-US" dirty="0"/>
+              <a:rPr lang="en-US" sz="1800" dirty="0"/>
               <a:t>Grab the last relevant project(s)</a:t>
             </a:r>
           </a:p>
           <a:p>
             <a:pPr lvl="2"/>
             <a:r>
-              <a:rPr lang="en-US" dirty="0"/>
-              <a:t>Attempt to throw away the unneeded parts</a:t>
+              <a:rPr lang="en-US" sz="1800" dirty="0"/>
+              <a:t>Attempt to throw away unneeded parts</a:t>
             </a:r>
           </a:p>
           <a:p>
             <a:pPr lvl="3"/>
             <a:r>
-              <a:rPr lang="en-US" dirty="0"/>
+              <a:rPr lang="en-US" sz="1600" dirty="0"/>
               <a:t>Sometimes we keep unneeded parts because too much breaks if we remove</a:t>
             </a:r>
           </a:p>
           <a:p>
             <a:pPr lvl="3"/>
             <a:r>
-              <a:rPr lang="en-US" dirty="0"/>
+              <a:rPr lang="en-US" sz="1600" dirty="0"/>
               <a:t>That causes maintenance problems</a:t>
             </a:r>
           </a:p>
           <a:p>
             <a:pPr lvl="2"/>
             <a:r>
-              <a:rPr lang="en-US" dirty="0"/>
-              <a:t>Add needed new parts</a:t>
+              <a:rPr lang="en-US" sz="1800" dirty="0"/>
+              <a:t>Merge and add needed new parts</a:t>
             </a:r>
           </a:p>
           <a:p>
             <a:pPr lvl="2"/>
             <a:r>
-              <a:rPr lang="en-US" dirty="0"/>
+              <a:rPr lang="en-US" sz="1800" dirty="0"/>
               <a:t>Spend a lot of time fixing breakage</a:t>
             </a:r>
           </a:p>
@@ -9001,14 +9021,13 @@
           <a:p>
             <a:r>
               <a:rPr lang="en-US" dirty="0"/>
+              <a:t>Purpose: to provide for application domain specific code the same advantages attained from compiler libraries</a:t>
+            </a:r>
+          </a:p>
+          <a:p>
+            <a:r>
+              <a:rPr lang="en-US" dirty="0"/>
               <a:t>For reuse a software component should be designed so that reusing in a new project is quicker and easier than creating from scratch</a:t>
-            </a:r>
-          </a:p>
-          <a:p>
-            <a:pPr lvl="1"/>
-            <a:r>
-              <a:rPr lang="en-US" dirty="0"/>
-              <a:t>How to do that is a topic for another story.</a:t>
             </a:r>
           </a:p>
           <a:p>
@@ -9024,6 +9043,13 @@
             <a:r>
               <a:rPr lang="en-US" dirty="0"/>
               <a:t>.</a:t>
+            </a:r>
+          </a:p>
+          <a:p>
+            <a:pPr lvl="1"/>
+            <a:r>
+              <a:rPr lang="en-US" dirty="0"/>
+              <a:t>How to do that is a topic for another story.</a:t>
             </a:r>
           </a:p>
           <a:p>
@@ -9121,407 +9147,6 @@
           <p:cNvPr id="2" name="Title 1">
             <a:extLst>
               <a:ext uri="{FF2B5EF4-FFF2-40B4-BE49-F238E27FC236}">
-                <a16:creationId xmlns:a16="http://schemas.microsoft.com/office/drawing/2014/main" id="{7B9AA4E2-8439-499E-8E09-B7B92D39946D}"/>
-              </a:ext>
-            </a:extLst>
-          </p:cNvPr>
-          <p:cNvSpPr>
-            <a:spLocks noGrp="1"/>
-          </p:cNvSpPr>
-          <p:nvPr>
-            <p:ph type="title"/>
-          </p:nvPr>
-        </p:nvSpPr>
-        <p:spPr/>
-        <p:txBody>
-          <a:bodyPr/>
-          <a:lstStyle/>
-          <a:p>
-            <a:r>
-              <a:rPr lang="en-US" dirty="0"/>
-              <a:t>Publishing Code Components for (Re)use</a:t>
-            </a:r>
-          </a:p>
-        </p:txBody>
-      </p:sp>
-      <p:sp>
-        <p:nvSpPr>
-          <p:cNvPr id="3" name="Content Placeholder 2">
-            <a:extLst>
-              <a:ext uri="{FF2B5EF4-FFF2-40B4-BE49-F238E27FC236}">
-                <a16:creationId xmlns:a16="http://schemas.microsoft.com/office/drawing/2014/main" id="{52CCEAD5-80CD-43AC-9D2F-18A29BD5B9E1}"/>
-              </a:ext>
-            </a:extLst>
-          </p:cNvPr>
-          <p:cNvSpPr>
-            <a:spLocks noGrp="1"/>
-          </p:cNvSpPr>
-          <p:nvPr>
-            <p:ph idx="1"/>
-          </p:nvPr>
-        </p:nvSpPr>
-        <p:spPr>
-          <a:xfrm>
-            <a:off x="838200" y="1339403"/>
-            <a:ext cx="10515600" cy="4734530"/>
-          </a:xfrm>
-        </p:spPr>
-        <p:txBody>
-          <a:bodyPr/>
-          <a:lstStyle/>
-          <a:p>
-            <a:pPr>
-              <a:lnSpc>
-                <a:spcPct val="100000"/>
-              </a:lnSpc>
-            </a:pPr>
-            <a:r>
-              <a:rPr lang="en-US" dirty="0"/>
-              <a:t>The goal of this site is to improve that process by publishing code in an effective way</a:t>
-            </a:r>
-          </a:p>
-          <a:p>
-            <a:pPr>
-              <a:lnSpc>
-                <a:spcPct val="100000"/>
-              </a:lnSpc>
-            </a:pPr>
-            <a:r>
-              <a:rPr lang="en-US" dirty="0"/>
-              <a:t>Publishing some code artifact is the act of making it available, in usable form.</a:t>
-            </a:r>
-          </a:p>
-          <a:p>
-            <a:pPr>
-              <a:lnSpc>
-                <a:spcPct val="150000"/>
-              </a:lnSpc>
-            </a:pPr>
-            <a:r>
-              <a:rPr lang="en-US" dirty="0"/>
-              <a:t>Five main facets:</a:t>
-            </a:r>
-          </a:p>
-          <a:p>
-            <a:pPr lvl="1">
-              <a:lnSpc>
-                <a:spcPct val="100000"/>
-              </a:lnSpc>
-            </a:pPr>
-            <a:r>
-              <a:rPr lang="en-US" dirty="0"/>
-              <a:t>Containment</a:t>
-            </a:r>
-          </a:p>
-          <a:p>
-            <a:pPr lvl="1">
-              <a:lnSpc>
-                <a:spcPct val="100000"/>
-              </a:lnSpc>
-            </a:pPr>
-            <a:r>
-              <a:rPr lang="en-US" dirty="0"/>
-              <a:t>Delivery</a:t>
-            </a:r>
-          </a:p>
-          <a:p>
-            <a:pPr lvl="1">
-              <a:lnSpc>
-                <a:spcPct val="100000"/>
-              </a:lnSpc>
-            </a:pPr>
-            <a:r>
-              <a:rPr lang="en-US" dirty="0"/>
-              <a:t>Location</a:t>
-            </a:r>
-          </a:p>
-          <a:p>
-            <a:pPr lvl="1">
-              <a:lnSpc>
-                <a:spcPct val="100000"/>
-              </a:lnSpc>
-            </a:pPr>
-            <a:r>
-              <a:rPr lang="en-US" dirty="0"/>
-              <a:t>Interpretation</a:t>
-            </a:r>
-          </a:p>
-          <a:p>
-            <a:pPr lvl="1">
-              <a:lnSpc>
-                <a:spcPct val="100000"/>
-              </a:lnSpc>
-            </a:pPr>
-            <a:r>
-              <a:rPr lang="en-US" dirty="0"/>
-              <a:t>Quality Control</a:t>
-            </a:r>
-          </a:p>
-        </p:txBody>
-      </p:sp>
-      <p:sp>
-        <p:nvSpPr>
-          <p:cNvPr id="4" name="Slide Number Placeholder 3">
-            <a:extLst>
-              <a:ext uri="{FF2B5EF4-FFF2-40B4-BE49-F238E27FC236}">
-                <a16:creationId xmlns:a16="http://schemas.microsoft.com/office/drawing/2014/main" id="{0E7EA502-B1E7-4DB5-B94A-0DBA481132A4}"/>
-              </a:ext>
-            </a:extLst>
-          </p:cNvPr>
-          <p:cNvSpPr>
-            <a:spLocks noGrp="1"/>
-          </p:cNvSpPr>
-          <p:nvPr>
-            <p:ph type="sldNum" sz="quarter" idx="12"/>
-          </p:nvPr>
-        </p:nvSpPr>
-        <p:spPr/>
-        <p:txBody>
-          <a:bodyPr/>
-          <a:lstStyle/>
-          <a:p>
-            <a:fld id="{EDEBF0BA-A897-4C1E-AB3C-F330808C0E1D}" type="slidenum">
-              <a:rPr lang="en-US" smtClean="0"/>
-              <a:t>7</a:t>
-            </a:fld>
-            <a:endParaRPr lang="en-US"/>
-          </a:p>
-        </p:txBody>
-      </p:sp>
-    </p:spTree>
-    <p:extLst>
-      <p:ext uri="{BB962C8B-B14F-4D97-AF65-F5344CB8AC3E}">
-        <p14:creationId xmlns:p14="http://schemas.microsoft.com/office/powerpoint/2010/main" val="4268696743"/>
-      </p:ext>
-    </p:extLst>
-  </p:cSld>
-  <p:clrMapOvr>
-    <a:masterClrMapping/>
-  </p:clrMapOvr>
-</p:sld>
-</file>
-
-<file path=ppt/slides/slide8.xml><?xml version="1.0" encoding="utf-8"?>
-<p:sld xmlns:a="http://schemas.openxmlformats.org/drawingml/2006/main" xmlns:r="http://schemas.openxmlformats.org/officeDocument/2006/relationships" xmlns:p="http://schemas.openxmlformats.org/presentationml/2006/main">
-  <p:cSld>
-    <p:spTree>
-      <p:nvGrpSpPr>
-        <p:cNvPr id="1" name=""/>
-        <p:cNvGrpSpPr/>
-        <p:nvPr/>
-      </p:nvGrpSpPr>
-      <p:grpSpPr>
-        <a:xfrm>
-          <a:off x="0" y="0"/>
-          <a:ext cx="0" cy="0"/>
-          <a:chOff x="0" y="0"/>
-          <a:chExt cx="0" cy="0"/>
-        </a:xfrm>
-      </p:grpSpPr>
-      <p:sp>
-        <p:nvSpPr>
-          <p:cNvPr id="2" name="Title 1">
-            <a:extLst>
-              <a:ext uri="{FF2B5EF4-FFF2-40B4-BE49-F238E27FC236}">
-                <a16:creationId xmlns:a16="http://schemas.microsoft.com/office/drawing/2014/main" id="{B4725340-475B-4911-AC68-3E9A7FF99896}"/>
-              </a:ext>
-            </a:extLst>
-          </p:cNvPr>
-          <p:cNvSpPr>
-            <a:spLocks noGrp="1"/>
-          </p:cNvSpPr>
-          <p:nvPr>
-            <p:ph type="title"/>
-          </p:nvPr>
-        </p:nvSpPr>
-        <p:spPr/>
-        <p:txBody>
-          <a:bodyPr/>
-          <a:lstStyle/>
-          <a:p>
-            <a:r>
-              <a:rPr lang="en-US" dirty="0"/>
-              <a:t>The Issues</a:t>
-            </a:r>
-          </a:p>
-        </p:txBody>
-      </p:sp>
-      <p:sp>
-        <p:nvSpPr>
-          <p:cNvPr id="3" name="Content Placeholder 2">
-            <a:extLst>
-              <a:ext uri="{FF2B5EF4-FFF2-40B4-BE49-F238E27FC236}">
-                <a16:creationId xmlns:a16="http://schemas.microsoft.com/office/drawing/2014/main" id="{D28EEC85-0147-4609-8EA7-C7AE355F5329}"/>
-              </a:ext>
-            </a:extLst>
-          </p:cNvPr>
-          <p:cNvSpPr>
-            <a:spLocks noGrp="1"/>
-          </p:cNvSpPr>
-          <p:nvPr>
-            <p:ph idx="1"/>
-          </p:nvPr>
-        </p:nvSpPr>
-        <p:spPr>
-          <a:xfrm>
-            <a:off x="838200" y="1390918"/>
-            <a:ext cx="10515600" cy="4786045"/>
-          </a:xfrm>
-        </p:spPr>
-        <p:txBody>
-          <a:bodyPr/>
-          <a:lstStyle/>
-          <a:p>
-            <a:pPr>
-              <a:lnSpc>
-                <a:spcPct val="150000"/>
-              </a:lnSpc>
-            </a:pPr>
-            <a:r>
-              <a:rPr lang="en-US" dirty="0"/>
-              <a:t>Source code containment and delivery are solved problems</a:t>
-            </a:r>
-          </a:p>
-          <a:p>
-            <a:pPr lvl="1">
-              <a:lnSpc>
-                <a:spcPct val="100000"/>
-              </a:lnSpc>
-            </a:pPr>
-            <a:r>
-              <a:rPr lang="en-US" dirty="0"/>
-              <a:t>Cloud-based facilities like </a:t>
-            </a:r>
-            <a:r>
-              <a:rPr lang="en-US" dirty="0" err="1"/>
-              <a:t>github</a:t>
-            </a:r>
-            <a:r>
-              <a:rPr lang="en-US" dirty="0"/>
-              <a:t> do that very well</a:t>
-            </a:r>
-          </a:p>
-          <a:p>
-            <a:pPr>
-              <a:lnSpc>
-                <a:spcPct val="150000"/>
-              </a:lnSpc>
-            </a:pPr>
-            <a:r>
-              <a:rPr lang="en-US" dirty="0"/>
-              <a:t>The issues are finding and understanding code relevant to a need</a:t>
-            </a:r>
-          </a:p>
-          <a:p>
-            <a:pPr lvl="1">
-              <a:lnSpc>
-                <a:spcPct val="100000"/>
-              </a:lnSpc>
-            </a:pPr>
-            <a:r>
-              <a:rPr lang="en-US" dirty="0"/>
-              <a:t>We want most code repositories to be large – to support broad reuse</a:t>
-            </a:r>
-          </a:p>
-          <a:p>
-            <a:pPr lvl="1">
-              <a:lnSpc>
-                <a:spcPct val="100000"/>
-              </a:lnSpc>
-            </a:pPr>
-            <a:r>
-              <a:rPr lang="en-US" dirty="0"/>
-              <a:t>How do we find, in a large repository, code that fills some need?</a:t>
-            </a:r>
-          </a:p>
-          <a:p>
-            <a:pPr>
-              <a:lnSpc>
-                <a:spcPct val="100000"/>
-              </a:lnSpc>
-            </a:pPr>
-            <a:r>
-              <a:rPr lang="en-US" dirty="0"/>
-              <a:t>Website documentation, collocated with source code - a good option</a:t>
-            </a:r>
-          </a:p>
-          <a:p>
-            <a:pPr lvl="1">
-              <a:lnSpc>
-                <a:spcPct val="100000"/>
-              </a:lnSpc>
-            </a:pPr>
-            <a:r>
-              <a:rPr lang="en-US" dirty="0"/>
-              <a:t>To support both salvage and reuse, documentation needs to provide information about the component’s concept, design, and typical use</a:t>
-            </a:r>
-          </a:p>
-        </p:txBody>
-      </p:sp>
-      <p:sp>
-        <p:nvSpPr>
-          <p:cNvPr id="4" name="Slide Number Placeholder 3">
-            <a:extLst>
-              <a:ext uri="{FF2B5EF4-FFF2-40B4-BE49-F238E27FC236}">
-                <a16:creationId xmlns:a16="http://schemas.microsoft.com/office/drawing/2014/main" id="{B69DD603-6CCB-4044-86D9-1197C687F477}"/>
-              </a:ext>
-            </a:extLst>
-          </p:cNvPr>
-          <p:cNvSpPr>
-            <a:spLocks noGrp="1"/>
-          </p:cNvSpPr>
-          <p:nvPr>
-            <p:ph type="sldNum" sz="quarter" idx="12"/>
-          </p:nvPr>
-        </p:nvSpPr>
-        <p:spPr/>
-        <p:txBody>
-          <a:bodyPr/>
-          <a:lstStyle/>
-          <a:p>
-            <a:fld id="{EDEBF0BA-A897-4C1E-AB3C-F330808C0E1D}" type="slidenum">
-              <a:rPr lang="en-US" smtClean="0"/>
-              <a:t>8</a:t>
-            </a:fld>
-            <a:endParaRPr lang="en-US"/>
-          </a:p>
-        </p:txBody>
-      </p:sp>
-    </p:spTree>
-    <p:extLst>
-      <p:ext uri="{BB962C8B-B14F-4D97-AF65-F5344CB8AC3E}">
-        <p14:creationId xmlns:p14="http://schemas.microsoft.com/office/powerpoint/2010/main" val="1974146755"/>
-      </p:ext>
-    </p:extLst>
-  </p:cSld>
-  <p:clrMapOvr>
-    <a:masterClrMapping/>
-  </p:clrMapOvr>
-</p:sld>
-</file>
-
-<file path=ppt/slides/slide9.xml><?xml version="1.0" encoding="utf-8"?>
-<p:sld xmlns:a="http://schemas.openxmlformats.org/drawingml/2006/main" xmlns:r="http://schemas.openxmlformats.org/officeDocument/2006/relationships" xmlns:p="http://schemas.openxmlformats.org/presentationml/2006/main">
-  <p:cSld>
-    <p:spTree>
-      <p:nvGrpSpPr>
-        <p:cNvPr id="1" name=""/>
-        <p:cNvGrpSpPr/>
-        <p:nvPr/>
-      </p:nvGrpSpPr>
-      <p:grpSpPr>
-        <a:xfrm>
-          <a:off x="0" y="0"/>
-          <a:ext cx="0" cy="0"/>
-          <a:chOff x="0" y="0"/>
-          <a:chExt cx="0" cy="0"/>
-        </a:xfrm>
-      </p:grpSpPr>
-      <p:sp>
-        <p:nvSpPr>
-          <p:cNvPr id="2" name="Title 1">
-            <a:extLst>
-              <a:ext uri="{FF2B5EF4-FFF2-40B4-BE49-F238E27FC236}">
                 <a16:creationId xmlns:a16="http://schemas.microsoft.com/office/drawing/2014/main" id="{79DD350B-D16A-4094-A81A-3C2D95DE90DB}"/>
               </a:ext>
             </a:extLst>
@@ -9545,7 +9170,7 @@
           <a:p>
             <a:r>
               <a:rPr lang="en-US" dirty="0"/>
-              <a:t>Story Prologue</a:t>
+              <a:t>Website Story Prologue</a:t>
             </a:r>
           </a:p>
         </p:txBody>
@@ -9677,7 +9302,7 @@
           <a:p>
             <a:fld id="{EDEBF0BA-A897-4C1E-AB3C-F330808C0E1D}" type="slidenum">
               <a:rPr lang="en-US" smtClean="0"/>
-              <a:t>9</a:t>
+              <a:t>7</a:t>
             </a:fld>
             <a:endParaRPr lang="en-US"/>
           </a:p>
@@ -9736,6 +9361,415 @@
     <p:extLst>
       <p:ext uri="{BB962C8B-B14F-4D97-AF65-F5344CB8AC3E}">
         <p14:creationId xmlns:p14="http://schemas.microsoft.com/office/powerpoint/2010/main" val="3203741197"/>
+      </p:ext>
+    </p:extLst>
+  </p:cSld>
+  <p:clrMapOvr>
+    <a:masterClrMapping/>
+  </p:clrMapOvr>
+</p:sld>
+</file>
+
+<file path=ppt/slides/slide8.xml><?xml version="1.0" encoding="utf-8"?>
+<p:sld xmlns:a="http://schemas.openxmlformats.org/drawingml/2006/main" xmlns:r="http://schemas.openxmlformats.org/officeDocument/2006/relationships" xmlns:p="http://schemas.openxmlformats.org/presentationml/2006/main">
+  <p:cSld>
+    <p:spTree>
+      <p:nvGrpSpPr>
+        <p:cNvPr id="1" name=""/>
+        <p:cNvGrpSpPr/>
+        <p:nvPr/>
+      </p:nvGrpSpPr>
+      <p:grpSpPr>
+        <a:xfrm>
+          <a:off x="0" y="0"/>
+          <a:ext cx="0" cy="0"/>
+          <a:chOff x="0" y="0"/>
+          <a:chExt cx="0" cy="0"/>
+        </a:xfrm>
+      </p:grpSpPr>
+      <p:sp>
+        <p:nvSpPr>
+          <p:cNvPr id="2" name="Title 1">
+            <a:extLst>
+              <a:ext uri="{FF2B5EF4-FFF2-40B4-BE49-F238E27FC236}">
+                <a16:creationId xmlns:a16="http://schemas.microsoft.com/office/drawing/2014/main" id="{7B9AA4E2-8439-499E-8E09-B7B92D39946D}"/>
+              </a:ext>
+            </a:extLst>
+          </p:cNvPr>
+          <p:cNvSpPr>
+            <a:spLocks noGrp="1"/>
+          </p:cNvSpPr>
+          <p:nvPr>
+            <p:ph type="title"/>
+          </p:nvPr>
+        </p:nvSpPr>
+        <p:spPr/>
+        <p:txBody>
+          <a:bodyPr/>
+          <a:lstStyle/>
+          <a:p>
+            <a:r>
+              <a:rPr lang="en-US" dirty="0"/>
+              <a:t>Publishing Code Components for (Re)use</a:t>
+            </a:r>
+          </a:p>
+        </p:txBody>
+      </p:sp>
+      <p:sp>
+        <p:nvSpPr>
+          <p:cNvPr id="3" name="Content Placeholder 2">
+            <a:extLst>
+              <a:ext uri="{FF2B5EF4-FFF2-40B4-BE49-F238E27FC236}">
+                <a16:creationId xmlns:a16="http://schemas.microsoft.com/office/drawing/2014/main" id="{52CCEAD5-80CD-43AC-9D2F-18A29BD5B9E1}"/>
+              </a:ext>
+            </a:extLst>
+          </p:cNvPr>
+          <p:cNvSpPr>
+            <a:spLocks noGrp="1"/>
+          </p:cNvSpPr>
+          <p:nvPr>
+            <p:ph idx="1"/>
+          </p:nvPr>
+        </p:nvSpPr>
+        <p:spPr>
+          <a:xfrm>
+            <a:off x="838200" y="1339403"/>
+            <a:ext cx="10515600" cy="4734530"/>
+          </a:xfrm>
+        </p:spPr>
+        <p:txBody>
+          <a:bodyPr/>
+          <a:lstStyle/>
+          <a:p>
+            <a:pPr>
+              <a:lnSpc>
+                <a:spcPct val="100000"/>
+              </a:lnSpc>
+            </a:pPr>
+            <a:r>
+              <a:rPr lang="en-US" dirty="0"/>
+              <a:t>The goal of this site is to improve that first site’s process by publishing code in an effective way</a:t>
+            </a:r>
+          </a:p>
+          <a:p>
+            <a:pPr>
+              <a:lnSpc>
+                <a:spcPct val="100000"/>
+              </a:lnSpc>
+            </a:pPr>
+            <a:r>
+              <a:rPr lang="en-US" dirty="0"/>
+              <a:t>Publishing some code artifact is the act of making it available, in usable form.</a:t>
+            </a:r>
+          </a:p>
+          <a:p>
+            <a:pPr>
+              <a:lnSpc>
+                <a:spcPct val="150000"/>
+              </a:lnSpc>
+            </a:pPr>
+            <a:r>
+              <a:rPr lang="en-US" dirty="0"/>
+              <a:t>Five main facets of publication:</a:t>
+            </a:r>
+          </a:p>
+          <a:p>
+            <a:pPr lvl="1">
+              <a:lnSpc>
+                <a:spcPct val="100000"/>
+              </a:lnSpc>
+            </a:pPr>
+            <a:r>
+              <a:rPr lang="en-US" dirty="0"/>
+              <a:t>Containment</a:t>
+            </a:r>
+          </a:p>
+          <a:p>
+            <a:pPr lvl="1">
+              <a:lnSpc>
+                <a:spcPct val="100000"/>
+              </a:lnSpc>
+            </a:pPr>
+            <a:r>
+              <a:rPr lang="en-US" dirty="0"/>
+              <a:t>Delivery</a:t>
+            </a:r>
+          </a:p>
+          <a:p>
+            <a:pPr lvl="1">
+              <a:lnSpc>
+                <a:spcPct val="100000"/>
+              </a:lnSpc>
+            </a:pPr>
+            <a:r>
+              <a:rPr lang="en-US" dirty="0"/>
+              <a:t>Location</a:t>
+            </a:r>
+          </a:p>
+          <a:p>
+            <a:pPr lvl="1">
+              <a:lnSpc>
+                <a:spcPct val="100000"/>
+              </a:lnSpc>
+            </a:pPr>
+            <a:r>
+              <a:rPr lang="en-US" dirty="0"/>
+              <a:t>Interpretation</a:t>
+            </a:r>
+          </a:p>
+          <a:p>
+            <a:pPr lvl="1">
+              <a:lnSpc>
+                <a:spcPct val="100000"/>
+              </a:lnSpc>
+            </a:pPr>
+            <a:r>
+              <a:rPr lang="en-US" dirty="0"/>
+              <a:t>Quality Control</a:t>
+            </a:r>
+          </a:p>
+        </p:txBody>
+      </p:sp>
+      <p:sp>
+        <p:nvSpPr>
+          <p:cNvPr id="4" name="Slide Number Placeholder 3">
+            <a:extLst>
+              <a:ext uri="{FF2B5EF4-FFF2-40B4-BE49-F238E27FC236}">
+                <a16:creationId xmlns:a16="http://schemas.microsoft.com/office/drawing/2014/main" id="{0E7EA502-B1E7-4DB5-B94A-0DBA481132A4}"/>
+              </a:ext>
+            </a:extLst>
+          </p:cNvPr>
+          <p:cNvSpPr>
+            <a:spLocks noGrp="1"/>
+          </p:cNvSpPr>
+          <p:nvPr>
+            <p:ph type="sldNum" sz="quarter" idx="12"/>
+          </p:nvPr>
+        </p:nvSpPr>
+        <p:spPr/>
+        <p:txBody>
+          <a:bodyPr/>
+          <a:lstStyle/>
+          <a:p>
+            <a:fld id="{EDEBF0BA-A897-4C1E-AB3C-F330808C0E1D}" type="slidenum">
+              <a:rPr lang="en-US" smtClean="0"/>
+              <a:t>8</a:t>
+            </a:fld>
+            <a:endParaRPr lang="en-US"/>
+          </a:p>
+        </p:txBody>
+      </p:sp>
+    </p:spTree>
+    <p:extLst>
+      <p:ext uri="{BB962C8B-B14F-4D97-AF65-F5344CB8AC3E}">
+        <p14:creationId xmlns:p14="http://schemas.microsoft.com/office/powerpoint/2010/main" val="4268696743"/>
+      </p:ext>
+    </p:extLst>
+  </p:cSld>
+  <p:clrMapOvr>
+    <a:masterClrMapping/>
+  </p:clrMapOvr>
+</p:sld>
+</file>
+
+<file path=ppt/slides/slide9.xml><?xml version="1.0" encoding="utf-8"?>
+<p:sld xmlns:a="http://schemas.openxmlformats.org/drawingml/2006/main" xmlns:r="http://schemas.openxmlformats.org/officeDocument/2006/relationships" xmlns:p="http://schemas.openxmlformats.org/presentationml/2006/main">
+  <p:cSld>
+    <p:spTree>
+      <p:nvGrpSpPr>
+        <p:cNvPr id="1" name=""/>
+        <p:cNvGrpSpPr/>
+        <p:nvPr/>
+      </p:nvGrpSpPr>
+      <p:grpSpPr>
+        <a:xfrm>
+          <a:off x="0" y="0"/>
+          <a:ext cx="0" cy="0"/>
+          <a:chOff x="0" y="0"/>
+          <a:chExt cx="0" cy="0"/>
+        </a:xfrm>
+      </p:grpSpPr>
+      <p:sp>
+        <p:nvSpPr>
+          <p:cNvPr id="2" name="Title 1">
+            <a:extLst>
+              <a:ext uri="{FF2B5EF4-FFF2-40B4-BE49-F238E27FC236}">
+                <a16:creationId xmlns:a16="http://schemas.microsoft.com/office/drawing/2014/main" id="{B4725340-475B-4911-AC68-3E9A7FF99896}"/>
+              </a:ext>
+            </a:extLst>
+          </p:cNvPr>
+          <p:cNvSpPr>
+            <a:spLocks noGrp="1"/>
+          </p:cNvSpPr>
+          <p:nvPr>
+            <p:ph type="title"/>
+          </p:nvPr>
+        </p:nvSpPr>
+        <p:spPr/>
+        <p:txBody>
+          <a:bodyPr/>
+          <a:lstStyle/>
+          <a:p>
+            <a:r>
+              <a:rPr lang="en-US" dirty="0"/>
+              <a:t>The Issues</a:t>
+            </a:r>
+          </a:p>
+        </p:txBody>
+      </p:sp>
+      <p:sp>
+        <p:nvSpPr>
+          <p:cNvPr id="3" name="Content Placeholder 2">
+            <a:extLst>
+              <a:ext uri="{FF2B5EF4-FFF2-40B4-BE49-F238E27FC236}">
+                <a16:creationId xmlns:a16="http://schemas.microsoft.com/office/drawing/2014/main" id="{D28EEC85-0147-4609-8EA7-C7AE355F5329}"/>
+              </a:ext>
+            </a:extLst>
+          </p:cNvPr>
+          <p:cNvSpPr>
+            <a:spLocks noGrp="1"/>
+          </p:cNvSpPr>
+          <p:nvPr>
+            <p:ph idx="1"/>
+          </p:nvPr>
+        </p:nvSpPr>
+        <p:spPr>
+          <a:xfrm>
+            <a:off x="838200" y="1390918"/>
+            <a:ext cx="10515600" cy="4786045"/>
+          </a:xfrm>
+        </p:spPr>
+        <p:txBody>
+          <a:bodyPr/>
+          <a:lstStyle/>
+          <a:p>
+            <a:pPr>
+              <a:lnSpc>
+                <a:spcPct val="150000"/>
+              </a:lnSpc>
+            </a:pPr>
+            <a:r>
+              <a:rPr lang="en-US" dirty="0"/>
+              <a:t>Source code containment and delivery are solved problems</a:t>
+            </a:r>
+          </a:p>
+          <a:p>
+            <a:pPr lvl="1">
+              <a:lnSpc>
+                <a:spcPct val="100000"/>
+              </a:lnSpc>
+            </a:pPr>
+            <a:r>
+              <a:rPr lang="en-US" dirty="0"/>
+              <a:t>Cloud-based facilities like </a:t>
+            </a:r>
+            <a:r>
+              <a:rPr lang="en-US" dirty="0" err="1"/>
+              <a:t>github</a:t>
+            </a:r>
+            <a:r>
+              <a:rPr lang="en-US" dirty="0"/>
+              <a:t> do that very well</a:t>
+            </a:r>
+          </a:p>
+          <a:p>
+            <a:pPr>
+              <a:lnSpc>
+                <a:spcPct val="150000"/>
+              </a:lnSpc>
+            </a:pPr>
+            <a:r>
+              <a:rPr lang="en-US" dirty="0"/>
+              <a:t>The issues are finding and understanding code relevant to a need</a:t>
+            </a:r>
+          </a:p>
+          <a:p>
+            <a:pPr lvl="1">
+              <a:lnSpc>
+                <a:spcPct val="100000"/>
+              </a:lnSpc>
+            </a:pPr>
+            <a:r>
+              <a:rPr lang="en-US" dirty="0"/>
+              <a:t>We want most code repositories to be large – to support broad reuse</a:t>
+            </a:r>
+          </a:p>
+          <a:p>
+            <a:pPr lvl="1">
+              <a:lnSpc>
+                <a:spcPct val="100000"/>
+              </a:lnSpc>
+            </a:pPr>
+            <a:r>
+              <a:rPr lang="en-US" dirty="0"/>
+              <a:t>How do we find, in a large repository, code that fills some need?</a:t>
+            </a:r>
+          </a:p>
+          <a:p>
+            <a:pPr>
+              <a:lnSpc>
+                <a:spcPct val="100000"/>
+              </a:lnSpc>
+            </a:pPr>
+            <a:r>
+              <a:rPr lang="en-US" dirty="0"/>
+              <a:t>A good option - website documentation, </a:t>
+            </a:r>
+            <a:r>
+              <a:rPr lang="en-US" dirty="0" err="1"/>
+              <a:t>colocated</a:t>
+            </a:r>
+            <a:r>
+              <a:rPr lang="en-US" dirty="0"/>
+              <a:t> with source code </a:t>
+            </a:r>
+          </a:p>
+          <a:p>
+            <a:pPr lvl="1">
+              <a:lnSpc>
+                <a:spcPct val="100000"/>
+              </a:lnSpc>
+            </a:pPr>
+            <a:r>
+              <a:rPr lang="en-US" dirty="0"/>
+              <a:t>To support both salvage and reuse, documentation needs to provide information about the component’s concept, design, and typical use</a:t>
+            </a:r>
+          </a:p>
+        </p:txBody>
+      </p:sp>
+      <p:sp>
+        <p:nvSpPr>
+          <p:cNvPr id="4" name="Slide Number Placeholder 3">
+            <a:extLst>
+              <a:ext uri="{FF2B5EF4-FFF2-40B4-BE49-F238E27FC236}">
+                <a16:creationId xmlns:a16="http://schemas.microsoft.com/office/drawing/2014/main" id="{B69DD603-6CCB-4044-86D9-1197C687F477}"/>
+              </a:ext>
+            </a:extLst>
+          </p:cNvPr>
+          <p:cNvSpPr>
+            <a:spLocks noGrp="1"/>
+          </p:cNvSpPr>
+          <p:nvPr>
+            <p:ph type="sldNum" sz="quarter" idx="12"/>
+          </p:nvPr>
+        </p:nvSpPr>
+        <p:spPr/>
+        <p:txBody>
+          <a:bodyPr/>
+          <a:lstStyle/>
+          <a:p>
+            <a:fld id="{EDEBF0BA-A897-4C1E-AB3C-F330808C0E1D}" type="slidenum">
+              <a:rPr lang="en-US" smtClean="0"/>
+              <a:t>9</a:t>
+            </a:fld>
+            <a:endParaRPr lang="en-US"/>
+          </a:p>
+        </p:txBody>
+      </p:sp>
+    </p:spTree>
+    <p:extLst>
+      <p:ext uri="{BB962C8B-B14F-4D97-AF65-F5344CB8AC3E}">
+        <p14:creationId xmlns:p14="http://schemas.microsoft.com/office/powerpoint/2010/main" val="1974146755"/>
       </p:ext>
     </p:extLst>
   </p:cSld>

</xml_diff>

<commit_message>
added new slide with Repo defin
</commit_message>
<xml_diff>
--- a/Resources/PublishingSourceCode.pptx
+++ b/Resources/PublishingSourceCode.pptx
@@ -5,7 +5,7 @@
     <p:sldMasterId id="2147483648" r:id="rId1"/>
   </p:sldMasterIdLst>
   <p:notesMasterIdLst>
-    <p:notesMasterId r:id="rId29"/>
+    <p:notesMasterId r:id="rId30"/>
   </p:notesMasterIdLst>
   <p:sldIdLst>
     <p:sldId id="256" r:id="rId2"/>
@@ -19,22 +19,23 @@
     <p:sldId id="257" r:id="rId10"/>
     <p:sldId id="267" r:id="rId11"/>
     <p:sldId id="259" r:id="rId12"/>
-    <p:sldId id="268" r:id="rId13"/>
-    <p:sldId id="270" r:id="rId14"/>
-    <p:sldId id="271" r:id="rId15"/>
-    <p:sldId id="278" r:id="rId16"/>
-    <p:sldId id="274" r:id="rId17"/>
-    <p:sldId id="273" r:id="rId18"/>
-    <p:sldId id="275" r:id="rId19"/>
-    <p:sldId id="282" r:id="rId20"/>
-    <p:sldId id="265" r:id="rId21"/>
-    <p:sldId id="266" r:id="rId22"/>
-    <p:sldId id="261" r:id="rId23"/>
-    <p:sldId id="262" r:id="rId24"/>
-    <p:sldId id="263" r:id="rId25"/>
-    <p:sldId id="276" r:id="rId26"/>
-    <p:sldId id="277" r:id="rId27"/>
-    <p:sldId id="279" r:id="rId28"/>
+    <p:sldId id="284" r:id="rId13"/>
+    <p:sldId id="268" r:id="rId14"/>
+    <p:sldId id="270" r:id="rId15"/>
+    <p:sldId id="271" r:id="rId16"/>
+    <p:sldId id="278" r:id="rId17"/>
+    <p:sldId id="274" r:id="rId18"/>
+    <p:sldId id="273" r:id="rId19"/>
+    <p:sldId id="275" r:id="rId20"/>
+    <p:sldId id="282" r:id="rId21"/>
+    <p:sldId id="265" r:id="rId22"/>
+    <p:sldId id="266" r:id="rId23"/>
+    <p:sldId id="261" r:id="rId24"/>
+    <p:sldId id="262" r:id="rId25"/>
+    <p:sldId id="263" r:id="rId26"/>
+    <p:sldId id="276" r:id="rId27"/>
+    <p:sldId id="277" r:id="rId28"/>
+    <p:sldId id="279" r:id="rId29"/>
   </p:sldIdLst>
   <p:sldSz cx="12192000" cy="6858000"/>
   <p:notesSz cx="7010400" cy="9296400"/>
@@ -4304,6 +4305,183 @@
           <p:cNvPr id="2" name="Title 1">
             <a:extLst>
               <a:ext uri="{FF2B5EF4-FFF2-40B4-BE49-F238E27FC236}">
+                <a16:creationId xmlns:a16="http://schemas.microsoft.com/office/drawing/2014/main" id="{D4B48825-A5B3-4E71-8A0C-1905775E7C9B}"/>
+              </a:ext>
+            </a:extLst>
+          </p:cNvPr>
+          <p:cNvSpPr>
+            <a:spLocks noGrp="1"/>
+          </p:cNvSpPr>
+          <p:nvPr>
+            <p:ph type="title"/>
+          </p:nvPr>
+        </p:nvSpPr>
+        <p:spPr/>
+        <p:txBody>
+          <a:bodyPr/>
+          <a:lstStyle/>
+          <a:p>
+            <a:r>
+              <a:rPr lang="en-US" dirty="0"/>
+              <a:t>Definitions - Repository</a:t>
+            </a:r>
+          </a:p>
+        </p:txBody>
+      </p:sp>
+      <p:sp>
+        <p:nvSpPr>
+          <p:cNvPr id="3" name="Content Placeholder 2">
+            <a:extLst>
+              <a:ext uri="{FF2B5EF4-FFF2-40B4-BE49-F238E27FC236}">
+                <a16:creationId xmlns:a16="http://schemas.microsoft.com/office/drawing/2014/main" id="{6AB6FE1E-65D4-4554-9809-B2FD2D3210A9}"/>
+              </a:ext>
+            </a:extLst>
+          </p:cNvPr>
+          <p:cNvSpPr>
+            <a:spLocks noGrp="1"/>
+          </p:cNvSpPr>
+          <p:nvPr>
+            <p:ph idx="1"/>
+          </p:nvPr>
+        </p:nvSpPr>
+        <p:spPr>
+          <a:xfrm>
+            <a:off x="838200" y="1339403"/>
+            <a:ext cx="10515600" cy="4605741"/>
+          </a:xfrm>
+        </p:spPr>
+        <p:txBody>
+          <a:bodyPr>
+            <a:noAutofit/>
+          </a:bodyPr>
+          <a:lstStyle/>
+          <a:p>
+            <a:r>
+              <a:rPr lang="en-US" sz="2400" dirty="0"/>
+              <a:t>“A </a:t>
+            </a:r>
+            <a:r>
+              <a:rPr lang="en-US" sz="2400" b="1" dirty="0"/>
+              <a:t>software repository</a:t>
+            </a:r>
+            <a:r>
+              <a:rPr lang="en-US" sz="2400" dirty="0"/>
+              <a:t>, colloquially known as a "repo" for short, is a storage location from which </a:t>
+            </a:r>
+            <a:r>
+              <a:rPr lang="en-US" sz="2400" dirty="0">
+                <a:hlinkClick r:id="rId2" tooltip="Package (package management system)"/>
+              </a:rPr>
+              <a:t>software packages</a:t>
+            </a:r>
+            <a:r>
+              <a:rPr lang="en-US" sz="2400" dirty="0"/>
+              <a:t> may be retrieved and installed on a computer. These repositories often house metadata about the packages stored in the repository.” </a:t>
+            </a:r>
+            <a:br>
+              <a:rPr lang="en-US" sz="2400" dirty="0"/>
+            </a:br>
+            <a:r>
+              <a:rPr lang="en-US" sz="2400" dirty="0"/>
+              <a:t>– Wikipedia software Repository</a:t>
+            </a:r>
+          </a:p>
+          <a:p>
+            <a:r>
+              <a:rPr lang="en-US" sz="2400" dirty="0"/>
+              <a:t>“A repository is like a folder for your project. Your project's repository contains all of your project's files and stores each file's revision history. You can also discuss and manage your project's work within the repository.”</a:t>
+            </a:r>
+            <a:br>
+              <a:rPr lang="en-US" sz="2400" dirty="0"/>
+            </a:br>
+            <a:r>
+              <a:rPr lang="en-US" sz="2400" dirty="0"/>
+              <a:t>- GitHub Help</a:t>
+            </a:r>
+          </a:p>
+          <a:p>
+            <a:r>
+              <a:rPr lang="en-US" sz="2400" dirty="0"/>
+              <a:t>Common use of the Repository name often implies the totality of all components served from one site.  We follow </a:t>
+            </a:r>
+            <a:r>
+              <a:rPr lang="en-US" sz="2400" dirty="0" err="1"/>
+              <a:t>github</a:t>
+            </a:r>
+            <a:r>
+              <a:rPr lang="en-US" sz="2400" dirty="0"/>
+              <a:t> with a narrower definition, i.e., a place to hold one project from a site that may make many projects available.</a:t>
+            </a:r>
+          </a:p>
+          <a:p>
+            <a:endParaRPr lang="en-US" sz="2400" dirty="0"/>
+          </a:p>
+        </p:txBody>
+      </p:sp>
+      <p:sp>
+        <p:nvSpPr>
+          <p:cNvPr id="4" name="Slide Number Placeholder 3">
+            <a:extLst>
+              <a:ext uri="{FF2B5EF4-FFF2-40B4-BE49-F238E27FC236}">
+                <a16:creationId xmlns:a16="http://schemas.microsoft.com/office/drawing/2014/main" id="{86F84746-86C3-4F32-A6FD-1E44C17FC41A}"/>
+              </a:ext>
+            </a:extLst>
+          </p:cNvPr>
+          <p:cNvSpPr>
+            <a:spLocks noGrp="1"/>
+          </p:cNvSpPr>
+          <p:nvPr>
+            <p:ph type="sldNum" sz="quarter" idx="12"/>
+          </p:nvPr>
+        </p:nvSpPr>
+        <p:spPr/>
+        <p:txBody>
+          <a:bodyPr/>
+          <a:lstStyle/>
+          <a:p>
+            <a:fld id="{EDEBF0BA-A897-4C1E-AB3C-F330808C0E1D}" type="slidenum">
+              <a:rPr lang="en-US" smtClean="0"/>
+              <a:t>12</a:t>
+            </a:fld>
+            <a:endParaRPr lang="en-US"/>
+          </a:p>
+        </p:txBody>
+      </p:sp>
+    </p:spTree>
+    <p:extLst>
+      <p:ext uri="{BB962C8B-B14F-4D97-AF65-F5344CB8AC3E}">
+        <p14:creationId xmlns:p14="http://schemas.microsoft.com/office/powerpoint/2010/main" val="3763259160"/>
+      </p:ext>
+    </p:extLst>
+  </p:cSld>
+  <p:clrMapOvr>
+    <a:masterClrMapping/>
+  </p:clrMapOvr>
+</p:sld>
+</file>
+
+<file path=ppt/slides/slide13.xml><?xml version="1.0" encoding="utf-8"?>
+<p:sld xmlns:a="http://schemas.openxmlformats.org/drawingml/2006/main" xmlns:r="http://schemas.openxmlformats.org/officeDocument/2006/relationships" xmlns:p="http://schemas.openxmlformats.org/presentationml/2006/main">
+  <p:cSld>
+    <p:spTree>
+      <p:nvGrpSpPr>
+        <p:cNvPr id="1" name=""/>
+        <p:cNvGrpSpPr/>
+        <p:nvPr/>
+      </p:nvGrpSpPr>
+      <p:grpSpPr>
+        <a:xfrm>
+          <a:off x="0" y="0"/>
+          <a:ext cx="0" cy="0"/>
+          <a:chOff x="0" y="0"/>
+          <a:chExt cx="0" cy="0"/>
+        </a:xfrm>
+      </p:grpSpPr>
+      <p:sp>
+        <p:nvSpPr>
+          <p:cNvPr id="2" name="Title 1">
+            <a:extLst>
+              <a:ext uri="{FF2B5EF4-FFF2-40B4-BE49-F238E27FC236}">
                 <a16:creationId xmlns:a16="http://schemas.microsoft.com/office/drawing/2014/main" id="{6DFB2D42-9518-4248-AE5E-AC4DE0E3E6DF}"/>
               </a:ext>
             </a:extLst>
@@ -4479,7 +4657,7 @@
           <a:p>
             <a:fld id="{EDEBF0BA-A897-4C1E-AB3C-F330808C0E1D}" type="slidenum">
               <a:rPr lang="en-US" smtClean="0"/>
-              <a:t>12</a:t>
+              <a:t>13</a:t>
             </a:fld>
             <a:endParaRPr lang="en-US" dirty="0"/>
           </a:p>
@@ -4528,7 +4706,7 @@
 </p:sld>
 </file>
 
-<file path=ppt/slides/slide13.xml><?xml version="1.0" encoding="utf-8"?>
+<file path=ppt/slides/slide14.xml><?xml version="1.0" encoding="utf-8"?>
 <p:sld xmlns:a="http://schemas.openxmlformats.org/drawingml/2006/main" xmlns:r="http://schemas.openxmlformats.org/officeDocument/2006/relationships" xmlns:p="http://schemas.openxmlformats.org/presentationml/2006/main">
   <p:cSld>
     <p:spTree>
@@ -4703,7 +4881,7 @@
           <a:p>
             <a:fld id="{EDEBF0BA-A897-4C1E-AB3C-F330808C0E1D}" type="slidenum">
               <a:rPr lang="en-US" smtClean="0"/>
-              <a:t>13</a:t>
+              <a:t>14</a:t>
             </a:fld>
             <a:endParaRPr lang="en-US"/>
           </a:p>
@@ -4989,7 +5167,7 @@
 </p:sld>
 </file>
 
-<file path=ppt/slides/slide14.xml><?xml version="1.0" encoding="utf-8"?>
+<file path=ppt/slides/slide15.xml><?xml version="1.0" encoding="utf-8"?>
 <p:sld xmlns:a="http://schemas.openxmlformats.org/drawingml/2006/main" xmlns:r="http://schemas.openxmlformats.org/officeDocument/2006/relationships" xmlns:p="http://schemas.openxmlformats.org/presentationml/2006/main">
   <p:cSld>
     <p:spTree>
@@ -5135,7 +5313,7 @@
           <a:p>
             <a:fld id="{EDEBF0BA-A897-4C1E-AB3C-F330808C0E1D}" type="slidenum">
               <a:rPr lang="en-US" smtClean="0"/>
-              <a:t>14</a:t>
+              <a:t>15</a:t>
             </a:fld>
             <a:endParaRPr lang="en-US"/>
           </a:p>
@@ -5457,7 +5635,7 @@
 </p:sld>
 </file>
 
-<file path=ppt/slides/slide15.xml><?xml version="1.0" encoding="utf-8"?>
+<file path=ppt/slides/slide16.xml><?xml version="1.0" encoding="utf-8"?>
 <p:sld xmlns:a="http://schemas.openxmlformats.org/drawingml/2006/main" xmlns:r="http://schemas.openxmlformats.org/officeDocument/2006/relationships" xmlns:p="http://schemas.openxmlformats.org/presentationml/2006/main">
   <p:cSld>
     <p:spTree>
@@ -5656,7 +5834,7 @@
           <a:p>
             <a:fld id="{EDEBF0BA-A897-4C1E-AB3C-F330808C0E1D}" type="slidenum">
               <a:rPr lang="en-US" smtClean="0"/>
-              <a:t>15</a:t>
+              <a:t>16</a:t>
             </a:fld>
             <a:endParaRPr lang="en-US"/>
           </a:p>
@@ -5711,238 +5889,6 @@
 </p:sld>
 </file>
 
-<file path=ppt/slides/slide16.xml><?xml version="1.0" encoding="utf-8"?>
-<p:sld xmlns:a="http://schemas.openxmlformats.org/drawingml/2006/main" xmlns:r="http://schemas.openxmlformats.org/officeDocument/2006/relationships" xmlns:p="http://schemas.openxmlformats.org/presentationml/2006/main">
-  <p:cSld>
-    <p:spTree>
-      <p:nvGrpSpPr>
-        <p:cNvPr id="1" name=""/>
-        <p:cNvGrpSpPr/>
-        <p:nvPr/>
-      </p:nvGrpSpPr>
-      <p:grpSpPr>
-        <a:xfrm>
-          <a:off x="0" y="0"/>
-          <a:ext cx="0" cy="0"/>
-          <a:chOff x="0" y="0"/>
-          <a:chExt cx="0" cy="0"/>
-        </a:xfrm>
-      </p:grpSpPr>
-      <p:sp>
-        <p:nvSpPr>
-          <p:cNvPr id="6" name="Title 5">
-            <a:extLst>
-              <a:ext uri="{FF2B5EF4-FFF2-40B4-BE49-F238E27FC236}">
-                <a16:creationId xmlns:a16="http://schemas.microsoft.com/office/drawing/2014/main" id="{6F84FA54-65FA-4160-855E-2B56132F9651}"/>
-              </a:ext>
-            </a:extLst>
-          </p:cNvPr>
-          <p:cNvSpPr>
-            <a:spLocks noGrp="1"/>
-          </p:cNvSpPr>
-          <p:nvPr>
-            <p:ph type="title"/>
-          </p:nvPr>
-        </p:nvSpPr>
-        <p:spPr>
-          <a:xfrm>
-            <a:off x="838200" y="300731"/>
-            <a:ext cx="10515600" cy="1276932"/>
-          </a:xfrm>
-        </p:spPr>
-        <p:txBody>
-          <a:bodyPr/>
-          <a:lstStyle/>
-          <a:p>
-            <a:r>
-              <a:rPr lang="en-US" dirty="0"/>
-              <a:t>Experiments</a:t>
-            </a:r>
-            <a:br>
-              <a:rPr lang="en-US" dirty="0"/>
-            </a:br>
-            <a:r>
-              <a:rPr lang="en-US" sz="2400" dirty="0">
-                <a:hlinkClick r:id="rId2"/>
-              </a:rPr>
-              <a:t>https://JimFawcett.github.io/Tests.html</a:t>
-            </a:r>
-            <a:r>
-              <a:rPr lang="en-US" sz="2400" dirty="0"/>
-              <a:t> - Main menu &gt; Resources &gt; UI Widget Tests </a:t>
-            </a:r>
-            <a:r>
-              <a:rPr lang="en-US" sz="2400" dirty="0">
-                <a:hlinkClick r:id="rId3"/>
-              </a:rPr>
-              <a:t>https://JimFawcett.github.io/SiteStory_4.html</a:t>
-            </a:r>
-            <a:r>
-              <a:rPr lang="en-US" sz="2400" dirty="0"/>
-              <a:t> - Main menu &gt; stories &gt; </a:t>
-            </a:r>
-            <a:r>
-              <a:rPr lang="en-US" sz="2400" dirty="0" err="1"/>
-              <a:t>SiteStory</a:t>
-            </a:r>
-            <a:endParaRPr lang="en-US" dirty="0"/>
-          </a:p>
-        </p:txBody>
-      </p:sp>
-      <p:sp>
-        <p:nvSpPr>
-          <p:cNvPr id="7" name="Content Placeholder 6">
-            <a:extLst>
-              <a:ext uri="{FF2B5EF4-FFF2-40B4-BE49-F238E27FC236}">
-                <a16:creationId xmlns:a16="http://schemas.microsoft.com/office/drawing/2014/main" id="{1BF0FC12-D67B-4A58-8EC4-1867ACA2F8BD}"/>
-              </a:ext>
-            </a:extLst>
-          </p:cNvPr>
-          <p:cNvSpPr>
-            <a:spLocks noGrp="1"/>
-          </p:cNvSpPr>
-          <p:nvPr>
-            <p:ph idx="1"/>
-          </p:nvPr>
-        </p:nvSpPr>
-        <p:spPr>
-          <a:xfrm>
-            <a:off x="838200" y="1909213"/>
-            <a:ext cx="10515600" cy="4605741"/>
-          </a:xfrm>
-        </p:spPr>
-        <p:txBody>
-          <a:bodyPr>
-            <a:noAutofit/>
-          </a:bodyPr>
-          <a:lstStyle/>
-          <a:p>
-            <a:r>
-              <a:rPr lang="en-US" sz="2400" dirty="0"/>
-              <a:t>Experiments to make the site’s publishing process more effective are continuing:</a:t>
-            </a:r>
-          </a:p>
-          <a:p>
-            <a:pPr lvl="1"/>
-            <a:r>
-              <a:rPr lang="en-US" sz="2000" dirty="0"/>
-              <a:t>Developing UI widgets to use webpage real estate effectively</a:t>
-            </a:r>
-          </a:p>
-          <a:p>
-            <a:pPr lvl="2"/>
-            <a:r>
-              <a:rPr lang="en-US" sz="1800" dirty="0"/>
-              <a:t>User driven diagram resizer</a:t>
-            </a:r>
-          </a:p>
-          <a:p>
-            <a:pPr lvl="2"/>
-            <a:r>
-              <a:rPr lang="en-US" sz="1800" dirty="0"/>
-              <a:t>Slide-in panels</a:t>
-            </a:r>
-          </a:p>
-          <a:p>
-            <a:pPr lvl="2"/>
-            <a:r>
-              <a:rPr lang="en-US" sz="1800" dirty="0"/>
-              <a:t>Slide show</a:t>
-            </a:r>
-          </a:p>
-          <a:p>
-            <a:pPr lvl="2"/>
-            <a:r>
-              <a:rPr lang="en-US" sz="1800" dirty="0"/>
-              <a:t>Code blocks for presentation</a:t>
-            </a:r>
-          </a:p>
-          <a:p>
-            <a:pPr lvl="2"/>
-            <a:r>
-              <a:rPr lang="en-US" sz="1800" dirty="0"/>
-              <a:t>Photo styling</a:t>
-            </a:r>
-          </a:p>
-          <a:p>
-            <a:pPr lvl="1"/>
-            <a:r>
-              <a:rPr lang="en-US" sz="2000" dirty="0"/>
-              <a:t>Navigation schemes</a:t>
-            </a:r>
-          </a:p>
-          <a:p>
-            <a:pPr lvl="2"/>
-            <a:r>
-              <a:rPr lang="en-US" sz="1800" dirty="0"/>
-              <a:t>Dropdown menus</a:t>
-            </a:r>
-          </a:p>
-          <a:p>
-            <a:pPr lvl="2"/>
-            <a:r>
-              <a:rPr lang="en-US" sz="1800" dirty="0"/>
-              <a:t>Page sequences (defined by hidden links)</a:t>
-            </a:r>
-          </a:p>
-          <a:p>
-            <a:pPr lvl="2"/>
-            <a:r>
-              <a:rPr lang="en-US" sz="1800" dirty="0"/>
-              <a:t>Navigation buttons and key presses</a:t>
-            </a:r>
-          </a:p>
-          <a:p>
-            <a:pPr lvl="1"/>
-            <a:r>
-              <a:rPr lang="en-US" sz="2000" dirty="0"/>
-              <a:t>Continuing to think about site organization schemes</a:t>
-            </a:r>
-          </a:p>
-        </p:txBody>
-      </p:sp>
-      <p:sp>
-        <p:nvSpPr>
-          <p:cNvPr id="5" name="Slide Number Placeholder 4">
-            <a:extLst>
-              <a:ext uri="{FF2B5EF4-FFF2-40B4-BE49-F238E27FC236}">
-                <a16:creationId xmlns:a16="http://schemas.microsoft.com/office/drawing/2014/main" id="{175BF427-C62C-4AB5-A038-A22DED838917}"/>
-              </a:ext>
-            </a:extLst>
-          </p:cNvPr>
-          <p:cNvSpPr>
-            <a:spLocks noGrp="1"/>
-          </p:cNvSpPr>
-          <p:nvPr>
-            <p:ph type="sldNum" sz="quarter" idx="12"/>
-          </p:nvPr>
-        </p:nvSpPr>
-        <p:spPr/>
-        <p:txBody>
-          <a:bodyPr/>
-          <a:lstStyle/>
-          <a:p>
-            <a:fld id="{EDEBF0BA-A897-4C1E-AB3C-F330808C0E1D}" type="slidenum">
-              <a:rPr lang="en-US" smtClean="0"/>
-              <a:t>16</a:t>
-            </a:fld>
-            <a:endParaRPr lang="en-US"/>
-          </a:p>
-        </p:txBody>
-      </p:sp>
-    </p:spTree>
-    <p:extLst>
-      <p:ext uri="{BB962C8B-B14F-4D97-AF65-F5344CB8AC3E}">
-        <p14:creationId xmlns:p14="http://schemas.microsoft.com/office/powerpoint/2010/main" val="3303993548"/>
-      </p:ext>
-    </p:extLst>
-  </p:cSld>
-  <p:clrMapOvr>
-    <a:masterClrMapping/>
-  </p:clrMapOvr>
-</p:sld>
-</file>
-
 <file path=ppt/slides/slide17.xml><?xml version="1.0" encoding="utf-8"?>
 <p:sld xmlns:a="http://schemas.openxmlformats.org/drawingml/2006/main" xmlns:r="http://schemas.openxmlformats.org/officeDocument/2006/relationships" xmlns:p="http://schemas.openxmlformats.org/presentationml/2006/main">
   <p:cSld>
@@ -5962,10 +5908,10 @@
       </p:grpSpPr>
       <p:sp>
         <p:nvSpPr>
-          <p:cNvPr id="2" name="Title 1">
-            <a:extLst>
-              <a:ext uri="{FF2B5EF4-FFF2-40B4-BE49-F238E27FC236}">
-                <a16:creationId xmlns:a16="http://schemas.microsoft.com/office/drawing/2014/main" id="{ACAA7557-4583-4CE5-9450-333B91340133}"/>
+          <p:cNvPr id="6" name="Title 5">
+            <a:extLst>
+              <a:ext uri="{FF2B5EF4-FFF2-40B4-BE49-F238E27FC236}">
+                <a16:creationId xmlns:a16="http://schemas.microsoft.com/office/drawing/2014/main" id="{6F84FA54-65FA-4160-855E-2B56132F9651}"/>
               </a:ext>
             </a:extLst>
           </p:cNvPr>
@@ -5978,211 +5924,167 @@
         </p:nvSpPr>
         <p:spPr>
           <a:xfrm>
-            <a:off x="838200" y="365126"/>
-            <a:ext cx="5257800" cy="806852"/>
+            <a:off x="838200" y="300731"/>
+            <a:ext cx="10515600" cy="1276932"/>
           </a:xfrm>
         </p:spPr>
         <p:txBody>
-          <a:bodyPr>
-            <a:normAutofit/>
-          </a:bodyPr>
-          <a:lstStyle/>
-          <a:p>
-            <a:r>
-              <a:rPr lang="en-US" sz="4000" dirty="0"/>
-              <a:t>Status and Conclusions</a:t>
-            </a:r>
-          </a:p>
-        </p:txBody>
-      </p:sp>
-      <p:sp>
-        <p:nvSpPr>
-          <p:cNvPr id="5" name="Content Placeholder 4">
-            <a:extLst>
-              <a:ext uri="{FF2B5EF4-FFF2-40B4-BE49-F238E27FC236}">
-                <a16:creationId xmlns:a16="http://schemas.microsoft.com/office/drawing/2014/main" id="{F59047EB-518C-4D47-AE0E-61C2D22A203D}"/>
-              </a:ext>
-            </a:extLst>
-          </p:cNvPr>
-          <p:cNvSpPr>
-            <a:spLocks noGrp="1"/>
-          </p:cNvSpPr>
-          <p:nvPr>
-            <p:ph sz="half" idx="1"/>
-          </p:nvPr>
-        </p:nvSpPr>
-        <p:spPr>
-          <a:xfrm>
-            <a:off x="709414" y="1345843"/>
-            <a:ext cx="5181600" cy="4856864"/>
-          </a:xfrm>
-        </p:spPr>
-        <p:txBody>
-          <a:bodyPr/>
-          <a:lstStyle/>
-          <a:p>
-            <a:r>
-              <a:rPr lang="en-US" dirty="0"/>
-              <a:t>Status - </a:t>
-            </a:r>
+          <a:bodyPr/>
+          <a:lstStyle/>
+          <a:p>
+            <a:r>
+              <a:rPr lang="en-US" dirty="0"/>
+              <a:t>Experiments</a:t>
+            </a:r>
+            <a:br>
+              <a:rPr lang="en-US" dirty="0"/>
+            </a:br>
             <a:r>
               <a:rPr lang="en-US" sz="2400" dirty="0">
                 <a:hlinkClick r:id="rId2"/>
               </a:rPr>
-              <a:t>https://JimFawcett.github.io</a:t>
+              <a:t>https://JimFawcett.github.io/Tests.html</a:t>
             </a:r>
             <a:r>
               <a:rPr lang="en-US" sz="2400" dirty="0"/>
-              <a:t>: </a:t>
+              <a:t> - Main menu &gt; Resources &gt; UI Widget Tests </a:t>
+            </a:r>
+            <a:r>
+              <a:rPr lang="en-US" sz="2400" dirty="0">
+                <a:hlinkClick r:id="rId3"/>
+              </a:rPr>
+              <a:t>https://JimFawcett.github.io/SiteStory_4.html</a:t>
+            </a:r>
+            <a:r>
+              <a:rPr lang="en-US" sz="2400" dirty="0"/>
+              <a:t> - Main menu &gt; stories &gt; </a:t>
+            </a:r>
+            <a:r>
+              <a:rPr lang="en-US" sz="2400" dirty="0" err="1"/>
+              <a:t>SiteStory</a:t>
             </a:r>
             <a:endParaRPr lang="en-US" dirty="0"/>
           </a:p>
-          <a:p>
-            <a:pPr lvl="1"/>
-            <a:r>
-              <a:rPr lang="en-US" dirty="0"/>
-              <a:t>Most of the structure described is in place</a:t>
-            </a:r>
-          </a:p>
-          <a:p>
-            <a:pPr lvl="1"/>
-            <a:r>
-              <a:rPr lang="en-US" dirty="0"/>
-              <a:t>More than 40 repositories of mostly C++ code are published</a:t>
-            </a:r>
-          </a:p>
-          <a:p>
-            <a:pPr lvl="1"/>
-            <a:r>
-              <a:rPr lang="en-US" dirty="0"/>
-              <a:t>Several stories are published</a:t>
-            </a:r>
-          </a:p>
-          <a:p>
-            <a:pPr lvl="1"/>
-            <a:r>
-              <a:rPr lang="en-US" dirty="0"/>
-              <a:t>Other resources and </a:t>
-            </a:r>
-            <a:r>
-              <a:rPr lang="en-US" dirty="0" err="1"/>
-              <a:t>CodeSnaps</a:t>
-            </a:r>
-            <a:r>
-              <a:rPr lang="en-US" dirty="0"/>
-              <a:t> are available from the site</a:t>
-            </a:r>
-          </a:p>
-          <a:p>
-            <a:r>
-              <a:rPr lang="en-US" dirty="0"/>
-              <a:t>Plans</a:t>
-            </a:r>
-          </a:p>
-          <a:p>
-            <a:pPr lvl="1"/>
-            <a:r>
-              <a:rPr lang="en-US" dirty="0"/>
-              <a:t>Install more code repositories</a:t>
-            </a:r>
-          </a:p>
-          <a:p>
-            <a:pPr lvl="1"/>
-            <a:r>
-              <a:rPr lang="en-US" dirty="0"/>
-              <a:t>Install starter site</a:t>
-            </a:r>
-          </a:p>
-          <a:p>
-            <a:pPr lvl="1"/>
-            <a:r>
-              <a:rPr lang="en-US" dirty="0"/>
-              <a:t>Start to add videos</a:t>
-            </a:r>
-          </a:p>
-        </p:txBody>
-      </p:sp>
-      <p:sp>
-        <p:nvSpPr>
-          <p:cNvPr id="6" name="Content Placeholder 5">
-            <a:extLst>
-              <a:ext uri="{FF2B5EF4-FFF2-40B4-BE49-F238E27FC236}">
-                <a16:creationId xmlns:a16="http://schemas.microsoft.com/office/drawing/2014/main" id="{FE80FAEC-8AE9-4AB5-9C84-5EEDD2807033}"/>
-              </a:ext>
-            </a:extLst>
-          </p:cNvPr>
-          <p:cNvSpPr>
-            <a:spLocks noGrp="1"/>
-          </p:cNvSpPr>
-          <p:nvPr>
-            <p:ph sz="half" idx="2"/>
+        </p:txBody>
+      </p:sp>
+      <p:sp>
+        <p:nvSpPr>
+          <p:cNvPr id="7" name="Content Placeholder 6">
+            <a:extLst>
+              <a:ext uri="{FF2B5EF4-FFF2-40B4-BE49-F238E27FC236}">
+                <a16:creationId xmlns:a16="http://schemas.microsoft.com/office/drawing/2014/main" id="{1BF0FC12-D67B-4A58-8EC4-1867ACA2F8BD}"/>
+              </a:ext>
+            </a:extLst>
+          </p:cNvPr>
+          <p:cNvSpPr>
+            <a:spLocks noGrp="1"/>
+          </p:cNvSpPr>
+          <p:nvPr>
+            <p:ph idx="1"/>
           </p:nvPr>
         </p:nvSpPr>
         <p:spPr>
           <a:xfrm>
-            <a:off x="6096000" y="1345843"/>
-            <a:ext cx="5296434" cy="5739066"/>
+            <a:off x="838200" y="1909213"/>
+            <a:ext cx="10515600" cy="4605741"/>
           </a:xfrm>
         </p:spPr>
         <p:txBody>
-          <a:bodyPr/>
-          <a:lstStyle/>
-          <a:p>
-            <a:r>
-              <a:rPr lang="en-US" dirty="0"/>
-              <a:t>Conclusions:</a:t>
-            </a:r>
-          </a:p>
-          <a:p>
-            <a:pPr lvl="1"/>
-            <a:r>
-              <a:rPr lang="en-US" dirty="0"/>
-              <a:t>Static sites seem like a good tool for publishing</a:t>
+          <a:bodyPr>
+            <a:noAutofit/>
+          </a:bodyPr>
+          <a:lstStyle/>
+          <a:p>
+            <a:r>
+              <a:rPr lang="en-US" sz="2400" dirty="0"/>
+              <a:t>Experiments to make the site’s publishing process more effective are continuing:</a:t>
+            </a:r>
+          </a:p>
+          <a:p>
+            <a:pPr lvl="1"/>
+            <a:r>
+              <a:rPr lang="en-US" sz="2000" dirty="0"/>
+              <a:t>Developing UI widgets to use webpage real estate effectively</a:t>
             </a:r>
           </a:p>
           <a:p>
             <a:pPr lvl="2"/>
             <a:r>
-              <a:rPr lang="en-US" dirty="0"/>
-              <a:t>Main issue is text or keyword searches not available with static sites</a:t>
+              <a:rPr lang="en-US" sz="1800" dirty="0"/>
+              <a:t>User driven diagram resizer</a:t>
             </a:r>
           </a:p>
           <a:p>
             <a:pPr lvl="2"/>
             <a:r>
-              <a:rPr lang="en-US" dirty="0"/>
-              <a:t>Can be addressed with local mirror and tools for synchronizing and local searching</a:t>
-            </a:r>
-          </a:p>
-          <a:p>
-            <a:pPr lvl="1"/>
-            <a:r>
-              <a:rPr lang="en-US" dirty="0"/>
-              <a:t>Required effort is reasonable for the expected payoff</a:t>
+              <a:rPr lang="en-US" sz="1800" dirty="0"/>
+              <a:t>Slide-in panels</a:t>
             </a:r>
           </a:p>
           <a:p>
             <a:pPr lvl="2"/>
             <a:r>
-              <a:rPr lang="en-US" dirty="0"/>
-              <a:t>This site went from zero to current status in four months of my time</a:t>
+              <a:rPr lang="en-US" sz="1800" dirty="0"/>
+              <a:t>Slide show</a:t>
             </a:r>
           </a:p>
           <a:p>
             <a:pPr lvl="2"/>
             <a:r>
-              <a:rPr lang="en-US" dirty="0"/>
-              <a:t>However, I’ve built a site like this before.</a:t>
-            </a:r>
-          </a:p>
-        </p:txBody>
-      </p:sp>
-      <p:sp>
-        <p:nvSpPr>
-          <p:cNvPr id="4" name="Slide Number Placeholder 3">
-            <a:extLst>
-              <a:ext uri="{FF2B5EF4-FFF2-40B4-BE49-F238E27FC236}">
-                <a16:creationId xmlns:a16="http://schemas.microsoft.com/office/drawing/2014/main" id="{A5C2B86A-AE47-44AF-9978-587D3DAADB7B}"/>
+              <a:rPr lang="en-US" sz="1800" dirty="0"/>
+              <a:t>Code blocks for presentation</a:t>
+            </a:r>
+          </a:p>
+          <a:p>
+            <a:pPr lvl="2"/>
+            <a:r>
+              <a:rPr lang="en-US" sz="1800" dirty="0"/>
+              <a:t>Photo styling</a:t>
+            </a:r>
+          </a:p>
+          <a:p>
+            <a:pPr lvl="1"/>
+            <a:r>
+              <a:rPr lang="en-US" sz="2000" dirty="0"/>
+              <a:t>Navigation schemes</a:t>
+            </a:r>
+          </a:p>
+          <a:p>
+            <a:pPr lvl="2"/>
+            <a:r>
+              <a:rPr lang="en-US" sz="1800" dirty="0"/>
+              <a:t>Dropdown menus</a:t>
+            </a:r>
+          </a:p>
+          <a:p>
+            <a:pPr lvl="2"/>
+            <a:r>
+              <a:rPr lang="en-US" sz="1800" dirty="0"/>
+              <a:t>Page sequences (defined by hidden links)</a:t>
+            </a:r>
+          </a:p>
+          <a:p>
+            <a:pPr lvl="2"/>
+            <a:r>
+              <a:rPr lang="en-US" sz="1800" dirty="0"/>
+              <a:t>Navigation buttons and key presses</a:t>
+            </a:r>
+          </a:p>
+          <a:p>
+            <a:pPr lvl="1"/>
+            <a:r>
+              <a:rPr lang="en-US" sz="2000" dirty="0"/>
+              <a:t>Continuing to think about site organization schemes</a:t>
+            </a:r>
+          </a:p>
+        </p:txBody>
+      </p:sp>
+      <p:sp>
+        <p:nvSpPr>
+          <p:cNvPr id="5" name="Slide Number Placeholder 4">
+            <a:extLst>
+              <a:ext uri="{FF2B5EF4-FFF2-40B4-BE49-F238E27FC236}">
+                <a16:creationId xmlns:a16="http://schemas.microsoft.com/office/drawing/2014/main" id="{175BF427-C62C-4AB5-A038-A22DED838917}"/>
               </a:ext>
             </a:extLst>
           </p:cNvPr>
@@ -6209,7 +6111,7 @@
     </p:spTree>
     <p:extLst>
       <p:ext uri="{BB962C8B-B14F-4D97-AF65-F5344CB8AC3E}">
-        <p14:creationId xmlns:p14="http://schemas.microsoft.com/office/powerpoint/2010/main" val="2191199278"/>
+        <p14:creationId xmlns:p14="http://schemas.microsoft.com/office/powerpoint/2010/main" val="3303993548"/>
       </p:ext>
     </p:extLst>
   </p:cSld>
@@ -6241,15 +6143,232 @@
           <p:cNvPr id="2" name="Title 1">
             <a:extLst>
               <a:ext uri="{FF2B5EF4-FFF2-40B4-BE49-F238E27FC236}">
-                <a16:creationId xmlns:a16="http://schemas.microsoft.com/office/drawing/2014/main" id="{508F2C2D-8A1E-4157-B36F-A4E30EAA74CE}"/>
-              </a:ext>
-            </a:extLst>
-          </p:cNvPr>
-          <p:cNvSpPr>
-            <a:spLocks noGrp="1"/>
-          </p:cNvSpPr>
-          <p:nvPr>
-            <p:ph type="ctrTitle"/>
+                <a16:creationId xmlns:a16="http://schemas.microsoft.com/office/drawing/2014/main" id="{ACAA7557-4583-4CE5-9450-333B91340133}"/>
+              </a:ext>
+            </a:extLst>
+          </p:cNvPr>
+          <p:cNvSpPr>
+            <a:spLocks noGrp="1"/>
+          </p:cNvSpPr>
+          <p:nvPr>
+            <p:ph type="title"/>
+          </p:nvPr>
+        </p:nvSpPr>
+        <p:spPr>
+          <a:xfrm>
+            <a:off x="838200" y="365126"/>
+            <a:ext cx="5257800" cy="806852"/>
+          </a:xfrm>
+        </p:spPr>
+        <p:txBody>
+          <a:bodyPr>
+            <a:normAutofit/>
+          </a:bodyPr>
+          <a:lstStyle/>
+          <a:p>
+            <a:r>
+              <a:rPr lang="en-US" sz="4000" dirty="0"/>
+              <a:t>Status and Conclusions</a:t>
+            </a:r>
+          </a:p>
+        </p:txBody>
+      </p:sp>
+      <p:sp>
+        <p:nvSpPr>
+          <p:cNvPr id="5" name="Content Placeholder 4">
+            <a:extLst>
+              <a:ext uri="{FF2B5EF4-FFF2-40B4-BE49-F238E27FC236}">
+                <a16:creationId xmlns:a16="http://schemas.microsoft.com/office/drawing/2014/main" id="{F59047EB-518C-4D47-AE0E-61C2D22A203D}"/>
+              </a:ext>
+            </a:extLst>
+          </p:cNvPr>
+          <p:cNvSpPr>
+            <a:spLocks noGrp="1"/>
+          </p:cNvSpPr>
+          <p:nvPr>
+            <p:ph sz="half" idx="1"/>
+          </p:nvPr>
+        </p:nvSpPr>
+        <p:spPr>
+          <a:xfrm>
+            <a:off x="709414" y="1345843"/>
+            <a:ext cx="5181600" cy="4856864"/>
+          </a:xfrm>
+        </p:spPr>
+        <p:txBody>
+          <a:bodyPr/>
+          <a:lstStyle/>
+          <a:p>
+            <a:r>
+              <a:rPr lang="en-US" dirty="0"/>
+              <a:t>Status - </a:t>
+            </a:r>
+            <a:r>
+              <a:rPr lang="en-US" sz="2400" dirty="0">
+                <a:hlinkClick r:id="rId2"/>
+              </a:rPr>
+              <a:t>https://JimFawcett.github.io</a:t>
+            </a:r>
+            <a:r>
+              <a:rPr lang="en-US" sz="2400" dirty="0"/>
+              <a:t>: </a:t>
+            </a:r>
+            <a:endParaRPr lang="en-US" dirty="0"/>
+          </a:p>
+          <a:p>
+            <a:pPr lvl="1"/>
+            <a:r>
+              <a:rPr lang="en-US" dirty="0"/>
+              <a:t>Most of the structure described is in place</a:t>
+            </a:r>
+          </a:p>
+          <a:p>
+            <a:pPr lvl="1"/>
+            <a:r>
+              <a:rPr lang="en-US" dirty="0"/>
+              <a:t>More than 40 repositories of mostly C++ code are published</a:t>
+            </a:r>
+          </a:p>
+          <a:p>
+            <a:pPr lvl="1"/>
+            <a:r>
+              <a:rPr lang="en-US" dirty="0"/>
+              <a:t>Several stories are published</a:t>
+            </a:r>
+          </a:p>
+          <a:p>
+            <a:pPr lvl="1"/>
+            <a:r>
+              <a:rPr lang="en-US" dirty="0"/>
+              <a:t>Other resources and </a:t>
+            </a:r>
+            <a:r>
+              <a:rPr lang="en-US" dirty="0" err="1"/>
+              <a:t>CodeSnaps</a:t>
+            </a:r>
+            <a:r>
+              <a:rPr lang="en-US" dirty="0"/>
+              <a:t> are available from the site</a:t>
+            </a:r>
+          </a:p>
+          <a:p>
+            <a:r>
+              <a:rPr lang="en-US" dirty="0"/>
+              <a:t>Plans</a:t>
+            </a:r>
+          </a:p>
+          <a:p>
+            <a:pPr lvl="1"/>
+            <a:r>
+              <a:rPr lang="en-US" dirty="0"/>
+              <a:t>Install more code repositories</a:t>
+            </a:r>
+          </a:p>
+          <a:p>
+            <a:pPr lvl="1"/>
+            <a:r>
+              <a:rPr lang="en-US" dirty="0"/>
+              <a:t>Install starter site</a:t>
+            </a:r>
+          </a:p>
+          <a:p>
+            <a:pPr lvl="1"/>
+            <a:r>
+              <a:rPr lang="en-US" dirty="0"/>
+              <a:t>Start to add videos</a:t>
+            </a:r>
+          </a:p>
+        </p:txBody>
+      </p:sp>
+      <p:sp>
+        <p:nvSpPr>
+          <p:cNvPr id="6" name="Content Placeholder 5">
+            <a:extLst>
+              <a:ext uri="{FF2B5EF4-FFF2-40B4-BE49-F238E27FC236}">
+                <a16:creationId xmlns:a16="http://schemas.microsoft.com/office/drawing/2014/main" id="{FE80FAEC-8AE9-4AB5-9C84-5EEDD2807033}"/>
+              </a:ext>
+            </a:extLst>
+          </p:cNvPr>
+          <p:cNvSpPr>
+            <a:spLocks noGrp="1"/>
+          </p:cNvSpPr>
+          <p:nvPr>
+            <p:ph sz="half" idx="2"/>
+          </p:nvPr>
+        </p:nvSpPr>
+        <p:spPr>
+          <a:xfrm>
+            <a:off x="6096000" y="1345843"/>
+            <a:ext cx="5296434" cy="5739066"/>
+          </a:xfrm>
+        </p:spPr>
+        <p:txBody>
+          <a:bodyPr/>
+          <a:lstStyle/>
+          <a:p>
+            <a:r>
+              <a:rPr lang="en-US" dirty="0"/>
+              <a:t>Conclusions:</a:t>
+            </a:r>
+          </a:p>
+          <a:p>
+            <a:pPr lvl="1"/>
+            <a:r>
+              <a:rPr lang="en-US" dirty="0"/>
+              <a:t>Static sites seem like a good tool for publishing</a:t>
+            </a:r>
+          </a:p>
+          <a:p>
+            <a:pPr lvl="2"/>
+            <a:r>
+              <a:rPr lang="en-US" dirty="0"/>
+              <a:t>Main issue is text or keyword searches not available with static sites</a:t>
+            </a:r>
+          </a:p>
+          <a:p>
+            <a:pPr lvl="2"/>
+            <a:r>
+              <a:rPr lang="en-US" dirty="0"/>
+              <a:t>Can be addressed with local mirror and tools for synchronizing and local searching</a:t>
+            </a:r>
+          </a:p>
+          <a:p>
+            <a:pPr lvl="1"/>
+            <a:r>
+              <a:rPr lang="en-US" dirty="0"/>
+              <a:t>Required effort is reasonable for the expected payoff</a:t>
+            </a:r>
+          </a:p>
+          <a:p>
+            <a:pPr lvl="2"/>
+            <a:r>
+              <a:rPr lang="en-US" dirty="0"/>
+              <a:t>This site went from zero to current status in four months of my time</a:t>
+            </a:r>
+          </a:p>
+          <a:p>
+            <a:pPr lvl="2"/>
+            <a:r>
+              <a:rPr lang="en-US" dirty="0"/>
+              <a:t>However, I’ve built a site like this before.</a:t>
+            </a:r>
+          </a:p>
+        </p:txBody>
+      </p:sp>
+      <p:sp>
+        <p:nvSpPr>
+          <p:cNvPr id="4" name="Slide Number Placeholder 3">
+            <a:extLst>
+              <a:ext uri="{FF2B5EF4-FFF2-40B4-BE49-F238E27FC236}">
+                <a16:creationId xmlns:a16="http://schemas.microsoft.com/office/drawing/2014/main" id="{A5C2B86A-AE47-44AF-9978-587D3DAADB7B}"/>
+              </a:ext>
+            </a:extLst>
+          </p:cNvPr>
+          <p:cNvSpPr>
+            <a:spLocks noGrp="1"/>
+          </p:cNvSpPr>
+          <p:nvPr>
+            <p:ph type="sldNum" sz="quarter" idx="12"/>
           </p:nvPr>
         </p:nvSpPr>
         <p:spPr/>
@@ -6257,17 +6376,18 @@
           <a:bodyPr/>
           <a:lstStyle/>
           <a:p>
-            <a:r>
-              <a:rPr lang="en-US" dirty="0"/>
-              <a:t>Appendix - Domains</a:t>
-            </a:r>
+            <a:fld id="{EDEBF0BA-A897-4C1E-AB3C-F330808C0E1D}" type="slidenum">
+              <a:rPr lang="en-US" smtClean="0"/>
+              <a:t>18</a:t>
+            </a:fld>
+            <a:endParaRPr lang="en-US"/>
           </a:p>
         </p:txBody>
       </p:sp>
     </p:spTree>
     <p:extLst>
       <p:ext uri="{BB962C8B-B14F-4D97-AF65-F5344CB8AC3E}">
-        <p14:creationId xmlns:p14="http://schemas.microsoft.com/office/powerpoint/2010/main" val="1857873718"/>
+        <p14:creationId xmlns:p14="http://schemas.microsoft.com/office/powerpoint/2010/main" val="2191199278"/>
       </p:ext>
     </p:extLst>
   </p:cSld>
@@ -6299,179 +6419,15 @@
           <p:cNvPr id="2" name="Title 1">
             <a:extLst>
               <a:ext uri="{FF2B5EF4-FFF2-40B4-BE49-F238E27FC236}">
-                <a16:creationId xmlns:a16="http://schemas.microsoft.com/office/drawing/2014/main" id="{C818CF9C-B350-4936-99E1-D89031958E0C}"/>
-              </a:ext>
-            </a:extLst>
-          </p:cNvPr>
-          <p:cNvSpPr>
-            <a:spLocks noGrp="1"/>
-          </p:cNvSpPr>
-          <p:nvPr>
-            <p:ph type="title"/>
-          </p:nvPr>
-        </p:nvSpPr>
-        <p:spPr>
-          <a:xfrm>
-            <a:off x="838200" y="339367"/>
-            <a:ext cx="10515600" cy="678161"/>
-          </a:xfrm>
-        </p:spPr>
-        <p:txBody>
-          <a:bodyPr>
-            <a:noAutofit/>
-          </a:bodyPr>
-          <a:lstStyle/>
-          <a:p>
-            <a:r>
-              <a:rPr lang="en-US" sz="3600" dirty="0"/>
-              <a:t>Application Domain Targets – Candidates for Support?</a:t>
-            </a:r>
-          </a:p>
-        </p:txBody>
-      </p:sp>
-      <p:sp>
-        <p:nvSpPr>
-          <p:cNvPr id="3" name="Content Placeholder 2">
-            <a:extLst>
-              <a:ext uri="{FF2B5EF4-FFF2-40B4-BE49-F238E27FC236}">
-                <a16:creationId xmlns:a16="http://schemas.microsoft.com/office/drawing/2014/main" id="{C65F66DE-FE31-4539-83AE-36CA6E637596}"/>
-              </a:ext>
-            </a:extLst>
-          </p:cNvPr>
-          <p:cNvSpPr>
-            <a:spLocks noGrp="1"/>
-          </p:cNvSpPr>
-          <p:nvPr>
-            <p:ph idx="1"/>
-          </p:nvPr>
-        </p:nvSpPr>
-        <p:spPr>
-          <a:xfrm>
-            <a:off x="838200" y="1183142"/>
-            <a:ext cx="10515600" cy="5355770"/>
-          </a:xfrm>
-        </p:spPr>
-        <p:txBody>
-          <a:bodyPr>
-            <a:noAutofit/>
-          </a:bodyPr>
-          <a:lstStyle/>
-          <a:p>
-            <a:r>
-              <a:rPr lang="en-US" sz="2000" dirty="0"/>
-              <a:t>Academic Research: 5 – 10 code developers</a:t>
-            </a:r>
-          </a:p>
-          <a:p>
-            <a:pPr lvl="1"/>
-            <a:r>
-              <a:rPr lang="en-US" sz="1800" dirty="0"/>
-              <a:t>Code life-time: 3 – 5 years</a:t>
-            </a:r>
-          </a:p>
-          <a:p>
-            <a:pPr lvl="1"/>
-            <a:r>
-              <a:rPr lang="en-US" sz="1800" dirty="0"/>
-              <a:t>Example: Natural Language Processing (NLP)</a:t>
-            </a:r>
-          </a:p>
-          <a:p>
-            <a:r>
-              <a:rPr lang="en-US" sz="2000" dirty="0"/>
-              <a:t>Open Source Development: 5 – 1000 active developers, many casual contributors</a:t>
-            </a:r>
-          </a:p>
-          <a:p>
-            <a:pPr lvl="1"/>
-            <a:r>
-              <a:rPr lang="en-US" sz="1800" dirty="0"/>
-              <a:t>Code life-time: 10 - 20 years</a:t>
-            </a:r>
-          </a:p>
-          <a:p>
-            <a:pPr lvl="1"/>
-            <a:r>
-              <a:rPr lang="en-US" sz="1800" dirty="0"/>
-              <a:t>Example: Linux</a:t>
-            </a:r>
-          </a:p>
-          <a:p>
-            <a:r>
-              <a:rPr lang="en-US" sz="2000" dirty="0"/>
-              <a:t>Industrial Development: 5 – 10 developers</a:t>
-            </a:r>
-          </a:p>
-          <a:p>
-            <a:pPr lvl="1"/>
-            <a:r>
-              <a:rPr lang="en-US" sz="1800" dirty="0"/>
-              <a:t>Code life-time: 5 – 20 years</a:t>
-            </a:r>
-          </a:p>
-          <a:p>
-            <a:pPr lvl="1"/>
-            <a:r>
-              <a:rPr lang="en-US" sz="1800" dirty="0"/>
-              <a:t>Example: Machine Tool Control</a:t>
-            </a:r>
-          </a:p>
-          <a:p>
-            <a:r>
-              <a:rPr lang="en-US" sz="2000" dirty="0"/>
-              <a:t>Commercial Products: 10 – 30 developers</a:t>
-            </a:r>
-          </a:p>
-          <a:p>
-            <a:pPr lvl="1"/>
-            <a:r>
-              <a:rPr lang="en-US" sz="1800" dirty="0"/>
-              <a:t>Code life-time: 20 – 30 years</a:t>
-            </a:r>
-          </a:p>
-          <a:p>
-            <a:pPr lvl="1"/>
-            <a:r>
-              <a:rPr lang="en-US" sz="1800" dirty="0"/>
-              <a:t>Example: Microsoft Word</a:t>
-            </a:r>
-          </a:p>
-          <a:p>
-            <a:r>
-              <a:rPr lang="en-US" sz="2000" dirty="0"/>
-              <a:t>Aerospace Programs: 5 – 200 developers</a:t>
-            </a:r>
-          </a:p>
-          <a:p>
-            <a:pPr lvl="1"/>
-            <a:r>
-              <a:rPr lang="en-US" sz="1600" dirty="0"/>
-              <a:t>Code life-time: 20 – 30 years</a:t>
-            </a:r>
-          </a:p>
-          <a:p>
-            <a:pPr lvl="1"/>
-            <a:r>
-              <a:rPr lang="en-US" sz="1600" dirty="0"/>
-              <a:t>Example: Submarine control, Area surveillance, ..</a:t>
-            </a:r>
-          </a:p>
-        </p:txBody>
-      </p:sp>
-      <p:sp>
-        <p:nvSpPr>
-          <p:cNvPr id="4" name="Slide Number Placeholder 3">
-            <a:extLst>
-              <a:ext uri="{FF2B5EF4-FFF2-40B4-BE49-F238E27FC236}">
-                <a16:creationId xmlns:a16="http://schemas.microsoft.com/office/drawing/2014/main" id="{F980341C-B802-4DB5-8B01-9BF021EDC77D}"/>
-              </a:ext>
-            </a:extLst>
-          </p:cNvPr>
-          <p:cNvSpPr>
-            <a:spLocks noGrp="1"/>
-          </p:cNvSpPr>
-          <p:nvPr>
-            <p:ph type="sldNum" sz="quarter" idx="12"/>
+                <a16:creationId xmlns:a16="http://schemas.microsoft.com/office/drawing/2014/main" id="{508F2C2D-8A1E-4157-B36F-A4E30EAA74CE}"/>
+              </a:ext>
+            </a:extLst>
+          </p:cNvPr>
+          <p:cNvSpPr>
+            <a:spLocks noGrp="1"/>
+          </p:cNvSpPr>
+          <p:nvPr>
+            <p:ph type="ctrTitle"/>
           </p:nvPr>
         </p:nvSpPr>
         <p:spPr/>
@@ -6479,18 +6435,17 @@
           <a:bodyPr/>
           <a:lstStyle/>
           <a:p>
-            <a:fld id="{EDEBF0BA-A897-4C1E-AB3C-F330808C0E1D}" type="slidenum">
-              <a:rPr lang="en-US" smtClean="0"/>
-              <a:t>19</a:t>
-            </a:fld>
-            <a:endParaRPr lang="en-US"/>
+            <a:r>
+              <a:rPr lang="en-US" dirty="0"/>
+              <a:t>Appendix - Domains</a:t>
+            </a:r>
           </a:p>
         </p:txBody>
       </p:sp>
     </p:spTree>
     <p:extLst>
       <p:ext uri="{BB962C8B-B14F-4D97-AF65-F5344CB8AC3E}">
-        <p14:creationId xmlns:p14="http://schemas.microsoft.com/office/powerpoint/2010/main" val="3759881247"/>
+        <p14:creationId xmlns:p14="http://schemas.microsoft.com/office/powerpoint/2010/main" val="1857873718"/>
       </p:ext>
     </p:extLst>
   </p:cSld>
@@ -6698,6 +6653,229 @@
       </p:grpSpPr>
       <p:sp>
         <p:nvSpPr>
+          <p:cNvPr id="2" name="Title 1">
+            <a:extLst>
+              <a:ext uri="{FF2B5EF4-FFF2-40B4-BE49-F238E27FC236}">
+                <a16:creationId xmlns:a16="http://schemas.microsoft.com/office/drawing/2014/main" id="{C818CF9C-B350-4936-99E1-D89031958E0C}"/>
+              </a:ext>
+            </a:extLst>
+          </p:cNvPr>
+          <p:cNvSpPr>
+            <a:spLocks noGrp="1"/>
+          </p:cNvSpPr>
+          <p:nvPr>
+            <p:ph type="title"/>
+          </p:nvPr>
+        </p:nvSpPr>
+        <p:spPr>
+          <a:xfrm>
+            <a:off x="838200" y="339367"/>
+            <a:ext cx="10515600" cy="678161"/>
+          </a:xfrm>
+        </p:spPr>
+        <p:txBody>
+          <a:bodyPr>
+            <a:noAutofit/>
+          </a:bodyPr>
+          <a:lstStyle/>
+          <a:p>
+            <a:r>
+              <a:rPr lang="en-US" sz="3600" dirty="0"/>
+              <a:t>Application Domain Targets – Candidates for Support?</a:t>
+            </a:r>
+          </a:p>
+        </p:txBody>
+      </p:sp>
+      <p:sp>
+        <p:nvSpPr>
+          <p:cNvPr id="3" name="Content Placeholder 2">
+            <a:extLst>
+              <a:ext uri="{FF2B5EF4-FFF2-40B4-BE49-F238E27FC236}">
+                <a16:creationId xmlns:a16="http://schemas.microsoft.com/office/drawing/2014/main" id="{C65F66DE-FE31-4539-83AE-36CA6E637596}"/>
+              </a:ext>
+            </a:extLst>
+          </p:cNvPr>
+          <p:cNvSpPr>
+            <a:spLocks noGrp="1"/>
+          </p:cNvSpPr>
+          <p:nvPr>
+            <p:ph idx="1"/>
+          </p:nvPr>
+        </p:nvSpPr>
+        <p:spPr>
+          <a:xfrm>
+            <a:off x="838200" y="1183142"/>
+            <a:ext cx="10515600" cy="5355770"/>
+          </a:xfrm>
+        </p:spPr>
+        <p:txBody>
+          <a:bodyPr>
+            <a:noAutofit/>
+          </a:bodyPr>
+          <a:lstStyle/>
+          <a:p>
+            <a:r>
+              <a:rPr lang="en-US" sz="2000" dirty="0"/>
+              <a:t>Academic Research: 5 – 10 code developers</a:t>
+            </a:r>
+          </a:p>
+          <a:p>
+            <a:pPr lvl="1"/>
+            <a:r>
+              <a:rPr lang="en-US" sz="1800" dirty="0"/>
+              <a:t>Code life-time: 3 – 5 years</a:t>
+            </a:r>
+          </a:p>
+          <a:p>
+            <a:pPr lvl="1"/>
+            <a:r>
+              <a:rPr lang="en-US" sz="1800" dirty="0"/>
+              <a:t>Example: Natural Language Processing (NLP)</a:t>
+            </a:r>
+          </a:p>
+          <a:p>
+            <a:r>
+              <a:rPr lang="en-US" sz="2000" dirty="0"/>
+              <a:t>Open Source Development: 5 – 1000 active developers, many casual contributors</a:t>
+            </a:r>
+          </a:p>
+          <a:p>
+            <a:pPr lvl="1"/>
+            <a:r>
+              <a:rPr lang="en-US" sz="1800" dirty="0"/>
+              <a:t>Code life-time: 10 - 20 years</a:t>
+            </a:r>
+          </a:p>
+          <a:p>
+            <a:pPr lvl="1"/>
+            <a:r>
+              <a:rPr lang="en-US" sz="1800" dirty="0"/>
+              <a:t>Example: Linux</a:t>
+            </a:r>
+          </a:p>
+          <a:p>
+            <a:r>
+              <a:rPr lang="en-US" sz="2000" dirty="0"/>
+              <a:t>Industrial Development: 5 – 10 developers</a:t>
+            </a:r>
+          </a:p>
+          <a:p>
+            <a:pPr lvl="1"/>
+            <a:r>
+              <a:rPr lang="en-US" sz="1800" dirty="0"/>
+              <a:t>Code life-time: 5 – 20 years</a:t>
+            </a:r>
+          </a:p>
+          <a:p>
+            <a:pPr lvl="1"/>
+            <a:r>
+              <a:rPr lang="en-US" sz="1800" dirty="0"/>
+              <a:t>Example: Machine Tool Control</a:t>
+            </a:r>
+          </a:p>
+          <a:p>
+            <a:r>
+              <a:rPr lang="en-US" sz="2000" dirty="0"/>
+              <a:t>Commercial Products: 10 – 30 developers</a:t>
+            </a:r>
+          </a:p>
+          <a:p>
+            <a:pPr lvl="1"/>
+            <a:r>
+              <a:rPr lang="en-US" sz="1800" dirty="0"/>
+              <a:t>Code life-time: 20 – 30 years</a:t>
+            </a:r>
+          </a:p>
+          <a:p>
+            <a:pPr lvl="1"/>
+            <a:r>
+              <a:rPr lang="en-US" sz="1800" dirty="0"/>
+              <a:t>Example: Microsoft Word</a:t>
+            </a:r>
+          </a:p>
+          <a:p>
+            <a:r>
+              <a:rPr lang="en-US" sz="2000" dirty="0"/>
+              <a:t>Aerospace Programs: 5 – 200 developers</a:t>
+            </a:r>
+          </a:p>
+          <a:p>
+            <a:pPr lvl="1"/>
+            <a:r>
+              <a:rPr lang="en-US" sz="1600" dirty="0"/>
+              <a:t>Code life-time: 20 – 30 years</a:t>
+            </a:r>
+          </a:p>
+          <a:p>
+            <a:pPr lvl="1"/>
+            <a:r>
+              <a:rPr lang="en-US" sz="1600" dirty="0"/>
+              <a:t>Example: Submarine control, Area surveillance, ..</a:t>
+            </a:r>
+          </a:p>
+        </p:txBody>
+      </p:sp>
+      <p:sp>
+        <p:nvSpPr>
+          <p:cNvPr id="4" name="Slide Number Placeholder 3">
+            <a:extLst>
+              <a:ext uri="{FF2B5EF4-FFF2-40B4-BE49-F238E27FC236}">
+                <a16:creationId xmlns:a16="http://schemas.microsoft.com/office/drawing/2014/main" id="{F980341C-B802-4DB5-8B01-9BF021EDC77D}"/>
+              </a:ext>
+            </a:extLst>
+          </p:cNvPr>
+          <p:cNvSpPr>
+            <a:spLocks noGrp="1"/>
+          </p:cNvSpPr>
+          <p:nvPr>
+            <p:ph type="sldNum" sz="quarter" idx="12"/>
+          </p:nvPr>
+        </p:nvSpPr>
+        <p:spPr/>
+        <p:txBody>
+          <a:bodyPr/>
+          <a:lstStyle/>
+          <a:p>
+            <a:fld id="{EDEBF0BA-A897-4C1E-AB3C-F330808C0E1D}" type="slidenum">
+              <a:rPr lang="en-US" smtClean="0"/>
+              <a:t>20</a:t>
+            </a:fld>
+            <a:endParaRPr lang="en-US"/>
+          </a:p>
+        </p:txBody>
+      </p:sp>
+    </p:spTree>
+    <p:extLst>
+      <p:ext uri="{BB962C8B-B14F-4D97-AF65-F5344CB8AC3E}">
+        <p14:creationId xmlns:p14="http://schemas.microsoft.com/office/powerpoint/2010/main" val="3759881247"/>
+      </p:ext>
+    </p:extLst>
+  </p:cSld>
+  <p:clrMapOvr>
+    <a:masterClrMapping/>
+  </p:clrMapOvr>
+</p:sld>
+</file>
+
+<file path=ppt/slides/slide21.xml><?xml version="1.0" encoding="utf-8"?>
+<p:sld xmlns:a="http://schemas.openxmlformats.org/drawingml/2006/main" xmlns:r="http://schemas.openxmlformats.org/officeDocument/2006/relationships" xmlns:p="http://schemas.openxmlformats.org/presentationml/2006/main">
+  <p:cSld>
+    <p:spTree>
+      <p:nvGrpSpPr>
+        <p:cNvPr id="1" name=""/>
+        <p:cNvGrpSpPr/>
+        <p:nvPr/>
+      </p:nvGrpSpPr>
+      <p:grpSpPr>
+        <a:xfrm>
+          <a:off x="0" y="0"/>
+          <a:ext cx="0" cy="0"/>
+          <a:chOff x="0" y="0"/>
+          <a:chExt cx="0" cy="0"/>
+        </a:xfrm>
+      </p:grpSpPr>
+      <p:sp>
+        <p:nvSpPr>
           <p:cNvPr id="4" name="Rectangle 3">
             <a:extLst>
               <a:ext uri="{FF2B5EF4-FFF2-40B4-BE49-F238E27FC236}">
@@ -6931,7 +7109,7 @@
           <a:p>
             <a:fld id="{EDEBF0BA-A897-4C1E-AB3C-F330808C0E1D}" type="slidenum">
               <a:rPr lang="en-US" smtClean="0"/>
-              <a:t>20</a:t>
+              <a:t>21</a:t>
             </a:fld>
             <a:endParaRPr lang="en-US"/>
           </a:p>
@@ -6950,7 +7128,7 @@
 </p:sld>
 </file>
 
-<file path=ppt/slides/slide21.xml><?xml version="1.0" encoding="utf-8"?>
+<file path=ppt/slides/slide22.xml><?xml version="1.0" encoding="utf-8"?>
 <p:sld xmlns:a="http://schemas.openxmlformats.org/drawingml/2006/main" xmlns:r="http://schemas.openxmlformats.org/officeDocument/2006/relationships" xmlns:p="http://schemas.openxmlformats.org/presentationml/2006/main">
   <p:cSld>
     <p:spTree>
@@ -7211,7 +7389,7 @@
           <a:p>
             <a:fld id="{EDEBF0BA-A897-4C1E-AB3C-F330808C0E1D}" type="slidenum">
               <a:rPr lang="en-US" smtClean="0"/>
-              <a:t>21</a:t>
+              <a:t>22</a:t>
             </a:fld>
             <a:endParaRPr lang="en-US"/>
           </a:p>
@@ -7221,190 +7399,6 @@
     <p:extLst>
       <p:ext uri="{BB962C8B-B14F-4D97-AF65-F5344CB8AC3E}">
         <p14:creationId xmlns:p14="http://schemas.microsoft.com/office/powerpoint/2010/main" val="99145666"/>
-      </p:ext>
-    </p:extLst>
-  </p:cSld>
-  <p:clrMapOvr>
-    <a:masterClrMapping/>
-  </p:clrMapOvr>
-</p:sld>
-</file>
-
-<file path=ppt/slides/slide22.xml><?xml version="1.0" encoding="utf-8"?>
-<p:sld xmlns:a="http://schemas.openxmlformats.org/drawingml/2006/main" xmlns:r="http://schemas.openxmlformats.org/officeDocument/2006/relationships" xmlns:p="http://schemas.openxmlformats.org/presentationml/2006/main">
-  <p:cSld>
-    <p:spTree>
-      <p:nvGrpSpPr>
-        <p:cNvPr id="1" name=""/>
-        <p:cNvGrpSpPr/>
-        <p:nvPr/>
-      </p:nvGrpSpPr>
-      <p:grpSpPr>
-        <a:xfrm>
-          <a:off x="0" y="0"/>
-          <a:ext cx="0" cy="0"/>
-          <a:chOff x="0" y="0"/>
-          <a:chExt cx="0" cy="0"/>
-        </a:xfrm>
-      </p:grpSpPr>
-      <p:sp>
-        <p:nvSpPr>
-          <p:cNvPr id="2" name="Title 1">
-            <a:extLst>
-              <a:ext uri="{FF2B5EF4-FFF2-40B4-BE49-F238E27FC236}">
-                <a16:creationId xmlns:a16="http://schemas.microsoft.com/office/drawing/2014/main" id="{C818CF9C-B350-4936-99E1-D89031958E0C}"/>
-              </a:ext>
-            </a:extLst>
-          </p:cNvPr>
-          <p:cNvSpPr>
-            <a:spLocks noGrp="1"/>
-          </p:cNvSpPr>
-          <p:nvPr>
-            <p:ph type="title"/>
-          </p:nvPr>
-        </p:nvSpPr>
-        <p:spPr>
-          <a:xfrm>
-            <a:off x="838200" y="339367"/>
-            <a:ext cx="10515600" cy="678161"/>
-          </a:xfrm>
-        </p:spPr>
-        <p:txBody>
-          <a:bodyPr/>
-          <a:lstStyle/>
-          <a:p>
-            <a:r>
-              <a:rPr lang="en-US" dirty="0"/>
-              <a:t>Academic Research Domain</a:t>
-            </a:r>
-          </a:p>
-        </p:txBody>
-      </p:sp>
-      <p:sp>
-        <p:nvSpPr>
-          <p:cNvPr id="3" name="Content Placeholder 2">
-            <a:extLst>
-              <a:ext uri="{FF2B5EF4-FFF2-40B4-BE49-F238E27FC236}">
-                <a16:creationId xmlns:a16="http://schemas.microsoft.com/office/drawing/2014/main" id="{C65F66DE-FE31-4539-83AE-36CA6E637596}"/>
-              </a:ext>
-            </a:extLst>
-          </p:cNvPr>
-          <p:cNvSpPr>
-            <a:spLocks noGrp="1"/>
-          </p:cNvSpPr>
-          <p:nvPr>
-            <p:ph idx="1"/>
-          </p:nvPr>
-        </p:nvSpPr>
-        <p:spPr>
-          <a:xfrm>
-            <a:off x="838200" y="1017529"/>
-            <a:ext cx="10515600" cy="5355770"/>
-          </a:xfrm>
-        </p:spPr>
-        <p:txBody>
-          <a:bodyPr>
-            <a:noAutofit/>
-          </a:bodyPr>
-          <a:lstStyle/>
-          <a:p>
-            <a:r>
-              <a:rPr lang="en-US" sz="2000" dirty="0"/>
-              <a:t>Academic Research: 5 – 10 code developers</a:t>
-            </a:r>
-          </a:p>
-          <a:p>
-            <a:pPr lvl="1"/>
-            <a:r>
-              <a:rPr lang="en-US" sz="1800" dirty="0"/>
-              <a:t>Code life-time: 3 – 5 years</a:t>
-            </a:r>
-          </a:p>
-          <a:p>
-            <a:pPr lvl="1"/>
-            <a:r>
-              <a:rPr lang="en-US" sz="1800" dirty="0"/>
-              <a:t>Example: Natural Language Processing (NLP)</a:t>
-            </a:r>
-          </a:p>
-          <a:p>
-            <a:r>
-              <a:rPr lang="en-US" sz="2000" dirty="0"/>
-              <a:t>An academic researcher may have 2 or 3 doctoral candidates working on related parts of a research project.</a:t>
-            </a:r>
-          </a:p>
-          <a:p>
-            <a:r>
-              <a:rPr lang="en-US" sz="2000" dirty="0"/>
-              <a:t>She may collaborate with two or three colleagues, perhaps at different universities.</a:t>
-            </a:r>
-          </a:p>
-          <a:p>
-            <a:pPr lvl="1"/>
-            <a:r>
-              <a:rPr lang="en-US" sz="1800" dirty="0"/>
-              <a:t>Each of those colleagues may have a similar team working on related projects.</a:t>
-            </a:r>
-          </a:p>
-          <a:p>
-            <a:r>
-              <a:rPr lang="en-US" sz="2200" dirty="0"/>
-              <a:t>There usually is continuing work on the same or related research projects for many years.</a:t>
-            </a:r>
-          </a:p>
-          <a:p>
-            <a:r>
-              <a:rPr lang="en-US" sz="2200" dirty="0"/>
-              <a:t>It is quite common that this work develops software tools for gathering and analyzing data.  Sometimes software is part of the end product, e.g., compilers for a new language, an architecture for streaming or classifying content, …</a:t>
-            </a:r>
-          </a:p>
-          <a:p>
-            <a:r>
-              <a:rPr lang="en-US" sz="2200" dirty="0"/>
-              <a:t>These software developments are rarely maintained well.  Often documentation is nothing but code and the papers that describe research results and mention the software as an aside.</a:t>
-            </a:r>
-          </a:p>
-          <a:p>
-            <a:r>
-              <a:rPr lang="en-US" sz="2200" dirty="0"/>
-              <a:t>Our methods are applicable.</a:t>
-            </a:r>
-          </a:p>
-        </p:txBody>
-      </p:sp>
-      <p:sp>
-        <p:nvSpPr>
-          <p:cNvPr id="4" name="Slide Number Placeholder 3">
-            <a:extLst>
-              <a:ext uri="{FF2B5EF4-FFF2-40B4-BE49-F238E27FC236}">
-                <a16:creationId xmlns:a16="http://schemas.microsoft.com/office/drawing/2014/main" id="{B11F232F-AB6D-4130-9246-6A1AF1E6451D}"/>
-              </a:ext>
-            </a:extLst>
-          </p:cNvPr>
-          <p:cNvSpPr>
-            <a:spLocks noGrp="1"/>
-          </p:cNvSpPr>
-          <p:nvPr>
-            <p:ph type="sldNum" sz="quarter" idx="12"/>
-          </p:nvPr>
-        </p:nvSpPr>
-        <p:spPr/>
-        <p:txBody>
-          <a:bodyPr/>
-          <a:lstStyle/>
-          <a:p>
-            <a:fld id="{EDEBF0BA-A897-4C1E-AB3C-F330808C0E1D}" type="slidenum">
-              <a:rPr lang="en-US" smtClean="0"/>
-              <a:t>22</a:t>
-            </a:fld>
-            <a:endParaRPr lang="en-US"/>
-          </a:p>
-        </p:txBody>
-      </p:sp>
-    </p:spTree>
-    <p:extLst>
-      <p:ext uri="{BB962C8B-B14F-4D97-AF65-F5344CB8AC3E}">
-        <p14:creationId xmlns:p14="http://schemas.microsoft.com/office/powerpoint/2010/main" val="3236624771"/>
       </p:ext>
     </p:extLst>
   </p:cSld>
@@ -7459,7 +7453,7 @@
           <a:p>
             <a:r>
               <a:rPr lang="en-US" dirty="0"/>
-              <a:t>Open Source Domain</a:t>
+              <a:t>Academic Research Domain</a:t>
             </a:r>
           </a:p>
         </p:txBody>
@@ -7482,7 +7476,7 @@
         </p:nvSpPr>
         <p:spPr>
           <a:xfrm>
-            <a:off x="838200" y="1216909"/>
+            <a:off x="838200" y="1017529"/>
             <a:ext cx="10515600" cy="5355770"/>
           </a:xfrm>
         </p:spPr>
@@ -7494,101 +7488,64 @@
           <a:p>
             <a:r>
               <a:rPr lang="en-US" sz="2000" dirty="0"/>
-              <a:t>Open Source Development: 5 – 1000 active developers, many casual contributors</a:t>
+              <a:t>Academic Research: 5 – 10 code developers</a:t>
             </a:r>
           </a:p>
           <a:p>
             <a:pPr lvl="1"/>
             <a:r>
               <a:rPr lang="en-US" sz="1800" dirty="0"/>
-              <a:t>Code life-time: 10 - 20 years</a:t>
+              <a:t>Code life-time: 3 – 5 years</a:t>
             </a:r>
           </a:p>
           <a:p>
             <a:pPr lvl="1"/>
             <a:r>
               <a:rPr lang="en-US" sz="1800" dirty="0"/>
-              <a:t>Examples: Linux, Node.js, MongoDB</a:t>
+              <a:t>Example: Natural Language Processing (NLP)</a:t>
+            </a:r>
+          </a:p>
+          <a:p>
+            <a:r>
+              <a:rPr lang="en-US" sz="2000" dirty="0"/>
+              <a:t>An academic researcher may have 2 or 3 doctoral candidates working on related parts of a research project.</a:t>
+            </a:r>
+          </a:p>
+          <a:p>
+            <a:r>
+              <a:rPr lang="en-US" sz="2000" dirty="0"/>
+              <a:t>She may collaborate with two or three colleagues, perhaps at different universities.</a:t>
+            </a:r>
+          </a:p>
+          <a:p>
+            <a:pPr lvl="1"/>
+            <a:r>
+              <a:rPr lang="en-US" sz="1800" dirty="0"/>
+              <a:t>Each of those colleagues may have a similar team working on related projects.</a:t>
             </a:r>
           </a:p>
           <a:p>
             <a:r>
               <a:rPr lang="en-US" sz="2200" dirty="0"/>
-              <a:t>Following an initial period of development, a project often settles into a maintenance mode:</a:t>
-            </a:r>
-          </a:p>
-          <a:p>
-            <a:pPr lvl="1"/>
-            <a:r>
-              <a:rPr lang="en-US" sz="1800" dirty="0"/>
-              <a:t>Maintain the same mission and design.</a:t>
-            </a:r>
-          </a:p>
-          <a:p>
-            <a:pPr lvl="1"/>
-            <a:r>
-              <a:rPr lang="en-US" sz="1800" dirty="0"/>
-              <a:t>Add new features and port to new platforms.</a:t>
+              <a:t>There usually is continuing work on the same or related research projects for many years.</a:t>
             </a:r>
           </a:p>
           <a:p>
             <a:r>
               <a:rPr lang="en-US" sz="2200" dirty="0"/>
-              <a:t>Occasionally revise most of the code and support new missions.</a:t>
+              <a:t>It is quite common that this work develops software tools for gathering and analyzing data.  Sometimes software is part of the end product, e.g., compilers for a new language, an architecture for streaming or classifying content, …</a:t>
             </a:r>
           </a:p>
           <a:p>
             <a:r>
               <a:rPr lang="en-US" sz="2200" dirty="0"/>
-              <a:t>Documentation varies from poor to outstanding.</a:t>
-            </a:r>
-          </a:p>
-          <a:p>
-            <a:pPr lvl="1"/>
-            <a:r>
-              <a:rPr lang="en-US" sz="1800" dirty="0"/>
-              <a:t>Linux documentation is one of the outstanding ones: </a:t>
-            </a:r>
-          </a:p>
-          <a:p>
-            <a:pPr lvl="2"/>
-            <a:r>
-              <a:rPr lang="en-US" sz="1400" dirty="0">
-                <a:hlinkClick r:id="rId2"/>
-              </a:rPr>
-              <a:t>https://www.kernel.org/doc/html/v4.10/index.html</a:t>
-            </a:r>
-            <a:r>
-              <a:rPr lang="en-US" sz="1400" dirty="0"/>
-              <a:t> </a:t>
-            </a:r>
-          </a:p>
-          <a:p>
-            <a:pPr lvl="1"/>
-            <a:r>
-              <a:rPr lang="en-US" sz="1800" dirty="0"/>
-              <a:t>Some projects focus on </a:t>
-            </a:r>
-            <a:r>
-              <a:rPr lang="en-US" sz="1800" dirty="0" err="1"/>
-              <a:t>api</a:t>
-            </a:r>
-            <a:r>
-              <a:rPr lang="en-US" sz="1800" dirty="0"/>
-              <a:t> level documentation – how to use the code.</a:t>
-            </a:r>
-          </a:p>
-          <a:p>
-            <a:pPr lvl="1"/>
-            <a:r>
-              <a:rPr lang="en-US" sz="1800" dirty="0"/>
-              <a:t>Some focus on maintenance – what are the parts, how are they related, code standards, …</a:t>
+              <a:t>These software developments are rarely maintained well.  Often documentation is nothing but code and the papers that describe research results and mention the software as an aside.</a:t>
             </a:r>
           </a:p>
           <a:p>
             <a:r>
               <a:rPr lang="en-US" sz="2200" dirty="0"/>
-              <a:t>Their goal is different than ours – our methods may not apply.</a:t>
+              <a:t>Our methods are applicable.</a:t>
             </a:r>
           </a:p>
         </p:txBody>
@@ -7598,7 +7555,7 @@
           <p:cNvPr id="4" name="Slide Number Placeholder 3">
             <a:extLst>
               <a:ext uri="{FF2B5EF4-FFF2-40B4-BE49-F238E27FC236}">
-                <a16:creationId xmlns:a16="http://schemas.microsoft.com/office/drawing/2014/main" id="{322EE9A1-C48D-4BEF-9075-0B0169EC94DF}"/>
+                <a16:creationId xmlns:a16="http://schemas.microsoft.com/office/drawing/2014/main" id="{B11F232F-AB6D-4130-9246-6A1AF1E6451D}"/>
               </a:ext>
             </a:extLst>
           </p:cNvPr>
@@ -7625,7 +7582,7 @@
     </p:spTree>
     <p:extLst>
       <p:ext uri="{BB962C8B-B14F-4D97-AF65-F5344CB8AC3E}">
-        <p14:creationId xmlns:p14="http://schemas.microsoft.com/office/powerpoint/2010/main" val="891542893"/>
+        <p14:creationId xmlns:p14="http://schemas.microsoft.com/office/powerpoint/2010/main" val="3236624771"/>
       </p:ext>
     </p:extLst>
   </p:cSld>
@@ -7680,7 +7637,7 @@
           <a:p>
             <a:r>
               <a:rPr lang="en-US" dirty="0"/>
-              <a:t>Industrial Development Domain</a:t>
+              <a:t>Open Source Domain</a:t>
             </a:r>
           </a:p>
         </p:txBody>
@@ -7703,8 +7660,8 @@
         </p:nvSpPr>
         <p:spPr>
           <a:xfrm>
-            <a:off x="838200" y="1268569"/>
-            <a:ext cx="10515600" cy="5104730"/>
+            <a:off x="838200" y="1216909"/>
+            <a:ext cx="10515600" cy="5355770"/>
           </a:xfrm>
         </p:spPr>
         <p:txBody>
@@ -7715,67 +7672,101 @@
           <a:p>
             <a:r>
               <a:rPr lang="en-US" sz="2000" dirty="0"/>
-              <a:t>Industrial Development: 5 – 10 developers</a:t>
+              <a:t>Open Source Development: 5 – 1000 active developers, many casual contributors</a:t>
             </a:r>
           </a:p>
           <a:p>
             <a:pPr lvl="1"/>
             <a:r>
               <a:rPr lang="en-US" sz="1800" dirty="0"/>
-              <a:t>Code life-time: 5 – 20 years</a:t>
+              <a:t>Code life-time: 10 - 20 years</a:t>
             </a:r>
           </a:p>
           <a:p>
             <a:pPr lvl="1"/>
             <a:r>
               <a:rPr lang="en-US" sz="1800" dirty="0"/>
-              <a:t>Example: Machine Tool Control</a:t>
+              <a:t>Examples: Linux, Node.js, MongoDB</a:t>
             </a:r>
           </a:p>
           <a:p>
             <a:r>
               <a:rPr lang="en-US" sz="2200" dirty="0"/>
-              <a:t>Code base starts with an initial product</a:t>
+              <a:t>Following an initial period of development, a project often settles into a maintenance mode:</a:t>
+            </a:r>
+          </a:p>
+          <a:p>
+            <a:pPr lvl="1"/>
+            <a:r>
+              <a:rPr lang="en-US" sz="1800" dirty="0"/>
+              <a:t>Maintain the same mission and design.</a:t>
+            </a:r>
+          </a:p>
+          <a:p>
+            <a:pPr lvl="1"/>
+            <a:r>
+              <a:rPr lang="en-US" sz="1800" dirty="0"/>
+              <a:t>Add new features and port to new platforms.</a:t>
             </a:r>
           </a:p>
           <a:p>
             <a:r>
               <a:rPr lang="en-US" sz="2200" dirty="0"/>
-              <a:t>New products start from that initial code</a:t>
+              <a:t>Occasionally revise most of the code and support new missions.</a:t>
+            </a:r>
+          </a:p>
+          <a:p>
+            <a:r>
+              <a:rPr lang="en-US" sz="2200" dirty="0"/>
+              <a:t>Documentation varies from poor to outstanding.</a:t>
             </a:r>
           </a:p>
           <a:p>
             <a:pPr lvl="1"/>
             <a:r>
               <a:rPr lang="en-US" sz="1800" dirty="0"/>
-              <a:t>Has a common code baseline been defined?</a:t>
+              <a:t>Linux documentation is one of the outstanding ones: </a:t>
+            </a:r>
+          </a:p>
+          <a:p>
+            <a:pPr lvl="2"/>
+            <a:r>
+              <a:rPr lang="en-US" sz="1400" dirty="0">
+                <a:hlinkClick r:id="rId2"/>
+              </a:rPr>
+              <a:t>https://www.kernel.org/doc/html/v4.10/index.html</a:t>
+            </a:r>
+            <a:r>
+              <a:rPr lang="en-US" sz="1400" dirty="0"/>
+              <a:t> </a:t>
             </a:r>
           </a:p>
           <a:p>
             <a:pPr lvl="1"/>
             <a:r>
               <a:rPr lang="en-US" sz="1800" dirty="0"/>
-              <a:t>Code reviews are held during development</a:t>
-            </a:r>
-          </a:p>
-          <a:p>
-            <a:pPr lvl="1"/>
+              <a:t>Some projects focus on </a:t>
+            </a:r>
+            <a:r>
+              <a:rPr lang="en-US" sz="1800" dirty="0" err="1"/>
+              <a:t>api</a:t>
+            </a:r>
             <a:r>
               <a:rPr lang="en-US" sz="1800" dirty="0"/>
-              <a:t>At product completion is code reviewed and refactored into reusable parts and product specific code?</a:t>
+              <a:t> level documentation – how to use the code.</a:t>
             </a:r>
           </a:p>
           <a:p>
             <a:pPr lvl="1"/>
             <a:r>
               <a:rPr lang="en-US" sz="1800" dirty="0"/>
-              <a:t>Is the organization willing to provide overhead effort to evolve the common code base?</a:t>
+              <a:t>Some focus on maintenance – what are the parts, how are they related, code standards, …</a:t>
             </a:r>
           </a:p>
           <a:p>
             <a:r>
               <a:rPr lang="en-US" sz="2200" dirty="0"/>
-              <a:t>Our methods are applicable.  A scaled down version is probably appropriate.</a:t>
+              <a:t>Their goal is different than ours – our methods may not apply.</a:t>
             </a:r>
           </a:p>
         </p:txBody>
@@ -7785,7 +7776,7 @@
           <p:cNvPr id="4" name="Slide Number Placeholder 3">
             <a:extLst>
               <a:ext uri="{FF2B5EF4-FFF2-40B4-BE49-F238E27FC236}">
-                <a16:creationId xmlns:a16="http://schemas.microsoft.com/office/drawing/2014/main" id="{A916C694-BD83-42C9-A8AC-D048E61AD071}"/>
+                <a16:creationId xmlns:a16="http://schemas.microsoft.com/office/drawing/2014/main" id="{322EE9A1-C48D-4BEF-9075-0B0169EC94DF}"/>
               </a:ext>
             </a:extLst>
           </p:cNvPr>
@@ -7812,7 +7803,7 @@
     </p:spTree>
     <p:extLst>
       <p:ext uri="{BB962C8B-B14F-4D97-AF65-F5344CB8AC3E}">
-        <p14:creationId xmlns:p14="http://schemas.microsoft.com/office/powerpoint/2010/main" val="1744719603"/>
+        <p14:creationId xmlns:p14="http://schemas.microsoft.com/office/powerpoint/2010/main" val="891542893"/>
       </p:ext>
     </p:extLst>
   </p:cSld>
@@ -7867,7 +7858,7 @@
           <a:p>
             <a:r>
               <a:rPr lang="en-US" dirty="0"/>
-              <a:t>Commercial Domain</a:t>
+              <a:t>Industrial Development Domain</a:t>
             </a:r>
           </a:p>
         </p:txBody>
@@ -7890,8 +7881,8 @@
         </p:nvSpPr>
         <p:spPr>
           <a:xfrm>
-            <a:off x="838200" y="1017529"/>
-            <a:ext cx="10515600" cy="5355770"/>
+            <a:off x="838200" y="1268569"/>
+            <a:ext cx="10515600" cy="5104730"/>
           </a:xfrm>
         </p:spPr>
         <p:txBody>
@@ -7902,119 +7893,68 @@
           <a:p>
             <a:r>
               <a:rPr lang="en-US" sz="2000" dirty="0"/>
-              <a:t>Commercial Products: </a:t>
+              <a:t>Industrial Development: 5 – 10 developers</a:t>
             </a:r>
           </a:p>
           <a:p>
             <a:pPr lvl="1"/>
             <a:r>
               <a:rPr lang="en-US" sz="1800" dirty="0"/>
-              <a:t>Code life-time: 20 – 30 years</a:t>
+              <a:t>Code life-time: 5 – 20 years</a:t>
             </a:r>
           </a:p>
           <a:p>
             <a:pPr lvl="1"/>
             <a:r>
               <a:rPr lang="en-US" sz="1800" dirty="0"/>
-              <a:t>Example: Microsoft Word</a:t>
+              <a:t>Example: Machine Tool Control</a:t>
             </a:r>
           </a:p>
           <a:p>
             <a:r>
               <a:rPr lang="en-US" sz="2200" dirty="0"/>
-              <a:t>Product may start with code framework, standards, and a specification</a:t>
+              <a:t>Code base starts with an initial product</a:t>
+            </a:r>
+          </a:p>
+          <a:p>
+            <a:r>
+              <a:rPr lang="en-US" sz="2200" dirty="0"/>
+              <a:t>New products start from that initial code</a:t>
             </a:r>
           </a:p>
           <a:p>
             <a:pPr lvl="1"/>
             <a:r>
               <a:rPr lang="en-US" sz="1800" dirty="0"/>
-              <a:t>For Microsoft Office and many other products, the framework has been the Microsoft Component Object Model (COM) – technology was specifically designed for reuse</a:t>
-            </a:r>
-          </a:p>
-          <a:p>
-            <a:pPr lvl="2"/>
-            <a:r>
-              <a:rPr lang="en-US" sz="1400" dirty="0"/>
-              <a:t>It appears that, moving forward, COM will be hidden with a wrapper technology - Windows </a:t>
-            </a:r>
-            <a:r>
-              <a:rPr lang="en-US" sz="1400" dirty="0" err="1"/>
-              <a:t>RunTime</a:t>
-            </a:r>
-            <a:r>
-              <a:rPr lang="en-US" sz="1400" dirty="0"/>
-              <a:t> (WinRT): </a:t>
-            </a:r>
-            <a:r>
-              <a:rPr lang="en-US" sz="1400" dirty="0">
-                <a:hlinkClick r:id="rId2"/>
-              </a:rPr>
-              <a:t>https://en.wikipedia.org/wiki/Windows_Runtime</a:t>
-            </a:r>
-            <a:r>
-              <a:rPr lang="en-US" sz="1400" dirty="0"/>
-              <a:t> </a:t>
+              <a:t>Has a common code baseline been defined?</a:t>
             </a:r>
           </a:p>
           <a:p>
             <a:pPr lvl="1"/>
             <a:r>
               <a:rPr lang="en-US" sz="1800" dirty="0"/>
-              <a:t>Specification is developed by a Program Manager and reviewed by the development team</a:t>
+              <a:t>Code reviews are held during development</a:t>
+            </a:r>
+          </a:p>
+          <a:p>
+            <a:pPr lvl="1"/>
+            <a:r>
+              <a:rPr lang="en-US" sz="1800" dirty="0"/>
+              <a:t>At product completion is code reviewed and refactored into reusable parts and product specific code?</a:t>
+            </a:r>
+          </a:p>
+          <a:p>
+            <a:pPr lvl="1"/>
+            <a:r>
+              <a:rPr lang="en-US" sz="1800" dirty="0"/>
+              <a:t>Is the organization willing to provide overhead effort to evolve the common code base?</a:t>
             </a:r>
           </a:p>
           <a:p>
             <a:r>
               <a:rPr lang="en-US" sz="2200" dirty="0"/>
-              <a:t>Microsoft has spent a lot of resources on documentation, with mixed results</a:t>
-            </a:r>
-          </a:p>
-          <a:p>
-            <a:pPr lvl="1"/>
-            <a:r>
-              <a:rPr lang="en-US" sz="1800" dirty="0"/>
-              <a:t>Executing a search in MSDN for WinRT results in 6,180,000 results.  </a:t>
-            </a:r>
-          </a:p>
-          <a:p>
-            <a:pPr lvl="1"/>
-            <a:r>
-              <a:rPr lang="en-US" sz="1800" dirty="0"/>
-              <a:t>That isn’t a useful query – in fairness, the results are prioritized</a:t>
-            </a:r>
-          </a:p>
-          <a:p>
-            <a:pPr lvl="1"/>
-            <a:r>
-              <a:rPr lang="en-US" sz="1800" dirty="0"/>
-              <a:t>It’s quite common that when you arrive at a useful documentation page you get partial results with the remainder often linked to many pages scattered over the vast reaches of MSDN</a:t>
-            </a:r>
-          </a:p>
-          <a:p>
-            <a:r>
-              <a:rPr lang="en-US" sz="2200" dirty="0"/>
-              <a:t>There are many Microsoft technologies each with its own products, APIs, code examples.</a:t>
-            </a:r>
-          </a:p>
-          <a:p>
-            <a:pPr lvl="1"/>
-            <a:r>
-              <a:rPr lang="en-US" sz="1800" dirty="0"/>
-              <a:t>Some, like the </a:t>
-            </a:r>
-            <a:r>
-              <a:rPr lang="en-US" sz="1800" dirty="0" err="1"/>
-              <a:t>.Net</a:t>
-            </a:r>
-            <a:r>
-              <a:rPr lang="en-US" sz="1800" dirty="0"/>
-              <a:t> framework have outstanding organization and documentation.</a:t>
-            </a:r>
-          </a:p>
-          <a:p>
-            <a:pPr lvl="1"/>
-            <a:endParaRPr lang="en-US" sz="1800" dirty="0"/>
+              <a:t>Our methods are applicable.  A scaled down version is probably appropriate.</a:t>
+            </a:r>
           </a:p>
         </p:txBody>
       </p:sp>
@@ -8050,7 +7990,7 @@
     </p:spTree>
     <p:extLst>
       <p:ext uri="{BB962C8B-B14F-4D97-AF65-F5344CB8AC3E}">
-        <p14:creationId xmlns:p14="http://schemas.microsoft.com/office/powerpoint/2010/main" val="1820564551"/>
+        <p14:creationId xmlns:p14="http://schemas.microsoft.com/office/powerpoint/2010/main" val="1744719603"/>
       </p:ext>
     </p:extLst>
   </p:cSld>
@@ -8096,7 +8036,7 @@
         <p:spPr>
           <a:xfrm>
             <a:off x="838200" y="339367"/>
-            <a:ext cx="10515600" cy="529957"/>
+            <a:ext cx="10515600" cy="678161"/>
           </a:xfrm>
         </p:spPr>
         <p:txBody>
@@ -8105,7 +8045,7 @@
           <a:p>
             <a:r>
               <a:rPr lang="en-US" dirty="0"/>
-              <a:t>Aerospace Domain</a:t>
+              <a:t>Commercial Domain</a:t>
             </a:r>
           </a:p>
         </p:txBody>
@@ -8139,84 +8079,56 @@
           <a:lstStyle/>
           <a:p>
             <a:r>
+              <a:rPr lang="en-US" sz="2000" dirty="0"/>
+              <a:t>Commercial Products: </a:t>
+            </a:r>
+          </a:p>
+          <a:p>
+            <a:pPr lvl="1"/>
+            <a:r>
               <a:rPr lang="en-US" sz="1800" dirty="0"/>
-              <a:t>Aerospace Programs: 5 – 200 developers</a:t>
-            </a:r>
-          </a:p>
-          <a:p>
-            <a:pPr lvl="1"/>
+              <a:t>Code life-time: 20 – 30 years</a:t>
+            </a:r>
+          </a:p>
+          <a:p>
+            <a:pPr lvl="1"/>
+            <a:r>
+              <a:rPr lang="en-US" sz="1800" dirty="0"/>
+              <a:t>Example: Microsoft Word</a:t>
+            </a:r>
+          </a:p>
+          <a:p>
+            <a:r>
+              <a:rPr lang="en-US" sz="2200" dirty="0"/>
+              <a:t>Product may start with code framework, standards, and a specification</a:t>
+            </a:r>
+          </a:p>
+          <a:p>
+            <a:pPr lvl="1"/>
+            <a:r>
+              <a:rPr lang="en-US" sz="1800" dirty="0"/>
+              <a:t>For Microsoft Office and many other products, the framework has been the Microsoft Component Object Model (COM) – technology was specifically designed for reuse</a:t>
+            </a:r>
+          </a:p>
+          <a:p>
+            <a:pPr lvl="2"/>
             <a:r>
               <a:rPr lang="en-US" sz="1400" dirty="0"/>
-              <a:t>Code life-time: 20 – 30 years</a:t>
-            </a:r>
-          </a:p>
-          <a:p>
-            <a:pPr lvl="1"/>
+              <a:t>It appears that, moving forward, COM will be hidden with a wrapper technology - Windows </a:t>
+            </a:r>
+            <a:r>
+              <a:rPr lang="en-US" sz="1400" dirty="0" err="1"/>
+              <a:t>RunTime</a:t>
+            </a:r>
             <a:r>
               <a:rPr lang="en-US" sz="1400" dirty="0"/>
-              <a:t>Example: Submarine control, Area surveillance, ..</a:t>
-            </a:r>
-          </a:p>
-          <a:p>
-            <a:r>
-              <a:rPr lang="en-US" sz="1800" dirty="0"/>
-              <a:t>Development is product oriented, starting with an initial contract, and continuing for possibly many years of enhancements and new contracts that build on the existing product technology</a:t>
-            </a:r>
-          </a:p>
-          <a:p>
-            <a:r>
-              <a:rPr lang="en-US" sz="1800" dirty="0"/>
-              <a:t>An example is the development of area surveillance radar systems</a:t>
-            </a:r>
-          </a:p>
-          <a:p>
-            <a:pPr lvl="1"/>
-            <a:r>
-              <a:rPr lang="en-US" sz="1400" dirty="0"/>
-              <a:t>Typical lifetime of a radar system is 20 years</a:t>
-            </a:r>
-          </a:p>
-          <a:p>
-            <a:pPr lvl="2"/>
-            <a:r>
-              <a:rPr lang="en-US" sz="1100" dirty="0"/>
-              <a:t>The code has to be maintained over that lifetime, sometimes by the manufacturer, sometimes by the customer.</a:t>
-            </a:r>
-          </a:p>
-          <a:p>
-            <a:pPr lvl="1"/>
-            <a:r>
-              <a:rPr lang="en-US" sz="1400" dirty="0"/>
-              <a:t>Once an initial contract has been successfully completed it is common for many contracts to be awarded for new versions.</a:t>
-            </a:r>
-          </a:p>
-          <a:p>
-            <a:pPr lvl="2"/>
-            <a:r>
-              <a:rPr lang="en-US" sz="1100" dirty="0"/>
-              <a:t>Usually a large part of a new product is based on an existing one and will share a large fraction of its code</a:t>
-            </a:r>
-          </a:p>
-          <a:p>
-            <a:pPr lvl="2"/>
-            <a:r>
-              <a:rPr lang="en-US" sz="1100" dirty="0"/>
-              <a:t>In most cases the new contract requires new features and enhancements – the customer looks at the original and decides how to embellish</a:t>
-            </a:r>
-          </a:p>
-          <a:p>
-            <a:r>
-              <a:rPr lang="en-US" sz="1800" dirty="0"/>
-              <a:t>The Capability Maturity Model was developed beginning when the Air Force funded a study with the Software Engineering Institute.  Its intent is to encourage DoD contractors to develop and maintain a consistent process for creation of software. </a:t>
-            </a:r>
-          </a:p>
-          <a:p>
-            <a:pPr lvl="1"/>
+              <a:t> (WinRT): </a:t>
+            </a:r>
             <a:r>
               <a:rPr lang="en-US" sz="1400" dirty="0">
                 <a:hlinkClick r:id="rId2"/>
               </a:rPr>
-              <a:t>https://en.wikipedia.org/wiki/Capability_Maturity_Model</a:t>
+              <a:t>https://en.wikipedia.org/wiki/Windows_Runtime</a:t>
             </a:r>
             <a:r>
               <a:rPr lang="en-US" sz="1400" dirty="0"/>
@@ -8226,30 +8138,61 @@
           <a:p>
             <a:pPr lvl="1"/>
             <a:r>
-              <a:rPr lang="en-US" sz="1400" dirty="0"/>
-              <a:t>CMM provides guidelines, but it is a model and a yardstick for assessing capability of contractors</a:t>
-            </a:r>
-          </a:p>
-          <a:p>
-            <a:pPr lvl="1"/>
-            <a:r>
-              <a:rPr lang="en-US" sz="1400" dirty="0"/>
-              <a:t>It does not provide specifics for tools and techniques that support reuse</a:t>
-            </a:r>
-          </a:p>
-          <a:p>
-            <a:r>
               <a:rPr lang="en-US" sz="1800" dirty="0"/>
-              <a:t>Our methods apply for individual product teams.  Unknown how that would scale to corporation level. </a:t>
-            </a:r>
-          </a:p>
-          <a:p>
-            <a:pPr lvl="1"/>
-            <a:endParaRPr lang="en-US" sz="1400" dirty="0"/>
-          </a:p>
-          <a:p>
-            <a:pPr lvl="1"/>
-            <a:endParaRPr lang="en-US" sz="1400" dirty="0"/>
+              <a:t>Specification is developed by a Program Manager and reviewed by the development team</a:t>
+            </a:r>
+          </a:p>
+          <a:p>
+            <a:r>
+              <a:rPr lang="en-US" sz="2200" dirty="0"/>
+              <a:t>Microsoft has spent a lot of resources on documentation, with mixed results</a:t>
+            </a:r>
+          </a:p>
+          <a:p>
+            <a:pPr lvl="1"/>
+            <a:r>
+              <a:rPr lang="en-US" sz="1800" dirty="0"/>
+              <a:t>Executing a search in MSDN for WinRT results in 6,180,000 results.  </a:t>
+            </a:r>
+          </a:p>
+          <a:p>
+            <a:pPr lvl="1"/>
+            <a:r>
+              <a:rPr lang="en-US" sz="1800" dirty="0"/>
+              <a:t>That isn’t a useful query – in fairness, the results are prioritized</a:t>
+            </a:r>
+          </a:p>
+          <a:p>
+            <a:pPr lvl="1"/>
+            <a:r>
+              <a:rPr lang="en-US" sz="1800" dirty="0"/>
+              <a:t>It’s quite common that when you arrive at a useful documentation page you get partial results with the remainder often linked to many pages scattered over the vast reaches of MSDN</a:t>
+            </a:r>
+          </a:p>
+          <a:p>
+            <a:r>
+              <a:rPr lang="en-US" sz="2200" dirty="0"/>
+              <a:t>There are many Microsoft technologies each with its own products, APIs, code examples.</a:t>
+            </a:r>
+          </a:p>
+          <a:p>
+            <a:pPr lvl="1"/>
+            <a:r>
+              <a:rPr lang="en-US" sz="1800" dirty="0"/>
+              <a:t>Some, like the </a:t>
+            </a:r>
+            <a:r>
+              <a:rPr lang="en-US" sz="1800" dirty="0" err="1"/>
+              <a:t>.Net</a:t>
+            </a:r>
+            <a:r>
+              <a:rPr lang="en-US" sz="1800" dirty="0"/>
+              <a:t> framework have outstanding organization and documentation.</a:t>
+            </a:r>
+          </a:p>
+          <a:p>
+            <a:pPr lvl="1"/>
+            <a:endParaRPr lang="en-US" sz="1800" dirty="0"/>
           </a:p>
         </p:txBody>
       </p:sp>
@@ -8285,7 +8228,7 @@
     </p:spTree>
     <p:extLst>
       <p:ext uri="{BB962C8B-B14F-4D97-AF65-F5344CB8AC3E}">
-        <p14:creationId xmlns:p14="http://schemas.microsoft.com/office/powerpoint/2010/main" val="3738534843"/>
+        <p14:creationId xmlns:p14="http://schemas.microsoft.com/office/powerpoint/2010/main" val="1820564551"/>
       </p:ext>
     </p:extLst>
   </p:cSld>
@@ -8317,6 +8260,241 @@
           <p:cNvPr id="2" name="Title 1">
             <a:extLst>
               <a:ext uri="{FF2B5EF4-FFF2-40B4-BE49-F238E27FC236}">
+                <a16:creationId xmlns:a16="http://schemas.microsoft.com/office/drawing/2014/main" id="{C818CF9C-B350-4936-99E1-D89031958E0C}"/>
+              </a:ext>
+            </a:extLst>
+          </p:cNvPr>
+          <p:cNvSpPr>
+            <a:spLocks noGrp="1"/>
+          </p:cNvSpPr>
+          <p:nvPr>
+            <p:ph type="title"/>
+          </p:nvPr>
+        </p:nvSpPr>
+        <p:spPr>
+          <a:xfrm>
+            <a:off x="838200" y="339367"/>
+            <a:ext cx="10515600" cy="529957"/>
+          </a:xfrm>
+        </p:spPr>
+        <p:txBody>
+          <a:bodyPr/>
+          <a:lstStyle/>
+          <a:p>
+            <a:r>
+              <a:rPr lang="en-US" dirty="0"/>
+              <a:t>Aerospace Domain</a:t>
+            </a:r>
+          </a:p>
+        </p:txBody>
+      </p:sp>
+      <p:sp>
+        <p:nvSpPr>
+          <p:cNvPr id="3" name="Content Placeholder 2">
+            <a:extLst>
+              <a:ext uri="{FF2B5EF4-FFF2-40B4-BE49-F238E27FC236}">
+                <a16:creationId xmlns:a16="http://schemas.microsoft.com/office/drawing/2014/main" id="{C65F66DE-FE31-4539-83AE-36CA6E637596}"/>
+              </a:ext>
+            </a:extLst>
+          </p:cNvPr>
+          <p:cNvSpPr>
+            <a:spLocks noGrp="1"/>
+          </p:cNvSpPr>
+          <p:nvPr>
+            <p:ph idx="1"/>
+          </p:nvPr>
+        </p:nvSpPr>
+        <p:spPr>
+          <a:xfrm>
+            <a:off x="838200" y="1017529"/>
+            <a:ext cx="10515600" cy="5355770"/>
+          </a:xfrm>
+        </p:spPr>
+        <p:txBody>
+          <a:bodyPr>
+            <a:noAutofit/>
+          </a:bodyPr>
+          <a:lstStyle/>
+          <a:p>
+            <a:r>
+              <a:rPr lang="en-US" sz="1800" dirty="0"/>
+              <a:t>Aerospace Programs: 5 – 200 developers</a:t>
+            </a:r>
+          </a:p>
+          <a:p>
+            <a:pPr lvl="1"/>
+            <a:r>
+              <a:rPr lang="en-US" sz="1400" dirty="0"/>
+              <a:t>Code life-time: 20 – 30 years</a:t>
+            </a:r>
+          </a:p>
+          <a:p>
+            <a:pPr lvl="1"/>
+            <a:r>
+              <a:rPr lang="en-US" sz="1400" dirty="0"/>
+              <a:t>Example: Submarine control, Area surveillance, ..</a:t>
+            </a:r>
+          </a:p>
+          <a:p>
+            <a:r>
+              <a:rPr lang="en-US" sz="1800" dirty="0"/>
+              <a:t>Development is product oriented, starting with an initial contract, and continuing for possibly many years of enhancements and new contracts that build on the existing product technology</a:t>
+            </a:r>
+          </a:p>
+          <a:p>
+            <a:r>
+              <a:rPr lang="en-US" sz="1800" dirty="0"/>
+              <a:t>An example is the development of area surveillance radar systems</a:t>
+            </a:r>
+          </a:p>
+          <a:p>
+            <a:pPr lvl="1"/>
+            <a:r>
+              <a:rPr lang="en-US" sz="1400" dirty="0"/>
+              <a:t>Typical lifetime of a radar system is 20 years</a:t>
+            </a:r>
+          </a:p>
+          <a:p>
+            <a:pPr lvl="2"/>
+            <a:r>
+              <a:rPr lang="en-US" sz="1100" dirty="0"/>
+              <a:t>The code has to be maintained over that lifetime, sometimes by the manufacturer, sometimes by the customer.</a:t>
+            </a:r>
+          </a:p>
+          <a:p>
+            <a:pPr lvl="1"/>
+            <a:r>
+              <a:rPr lang="en-US" sz="1400" dirty="0"/>
+              <a:t>Once an initial contract has been successfully completed it is common for many contracts to be awarded for new versions.</a:t>
+            </a:r>
+          </a:p>
+          <a:p>
+            <a:pPr lvl="2"/>
+            <a:r>
+              <a:rPr lang="en-US" sz="1100" dirty="0"/>
+              <a:t>Usually a large part of a new product is based on an existing one and will share a large fraction of its code</a:t>
+            </a:r>
+          </a:p>
+          <a:p>
+            <a:pPr lvl="2"/>
+            <a:r>
+              <a:rPr lang="en-US" sz="1100" dirty="0"/>
+              <a:t>In most cases the new contract requires new features and enhancements – the customer looks at the original and decides how to embellish</a:t>
+            </a:r>
+          </a:p>
+          <a:p>
+            <a:r>
+              <a:rPr lang="en-US" sz="1800" dirty="0"/>
+              <a:t>The Capability Maturity Model was developed beginning when the Air Force funded a study with the Software Engineering Institute.  Its intent is to encourage DoD contractors to develop and maintain a consistent process for creation of software. </a:t>
+            </a:r>
+          </a:p>
+          <a:p>
+            <a:pPr lvl="1"/>
+            <a:r>
+              <a:rPr lang="en-US" sz="1400" dirty="0">
+                <a:hlinkClick r:id="rId2"/>
+              </a:rPr>
+              <a:t>https://en.wikipedia.org/wiki/Capability_Maturity_Model</a:t>
+            </a:r>
+            <a:r>
+              <a:rPr lang="en-US" sz="1400" dirty="0"/>
+              <a:t> </a:t>
+            </a:r>
+          </a:p>
+          <a:p>
+            <a:pPr lvl="1"/>
+            <a:r>
+              <a:rPr lang="en-US" sz="1400" dirty="0"/>
+              <a:t>CMM provides guidelines, but it is a model and a yardstick for assessing capability of contractors</a:t>
+            </a:r>
+          </a:p>
+          <a:p>
+            <a:pPr lvl="1"/>
+            <a:r>
+              <a:rPr lang="en-US" sz="1400" dirty="0"/>
+              <a:t>It does not provide specifics for tools and techniques that support reuse</a:t>
+            </a:r>
+          </a:p>
+          <a:p>
+            <a:r>
+              <a:rPr lang="en-US" sz="1800" dirty="0"/>
+              <a:t>Our methods apply for individual product teams.  Unknown how that would scale to corporation level. </a:t>
+            </a:r>
+          </a:p>
+          <a:p>
+            <a:pPr lvl="1"/>
+            <a:endParaRPr lang="en-US" sz="1400" dirty="0"/>
+          </a:p>
+          <a:p>
+            <a:pPr lvl="1"/>
+            <a:endParaRPr lang="en-US" sz="1400" dirty="0"/>
+          </a:p>
+        </p:txBody>
+      </p:sp>
+      <p:sp>
+        <p:nvSpPr>
+          <p:cNvPr id="4" name="Slide Number Placeholder 3">
+            <a:extLst>
+              <a:ext uri="{FF2B5EF4-FFF2-40B4-BE49-F238E27FC236}">
+                <a16:creationId xmlns:a16="http://schemas.microsoft.com/office/drawing/2014/main" id="{A916C694-BD83-42C9-A8AC-D048E61AD071}"/>
+              </a:ext>
+            </a:extLst>
+          </p:cNvPr>
+          <p:cNvSpPr>
+            <a:spLocks noGrp="1"/>
+          </p:cNvSpPr>
+          <p:nvPr>
+            <p:ph type="sldNum" sz="quarter" idx="12"/>
+          </p:nvPr>
+        </p:nvSpPr>
+        <p:spPr/>
+        <p:txBody>
+          <a:bodyPr/>
+          <a:lstStyle/>
+          <a:p>
+            <a:fld id="{EDEBF0BA-A897-4C1E-AB3C-F330808C0E1D}" type="slidenum">
+              <a:rPr lang="en-US" smtClean="0"/>
+              <a:t>27</a:t>
+            </a:fld>
+            <a:endParaRPr lang="en-US"/>
+          </a:p>
+        </p:txBody>
+      </p:sp>
+    </p:spTree>
+    <p:extLst>
+      <p:ext uri="{BB962C8B-B14F-4D97-AF65-F5344CB8AC3E}">
+        <p14:creationId xmlns:p14="http://schemas.microsoft.com/office/powerpoint/2010/main" val="3738534843"/>
+      </p:ext>
+    </p:extLst>
+  </p:cSld>
+  <p:clrMapOvr>
+    <a:masterClrMapping/>
+  </p:clrMapOvr>
+</p:sld>
+</file>
+
+<file path=ppt/slides/slide28.xml><?xml version="1.0" encoding="utf-8"?>
+<p:sld xmlns:a="http://schemas.openxmlformats.org/drawingml/2006/main" xmlns:r="http://schemas.openxmlformats.org/officeDocument/2006/relationships" xmlns:p="http://schemas.openxmlformats.org/presentationml/2006/main">
+  <p:cSld>
+    <p:spTree>
+      <p:nvGrpSpPr>
+        <p:cNvPr id="1" name=""/>
+        <p:cNvGrpSpPr/>
+        <p:nvPr/>
+      </p:nvGrpSpPr>
+      <p:grpSpPr>
+        <a:xfrm>
+          <a:off x="0" y="0"/>
+          <a:ext cx="0" cy="0"/>
+          <a:chOff x="0" y="0"/>
+          <a:chExt cx="0" cy="0"/>
+        </a:xfrm>
+      </p:grpSpPr>
+      <p:sp>
+        <p:nvSpPr>
+          <p:cNvPr id="2" name="Title 1">
+            <a:extLst>
+              <a:ext uri="{FF2B5EF4-FFF2-40B4-BE49-F238E27FC236}">
                 <a16:creationId xmlns:a16="http://schemas.microsoft.com/office/drawing/2014/main" id="{4E9D22A6-D52F-42FB-B419-4D8F5EA420AF}"/>
               </a:ext>
             </a:extLst>
@@ -8368,7 +8546,7 @@
           <a:p>
             <a:fld id="{EDEBF0BA-A897-4C1E-AB3C-F330808C0E1D}" type="slidenum">
               <a:rPr lang="en-US" smtClean="0"/>
-              <a:t>27</a:t>
+              <a:t>28</a:t>
             </a:fld>
             <a:endParaRPr lang="en-US"/>
           </a:p>
@@ -9752,7 +9930,7 @@
             </a:pPr>
             <a:r>
               <a:rPr lang="en-US" dirty="0"/>
-              <a:t>We want most code repositories to be large – to support broad reuse</a:t>
+              <a:t>We want most code repository collections to be large – support broad reuse</a:t>
             </a:r>
           </a:p>
           <a:p>
@@ -9763,7 +9941,7 @@
             </a:pPr>
             <a:r>
               <a:rPr lang="en-US" dirty="0"/>
-              <a:t>How do we find, in a large repository, code that fills some need?</a:t>
+              <a:t>How do we find, in a large repository collection, code that fills some need?</a:t>
             </a:r>
           </a:p>
           <a:p>

</xml_diff>

<commit_message>
fixed text error in Hier, modified slides in PublishingSourceCode
</commit_message>
<xml_diff>
--- a/Resources/PublishingSourceCode.pptx
+++ b/Resources/PublishingSourceCode.pptx
@@ -27,7 +27,7 @@
     <p:sldId id="274" r:id="rId18"/>
     <p:sldId id="273" r:id="rId19"/>
     <p:sldId id="275" r:id="rId20"/>
-    <p:sldId id="282" r:id="rId21"/>
+    <p:sldId id="285" r:id="rId21"/>
     <p:sldId id="265" r:id="rId22"/>
     <p:sldId id="266" r:id="rId23"/>
     <p:sldId id="261" r:id="rId24"/>
@@ -223,7 +223,7 @@
           <a:p>
             <a:fld id="{707A244B-480E-4DF8-B8AD-6F4623E3B964}" type="datetimeFigureOut">
               <a:rPr lang="en-US" smtClean="0"/>
-              <a:t>10/15/2019</a:t>
+              <a:t>10/17/2019</a:t>
             </a:fld>
             <a:endParaRPr lang="en-US"/>
           </a:p>
@@ -758,7 +758,7 @@
           <a:p>
             <a:fld id="{7E5A6A94-3764-4657-B78A-EA3F42F28C9C}" type="datetime1">
               <a:rPr lang="en-US" smtClean="0"/>
-              <a:t>10/15/2019</a:t>
+              <a:t>10/17/2019</a:t>
             </a:fld>
             <a:endParaRPr lang="en-US"/>
           </a:p>
@@ -956,7 +956,7 @@
           <a:p>
             <a:fld id="{93B9EABD-462C-4F85-9539-646406A6B6CC}" type="datetime1">
               <a:rPr lang="en-US" smtClean="0"/>
-              <a:t>10/15/2019</a:t>
+              <a:t>10/17/2019</a:t>
             </a:fld>
             <a:endParaRPr lang="en-US"/>
           </a:p>
@@ -1164,7 +1164,7 @@
           <a:p>
             <a:fld id="{E179B0F1-CFD2-466E-85DC-3349E60E54D2}" type="datetime1">
               <a:rPr lang="en-US" smtClean="0"/>
-              <a:t>10/15/2019</a:t>
+              <a:t>10/17/2019</a:t>
             </a:fld>
             <a:endParaRPr lang="en-US"/>
           </a:p>
@@ -1372,7 +1372,7 @@
           <a:p>
             <a:fld id="{6DC36762-1270-475E-8EE1-6BB0D9927869}" type="datetime1">
               <a:rPr lang="en-US" smtClean="0"/>
-              <a:t>10/15/2019</a:t>
+              <a:t>10/17/2019</a:t>
             </a:fld>
             <a:endParaRPr lang="en-US"/>
           </a:p>
@@ -1647,7 +1647,7 @@
           <a:p>
             <a:fld id="{E28B701A-BF74-4B76-B760-E2C6561B48E0}" type="datetime1">
               <a:rPr lang="en-US" smtClean="0"/>
-              <a:t>10/15/2019</a:t>
+              <a:t>10/17/2019</a:t>
             </a:fld>
             <a:endParaRPr lang="en-US"/>
           </a:p>
@@ -1912,7 +1912,7 @@
           <a:p>
             <a:fld id="{848E7606-0344-46F9-B489-348F205DDD81}" type="datetime1">
               <a:rPr lang="en-US" smtClean="0"/>
-              <a:t>10/15/2019</a:t>
+              <a:t>10/17/2019</a:t>
             </a:fld>
             <a:endParaRPr lang="en-US"/>
           </a:p>
@@ -2324,7 +2324,7 @@
           <a:p>
             <a:fld id="{12562A6D-B456-4A3E-ABF9-DB3F97FE8526}" type="datetime1">
               <a:rPr lang="en-US" smtClean="0"/>
-              <a:t>10/15/2019</a:t>
+              <a:t>10/17/2019</a:t>
             </a:fld>
             <a:endParaRPr lang="en-US"/>
           </a:p>
@@ -2465,7 +2465,7 @@
           <a:p>
             <a:fld id="{14644366-7E7B-43AD-8FBC-DB94443C6600}" type="datetime1">
               <a:rPr lang="en-US" smtClean="0"/>
-              <a:t>10/15/2019</a:t>
+              <a:t>10/17/2019</a:t>
             </a:fld>
             <a:endParaRPr lang="en-US"/>
           </a:p>
@@ -2578,7 +2578,7 @@
           <a:p>
             <a:fld id="{8ABD86A2-66D8-40CD-9756-5715ECB136F6}" type="datetime1">
               <a:rPr lang="en-US" smtClean="0"/>
-              <a:t>10/15/2019</a:t>
+              <a:t>10/17/2019</a:t>
             </a:fld>
             <a:endParaRPr lang="en-US"/>
           </a:p>
@@ -2889,7 +2889,7 @@
           <a:p>
             <a:fld id="{84947D4A-30B2-48C8-A960-21FC1AE3E1D6}" type="datetime1">
               <a:rPr lang="en-US" smtClean="0"/>
-              <a:t>10/15/2019</a:t>
+              <a:t>10/17/2019</a:t>
             </a:fld>
             <a:endParaRPr lang="en-US"/>
           </a:p>
@@ -3177,7 +3177,7 @@
           <a:p>
             <a:fld id="{1A4A88B8-2510-4B6F-8DFE-EE55B4B2CE7F}" type="datetime1">
               <a:rPr lang="en-US" smtClean="0"/>
-              <a:t>10/15/2019</a:t>
+              <a:t>10/17/2019</a:t>
             </a:fld>
             <a:endParaRPr lang="en-US"/>
           </a:p>
@@ -3418,7 +3418,7 @@
           <a:p>
             <a:fld id="{17ED4B07-0083-46EC-AB42-36920CDC7586}" type="datetime1">
               <a:rPr lang="en-US" smtClean="0"/>
-              <a:t>10/15/2019</a:t>
+              <a:t>10/17/2019</a:t>
             </a:fld>
             <a:endParaRPr lang="en-US"/>
           </a:p>
@@ -6528,7 +6528,7 @@
           <a:p>
             <a:r>
               <a:rPr lang="en-US" dirty="0"/>
-              <a:t>Publishing Code Components</a:t>
+              <a:t>Web-based Publishing Code Components</a:t>
             </a:r>
           </a:p>
           <a:p>
@@ -6755,7 +6755,7 @@
           <a:p>
             <a:r>
               <a:rPr lang="en-US" sz="2000" dirty="0"/>
-              <a:t>Industrial Development: 5 – 10 developers</a:t>
+              <a:t>Industrial and Commercial Development: 5 – 20 developers</a:t>
             </a:r>
           </a:p>
           <a:p>
@@ -6770,26 +6770,6 @@
             <a:r>
               <a:rPr lang="en-US" sz="1800" dirty="0"/>
               <a:t>Example: Machine Tool Control</a:t>
-            </a:r>
-          </a:p>
-          <a:p>
-            <a:r>
-              <a:rPr lang="en-US" sz="2000" dirty="0"/>
-              <a:t>Commercial Products: 10 – 30 developers</a:t>
-            </a:r>
-          </a:p>
-          <a:p>
-            <a:pPr lvl="1"/>
-            <a:r>
-              <a:rPr lang="en-US" sz="1800" dirty="0"/>
-              <a:t>Code life-time: 20 – 30 years</a:t>
-            </a:r>
-          </a:p>
-          <a:p>
-            <a:pPr lvl="1"/>
-            <a:r>
-              <a:rPr lang="en-US" sz="1800" dirty="0"/>
-              <a:t>Example: Microsoft Word</a:t>
             </a:r>
           </a:p>
           <a:p>
@@ -6846,7 +6826,7 @@
     </p:spTree>
     <p:extLst>
       <p:ext uri="{BB962C8B-B14F-4D97-AF65-F5344CB8AC3E}">
-        <p14:creationId xmlns:p14="http://schemas.microsoft.com/office/powerpoint/2010/main" val="3759881247"/>
+        <p14:creationId xmlns:p14="http://schemas.microsoft.com/office/powerpoint/2010/main" val="1101158785"/>
       </p:ext>
     </p:extLst>
   </p:cSld>
@@ -7631,12 +7611,14 @@
           </a:xfrm>
         </p:spPr>
         <p:txBody>
-          <a:bodyPr/>
-          <a:lstStyle/>
-          <a:p>
-            <a:r>
-              <a:rPr lang="en-US" dirty="0"/>
-              <a:t>Industrial Development Domain</a:t>
+          <a:bodyPr>
+            <a:noAutofit/>
+          </a:bodyPr>
+          <a:lstStyle/>
+          <a:p>
+            <a:r>
+              <a:rPr lang="en-US" sz="4000" dirty="0"/>
+              <a:t>Industrial and Commercial Development Domain</a:t>
             </a:r>
           </a:p>
         </p:txBody>
@@ -7671,7 +7653,7 @@
           <a:p>
             <a:r>
               <a:rPr lang="en-US" sz="2000" dirty="0"/>
-              <a:t>Industrial Development: 5 – 10 developers</a:t>
+              <a:t>Industrial and Commercial Development: 5 – 20 developers on a product team</a:t>
             </a:r>
           </a:p>
           <a:p>
@@ -7731,8 +7713,48 @@
           <a:p>
             <a:r>
               <a:rPr lang="en-US" sz="2200" dirty="0"/>
-              <a:t>Our methods are applicable.  A scaled down version is probably appropriate.</a:t>
-            </a:r>
+              <a:t>Microsoft is a commercial development domain with many products, some modernized versions of vintage products.</a:t>
+            </a:r>
+          </a:p>
+          <a:p>
+            <a:pPr lvl="1"/>
+            <a:r>
+              <a:rPr lang="en-US" sz="1800" dirty="0"/>
+              <a:t>They have a well engineered code sharing platform: </a:t>
+            </a:r>
+            <a:r>
+              <a:rPr lang="en-US" sz="1800" dirty="0">
+                <a:hlinkClick r:id="rId2"/>
+              </a:rPr>
+              <a:t>https://github.com/microsoft</a:t>
+            </a:r>
+            <a:r>
+              <a:rPr lang="en-US" sz="1800" dirty="0"/>
+              <a:t> </a:t>
+            </a:r>
+          </a:p>
+          <a:p>
+            <a:pPr lvl="1"/>
+            <a:r>
+              <a:rPr lang="en-US" sz="1800" dirty="0"/>
+              <a:t>That platform uses designs similar to those described here</a:t>
+            </a:r>
+          </a:p>
+          <a:p>
+            <a:r>
+              <a:rPr lang="en-US" sz="2200" dirty="0"/>
+              <a:t>Our methods are applicable.  A scaled down version is probably appropriate for some product teams.</a:t>
+            </a:r>
+          </a:p>
+          <a:p>
+            <a:pPr marL="0" indent="0">
+              <a:buNone/>
+            </a:pPr>
+            <a:endParaRPr lang="en-US" sz="2200" dirty="0"/>
+          </a:p>
+          <a:p>
+            <a:pPr lvl="1"/>
+            <a:endParaRPr lang="en-US" sz="1800" dirty="0"/>
           </a:p>
         </p:txBody>
       </p:sp>
@@ -8859,7 +8881,7 @@
           <a:p>
             <a:r>
               <a:rPr lang="en-US" sz="2000" dirty="0"/>
-              <a:t>Industrial Development: 5 – 10 developers</a:t>
+              <a:t>Industrial and Commercial Development: 5 – 20 developers</a:t>
             </a:r>
           </a:p>
           <a:p>
@@ -8874,26 +8896,6 @@
             <a:r>
               <a:rPr lang="en-US" sz="1800" dirty="0"/>
               <a:t>Example: Machine Tool Control</a:t>
-            </a:r>
-          </a:p>
-          <a:p>
-            <a:r>
-              <a:rPr lang="en-US" sz="2000" dirty="0"/>
-              <a:t>Commercial Products: 10 – 30 developers</a:t>
-            </a:r>
-          </a:p>
-          <a:p>
-            <a:pPr lvl="1"/>
-            <a:r>
-              <a:rPr lang="en-US" sz="1800" dirty="0"/>
-              <a:t>Code life-time: 20 – 30 years</a:t>
-            </a:r>
-          </a:p>
-          <a:p>
-            <a:pPr lvl="1"/>
-            <a:r>
-              <a:rPr lang="en-US" sz="1800" dirty="0"/>
-              <a:t>Example: Microsoft Word</a:t>
             </a:r>
           </a:p>
           <a:p>

</xml_diff>

<commit_message>
added content to CppStory_Operations.html and tweaked text in the remaining items
</commit_message>
<xml_diff>
--- a/Resources/PublishingSourceCode.pptx
+++ b/Resources/PublishingSourceCode.pptx
@@ -5,7 +5,7 @@
     <p:sldMasterId id="2147483648" r:id="rId1"/>
   </p:sldMasterIdLst>
   <p:notesMasterIdLst>
-    <p:notesMasterId r:id="rId28"/>
+    <p:notesMasterId r:id="rId29"/>
   </p:notesMasterIdLst>
   <p:sldIdLst>
     <p:sldId id="256" r:id="rId2"/>
@@ -27,13 +27,14 @@
     <p:sldId id="274" r:id="rId18"/>
     <p:sldId id="273" r:id="rId19"/>
     <p:sldId id="275" r:id="rId20"/>
-    <p:sldId id="285" r:id="rId21"/>
+    <p:sldId id="286" r:id="rId21"/>
     <p:sldId id="265" r:id="rId22"/>
     <p:sldId id="266" r:id="rId23"/>
     <p:sldId id="261" r:id="rId24"/>
-    <p:sldId id="263" r:id="rId25"/>
-    <p:sldId id="277" r:id="rId26"/>
-    <p:sldId id="279" r:id="rId27"/>
+    <p:sldId id="287" r:id="rId25"/>
+    <p:sldId id="263" r:id="rId26"/>
+    <p:sldId id="277" r:id="rId27"/>
+    <p:sldId id="279" r:id="rId28"/>
   </p:sldIdLst>
   <p:sldSz cx="12192000" cy="6858000"/>
   <p:notesSz cx="7010400" cy="9296400"/>
@@ -222,7 +223,7 @@
           <a:p>
             <a:fld id="{707A244B-480E-4DF8-B8AD-6F4623E3B964}" type="datetimeFigureOut">
               <a:rPr lang="en-US" smtClean="0"/>
-              <a:t>10/17/2019</a:t>
+              <a:t>12/4/2019</a:t>
             </a:fld>
             <a:endParaRPr lang="en-US"/>
           </a:p>
@@ -757,7 +758,7 @@
           <a:p>
             <a:fld id="{7E5A6A94-3764-4657-B78A-EA3F42F28C9C}" type="datetime1">
               <a:rPr lang="en-US" smtClean="0"/>
-              <a:t>10/17/2019</a:t>
+              <a:t>12/4/2019</a:t>
             </a:fld>
             <a:endParaRPr lang="en-US"/>
           </a:p>
@@ -955,7 +956,7 @@
           <a:p>
             <a:fld id="{93B9EABD-462C-4F85-9539-646406A6B6CC}" type="datetime1">
               <a:rPr lang="en-US" smtClean="0"/>
-              <a:t>10/17/2019</a:t>
+              <a:t>12/4/2019</a:t>
             </a:fld>
             <a:endParaRPr lang="en-US"/>
           </a:p>
@@ -1163,7 +1164,7 @@
           <a:p>
             <a:fld id="{E179B0F1-CFD2-466E-85DC-3349E60E54D2}" type="datetime1">
               <a:rPr lang="en-US" smtClean="0"/>
-              <a:t>10/17/2019</a:t>
+              <a:t>12/4/2019</a:t>
             </a:fld>
             <a:endParaRPr lang="en-US"/>
           </a:p>
@@ -1371,7 +1372,7 @@
           <a:p>
             <a:fld id="{6DC36762-1270-475E-8EE1-6BB0D9927869}" type="datetime1">
               <a:rPr lang="en-US" smtClean="0"/>
-              <a:t>10/17/2019</a:t>
+              <a:t>12/4/2019</a:t>
             </a:fld>
             <a:endParaRPr lang="en-US"/>
           </a:p>
@@ -1646,7 +1647,7 @@
           <a:p>
             <a:fld id="{E28B701A-BF74-4B76-B760-E2C6561B48E0}" type="datetime1">
               <a:rPr lang="en-US" smtClean="0"/>
-              <a:t>10/17/2019</a:t>
+              <a:t>12/4/2019</a:t>
             </a:fld>
             <a:endParaRPr lang="en-US"/>
           </a:p>
@@ -1911,7 +1912,7 @@
           <a:p>
             <a:fld id="{848E7606-0344-46F9-B489-348F205DDD81}" type="datetime1">
               <a:rPr lang="en-US" smtClean="0"/>
-              <a:t>10/17/2019</a:t>
+              <a:t>12/4/2019</a:t>
             </a:fld>
             <a:endParaRPr lang="en-US"/>
           </a:p>
@@ -2323,7 +2324,7 @@
           <a:p>
             <a:fld id="{12562A6D-B456-4A3E-ABF9-DB3F97FE8526}" type="datetime1">
               <a:rPr lang="en-US" smtClean="0"/>
-              <a:t>10/17/2019</a:t>
+              <a:t>12/4/2019</a:t>
             </a:fld>
             <a:endParaRPr lang="en-US"/>
           </a:p>
@@ -2464,7 +2465,7 @@
           <a:p>
             <a:fld id="{14644366-7E7B-43AD-8FBC-DB94443C6600}" type="datetime1">
               <a:rPr lang="en-US" smtClean="0"/>
-              <a:t>10/17/2019</a:t>
+              <a:t>12/4/2019</a:t>
             </a:fld>
             <a:endParaRPr lang="en-US"/>
           </a:p>
@@ -2577,7 +2578,7 @@
           <a:p>
             <a:fld id="{8ABD86A2-66D8-40CD-9756-5715ECB136F6}" type="datetime1">
               <a:rPr lang="en-US" smtClean="0"/>
-              <a:t>10/17/2019</a:t>
+              <a:t>12/4/2019</a:t>
             </a:fld>
             <a:endParaRPr lang="en-US"/>
           </a:p>
@@ -2888,7 +2889,7 @@
           <a:p>
             <a:fld id="{84947D4A-30B2-48C8-A960-21FC1AE3E1D6}" type="datetime1">
               <a:rPr lang="en-US" smtClean="0"/>
-              <a:t>10/17/2019</a:t>
+              <a:t>12/4/2019</a:t>
             </a:fld>
             <a:endParaRPr lang="en-US"/>
           </a:p>
@@ -3176,7 +3177,7 @@
           <a:p>
             <a:fld id="{1A4A88B8-2510-4B6F-8DFE-EE55B4B2CE7F}" type="datetime1">
               <a:rPr lang="en-US" smtClean="0"/>
-              <a:t>10/17/2019</a:t>
+              <a:t>12/4/2019</a:t>
             </a:fld>
             <a:endParaRPr lang="en-US"/>
           </a:p>
@@ -3417,7 +3418,7 @@
           <a:p>
             <a:fld id="{17ED4B07-0083-46EC-AB42-36920CDC7586}" type="datetime1">
               <a:rPr lang="en-US" smtClean="0"/>
-              <a:t>10/17/2019</a:t>
+              <a:t>12/4/2019</a:t>
             </a:fld>
             <a:endParaRPr lang="en-US"/>
           </a:p>
@@ -3851,14 +3852,19 @@
             <p:ph type="ctrTitle"/>
           </p:nvPr>
         </p:nvSpPr>
-        <p:spPr/>
-        <p:txBody>
-          <a:bodyPr/>
-          <a:lstStyle/>
-          <a:p>
-            <a:r>
-              <a:rPr lang="en-US" dirty="0"/>
-              <a:t>Publishing Source Code</a:t>
+        <p:spPr>
+          <a:xfrm>
+            <a:off x="1524000" y="1122363"/>
+            <a:ext cx="9144000" cy="3578426"/>
+          </a:xfrm>
+        </p:spPr>
+        <p:txBody>
+          <a:bodyPr/>
+          <a:lstStyle/>
+          <a:p>
+            <a:r>
+              <a:rPr lang="en-US" sz="5400" dirty="0"/>
+              <a:t>Publishing Domain Specific Source Code</a:t>
             </a:r>
             <a:br>
               <a:rPr lang="en-US" dirty="0"/>
@@ -3912,7 +3918,7 @@
         </p:nvSpPr>
         <p:spPr>
           <a:xfrm>
-            <a:off x="1524000" y="4296992"/>
+            <a:off x="1524000" y="5076160"/>
             <a:ext cx="9144000" cy="960808"/>
           </a:xfrm>
         </p:spPr>
@@ -3928,7 +3934,7 @@
           <a:p>
             <a:r>
               <a:rPr lang="en-US" dirty="0"/>
-              <a:t>11 October 2019</a:t>
+              <a:t>04 December 2019</a:t>
             </a:r>
           </a:p>
         </p:txBody>
@@ -6224,7 +6230,7 @@
             <a:pPr lvl="1"/>
             <a:r>
               <a:rPr lang="en-US" dirty="0"/>
-              <a:t>More than 40 repositories of mostly C++ code are published</a:t>
+              <a:t>More than 50 repositories of mostly C++ code are published</a:t>
             </a:r>
           </a:p>
           <a:p>
@@ -6733,8 +6739,28 @@
           </a:p>
           <a:p>
             <a:r>
+              <a:rPr lang="en-US" sz="2200" dirty="0"/>
+              <a:t>Academic Teaching: 1 instructor – 100 students</a:t>
+            </a:r>
+          </a:p>
+          <a:p>
+            <a:pPr lvl="1"/>
+            <a:r>
+              <a:rPr lang="en-US" sz="1800" dirty="0"/>
+              <a:t>Code life-time: 5 – 10 years</a:t>
+            </a:r>
+          </a:p>
+          <a:p>
+            <a:pPr lvl="1"/>
+            <a:r>
+              <a:rPr lang="en-US" sz="1800" dirty="0"/>
+              <a:t>Example: software examples for language and design courses</a:t>
+            </a:r>
+          </a:p>
+          <a:p>
+            <a:r>
               <a:rPr lang="en-US" sz="2000" dirty="0"/>
-              <a:t>Open Source Development: 5 – 1000 active developers, many casual contributors</a:t>
+              <a:t>Open Source Development: 1 – 300 active developers, many casual contributors</a:t>
             </a:r>
           </a:p>
           <a:p>
@@ -6825,7 +6851,7 @@
     </p:spTree>
     <p:extLst>
       <p:ext uri="{BB962C8B-B14F-4D97-AF65-F5344CB8AC3E}">
-        <p14:creationId xmlns:p14="http://schemas.microsoft.com/office/powerpoint/2010/main" val="1101158785"/>
+        <p14:creationId xmlns:p14="http://schemas.microsoft.com/office/powerpoint/2010/main" val="2827041285"/>
       </p:ext>
     </p:extLst>
   </p:cSld>
@@ -7610,150 +7636,99 @@
           </a:xfrm>
         </p:spPr>
         <p:txBody>
+          <a:bodyPr/>
+          <a:lstStyle/>
+          <a:p>
+            <a:r>
+              <a:rPr lang="en-US" dirty="0"/>
+              <a:t>Academic Teaching Domain</a:t>
+            </a:r>
+          </a:p>
+        </p:txBody>
+      </p:sp>
+      <p:sp>
+        <p:nvSpPr>
+          <p:cNvPr id="3" name="Content Placeholder 2">
+            <a:extLst>
+              <a:ext uri="{FF2B5EF4-FFF2-40B4-BE49-F238E27FC236}">
+                <a16:creationId xmlns:a16="http://schemas.microsoft.com/office/drawing/2014/main" id="{C65F66DE-FE31-4539-83AE-36CA6E637596}"/>
+              </a:ext>
+            </a:extLst>
+          </p:cNvPr>
+          <p:cNvSpPr>
+            <a:spLocks noGrp="1"/>
+          </p:cNvSpPr>
+          <p:nvPr>
+            <p:ph idx="1"/>
+          </p:nvPr>
+        </p:nvSpPr>
+        <p:spPr>
+          <a:xfrm>
+            <a:off x="838200" y="1017529"/>
+            <a:ext cx="10515600" cy="5355770"/>
+          </a:xfrm>
+        </p:spPr>
+        <p:txBody>
           <a:bodyPr>
             <a:noAutofit/>
           </a:bodyPr>
           <a:lstStyle/>
           <a:p>
             <a:r>
-              <a:rPr lang="en-US" sz="4000" dirty="0"/>
-              <a:t>Industrial and Commercial Development Domain</a:t>
-            </a:r>
-          </a:p>
-        </p:txBody>
-      </p:sp>
-      <p:sp>
-        <p:nvSpPr>
-          <p:cNvPr id="3" name="Content Placeholder 2">
-            <a:extLst>
-              <a:ext uri="{FF2B5EF4-FFF2-40B4-BE49-F238E27FC236}">
-                <a16:creationId xmlns:a16="http://schemas.microsoft.com/office/drawing/2014/main" id="{C65F66DE-FE31-4539-83AE-36CA6E637596}"/>
-              </a:ext>
-            </a:extLst>
-          </p:cNvPr>
-          <p:cNvSpPr>
-            <a:spLocks noGrp="1"/>
-          </p:cNvSpPr>
-          <p:nvPr>
-            <p:ph idx="1"/>
-          </p:nvPr>
-        </p:nvSpPr>
-        <p:spPr>
-          <a:xfrm>
-            <a:off x="838200" y="1268569"/>
-            <a:ext cx="10515600" cy="5104730"/>
-          </a:xfrm>
-        </p:spPr>
-        <p:txBody>
-          <a:bodyPr>
-            <a:noAutofit/>
-          </a:bodyPr>
-          <a:lstStyle/>
-          <a:p>
-            <a:r>
               <a:rPr lang="en-US" sz="2000" dirty="0"/>
-              <a:t>Industrial and Commercial Development: 5 – 20 developers on a product team</a:t>
+              <a:t>Academic Teaching:  1 Instructor, 2 Tas, 100 students</a:t>
             </a:r>
           </a:p>
           <a:p>
             <a:pPr lvl="1"/>
             <a:r>
               <a:rPr lang="en-US" sz="1800" dirty="0"/>
-              <a:t>Code life-time: 5 – 20 years</a:t>
+              <a:t>Code life-time: 5 – 10 years</a:t>
             </a:r>
           </a:p>
           <a:p>
             <a:pPr lvl="1"/>
             <a:r>
               <a:rPr lang="en-US" sz="1800" dirty="0"/>
-              <a:t>Example: Machine Tool Control</a:t>
-            </a:r>
+              <a:t>Example: </a:t>
+            </a:r>
+          </a:p>
+          <a:p>
+            <a:r>
+              <a:rPr lang="en-US" sz="2000" dirty="0"/>
+              <a:t>A language or design course needs non-trivial examples, in addition to exercises.  For graduate courses the examples may be quite large – multipackage, multi-threaded, distributed prototypes.</a:t>
+            </a:r>
+          </a:p>
+          <a:p>
+            <a:r>
+              <a:rPr lang="en-US" sz="2000" dirty="0"/>
+              <a:t>For project-based courses the instructor may wish to give starter components to allow students to build more ambitious projects than if they write all code themselves.</a:t>
+            </a:r>
+            <a:endParaRPr lang="en-US" sz="1800" dirty="0"/>
           </a:p>
           <a:p>
             <a:r>
               <a:rPr lang="en-US" sz="2200" dirty="0"/>
-              <a:t>Code base starts with an initial product</a:t>
+              <a:t>An instructor who teaches a sequence of design courses over several years will need a place to store and organize design notes and sample code.</a:t>
             </a:r>
           </a:p>
           <a:p>
             <a:r>
               <a:rPr lang="en-US" sz="2200" dirty="0"/>
-              <a:t>New products start from that initial code</a:t>
-            </a:r>
-          </a:p>
-          <a:p>
-            <a:pPr lvl="1"/>
-            <a:r>
-              <a:rPr lang="en-US" sz="1800" dirty="0"/>
-              <a:t>Has a common code baseline been defined?</a:t>
-            </a:r>
-          </a:p>
-          <a:p>
-            <a:pPr lvl="1"/>
-            <a:r>
-              <a:rPr lang="en-US" sz="1800" dirty="0"/>
-              <a:t>Code reviews are held during development</a:t>
-            </a:r>
-          </a:p>
-          <a:p>
-            <a:pPr lvl="1"/>
-            <a:r>
-              <a:rPr lang="en-US" sz="1800" dirty="0"/>
-              <a:t>At product completion is code reviewed and refactored into reusable parts and product specific code?</a:t>
-            </a:r>
-          </a:p>
-          <a:p>
-            <a:pPr lvl="1"/>
-            <a:r>
-              <a:rPr lang="en-US" sz="1800" dirty="0"/>
-              <a:t>Is the organization willing to provide overhead effort to evolve the common code base?</a:t>
+              <a:t>It is quite important for students to have a clear path to the resources they need for their projects.</a:t>
             </a:r>
           </a:p>
           <a:p>
             <a:r>
               <a:rPr lang="en-US" sz="2200" dirty="0"/>
-              <a:t>Microsoft is a commercial development domain with many products, some modernized versions of vintage products.</a:t>
-            </a:r>
-          </a:p>
-          <a:p>
-            <a:pPr lvl="1"/>
-            <a:r>
-              <a:rPr lang="en-US" sz="1800" dirty="0"/>
-              <a:t>They have a well engineered code sharing platform: </a:t>
-            </a:r>
-            <a:r>
-              <a:rPr lang="en-US" sz="1800" dirty="0">
-                <a:hlinkClick r:id="rId2"/>
-              </a:rPr>
-              <a:t>https://github.com/microsoft</a:t>
-            </a:r>
-            <a:r>
-              <a:rPr lang="en-US" sz="1800" dirty="0"/>
-              <a:t> </a:t>
-            </a:r>
-          </a:p>
-          <a:p>
-            <a:pPr lvl="1"/>
-            <a:r>
-              <a:rPr lang="en-US" sz="1800" dirty="0"/>
-              <a:t>That platform uses designs similar to those described here</a:t>
+              <a:t>It has been my experience that former students return to a teaching site to review notes and access sample code.</a:t>
             </a:r>
           </a:p>
           <a:p>
             <a:r>
               <a:rPr lang="en-US" sz="2200" dirty="0"/>
-              <a:t>Our methods are applicable.  A scaled down version is probably appropriate for some product teams.</a:t>
-            </a:r>
-          </a:p>
-          <a:p>
-            <a:pPr marL="0" indent="0">
-              <a:buNone/>
-            </a:pPr>
-            <a:endParaRPr lang="en-US" sz="2200" dirty="0"/>
-          </a:p>
-          <a:p>
-            <a:pPr lvl="1"/>
-            <a:endParaRPr lang="en-US" sz="1800" dirty="0"/>
+              <a:t>Our methods are directly applicable.</a:t>
+            </a:r>
           </a:p>
         </p:txBody>
       </p:sp>
@@ -7762,7 +7737,7 @@
           <p:cNvPr id="4" name="Slide Number Placeholder 3">
             <a:extLst>
               <a:ext uri="{FF2B5EF4-FFF2-40B4-BE49-F238E27FC236}">
-                <a16:creationId xmlns:a16="http://schemas.microsoft.com/office/drawing/2014/main" id="{A916C694-BD83-42C9-A8AC-D048E61AD071}"/>
+                <a16:creationId xmlns:a16="http://schemas.microsoft.com/office/drawing/2014/main" id="{B11F232F-AB6D-4130-9246-6A1AF1E6451D}"/>
               </a:ext>
             </a:extLst>
           </p:cNvPr>
@@ -7789,7 +7764,7 @@
     </p:spTree>
     <p:extLst>
       <p:ext uri="{BB962C8B-B14F-4D97-AF65-F5344CB8AC3E}">
-        <p14:creationId xmlns:p14="http://schemas.microsoft.com/office/powerpoint/2010/main" val="1744719603"/>
+        <p14:creationId xmlns:p14="http://schemas.microsoft.com/office/powerpoint/2010/main" val="2174486356"/>
       </p:ext>
     </p:extLst>
   </p:cSld>
@@ -7835,40 +7810,7 @@
         <p:spPr>
           <a:xfrm>
             <a:off x="838200" y="339367"/>
-            <a:ext cx="10515600" cy="529957"/>
-          </a:xfrm>
-        </p:spPr>
-        <p:txBody>
-          <a:bodyPr/>
-          <a:lstStyle/>
-          <a:p>
-            <a:r>
-              <a:rPr lang="en-US" dirty="0"/>
-              <a:t>Aerospace Domain</a:t>
-            </a:r>
-          </a:p>
-        </p:txBody>
-      </p:sp>
-      <p:sp>
-        <p:nvSpPr>
-          <p:cNvPr id="3" name="Content Placeholder 2">
-            <a:extLst>
-              <a:ext uri="{FF2B5EF4-FFF2-40B4-BE49-F238E27FC236}">
-                <a16:creationId xmlns:a16="http://schemas.microsoft.com/office/drawing/2014/main" id="{C65F66DE-FE31-4539-83AE-36CA6E637596}"/>
-              </a:ext>
-            </a:extLst>
-          </p:cNvPr>
-          <p:cNvSpPr>
-            <a:spLocks noGrp="1"/>
-          </p:cNvSpPr>
-          <p:nvPr>
-            <p:ph idx="1"/>
-          </p:nvPr>
-        </p:nvSpPr>
-        <p:spPr>
-          <a:xfrm>
-            <a:off x="838200" y="1017529"/>
-            <a:ext cx="10515600" cy="5355770"/>
+            <a:ext cx="10515600" cy="678161"/>
           </a:xfrm>
         </p:spPr>
         <p:txBody>
@@ -7878,117 +7820,144 @@
           <a:lstStyle/>
           <a:p>
             <a:r>
+              <a:rPr lang="en-US" sz="4000" dirty="0"/>
+              <a:t>Industrial and Commercial Development Domain</a:t>
+            </a:r>
+          </a:p>
+        </p:txBody>
+      </p:sp>
+      <p:sp>
+        <p:nvSpPr>
+          <p:cNvPr id="3" name="Content Placeholder 2">
+            <a:extLst>
+              <a:ext uri="{FF2B5EF4-FFF2-40B4-BE49-F238E27FC236}">
+                <a16:creationId xmlns:a16="http://schemas.microsoft.com/office/drawing/2014/main" id="{C65F66DE-FE31-4539-83AE-36CA6E637596}"/>
+              </a:ext>
+            </a:extLst>
+          </p:cNvPr>
+          <p:cNvSpPr>
+            <a:spLocks noGrp="1"/>
+          </p:cNvSpPr>
+          <p:nvPr>
+            <p:ph idx="1"/>
+          </p:nvPr>
+        </p:nvSpPr>
+        <p:spPr>
+          <a:xfrm>
+            <a:off x="838200" y="1268569"/>
+            <a:ext cx="10515600" cy="5104730"/>
+          </a:xfrm>
+        </p:spPr>
+        <p:txBody>
+          <a:bodyPr>
+            <a:noAutofit/>
+          </a:bodyPr>
+          <a:lstStyle/>
+          <a:p>
+            <a:r>
+              <a:rPr lang="en-US" sz="2000" dirty="0"/>
+              <a:t>Industrial and Commercial Development: 5 – 20 developers on a product team</a:t>
+            </a:r>
+          </a:p>
+          <a:p>
+            <a:pPr lvl="1"/>
+            <a:r>
               <a:rPr lang="en-US" sz="1800" dirty="0"/>
-              <a:t>Aerospace Programs: 5 – 200 developers</a:t>
-            </a:r>
-          </a:p>
-          <a:p>
-            <a:pPr lvl="1"/>
-            <a:r>
-              <a:rPr lang="en-US" sz="1400" dirty="0"/>
-              <a:t>Code life-time: 20 – 30 years</a:t>
-            </a:r>
-          </a:p>
-          <a:p>
-            <a:pPr lvl="1"/>
-            <a:r>
-              <a:rPr lang="en-US" sz="1400" dirty="0"/>
-              <a:t>Example: Submarine control, Area surveillance, ..</a:t>
-            </a:r>
-          </a:p>
-          <a:p>
+              <a:t>Code life-time: 5 – 20 years</a:t>
+            </a:r>
+          </a:p>
+          <a:p>
+            <a:pPr lvl="1"/>
             <a:r>
               <a:rPr lang="en-US" sz="1800" dirty="0"/>
-              <a:t>Development is product oriented, starting with an initial contract, and continuing for possibly many years of enhancements and new contracts that build on the existing product technology</a:t>
-            </a:r>
-          </a:p>
-          <a:p>
+              <a:t>Example: Machine Tool Control</a:t>
+            </a:r>
+          </a:p>
+          <a:p>
+            <a:r>
+              <a:rPr lang="en-US" sz="2200" dirty="0"/>
+              <a:t>Code base starts with an initial product</a:t>
+            </a:r>
+          </a:p>
+          <a:p>
+            <a:r>
+              <a:rPr lang="en-US" sz="2200" dirty="0"/>
+              <a:t>New products start from that initial code</a:t>
+            </a:r>
+          </a:p>
+          <a:p>
+            <a:pPr lvl="1"/>
             <a:r>
               <a:rPr lang="en-US" sz="1800" dirty="0"/>
-              <a:t>An example is the development of area surveillance radar systems</a:t>
-            </a:r>
-          </a:p>
-          <a:p>
-            <a:pPr lvl="1"/>
-            <a:r>
-              <a:rPr lang="en-US" sz="1400" dirty="0"/>
-              <a:t>Typical lifetime of a radar system is 20 years</a:t>
-            </a:r>
-          </a:p>
-          <a:p>
-            <a:pPr lvl="2"/>
-            <a:r>
-              <a:rPr lang="en-US" sz="1100" dirty="0"/>
-              <a:t>The code has to be maintained over that lifetime, sometimes by the manufacturer, sometimes by the customer.</a:t>
-            </a:r>
-          </a:p>
-          <a:p>
-            <a:pPr lvl="1"/>
-            <a:r>
-              <a:rPr lang="en-US" sz="1400" dirty="0"/>
-              <a:t>Once an initial contract has been successfully completed it is common for many contracts to be awarded for new versions.</a:t>
-            </a:r>
-          </a:p>
-          <a:p>
-            <a:pPr lvl="2"/>
-            <a:r>
-              <a:rPr lang="en-US" sz="1100" dirty="0"/>
-              <a:t>Usually a large part of a new product is based on an existing one and will share a large fraction of its code</a:t>
-            </a:r>
-          </a:p>
-          <a:p>
-            <a:pPr lvl="2"/>
-            <a:r>
-              <a:rPr lang="en-US" sz="1100" dirty="0"/>
-              <a:t>In most cases the new contract requires new features and enhancements – the customer looks at the original and decides how to embellish</a:t>
-            </a:r>
-          </a:p>
-          <a:p>
+              <a:t>Has a common code baseline been defined?</a:t>
+            </a:r>
+          </a:p>
+          <a:p>
+            <a:pPr lvl="1"/>
             <a:r>
               <a:rPr lang="en-US" sz="1800" dirty="0"/>
-              <a:t>The Capability Maturity Model was developed beginning when the Air Force funded a study with the Software Engineering Institute.  Its intent is to encourage DoD contractors to develop and maintain a consistent process for creation of software. </a:t>
-            </a:r>
-          </a:p>
-          <a:p>
-            <a:pPr lvl="1"/>
-            <a:r>
-              <a:rPr lang="en-US" sz="1400" dirty="0">
+              <a:t>Code reviews are held during development</a:t>
+            </a:r>
+          </a:p>
+          <a:p>
+            <a:pPr lvl="1"/>
+            <a:r>
+              <a:rPr lang="en-US" sz="1800" dirty="0"/>
+              <a:t>At product completion is code reviewed and refactored into reusable parts and product specific code?</a:t>
+            </a:r>
+          </a:p>
+          <a:p>
+            <a:pPr lvl="1"/>
+            <a:r>
+              <a:rPr lang="en-US" sz="1800" dirty="0"/>
+              <a:t>Is the organization willing to provide overhead effort to evolve the common code base?</a:t>
+            </a:r>
+          </a:p>
+          <a:p>
+            <a:r>
+              <a:rPr lang="en-US" sz="2200" dirty="0"/>
+              <a:t>Microsoft is a commercial development domain with many products, some modernized versions of vintage products.</a:t>
+            </a:r>
+          </a:p>
+          <a:p>
+            <a:pPr lvl="1"/>
+            <a:r>
+              <a:rPr lang="en-US" sz="1800" dirty="0"/>
+              <a:t>They have a well engineered code sharing platform: </a:t>
+            </a:r>
+            <a:r>
+              <a:rPr lang="en-US" sz="1800" dirty="0">
                 <a:hlinkClick r:id="rId2"/>
               </a:rPr>
-              <a:t>https://en.wikipedia.org/wiki/Capability_Maturity_Model</a:t>
-            </a:r>
-            <a:r>
-              <a:rPr lang="en-US" sz="1400" dirty="0"/>
+              <a:t>https://github.com/microsoft</a:t>
+            </a:r>
+            <a:r>
+              <a:rPr lang="en-US" sz="1800" dirty="0"/>
               <a:t> </a:t>
             </a:r>
           </a:p>
           <a:p>
             <a:pPr lvl="1"/>
             <a:r>
-              <a:rPr lang="en-US" sz="1400" dirty="0"/>
-              <a:t>CMM provides guidelines, but it is a model and a yardstick for assessing capability of contractors</a:t>
-            </a:r>
-          </a:p>
-          <a:p>
-            <a:pPr lvl="1"/>
-            <a:r>
-              <a:rPr lang="en-US" sz="1400" dirty="0"/>
-              <a:t>It does not provide specifics for tools and techniques that support reuse</a:t>
-            </a:r>
-          </a:p>
-          <a:p>
-            <a:r>
               <a:rPr lang="en-US" sz="1800" dirty="0"/>
-              <a:t>Our methods apply for individual product teams.  Unknown how that would scale to corporation level. </a:t>
-            </a:r>
-          </a:p>
-          <a:p>
-            <a:pPr lvl="1"/>
-            <a:endParaRPr lang="en-US" sz="1400" dirty="0"/>
-          </a:p>
-          <a:p>
-            <a:pPr lvl="1"/>
-            <a:endParaRPr lang="en-US" sz="1400" dirty="0"/>
+              <a:t>That platform uses designs similar to those described here</a:t>
+            </a:r>
+          </a:p>
+          <a:p>
+            <a:r>
+              <a:rPr lang="en-US" sz="2200" dirty="0"/>
+              <a:t>Our methods are applicable.  A scaled down version is probably appropriate for some product teams.</a:t>
+            </a:r>
+          </a:p>
+          <a:p>
+            <a:pPr marL="0" indent="0">
+              <a:buNone/>
+            </a:pPr>
+            <a:endParaRPr lang="en-US" sz="2200" dirty="0"/>
+          </a:p>
+          <a:p>
+            <a:pPr lvl="1"/>
+            <a:endParaRPr lang="en-US" sz="1800" dirty="0"/>
           </a:p>
         </p:txBody>
       </p:sp>
@@ -8024,7 +7993,7 @@
     </p:spTree>
     <p:extLst>
       <p:ext uri="{BB962C8B-B14F-4D97-AF65-F5344CB8AC3E}">
-        <p14:creationId xmlns:p14="http://schemas.microsoft.com/office/powerpoint/2010/main" val="3738534843"/>
+        <p14:creationId xmlns:p14="http://schemas.microsoft.com/office/powerpoint/2010/main" val="1744719603"/>
       </p:ext>
     </p:extLst>
   </p:cSld>
@@ -8056,6 +8025,241 @@
           <p:cNvPr id="2" name="Title 1">
             <a:extLst>
               <a:ext uri="{FF2B5EF4-FFF2-40B4-BE49-F238E27FC236}">
+                <a16:creationId xmlns:a16="http://schemas.microsoft.com/office/drawing/2014/main" id="{C818CF9C-B350-4936-99E1-D89031958E0C}"/>
+              </a:ext>
+            </a:extLst>
+          </p:cNvPr>
+          <p:cNvSpPr>
+            <a:spLocks noGrp="1"/>
+          </p:cNvSpPr>
+          <p:nvPr>
+            <p:ph type="title"/>
+          </p:nvPr>
+        </p:nvSpPr>
+        <p:spPr>
+          <a:xfrm>
+            <a:off x="838200" y="339367"/>
+            <a:ext cx="10515600" cy="529957"/>
+          </a:xfrm>
+        </p:spPr>
+        <p:txBody>
+          <a:bodyPr/>
+          <a:lstStyle/>
+          <a:p>
+            <a:r>
+              <a:rPr lang="en-US" dirty="0"/>
+              <a:t>Aerospace Domain</a:t>
+            </a:r>
+          </a:p>
+        </p:txBody>
+      </p:sp>
+      <p:sp>
+        <p:nvSpPr>
+          <p:cNvPr id="3" name="Content Placeholder 2">
+            <a:extLst>
+              <a:ext uri="{FF2B5EF4-FFF2-40B4-BE49-F238E27FC236}">
+                <a16:creationId xmlns:a16="http://schemas.microsoft.com/office/drawing/2014/main" id="{C65F66DE-FE31-4539-83AE-36CA6E637596}"/>
+              </a:ext>
+            </a:extLst>
+          </p:cNvPr>
+          <p:cNvSpPr>
+            <a:spLocks noGrp="1"/>
+          </p:cNvSpPr>
+          <p:nvPr>
+            <p:ph idx="1"/>
+          </p:nvPr>
+        </p:nvSpPr>
+        <p:spPr>
+          <a:xfrm>
+            <a:off x="838200" y="1017529"/>
+            <a:ext cx="10515600" cy="5355770"/>
+          </a:xfrm>
+        </p:spPr>
+        <p:txBody>
+          <a:bodyPr>
+            <a:noAutofit/>
+          </a:bodyPr>
+          <a:lstStyle/>
+          <a:p>
+            <a:r>
+              <a:rPr lang="en-US" sz="1800" dirty="0"/>
+              <a:t>Aerospace Programs: 5 – 200 developers</a:t>
+            </a:r>
+          </a:p>
+          <a:p>
+            <a:pPr lvl="1"/>
+            <a:r>
+              <a:rPr lang="en-US" sz="1400" dirty="0"/>
+              <a:t>Code life-time: 20 – 30 years</a:t>
+            </a:r>
+          </a:p>
+          <a:p>
+            <a:pPr lvl="1"/>
+            <a:r>
+              <a:rPr lang="en-US" sz="1400" dirty="0"/>
+              <a:t>Example: Submarine control, Area surveillance, ..</a:t>
+            </a:r>
+          </a:p>
+          <a:p>
+            <a:r>
+              <a:rPr lang="en-US" sz="1800" dirty="0"/>
+              <a:t>Development is product oriented, starting with an initial contract, and continuing for possibly many years of enhancements and new contracts that build on the existing product technology</a:t>
+            </a:r>
+          </a:p>
+          <a:p>
+            <a:r>
+              <a:rPr lang="en-US" sz="1800" dirty="0"/>
+              <a:t>An example is the development of area surveillance radar systems</a:t>
+            </a:r>
+          </a:p>
+          <a:p>
+            <a:pPr lvl="1"/>
+            <a:r>
+              <a:rPr lang="en-US" sz="1400" dirty="0"/>
+              <a:t>Typical lifetime of a radar system is 20 years</a:t>
+            </a:r>
+          </a:p>
+          <a:p>
+            <a:pPr lvl="2"/>
+            <a:r>
+              <a:rPr lang="en-US" sz="1100" dirty="0"/>
+              <a:t>The code has to be maintained over that lifetime, sometimes by the manufacturer, sometimes by the customer.</a:t>
+            </a:r>
+          </a:p>
+          <a:p>
+            <a:pPr lvl="1"/>
+            <a:r>
+              <a:rPr lang="en-US" sz="1400" dirty="0"/>
+              <a:t>Once an initial contract has been successfully completed it is common for many contracts to be awarded for new versions.</a:t>
+            </a:r>
+          </a:p>
+          <a:p>
+            <a:pPr lvl="2"/>
+            <a:r>
+              <a:rPr lang="en-US" sz="1100" dirty="0"/>
+              <a:t>Usually a large part of a new product is based on an existing one and will share a large fraction of its code</a:t>
+            </a:r>
+          </a:p>
+          <a:p>
+            <a:pPr lvl="2"/>
+            <a:r>
+              <a:rPr lang="en-US" sz="1100" dirty="0"/>
+              <a:t>In most cases the new contract requires new features and enhancements – the customer looks at the original and decides how to embellish</a:t>
+            </a:r>
+          </a:p>
+          <a:p>
+            <a:r>
+              <a:rPr lang="en-US" sz="1800" dirty="0"/>
+              <a:t>The Capability Maturity Model was developed beginning when the Air Force funded a study with the Software Engineering Institute.  Its intent is to encourage DoD contractors to develop and maintain a consistent process for creation of software. </a:t>
+            </a:r>
+          </a:p>
+          <a:p>
+            <a:pPr lvl="1"/>
+            <a:r>
+              <a:rPr lang="en-US" sz="1400" dirty="0">
+                <a:hlinkClick r:id="rId2"/>
+              </a:rPr>
+              <a:t>https://en.wikipedia.org/wiki/Capability_Maturity_Model</a:t>
+            </a:r>
+            <a:r>
+              <a:rPr lang="en-US" sz="1400" dirty="0"/>
+              <a:t> </a:t>
+            </a:r>
+          </a:p>
+          <a:p>
+            <a:pPr lvl="1"/>
+            <a:r>
+              <a:rPr lang="en-US" sz="1400" dirty="0"/>
+              <a:t>CMM provides guidelines, but it is a model and a yardstick for assessing capability of contractors</a:t>
+            </a:r>
+          </a:p>
+          <a:p>
+            <a:pPr lvl="1"/>
+            <a:r>
+              <a:rPr lang="en-US" sz="1400" dirty="0"/>
+              <a:t>It does not provide specifics for tools and techniques that support reuse</a:t>
+            </a:r>
+          </a:p>
+          <a:p>
+            <a:r>
+              <a:rPr lang="en-US" sz="1800" dirty="0"/>
+              <a:t>Our methods apply for individual product teams.  Unknown how that would scale to corporation level. </a:t>
+            </a:r>
+          </a:p>
+          <a:p>
+            <a:pPr lvl="1"/>
+            <a:endParaRPr lang="en-US" sz="1400" dirty="0"/>
+          </a:p>
+          <a:p>
+            <a:pPr lvl="1"/>
+            <a:endParaRPr lang="en-US" sz="1400" dirty="0"/>
+          </a:p>
+        </p:txBody>
+      </p:sp>
+      <p:sp>
+        <p:nvSpPr>
+          <p:cNvPr id="4" name="Slide Number Placeholder 3">
+            <a:extLst>
+              <a:ext uri="{FF2B5EF4-FFF2-40B4-BE49-F238E27FC236}">
+                <a16:creationId xmlns:a16="http://schemas.microsoft.com/office/drawing/2014/main" id="{A916C694-BD83-42C9-A8AC-D048E61AD071}"/>
+              </a:ext>
+            </a:extLst>
+          </p:cNvPr>
+          <p:cNvSpPr>
+            <a:spLocks noGrp="1"/>
+          </p:cNvSpPr>
+          <p:nvPr>
+            <p:ph type="sldNum" sz="quarter" idx="12"/>
+          </p:nvPr>
+        </p:nvSpPr>
+        <p:spPr/>
+        <p:txBody>
+          <a:bodyPr/>
+          <a:lstStyle/>
+          <a:p>
+            <a:fld id="{EDEBF0BA-A897-4C1E-AB3C-F330808C0E1D}" type="slidenum">
+              <a:rPr lang="en-US" smtClean="0"/>
+              <a:t>26</a:t>
+            </a:fld>
+            <a:endParaRPr lang="en-US"/>
+          </a:p>
+        </p:txBody>
+      </p:sp>
+    </p:spTree>
+    <p:extLst>
+      <p:ext uri="{BB962C8B-B14F-4D97-AF65-F5344CB8AC3E}">
+        <p14:creationId xmlns:p14="http://schemas.microsoft.com/office/powerpoint/2010/main" val="3738534843"/>
+      </p:ext>
+    </p:extLst>
+  </p:cSld>
+  <p:clrMapOvr>
+    <a:masterClrMapping/>
+  </p:clrMapOvr>
+</p:sld>
+</file>
+
+<file path=ppt/slides/slide27.xml><?xml version="1.0" encoding="utf-8"?>
+<p:sld xmlns:a="http://schemas.openxmlformats.org/drawingml/2006/main" xmlns:r="http://schemas.openxmlformats.org/officeDocument/2006/relationships" xmlns:p="http://schemas.openxmlformats.org/presentationml/2006/main">
+  <p:cSld>
+    <p:spTree>
+      <p:nvGrpSpPr>
+        <p:cNvPr id="1" name=""/>
+        <p:cNvGrpSpPr/>
+        <p:nvPr/>
+      </p:nvGrpSpPr>
+      <p:grpSpPr>
+        <a:xfrm>
+          <a:off x="0" y="0"/>
+          <a:ext cx="0" cy="0"/>
+          <a:chOff x="0" y="0"/>
+          <a:chExt cx="0" cy="0"/>
+        </a:xfrm>
+      </p:grpSpPr>
+      <p:sp>
+        <p:nvSpPr>
+          <p:cNvPr id="2" name="Title 1">
+            <a:extLst>
+              <a:ext uri="{FF2B5EF4-FFF2-40B4-BE49-F238E27FC236}">
                 <a16:creationId xmlns:a16="http://schemas.microsoft.com/office/drawing/2014/main" id="{4E9D22A6-D52F-42FB-B419-4D8F5EA420AF}"/>
               </a:ext>
             </a:extLst>
@@ -8107,7 +8311,7 @@
           <a:p>
             <a:fld id="{EDEBF0BA-A897-4C1E-AB3C-F330808C0E1D}" type="slidenum">
               <a:rPr lang="en-US" smtClean="0"/>
-              <a:t>26</a:t>
+              <a:t>27</a:t>
             </a:fld>
             <a:endParaRPr lang="en-US"/>
           </a:p>
@@ -8412,6 +8616,13 @@
             </a:r>
           </a:p>
           <a:p>
+            <a:pPr lvl="1"/>
+            <a:r>
+              <a:rPr lang="en-US" sz="2000" dirty="0"/>
+              <a:t>Also applies to domain agnostic libraries like Boost</a:t>
+            </a:r>
+          </a:p>
+          <a:p>
             <a:pPr marL="457200" lvl="1" indent="0">
               <a:buNone/>
             </a:pPr>
@@ -8621,8 +8832,28 @@
           </a:p>
           <a:p>
             <a:r>
+              <a:rPr lang="en-US" sz="2200" dirty="0"/>
+              <a:t>Academic Teaching: 1 instructor – 100 students</a:t>
+            </a:r>
+          </a:p>
+          <a:p>
+            <a:pPr lvl="1"/>
+            <a:r>
+              <a:rPr lang="en-US" sz="1800" dirty="0"/>
+              <a:t>Code life-time: 5 – 10 years</a:t>
+            </a:r>
+          </a:p>
+          <a:p>
+            <a:pPr lvl="1"/>
+            <a:r>
+              <a:rPr lang="en-US" sz="1800" dirty="0"/>
+              <a:t>Example: software examples for language and design courses</a:t>
+            </a:r>
+          </a:p>
+          <a:p>
+            <a:r>
               <a:rPr lang="en-US" sz="2000" dirty="0"/>
-              <a:t>Open Source Development: 5 – 1000 active developers, many casual contributors</a:t>
+              <a:t>Open Source Development: 1 – 300 active developers, many casual contributors</a:t>
             </a:r>
           </a:p>
           <a:p>
@@ -8983,7 +9214,7 @@
           <a:p>
             <a:r>
               <a:rPr lang="en-US" dirty="0"/>
-              <a:t>This is a presentation of goals and features of a website designed to publish source code in support of software reuse.</a:t>
+              <a:t>This is a presentation of goals and features of a website designed to publish source code in support of domain specific software reuse.</a:t>
             </a:r>
           </a:p>
           <a:p>
@@ -9493,15 +9724,7 @@
             </a:pPr>
             <a:r>
               <a:rPr lang="en-US" dirty="0"/>
-              <a:t>A good option - website documentation, </a:t>
-            </a:r>
-            <a:r>
-              <a:rPr lang="en-US" dirty="0" err="1"/>
-              <a:t>colocated</a:t>
-            </a:r>
-            <a:r>
-              <a:rPr lang="en-US" dirty="0"/>
-              <a:t> with source code </a:t>
+              <a:t>A good option - website documentation, co-located with source code </a:t>
             </a:r>
           </a:p>
           <a:p>

</xml_diff>